<commit_message>
new simulations and summary files.
</commit_message>
<xml_diff>
--- a/paper/figures/Experimental design graphics.pptx
+++ b/paper/figures/Experimental design graphics.pptx
@@ -4974,6 +4974,94 @@
           </a:graphicData>
         </a:graphic>
       </p:graphicFrame>
+      <p:sp>
+        <p:nvSpPr>
+          <p:cNvPr id="3" name="TextBox 2">
+            <a:extLst>
+              <a:ext uri="{FF2B5EF4-FFF2-40B4-BE49-F238E27FC236}">
+                <a16:creationId xmlns:a16="http://schemas.microsoft.com/office/drawing/2014/main" id="{F0822401-84D8-4054-B2EA-3FE78E43FF2E}"/>
+              </a:ext>
+            </a:extLst>
+          </p:cNvPr>
+          <p:cNvSpPr txBox="1"/>
+          <p:nvPr/>
+        </p:nvSpPr>
+        <p:spPr>
+          <a:xfrm>
+            <a:off x="9622653" y="3739654"/>
+            <a:ext cx="2495365" cy="1107996"/>
+          </a:xfrm>
+          <a:prstGeom prst="rect">
+            <a:avLst/>
+          </a:prstGeom>
+          <a:noFill/>
+        </p:spPr>
+        <p:txBody>
+          <a:bodyPr wrap="square" rtlCol="0">
+            <a:spAutoFit/>
+          </a:bodyPr>
+          <a:lstStyle/>
+          <a:p>
+            <a:r>
+              <a:rPr lang="en-AU" sz="2200" dirty="0"/>
+              <a:t>~(p=8, cl=3, np=5)</a:t>
+            </a:r>
+          </a:p>
+          <a:p>
+            <a:r>
+              <a:rPr lang="en-AU" sz="2200" dirty="0"/>
+              <a:t>~(p=8, cl=4, np=4)</a:t>
+            </a:r>
+          </a:p>
+          <a:p>
+            <a:r>
+              <a:rPr lang="en-AU" sz="2200" dirty="0"/>
+              <a:t>~(p=10, cl=4, np=5)</a:t>
+            </a:r>
+          </a:p>
+        </p:txBody>
+      </p:sp>
+      <p:sp>
+        <p:nvSpPr>
+          <p:cNvPr id="12" name="TextBox 11">
+            <a:extLst>
+              <a:ext uri="{FF2B5EF4-FFF2-40B4-BE49-F238E27FC236}">
+                <a16:creationId xmlns:a16="http://schemas.microsoft.com/office/drawing/2014/main" id="{C1CE658D-2B84-4D97-9B04-BE2E4F7BA3DE}"/>
+              </a:ext>
+            </a:extLst>
+          </p:cNvPr>
+          <p:cNvSpPr txBox="1"/>
+          <p:nvPr/>
+        </p:nvSpPr>
+        <p:spPr>
+          <a:xfrm>
+            <a:off x="8842160" y="5589544"/>
+            <a:ext cx="3124544" cy="769441"/>
+          </a:xfrm>
+          <a:prstGeom prst="rect">
+            <a:avLst/>
+          </a:prstGeom>
+          <a:noFill/>
+        </p:spPr>
+        <p:txBody>
+          <a:bodyPr wrap="square" rtlCol="0">
+            <a:spAutoFit/>
+          </a:bodyPr>
+          <a:lstStyle/>
+          <a:p>
+            <a:r>
+              <a:rPr lang="en-AU" sz="2200" dirty="0"/>
+              <a:t>Sim119~(p=6, cl=3, np=2)</a:t>
+            </a:r>
+          </a:p>
+          <a:p>
+            <a:r>
+              <a:rPr lang="en-AU" sz="2200" dirty="0"/>
+              <a:t>Sim120~(p=6, cl=3, np=2)</a:t>
+            </a:r>
+          </a:p>
+        </p:txBody>
+      </p:sp>
     </p:spTree>
     <p:extLst>
       <p:ext uri="{BB962C8B-B14F-4D97-AF65-F5344CB8AC3E}">

</xml_diff>

<commit_message>
"rep" -> "block difficulty", changed images too.
</commit_message>
<xml_diff>
--- a/paper/figures/Experimental design graphics.pptx
+++ b/paper/figures/Experimental design graphics.pptx
@@ -6,8 +6,8 @@
   </p:sldMasterIdLst>
   <p:sldIdLst>
     <p:sldId id="262" r:id="rId2"/>
-    <p:sldId id="258" r:id="rId3"/>
-    <p:sldId id="259" r:id="rId4"/>
+    <p:sldId id="259" r:id="rId3"/>
+    <p:sldId id="258" r:id="rId4"/>
     <p:sldId id="260" r:id="rId5"/>
     <p:sldId id="257" r:id="rId6"/>
   </p:sldIdLst>
@@ -277,7 +277,7 @@
           <a:p>
             <a:fld id="{B25803F7-6624-424E-B78C-2F27C4BCE53D}" type="datetimeFigureOut">
               <a:rPr lang="en-AU" smtClean="0"/>
-              <a:t>18/12/2019</a:t>
+              <a:t>7/01/2020</a:t>
             </a:fld>
             <a:endParaRPr lang="en-AU"/>
           </a:p>
@@ -477,7 +477,7 @@
           <a:p>
             <a:fld id="{B25803F7-6624-424E-B78C-2F27C4BCE53D}" type="datetimeFigureOut">
               <a:rPr lang="en-AU" smtClean="0"/>
-              <a:t>18/12/2019</a:t>
+              <a:t>7/01/2020</a:t>
             </a:fld>
             <a:endParaRPr lang="en-AU"/>
           </a:p>
@@ -687,7 +687,7 @@
           <a:p>
             <a:fld id="{B25803F7-6624-424E-B78C-2F27C4BCE53D}" type="datetimeFigureOut">
               <a:rPr lang="en-AU" smtClean="0"/>
-              <a:t>18/12/2019</a:t>
+              <a:t>7/01/2020</a:t>
             </a:fld>
             <a:endParaRPr lang="en-AU"/>
           </a:p>
@@ -887,7 +887,7 @@
           <a:p>
             <a:fld id="{B25803F7-6624-424E-B78C-2F27C4BCE53D}" type="datetimeFigureOut">
               <a:rPr lang="en-AU" smtClean="0"/>
-              <a:t>18/12/2019</a:t>
+              <a:t>7/01/2020</a:t>
             </a:fld>
             <a:endParaRPr lang="en-AU"/>
           </a:p>
@@ -1163,7 +1163,7 @@
           <a:p>
             <a:fld id="{B25803F7-6624-424E-B78C-2F27C4BCE53D}" type="datetimeFigureOut">
               <a:rPr lang="en-AU" smtClean="0"/>
-              <a:t>18/12/2019</a:t>
+              <a:t>7/01/2020</a:t>
             </a:fld>
             <a:endParaRPr lang="en-AU"/>
           </a:p>
@@ -1431,7 +1431,7 @@
           <a:p>
             <a:fld id="{B25803F7-6624-424E-B78C-2F27C4BCE53D}" type="datetimeFigureOut">
               <a:rPr lang="en-AU" smtClean="0"/>
-              <a:t>18/12/2019</a:t>
+              <a:t>7/01/2020</a:t>
             </a:fld>
             <a:endParaRPr lang="en-AU"/>
           </a:p>
@@ -1846,7 +1846,7 @@
           <a:p>
             <a:fld id="{B25803F7-6624-424E-B78C-2F27C4BCE53D}" type="datetimeFigureOut">
               <a:rPr lang="en-AU" smtClean="0"/>
-              <a:t>18/12/2019</a:t>
+              <a:t>7/01/2020</a:t>
             </a:fld>
             <a:endParaRPr lang="en-AU"/>
           </a:p>
@@ -1988,7 +1988,7 @@
           <a:p>
             <a:fld id="{B25803F7-6624-424E-B78C-2F27C4BCE53D}" type="datetimeFigureOut">
               <a:rPr lang="en-AU" smtClean="0"/>
-              <a:t>18/12/2019</a:t>
+              <a:t>7/01/2020</a:t>
             </a:fld>
             <a:endParaRPr lang="en-AU"/>
           </a:p>
@@ -2101,7 +2101,7 @@
           <a:p>
             <a:fld id="{B25803F7-6624-424E-B78C-2F27C4BCE53D}" type="datetimeFigureOut">
               <a:rPr lang="en-AU" smtClean="0"/>
-              <a:t>18/12/2019</a:t>
+              <a:t>7/01/2020</a:t>
             </a:fld>
             <a:endParaRPr lang="en-AU"/>
           </a:p>
@@ -2414,7 +2414,7 @@
           <a:p>
             <a:fld id="{B25803F7-6624-424E-B78C-2F27C4BCE53D}" type="datetimeFigureOut">
               <a:rPr lang="en-AU" smtClean="0"/>
-              <a:t>18/12/2019</a:t>
+              <a:t>7/01/2020</a:t>
             </a:fld>
             <a:endParaRPr lang="en-AU"/>
           </a:p>
@@ -2703,7 +2703,7 @@
           <a:p>
             <a:fld id="{B25803F7-6624-424E-B78C-2F27C4BCE53D}" type="datetimeFigureOut">
               <a:rPr lang="en-AU" smtClean="0"/>
-              <a:t>18/12/2019</a:t>
+              <a:t>7/01/2020</a:t>
             </a:fld>
             <a:endParaRPr lang="en-AU"/>
           </a:p>
@@ -2946,7 +2946,7 @@
           <a:p>
             <a:fld id="{B25803F7-6624-424E-B78C-2F27C4BCE53D}" type="datetimeFigureOut">
               <a:rPr lang="en-AU" smtClean="0"/>
-              <a:t>18/12/2019</a:t>
+              <a:t>7/01/2020</a:t>
             </a:fld>
             <a:endParaRPr lang="en-AU"/>
           </a:p>
@@ -3909,7 +3909,7 @@
           <p:nvPr>
             <p:extLst>
               <p:ext uri="{D42A27DB-BD31-4B8C-83A1-F6EECF244321}">
-                <p14:modId xmlns:p14="http://schemas.microsoft.com/office/powerpoint/2010/main" val="2194013011"/>
+                <p14:modId xmlns:p14="http://schemas.microsoft.com/office/powerpoint/2010/main" val="3729027227"/>
               </p:ext>
             </p:extLst>
           </p:nvPr>
@@ -4000,72 +4000,72 @@
                     <a:p>
                       <a:r>
                         <a:rPr lang="en-AU" dirty="0"/>
-                        <a:t>P1.B1</a:t>
-                      </a:r>
-                    </a:p>
-                  </a:txBody>
-                  <a:tcPr/>
-                </a:tc>
-                <a:tc>
-                  <a:txBody>
-                    <a:bodyPr/>
-                    <a:lstStyle/>
-                    <a:p>
-                      <a:r>
-                        <a:rPr lang="en-AU" dirty="0"/>
-                        <a:t>P1.B2</a:t>
-                      </a:r>
-                    </a:p>
-                  </a:txBody>
-                  <a:tcPr/>
-                </a:tc>
-                <a:tc>
-                  <a:txBody>
-                    <a:bodyPr/>
-                    <a:lstStyle/>
-                    <a:p>
-                      <a:r>
-                        <a:rPr lang="en-AU" dirty="0"/>
-                        <a:t>P2.B1</a:t>
-                      </a:r>
-                    </a:p>
-                  </a:txBody>
-                  <a:tcPr/>
-                </a:tc>
-                <a:tc>
-                  <a:txBody>
-                    <a:bodyPr/>
-                    <a:lstStyle/>
-                    <a:p>
-                      <a:r>
-                        <a:rPr lang="en-AU" dirty="0"/>
-                        <a:t>P2.B2</a:t>
-                      </a:r>
-                    </a:p>
-                  </a:txBody>
-                  <a:tcPr/>
-                </a:tc>
-                <a:tc>
-                  <a:txBody>
-                    <a:bodyPr/>
-                    <a:lstStyle/>
-                    <a:p>
-                      <a:r>
-                        <a:rPr lang="en-AU" dirty="0"/>
-                        <a:t>P2.B1</a:t>
-                      </a:r>
-                    </a:p>
-                  </a:txBody>
-                  <a:tcPr/>
-                </a:tc>
-                <a:tc>
-                  <a:txBody>
-                    <a:bodyPr/>
-                    <a:lstStyle/>
-                    <a:p>
-                      <a:r>
-                        <a:rPr lang="en-AU" dirty="0"/>
-                        <a:t>P2.B2</a:t>
+                        <a:t>P1.T1</a:t>
+                      </a:r>
+                    </a:p>
+                  </a:txBody>
+                  <a:tcPr/>
+                </a:tc>
+                <a:tc>
+                  <a:txBody>
+                    <a:bodyPr/>
+                    <a:lstStyle/>
+                    <a:p>
+                      <a:r>
+                        <a:rPr lang="en-AU" dirty="0"/>
+                        <a:t>P1.T2</a:t>
+                      </a:r>
+                    </a:p>
+                  </a:txBody>
+                  <a:tcPr/>
+                </a:tc>
+                <a:tc>
+                  <a:txBody>
+                    <a:bodyPr/>
+                    <a:lstStyle/>
+                    <a:p>
+                      <a:r>
+                        <a:rPr lang="en-AU" dirty="0"/>
+                        <a:t>P2.T1</a:t>
+                      </a:r>
+                    </a:p>
+                  </a:txBody>
+                  <a:tcPr/>
+                </a:tc>
+                <a:tc>
+                  <a:txBody>
+                    <a:bodyPr/>
+                    <a:lstStyle/>
+                    <a:p>
+                      <a:r>
+                        <a:rPr lang="en-AU" dirty="0"/>
+                        <a:t>P2.T2</a:t>
+                      </a:r>
+                    </a:p>
+                  </a:txBody>
+                  <a:tcPr/>
+                </a:tc>
+                <a:tc>
+                  <a:txBody>
+                    <a:bodyPr/>
+                    <a:lstStyle/>
+                    <a:p>
+                      <a:r>
+                        <a:rPr lang="en-AU" dirty="0"/>
+                        <a:t>P2.T1</a:t>
+                      </a:r>
+                    </a:p>
+                  </a:txBody>
+                  <a:tcPr/>
+                </a:tc>
+                <a:tc>
+                  <a:txBody>
+                    <a:bodyPr/>
+                    <a:lstStyle/>
+                    <a:p>
+                      <a:r>
+                        <a:rPr lang="en-AU" dirty="0"/>
+                        <a:t>P2.T2</a:t>
                       </a:r>
                     </a:p>
                   </a:txBody>
@@ -4106,7 +4106,7 @@
                     <a:p>
                       <a:r>
                         <a:rPr lang="en-AU" dirty="0"/>
-                        <a:t>Repetition 1</a:t>
+                        <a:t>Difficulty  1</a:t>
                       </a:r>
                     </a:p>
                   </a:txBody>
@@ -4225,7 +4225,7 @@
                     <a:p>
                       <a:r>
                         <a:rPr lang="en-AU" dirty="0"/>
-                        <a:t>Repetition 2</a:t>
+                        <a:t>Difficulty 2</a:t>
                       </a:r>
                     </a:p>
                   </a:txBody>
@@ -4344,7 +4344,7 @@
                     <a:p>
                       <a:r>
                         <a:rPr lang="en-AU" dirty="0"/>
-                        <a:t>Repetition 3</a:t>
+                        <a:t>Difficulty 3</a:t>
                       </a:r>
                     </a:p>
                   </a:txBody>
@@ -4661,7 +4661,11 @@
             <a:graphicFrameLocks noGrp="1"/>
           </p:cNvGraphicFramePr>
           <p:nvPr>
-            <p:extLst/>
+            <p:extLst>
+              <p:ext uri="{D42A27DB-BD31-4B8C-83A1-F6EECF244321}">
+                <p14:modId xmlns:p14="http://schemas.microsoft.com/office/powerpoint/2010/main" val="3765390746"/>
+              </p:ext>
+            </p:extLst>
           </p:nvPr>
         </p:nvGraphicFramePr>
         <p:xfrm>
@@ -4872,7 +4876,7 @@
                     <a:p>
                       <a:r>
                         <a:rPr lang="en-AU" dirty="0"/>
-                        <a:t>Block 1</a:t>
+                        <a:t>Task 1</a:t>
                       </a:r>
                     </a:p>
                   </a:txBody>
@@ -4941,7 +4945,7 @@
                     <a:p>
                       <a:r>
                         <a:rPr lang="en-AU" dirty="0"/>
-                        <a:t>Block 2</a:t>
+                        <a:t>Task 2</a:t>
                       </a:r>
                     </a:p>
                   </a:txBody>
@@ -6406,6 +6410,1718 @@
           <a:p>
             <a:r>
               <a:rPr lang="en-AU" dirty="0"/>
+              <a:t>Experimental design graphics v2.2</a:t>
+            </a:r>
+            <a:br>
+              <a:rPr lang="en-AU" dirty="0"/>
+            </a:br>
+            <a:endParaRPr lang="en-AU" dirty="0"/>
+          </a:p>
+        </p:txBody>
+      </p:sp>
+      <p:graphicFrame>
+        <p:nvGraphicFramePr>
+          <p:cNvPr id="7" name="Table 6">
+            <a:extLst>
+              <a:ext uri="{FF2B5EF4-FFF2-40B4-BE49-F238E27FC236}">
+                <a16:creationId xmlns:a16="http://schemas.microsoft.com/office/drawing/2014/main" id="{2232D69B-0643-4FD4-8B46-BA53AEB5EFEA}"/>
+              </a:ext>
+            </a:extLst>
+          </p:cNvPr>
+          <p:cNvGraphicFramePr>
+            <a:graphicFrameLocks noGrp="1"/>
+          </p:cNvGraphicFramePr>
+          <p:nvPr>
+            <p:extLst/>
+          </p:nvPr>
+        </p:nvGraphicFramePr>
+        <p:xfrm>
+          <a:off x="1562468" y="1539986"/>
+          <a:ext cx="6398775" cy="1522675"/>
+        </p:xfrm>
+        <a:graphic>
+          <a:graphicData uri="http://schemas.openxmlformats.org/drawingml/2006/table">
+            <a:tbl>
+              <a:tblPr firstRow="1" bandRow="1">
+                <a:tableStyleId>{5C22544A-7EE6-4342-B048-85BDC9FD1C3A}</a:tableStyleId>
+              </a:tblPr>
+              <a:tblGrid>
+                <a:gridCol w="1322775">
+                  <a:extLst>
+                    <a:ext uri="{9D8B030D-6E8A-4147-A177-3AD203B41FA5}">
+                      <a16:colId xmlns:a16="http://schemas.microsoft.com/office/drawing/2014/main" val="952443710"/>
+                    </a:ext>
+                  </a:extLst>
+                </a:gridCol>
+                <a:gridCol w="1692000">
+                  <a:extLst>
+                    <a:ext uri="{9D8B030D-6E8A-4147-A177-3AD203B41FA5}">
+                      <a16:colId xmlns:a16="http://schemas.microsoft.com/office/drawing/2014/main" val="1574367336"/>
+                    </a:ext>
+                  </a:extLst>
+                </a:gridCol>
+                <a:gridCol w="1692000">
+                  <a:extLst>
+                    <a:ext uri="{9D8B030D-6E8A-4147-A177-3AD203B41FA5}">
+                      <a16:colId xmlns:a16="http://schemas.microsoft.com/office/drawing/2014/main" val="1714213086"/>
+                    </a:ext>
+                  </a:extLst>
+                </a:gridCol>
+                <a:gridCol w="1692000">
+                  <a:extLst>
+                    <a:ext uri="{9D8B030D-6E8A-4147-A177-3AD203B41FA5}">
+                      <a16:colId xmlns:a16="http://schemas.microsoft.com/office/drawing/2014/main" val="313146614"/>
+                    </a:ext>
+                  </a:extLst>
+                </a:gridCol>
+              </a:tblGrid>
+              <a:tr h="376744">
+                <a:tc>
+                  <a:txBody>
+                    <a:bodyPr/>
+                    <a:lstStyle/>
+                    <a:p>
+                      <a:endParaRPr lang="en-AU" dirty="0"/>
+                    </a:p>
+                  </a:txBody>
+                  <a:tcPr/>
+                </a:tc>
+                <a:tc>
+                  <a:txBody>
+                    <a:bodyPr/>
+                    <a:lstStyle/>
+                    <a:p>
+                      <a:r>
+                        <a:rPr lang="en-AU" dirty="0"/>
+                        <a:t>Period 1</a:t>
+                      </a:r>
+                    </a:p>
+                  </a:txBody>
+                  <a:tcPr/>
+                </a:tc>
+                <a:tc>
+                  <a:txBody>
+                    <a:bodyPr/>
+                    <a:lstStyle/>
+                    <a:p>
+                      <a:r>
+                        <a:rPr lang="en-AU" dirty="0"/>
+                        <a:t>Period 2</a:t>
+                      </a:r>
+                    </a:p>
+                  </a:txBody>
+                  <a:tcPr/>
+                </a:tc>
+                <a:tc>
+                  <a:txBody>
+                    <a:bodyPr/>
+                    <a:lstStyle/>
+                    <a:p>
+                      <a:r>
+                        <a:rPr lang="en-AU" dirty="0"/>
+                        <a:t>Period 3</a:t>
+                      </a:r>
+                    </a:p>
+                  </a:txBody>
+                  <a:tcPr/>
+                </a:tc>
+                <a:extLst>
+                  <a:ext uri="{0D108BD9-81ED-4DB2-BD59-A6C34878D82A}">
+                    <a16:rowId xmlns:a16="http://schemas.microsoft.com/office/drawing/2014/main" val="4138763571"/>
+                  </a:ext>
+                </a:extLst>
+              </a:tr>
+              <a:tr h="381977">
+                <a:tc>
+                  <a:txBody>
+                    <a:bodyPr/>
+                    <a:lstStyle/>
+                    <a:p>
+                      <a:r>
+                        <a:rPr lang="en-AU" dirty="0"/>
+                        <a:t>Gp1 (1/3*n)</a:t>
+                      </a:r>
+                    </a:p>
+                  </a:txBody>
+                  <a:tcPr/>
+                </a:tc>
+                <a:tc>
+                  <a:txBody>
+                    <a:bodyPr/>
+                    <a:lstStyle/>
+                    <a:p>
+                      <a:r>
+                        <a:rPr lang="en-AU" dirty="0"/>
+                        <a:t>Factor 1</a:t>
+                      </a:r>
+                    </a:p>
+                  </a:txBody>
+                  <a:tcPr/>
+                </a:tc>
+                <a:tc>
+                  <a:txBody>
+                    <a:bodyPr/>
+                    <a:lstStyle/>
+                    <a:p>
+                      <a:pPr marL="0" marR="0" lvl="0" indent="0" algn="l" defTabSz="914400" rtl="0" eaLnBrk="1" fontAlgn="auto" latinLnBrk="0" hangingPunct="1">
+                        <a:lnSpc>
+                          <a:spcPct val="100000"/>
+                        </a:lnSpc>
+                        <a:spcBef>
+                          <a:spcPts val="0"/>
+                        </a:spcBef>
+                        <a:spcAft>
+                          <a:spcPts val="0"/>
+                        </a:spcAft>
+                        <a:buClrTx/>
+                        <a:buSzTx/>
+                        <a:buFontTx/>
+                        <a:buNone/>
+                        <a:tabLst/>
+                        <a:defRPr/>
+                      </a:pPr>
+                      <a:r>
+                        <a:rPr lang="en-AU" dirty="0"/>
+                        <a:t>Factor 2</a:t>
+                      </a:r>
+                    </a:p>
+                  </a:txBody>
+                  <a:tcPr/>
+                </a:tc>
+                <a:tc>
+                  <a:txBody>
+                    <a:bodyPr/>
+                    <a:lstStyle/>
+                    <a:p>
+                      <a:pPr marL="0" marR="0" lvl="0" indent="0" algn="l" defTabSz="914400" rtl="0" eaLnBrk="1" fontAlgn="auto" latinLnBrk="0" hangingPunct="1">
+                        <a:lnSpc>
+                          <a:spcPct val="100000"/>
+                        </a:lnSpc>
+                        <a:spcBef>
+                          <a:spcPts val="0"/>
+                        </a:spcBef>
+                        <a:spcAft>
+                          <a:spcPts val="0"/>
+                        </a:spcAft>
+                        <a:buClrTx/>
+                        <a:buSzTx/>
+                        <a:buFontTx/>
+                        <a:buNone/>
+                        <a:tabLst/>
+                        <a:defRPr/>
+                      </a:pPr>
+                      <a:r>
+                        <a:rPr lang="en-AU" dirty="0"/>
+                        <a:t>Factor 3</a:t>
+                      </a:r>
+                    </a:p>
+                  </a:txBody>
+                  <a:tcPr/>
+                </a:tc>
+                <a:extLst>
+                  <a:ext uri="{0D108BD9-81ED-4DB2-BD59-A6C34878D82A}">
+                    <a16:rowId xmlns:a16="http://schemas.microsoft.com/office/drawing/2014/main" val="4152554093"/>
+                  </a:ext>
+                </a:extLst>
+              </a:tr>
+              <a:tr h="381977">
+                <a:tc>
+                  <a:txBody>
+                    <a:bodyPr/>
+                    <a:lstStyle/>
+                    <a:p>
+                      <a:pPr marL="0" marR="0" lvl="0" indent="0" algn="l" defTabSz="914400" rtl="0" eaLnBrk="1" fontAlgn="auto" latinLnBrk="0" hangingPunct="1">
+                        <a:lnSpc>
+                          <a:spcPct val="100000"/>
+                        </a:lnSpc>
+                        <a:spcBef>
+                          <a:spcPts val="0"/>
+                        </a:spcBef>
+                        <a:spcAft>
+                          <a:spcPts val="0"/>
+                        </a:spcAft>
+                        <a:buClrTx/>
+                        <a:buSzTx/>
+                        <a:buFontTx/>
+                        <a:buNone/>
+                        <a:tabLst/>
+                        <a:defRPr/>
+                      </a:pPr>
+                      <a:r>
+                        <a:rPr lang="en-AU" dirty="0"/>
+                        <a:t>Gp2 (1/3*n)</a:t>
+                      </a:r>
+                    </a:p>
+                  </a:txBody>
+                  <a:tcPr/>
+                </a:tc>
+                <a:tc>
+                  <a:txBody>
+                    <a:bodyPr/>
+                    <a:lstStyle/>
+                    <a:p>
+                      <a:pPr marL="0" marR="0" lvl="0" indent="0" algn="l" defTabSz="914400" rtl="0" eaLnBrk="1" fontAlgn="auto" latinLnBrk="0" hangingPunct="1">
+                        <a:lnSpc>
+                          <a:spcPct val="100000"/>
+                        </a:lnSpc>
+                        <a:spcBef>
+                          <a:spcPts val="0"/>
+                        </a:spcBef>
+                        <a:spcAft>
+                          <a:spcPts val="0"/>
+                        </a:spcAft>
+                        <a:buClrTx/>
+                        <a:buSzTx/>
+                        <a:buFontTx/>
+                        <a:buNone/>
+                        <a:tabLst/>
+                        <a:defRPr/>
+                      </a:pPr>
+                      <a:r>
+                        <a:rPr lang="en-AU" dirty="0"/>
+                        <a:t>Factor 2</a:t>
+                      </a:r>
+                    </a:p>
+                  </a:txBody>
+                  <a:tcPr/>
+                </a:tc>
+                <a:tc>
+                  <a:txBody>
+                    <a:bodyPr/>
+                    <a:lstStyle/>
+                    <a:p>
+                      <a:pPr marL="0" marR="0" lvl="0" indent="0" algn="l" defTabSz="914400" rtl="0" eaLnBrk="1" fontAlgn="auto" latinLnBrk="0" hangingPunct="1">
+                        <a:lnSpc>
+                          <a:spcPct val="100000"/>
+                        </a:lnSpc>
+                        <a:spcBef>
+                          <a:spcPts val="0"/>
+                        </a:spcBef>
+                        <a:spcAft>
+                          <a:spcPts val="0"/>
+                        </a:spcAft>
+                        <a:buClrTx/>
+                        <a:buSzTx/>
+                        <a:buFontTx/>
+                        <a:buNone/>
+                        <a:tabLst/>
+                        <a:defRPr/>
+                      </a:pPr>
+                      <a:r>
+                        <a:rPr lang="en-AU" dirty="0"/>
+                        <a:t>Factor 3</a:t>
+                      </a:r>
+                    </a:p>
+                  </a:txBody>
+                  <a:tcPr/>
+                </a:tc>
+                <a:tc>
+                  <a:txBody>
+                    <a:bodyPr/>
+                    <a:lstStyle/>
+                    <a:p>
+                      <a:pPr marL="0" marR="0" lvl="0" indent="0" algn="l" defTabSz="914400" rtl="0" eaLnBrk="1" fontAlgn="auto" latinLnBrk="0" hangingPunct="1">
+                        <a:lnSpc>
+                          <a:spcPct val="100000"/>
+                        </a:lnSpc>
+                        <a:spcBef>
+                          <a:spcPts val="0"/>
+                        </a:spcBef>
+                        <a:spcAft>
+                          <a:spcPts val="0"/>
+                        </a:spcAft>
+                        <a:buClrTx/>
+                        <a:buSzTx/>
+                        <a:buFontTx/>
+                        <a:buNone/>
+                        <a:tabLst/>
+                        <a:defRPr/>
+                      </a:pPr>
+                      <a:r>
+                        <a:rPr lang="en-AU" dirty="0"/>
+                        <a:t>Factor 1</a:t>
+                      </a:r>
+                    </a:p>
+                  </a:txBody>
+                  <a:tcPr/>
+                </a:tc>
+                <a:extLst>
+                  <a:ext uri="{0D108BD9-81ED-4DB2-BD59-A6C34878D82A}">
+                    <a16:rowId xmlns:a16="http://schemas.microsoft.com/office/drawing/2014/main" val="127744001"/>
+                  </a:ext>
+                </a:extLst>
+              </a:tr>
+              <a:tr h="381977">
+                <a:tc>
+                  <a:txBody>
+                    <a:bodyPr/>
+                    <a:lstStyle/>
+                    <a:p>
+                      <a:r>
+                        <a:rPr lang="en-AU" dirty="0"/>
+                        <a:t>Gp3 (1/3*n)</a:t>
+                      </a:r>
+                    </a:p>
+                  </a:txBody>
+                  <a:tcPr/>
+                </a:tc>
+                <a:tc>
+                  <a:txBody>
+                    <a:bodyPr/>
+                    <a:lstStyle/>
+                    <a:p>
+                      <a:pPr marL="0" marR="0" lvl="0" indent="0" algn="l" defTabSz="914400" rtl="0" eaLnBrk="1" fontAlgn="auto" latinLnBrk="0" hangingPunct="1">
+                        <a:lnSpc>
+                          <a:spcPct val="100000"/>
+                        </a:lnSpc>
+                        <a:spcBef>
+                          <a:spcPts val="0"/>
+                        </a:spcBef>
+                        <a:spcAft>
+                          <a:spcPts val="0"/>
+                        </a:spcAft>
+                        <a:buClrTx/>
+                        <a:buSzTx/>
+                        <a:buFontTx/>
+                        <a:buNone/>
+                        <a:tabLst/>
+                        <a:defRPr/>
+                      </a:pPr>
+                      <a:r>
+                        <a:rPr lang="en-AU" dirty="0"/>
+                        <a:t>Factor 3</a:t>
+                      </a:r>
+                    </a:p>
+                  </a:txBody>
+                  <a:tcPr/>
+                </a:tc>
+                <a:tc>
+                  <a:txBody>
+                    <a:bodyPr/>
+                    <a:lstStyle/>
+                    <a:p>
+                      <a:pPr marL="0" marR="0" lvl="0" indent="0" algn="l" defTabSz="914400" rtl="0" eaLnBrk="1" fontAlgn="auto" latinLnBrk="0" hangingPunct="1">
+                        <a:lnSpc>
+                          <a:spcPct val="100000"/>
+                        </a:lnSpc>
+                        <a:spcBef>
+                          <a:spcPts val="0"/>
+                        </a:spcBef>
+                        <a:spcAft>
+                          <a:spcPts val="0"/>
+                        </a:spcAft>
+                        <a:buClrTx/>
+                        <a:buSzTx/>
+                        <a:buFontTx/>
+                        <a:buNone/>
+                        <a:tabLst/>
+                        <a:defRPr/>
+                      </a:pPr>
+                      <a:r>
+                        <a:rPr lang="en-AU" dirty="0"/>
+                        <a:t>Factor 1</a:t>
+                      </a:r>
+                    </a:p>
+                  </a:txBody>
+                  <a:tcPr/>
+                </a:tc>
+                <a:tc>
+                  <a:txBody>
+                    <a:bodyPr/>
+                    <a:lstStyle/>
+                    <a:p>
+                      <a:pPr marL="0" marR="0" lvl="0" indent="0" algn="l" defTabSz="914400" rtl="0" eaLnBrk="1" fontAlgn="auto" latinLnBrk="0" hangingPunct="1">
+                        <a:lnSpc>
+                          <a:spcPct val="100000"/>
+                        </a:lnSpc>
+                        <a:spcBef>
+                          <a:spcPts val="0"/>
+                        </a:spcBef>
+                        <a:spcAft>
+                          <a:spcPts val="0"/>
+                        </a:spcAft>
+                        <a:buClrTx/>
+                        <a:buSzTx/>
+                        <a:buFontTx/>
+                        <a:buNone/>
+                        <a:tabLst/>
+                        <a:defRPr/>
+                      </a:pPr>
+                      <a:r>
+                        <a:rPr lang="en-AU" dirty="0"/>
+                        <a:t>Factor 2</a:t>
+                      </a:r>
+                    </a:p>
+                  </a:txBody>
+                  <a:tcPr/>
+                </a:tc>
+                <a:extLst>
+                  <a:ext uri="{0D108BD9-81ED-4DB2-BD59-A6C34878D82A}">
+                    <a16:rowId xmlns:a16="http://schemas.microsoft.com/office/drawing/2014/main" val="2888210093"/>
+                  </a:ext>
+                </a:extLst>
+              </a:tr>
+            </a:tbl>
+          </a:graphicData>
+        </a:graphic>
+      </p:graphicFrame>
+      <p:graphicFrame>
+        <p:nvGraphicFramePr>
+          <p:cNvPr id="9" name="Table 8">
+            <a:extLst>
+              <a:ext uri="{FF2B5EF4-FFF2-40B4-BE49-F238E27FC236}">
+                <a16:creationId xmlns:a16="http://schemas.microsoft.com/office/drawing/2014/main" id="{46D36220-A859-42B9-A346-0C939B88C1E0}"/>
+              </a:ext>
+            </a:extLst>
+          </p:cNvPr>
+          <p:cNvGraphicFramePr>
+            <a:graphicFrameLocks noGrp="1"/>
+          </p:cNvGraphicFramePr>
+          <p:nvPr>
+            <p:extLst>
+              <p:ext uri="{D42A27DB-BD31-4B8C-83A1-F6EECF244321}">
+                <p14:modId xmlns:p14="http://schemas.microsoft.com/office/powerpoint/2010/main" val="2938888582"/>
+              </p:ext>
+            </p:extLst>
+          </p:nvPr>
+        </p:nvGraphicFramePr>
+        <p:xfrm>
+          <a:off x="1562468" y="3384610"/>
+          <a:ext cx="8124870" cy="1463040"/>
+        </p:xfrm>
+        <a:graphic>
+          <a:graphicData uri="http://schemas.openxmlformats.org/drawingml/2006/table">
+            <a:tbl>
+              <a:tblPr firstRow="1" bandRow="1">
+                <a:tableStyleId>{5C22544A-7EE6-4342-B048-85BDC9FD1C3A}</a:tableStyleId>
+              </a:tblPr>
+              <a:tblGrid>
+                <a:gridCol w="1321200">
+                  <a:extLst>
+                    <a:ext uri="{9D8B030D-6E8A-4147-A177-3AD203B41FA5}">
+                      <a16:colId xmlns:a16="http://schemas.microsoft.com/office/drawing/2014/main" val="1987586350"/>
+                    </a:ext>
+                  </a:extLst>
+                </a:gridCol>
+                <a:gridCol w="845945">
+                  <a:extLst>
+                    <a:ext uri="{9D8B030D-6E8A-4147-A177-3AD203B41FA5}">
+                      <a16:colId xmlns:a16="http://schemas.microsoft.com/office/drawing/2014/main" val="2757630649"/>
+                    </a:ext>
+                  </a:extLst>
+                </a:gridCol>
+                <a:gridCol w="845945">
+                  <a:extLst>
+                    <a:ext uri="{9D8B030D-6E8A-4147-A177-3AD203B41FA5}">
+                      <a16:colId xmlns:a16="http://schemas.microsoft.com/office/drawing/2014/main" val="3466847723"/>
+                    </a:ext>
+                  </a:extLst>
+                </a:gridCol>
+                <a:gridCol w="845945">
+                  <a:extLst>
+                    <a:ext uri="{9D8B030D-6E8A-4147-A177-3AD203B41FA5}">
+                      <a16:colId xmlns:a16="http://schemas.microsoft.com/office/drawing/2014/main" val="37018863"/>
+                    </a:ext>
+                  </a:extLst>
+                </a:gridCol>
+                <a:gridCol w="845945">
+                  <a:extLst>
+                    <a:ext uri="{9D8B030D-6E8A-4147-A177-3AD203B41FA5}">
+                      <a16:colId xmlns:a16="http://schemas.microsoft.com/office/drawing/2014/main" val="404444310"/>
+                    </a:ext>
+                  </a:extLst>
+                </a:gridCol>
+                <a:gridCol w="845945">
+                  <a:extLst>
+                    <a:ext uri="{9D8B030D-6E8A-4147-A177-3AD203B41FA5}">
+                      <a16:colId xmlns:a16="http://schemas.microsoft.com/office/drawing/2014/main" val="3782919050"/>
+                    </a:ext>
+                  </a:extLst>
+                </a:gridCol>
+                <a:gridCol w="845945">
+                  <a:extLst>
+                    <a:ext uri="{9D8B030D-6E8A-4147-A177-3AD203B41FA5}">
+                      <a16:colId xmlns:a16="http://schemas.microsoft.com/office/drawing/2014/main" val="1327298383"/>
+                    </a:ext>
+                  </a:extLst>
+                </a:gridCol>
+                <a:gridCol w="1728000">
+                  <a:extLst>
+                    <a:ext uri="{9D8B030D-6E8A-4147-A177-3AD203B41FA5}">
+                      <a16:colId xmlns:a16="http://schemas.microsoft.com/office/drawing/2014/main" val="3798089852"/>
+                    </a:ext>
+                  </a:extLst>
+                </a:gridCol>
+              </a:tblGrid>
+              <a:tr h="0">
+                <a:tc>
+                  <a:txBody>
+                    <a:bodyPr/>
+                    <a:lstStyle/>
+                    <a:p>
+                      <a:endParaRPr lang="en-AU" dirty="0"/>
+                    </a:p>
+                  </a:txBody>
+                  <a:tcPr/>
+                </a:tc>
+                <a:tc>
+                  <a:txBody>
+                    <a:bodyPr/>
+                    <a:lstStyle/>
+                    <a:p>
+                      <a:r>
+                        <a:rPr lang="en-AU" dirty="0"/>
+                        <a:t>P1.T1</a:t>
+                      </a:r>
+                    </a:p>
+                  </a:txBody>
+                  <a:tcPr/>
+                </a:tc>
+                <a:tc>
+                  <a:txBody>
+                    <a:bodyPr/>
+                    <a:lstStyle/>
+                    <a:p>
+                      <a:r>
+                        <a:rPr lang="en-AU" dirty="0"/>
+                        <a:t>P1.T2</a:t>
+                      </a:r>
+                    </a:p>
+                  </a:txBody>
+                  <a:tcPr/>
+                </a:tc>
+                <a:tc>
+                  <a:txBody>
+                    <a:bodyPr/>
+                    <a:lstStyle/>
+                    <a:p>
+                      <a:r>
+                        <a:rPr lang="en-AU" dirty="0"/>
+                        <a:t>P2.T1</a:t>
+                      </a:r>
+                    </a:p>
+                  </a:txBody>
+                  <a:tcPr/>
+                </a:tc>
+                <a:tc>
+                  <a:txBody>
+                    <a:bodyPr/>
+                    <a:lstStyle/>
+                    <a:p>
+                      <a:r>
+                        <a:rPr lang="en-AU" dirty="0"/>
+                        <a:t>P2.T2</a:t>
+                      </a:r>
+                    </a:p>
+                  </a:txBody>
+                  <a:tcPr/>
+                </a:tc>
+                <a:tc>
+                  <a:txBody>
+                    <a:bodyPr/>
+                    <a:lstStyle/>
+                    <a:p>
+                      <a:r>
+                        <a:rPr lang="en-AU" dirty="0"/>
+                        <a:t>P2.T1</a:t>
+                      </a:r>
+                    </a:p>
+                  </a:txBody>
+                  <a:tcPr/>
+                </a:tc>
+                <a:tc>
+                  <a:txBody>
+                    <a:bodyPr/>
+                    <a:lstStyle/>
+                    <a:p>
+                      <a:r>
+                        <a:rPr lang="en-AU" dirty="0"/>
+                        <a:t>P2.T2</a:t>
+                      </a:r>
+                    </a:p>
+                  </a:txBody>
+                  <a:tcPr/>
+                </a:tc>
+                <a:tc>
+                  <a:txBody>
+                    <a:bodyPr/>
+                    <a:lstStyle/>
+                    <a:p>
+                      <a:r>
+                        <a:rPr lang="en-AU" dirty="0"/>
+                        <a:t>Distribution</a:t>
+                      </a:r>
+                    </a:p>
+                  </a:txBody>
+                  <a:tcPr/>
+                </a:tc>
+                <a:extLst>
+                  <a:ext uri="{0D108BD9-81ED-4DB2-BD59-A6C34878D82A}">
+                    <a16:rowId xmlns:a16="http://schemas.microsoft.com/office/drawing/2014/main" val="3189871482"/>
+                  </a:ext>
+                </a:extLst>
+              </a:tr>
+              <a:tr h="360000">
+                <a:tc>
+                  <a:txBody>
+                    <a:bodyPr/>
+                    <a:lstStyle/>
+                    <a:p>
+                      <a:r>
+                        <a:rPr lang="en-AU" dirty="0"/>
+                        <a:t>Repetition 1</a:t>
+                      </a:r>
+                    </a:p>
+                  </a:txBody>
+                  <a:tcPr/>
+                </a:tc>
+                <a:tc>
+                  <a:txBody>
+                    <a:bodyPr/>
+                    <a:lstStyle/>
+                    <a:p>
+                      <a:r>
+                        <a:rPr lang="en-AU" dirty="0"/>
+                        <a:t>Sim1</a:t>
+                      </a:r>
+                    </a:p>
+                  </a:txBody>
+                  <a:tcPr/>
+                </a:tc>
+                <a:tc>
+                  <a:txBody>
+                    <a:bodyPr/>
+                    <a:lstStyle/>
+                    <a:p>
+                      <a:r>
+                        <a:rPr lang="en-AU" dirty="0"/>
+                        <a:t>Sim4</a:t>
+                      </a:r>
+                    </a:p>
+                  </a:txBody>
+                  <a:tcPr/>
+                </a:tc>
+                <a:tc>
+                  <a:txBody>
+                    <a:bodyPr/>
+                    <a:lstStyle/>
+                    <a:p>
+                      <a:r>
+                        <a:rPr lang="en-AU" dirty="0"/>
+                        <a:t>Sim7</a:t>
+                      </a:r>
+                    </a:p>
+                  </a:txBody>
+                  <a:tcPr/>
+                </a:tc>
+                <a:tc>
+                  <a:txBody>
+                    <a:bodyPr/>
+                    <a:lstStyle/>
+                    <a:p>
+                      <a:r>
+                        <a:rPr lang="en-AU" dirty="0"/>
+                        <a:t>Sim10</a:t>
+                      </a:r>
+                    </a:p>
+                  </a:txBody>
+                  <a:tcPr/>
+                </a:tc>
+                <a:tc>
+                  <a:txBody>
+                    <a:bodyPr/>
+                    <a:lstStyle/>
+                    <a:p>
+                      <a:r>
+                        <a:rPr lang="en-AU" dirty="0"/>
+                        <a:t>Sim13</a:t>
+                      </a:r>
+                    </a:p>
+                  </a:txBody>
+                  <a:tcPr/>
+                </a:tc>
+                <a:tc>
+                  <a:txBody>
+                    <a:bodyPr/>
+                    <a:lstStyle/>
+                    <a:p>
+                      <a:r>
+                        <a:rPr lang="en-AU" dirty="0"/>
+                        <a:t>Sim16</a:t>
+                      </a:r>
+                    </a:p>
+                  </a:txBody>
+                  <a:tcPr/>
+                </a:tc>
+                <a:tc>
+                  <a:txBody>
+                    <a:bodyPr/>
+                    <a:lstStyle/>
+                    <a:p>
+                      <a:r>
+                        <a:rPr lang="en-AU" dirty="0"/>
+                        <a:t>~mtvN(easy)</a:t>
+                      </a:r>
+                    </a:p>
+                  </a:txBody>
+                  <a:tcPr/>
+                </a:tc>
+                <a:extLst>
+                  <a:ext uri="{0D108BD9-81ED-4DB2-BD59-A6C34878D82A}">
+                    <a16:rowId xmlns:a16="http://schemas.microsoft.com/office/drawing/2014/main" val="1288797883"/>
+                  </a:ext>
+                </a:extLst>
+              </a:tr>
+              <a:tr h="360000">
+                <a:tc>
+                  <a:txBody>
+                    <a:bodyPr/>
+                    <a:lstStyle/>
+                    <a:p>
+                      <a:r>
+                        <a:rPr lang="en-AU" dirty="0"/>
+                        <a:t>Repetition 2</a:t>
+                      </a:r>
+                    </a:p>
+                  </a:txBody>
+                  <a:tcPr/>
+                </a:tc>
+                <a:tc>
+                  <a:txBody>
+                    <a:bodyPr/>
+                    <a:lstStyle/>
+                    <a:p>
+                      <a:r>
+                        <a:rPr lang="en-AU" dirty="0"/>
+                        <a:t>Sim2</a:t>
+                      </a:r>
+                    </a:p>
+                  </a:txBody>
+                  <a:tcPr/>
+                </a:tc>
+                <a:tc>
+                  <a:txBody>
+                    <a:bodyPr/>
+                    <a:lstStyle/>
+                    <a:p>
+                      <a:r>
+                        <a:rPr lang="en-AU" dirty="0"/>
+                        <a:t>Sim5</a:t>
+                      </a:r>
+                    </a:p>
+                  </a:txBody>
+                  <a:tcPr/>
+                </a:tc>
+                <a:tc>
+                  <a:txBody>
+                    <a:bodyPr/>
+                    <a:lstStyle/>
+                    <a:p>
+                      <a:r>
+                        <a:rPr lang="en-AU" dirty="0"/>
+                        <a:t>Sim8</a:t>
+                      </a:r>
+                    </a:p>
+                  </a:txBody>
+                  <a:tcPr/>
+                </a:tc>
+                <a:tc>
+                  <a:txBody>
+                    <a:bodyPr/>
+                    <a:lstStyle/>
+                    <a:p>
+                      <a:r>
+                        <a:rPr lang="en-AU" dirty="0"/>
+                        <a:t>Sim11</a:t>
+                      </a:r>
+                    </a:p>
+                  </a:txBody>
+                  <a:tcPr/>
+                </a:tc>
+                <a:tc>
+                  <a:txBody>
+                    <a:bodyPr/>
+                    <a:lstStyle/>
+                    <a:p>
+                      <a:r>
+                        <a:rPr lang="en-AU" dirty="0"/>
+                        <a:t>Sim14</a:t>
+                      </a:r>
+                    </a:p>
+                  </a:txBody>
+                  <a:tcPr/>
+                </a:tc>
+                <a:tc>
+                  <a:txBody>
+                    <a:bodyPr/>
+                    <a:lstStyle/>
+                    <a:p>
+                      <a:r>
+                        <a:rPr lang="en-AU" dirty="0"/>
+                        <a:t>Sim17</a:t>
+                      </a:r>
+                    </a:p>
+                  </a:txBody>
+                  <a:tcPr/>
+                </a:tc>
+                <a:tc>
+                  <a:txBody>
+                    <a:bodyPr/>
+                    <a:lstStyle/>
+                    <a:p>
+                      <a:r>
+                        <a:rPr lang="en-AU" dirty="0"/>
+                        <a:t>~mtvΝ(medium)</a:t>
+                      </a:r>
+                    </a:p>
+                  </a:txBody>
+                  <a:tcPr/>
+                </a:tc>
+                <a:extLst>
+                  <a:ext uri="{0D108BD9-81ED-4DB2-BD59-A6C34878D82A}">
+                    <a16:rowId xmlns:a16="http://schemas.microsoft.com/office/drawing/2014/main" val="304250112"/>
+                  </a:ext>
+                </a:extLst>
+              </a:tr>
+              <a:tr h="0">
+                <a:tc>
+                  <a:txBody>
+                    <a:bodyPr/>
+                    <a:lstStyle/>
+                    <a:p>
+                      <a:r>
+                        <a:rPr lang="en-AU" dirty="0"/>
+                        <a:t>Repetition 3</a:t>
+                      </a:r>
+                    </a:p>
+                  </a:txBody>
+                  <a:tcPr/>
+                </a:tc>
+                <a:tc>
+                  <a:txBody>
+                    <a:bodyPr/>
+                    <a:lstStyle/>
+                    <a:p>
+                      <a:r>
+                        <a:rPr lang="en-AU" dirty="0"/>
+                        <a:t>Sim3</a:t>
+                      </a:r>
+                    </a:p>
+                  </a:txBody>
+                  <a:tcPr/>
+                </a:tc>
+                <a:tc>
+                  <a:txBody>
+                    <a:bodyPr/>
+                    <a:lstStyle/>
+                    <a:p>
+                      <a:r>
+                        <a:rPr lang="en-AU" dirty="0"/>
+                        <a:t>Sim6</a:t>
+                      </a:r>
+                    </a:p>
+                  </a:txBody>
+                  <a:tcPr/>
+                </a:tc>
+                <a:tc>
+                  <a:txBody>
+                    <a:bodyPr/>
+                    <a:lstStyle/>
+                    <a:p>
+                      <a:r>
+                        <a:rPr lang="en-AU" dirty="0"/>
+                        <a:t>Sim9</a:t>
+                      </a:r>
+                    </a:p>
+                  </a:txBody>
+                  <a:tcPr/>
+                </a:tc>
+                <a:tc>
+                  <a:txBody>
+                    <a:bodyPr/>
+                    <a:lstStyle/>
+                    <a:p>
+                      <a:r>
+                        <a:rPr lang="en-AU" dirty="0"/>
+                        <a:t>Sim12</a:t>
+                      </a:r>
+                    </a:p>
+                  </a:txBody>
+                  <a:tcPr/>
+                </a:tc>
+                <a:tc>
+                  <a:txBody>
+                    <a:bodyPr/>
+                    <a:lstStyle/>
+                    <a:p>
+                      <a:r>
+                        <a:rPr lang="en-AU" dirty="0"/>
+                        <a:t>Sim15</a:t>
+                      </a:r>
+                    </a:p>
+                  </a:txBody>
+                  <a:tcPr/>
+                </a:tc>
+                <a:tc>
+                  <a:txBody>
+                    <a:bodyPr/>
+                    <a:lstStyle/>
+                    <a:p>
+                      <a:r>
+                        <a:rPr lang="en-AU" dirty="0"/>
+                        <a:t>Sim18</a:t>
+                      </a:r>
+                    </a:p>
+                  </a:txBody>
+                  <a:tcPr/>
+                </a:tc>
+                <a:tc>
+                  <a:txBody>
+                    <a:bodyPr/>
+                    <a:lstStyle/>
+                    <a:p>
+                      <a:r>
+                        <a:rPr lang="en-AU" dirty="0"/>
+                        <a:t>~mtvN(hard)</a:t>
+                      </a:r>
+                    </a:p>
+                  </a:txBody>
+                  <a:tcPr/>
+                </a:tc>
+                <a:extLst>
+                  <a:ext uri="{0D108BD9-81ED-4DB2-BD59-A6C34878D82A}">
+                    <a16:rowId xmlns:a16="http://schemas.microsoft.com/office/drawing/2014/main" val="2370493989"/>
+                  </a:ext>
+                </a:extLst>
+              </a:tr>
+            </a:tbl>
+          </a:graphicData>
+        </a:graphic>
+      </p:graphicFrame>
+      <p:grpSp>
+        <p:nvGrpSpPr>
+          <p:cNvPr id="5" name="Group 4">
+            <a:extLst>
+              <a:ext uri="{FF2B5EF4-FFF2-40B4-BE49-F238E27FC236}">
+                <a16:creationId xmlns:a16="http://schemas.microsoft.com/office/drawing/2014/main" id="{3FE3C3C4-13C2-4C3E-BEB5-81EF20876CDC}"/>
+              </a:ext>
+            </a:extLst>
+          </p:cNvPr>
+          <p:cNvGrpSpPr/>
+          <p:nvPr/>
+        </p:nvGrpSpPr>
+        <p:grpSpPr>
+          <a:xfrm>
+            <a:off x="2902998" y="3062661"/>
+            <a:ext cx="5058245" cy="370856"/>
+            <a:chOff x="2902998" y="3062661"/>
+            <a:chExt cx="5058245" cy="370856"/>
+          </a:xfrm>
+        </p:grpSpPr>
+        <p:cxnSp>
+          <p:nvCxnSpPr>
+            <p:cNvPr id="4" name="Straight Connector 3">
+              <a:extLst>
+                <a:ext uri="{FF2B5EF4-FFF2-40B4-BE49-F238E27FC236}">
+                  <a16:creationId xmlns:a16="http://schemas.microsoft.com/office/drawing/2014/main" id="{8764B69E-BA77-429A-B681-8E2C0BB7E344}"/>
+                </a:ext>
+              </a:extLst>
+            </p:cNvPr>
+            <p:cNvCxnSpPr/>
+            <p:nvPr/>
+          </p:nvCxnSpPr>
+          <p:spPr>
+            <a:xfrm>
+              <a:off x="2902998" y="3062661"/>
+              <a:ext cx="0" cy="370856"/>
+            </a:xfrm>
+            <a:prstGeom prst="line">
+              <a:avLst/>
+            </a:prstGeom>
+            <a:ln w="28575">
+              <a:solidFill>
+                <a:schemeClr val="tx1"/>
+              </a:solidFill>
+              <a:prstDash val="dash"/>
+            </a:ln>
+          </p:spPr>
+          <p:style>
+            <a:lnRef idx="1">
+              <a:schemeClr val="accent1"/>
+            </a:lnRef>
+            <a:fillRef idx="0">
+              <a:schemeClr val="accent1"/>
+            </a:fillRef>
+            <a:effectRef idx="0">
+              <a:schemeClr val="accent1"/>
+            </a:effectRef>
+            <a:fontRef idx="minor">
+              <a:schemeClr val="tx1"/>
+            </a:fontRef>
+          </p:style>
+        </p:cxnSp>
+        <p:cxnSp>
+          <p:nvCxnSpPr>
+            <p:cNvPr id="8" name="Straight Connector 7">
+              <a:extLst>
+                <a:ext uri="{FF2B5EF4-FFF2-40B4-BE49-F238E27FC236}">
+                  <a16:creationId xmlns:a16="http://schemas.microsoft.com/office/drawing/2014/main" id="{5737FC28-2696-4EB1-AB61-74080ED4916C}"/>
+                </a:ext>
+              </a:extLst>
+            </p:cNvPr>
+            <p:cNvCxnSpPr/>
+            <p:nvPr/>
+          </p:nvCxnSpPr>
+          <p:spPr>
+            <a:xfrm>
+              <a:off x="4564602" y="3062661"/>
+              <a:ext cx="0" cy="370856"/>
+            </a:xfrm>
+            <a:prstGeom prst="line">
+              <a:avLst/>
+            </a:prstGeom>
+            <a:ln w="28575">
+              <a:solidFill>
+                <a:schemeClr val="tx1"/>
+              </a:solidFill>
+              <a:prstDash val="dash"/>
+            </a:ln>
+          </p:spPr>
+          <p:style>
+            <a:lnRef idx="1">
+              <a:schemeClr val="accent1"/>
+            </a:lnRef>
+            <a:fillRef idx="0">
+              <a:schemeClr val="accent1"/>
+            </a:fillRef>
+            <a:effectRef idx="0">
+              <a:schemeClr val="accent1"/>
+            </a:effectRef>
+            <a:fontRef idx="minor">
+              <a:schemeClr val="tx1"/>
+            </a:fontRef>
+          </p:style>
+        </p:cxnSp>
+        <p:cxnSp>
+          <p:nvCxnSpPr>
+            <p:cNvPr id="10" name="Straight Connector 9">
+              <a:extLst>
+                <a:ext uri="{FF2B5EF4-FFF2-40B4-BE49-F238E27FC236}">
+                  <a16:creationId xmlns:a16="http://schemas.microsoft.com/office/drawing/2014/main" id="{52C97FD3-668A-468A-9E69-284F5ED6D448}"/>
+                </a:ext>
+              </a:extLst>
+            </p:cNvPr>
+            <p:cNvCxnSpPr/>
+            <p:nvPr/>
+          </p:nvCxnSpPr>
+          <p:spPr>
+            <a:xfrm>
+              <a:off x="6277992" y="3062661"/>
+              <a:ext cx="0" cy="370856"/>
+            </a:xfrm>
+            <a:prstGeom prst="line">
+              <a:avLst/>
+            </a:prstGeom>
+            <a:ln w="28575">
+              <a:solidFill>
+                <a:schemeClr val="tx1"/>
+              </a:solidFill>
+              <a:prstDash val="dash"/>
+            </a:ln>
+          </p:spPr>
+          <p:style>
+            <a:lnRef idx="1">
+              <a:schemeClr val="accent1"/>
+            </a:lnRef>
+            <a:fillRef idx="0">
+              <a:schemeClr val="accent1"/>
+            </a:fillRef>
+            <a:effectRef idx="0">
+              <a:schemeClr val="accent1"/>
+            </a:effectRef>
+            <a:fontRef idx="minor">
+              <a:schemeClr val="tx1"/>
+            </a:fontRef>
+          </p:style>
+        </p:cxnSp>
+        <p:cxnSp>
+          <p:nvCxnSpPr>
+            <p:cNvPr id="11" name="Straight Connector 10">
+              <a:extLst>
+                <a:ext uri="{FF2B5EF4-FFF2-40B4-BE49-F238E27FC236}">
+                  <a16:creationId xmlns:a16="http://schemas.microsoft.com/office/drawing/2014/main" id="{83C01968-F948-4C0C-BD04-3A554E456599}"/>
+                </a:ext>
+              </a:extLst>
+            </p:cNvPr>
+            <p:cNvCxnSpPr/>
+            <p:nvPr/>
+          </p:nvCxnSpPr>
+          <p:spPr>
+            <a:xfrm>
+              <a:off x="7961243" y="3062661"/>
+              <a:ext cx="0" cy="370856"/>
+            </a:xfrm>
+            <a:prstGeom prst="line">
+              <a:avLst/>
+            </a:prstGeom>
+            <a:ln w="28575">
+              <a:solidFill>
+                <a:schemeClr val="tx1"/>
+              </a:solidFill>
+              <a:prstDash val="dash"/>
+            </a:ln>
+          </p:spPr>
+          <p:style>
+            <a:lnRef idx="1">
+              <a:schemeClr val="accent1"/>
+            </a:lnRef>
+            <a:fillRef idx="0">
+              <a:schemeClr val="accent1"/>
+            </a:fillRef>
+            <a:effectRef idx="0">
+              <a:schemeClr val="accent1"/>
+            </a:effectRef>
+            <a:fontRef idx="minor">
+              <a:schemeClr val="tx1"/>
+            </a:fontRef>
+          </p:style>
+        </p:cxnSp>
+      </p:grpSp>
+      <p:graphicFrame>
+        <p:nvGraphicFramePr>
+          <p:cNvPr id="6" name="Table 5">
+            <a:extLst>
+              <a:ext uri="{FF2B5EF4-FFF2-40B4-BE49-F238E27FC236}">
+                <a16:creationId xmlns:a16="http://schemas.microsoft.com/office/drawing/2014/main" id="{A3F26061-83F0-46E4-B0E4-8DC5B0FC8570}"/>
+              </a:ext>
+            </a:extLst>
+          </p:cNvPr>
+          <p:cNvGraphicFramePr>
+            <a:graphicFrameLocks noGrp="1"/>
+          </p:cNvGraphicFramePr>
+          <p:nvPr>
+            <p:extLst>
+              <p:ext uri="{D42A27DB-BD31-4B8C-83A1-F6EECF244321}">
+                <p14:modId xmlns:p14="http://schemas.microsoft.com/office/powerpoint/2010/main" val="73944367"/>
+              </p:ext>
+            </p:extLst>
+          </p:nvPr>
+        </p:nvGraphicFramePr>
+        <p:xfrm>
+          <a:off x="1562468" y="4847864"/>
+          <a:ext cx="6225905" cy="1483360"/>
+        </p:xfrm>
+        <a:graphic>
+          <a:graphicData uri="http://schemas.openxmlformats.org/drawingml/2006/table">
+            <a:tbl>
+              <a:tblPr firstRow="1" bandRow="1">
+                <a:tableStyleId>{5C22544A-7EE6-4342-B048-85BDC9FD1C3A}</a:tableStyleId>
+              </a:tblPr>
+              <a:tblGrid>
+                <a:gridCol w="955047">
+                  <a:extLst>
+                    <a:ext uri="{9D8B030D-6E8A-4147-A177-3AD203B41FA5}">
+                      <a16:colId xmlns:a16="http://schemas.microsoft.com/office/drawing/2014/main" val="1623098923"/>
+                    </a:ext>
+                  </a:extLst>
+                </a:gridCol>
+                <a:gridCol w="1357585">
+                  <a:extLst>
+                    <a:ext uri="{9D8B030D-6E8A-4147-A177-3AD203B41FA5}">
+                      <a16:colId xmlns:a16="http://schemas.microsoft.com/office/drawing/2014/main" val="1883872424"/>
+                    </a:ext>
+                  </a:extLst>
+                </a:gridCol>
+                <a:gridCol w="208280">
+                  <a:extLst>
+                    <a:ext uri="{9D8B030D-6E8A-4147-A177-3AD203B41FA5}">
+                      <a16:colId xmlns:a16="http://schemas.microsoft.com/office/drawing/2014/main" val="4067034447"/>
+                    </a:ext>
+                  </a:extLst>
+                </a:gridCol>
+                <a:gridCol w="896993">
+                  <a:extLst>
+                    <a:ext uri="{9D8B030D-6E8A-4147-A177-3AD203B41FA5}">
+                      <a16:colId xmlns:a16="http://schemas.microsoft.com/office/drawing/2014/main" val="1421016201"/>
+                    </a:ext>
+                  </a:extLst>
+                </a:gridCol>
+                <a:gridCol w="2808000">
+                  <a:extLst>
+                    <a:ext uri="{9D8B030D-6E8A-4147-A177-3AD203B41FA5}">
+                      <a16:colId xmlns:a16="http://schemas.microsoft.com/office/drawing/2014/main" val="1360828441"/>
+                    </a:ext>
+                  </a:extLst>
+                </a:gridCol>
+              </a:tblGrid>
+              <a:tr h="370840">
+                <a:tc>
+                  <a:txBody>
+                    <a:bodyPr/>
+                    <a:lstStyle/>
+                    <a:p>
+                      <a:pPr marL="0" algn="l" defTabSz="914400" rtl="0" eaLnBrk="1" latinLnBrk="0" hangingPunct="1"/>
+                      <a:endParaRPr lang="en-AU" sz="1800" kern="1200" dirty="0">
+                        <a:solidFill>
+                          <a:schemeClr val="dk1"/>
+                        </a:solidFill>
+                        <a:latin typeface="+mn-lt"/>
+                        <a:ea typeface="+mn-ea"/>
+                        <a:cs typeface="+mn-cs"/>
+                      </a:endParaRPr>
+                    </a:p>
+                  </a:txBody>
+                  <a:tcPr>
+                    <a:solidFill>
+                      <a:schemeClr val="bg1"/>
+                    </a:solidFill>
+                  </a:tcPr>
+                </a:tc>
+                <a:tc>
+                  <a:txBody>
+                    <a:bodyPr/>
+                    <a:lstStyle/>
+                    <a:p>
+                      <a:pPr marL="0" algn="l" defTabSz="914400" rtl="0" eaLnBrk="1" latinLnBrk="0" hangingPunct="1"/>
+                      <a:endParaRPr lang="en-AU" sz="1800" kern="1200" dirty="0">
+                        <a:solidFill>
+                          <a:schemeClr val="dk1"/>
+                        </a:solidFill>
+                        <a:latin typeface="+mn-lt"/>
+                        <a:ea typeface="+mn-ea"/>
+                        <a:cs typeface="+mn-cs"/>
+                      </a:endParaRPr>
+                    </a:p>
+                  </a:txBody>
+                  <a:tcPr>
+                    <a:solidFill>
+                      <a:schemeClr val="bg1"/>
+                    </a:solidFill>
+                  </a:tcPr>
+                </a:tc>
+                <a:tc>
+                  <a:txBody>
+                    <a:bodyPr/>
+                    <a:lstStyle/>
+                    <a:p>
+                      <a:pPr marL="0" algn="l" defTabSz="914400" rtl="0" eaLnBrk="1" latinLnBrk="0" hangingPunct="1"/>
+                      <a:endParaRPr lang="en-AU" sz="1800" kern="1200" dirty="0">
+                        <a:solidFill>
+                          <a:schemeClr val="dk1"/>
+                        </a:solidFill>
+                        <a:latin typeface="+mn-lt"/>
+                        <a:ea typeface="+mn-ea"/>
+                        <a:cs typeface="+mn-cs"/>
+                      </a:endParaRPr>
+                    </a:p>
+                  </a:txBody>
+                  <a:tcPr>
+                    <a:solidFill>
+                      <a:schemeClr val="bg1"/>
+                    </a:solidFill>
+                  </a:tcPr>
+                </a:tc>
+                <a:tc>
+                  <a:txBody>
+                    <a:bodyPr/>
+                    <a:lstStyle/>
+                    <a:p>
+                      <a:pPr marL="0" algn="l" defTabSz="914400" rtl="0" eaLnBrk="1" latinLnBrk="0" hangingPunct="1"/>
+                      <a:endParaRPr lang="en-AU" sz="1800" kern="1200" dirty="0">
+                        <a:solidFill>
+                          <a:schemeClr val="dk1"/>
+                        </a:solidFill>
+                        <a:latin typeface="+mn-lt"/>
+                        <a:ea typeface="+mn-ea"/>
+                        <a:cs typeface="+mn-cs"/>
+                      </a:endParaRPr>
+                    </a:p>
+                  </a:txBody>
+                  <a:tcPr>
+                    <a:solidFill>
+                      <a:schemeClr val="bg1"/>
+                    </a:solidFill>
+                  </a:tcPr>
+                </a:tc>
+                <a:tc>
+                  <a:txBody>
+                    <a:bodyPr/>
+                    <a:lstStyle/>
+                    <a:p>
+                      <a:pPr marL="0" algn="l" defTabSz="914400" rtl="0" eaLnBrk="1" latinLnBrk="0" hangingPunct="1"/>
+                      <a:endParaRPr lang="en-AU" sz="1800" kern="1200" dirty="0">
+                        <a:solidFill>
+                          <a:schemeClr val="dk1"/>
+                        </a:solidFill>
+                        <a:latin typeface="+mn-lt"/>
+                        <a:ea typeface="+mn-ea"/>
+                        <a:cs typeface="+mn-cs"/>
+                      </a:endParaRPr>
+                    </a:p>
+                  </a:txBody>
+                  <a:tcPr>
+                    <a:solidFill>
+                      <a:schemeClr val="bg1"/>
+                    </a:solidFill>
+                  </a:tcPr>
+                </a:tc>
+                <a:extLst>
+                  <a:ext uri="{0D108BD9-81ED-4DB2-BD59-A6C34878D82A}">
+                    <a16:rowId xmlns:a16="http://schemas.microsoft.com/office/drawing/2014/main" val="222219733"/>
+                  </a:ext>
+                </a:extLst>
+              </a:tr>
+              <a:tr h="370840">
+                <a:tc>
+                  <a:txBody>
+                    <a:bodyPr/>
+                    <a:lstStyle/>
+                    <a:p>
+                      <a:r>
+                        <a:rPr lang="en-AU" dirty="0"/>
+                        <a:t>Factor 1</a:t>
+                      </a:r>
+                    </a:p>
+                  </a:txBody>
+                  <a:tcPr/>
+                </a:tc>
+                <a:tc>
+                  <a:txBody>
+                    <a:bodyPr/>
+                    <a:lstStyle/>
+                    <a:p>
+                      <a:r>
+                        <a:rPr lang="en-AU" dirty="0"/>
+                        <a:t>PCA</a:t>
+                      </a:r>
+                    </a:p>
+                  </a:txBody>
+                  <a:tcPr/>
+                </a:tc>
+                <a:tc>
+                  <a:txBody>
+                    <a:bodyPr/>
+                    <a:lstStyle/>
+                    <a:p>
+                      <a:endParaRPr lang="en-AU" dirty="0"/>
+                    </a:p>
+                  </a:txBody>
+                  <a:tcPr/>
+                </a:tc>
+                <a:tc>
+                  <a:txBody>
+                    <a:bodyPr/>
+                    <a:lstStyle/>
+                    <a:p>
+                      <a:r>
+                        <a:rPr lang="en-AU" dirty="0"/>
+                        <a:t>Task 1</a:t>
+                      </a:r>
+                    </a:p>
+                  </a:txBody>
+                  <a:tcPr/>
+                </a:tc>
+                <a:tc>
+                  <a:txBody>
+                    <a:bodyPr/>
+                    <a:lstStyle/>
+                    <a:p>
+                      <a:r>
+                        <a:rPr lang="en-AU" dirty="0"/>
+                        <a:t>Number of clusters</a:t>
+                      </a:r>
+                    </a:p>
+                  </a:txBody>
+                  <a:tcPr/>
+                </a:tc>
+                <a:extLst>
+                  <a:ext uri="{0D108BD9-81ED-4DB2-BD59-A6C34878D82A}">
+                    <a16:rowId xmlns:a16="http://schemas.microsoft.com/office/drawing/2014/main" val="2938560685"/>
+                  </a:ext>
+                </a:extLst>
+              </a:tr>
+              <a:tr h="370840">
+                <a:tc>
+                  <a:txBody>
+                    <a:bodyPr/>
+                    <a:lstStyle/>
+                    <a:p>
+                      <a:r>
+                        <a:rPr lang="en-AU" dirty="0"/>
+                        <a:t>Factor 2</a:t>
+                      </a:r>
+                    </a:p>
+                  </a:txBody>
+                  <a:tcPr/>
+                </a:tc>
+                <a:tc>
+                  <a:txBody>
+                    <a:bodyPr/>
+                    <a:lstStyle/>
+                    <a:p>
+                      <a:r>
+                        <a:rPr lang="en-AU" dirty="0"/>
+                        <a:t>Grand tour</a:t>
+                      </a:r>
+                    </a:p>
+                  </a:txBody>
+                  <a:tcPr/>
+                </a:tc>
+                <a:tc>
+                  <a:txBody>
+                    <a:bodyPr/>
+                    <a:lstStyle/>
+                    <a:p>
+                      <a:endParaRPr lang="en-AU" dirty="0"/>
+                    </a:p>
+                  </a:txBody>
+                  <a:tcPr/>
+                </a:tc>
+                <a:tc rowSpan="2">
+                  <a:txBody>
+                    <a:bodyPr/>
+                    <a:lstStyle/>
+                    <a:p>
+                      <a:r>
+                        <a:rPr lang="en-AU" dirty="0"/>
+                        <a:t>Task 2</a:t>
+                      </a:r>
+                    </a:p>
+                  </a:txBody>
+                  <a:tcPr/>
+                </a:tc>
+                <a:tc rowSpan="2">
+                  <a:txBody>
+                    <a:bodyPr/>
+                    <a:lstStyle/>
+                    <a:p>
+                      <a:r>
+                        <a:rPr lang="en-AU" dirty="0"/>
+                        <a:t>Importance of each variable for distinguishing a cluster</a:t>
+                      </a:r>
+                    </a:p>
+                  </a:txBody>
+                  <a:tcPr/>
+                </a:tc>
+                <a:extLst>
+                  <a:ext uri="{0D108BD9-81ED-4DB2-BD59-A6C34878D82A}">
+                    <a16:rowId xmlns:a16="http://schemas.microsoft.com/office/drawing/2014/main" val="4223562969"/>
+                  </a:ext>
+                </a:extLst>
+              </a:tr>
+              <a:tr h="370840">
+                <a:tc>
+                  <a:txBody>
+                    <a:bodyPr/>
+                    <a:lstStyle/>
+                    <a:p>
+                      <a:r>
+                        <a:rPr lang="en-AU" dirty="0"/>
+                        <a:t>Factor 3</a:t>
+                      </a:r>
+                    </a:p>
+                  </a:txBody>
+                  <a:tcPr/>
+                </a:tc>
+                <a:tc>
+                  <a:txBody>
+                    <a:bodyPr/>
+                    <a:lstStyle/>
+                    <a:p>
+                      <a:r>
+                        <a:rPr lang="en-AU" dirty="0"/>
+                        <a:t>Manual tour</a:t>
+                      </a:r>
+                    </a:p>
+                  </a:txBody>
+                  <a:tcPr/>
+                </a:tc>
+                <a:tc>
+                  <a:txBody>
+                    <a:bodyPr/>
+                    <a:lstStyle/>
+                    <a:p>
+                      <a:endParaRPr lang="en-AU" dirty="0"/>
+                    </a:p>
+                  </a:txBody>
+                  <a:tcPr/>
+                </a:tc>
+                <a:tc vMerge="1">
+                  <a:txBody>
+                    <a:bodyPr/>
+                    <a:lstStyle/>
+                    <a:p>
+                      <a:endParaRPr lang="en-AU" dirty="0"/>
+                    </a:p>
+                  </a:txBody>
+                  <a:tcPr/>
+                </a:tc>
+                <a:tc vMerge="1">
+                  <a:txBody>
+                    <a:bodyPr/>
+                    <a:lstStyle/>
+                    <a:p>
+                      <a:endParaRPr lang="en-AU" dirty="0"/>
+                    </a:p>
+                  </a:txBody>
+                  <a:tcPr/>
+                </a:tc>
+                <a:extLst>
+                  <a:ext uri="{0D108BD9-81ED-4DB2-BD59-A6C34878D82A}">
+                    <a16:rowId xmlns:a16="http://schemas.microsoft.com/office/drawing/2014/main" val="1091866687"/>
+                  </a:ext>
+                </a:extLst>
+              </a:tr>
+            </a:tbl>
+          </a:graphicData>
+        </a:graphic>
+      </p:graphicFrame>
+      <p:sp>
+        <p:nvSpPr>
+          <p:cNvPr id="3" name="TextBox 2">
+            <a:extLst>
+              <a:ext uri="{FF2B5EF4-FFF2-40B4-BE49-F238E27FC236}">
+                <a16:creationId xmlns:a16="http://schemas.microsoft.com/office/drawing/2014/main" id="{F0822401-84D8-4054-B2EA-3FE78E43FF2E}"/>
+              </a:ext>
+            </a:extLst>
+          </p:cNvPr>
+          <p:cNvSpPr txBox="1"/>
+          <p:nvPr/>
+        </p:nvSpPr>
+        <p:spPr>
+          <a:xfrm>
+            <a:off x="9937242" y="3739654"/>
+            <a:ext cx="2495365" cy="1107996"/>
+          </a:xfrm>
+          <a:prstGeom prst="rect">
+            <a:avLst/>
+          </a:prstGeom>
+          <a:noFill/>
+        </p:spPr>
+        <p:txBody>
+          <a:bodyPr wrap="square" rtlCol="0">
+            <a:spAutoFit/>
+          </a:bodyPr>
+          <a:lstStyle/>
+          <a:p>
+            <a:r>
+              <a:rPr lang="en-AU" sz="2200" dirty="0"/>
+              <a:t>~(p=8, cl=3, np=5)</a:t>
+            </a:r>
+          </a:p>
+          <a:p>
+            <a:r>
+              <a:rPr lang="en-AU" sz="2200" dirty="0"/>
+              <a:t>~(p=8, cl=4, np=4)</a:t>
+            </a:r>
+          </a:p>
+          <a:p>
+            <a:r>
+              <a:rPr lang="en-AU" sz="2200" dirty="0"/>
+              <a:t>~(p=10, cl=4, np=5)</a:t>
+            </a:r>
+          </a:p>
+        </p:txBody>
+      </p:sp>
+      <p:sp>
+        <p:nvSpPr>
+          <p:cNvPr id="12" name="TextBox 11">
+            <a:extLst>
+              <a:ext uri="{FF2B5EF4-FFF2-40B4-BE49-F238E27FC236}">
+                <a16:creationId xmlns:a16="http://schemas.microsoft.com/office/drawing/2014/main" id="{C1CE658D-2B84-4D97-9B04-BE2E4F7BA3DE}"/>
+              </a:ext>
+            </a:extLst>
+          </p:cNvPr>
+          <p:cNvSpPr txBox="1"/>
+          <p:nvPr/>
+        </p:nvSpPr>
+        <p:spPr>
+          <a:xfrm>
+            <a:off x="9937242" y="5558395"/>
+            <a:ext cx="3124544" cy="769441"/>
+          </a:xfrm>
+          <a:prstGeom prst="rect">
+            <a:avLst/>
+          </a:prstGeom>
+          <a:noFill/>
+        </p:spPr>
+        <p:txBody>
+          <a:bodyPr wrap="square" rtlCol="0">
+            <a:spAutoFit/>
+          </a:bodyPr>
+          <a:lstStyle/>
+          <a:p>
+            <a:r>
+              <a:rPr lang="en-AU" sz="2200" dirty="0"/>
+              <a:t>Sim119~(p=6, cl=3, np=2)</a:t>
+            </a:r>
+          </a:p>
+          <a:p>
+            <a:r>
+              <a:rPr lang="en-AU" sz="2200" dirty="0"/>
+              <a:t>Sim120~(p=6, cl=3, np=2)</a:t>
+            </a:r>
+          </a:p>
+        </p:txBody>
+      </p:sp>
+    </p:spTree>
+    <p:extLst>
+      <p:ext uri="{BB962C8B-B14F-4D97-AF65-F5344CB8AC3E}">
+        <p14:creationId xmlns:p14="http://schemas.microsoft.com/office/powerpoint/2010/main" val="3315783496"/>
+      </p:ext>
+    </p:extLst>
+  </p:cSld>
+  <p:clrMapOvr>
+    <a:masterClrMapping/>
+  </p:clrMapOvr>
+</p:sld>
+</file>
+
+<file path=ppt/slides/slide3.xml><?xml version="1.0" encoding="utf-8"?>
+<p:sld xmlns:a="http://schemas.openxmlformats.org/drawingml/2006/main" xmlns:r="http://schemas.openxmlformats.org/officeDocument/2006/relationships" xmlns:p="http://schemas.openxmlformats.org/presentationml/2006/main">
+  <p:cSld>
+    <p:spTree>
+      <p:nvGrpSpPr>
+        <p:cNvPr id="1" name=""/>
+        <p:cNvGrpSpPr/>
+        <p:nvPr/>
+      </p:nvGrpSpPr>
+      <p:grpSpPr>
+        <a:xfrm>
+          <a:off x="0" y="0"/>
+          <a:ext cx="0" cy="0"/>
+          <a:chOff x="0" y="0"/>
+          <a:chExt cx="0" cy="0"/>
+        </a:xfrm>
+      </p:grpSpPr>
+      <p:sp>
+        <p:nvSpPr>
+          <p:cNvPr id="2" name="Title 1">
+            <a:extLst>
+              <a:ext uri="{FF2B5EF4-FFF2-40B4-BE49-F238E27FC236}">
+                <a16:creationId xmlns:a16="http://schemas.microsoft.com/office/drawing/2014/main" id="{4ECC392A-79EE-4FB3-B62C-DFA7957706E4}"/>
+              </a:ext>
+            </a:extLst>
+          </p:cNvPr>
+          <p:cNvSpPr>
+            <a:spLocks noGrp="1"/>
+          </p:cNvSpPr>
+          <p:nvPr>
+            <p:ph type="title"/>
+          </p:nvPr>
+        </p:nvSpPr>
+        <p:spPr>
+          <a:xfrm>
+            <a:off x="838200" y="18840"/>
+            <a:ext cx="10515600" cy="1325563"/>
+          </a:xfrm>
+        </p:spPr>
+        <p:txBody>
+          <a:bodyPr/>
+          <a:lstStyle/>
+          <a:p>
+            <a:r>
+              <a:rPr lang="en-AU" dirty="0"/>
               <a:t>Experimental design graphics v3</a:t>
             </a:r>
           </a:p>
@@ -6426,7 +8142,7 @@
           <p:nvPr>
             <p:extLst>
               <p:ext uri="{D42A27DB-BD31-4B8C-83A1-F6EECF244321}">
-                <p14:modId xmlns:p14="http://schemas.microsoft.com/office/powerpoint/2010/main" val="2294449351"/>
+                <p14:modId xmlns:p14="http://schemas.microsoft.com/office/powerpoint/2010/main" val="977430248"/>
               </p:ext>
             </p:extLst>
           </p:nvPr>
@@ -9331,6 +11047,56 @@
           </p:cxnSp>
         </p:grpSp>
       </p:grpSp>
+      <p:sp>
+        <p:nvSpPr>
+          <p:cNvPr id="13" name="Rectangle 12">
+            <a:extLst>
+              <a:ext uri="{FF2B5EF4-FFF2-40B4-BE49-F238E27FC236}">
+                <a16:creationId xmlns:a16="http://schemas.microsoft.com/office/drawing/2014/main" id="{4E80F691-965C-4E79-A914-779327890685}"/>
+              </a:ext>
+            </a:extLst>
+          </p:cNvPr>
+          <p:cNvSpPr/>
+          <p:nvPr/>
+        </p:nvSpPr>
+        <p:spPr>
+          <a:xfrm rot="712059">
+            <a:off x="421244" y="1418702"/>
+            <a:ext cx="9862188" cy="1569660"/>
+          </a:xfrm>
+          <a:prstGeom prst="rect">
+            <a:avLst/>
+          </a:prstGeom>
+          <a:noFill/>
+        </p:spPr>
+        <p:txBody>
+          <a:bodyPr wrap="none" lIns="91440" tIns="45720" rIns="91440" bIns="45720">
+            <a:spAutoFit/>
+          </a:bodyPr>
+          <a:lstStyle/>
+          <a:p>
+            <a:pPr algn="ctr"/>
+            <a:r>
+              <a:rPr lang="en-US" sz="9600" b="1" cap="none" spc="0" dirty="0">
+                <a:ln w="22225">
+                  <a:solidFill>
+                    <a:schemeClr val="accent2"/>
+                  </a:solidFill>
+                  <a:prstDash val="solid"/>
+                </a:ln>
+                <a:solidFill>
+                  <a:schemeClr val="accent2">
+                    <a:lumMod val="40000"/>
+                    <a:lumOff val="60000"/>
+                  </a:schemeClr>
+                </a:solidFill>
+                <a:effectLst/>
+              </a:rPr>
+              <a:t>OLD – DO NOT USE</a:t>
+            </a:r>
+          </a:p>
+        </p:txBody>
+      </p:sp>
     </p:spTree>
     <p:extLst>
       <p:ext uri="{BB962C8B-B14F-4D97-AF65-F5344CB8AC3E}">
@@ -9344,7 +11110,7 @@
 </p:sld>
 </file>
 
-<file path=ppt/slides/slide3.xml><?xml version="1.0" encoding="utf-8"?>
+<file path=ppt/slides/slide4.xml><?xml version="1.0" encoding="utf-8"?>
 <p:sld xmlns:a="http://schemas.openxmlformats.org/drawingml/2006/main" xmlns:r="http://schemas.openxmlformats.org/officeDocument/2006/relationships" xmlns:p="http://schemas.openxmlformats.org/presentationml/2006/main">
   <p:cSld>
     <p:spTree>
@@ -9389,12 +11155,8 @@
           <a:p>
             <a:r>
               <a:rPr lang="en-AU" dirty="0"/>
-              <a:t>Experimental design graphics v2.2</a:t>
+              <a:t>Experimental design graphics v2</a:t>
             </a:r>
-            <a:br>
-              <a:rPr lang="en-AU" dirty="0"/>
-            </a:br>
-            <a:endParaRPr lang="en-AU" dirty="0"/>
           </a:p>
         </p:txBody>
       </p:sp>
@@ -9857,11 +11619,7 @@
             <a:graphicFrameLocks noGrp="1"/>
           </p:cNvGraphicFramePr>
           <p:nvPr>
-            <p:extLst>
-              <p:ext uri="{D42A27DB-BD31-4B8C-83A1-F6EECF244321}">
-                <p14:modId xmlns:p14="http://schemas.microsoft.com/office/powerpoint/2010/main" val="2551090780"/>
-              </p:ext>
-            </p:extLst>
+            <p:extLst/>
           </p:nvPr>
         </p:nvGraphicFramePr>
         <p:xfrm>
@@ -10074,6 +11832,32 @@
                     <a:p>
                       <a:r>
                         <a:rPr lang="en-AU" dirty="0"/>
+                        <a:t>Sim2</a:t>
+                      </a:r>
+                    </a:p>
+                  </a:txBody>
+                  <a:tcPr/>
+                </a:tc>
+                <a:tc>
+                  <a:txBody>
+                    <a:bodyPr/>
+                    <a:lstStyle/>
+                    <a:p>
+                      <a:r>
+                        <a:rPr lang="en-AU" dirty="0"/>
+                        <a:t>Sim3</a:t>
+                      </a:r>
+                    </a:p>
+                  </a:txBody>
+                  <a:tcPr/>
+                </a:tc>
+                <a:tc>
+                  <a:txBody>
+                    <a:bodyPr/>
+                    <a:lstStyle/>
+                    <a:p>
+                      <a:r>
+                        <a:rPr lang="en-AU" dirty="0"/>
                         <a:t>Sim4</a:t>
                       </a:r>
                     </a:p>
@@ -10087,46 +11871,20 @@
                     <a:p>
                       <a:r>
                         <a:rPr lang="en-AU" dirty="0"/>
-                        <a:t>Sim7</a:t>
-                      </a:r>
-                    </a:p>
-                  </a:txBody>
-                  <a:tcPr/>
-                </a:tc>
-                <a:tc>
-                  <a:txBody>
-                    <a:bodyPr/>
-                    <a:lstStyle/>
-                    <a:p>
-                      <a:r>
-                        <a:rPr lang="en-AU" dirty="0"/>
-                        <a:t>Sim10</a:t>
-                      </a:r>
-                    </a:p>
-                  </a:txBody>
-                  <a:tcPr/>
-                </a:tc>
-                <a:tc>
-                  <a:txBody>
-                    <a:bodyPr/>
-                    <a:lstStyle/>
-                    <a:p>
-                      <a:r>
-                        <a:rPr lang="en-AU" dirty="0"/>
-                        <a:t>Sim13</a:t>
-                      </a:r>
-                    </a:p>
-                  </a:txBody>
-                  <a:tcPr/>
-                </a:tc>
-                <a:tc>
-                  <a:txBody>
-                    <a:bodyPr/>
-                    <a:lstStyle/>
-                    <a:p>
-                      <a:r>
-                        <a:rPr lang="en-AU" dirty="0"/>
-                        <a:t>Sim16</a:t>
+                        <a:t>Sim5</a:t>
+                      </a:r>
+                    </a:p>
+                  </a:txBody>
+                  <a:tcPr/>
+                </a:tc>
+                <a:tc>
+                  <a:txBody>
+                    <a:bodyPr/>
+                    <a:lstStyle/>
+                    <a:p>
+                      <a:r>
+                        <a:rPr lang="en-AU" dirty="0"/>
+                        <a:t>Sim6</a:t>
                       </a:r>
                     </a:p>
                   </a:txBody>
@@ -10172,20 +11930,7 @@
                     <a:p>
                       <a:r>
                         <a:rPr lang="en-AU" dirty="0"/>
-                        <a:t>Sim2</a:t>
-                      </a:r>
-                    </a:p>
-                  </a:txBody>
-                  <a:tcPr/>
-                </a:tc>
-                <a:tc>
-                  <a:txBody>
-                    <a:bodyPr/>
-                    <a:lstStyle/>
-                    <a:p>
-                      <a:r>
-                        <a:rPr lang="en-AU" dirty="0"/>
-                        <a:t>Sim5</a:t>
+                        <a:t>Sim7</a:t>
                       </a:r>
                     </a:p>
                   </a:txBody>
@@ -10211,6 +11956,32 @@
                     <a:p>
                       <a:r>
                         <a:rPr lang="en-AU" dirty="0"/>
+                        <a:t>Sim9</a:t>
+                      </a:r>
+                    </a:p>
+                  </a:txBody>
+                  <a:tcPr/>
+                </a:tc>
+                <a:tc>
+                  <a:txBody>
+                    <a:bodyPr/>
+                    <a:lstStyle/>
+                    <a:p>
+                      <a:r>
+                        <a:rPr lang="en-AU" dirty="0"/>
+                        <a:t>Sim10</a:t>
+                      </a:r>
+                    </a:p>
+                  </a:txBody>
+                  <a:tcPr/>
+                </a:tc>
+                <a:tc>
+                  <a:txBody>
+                    <a:bodyPr/>
+                    <a:lstStyle/>
+                    <a:p>
+                      <a:r>
+                        <a:rPr lang="en-AU" dirty="0"/>
                         <a:t>Sim11</a:t>
                       </a:r>
                     </a:p>
@@ -10224,20 +11995,7 @@
                     <a:p>
                       <a:r>
                         <a:rPr lang="en-AU" dirty="0"/>
-                        <a:t>Sim14</a:t>
-                      </a:r>
-                    </a:p>
-                  </a:txBody>
-                  <a:tcPr/>
-                </a:tc>
-                <a:tc>
-                  <a:txBody>
-                    <a:bodyPr/>
-                    <a:lstStyle/>
-                    <a:p>
-                      <a:r>
-                        <a:rPr lang="en-AU" dirty="0"/>
-                        <a:t>Sim17</a:t>
+                        <a:t>Sim12</a:t>
                       </a:r>
                     </a:p>
                   </a:txBody>
@@ -10283,46 +12041,20 @@
                     <a:p>
                       <a:r>
                         <a:rPr lang="en-AU" dirty="0"/>
-                        <a:t>Sim3</a:t>
-                      </a:r>
-                    </a:p>
-                  </a:txBody>
-                  <a:tcPr/>
-                </a:tc>
-                <a:tc>
-                  <a:txBody>
-                    <a:bodyPr/>
-                    <a:lstStyle/>
-                    <a:p>
-                      <a:r>
-                        <a:rPr lang="en-AU" dirty="0"/>
-                        <a:t>Sim6</a:t>
-                      </a:r>
-                    </a:p>
-                  </a:txBody>
-                  <a:tcPr/>
-                </a:tc>
-                <a:tc>
-                  <a:txBody>
-                    <a:bodyPr/>
-                    <a:lstStyle/>
-                    <a:p>
-                      <a:r>
-                        <a:rPr lang="en-AU" dirty="0"/>
-                        <a:t>Sim9</a:t>
-                      </a:r>
-                    </a:p>
-                  </a:txBody>
-                  <a:tcPr/>
-                </a:tc>
-                <a:tc>
-                  <a:txBody>
-                    <a:bodyPr/>
-                    <a:lstStyle/>
-                    <a:p>
-                      <a:r>
-                        <a:rPr lang="en-AU" dirty="0"/>
-                        <a:t>Sim12</a:t>
+                        <a:t>Sim13</a:t>
+                      </a:r>
+                    </a:p>
+                  </a:txBody>
+                  <a:tcPr/>
+                </a:tc>
+                <a:tc>
+                  <a:txBody>
+                    <a:bodyPr/>
+                    <a:lstStyle/>
+                    <a:p>
+                      <a:r>
+                        <a:rPr lang="en-AU" dirty="0"/>
+                        <a:t>Sim14</a:t>
                       </a:r>
                     </a:p>
                   </a:txBody>
@@ -10336,6 +12068,32 @@
                       <a:r>
                         <a:rPr lang="en-AU" dirty="0"/>
                         <a:t>Sim15</a:t>
+                      </a:r>
+                    </a:p>
+                  </a:txBody>
+                  <a:tcPr/>
+                </a:tc>
+                <a:tc>
+                  <a:txBody>
+                    <a:bodyPr/>
+                    <a:lstStyle/>
+                    <a:p>
+                      <a:r>
+                        <a:rPr lang="en-AU" dirty="0"/>
+                        <a:t>Sim16</a:t>
+                      </a:r>
+                    </a:p>
+                  </a:txBody>
+                  <a:tcPr/>
+                </a:tc>
+                <a:tc>
+                  <a:txBody>
+                    <a:bodyPr/>
+                    <a:lstStyle/>
+                    <a:p>
+                      <a:r>
+                        <a:rPr lang="en-AU" dirty="0"/>
+                        <a:t>Sim17</a:t>
                       </a:r>
                     </a:p>
                   </a:txBody>
@@ -11039,1634 +12797,22 @@
           </a:p>
         </p:txBody>
       </p:sp>
-    </p:spTree>
-    <p:extLst>
-      <p:ext uri="{BB962C8B-B14F-4D97-AF65-F5344CB8AC3E}">
-        <p14:creationId xmlns:p14="http://schemas.microsoft.com/office/powerpoint/2010/main" val="3315783496"/>
-      </p:ext>
-    </p:extLst>
-  </p:cSld>
-  <p:clrMapOvr>
-    <a:masterClrMapping/>
-  </p:clrMapOvr>
-</p:sld>
-</file>
-
-<file path=ppt/slides/slide4.xml><?xml version="1.0" encoding="utf-8"?>
-<p:sld xmlns:a="http://schemas.openxmlformats.org/drawingml/2006/main" xmlns:r="http://schemas.openxmlformats.org/officeDocument/2006/relationships" xmlns:p="http://schemas.openxmlformats.org/presentationml/2006/main">
-  <p:cSld>
-    <p:spTree>
-      <p:nvGrpSpPr>
-        <p:cNvPr id="1" name=""/>
-        <p:cNvGrpSpPr/>
-        <p:nvPr/>
-      </p:nvGrpSpPr>
-      <p:grpSpPr>
-        <a:xfrm>
-          <a:off x="0" y="0"/>
-          <a:ext cx="0" cy="0"/>
-          <a:chOff x="0" y="0"/>
-          <a:chExt cx="0" cy="0"/>
-        </a:xfrm>
-      </p:grpSpPr>
       <p:sp>
         <p:nvSpPr>
-          <p:cNvPr id="2" name="Title 1">
+          <p:cNvPr id="13" name="Rectangle 12">
             <a:extLst>
               <a:ext uri="{FF2B5EF4-FFF2-40B4-BE49-F238E27FC236}">
-                <a16:creationId xmlns:a16="http://schemas.microsoft.com/office/drawing/2014/main" id="{4ECC392A-79EE-4FB3-B62C-DFA7957706E4}"/>
+                <a16:creationId xmlns:a16="http://schemas.microsoft.com/office/drawing/2014/main" id="{BA41EC9B-5EEF-447A-A788-C4454B91B0F7}"/>
               </a:ext>
             </a:extLst>
           </p:cNvPr>
-          <p:cNvSpPr>
-            <a:spLocks noGrp="1"/>
-          </p:cNvSpPr>
-          <p:nvPr>
-            <p:ph type="title"/>
-          </p:nvPr>
-        </p:nvSpPr>
-        <p:spPr>
-          <a:xfrm>
-            <a:off x="838200" y="18840"/>
-            <a:ext cx="10515600" cy="1325563"/>
-          </a:xfrm>
-        </p:spPr>
-        <p:txBody>
-          <a:bodyPr/>
-          <a:lstStyle/>
-          <a:p>
-            <a:r>
-              <a:rPr lang="en-AU" dirty="0"/>
-              <a:t>Experimental design graphics v2</a:t>
-            </a:r>
-          </a:p>
-        </p:txBody>
-      </p:sp>
-      <p:graphicFrame>
-        <p:nvGraphicFramePr>
-          <p:cNvPr id="7" name="Table 6">
-            <a:extLst>
-              <a:ext uri="{FF2B5EF4-FFF2-40B4-BE49-F238E27FC236}">
-                <a16:creationId xmlns:a16="http://schemas.microsoft.com/office/drawing/2014/main" id="{2232D69B-0643-4FD4-8B46-BA53AEB5EFEA}"/>
-              </a:ext>
-            </a:extLst>
-          </p:cNvPr>
-          <p:cNvGraphicFramePr>
-            <a:graphicFrameLocks noGrp="1"/>
-          </p:cNvGraphicFramePr>
-          <p:nvPr>
-            <p:extLst/>
-          </p:nvPr>
-        </p:nvGraphicFramePr>
-        <p:xfrm>
-          <a:off x="1562468" y="1539986"/>
-          <a:ext cx="6398775" cy="1522675"/>
-        </p:xfrm>
-        <a:graphic>
-          <a:graphicData uri="http://schemas.openxmlformats.org/drawingml/2006/table">
-            <a:tbl>
-              <a:tblPr firstRow="1" bandRow="1">
-                <a:tableStyleId>{5C22544A-7EE6-4342-B048-85BDC9FD1C3A}</a:tableStyleId>
-              </a:tblPr>
-              <a:tblGrid>
-                <a:gridCol w="1322775">
-                  <a:extLst>
-                    <a:ext uri="{9D8B030D-6E8A-4147-A177-3AD203B41FA5}">
-                      <a16:colId xmlns:a16="http://schemas.microsoft.com/office/drawing/2014/main" val="952443710"/>
-                    </a:ext>
-                  </a:extLst>
-                </a:gridCol>
-                <a:gridCol w="1692000">
-                  <a:extLst>
-                    <a:ext uri="{9D8B030D-6E8A-4147-A177-3AD203B41FA5}">
-                      <a16:colId xmlns:a16="http://schemas.microsoft.com/office/drawing/2014/main" val="1574367336"/>
-                    </a:ext>
-                  </a:extLst>
-                </a:gridCol>
-                <a:gridCol w="1692000">
-                  <a:extLst>
-                    <a:ext uri="{9D8B030D-6E8A-4147-A177-3AD203B41FA5}">
-                      <a16:colId xmlns:a16="http://schemas.microsoft.com/office/drawing/2014/main" val="1714213086"/>
-                    </a:ext>
-                  </a:extLst>
-                </a:gridCol>
-                <a:gridCol w="1692000">
-                  <a:extLst>
-                    <a:ext uri="{9D8B030D-6E8A-4147-A177-3AD203B41FA5}">
-                      <a16:colId xmlns:a16="http://schemas.microsoft.com/office/drawing/2014/main" val="313146614"/>
-                    </a:ext>
-                  </a:extLst>
-                </a:gridCol>
-              </a:tblGrid>
-              <a:tr h="376744">
-                <a:tc>
-                  <a:txBody>
-                    <a:bodyPr/>
-                    <a:lstStyle/>
-                    <a:p>
-                      <a:endParaRPr lang="en-AU" dirty="0"/>
-                    </a:p>
-                  </a:txBody>
-                  <a:tcPr/>
-                </a:tc>
-                <a:tc>
-                  <a:txBody>
-                    <a:bodyPr/>
-                    <a:lstStyle/>
-                    <a:p>
-                      <a:r>
-                        <a:rPr lang="en-AU" dirty="0"/>
-                        <a:t>Period 1</a:t>
-                      </a:r>
-                    </a:p>
-                  </a:txBody>
-                  <a:tcPr/>
-                </a:tc>
-                <a:tc>
-                  <a:txBody>
-                    <a:bodyPr/>
-                    <a:lstStyle/>
-                    <a:p>
-                      <a:r>
-                        <a:rPr lang="en-AU" dirty="0"/>
-                        <a:t>Period 2</a:t>
-                      </a:r>
-                    </a:p>
-                  </a:txBody>
-                  <a:tcPr/>
-                </a:tc>
-                <a:tc>
-                  <a:txBody>
-                    <a:bodyPr/>
-                    <a:lstStyle/>
-                    <a:p>
-                      <a:r>
-                        <a:rPr lang="en-AU" dirty="0"/>
-                        <a:t>Period 3</a:t>
-                      </a:r>
-                    </a:p>
-                  </a:txBody>
-                  <a:tcPr/>
-                </a:tc>
-                <a:extLst>
-                  <a:ext uri="{0D108BD9-81ED-4DB2-BD59-A6C34878D82A}">
-                    <a16:rowId xmlns:a16="http://schemas.microsoft.com/office/drawing/2014/main" val="4138763571"/>
-                  </a:ext>
-                </a:extLst>
-              </a:tr>
-              <a:tr h="381977">
-                <a:tc>
-                  <a:txBody>
-                    <a:bodyPr/>
-                    <a:lstStyle/>
-                    <a:p>
-                      <a:r>
-                        <a:rPr lang="en-AU" dirty="0"/>
-                        <a:t>Gp1 (1/3*n)</a:t>
-                      </a:r>
-                    </a:p>
-                  </a:txBody>
-                  <a:tcPr/>
-                </a:tc>
-                <a:tc>
-                  <a:txBody>
-                    <a:bodyPr/>
-                    <a:lstStyle/>
-                    <a:p>
-                      <a:r>
-                        <a:rPr lang="en-AU" dirty="0"/>
-                        <a:t>Factor 1</a:t>
-                      </a:r>
-                    </a:p>
-                  </a:txBody>
-                  <a:tcPr/>
-                </a:tc>
-                <a:tc>
-                  <a:txBody>
-                    <a:bodyPr/>
-                    <a:lstStyle/>
-                    <a:p>
-                      <a:pPr marL="0" marR="0" lvl="0" indent="0" algn="l" defTabSz="914400" rtl="0" eaLnBrk="1" fontAlgn="auto" latinLnBrk="0" hangingPunct="1">
-                        <a:lnSpc>
-                          <a:spcPct val="100000"/>
-                        </a:lnSpc>
-                        <a:spcBef>
-                          <a:spcPts val="0"/>
-                        </a:spcBef>
-                        <a:spcAft>
-                          <a:spcPts val="0"/>
-                        </a:spcAft>
-                        <a:buClrTx/>
-                        <a:buSzTx/>
-                        <a:buFontTx/>
-                        <a:buNone/>
-                        <a:tabLst/>
-                        <a:defRPr/>
-                      </a:pPr>
-                      <a:r>
-                        <a:rPr lang="en-AU" dirty="0"/>
-                        <a:t>Factor 2</a:t>
-                      </a:r>
-                    </a:p>
-                  </a:txBody>
-                  <a:tcPr/>
-                </a:tc>
-                <a:tc>
-                  <a:txBody>
-                    <a:bodyPr/>
-                    <a:lstStyle/>
-                    <a:p>
-                      <a:pPr marL="0" marR="0" lvl="0" indent="0" algn="l" defTabSz="914400" rtl="0" eaLnBrk="1" fontAlgn="auto" latinLnBrk="0" hangingPunct="1">
-                        <a:lnSpc>
-                          <a:spcPct val="100000"/>
-                        </a:lnSpc>
-                        <a:spcBef>
-                          <a:spcPts val="0"/>
-                        </a:spcBef>
-                        <a:spcAft>
-                          <a:spcPts val="0"/>
-                        </a:spcAft>
-                        <a:buClrTx/>
-                        <a:buSzTx/>
-                        <a:buFontTx/>
-                        <a:buNone/>
-                        <a:tabLst/>
-                        <a:defRPr/>
-                      </a:pPr>
-                      <a:r>
-                        <a:rPr lang="en-AU" dirty="0"/>
-                        <a:t>Factor 3</a:t>
-                      </a:r>
-                    </a:p>
-                  </a:txBody>
-                  <a:tcPr/>
-                </a:tc>
-                <a:extLst>
-                  <a:ext uri="{0D108BD9-81ED-4DB2-BD59-A6C34878D82A}">
-                    <a16:rowId xmlns:a16="http://schemas.microsoft.com/office/drawing/2014/main" val="4152554093"/>
-                  </a:ext>
-                </a:extLst>
-              </a:tr>
-              <a:tr h="381977">
-                <a:tc>
-                  <a:txBody>
-                    <a:bodyPr/>
-                    <a:lstStyle/>
-                    <a:p>
-                      <a:pPr marL="0" marR="0" lvl="0" indent="0" algn="l" defTabSz="914400" rtl="0" eaLnBrk="1" fontAlgn="auto" latinLnBrk="0" hangingPunct="1">
-                        <a:lnSpc>
-                          <a:spcPct val="100000"/>
-                        </a:lnSpc>
-                        <a:spcBef>
-                          <a:spcPts val="0"/>
-                        </a:spcBef>
-                        <a:spcAft>
-                          <a:spcPts val="0"/>
-                        </a:spcAft>
-                        <a:buClrTx/>
-                        <a:buSzTx/>
-                        <a:buFontTx/>
-                        <a:buNone/>
-                        <a:tabLst/>
-                        <a:defRPr/>
-                      </a:pPr>
-                      <a:r>
-                        <a:rPr lang="en-AU" dirty="0"/>
-                        <a:t>Gp2 (1/3*n)</a:t>
-                      </a:r>
-                    </a:p>
-                  </a:txBody>
-                  <a:tcPr/>
-                </a:tc>
-                <a:tc>
-                  <a:txBody>
-                    <a:bodyPr/>
-                    <a:lstStyle/>
-                    <a:p>
-                      <a:pPr marL="0" marR="0" lvl="0" indent="0" algn="l" defTabSz="914400" rtl="0" eaLnBrk="1" fontAlgn="auto" latinLnBrk="0" hangingPunct="1">
-                        <a:lnSpc>
-                          <a:spcPct val="100000"/>
-                        </a:lnSpc>
-                        <a:spcBef>
-                          <a:spcPts val="0"/>
-                        </a:spcBef>
-                        <a:spcAft>
-                          <a:spcPts val="0"/>
-                        </a:spcAft>
-                        <a:buClrTx/>
-                        <a:buSzTx/>
-                        <a:buFontTx/>
-                        <a:buNone/>
-                        <a:tabLst/>
-                        <a:defRPr/>
-                      </a:pPr>
-                      <a:r>
-                        <a:rPr lang="en-AU" dirty="0"/>
-                        <a:t>Factor 2</a:t>
-                      </a:r>
-                    </a:p>
-                  </a:txBody>
-                  <a:tcPr/>
-                </a:tc>
-                <a:tc>
-                  <a:txBody>
-                    <a:bodyPr/>
-                    <a:lstStyle/>
-                    <a:p>
-                      <a:pPr marL="0" marR="0" lvl="0" indent="0" algn="l" defTabSz="914400" rtl="0" eaLnBrk="1" fontAlgn="auto" latinLnBrk="0" hangingPunct="1">
-                        <a:lnSpc>
-                          <a:spcPct val="100000"/>
-                        </a:lnSpc>
-                        <a:spcBef>
-                          <a:spcPts val="0"/>
-                        </a:spcBef>
-                        <a:spcAft>
-                          <a:spcPts val="0"/>
-                        </a:spcAft>
-                        <a:buClrTx/>
-                        <a:buSzTx/>
-                        <a:buFontTx/>
-                        <a:buNone/>
-                        <a:tabLst/>
-                        <a:defRPr/>
-                      </a:pPr>
-                      <a:r>
-                        <a:rPr lang="en-AU" dirty="0"/>
-                        <a:t>Factor 3</a:t>
-                      </a:r>
-                    </a:p>
-                  </a:txBody>
-                  <a:tcPr/>
-                </a:tc>
-                <a:tc>
-                  <a:txBody>
-                    <a:bodyPr/>
-                    <a:lstStyle/>
-                    <a:p>
-                      <a:pPr marL="0" marR="0" lvl="0" indent="0" algn="l" defTabSz="914400" rtl="0" eaLnBrk="1" fontAlgn="auto" latinLnBrk="0" hangingPunct="1">
-                        <a:lnSpc>
-                          <a:spcPct val="100000"/>
-                        </a:lnSpc>
-                        <a:spcBef>
-                          <a:spcPts val="0"/>
-                        </a:spcBef>
-                        <a:spcAft>
-                          <a:spcPts val="0"/>
-                        </a:spcAft>
-                        <a:buClrTx/>
-                        <a:buSzTx/>
-                        <a:buFontTx/>
-                        <a:buNone/>
-                        <a:tabLst/>
-                        <a:defRPr/>
-                      </a:pPr>
-                      <a:r>
-                        <a:rPr lang="en-AU" dirty="0"/>
-                        <a:t>Factor 1</a:t>
-                      </a:r>
-                    </a:p>
-                  </a:txBody>
-                  <a:tcPr/>
-                </a:tc>
-                <a:extLst>
-                  <a:ext uri="{0D108BD9-81ED-4DB2-BD59-A6C34878D82A}">
-                    <a16:rowId xmlns:a16="http://schemas.microsoft.com/office/drawing/2014/main" val="127744001"/>
-                  </a:ext>
-                </a:extLst>
-              </a:tr>
-              <a:tr h="381977">
-                <a:tc>
-                  <a:txBody>
-                    <a:bodyPr/>
-                    <a:lstStyle/>
-                    <a:p>
-                      <a:r>
-                        <a:rPr lang="en-AU" dirty="0"/>
-                        <a:t>Gp3 (1/3*n)</a:t>
-                      </a:r>
-                    </a:p>
-                  </a:txBody>
-                  <a:tcPr/>
-                </a:tc>
-                <a:tc>
-                  <a:txBody>
-                    <a:bodyPr/>
-                    <a:lstStyle/>
-                    <a:p>
-                      <a:pPr marL="0" marR="0" lvl="0" indent="0" algn="l" defTabSz="914400" rtl="0" eaLnBrk="1" fontAlgn="auto" latinLnBrk="0" hangingPunct="1">
-                        <a:lnSpc>
-                          <a:spcPct val="100000"/>
-                        </a:lnSpc>
-                        <a:spcBef>
-                          <a:spcPts val="0"/>
-                        </a:spcBef>
-                        <a:spcAft>
-                          <a:spcPts val="0"/>
-                        </a:spcAft>
-                        <a:buClrTx/>
-                        <a:buSzTx/>
-                        <a:buFontTx/>
-                        <a:buNone/>
-                        <a:tabLst/>
-                        <a:defRPr/>
-                      </a:pPr>
-                      <a:r>
-                        <a:rPr lang="en-AU" dirty="0"/>
-                        <a:t>Factor 3</a:t>
-                      </a:r>
-                    </a:p>
-                  </a:txBody>
-                  <a:tcPr/>
-                </a:tc>
-                <a:tc>
-                  <a:txBody>
-                    <a:bodyPr/>
-                    <a:lstStyle/>
-                    <a:p>
-                      <a:pPr marL="0" marR="0" lvl="0" indent="0" algn="l" defTabSz="914400" rtl="0" eaLnBrk="1" fontAlgn="auto" latinLnBrk="0" hangingPunct="1">
-                        <a:lnSpc>
-                          <a:spcPct val="100000"/>
-                        </a:lnSpc>
-                        <a:spcBef>
-                          <a:spcPts val="0"/>
-                        </a:spcBef>
-                        <a:spcAft>
-                          <a:spcPts val="0"/>
-                        </a:spcAft>
-                        <a:buClrTx/>
-                        <a:buSzTx/>
-                        <a:buFontTx/>
-                        <a:buNone/>
-                        <a:tabLst/>
-                        <a:defRPr/>
-                      </a:pPr>
-                      <a:r>
-                        <a:rPr lang="en-AU" dirty="0"/>
-                        <a:t>Factor 1</a:t>
-                      </a:r>
-                    </a:p>
-                  </a:txBody>
-                  <a:tcPr/>
-                </a:tc>
-                <a:tc>
-                  <a:txBody>
-                    <a:bodyPr/>
-                    <a:lstStyle/>
-                    <a:p>
-                      <a:pPr marL="0" marR="0" lvl="0" indent="0" algn="l" defTabSz="914400" rtl="0" eaLnBrk="1" fontAlgn="auto" latinLnBrk="0" hangingPunct="1">
-                        <a:lnSpc>
-                          <a:spcPct val="100000"/>
-                        </a:lnSpc>
-                        <a:spcBef>
-                          <a:spcPts val="0"/>
-                        </a:spcBef>
-                        <a:spcAft>
-                          <a:spcPts val="0"/>
-                        </a:spcAft>
-                        <a:buClrTx/>
-                        <a:buSzTx/>
-                        <a:buFontTx/>
-                        <a:buNone/>
-                        <a:tabLst/>
-                        <a:defRPr/>
-                      </a:pPr>
-                      <a:r>
-                        <a:rPr lang="en-AU" dirty="0"/>
-                        <a:t>Factor 2</a:t>
-                      </a:r>
-                    </a:p>
-                  </a:txBody>
-                  <a:tcPr/>
-                </a:tc>
-                <a:extLst>
-                  <a:ext uri="{0D108BD9-81ED-4DB2-BD59-A6C34878D82A}">
-                    <a16:rowId xmlns:a16="http://schemas.microsoft.com/office/drawing/2014/main" val="2888210093"/>
-                  </a:ext>
-                </a:extLst>
-              </a:tr>
-            </a:tbl>
-          </a:graphicData>
-        </a:graphic>
-      </p:graphicFrame>
-      <p:graphicFrame>
-        <p:nvGraphicFramePr>
-          <p:cNvPr id="9" name="Table 8">
-            <a:extLst>
-              <a:ext uri="{FF2B5EF4-FFF2-40B4-BE49-F238E27FC236}">
-                <a16:creationId xmlns:a16="http://schemas.microsoft.com/office/drawing/2014/main" id="{46D36220-A859-42B9-A346-0C939B88C1E0}"/>
-              </a:ext>
-            </a:extLst>
-          </p:cNvPr>
-          <p:cNvGraphicFramePr>
-            <a:graphicFrameLocks noGrp="1"/>
-          </p:cNvGraphicFramePr>
-          <p:nvPr>
-            <p:extLst/>
-          </p:nvPr>
-        </p:nvGraphicFramePr>
-        <p:xfrm>
-          <a:off x="1562468" y="3384610"/>
-          <a:ext cx="7908870" cy="1463040"/>
-        </p:xfrm>
-        <a:graphic>
-          <a:graphicData uri="http://schemas.openxmlformats.org/drawingml/2006/table">
-            <a:tbl>
-              <a:tblPr firstRow="1" bandRow="1">
-                <a:tableStyleId>{5C22544A-7EE6-4342-B048-85BDC9FD1C3A}</a:tableStyleId>
-              </a:tblPr>
-              <a:tblGrid>
-                <a:gridCol w="1321200">
-                  <a:extLst>
-                    <a:ext uri="{9D8B030D-6E8A-4147-A177-3AD203B41FA5}">
-                      <a16:colId xmlns:a16="http://schemas.microsoft.com/office/drawing/2014/main" val="1987586350"/>
-                    </a:ext>
-                  </a:extLst>
-                </a:gridCol>
-                <a:gridCol w="845945">
-                  <a:extLst>
-                    <a:ext uri="{9D8B030D-6E8A-4147-A177-3AD203B41FA5}">
-                      <a16:colId xmlns:a16="http://schemas.microsoft.com/office/drawing/2014/main" val="2757630649"/>
-                    </a:ext>
-                  </a:extLst>
-                </a:gridCol>
-                <a:gridCol w="845945">
-                  <a:extLst>
-                    <a:ext uri="{9D8B030D-6E8A-4147-A177-3AD203B41FA5}">
-                      <a16:colId xmlns:a16="http://schemas.microsoft.com/office/drawing/2014/main" val="3466847723"/>
-                    </a:ext>
-                  </a:extLst>
-                </a:gridCol>
-                <a:gridCol w="845945">
-                  <a:extLst>
-                    <a:ext uri="{9D8B030D-6E8A-4147-A177-3AD203B41FA5}">
-                      <a16:colId xmlns:a16="http://schemas.microsoft.com/office/drawing/2014/main" val="37018863"/>
-                    </a:ext>
-                  </a:extLst>
-                </a:gridCol>
-                <a:gridCol w="845945">
-                  <a:extLst>
-                    <a:ext uri="{9D8B030D-6E8A-4147-A177-3AD203B41FA5}">
-                      <a16:colId xmlns:a16="http://schemas.microsoft.com/office/drawing/2014/main" val="404444310"/>
-                    </a:ext>
-                  </a:extLst>
-                </a:gridCol>
-                <a:gridCol w="845945">
-                  <a:extLst>
-                    <a:ext uri="{9D8B030D-6E8A-4147-A177-3AD203B41FA5}">
-                      <a16:colId xmlns:a16="http://schemas.microsoft.com/office/drawing/2014/main" val="3782919050"/>
-                    </a:ext>
-                  </a:extLst>
-                </a:gridCol>
-                <a:gridCol w="845945">
-                  <a:extLst>
-                    <a:ext uri="{9D8B030D-6E8A-4147-A177-3AD203B41FA5}">
-                      <a16:colId xmlns:a16="http://schemas.microsoft.com/office/drawing/2014/main" val="1327298383"/>
-                    </a:ext>
-                  </a:extLst>
-                </a:gridCol>
-                <a:gridCol w="1512000">
-                  <a:extLst>
-                    <a:ext uri="{9D8B030D-6E8A-4147-A177-3AD203B41FA5}">
-                      <a16:colId xmlns:a16="http://schemas.microsoft.com/office/drawing/2014/main" val="3798089852"/>
-                    </a:ext>
-                  </a:extLst>
-                </a:gridCol>
-              </a:tblGrid>
-              <a:tr h="0">
-                <a:tc>
-                  <a:txBody>
-                    <a:bodyPr/>
-                    <a:lstStyle/>
-                    <a:p>
-                      <a:endParaRPr lang="en-AU" dirty="0"/>
-                    </a:p>
-                  </a:txBody>
-                  <a:tcPr/>
-                </a:tc>
-                <a:tc>
-                  <a:txBody>
-                    <a:bodyPr/>
-                    <a:lstStyle/>
-                    <a:p>
-                      <a:r>
-                        <a:rPr lang="en-AU" dirty="0"/>
-                        <a:t>P1.B1</a:t>
-                      </a:r>
-                    </a:p>
-                  </a:txBody>
-                  <a:tcPr/>
-                </a:tc>
-                <a:tc>
-                  <a:txBody>
-                    <a:bodyPr/>
-                    <a:lstStyle/>
-                    <a:p>
-                      <a:r>
-                        <a:rPr lang="en-AU" dirty="0"/>
-                        <a:t>P1.B2</a:t>
-                      </a:r>
-                    </a:p>
-                  </a:txBody>
-                  <a:tcPr/>
-                </a:tc>
-                <a:tc>
-                  <a:txBody>
-                    <a:bodyPr/>
-                    <a:lstStyle/>
-                    <a:p>
-                      <a:r>
-                        <a:rPr lang="en-AU" dirty="0"/>
-                        <a:t>P2.B1</a:t>
-                      </a:r>
-                    </a:p>
-                  </a:txBody>
-                  <a:tcPr/>
-                </a:tc>
-                <a:tc>
-                  <a:txBody>
-                    <a:bodyPr/>
-                    <a:lstStyle/>
-                    <a:p>
-                      <a:r>
-                        <a:rPr lang="en-AU" dirty="0"/>
-                        <a:t>P2.B2</a:t>
-                      </a:r>
-                    </a:p>
-                  </a:txBody>
-                  <a:tcPr/>
-                </a:tc>
-                <a:tc>
-                  <a:txBody>
-                    <a:bodyPr/>
-                    <a:lstStyle/>
-                    <a:p>
-                      <a:r>
-                        <a:rPr lang="en-AU" dirty="0"/>
-                        <a:t>P2.B1</a:t>
-                      </a:r>
-                    </a:p>
-                  </a:txBody>
-                  <a:tcPr/>
-                </a:tc>
-                <a:tc>
-                  <a:txBody>
-                    <a:bodyPr/>
-                    <a:lstStyle/>
-                    <a:p>
-                      <a:r>
-                        <a:rPr lang="en-AU" dirty="0"/>
-                        <a:t>P2.B2</a:t>
-                      </a:r>
-                    </a:p>
-                  </a:txBody>
-                  <a:tcPr/>
-                </a:tc>
-                <a:tc>
-                  <a:txBody>
-                    <a:bodyPr/>
-                    <a:lstStyle/>
-                    <a:p>
-                      <a:r>
-                        <a:rPr lang="en-AU" dirty="0"/>
-                        <a:t>Distribution</a:t>
-                      </a:r>
-                    </a:p>
-                  </a:txBody>
-                  <a:tcPr/>
-                </a:tc>
-                <a:extLst>
-                  <a:ext uri="{0D108BD9-81ED-4DB2-BD59-A6C34878D82A}">
-                    <a16:rowId xmlns:a16="http://schemas.microsoft.com/office/drawing/2014/main" val="3189871482"/>
-                  </a:ext>
-                </a:extLst>
-              </a:tr>
-              <a:tr h="360000">
-                <a:tc>
-                  <a:txBody>
-                    <a:bodyPr/>
-                    <a:lstStyle/>
-                    <a:p>
-                      <a:r>
-                        <a:rPr lang="en-AU" dirty="0"/>
-                        <a:t>Repetition 1</a:t>
-                      </a:r>
-                    </a:p>
-                  </a:txBody>
-                  <a:tcPr/>
-                </a:tc>
-                <a:tc>
-                  <a:txBody>
-                    <a:bodyPr/>
-                    <a:lstStyle/>
-                    <a:p>
-                      <a:r>
-                        <a:rPr lang="en-AU" dirty="0"/>
-                        <a:t>Sim1</a:t>
-                      </a:r>
-                    </a:p>
-                  </a:txBody>
-                  <a:tcPr/>
-                </a:tc>
-                <a:tc>
-                  <a:txBody>
-                    <a:bodyPr/>
-                    <a:lstStyle/>
-                    <a:p>
-                      <a:r>
-                        <a:rPr lang="en-AU" dirty="0"/>
-                        <a:t>Sim2</a:t>
-                      </a:r>
-                    </a:p>
-                  </a:txBody>
-                  <a:tcPr/>
-                </a:tc>
-                <a:tc>
-                  <a:txBody>
-                    <a:bodyPr/>
-                    <a:lstStyle/>
-                    <a:p>
-                      <a:r>
-                        <a:rPr lang="en-AU" dirty="0"/>
-                        <a:t>Sim3</a:t>
-                      </a:r>
-                    </a:p>
-                  </a:txBody>
-                  <a:tcPr/>
-                </a:tc>
-                <a:tc>
-                  <a:txBody>
-                    <a:bodyPr/>
-                    <a:lstStyle/>
-                    <a:p>
-                      <a:r>
-                        <a:rPr lang="en-AU" dirty="0"/>
-                        <a:t>Sim4</a:t>
-                      </a:r>
-                    </a:p>
-                  </a:txBody>
-                  <a:tcPr/>
-                </a:tc>
-                <a:tc>
-                  <a:txBody>
-                    <a:bodyPr/>
-                    <a:lstStyle/>
-                    <a:p>
-                      <a:r>
-                        <a:rPr lang="en-AU" dirty="0"/>
-                        <a:t>Sim5</a:t>
-                      </a:r>
-                    </a:p>
-                  </a:txBody>
-                  <a:tcPr/>
-                </a:tc>
-                <a:tc>
-                  <a:txBody>
-                    <a:bodyPr/>
-                    <a:lstStyle/>
-                    <a:p>
-                      <a:r>
-                        <a:rPr lang="en-AU" dirty="0"/>
-                        <a:t>Sim6</a:t>
-                      </a:r>
-                    </a:p>
-                  </a:txBody>
-                  <a:tcPr/>
-                </a:tc>
-                <a:tc>
-                  <a:txBody>
-                    <a:bodyPr/>
-                    <a:lstStyle/>
-                    <a:p>
-                      <a:r>
-                        <a:rPr lang="en-AU" dirty="0"/>
-                        <a:t>~mtvN(easy)</a:t>
-                      </a:r>
-                    </a:p>
-                  </a:txBody>
-                  <a:tcPr/>
-                </a:tc>
-                <a:extLst>
-                  <a:ext uri="{0D108BD9-81ED-4DB2-BD59-A6C34878D82A}">
-                    <a16:rowId xmlns:a16="http://schemas.microsoft.com/office/drawing/2014/main" val="1288797883"/>
-                  </a:ext>
-                </a:extLst>
-              </a:tr>
-              <a:tr h="360000">
-                <a:tc>
-                  <a:txBody>
-                    <a:bodyPr/>
-                    <a:lstStyle/>
-                    <a:p>
-                      <a:r>
-                        <a:rPr lang="en-AU" dirty="0"/>
-                        <a:t>Repetition 2</a:t>
-                      </a:r>
-                    </a:p>
-                  </a:txBody>
-                  <a:tcPr/>
-                </a:tc>
-                <a:tc>
-                  <a:txBody>
-                    <a:bodyPr/>
-                    <a:lstStyle/>
-                    <a:p>
-                      <a:r>
-                        <a:rPr lang="en-AU" dirty="0"/>
-                        <a:t>Sim7</a:t>
-                      </a:r>
-                    </a:p>
-                  </a:txBody>
-                  <a:tcPr/>
-                </a:tc>
-                <a:tc>
-                  <a:txBody>
-                    <a:bodyPr/>
-                    <a:lstStyle/>
-                    <a:p>
-                      <a:r>
-                        <a:rPr lang="en-AU" dirty="0"/>
-                        <a:t>Sim8</a:t>
-                      </a:r>
-                    </a:p>
-                  </a:txBody>
-                  <a:tcPr/>
-                </a:tc>
-                <a:tc>
-                  <a:txBody>
-                    <a:bodyPr/>
-                    <a:lstStyle/>
-                    <a:p>
-                      <a:r>
-                        <a:rPr lang="en-AU" dirty="0"/>
-                        <a:t>Sim9</a:t>
-                      </a:r>
-                    </a:p>
-                  </a:txBody>
-                  <a:tcPr/>
-                </a:tc>
-                <a:tc>
-                  <a:txBody>
-                    <a:bodyPr/>
-                    <a:lstStyle/>
-                    <a:p>
-                      <a:r>
-                        <a:rPr lang="en-AU" dirty="0"/>
-                        <a:t>Sim10</a:t>
-                      </a:r>
-                    </a:p>
-                  </a:txBody>
-                  <a:tcPr/>
-                </a:tc>
-                <a:tc>
-                  <a:txBody>
-                    <a:bodyPr/>
-                    <a:lstStyle/>
-                    <a:p>
-                      <a:r>
-                        <a:rPr lang="en-AU" dirty="0"/>
-                        <a:t>Sim11</a:t>
-                      </a:r>
-                    </a:p>
-                  </a:txBody>
-                  <a:tcPr/>
-                </a:tc>
-                <a:tc>
-                  <a:txBody>
-                    <a:bodyPr/>
-                    <a:lstStyle/>
-                    <a:p>
-                      <a:r>
-                        <a:rPr lang="en-AU" dirty="0"/>
-                        <a:t>Sim12</a:t>
-                      </a:r>
-                    </a:p>
-                  </a:txBody>
-                  <a:tcPr/>
-                </a:tc>
-                <a:tc>
-                  <a:txBody>
-                    <a:bodyPr/>
-                    <a:lstStyle/>
-                    <a:p>
-                      <a:r>
-                        <a:rPr lang="en-AU" dirty="0"/>
-                        <a:t>~mtvΝ(hard1)</a:t>
-                      </a:r>
-                    </a:p>
-                  </a:txBody>
-                  <a:tcPr/>
-                </a:tc>
-                <a:extLst>
-                  <a:ext uri="{0D108BD9-81ED-4DB2-BD59-A6C34878D82A}">
-                    <a16:rowId xmlns:a16="http://schemas.microsoft.com/office/drawing/2014/main" val="304250112"/>
-                  </a:ext>
-                </a:extLst>
-              </a:tr>
-              <a:tr h="0">
-                <a:tc>
-                  <a:txBody>
-                    <a:bodyPr/>
-                    <a:lstStyle/>
-                    <a:p>
-                      <a:r>
-                        <a:rPr lang="en-AU" dirty="0"/>
-                        <a:t>Repetition 3</a:t>
-                      </a:r>
-                    </a:p>
-                  </a:txBody>
-                  <a:tcPr/>
-                </a:tc>
-                <a:tc>
-                  <a:txBody>
-                    <a:bodyPr/>
-                    <a:lstStyle/>
-                    <a:p>
-                      <a:r>
-                        <a:rPr lang="en-AU" dirty="0"/>
-                        <a:t>Sim13</a:t>
-                      </a:r>
-                    </a:p>
-                  </a:txBody>
-                  <a:tcPr/>
-                </a:tc>
-                <a:tc>
-                  <a:txBody>
-                    <a:bodyPr/>
-                    <a:lstStyle/>
-                    <a:p>
-                      <a:r>
-                        <a:rPr lang="en-AU" dirty="0"/>
-                        <a:t>Sim14</a:t>
-                      </a:r>
-                    </a:p>
-                  </a:txBody>
-                  <a:tcPr/>
-                </a:tc>
-                <a:tc>
-                  <a:txBody>
-                    <a:bodyPr/>
-                    <a:lstStyle/>
-                    <a:p>
-                      <a:r>
-                        <a:rPr lang="en-AU" dirty="0"/>
-                        <a:t>Sim15</a:t>
-                      </a:r>
-                    </a:p>
-                  </a:txBody>
-                  <a:tcPr/>
-                </a:tc>
-                <a:tc>
-                  <a:txBody>
-                    <a:bodyPr/>
-                    <a:lstStyle/>
-                    <a:p>
-                      <a:r>
-                        <a:rPr lang="en-AU" dirty="0"/>
-                        <a:t>Sim16</a:t>
-                      </a:r>
-                    </a:p>
-                  </a:txBody>
-                  <a:tcPr/>
-                </a:tc>
-                <a:tc>
-                  <a:txBody>
-                    <a:bodyPr/>
-                    <a:lstStyle/>
-                    <a:p>
-                      <a:r>
-                        <a:rPr lang="en-AU" dirty="0"/>
-                        <a:t>Sim17</a:t>
-                      </a:r>
-                    </a:p>
-                  </a:txBody>
-                  <a:tcPr/>
-                </a:tc>
-                <a:tc>
-                  <a:txBody>
-                    <a:bodyPr/>
-                    <a:lstStyle/>
-                    <a:p>
-                      <a:r>
-                        <a:rPr lang="en-AU" dirty="0"/>
-                        <a:t>Sim18</a:t>
-                      </a:r>
-                    </a:p>
-                  </a:txBody>
-                  <a:tcPr/>
-                </a:tc>
-                <a:tc>
-                  <a:txBody>
-                    <a:bodyPr/>
-                    <a:lstStyle/>
-                    <a:p>
-                      <a:r>
-                        <a:rPr lang="en-AU" dirty="0"/>
-                        <a:t>~mtvN(hard2)</a:t>
-                      </a:r>
-                    </a:p>
-                  </a:txBody>
-                  <a:tcPr/>
-                </a:tc>
-                <a:extLst>
-                  <a:ext uri="{0D108BD9-81ED-4DB2-BD59-A6C34878D82A}">
-                    <a16:rowId xmlns:a16="http://schemas.microsoft.com/office/drawing/2014/main" val="2370493989"/>
-                  </a:ext>
-                </a:extLst>
-              </a:tr>
-            </a:tbl>
-          </a:graphicData>
-        </a:graphic>
-      </p:graphicFrame>
-      <p:grpSp>
-        <p:nvGrpSpPr>
-          <p:cNvPr id="5" name="Group 4">
-            <a:extLst>
-              <a:ext uri="{FF2B5EF4-FFF2-40B4-BE49-F238E27FC236}">
-                <a16:creationId xmlns:a16="http://schemas.microsoft.com/office/drawing/2014/main" id="{3FE3C3C4-13C2-4C3E-BEB5-81EF20876CDC}"/>
-              </a:ext>
-            </a:extLst>
-          </p:cNvPr>
-          <p:cNvGrpSpPr/>
-          <p:nvPr/>
-        </p:nvGrpSpPr>
-        <p:grpSpPr>
-          <a:xfrm>
-            <a:off x="2902998" y="3062661"/>
-            <a:ext cx="5058245" cy="370856"/>
-            <a:chOff x="2902998" y="3062661"/>
-            <a:chExt cx="5058245" cy="370856"/>
-          </a:xfrm>
-        </p:grpSpPr>
-        <p:cxnSp>
-          <p:nvCxnSpPr>
-            <p:cNvPr id="4" name="Straight Connector 3">
-              <a:extLst>
-                <a:ext uri="{FF2B5EF4-FFF2-40B4-BE49-F238E27FC236}">
-                  <a16:creationId xmlns:a16="http://schemas.microsoft.com/office/drawing/2014/main" id="{8764B69E-BA77-429A-B681-8E2C0BB7E344}"/>
-                </a:ext>
-              </a:extLst>
-            </p:cNvPr>
-            <p:cNvCxnSpPr/>
-            <p:nvPr/>
-          </p:nvCxnSpPr>
-          <p:spPr>
-            <a:xfrm>
-              <a:off x="2902998" y="3062661"/>
-              <a:ext cx="0" cy="370856"/>
-            </a:xfrm>
-            <a:prstGeom prst="line">
-              <a:avLst/>
-            </a:prstGeom>
-            <a:ln w="28575">
-              <a:solidFill>
-                <a:schemeClr val="tx1"/>
-              </a:solidFill>
-              <a:prstDash val="dash"/>
-            </a:ln>
-          </p:spPr>
-          <p:style>
-            <a:lnRef idx="1">
-              <a:schemeClr val="accent1"/>
-            </a:lnRef>
-            <a:fillRef idx="0">
-              <a:schemeClr val="accent1"/>
-            </a:fillRef>
-            <a:effectRef idx="0">
-              <a:schemeClr val="accent1"/>
-            </a:effectRef>
-            <a:fontRef idx="minor">
-              <a:schemeClr val="tx1"/>
-            </a:fontRef>
-          </p:style>
-        </p:cxnSp>
-        <p:cxnSp>
-          <p:nvCxnSpPr>
-            <p:cNvPr id="8" name="Straight Connector 7">
-              <a:extLst>
-                <a:ext uri="{FF2B5EF4-FFF2-40B4-BE49-F238E27FC236}">
-                  <a16:creationId xmlns:a16="http://schemas.microsoft.com/office/drawing/2014/main" id="{5737FC28-2696-4EB1-AB61-74080ED4916C}"/>
-                </a:ext>
-              </a:extLst>
-            </p:cNvPr>
-            <p:cNvCxnSpPr/>
-            <p:nvPr/>
-          </p:nvCxnSpPr>
-          <p:spPr>
-            <a:xfrm>
-              <a:off x="4564602" y="3062661"/>
-              <a:ext cx="0" cy="370856"/>
-            </a:xfrm>
-            <a:prstGeom prst="line">
-              <a:avLst/>
-            </a:prstGeom>
-            <a:ln w="28575">
-              <a:solidFill>
-                <a:schemeClr val="tx1"/>
-              </a:solidFill>
-              <a:prstDash val="dash"/>
-            </a:ln>
-          </p:spPr>
-          <p:style>
-            <a:lnRef idx="1">
-              <a:schemeClr val="accent1"/>
-            </a:lnRef>
-            <a:fillRef idx="0">
-              <a:schemeClr val="accent1"/>
-            </a:fillRef>
-            <a:effectRef idx="0">
-              <a:schemeClr val="accent1"/>
-            </a:effectRef>
-            <a:fontRef idx="minor">
-              <a:schemeClr val="tx1"/>
-            </a:fontRef>
-          </p:style>
-        </p:cxnSp>
-        <p:cxnSp>
-          <p:nvCxnSpPr>
-            <p:cNvPr id="10" name="Straight Connector 9">
-              <a:extLst>
-                <a:ext uri="{FF2B5EF4-FFF2-40B4-BE49-F238E27FC236}">
-                  <a16:creationId xmlns:a16="http://schemas.microsoft.com/office/drawing/2014/main" id="{52C97FD3-668A-468A-9E69-284F5ED6D448}"/>
-                </a:ext>
-              </a:extLst>
-            </p:cNvPr>
-            <p:cNvCxnSpPr/>
-            <p:nvPr/>
-          </p:nvCxnSpPr>
-          <p:spPr>
-            <a:xfrm>
-              <a:off x="6277992" y="3062661"/>
-              <a:ext cx="0" cy="370856"/>
-            </a:xfrm>
-            <a:prstGeom prst="line">
-              <a:avLst/>
-            </a:prstGeom>
-            <a:ln w="28575">
-              <a:solidFill>
-                <a:schemeClr val="tx1"/>
-              </a:solidFill>
-              <a:prstDash val="dash"/>
-            </a:ln>
-          </p:spPr>
-          <p:style>
-            <a:lnRef idx="1">
-              <a:schemeClr val="accent1"/>
-            </a:lnRef>
-            <a:fillRef idx="0">
-              <a:schemeClr val="accent1"/>
-            </a:fillRef>
-            <a:effectRef idx="0">
-              <a:schemeClr val="accent1"/>
-            </a:effectRef>
-            <a:fontRef idx="minor">
-              <a:schemeClr val="tx1"/>
-            </a:fontRef>
-          </p:style>
-        </p:cxnSp>
-        <p:cxnSp>
-          <p:nvCxnSpPr>
-            <p:cNvPr id="11" name="Straight Connector 10">
-              <a:extLst>
-                <a:ext uri="{FF2B5EF4-FFF2-40B4-BE49-F238E27FC236}">
-                  <a16:creationId xmlns:a16="http://schemas.microsoft.com/office/drawing/2014/main" id="{83C01968-F948-4C0C-BD04-3A554E456599}"/>
-                </a:ext>
-              </a:extLst>
-            </p:cNvPr>
-            <p:cNvCxnSpPr/>
-            <p:nvPr/>
-          </p:nvCxnSpPr>
-          <p:spPr>
-            <a:xfrm>
-              <a:off x="7961243" y="3062661"/>
-              <a:ext cx="0" cy="370856"/>
-            </a:xfrm>
-            <a:prstGeom prst="line">
-              <a:avLst/>
-            </a:prstGeom>
-            <a:ln w="28575">
-              <a:solidFill>
-                <a:schemeClr val="tx1"/>
-              </a:solidFill>
-              <a:prstDash val="dash"/>
-            </a:ln>
-          </p:spPr>
-          <p:style>
-            <a:lnRef idx="1">
-              <a:schemeClr val="accent1"/>
-            </a:lnRef>
-            <a:fillRef idx="0">
-              <a:schemeClr val="accent1"/>
-            </a:fillRef>
-            <a:effectRef idx="0">
-              <a:schemeClr val="accent1"/>
-            </a:effectRef>
-            <a:fontRef idx="minor">
-              <a:schemeClr val="tx1"/>
-            </a:fontRef>
-          </p:style>
-        </p:cxnSp>
-      </p:grpSp>
-      <p:graphicFrame>
-        <p:nvGraphicFramePr>
-          <p:cNvPr id="6" name="Table 5">
-            <a:extLst>
-              <a:ext uri="{FF2B5EF4-FFF2-40B4-BE49-F238E27FC236}">
-                <a16:creationId xmlns:a16="http://schemas.microsoft.com/office/drawing/2014/main" id="{A3F26061-83F0-46E4-B0E4-8DC5B0FC8570}"/>
-              </a:ext>
-            </a:extLst>
-          </p:cNvPr>
-          <p:cNvGraphicFramePr>
-            <a:graphicFrameLocks noGrp="1"/>
-          </p:cNvGraphicFramePr>
-          <p:nvPr>
-            <p:extLst/>
-          </p:nvPr>
-        </p:nvGraphicFramePr>
-        <p:xfrm>
-          <a:off x="1562468" y="4847864"/>
-          <a:ext cx="6225905" cy="1483360"/>
-        </p:xfrm>
-        <a:graphic>
-          <a:graphicData uri="http://schemas.openxmlformats.org/drawingml/2006/table">
-            <a:tbl>
-              <a:tblPr firstRow="1" bandRow="1">
-                <a:tableStyleId>{5C22544A-7EE6-4342-B048-85BDC9FD1C3A}</a:tableStyleId>
-              </a:tblPr>
-              <a:tblGrid>
-                <a:gridCol w="955047">
-                  <a:extLst>
-                    <a:ext uri="{9D8B030D-6E8A-4147-A177-3AD203B41FA5}">
-                      <a16:colId xmlns:a16="http://schemas.microsoft.com/office/drawing/2014/main" val="1623098923"/>
-                    </a:ext>
-                  </a:extLst>
-                </a:gridCol>
-                <a:gridCol w="1357585">
-                  <a:extLst>
-                    <a:ext uri="{9D8B030D-6E8A-4147-A177-3AD203B41FA5}">
-                      <a16:colId xmlns:a16="http://schemas.microsoft.com/office/drawing/2014/main" val="1883872424"/>
-                    </a:ext>
-                  </a:extLst>
-                </a:gridCol>
-                <a:gridCol w="208280">
-                  <a:extLst>
-                    <a:ext uri="{9D8B030D-6E8A-4147-A177-3AD203B41FA5}">
-                      <a16:colId xmlns:a16="http://schemas.microsoft.com/office/drawing/2014/main" val="4067034447"/>
-                    </a:ext>
-                  </a:extLst>
-                </a:gridCol>
-                <a:gridCol w="896993">
-                  <a:extLst>
-                    <a:ext uri="{9D8B030D-6E8A-4147-A177-3AD203B41FA5}">
-                      <a16:colId xmlns:a16="http://schemas.microsoft.com/office/drawing/2014/main" val="1421016201"/>
-                    </a:ext>
-                  </a:extLst>
-                </a:gridCol>
-                <a:gridCol w="2808000">
-                  <a:extLst>
-                    <a:ext uri="{9D8B030D-6E8A-4147-A177-3AD203B41FA5}">
-                      <a16:colId xmlns:a16="http://schemas.microsoft.com/office/drawing/2014/main" val="1360828441"/>
-                    </a:ext>
-                  </a:extLst>
-                </a:gridCol>
-              </a:tblGrid>
-              <a:tr h="370840">
-                <a:tc>
-                  <a:txBody>
-                    <a:bodyPr/>
-                    <a:lstStyle/>
-                    <a:p>
-                      <a:pPr marL="0" algn="l" defTabSz="914400" rtl="0" eaLnBrk="1" latinLnBrk="0" hangingPunct="1"/>
-                      <a:endParaRPr lang="en-AU" sz="1800" kern="1200" dirty="0">
-                        <a:solidFill>
-                          <a:schemeClr val="dk1"/>
-                        </a:solidFill>
-                        <a:latin typeface="+mn-lt"/>
-                        <a:ea typeface="+mn-ea"/>
-                        <a:cs typeface="+mn-cs"/>
-                      </a:endParaRPr>
-                    </a:p>
-                  </a:txBody>
-                  <a:tcPr>
-                    <a:solidFill>
-                      <a:schemeClr val="bg1"/>
-                    </a:solidFill>
-                  </a:tcPr>
-                </a:tc>
-                <a:tc>
-                  <a:txBody>
-                    <a:bodyPr/>
-                    <a:lstStyle/>
-                    <a:p>
-                      <a:pPr marL="0" algn="l" defTabSz="914400" rtl="0" eaLnBrk="1" latinLnBrk="0" hangingPunct="1"/>
-                      <a:endParaRPr lang="en-AU" sz="1800" kern="1200" dirty="0">
-                        <a:solidFill>
-                          <a:schemeClr val="dk1"/>
-                        </a:solidFill>
-                        <a:latin typeface="+mn-lt"/>
-                        <a:ea typeface="+mn-ea"/>
-                        <a:cs typeface="+mn-cs"/>
-                      </a:endParaRPr>
-                    </a:p>
-                  </a:txBody>
-                  <a:tcPr>
-                    <a:solidFill>
-                      <a:schemeClr val="bg1"/>
-                    </a:solidFill>
-                  </a:tcPr>
-                </a:tc>
-                <a:tc>
-                  <a:txBody>
-                    <a:bodyPr/>
-                    <a:lstStyle/>
-                    <a:p>
-                      <a:pPr marL="0" algn="l" defTabSz="914400" rtl="0" eaLnBrk="1" latinLnBrk="0" hangingPunct="1"/>
-                      <a:endParaRPr lang="en-AU" sz="1800" kern="1200" dirty="0">
-                        <a:solidFill>
-                          <a:schemeClr val="dk1"/>
-                        </a:solidFill>
-                        <a:latin typeface="+mn-lt"/>
-                        <a:ea typeface="+mn-ea"/>
-                        <a:cs typeface="+mn-cs"/>
-                      </a:endParaRPr>
-                    </a:p>
-                  </a:txBody>
-                  <a:tcPr>
-                    <a:solidFill>
-                      <a:schemeClr val="bg1"/>
-                    </a:solidFill>
-                  </a:tcPr>
-                </a:tc>
-                <a:tc>
-                  <a:txBody>
-                    <a:bodyPr/>
-                    <a:lstStyle/>
-                    <a:p>
-                      <a:pPr marL="0" algn="l" defTabSz="914400" rtl="0" eaLnBrk="1" latinLnBrk="0" hangingPunct="1"/>
-                      <a:endParaRPr lang="en-AU" sz="1800" kern="1200" dirty="0">
-                        <a:solidFill>
-                          <a:schemeClr val="dk1"/>
-                        </a:solidFill>
-                        <a:latin typeface="+mn-lt"/>
-                        <a:ea typeface="+mn-ea"/>
-                        <a:cs typeface="+mn-cs"/>
-                      </a:endParaRPr>
-                    </a:p>
-                  </a:txBody>
-                  <a:tcPr>
-                    <a:solidFill>
-                      <a:schemeClr val="bg1"/>
-                    </a:solidFill>
-                  </a:tcPr>
-                </a:tc>
-                <a:tc>
-                  <a:txBody>
-                    <a:bodyPr/>
-                    <a:lstStyle/>
-                    <a:p>
-                      <a:pPr marL="0" algn="l" defTabSz="914400" rtl="0" eaLnBrk="1" latinLnBrk="0" hangingPunct="1"/>
-                      <a:endParaRPr lang="en-AU" sz="1800" kern="1200" dirty="0">
-                        <a:solidFill>
-                          <a:schemeClr val="dk1"/>
-                        </a:solidFill>
-                        <a:latin typeface="+mn-lt"/>
-                        <a:ea typeface="+mn-ea"/>
-                        <a:cs typeface="+mn-cs"/>
-                      </a:endParaRPr>
-                    </a:p>
-                  </a:txBody>
-                  <a:tcPr>
-                    <a:solidFill>
-                      <a:schemeClr val="bg1"/>
-                    </a:solidFill>
-                  </a:tcPr>
-                </a:tc>
-                <a:extLst>
-                  <a:ext uri="{0D108BD9-81ED-4DB2-BD59-A6C34878D82A}">
-                    <a16:rowId xmlns:a16="http://schemas.microsoft.com/office/drawing/2014/main" val="222219733"/>
-                  </a:ext>
-                </a:extLst>
-              </a:tr>
-              <a:tr h="370840">
-                <a:tc>
-                  <a:txBody>
-                    <a:bodyPr/>
-                    <a:lstStyle/>
-                    <a:p>
-                      <a:r>
-                        <a:rPr lang="en-AU" dirty="0"/>
-                        <a:t>Factor 1</a:t>
-                      </a:r>
-                    </a:p>
-                  </a:txBody>
-                  <a:tcPr/>
-                </a:tc>
-                <a:tc>
-                  <a:txBody>
-                    <a:bodyPr/>
-                    <a:lstStyle/>
-                    <a:p>
-                      <a:r>
-                        <a:rPr lang="en-AU" dirty="0"/>
-                        <a:t>PCA</a:t>
-                      </a:r>
-                    </a:p>
-                  </a:txBody>
-                  <a:tcPr/>
-                </a:tc>
-                <a:tc>
-                  <a:txBody>
-                    <a:bodyPr/>
-                    <a:lstStyle/>
-                    <a:p>
-                      <a:endParaRPr lang="en-AU" dirty="0"/>
-                    </a:p>
-                  </a:txBody>
-                  <a:tcPr/>
-                </a:tc>
-                <a:tc>
-                  <a:txBody>
-                    <a:bodyPr/>
-                    <a:lstStyle/>
-                    <a:p>
-                      <a:r>
-                        <a:rPr lang="en-AU" dirty="0"/>
-                        <a:t>Block 1</a:t>
-                      </a:r>
-                    </a:p>
-                  </a:txBody>
-                  <a:tcPr/>
-                </a:tc>
-                <a:tc>
-                  <a:txBody>
-                    <a:bodyPr/>
-                    <a:lstStyle/>
-                    <a:p>
-                      <a:r>
-                        <a:rPr lang="en-AU" dirty="0"/>
-                        <a:t>Number of clusters</a:t>
-                      </a:r>
-                    </a:p>
-                  </a:txBody>
-                  <a:tcPr/>
-                </a:tc>
-                <a:extLst>
-                  <a:ext uri="{0D108BD9-81ED-4DB2-BD59-A6C34878D82A}">
-                    <a16:rowId xmlns:a16="http://schemas.microsoft.com/office/drawing/2014/main" val="2938560685"/>
-                  </a:ext>
-                </a:extLst>
-              </a:tr>
-              <a:tr h="370840">
-                <a:tc>
-                  <a:txBody>
-                    <a:bodyPr/>
-                    <a:lstStyle/>
-                    <a:p>
-                      <a:r>
-                        <a:rPr lang="en-AU" dirty="0"/>
-                        <a:t>Factor 2</a:t>
-                      </a:r>
-                    </a:p>
-                  </a:txBody>
-                  <a:tcPr/>
-                </a:tc>
-                <a:tc>
-                  <a:txBody>
-                    <a:bodyPr/>
-                    <a:lstStyle/>
-                    <a:p>
-                      <a:r>
-                        <a:rPr lang="en-AU" dirty="0"/>
-                        <a:t>Grand tour</a:t>
-                      </a:r>
-                    </a:p>
-                  </a:txBody>
-                  <a:tcPr/>
-                </a:tc>
-                <a:tc>
-                  <a:txBody>
-                    <a:bodyPr/>
-                    <a:lstStyle/>
-                    <a:p>
-                      <a:endParaRPr lang="en-AU" dirty="0"/>
-                    </a:p>
-                  </a:txBody>
-                  <a:tcPr/>
-                </a:tc>
-                <a:tc rowSpan="2">
-                  <a:txBody>
-                    <a:bodyPr/>
-                    <a:lstStyle/>
-                    <a:p>
-                      <a:r>
-                        <a:rPr lang="en-AU" dirty="0"/>
-                        <a:t>Block 2</a:t>
-                      </a:r>
-                    </a:p>
-                  </a:txBody>
-                  <a:tcPr/>
-                </a:tc>
-                <a:tc rowSpan="2">
-                  <a:txBody>
-                    <a:bodyPr/>
-                    <a:lstStyle/>
-                    <a:p>
-                      <a:r>
-                        <a:rPr lang="en-AU" dirty="0"/>
-                        <a:t>Importance of each variable for distinguishing a cluster</a:t>
-                      </a:r>
-                    </a:p>
-                  </a:txBody>
-                  <a:tcPr/>
-                </a:tc>
-                <a:extLst>
-                  <a:ext uri="{0D108BD9-81ED-4DB2-BD59-A6C34878D82A}">
-                    <a16:rowId xmlns:a16="http://schemas.microsoft.com/office/drawing/2014/main" val="4223562969"/>
-                  </a:ext>
-                </a:extLst>
-              </a:tr>
-              <a:tr h="370840">
-                <a:tc>
-                  <a:txBody>
-                    <a:bodyPr/>
-                    <a:lstStyle/>
-                    <a:p>
-                      <a:r>
-                        <a:rPr lang="en-AU" dirty="0"/>
-                        <a:t>Factor 3</a:t>
-                      </a:r>
-                    </a:p>
-                  </a:txBody>
-                  <a:tcPr/>
-                </a:tc>
-                <a:tc>
-                  <a:txBody>
-                    <a:bodyPr/>
-                    <a:lstStyle/>
-                    <a:p>
-                      <a:r>
-                        <a:rPr lang="en-AU" dirty="0"/>
-                        <a:t>Manual tour</a:t>
-                      </a:r>
-                    </a:p>
-                  </a:txBody>
-                  <a:tcPr/>
-                </a:tc>
-                <a:tc>
-                  <a:txBody>
-                    <a:bodyPr/>
-                    <a:lstStyle/>
-                    <a:p>
-                      <a:endParaRPr lang="en-AU" dirty="0"/>
-                    </a:p>
-                  </a:txBody>
-                  <a:tcPr/>
-                </a:tc>
-                <a:tc vMerge="1">
-                  <a:txBody>
-                    <a:bodyPr/>
-                    <a:lstStyle/>
-                    <a:p>
-                      <a:endParaRPr lang="en-AU" dirty="0"/>
-                    </a:p>
-                  </a:txBody>
-                  <a:tcPr/>
-                </a:tc>
-                <a:tc vMerge="1">
-                  <a:txBody>
-                    <a:bodyPr/>
-                    <a:lstStyle/>
-                    <a:p>
-                      <a:endParaRPr lang="en-AU" dirty="0"/>
-                    </a:p>
-                  </a:txBody>
-                  <a:tcPr/>
-                </a:tc>
-                <a:extLst>
-                  <a:ext uri="{0D108BD9-81ED-4DB2-BD59-A6C34878D82A}">
-                    <a16:rowId xmlns:a16="http://schemas.microsoft.com/office/drawing/2014/main" val="1091866687"/>
-                  </a:ext>
-                </a:extLst>
-              </a:tr>
-            </a:tbl>
-          </a:graphicData>
-        </a:graphic>
-      </p:graphicFrame>
-      <p:sp>
-        <p:nvSpPr>
-          <p:cNvPr id="3" name="TextBox 2">
-            <a:extLst>
-              <a:ext uri="{FF2B5EF4-FFF2-40B4-BE49-F238E27FC236}">
-                <a16:creationId xmlns:a16="http://schemas.microsoft.com/office/drawing/2014/main" id="{F0822401-84D8-4054-B2EA-3FE78E43FF2E}"/>
-              </a:ext>
-            </a:extLst>
-          </p:cNvPr>
-          <p:cNvSpPr txBox="1"/>
+          <p:cNvSpPr/>
           <p:nvPr/>
         </p:nvSpPr>
         <p:spPr>
-          <a:xfrm>
-            <a:off x="9622653" y="3739654"/>
-            <a:ext cx="2495365" cy="1107996"/>
+          <a:xfrm rot="712059">
+            <a:off x="421244" y="1418702"/>
+            <a:ext cx="9862188" cy="1569660"/>
           </a:xfrm>
           <a:prstGeom prst="rect">
             <a:avLst/>
@@ -12674,67 +12820,29 @@
           <a:noFill/>
         </p:spPr>
         <p:txBody>
-          <a:bodyPr wrap="square" rtlCol="0">
+          <a:bodyPr wrap="none" lIns="91440" tIns="45720" rIns="91440" bIns="45720">
             <a:spAutoFit/>
           </a:bodyPr>
           <a:lstStyle/>
           <a:p>
+            <a:pPr algn="ctr"/>
             <a:r>
-              <a:rPr lang="en-AU" sz="2200" dirty="0"/>
-              <a:t>~(p=8, cl=3, np=5)</a:t>
-            </a:r>
-          </a:p>
-          <a:p>
-            <a:r>
-              <a:rPr lang="en-AU" sz="2200" dirty="0"/>
-              <a:t>~(p=8, cl=4, np=4)</a:t>
-            </a:r>
-          </a:p>
-          <a:p>
-            <a:r>
-              <a:rPr lang="en-AU" sz="2200" dirty="0"/>
-              <a:t>~(p=10, cl=4, np=5)</a:t>
-            </a:r>
-          </a:p>
-        </p:txBody>
-      </p:sp>
-      <p:sp>
-        <p:nvSpPr>
-          <p:cNvPr id="12" name="TextBox 11">
-            <a:extLst>
-              <a:ext uri="{FF2B5EF4-FFF2-40B4-BE49-F238E27FC236}">
-                <a16:creationId xmlns:a16="http://schemas.microsoft.com/office/drawing/2014/main" id="{C1CE658D-2B84-4D97-9B04-BE2E4F7BA3DE}"/>
-              </a:ext>
-            </a:extLst>
-          </p:cNvPr>
-          <p:cNvSpPr txBox="1"/>
-          <p:nvPr/>
-        </p:nvSpPr>
-        <p:spPr>
-          <a:xfrm>
-            <a:off x="9622653" y="5589544"/>
-            <a:ext cx="3124544" cy="769441"/>
-          </a:xfrm>
-          <a:prstGeom prst="rect">
-            <a:avLst/>
-          </a:prstGeom>
-          <a:noFill/>
-        </p:spPr>
-        <p:txBody>
-          <a:bodyPr wrap="square" rtlCol="0">
-            <a:spAutoFit/>
-          </a:bodyPr>
-          <a:lstStyle/>
-          <a:p>
-            <a:r>
-              <a:rPr lang="en-AU" sz="2200" dirty="0"/>
-              <a:t>Sim119~(p=6, cl=3, np=2)</a:t>
-            </a:r>
-          </a:p>
-          <a:p>
-            <a:r>
-              <a:rPr lang="en-AU" sz="2200" dirty="0"/>
-              <a:t>Sim120~(p=6, cl=3, np=2)</a:t>
+              <a:rPr lang="en-US" sz="9600" b="1" cap="none" spc="0" dirty="0">
+                <a:ln w="22225">
+                  <a:solidFill>
+                    <a:schemeClr val="accent2"/>
+                  </a:solidFill>
+                  <a:prstDash val="solid"/>
+                </a:ln>
+                <a:solidFill>
+                  <a:schemeClr val="accent2">
+                    <a:lumMod val="40000"/>
+                    <a:lumOff val="60000"/>
+                  </a:schemeClr>
+                </a:solidFill>
+                <a:effectLst/>
+              </a:rPr>
+              <a:t>OLD – DO NOT USE</a:t>
             </a:r>
           </a:p>
         </p:txBody>
@@ -13653,6 +13761,56 @@
           </a:graphicData>
         </a:graphic>
       </p:graphicFrame>
+      <p:sp>
+        <p:nvSpPr>
+          <p:cNvPr id="5" name="Rectangle 4">
+            <a:extLst>
+              <a:ext uri="{FF2B5EF4-FFF2-40B4-BE49-F238E27FC236}">
+                <a16:creationId xmlns:a16="http://schemas.microsoft.com/office/drawing/2014/main" id="{AD43418D-26D7-4635-A285-EF8631360D5B}"/>
+              </a:ext>
+            </a:extLst>
+          </p:cNvPr>
+          <p:cNvSpPr/>
+          <p:nvPr/>
+        </p:nvSpPr>
+        <p:spPr>
+          <a:xfrm rot="712059">
+            <a:off x="421244" y="1418702"/>
+            <a:ext cx="9862188" cy="1569660"/>
+          </a:xfrm>
+          <a:prstGeom prst="rect">
+            <a:avLst/>
+          </a:prstGeom>
+          <a:noFill/>
+        </p:spPr>
+        <p:txBody>
+          <a:bodyPr wrap="none" lIns="91440" tIns="45720" rIns="91440" bIns="45720">
+            <a:spAutoFit/>
+          </a:bodyPr>
+          <a:lstStyle/>
+          <a:p>
+            <a:pPr algn="ctr"/>
+            <a:r>
+              <a:rPr lang="en-US" sz="9600" b="1" cap="none" spc="0" dirty="0">
+                <a:ln w="22225">
+                  <a:solidFill>
+                    <a:schemeClr val="accent2"/>
+                  </a:solidFill>
+                  <a:prstDash val="solid"/>
+                </a:ln>
+                <a:solidFill>
+                  <a:schemeClr val="accent2">
+                    <a:lumMod val="40000"/>
+                    <a:lumOff val="60000"/>
+                  </a:schemeClr>
+                </a:solidFill>
+                <a:effectLst/>
+              </a:rPr>
+              <a:t>OLD – DO NOT USE</a:t>
+            </a:r>
+          </a:p>
+        </p:txBody>
+      </p:sp>
     </p:spTree>
     <p:extLst>
       <p:ext uri="{BB962C8B-B14F-4D97-AF65-F5344CB8AC3E}">

</xml_diff>

<commit_message>
Figure exp design correction
</commit_message>
<xml_diff>
--- a/paper/figures/Experimental design graphics.pptx
+++ b/paper/figures/Experimental design graphics.pptx
@@ -278,7 +278,7 @@
           <a:p>
             <a:fld id="{B25803F7-6624-424E-B78C-2F27C4BCE53D}" type="datetimeFigureOut">
               <a:rPr lang="en-AU" smtClean="0"/>
-              <a:t>15/01/2020</a:t>
+              <a:t>17/02/2020</a:t>
             </a:fld>
             <a:endParaRPr lang="en-AU"/>
           </a:p>
@@ -478,7 +478,7 @@
           <a:p>
             <a:fld id="{B25803F7-6624-424E-B78C-2F27C4BCE53D}" type="datetimeFigureOut">
               <a:rPr lang="en-AU" smtClean="0"/>
-              <a:t>15/01/2020</a:t>
+              <a:t>17/02/2020</a:t>
             </a:fld>
             <a:endParaRPr lang="en-AU"/>
           </a:p>
@@ -688,7 +688,7 @@
           <a:p>
             <a:fld id="{B25803F7-6624-424E-B78C-2F27C4BCE53D}" type="datetimeFigureOut">
               <a:rPr lang="en-AU" smtClean="0"/>
-              <a:t>15/01/2020</a:t>
+              <a:t>17/02/2020</a:t>
             </a:fld>
             <a:endParaRPr lang="en-AU"/>
           </a:p>
@@ -888,7 +888,7 @@
           <a:p>
             <a:fld id="{B25803F7-6624-424E-B78C-2F27C4BCE53D}" type="datetimeFigureOut">
               <a:rPr lang="en-AU" smtClean="0"/>
-              <a:t>15/01/2020</a:t>
+              <a:t>17/02/2020</a:t>
             </a:fld>
             <a:endParaRPr lang="en-AU"/>
           </a:p>
@@ -1164,7 +1164,7 @@
           <a:p>
             <a:fld id="{B25803F7-6624-424E-B78C-2F27C4BCE53D}" type="datetimeFigureOut">
               <a:rPr lang="en-AU" smtClean="0"/>
-              <a:t>15/01/2020</a:t>
+              <a:t>17/02/2020</a:t>
             </a:fld>
             <a:endParaRPr lang="en-AU"/>
           </a:p>
@@ -1432,7 +1432,7 @@
           <a:p>
             <a:fld id="{B25803F7-6624-424E-B78C-2F27C4BCE53D}" type="datetimeFigureOut">
               <a:rPr lang="en-AU" smtClean="0"/>
-              <a:t>15/01/2020</a:t>
+              <a:t>17/02/2020</a:t>
             </a:fld>
             <a:endParaRPr lang="en-AU"/>
           </a:p>
@@ -1847,7 +1847,7 @@
           <a:p>
             <a:fld id="{B25803F7-6624-424E-B78C-2F27C4BCE53D}" type="datetimeFigureOut">
               <a:rPr lang="en-AU" smtClean="0"/>
-              <a:t>15/01/2020</a:t>
+              <a:t>17/02/2020</a:t>
             </a:fld>
             <a:endParaRPr lang="en-AU"/>
           </a:p>
@@ -1989,7 +1989,7 @@
           <a:p>
             <a:fld id="{B25803F7-6624-424E-B78C-2F27C4BCE53D}" type="datetimeFigureOut">
               <a:rPr lang="en-AU" smtClean="0"/>
-              <a:t>15/01/2020</a:t>
+              <a:t>17/02/2020</a:t>
             </a:fld>
             <a:endParaRPr lang="en-AU"/>
           </a:p>
@@ -2102,7 +2102,7 @@
           <a:p>
             <a:fld id="{B25803F7-6624-424E-B78C-2F27C4BCE53D}" type="datetimeFigureOut">
               <a:rPr lang="en-AU" smtClean="0"/>
-              <a:t>15/01/2020</a:t>
+              <a:t>17/02/2020</a:t>
             </a:fld>
             <a:endParaRPr lang="en-AU"/>
           </a:p>
@@ -2415,7 +2415,7 @@
           <a:p>
             <a:fld id="{B25803F7-6624-424E-B78C-2F27C4BCE53D}" type="datetimeFigureOut">
               <a:rPr lang="en-AU" smtClean="0"/>
-              <a:t>15/01/2020</a:t>
+              <a:t>17/02/2020</a:t>
             </a:fld>
             <a:endParaRPr lang="en-AU"/>
           </a:p>
@@ -2704,7 +2704,7 @@
           <a:p>
             <a:fld id="{B25803F7-6624-424E-B78C-2F27C4BCE53D}" type="datetimeFigureOut">
               <a:rPr lang="en-AU" smtClean="0"/>
-              <a:t>15/01/2020</a:t>
+              <a:t>17/02/2020</a:t>
             </a:fld>
             <a:endParaRPr lang="en-AU"/>
           </a:p>
@@ -2947,7 +2947,7 @@
           <a:p>
             <a:fld id="{B25803F7-6624-424E-B78C-2F27C4BCE53D}" type="datetimeFigureOut">
               <a:rPr lang="en-AU" smtClean="0"/>
-              <a:t>15/01/2020</a:t>
+              <a:t>17/02/2020</a:t>
             </a:fld>
             <a:endParaRPr lang="en-AU"/>
           </a:p>
@@ -3910,14 +3910,14 @@
           <p:nvPr>
             <p:extLst>
               <p:ext uri="{D42A27DB-BD31-4B8C-83A1-F6EECF244321}">
-                <p14:modId xmlns:p14="http://schemas.microsoft.com/office/powerpoint/2010/main" val="3342091802"/>
+                <p14:modId xmlns:p14="http://schemas.microsoft.com/office/powerpoint/2010/main" val="3954454108"/>
               </p:ext>
             </p:extLst>
           </p:nvPr>
         </p:nvGraphicFramePr>
         <p:xfrm>
           <a:off x="1562468" y="3384610"/>
-          <a:ext cx="7908870" cy="1463040"/>
+          <a:ext cx="8124870" cy="1463040"/>
         </p:xfrm>
         <a:graphic>
           <a:graphicData uri="http://schemas.openxmlformats.org/drawingml/2006/table">
@@ -3975,7 +3975,7 @@
                     </a:ext>
                   </a:extLst>
                 </a:gridCol>
-                <a:gridCol w="1512000">
+                <a:gridCol w="1728000">
                   <a:extLst>
                     <a:ext uri="{9D8B030D-6E8A-4147-A177-3AD203B41FA5}">
                       <a16:colId xmlns:a16="http://schemas.microsoft.com/office/drawing/2014/main" val="3798089852"/>
@@ -4078,20 +4078,17 @@
                     <a:lstStyle/>
                     <a:p>
                       <a:r>
-                        <a:rPr lang="en-AU" dirty="0">
-                          <a:solidFill>
-                            <a:schemeClr val="bg1"/>
-                          </a:solidFill>
-                        </a:rPr>
+                        <a:rPr lang="en-AU" dirty="0"/>
                         <a:t>Distribution</a:t>
                       </a:r>
-                    </a:p>
-                  </a:txBody>
-                  <a:tcPr>
-                    <a:solidFill>
-                      <a:schemeClr val="bg1"/>
-                    </a:solidFill>
-                  </a:tcPr>
+                      <a:endParaRPr lang="en-AU" dirty="0">
+                        <a:solidFill>
+                          <a:sysClr val="windowText" lastClr="000000"/>
+                        </a:solidFill>
+                      </a:endParaRPr>
+                    </a:p>
+                  </a:txBody>
+                  <a:tcPr/>
                 </a:tc>
                 <a:extLst>
                   <a:ext uri="{0D108BD9-81ED-4DB2-BD59-A6C34878D82A}">
@@ -4197,20 +4194,17 @@
                     <a:lstStyle/>
                     <a:p>
                       <a:r>
-                        <a:rPr lang="en-AU" dirty="0">
-                          <a:solidFill>
-                            <a:schemeClr val="bg1"/>
-                          </a:solidFill>
-                        </a:rPr>
+                        <a:rPr lang="en-AU" dirty="0"/>
                         <a:t>~mtvN(easy)</a:t>
                       </a:r>
-                    </a:p>
-                  </a:txBody>
-                  <a:tcPr>
-                    <a:solidFill>
-                      <a:schemeClr val="bg1"/>
-                    </a:solidFill>
-                  </a:tcPr>
+                      <a:endParaRPr lang="en-AU" dirty="0">
+                        <a:solidFill>
+                          <a:sysClr val="windowText" lastClr="000000"/>
+                        </a:solidFill>
+                      </a:endParaRPr>
+                    </a:p>
+                  </a:txBody>
+                  <a:tcPr/>
                 </a:tc>
                 <a:extLst>
                   <a:ext uri="{0D108BD9-81ED-4DB2-BD59-A6C34878D82A}">
@@ -4316,20 +4310,17 @@
                     <a:lstStyle/>
                     <a:p>
                       <a:r>
-                        <a:rPr lang="en-AU" dirty="0">
-                          <a:solidFill>
-                            <a:schemeClr val="bg1"/>
-                          </a:solidFill>
-                        </a:rPr>
-                        <a:t>~mtvΝ(hard1)</a:t>
-                      </a:r>
-                    </a:p>
-                  </a:txBody>
-                  <a:tcPr>
-                    <a:solidFill>
-                      <a:schemeClr val="bg1"/>
-                    </a:solidFill>
-                  </a:tcPr>
+                        <a:rPr lang="en-AU" dirty="0"/>
+                        <a:t>~mtvΝ(medium)</a:t>
+                      </a:r>
+                      <a:endParaRPr lang="en-AU" dirty="0">
+                        <a:solidFill>
+                          <a:sysClr val="windowText" lastClr="000000"/>
+                        </a:solidFill>
+                      </a:endParaRPr>
+                    </a:p>
+                  </a:txBody>
+                  <a:tcPr/>
                 </a:tc>
                 <a:extLst>
                   <a:ext uri="{0D108BD9-81ED-4DB2-BD59-A6C34878D82A}">
@@ -4435,20 +4426,17 @@
                     <a:lstStyle/>
                     <a:p>
                       <a:r>
-                        <a:rPr lang="en-AU" dirty="0">
-                          <a:solidFill>
-                            <a:schemeClr val="bg1"/>
-                          </a:solidFill>
-                        </a:rPr>
-                        <a:t>~mtvN(hard2)</a:t>
-                      </a:r>
-                    </a:p>
-                  </a:txBody>
-                  <a:tcPr>
-                    <a:solidFill>
-                      <a:schemeClr val="bg1"/>
-                    </a:solidFill>
-                  </a:tcPr>
+                        <a:rPr lang="en-AU" dirty="0"/>
+                        <a:t>~mtvN(hard)</a:t>
+                      </a:r>
+                      <a:endParaRPr lang="en-AU" dirty="0">
+                        <a:solidFill>
+                          <a:sysClr val="windowText" lastClr="000000"/>
+                        </a:solidFill>
+                      </a:endParaRPr>
+                    </a:p>
+                  </a:txBody>
+                  <a:tcPr/>
                 </a:tc>
                 <a:extLst>
                   <a:ext uri="{0D108BD9-81ED-4DB2-BD59-A6C34878D82A}">
@@ -5052,7 +5040,7 @@
         </p:nvSpPr>
         <p:spPr>
           <a:xfrm>
-            <a:off x="9622653" y="3739654"/>
+            <a:off x="9857110" y="3739654"/>
             <a:ext cx="2495365" cy="1107996"/>
           </a:xfrm>
           <a:prstGeom prst="rect">

</xml_diff>

<commit_message>
change to 300 series, tpath, and sim files
</commit_message>
<xml_diff>
--- a/paper/figures/Experimental design graphics.pptx
+++ b/paper/figures/Experimental design graphics.pptx
@@ -293,7 +293,7 @@
           <a:p>
             <a:fld id="{B25803F7-6624-424E-B78C-2F27C4BCE53D}" type="datetimeFigureOut">
               <a:rPr lang="en-AU" smtClean="0"/>
-              <a:t>3/03/2020</a:t>
+              <a:t>4/03/2020</a:t>
             </a:fld>
             <a:endParaRPr lang="en-AU"/>
           </a:p>
@@ -493,7 +493,7 @@
           <a:p>
             <a:fld id="{B25803F7-6624-424E-B78C-2F27C4BCE53D}" type="datetimeFigureOut">
               <a:rPr lang="en-AU" smtClean="0"/>
-              <a:t>3/03/2020</a:t>
+              <a:t>4/03/2020</a:t>
             </a:fld>
             <a:endParaRPr lang="en-AU"/>
           </a:p>
@@ -703,7 +703,7 @@
           <a:p>
             <a:fld id="{B25803F7-6624-424E-B78C-2F27C4BCE53D}" type="datetimeFigureOut">
               <a:rPr lang="en-AU" smtClean="0"/>
-              <a:t>3/03/2020</a:t>
+              <a:t>4/03/2020</a:t>
             </a:fld>
             <a:endParaRPr lang="en-AU"/>
           </a:p>
@@ -903,7 +903,7 @@
           <a:p>
             <a:fld id="{B25803F7-6624-424E-B78C-2F27C4BCE53D}" type="datetimeFigureOut">
               <a:rPr lang="en-AU" smtClean="0"/>
-              <a:t>3/03/2020</a:t>
+              <a:t>4/03/2020</a:t>
             </a:fld>
             <a:endParaRPr lang="en-AU"/>
           </a:p>
@@ -1179,7 +1179,7 @@
           <a:p>
             <a:fld id="{B25803F7-6624-424E-B78C-2F27C4BCE53D}" type="datetimeFigureOut">
               <a:rPr lang="en-AU" smtClean="0"/>
-              <a:t>3/03/2020</a:t>
+              <a:t>4/03/2020</a:t>
             </a:fld>
             <a:endParaRPr lang="en-AU"/>
           </a:p>
@@ -1447,7 +1447,7 @@
           <a:p>
             <a:fld id="{B25803F7-6624-424E-B78C-2F27C4BCE53D}" type="datetimeFigureOut">
               <a:rPr lang="en-AU" smtClean="0"/>
-              <a:t>3/03/2020</a:t>
+              <a:t>4/03/2020</a:t>
             </a:fld>
             <a:endParaRPr lang="en-AU"/>
           </a:p>
@@ -1862,7 +1862,7 @@
           <a:p>
             <a:fld id="{B25803F7-6624-424E-B78C-2F27C4BCE53D}" type="datetimeFigureOut">
               <a:rPr lang="en-AU" smtClean="0"/>
-              <a:t>3/03/2020</a:t>
+              <a:t>4/03/2020</a:t>
             </a:fld>
             <a:endParaRPr lang="en-AU"/>
           </a:p>
@@ -2004,7 +2004,7 @@
           <a:p>
             <a:fld id="{B25803F7-6624-424E-B78C-2F27C4BCE53D}" type="datetimeFigureOut">
               <a:rPr lang="en-AU" smtClean="0"/>
-              <a:t>3/03/2020</a:t>
+              <a:t>4/03/2020</a:t>
             </a:fld>
             <a:endParaRPr lang="en-AU"/>
           </a:p>
@@ -2117,7 +2117,7 @@
           <a:p>
             <a:fld id="{B25803F7-6624-424E-B78C-2F27C4BCE53D}" type="datetimeFigureOut">
               <a:rPr lang="en-AU" smtClean="0"/>
-              <a:t>3/03/2020</a:t>
+              <a:t>4/03/2020</a:t>
             </a:fld>
             <a:endParaRPr lang="en-AU"/>
           </a:p>
@@ -2430,7 +2430,7 @@
           <a:p>
             <a:fld id="{B25803F7-6624-424E-B78C-2F27C4BCE53D}" type="datetimeFigureOut">
               <a:rPr lang="en-AU" smtClean="0"/>
-              <a:t>3/03/2020</a:t>
+              <a:t>4/03/2020</a:t>
             </a:fld>
             <a:endParaRPr lang="en-AU"/>
           </a:p>
@@ -2719,7 +2719,7 @@
           <a:p>
             <a:fld id="{B25803F7-6624-424E-B78C-2F27C4BCE53D}" type="datetimeFigureOut">
               <a:rPr lang="en-AU" smtClean="0"/>
-              <a:t>3/03/2020</a:t>
+              <a:t>4/03/2020</a:t>
             </a:fld>
             <a:endParaRPr lang="en-AU"/>
           </a:p>
@@ -2962,7 +2962,7 @@
           <a:p>
             <a:fld id="{B25803F7-6624-424E-B78C-2F27C4BCE53D}" type="datetimeFigureOut">
               <a:rPr lang="en-AU" smtClean="0"/>
-              <a:t>3/03/2020</a:t>
+              <a:t>4/03/2020</a:t>
             </a:fld>
             <a:endParaRPr lang="en-AU"/>
           </a:p>
@@ -5168,7 +5168,7 @@
         </p:nvCxnSpPr>
         <p:spPr>
           <a:xfrm>
-            <a:off x="2863083" y="3062661"/>
+            <a:off x="2894833" y="3062661"/>
             <a:ext cx="0" cy="167540"/>
           </a:xfrm>
           <a:prstGeom prst="line">
@@ -5212,7 +5212,7 @@
         </p:nvCxnSpPr>
         <p:spPr>
           <a:xfrm>
-            <a:off x="4387473" y="3075792"/>
+            <a:off x="4404565" y="3075792"/>
             <a:ext cx="0" cy="140136"/>
           </a:xfrm>
           <a:prstGeom prst="line">
@@ -5256,7 +5256,7 @@
         </p:nvCxnSpPr>
         <p:spPr>
           <a:xfrm>
-            <a:off x="5900722" y="3075792"/>
+            <a:off x="5917814" y="3075792"/>
             <a:ext cx="0" cy="140136"/>
           </a:xfrm>
           <a:prstGeom prst="line">
@@ -5300,8 +5300,8 @@
         </p:nvCxnSpPr>
         <p:spPr>
           <a:xfrm>
-            <a:off x="7415300" y="3075792"/>
-            <a:ext cx="5943" cy="182452"/>
+            <a:off x="7428000" y="3075792"/>
+            <a:ext cx="0" cy="154409"/>
           </a:xfrm>
           <a:prstGeom prst="line">
             <a:avLst/>
@@ -6049,7 +6049,7 @@
         </p:nvGrpSpPr>
         <p:grpSpPr>
           <a:xfrm>
-            <a:off x="2947382" y="2494545"/>
+            <a:off x="2964470" y="2494545"/>
             <a:ext cx="1505185" cy="1590728"/>
             <a:chOff x="2947382" y="2494545"/>
             <a:chExt cx="1505185" cy="1590728"/>
@@ -6300,7 +6300,7 @@
         </p:nvGrpSpPr>
         <p:grpSpPr>
           <a:xfrm>
-            <a:off x="4497956" y="2494545"/>
+            <a:off x="4506502" y="2494545"/>
             <a:ext cx="1465339" cy="1608484"/>
             <a:chOff x="2947382" y="2494545"/>
             <a:chExt cx="1465339" cy="1608484"/>

</xml_diff>

<commit_message>
extending simulations to p=6. neg corr ellipse still an issue.
</commit_message>
<xml_diff>
--- a/paper/figures/Experimental design graphics.pptx
+++ b/paper/figures/Experimental design graphics.pptx
@@ -3434,14 +3434,14 @@
           <p:nvPr>
             <p:extLst>
               <p:ext uri="{D42A27DB-BD31-4B8C-83A1-F6EECF244321}">
-                <p14:modId xmlns:p14="http://schemas.microsoft.com/office/powerpoint/2010/main" val="1024937533"/>
+                <p14:modId xmlns:p14="http://schemas.microsoft.com/office/powerpoint/2010/main" val="3571103959"/>
               </p:ext>
             </p:extLst>
           </p:nvPr>
         </p:nvGraphicFramePr>
         <p:xfrm>
           <a:off x="438342" y="336960"/>
-          <a:ext cx="16308598" cy="5940000"/>
+          <a:ext cx="16294812" cy="6306480"/>
         </p:xfrm>
         <a:graphic>
           <a:graphicData uri="http://schemas.openxmlformats.org/drawingml/2006/table">
@@ -3450,7 +3450,7 @@
                 <a:tableStyleId>{5C22544A-7EE6-4342-B048-85BDC9FD1C3A}</a:tableStyleId>
               </a:tblPr>
               <a:tblGrid>
-                <a:gridCol w="1675962">
+                <a:gridCol w="1662176">
                   <a:extLst>
                     <a:ext uri="{9D8B030D-6E8A-4147-A177-3AD203B41FA5}">
                       <a16:colId xmlns:a16="http://schemas.microsoft.com/office/drawing/2014/main" val="1090023252"/>
@@ -3527,7 +3527,7 @@
                     <a:p>
                       <a:r>
                         <a:rPr lang="en-AU" dirty="0"/>
-                        <a:t>Vales</a:t>
+                        <a:t>Values</a:t>
                       </a:r>
                       <a:endParaRPr lang="en-AU" dirty="0">
                         <a:solidFill>
@@ -4289,7 +4289,7 @@
                       </a:pPr>
                       <a:r>
                         <a:rPr lang="en-US" dirty="0"/>
-                        <a:t>Combine signal and noise variables: 25/75, 33/67, 50/50</a:t>
+                        <a:t>Combine signal and noise variables: 0/100, 33/67, 50/50</a:t>
                       </a:r>
                       <a:endParaRPr lang="en-AU" b="0" dirty="0">
                         <a:solidFill>
@@ -4587,12 +4587,20 @@
                         <a:defRPr/>
                       </a:pPr>
                       <a:r>
+                        <a:rPr lang="en-US" b="0" dirty="0">
+                          <a:solidFill>
+                            <a:schemeClr val="tx1"/>
+                          </a:solidFill>
+                        </a:rPr>
+                        <a:t>S</a:t>
+                      </a:r>
+                      <a:r>
                         <a:rPr lang="en-AU" b="0" dirty="0">
                           <a:solidFill>
                             <a:schemeClr val="tx1"/>
                           </a:solidFill>
                         </a:rPr>
-                        <a:t>Rand?</a:t>
+                        <a:t>m then lg?</a:t>
                       </a:r>
                     </a:p>
                   </a:txBody>
@@ -4741,9 +4749,9 @@
                     <a:p>
                       <a:r>
                         <a:rPr lang="en-US" b="1" dirty="0"/>
-                        <a:t>Randomization</a:t>
-                      </a:r>
-                      <a:endParaRPr lang="en-AU" b="1" dirty="0">
+                        <a:t>Fixed parameters</a:t>
+                      </a:r>
+                      <a:endParaRPr lang="en-US" b="1" dirty="0">
                         <a:solidFill>
                           <a:schemeClr val="tx1"/>
                         </a:solidFill>
@@ -4769,7 +4777,7 @@
                     <a:p>
                       <a:r>
                         <a:rPr lang="en-US" dirty="0"/>
-                        <a:t>Factor</a:t>
+                        <a:t>Correlation, signal</a:t>
                       </a:r>
                       <a:endParaRPr lang="en-AU" b="0" dirty="0">
                         <a:solidFill>
@@ -4823,7 +4831,7 @@
                       </a:pPr>
                       <a:r>
                         <a:rPr lang="en-US" dirty="0"/>
-                        <a:t>Participants perform 2 tasks with each factor</a:t>
+                        <a:t>.9</a:t>
                       </a:r>
                       <a:endParaRPr lang="en-AU" b="0" dirty="0">
                         <a:solidFill>
@@ -4959,138 +4967,6 @@
                     <a:bodyPr/>
                     <a:lstStyle/>
                     <a:p>
-                      <a:r>
-                        <a:rPr lang="en-AU" b="1" dirty="0"/>
-                        <a:t>Other block thoughts:</a:t>
-                      </a:r>
-                    </a:p>
-                  </a:txBody>
-                  <a:tcPr>
-                    <a:lnL w="12700" cmpd="sng">
-                      <a:noFill/>
-                    </a:lnL>
-                    <a:lnR w="12700" cmpd="sng">
-                      <a:noFill/>
-                    </a:lnR>
-                    <a:lnT w="12700" cap="flat" cmpd="sng" algn="ctr">
-                      <a:noFill/>
-                      <a:prstDash val="solid"/>
-                      <a:round/>
-                      <a:headEnd type="none" w="med" len="med"/>
-                      <a:tailEnd type="none" w="med" len="med"/>
-                    </a:lnT>
-                    <a:lnB w="12700" cmpd="sng">
-                      <a:noFill/>
-                    </a:lnB>
-                    <a:lnTlToBr w="12700" cmpd="sng">
-                      <a:noFill/>
-                      <a:prstDash val="solid"/>
-                    </a:lnTlToBr>
-                    <a:lnBlToTr w="12700" cmpd="sng">
-                      <a:noFill/>
-                      <a:prstDash val="solid"/>
-                    </a:lnBlToTr>
-                  </a:tcPr>
-                </a:tc>
-                <a:extLst>
-                  <a:ext uri="{0D108BD9-81ED-4DB2-BD59-A6C34878D82A}">
-                    <a16:rowId xmlns:a16="http://schemas.microsoft.com/office/drawing/2014/main" val="1041374245"/>
-                  </a:ext>
-                </a:extLst>
-              </a:tr>
-              <a:tr h="396000">
-                <a:tc>
-                  <a:txBody>
-                    <a:bodyPr/>
-                    <a:lstStyle/>
-                    <a:p>
-                      <a:endParaRPr lang="en-AU" b="1" dirty="0">
-                        <a:solidFill>
-                          <a:schemeClr val="tx1"/>
-                        </a:solidFill>
-                      </a:endParaRPr>
-                    </a:p>
-                  </a:txBody>
-                  <a:tcPr/>
-                </a:tc>
-                <a:tc>
-                  <a:txBody>
-                    <a:bodyPr/>
-                    <a:lstStyle/>
-                    <a:p>
-                      <a:r>
-                        <a:rPr lang="en-US" dirty="0"/>
-                        <a:t>Block</a:t>
-                      </a:r>
-                      <a:endParaRPr lang="en-AU" b="0" dirty="0">
-                        <a:solidFill>
-                          <a:schemeClr val="tx1"/>
-                        </a:solidFill>
-                      </a:endParaRPr>
-                    </a:p>
-                  </a:txBody>
-                  <a:tcPr>
-                    <a:lnR w="12700" cap="flat" cmpd="sng" algn="ctr">
-                      <a:solidFill>
-                        <a:schemeClr val="tx1"/>
-                      </a:solidFill>
-                      <a:prstDash val="solid"/>
-                      <a:round/>
-                      <a:headEnd type="none" w="med" len="med"/>
-                      <a:tailEnd type="none" w="med" len="med"/>
-                    </a:lnR>
-                  </a:tcPr>
-                </a:tc>
-                <a:tc>
-                  <a:txBody>
-                    <a:bodyPr/>
-                    <a:lstStyle/>
-                    <a:p>
-                      <a:pPr marL="0" marR="0" lvl="0" indent="0" algn="l" defTabSz="914400" rtl="0" eaLnBrk="1" fontAlgn="auto" latinLnBrk="0" hangingPunct="1">
-                        <a:lnSpc>
-                          <a:spcPct val="100000"/>
-                        </a:lnSpc>
-                        <a:spcBef>
-                          <a:spcPts val="0"/>
-                        </a:spcBef>
-                        <a:spcAft>
-                          <a:spcPts val="0"/>
-                        </a:spcAft>
-                        <a:buClrTx/>
-                        <a:buSzTx/>
-                        <a:buFontTx/>
-                        <a:buNone/>
-                        <a:tabLst/>
-                        <a:defRPr/>
-                      </a:pPr>
-                      <a:r>
-                        <a:rPr lang="en-US" dirty="0"/>
-                        <a:t>Participants perform 6 different blocks of the 27 combinations</a:t>
-                      </a:r>
-                      <a:endParaRPr lang="en-AU" b="0" dirty="0">
-                        <a:solidFill>
-                          <a:schemeClr val="tx1"/>
-                        </a:solidFill>
-                      </a:endParaRPr>
-                    </a:p>
-                  </a:txBody>
-                  <a:tcPr>
-                    <a:lnL w="12700" cap="flat" cmpd="sng" algn="ctr">
-                      <a:solidFill>
-                        <a:schemeClr val="tx1"/>
-                      </a:solidFill>
-                      <a:prstDash val="solid"/>
-                      <a:round/>
-                      <a:headEnd type="none" w="med" len="med"/>
-                      <a:tailEnd type="none" w="med" len="med"/>
-                    </a:lnL>
-                  </a:tcPr>
-                </a:tc>
-                <a:tc>
-                  <a:txBody>
-                    <a:bodyPr/>
-                    <a:lstStyle/>
-                    <a:p>
                       <a:pPr marL="0" marR="0" lvl="0" indent="0" algn="l" defTabSz="914400" rtl="0" eaLnBrk="1" fontAlgn="auto" latinLnBrk="0" hangingPunct="1">
                         <a:lnSpc>
                           <a:spcPct val="100000"/>
@@ -5116,9 +4992,124 @@
                     </a:p>
                   </a:txBody>
                   <a:tcPr>
+                    <a:lnL w="12700" cmpd="sng">
+                      <a:noFill/>
+                    </a:lnL>
                     <a:lnR w="12700" cmpd="sng">
                       <a:noFill/>
                     </a:lnR>
+                    <a:lnT w="12700" cap="flat" cmpd="sng" algn="ctr">
+                      <a:noFill/>
+                      <a:prstDash val="solid"/>
+                      <a:round/>
+                      <a:headEnd type="none" w="med" len="med"/>
+                      <a:tailEnd type="none" w="med" len="med"/>
+                    </a:lnT>
+                    <a:lnB w="12700" cmpd="sng">
+                      <a:noFill/>
+                    </a:lnB>
+                    <a:lnTlToBr w="12700" cmpd="sng">
+                      <a:noFill/>
+                      <a:prstDash val="solid"/>
+                    </a:lnTlToBr>
+                    <a:lnBlToTr w="12700" cmpd="sng">
+                      <a:noFill/>
+                      <a:prstDash val="solid"/>
+                    </a:lnBlToTr>
+                  </a:tcPr>
+                </a:tc>
+                <a:extLst>
+                  <a:ext uri="{0D108BD9-81ED-4DB2-BD59-A6C34878D82A}">
+                    <a16:rowId xmlns:a16="http://schemas.microsoft.com/office/drawing/2014/main" val="2732004267"/>
+                  </a:ext>
+                </a:extLst>
+              </a:tr>
+              <a:tr h="396000">
+                <a:tc>
+                  <a:txBody>
+                    <a:bodyPr/>
+                    <a:lstStyle/>
+                    <a:p>
+                      <a:endParaRPr lang="en-AU" b="0" i="1" dirty="0">
+                        <a:solidFill>
+                          <a:schemeClr val="tx1"/>
+                        </a:solidFill>
+                      </a:endParaRPr>
+                    </a:p>
+                  </a:txBody>
+                  <a:tcPr/>
+                </a:tc>
+                <a:tc>
+                  <a:txBody>
+                    <a:bodyPr/>
+                    <a:lstStyle/>
+                    <a:p>
+                      <a:r>
+                        <a:rPr lang="en-US" dirty="0"/>
+                        <a:t>Correlation, noise</a:t>
+                      </a:r>
+                      <a:endParaRPr lang="en-AU" b="0" dirty="0">
+                        <a:solidFill>
+                          <a:schemeClr val="tx1"/>
+                        </a:solidFill>
+                      </a:endParaRPr>
+                    </a:p>
+                  </a:txBody>
+                  <a:tcPr>
+                    <a:lnR w="12700" cap="flat" cmpd="sng" algn="ctr">
+                      <a:solidFill>
+                        <a:schemeClr val="tx1"/>
+                      </a:solidFill>
+                      <a:prstDash val="solid"/>
+                      <a:round/>
+                      <a:headEnd type="none" w="med" len="med"/>
+                      <a:tailEnd type="none" w="med" len="med"/>
+                    </a:lnR>
+                  </a:tcPr>
+                </a:tc>
+                <a:tc>
+                  <a:txBody>
+                    <a:bodyPr/>
+                    <a:lstStyle/>
+                    <a:p>
+                      <a:pPr marL="0" marR="0" lvl="0" indent="0" algn="l" defTabSz="914400" rtl="0" eaLnBrk="1" fontAlgn="auto" latinLnBrk="0" hangingPunct="1">
+                        <a:lnSpc>
+                          <a:spcPct val="100000"/>
+                        </a:lnSpc>
+                        <a:spcBef>
+                          <a:spcPts val="0"/>
+                        </a:spcBef>
+                        <a:spcAft>
+                          <a:spcPts val="0"/>
+                        </a:spcAft>
+                        <a:buClrTx/>
+                        <a:buSzTx/>
+                        <a:buFontTx/>
+                        <a:buNone/>
+                        <a:tabLst/>
+                        <a:defRPr/>
+                      </a:pPr>
+                      <a:r>
+                        <a:rPr lang="en-US" dirty="0"/>
+                        <a:t>0</a:t>
+                      </a:r>
+                      <a:endParaRPr lang="en-AU" b="0" dirty="0">
+                        <a:solidFill>
+                          <a:schemeClr val="tx1"/>
+                        </a:solidFill>
+                      </a:endParaRPr>
+                    </a:p>
+                  </a:txBody>
+                  <a:tcPr>
+                    <a:lnL w="12700" cap="flat" cmpd="sng" algn="ctr">
+                      <a:solidFill>
+                        <a:schemeClr val="tx1"/>
+                      </a:solidFill>
+                      <a:prstDash val="solid"/>
+                      <a:round/>
+                      <a:headEnd type="none" w="med" len="med"/>
+                      <a:tailEnd type="none" w="med" len="med"/>
+                    </a:lnL>
                   </a:tcPr>
                 </a:tc>
                 <a:tc>
@@ -5151,176 +5142,9 @@
                     </a:p>
                   </a:txBody>
                   <a:tcPr>
-                    <a:lnL w="12700" cmpd="sng">
-                      <a:noFill/>
-                    </a:lnL>
                     <a:lnR w="12700" cmpd="sng">
                       <a:noFill/>
                     </a:lnR>
-                    <a:lnT w="12700" cmpd="sng">
-                      <a:noFill/>
-                    </a:lnT>
-                    <a:lnB w="12700" cmpd="sng">
-                      <a:noFill/>
-                    </a:lnB>
-                    <a:lnTlToBr w="12700" cmpd="sng">
-                      <a:noFill/>
-                      <a:prstDash val="solid"/>
-                    </a:lnTlToBr>
-                    <a:lnBlToTr w="12700" cmpd="sng">
-                      <a:noFill/>
-                      <a:prstDash val="solid"/>
-                    </a:lnBlToTr>
-                    <a:noFill/>
-                  </a:tcPr>
-                </a:tc>
-                <a:tc>
-                  <a:txBody>
-                    <a:bodyPr/>
-                    <a:lstStyle/>
-                    <a:p>
-                      <a:pPr marL="0" marR="0" lvl="0" indent="0" algn="l" defTabSz="914400" rtl="0" eaLnBrk="1" fontAlgn="auto" latinLnBrk="0" hangingPunct="1">
-                        <a:lnSpc>
-                          <a:spcPct val="100000"/>
-                        </a:lnSpc>
-                        <a:spcBef>
-                          <a:spcPts val="0"/>
-                        </a:spcBef>
-                        <a:spcAft>
-                          <a:spcPts val="0"/>
-                        </a:spcAft>
-                        <a:buClrTx/>
-                        <a:buSzTx/>
-                        <a:buFontTx/>
-                        <a:buNone/>
-                        <a:tabLst/>
-                        <a:defRPr/>
-                      </a:pPr>
-                      <a:r>
-                        <a:rPr lang="en-AU" b="0" dirty="0">
-                          <a:solidFill>
-                            <a:schemeClr val="tx1"/>
-                          </a:solidFill>
-                        </a:rPr>
-                        <a:t>Fix 2 of each VC?</a:t>
-                      </a:r>
-                    </a:p>
-                  </a:txBody>
-                  <a:tcPr>
-                    <a:lnL w="12700" cmpd="sng">
-                      <a:noFill/>
-                    </a:lnL>
-                    <a:lnR w="12700" cmpd="sng">
-                      <a:noFill/>
-                    </a:lnR>
-                    <a:lnT w="12700" cmpd="sng">
-                      <a:noFill/>
-                    </a:lnT>
-                    <a:lnB w="12700" cmpd="sng">
-                      <a:noFill/>
-                    </a:lnB>
-                    <a:lnTlToBr w="12700" cmpd="sng">
-                      <a:noFill/>
-                      <a:prstDash val="solid"/>
-                    </a:lnTlToBr>
-                    <a:lnBlToTr w="12700" cmpd="sng">
-                      <a:noFill/>
-                      <a:prstDash val="solid"/>
-                    </a:lnBlToTr>
-                  </a:tcPr>
-                </a:tc>
-                <a:extLst>
-                  <a:ext uri="{0D108BD9-81ED-4DB2-BD59-A6C34878D82A}">
-                    <a16:rowId xmlns:a16="http://schemas.microsoft.com/office/drawing/2014/main" val="1241429002"/>
-                  </a:ext>
-                </a:extLst>
-              </a:tr>
-              <a:tr h="396000">
-                <a:tc>
-                  <a:txBody>
-                    <a:bodyPr/>
-                    <a:lstStyle/>
-                    <a:p>
-                      <a:endParaRPr lang="en-AU" b="1" dirty="0">
-                        <a:solidFill>
-                          <a:schemeClr val="tx1"/>
-                        </a:solidFill>
-                      </a:endParaRPr>
-                    </a:p>
-                  </a:txBody>
-                  <a:tcPr/>
-                </a:tc>
-                <a:tc>
-                  <a:txBody>
-                    <a:bodyPr/>
-                    <a:lstStyle/>
-                    <a:p>
-                      <a:r>
-                        <a:rPr lang="en-US" dirty="0"/>
-                        <a:t>Factor order</a:t>
-                      </a:r>
-                      <a:endParaRPr lang="en-AU" b="0" dirty="0">
-                        <a:solidFill>
-                          <a:schemeClr val="tx1"/>
-                        </a:solidFill>
-                      </a:endParaRPr>
-                    </a:p>
-                  </a:txBody>
-                  <a:tcPr>
-                    <a:lnR w="12700" cap="flat" cmpd="sng" algn="ctr">
-                      <a:solidFill>
-                        <a:schemeClr val="tx1"/>
-                      </a:solidFill>
-                      <a:prstDash val="solid"/>
-                      <a:round/>
-                      <a:headEnd type="none" w="med" len="med"/>
-                      <a:tailEnd type="none" w="med" len="med"/>
-                    </a:lnR>
-                  </a:tcPr>
-                </a:tc>
-                <a:tc>
-                  <a:txBody>
-                    <a:bodyPr/>
-                    <a:lstStyle/>
-                    <a:p>
-                      <a:pPr marL="0" marR="0" lvl="0" indent="0" algn="l" defTabSz="914400" rtl="0" eaLnBrk="1" fontAlgn="auto" latinLnBrk="0" hangingPunct="1">
-                        <a:lnSpc>
-                          <a:spcPct val="100000"/>
-                        </a:lnSpc>
-                        <a:spcBef>
-                          <a:spcPts val="0"/>
-                        </a:spcBef>
-                        <a:spcAft>
-                          <a:spcPts val="0"/>
-                        </a:spcAft>
-                        <a:buClrTx/>
-                        <a:buSzTx/>
-                        <a:buFontTx/>
-                        <a:buNone/>
-                        <a:tabLst/>
-                        <a:defRPr/>
-                      </a:pPr>
-                      <a:r>
-                        <a:rPr lang="en-AU" dirty="0"/>
-                        <a:t>Next factor order permutation</a:t>
-                      </a:r>
-                      <a:endParaRPr lang="en-AU" b="0" dirty="0">
-                        <a:solidFill>
-                          <a:schemeClr val="tx1"/>
-                        </a:solidFill>
-                      </a:endParaRPr>
-                    </a:p>
-                  </a:txBody>
-                  <a:tcPr>
-                    <a:lnL w="12700" cap="flat" cmpd="sng" algn="ctr">
-                      <a:solidFill>
-                        <a:schemeClr val="tx1"/>
-                      </a:solidFill>
-                      <a:prstDash val="solid"/>
-                      <a:round/>
-                      <a:headEnd type="none" w="med" len="med"/>
-                      <a:tailEnd type="none" w="med" len="med"/>
-                    </a:lnL>
                   </a:tcPr>
                 </a:tc>
                 <a:tc>
@@ -5353,9 +5177,27 @@
                     </a:p>
                   </a:txBody>
                   <a:tcPr>
+                    <a:lnL w="12700" cmpd="sng">
+                      <a:noFill/>
+                    </a:lnL>
                     <a:lnR w="12700" cmpd="sng">
                       <a:noFill/>
                     </a:lnR>
+                    <a:lnT w="12700" cmpd="sng">
+                      <a:noFill/>
+                    </a:lnT>
+                    <a:lnB w="12700" cmpd="sng">
+                      <a:noFill/>
+                    </a:lnB>
+                    <a:lnTlToBr w="12700" cmpd="sng">
+                      <a:noFill/>
+                      <a:prstDash val="solid"/>
+                    </a:lnTlToBr>
+                    <a:lnBlToTr w="12700" cmpd="sng">
+                      <a:noFill/>
+                      <a:prstDash val="solid"/>
+                    </a:lnBlToTr>
+                    <a:noFill/>
                   </a:tcPr>
                 </a:tc>
                 <a:tc>
@@ -5408,7 +5250,55 @@
                       <a:noFill/>
                       <a:prstDash val="solid"/>
                     </a:lnBlToTr>
-                    <a:noFill/>
+                  </a:tcPr>
+                </a:tc>
+                <a:extLst>
+                  <a:ext uri="{0D108BD9-81ED-4DB2-BD59-A6C34878D82A}">
+                    <a16:rowId xmlns:a16="http://schemas.microsoft.com/office/drawing/2014/main" val="3822648520"/>
+                  </a:ext>
+                </a:extLst>
+              </a:tr>
+              <a:tr h="396000">
+                <a:tc>
+                  <a:txBody>
+                    <a:bodyPr/>
+                    <a:lstStyle/>
+                    <a:p>
+                      <a:endParaRPr lang="en-AU" b="1" dirty="0">
+                        <a:solidFill>
+                          <a:schemeClr val="tx1"/>
+                        </a:solidFill>
+                      </a:endParaRPr>
+                    </a:p>
+                  </a:txBody>
+                  <a:tcPr/>
+                </a:tc>
+                <a:tc>
+                  <a:txBody>
+                    <a:bodyPr/>
+                    <a:lstStyle/>
+                    <a:p>
+                      <a:r>
+                        <a:rPr lang="en-US" dirty="0"/>
+                        <a:t>Separation size</a:t>
+                      </a:r>
+                      <a:endParaRPr lang="en-AU" b="0" dirty="0">
+                        <a:solidFill>
+                          <a:schemeClr val="tx1"/>
+                        </a:solidFill>
+                      </a:endParaRPr>
+                    </a:p>
+                  </a:txBody>
+                  <a:tcPr>
+                    <a:lnR w="12700" cap="flat" cmpd="sng" algn="ctr">
+                      <a:solidFill>
+                        <a:schemeClr val="tx1"/>
+                      </a:solidFill>
+                      <a:prstDash val="solid"/>
+                      <a:round/>
+                      <a:headEnd type="none" w="med" len="med"/>
+                      <a:tailEnd type="none" w="med" len="med"/>
+                    </a:lnR>
                   </a:tcPr>
                 </a:tc>
                 <a:tc>
@@ -5434,112 +5324,8 @@
                         <a:defRPr/>
                       </a:pPr>
                       <a:r>
-                        <a:rPr lang="en-AU" b="0" dirty="0">
-                          <a:solidFill>
-                            <a:schemeClr val="tx1"/>
-                          </a:solidFill>
-                        </a:rPr>
-                        <a:t>Fix 2 of each location?</a:t>
-                      </a:r>
-                    </a:p>
-                  </a:txBody>
-                  <a:tcPr>
-                    <a:lnL w="12700" cmpd="sng">
-                      <a:noFill/>
-                    </a:lnL>
-                    <a:lnR w="12700" cmpd="sng">
-                      <a:noFill/>
-                    </a:lnR>
-                    <a:lnT w="12700" cmpd="sng">
-                      <a:noFill/>
-                    </a:lnT>
-                    <a:lnB w="12700" cmpd="sng">
-                      <a:noFill/>
-                    </a:lnB>
-                    <a:lnTlToBr w="12700" cmpd="sng">
-                      <a:noFill/>
-                      <a:prstDash val="solid"/>
-                    </a:lnTlToBr>
-                    <a:lnBlToTr w="12700" cmpd="sng">
-                      <a:noFill/>
-                      <a:prstDash val="solid"/>
-                    </a:lnBlToTr>
-                  </a:tcPr>
-                </a:tc>
-                <a:extLst>
-                  <a:ext uri="{0D108BD9-81ED-4DB2-BD59-A6C34878D82A}">
-                    <a16:rowId xmlns:a16="http://schemas.microsoft.com/office/drawing/2014/main" val="2478020637"/>
-                  </a:ext>
-                </a:extLst>
-              </a:tr>
-              <a:tr h="396000">
-                <a:tc>
-                  <a:txBody>
-                    <a:bodyPr/>
-                    <a:lstStyle/>
-                    <a:p>
-                      <a:endParaRPr lang="en-AU" b="1" dirty="0">
-                        <a:solidFill>
-                          <a:schemeClr val="tx1"/>
-                        </a:solidFill>
-                      </a:endParaRPr>
-                    </a:p>
-                  </a:txBody>
-                  <a:tcPr/>
-                </a:tc>
-                <a:tc>
-                  <a:txBody>
-                    <a:bodyPr/>
-                    <a:lstStyle/>
-                    <a:p>
-                      <a:r>
                         <a:rPr lang="en-US" dirty="0"/>
-                        <a:t>Block order</a:t>
-                      </a:r>
-                      <a:endParaRPr lang="en-AU" b="0" dirty="0">
-                        <a:solidFill>
-                          <a:schemeClr val="tx1"/>
-                        </a:solidFill>
-                      </a:endParaRPr>
-                    </a:p>
-                  </a:txBody>
-                  <a:tcPr>
-                    <a:lnR w="12700" cap="flat" cmpd="sng" algn="ctr">
-                      <a:solidFill>
-                        <a:schemeClr val="tx1"/>
-                      </a:solidFill>
-                      <a:prstDash val="solid"/>
-                      <a:round/>
-                      <a:headEnd type="none" w="med" len="med"/>
-                      <a:tailEnd type="none" w="med" len="med"/>
-                    </a:lnR>
-                  </a:tcPr>
-                </a:tc>
-                <a:tc>
-                  <a:txBody>
-                    <a:bodyPr/>
-                    <a:lstStyle/>
-                    <a:p>
-                      <a:pPr marL="0" marR="0" lvl="0" indent="0" algn="l" defTabSz="914400" rtl="0" eaLnBrk="1" fontAlgn="auto" latinLnBrk="0" hangingPunct="1">
-                        <a:lnSpc>
-                          <a:spcPct val="100000"/>
-                        </a:lnSpc>
-                        <a:spcBef>
-                          <a:spcPts val="0"/>
-                        </a:spcBef>
-                        <a:spcAft>
-                          <a:spcPts val="0"/>
-                        </a:spcAft>
-                        <a:buClrTx/>
-                        <a:buSzTx/>
-                        <a:buFontTx/>
-                        <a:buNone/>
-                        <a:tabLst/>
-                        <a:defRPr/>
-                      </a:pPr>
-                      <a:r>
-                        <a:rPr lang="en-AU" dirty="0"/>
-                        <a:t>Next 6 elements from the block permutations</a:t>
+                        <a:t>2</a:t>
                       </a:r>
                       <a:endParaRPr lang="en-AU" b="0" dirty="0">
                         <a:solidFill>
@@ -5670,30 +5456,11 @@
                         <a:tabLst/>
                         <a:defRPr/>
                       </a:pPr>
-                      <a:r>
-                        <a:rPr lang="en-AU" b="0" dirty="0">
-                          <a:solidFill>
-                            <a:schemeClr val="tx1"/>
-                          </a:solidFill>
-                        </a:rPr>
-                        <a:t>Fix 3 of each </a:t>
-                      </a:r>
-                      <a:r>
-                        <a:rPr lang="en-AU" b="0" dirty="0" err="1">
-                          <a:solidFill>
-                            <a:schemeClr val="tx1"/>
-                          </a:solidFill>
-                        </a:rPr>
-                        <a:t>cl&amp;var</a:t>
-                      </a:r>
-                      <a:r>
-                        <a:rPr lang="en-AU" b="0" dirty="0">
-                          <a:solidFill>
-                            <a:schemeClr val="tx1"/>
-                          </a:solidFill>
-                        </a:rPr>
-                        <a:t>?</a:t>
-                      </a:r>
+                      <a:endParaRPr lang="en-AU" b="0" dirty="0">
+                        <a:solidFill>
+                          <a:schemeClr val="tx1"/>
+                        </a:solidFill>
+                      </a:endParaRPr>
                     </a:p>
                   </a:txBody>
                   <a:tcPr>
@@ -5721,7 +5488,7 @@
                 </a:tc>
                 <a:extLst>
                   <a:ext uri="{0D108BD9-81ED-4DB2-BD59-A6C34878D82A}">
-                    <a16:rowId xmlns:a16="http://schemas.microsoft.com/office/drawing/2014/main" val="690743864"/>
+                    <a16:rowId xmlns:a16="http://schemas.microsoft.com/office/drawing/2014/main" val="3699670257"/>
                   </a:ext>
                 </a:extLst>
               </a:tr>
@@ -5738,17 +5505,7 @@
                       </a:endParaRPr>
                     </a:p>
                   </a:txBody>
-                  <a:tcPr>
-                    <a:lnB w="12700" cap="flat" cmpd="sng" algn="ctr">
-                      <a:solidFill>
-                        <a:schemeClr val="tx1"/>
-                      </a:solidFill>
-                      <a:prstDash val="solid"/>
-                      <a:round/>
-                      <a:headEnd type="none" w="med" len="med"/>
-                      <a:tailEnd type="none" w="med" len="med"/>
-                    </a:lnB>
-                  </a:tcPr>
+                  <a:tcPr/>
                 </a:tc>
                 <a:tc>
                   <a:txBody>
@@ -5757,7 +5514,7 @@
                     <a:p>
                       <a:r>
                         <a:rPr lang="en-US" dirty="0"/>
-                        <a:t>Location</a:t>
+                        <a:t>Variation size</a:t>
                       </a:r>
                       <a:endParaRPr lang="en-AU" b="0" dirty="0">
                         <a:solidFill>
@@ -5776,15 +5533,6 @@
                       <a:headEnd type="none" w="med" len="med"/>
                       <a:tailEnd type="none" w="med" len="med"/>
                     </a:lnR>
-                    <a:lnB w="12700" cap="flat" cmpd="sng" algn="ctr">
-                      <a:solidFill>
-                        <a:schemeClr val="tx1"/>
-                      </a:solidFill>
-                      <a:prstDash val="solid"/>
-                      <a:round/>
-                      <a:headEnd type="none" w="med" len="med"/>
-                      <a:tailEnd type="none" w="med" len="med"/>
-                    </a:lnB>
                   </a:tcPr>
                 </a:tc>
                 <a:tc>
@@ -5810,8 +5558,8 @@
                         <a:defRPr/>
                       </a:pPr>
                       <a:r>
-                        <a:rPr lang="en-AU" dirty="0"/>
-                        <a:t>Variables are shuffled in simulation (reorder index stored)</a:t>
+                        <a:rPr lang="en-US" dirty="0"/>
+                        <a:t>1</a:t>
                       </a:r>
                       <a:endParaRPr lang="en-AU" b="0" dirty="0">
                         <a:solidFill>
@@ -5830,15 +5578,6 @@
                       <a:headEnd type="none" w="med" len="med"/>
                       <a:tailEnd type="none" w="med" len="med"/>
                     </a:lnL>
-                    <a:lnB w="12700" cap="flat" cmpd="sng" algn="ctr">
-                      <a:solidFill>
-                        <a:schemeClr val="tx1"/>
-                      </a:solidFill>
-                      <a:prstDash val="solid"/>
-                      <a:round/>
-                      <a:headEnd type="none" w="med" len="med"/>
-                      <a:tailEnd type="none" w="med" len="med"/>
-                    </a:lnB>
                   </a:tcPr>
                 </a:tc>
                 <a:tc>
@@ -5874,15 +5613,6 @@
                     <a:lnR w="12700" cmpd="sng">
                       <a:noFill/>
                     </a:lnR>
-                    <a:lnB w="12700" cap="flat" cmpd="sng" algn="ctr">
-                      <a:solidFill>
-                        <a:schemeClr val="tx1"/>
-                      </a:solidFill>
-                      <a:prstDash val="solid"/>
-                      <a:round/>
-                      <a:headEnd type="none" w="med" len="med"/>
-                      <a:tailEnd type="none" w="med" len="med"/>
-                    </a:lnB>
                   </a:tcPr>
                 </a:tc>
                 <a:tc>
@@ -5924,12 +5654,8 @@
                     <a:lnT w="12700" cmpd="sng">
                       <a:noFill/>
                     </a:lnT>
-                    <a:lnB w="12700" cap="flat" cmpd="sng" algn="ctr">
+                    <a:lnB w="12700" cmpd="sng">
                       <a:noFill/>
-                      <a:prstDash val="solid"/>
-                      <a:round/>
-                      <a:headEnd type="none" w="med" len="med"/>
-                      <a:tailEnd type="none" w="med" len="med"/>
                     </a:lnB>
                     <a:lnTlToBr w="12700" cmpd="sng">
                       <a:noFill/>
@@ -5940,191 +5666,6 @@
                       <a:prstDash val="solid"/>
                     </a:lnBlToTr>
                     <a:noFill/>
-                  </a:tcPr>
-                </a:tc>
-                <a:tc>
-                  <a:txBody>
-                    <a:bodyPr/>
-                    <a:lstStyle/>
-                    <a:p>
-                      <a:pPr marL="0" marR="0" lvl="0" indent="0" algn="l" defTabSz="914400" rtl="0" eaLnBrk="1" fontAlgn="auto" latinLnBrk="0" hangingPunct="1">
-                        <a:lnSpc>
-                          <a:spcPct val="100000"/>
-                        </a:lnSpc>
-                        <a:spcBef>
-                          <a:spcPts val="0"/>
-                        </a:spcBef>
-                        <a:spcAft>
-                          <a:spcPts val="0"/>
-                        </a:spcAft>
-                        <a:buClrTx/>
-                        <a:buSzTx/>
-                        <a:buFontTx/>
-                        <a:buNone/>
-                        <a:tabLst/>
-                        <a:defRPr/>
-                      </a:pPr>
-                      <a:r>
-                        <a:rPr lang="en-AU" b="0" dirty="0">
-                          <a:solidFill>
-                            <a:schemeClr val="tx1"/>
-                          </a:solidFill>
-                        </a:rPr>
-                        <a:t>Fix one of each to each cl &amp; var </a:t>
-                      </a:r>
-                    </a:p>
-                  </a:txBody>
-                  <a:tcPr>
-                    <a:lnL w="12700" cmpd="sng">
-                      <a:noFill/>
-                    </a:lnL>
-                    <a:lnR w="12700" cmpd="sng">
-                      <a:noFill/>
-                    </a:lnR>
-                    <a:lnT w="12700" cmpd="sng">
-                      <a:noFill/>
-                    </a:lnT>
-                    <a:lnB w="12700" cap="flat" cmpd="sng" algn="ctr">
-                      <a:noFill/>
-                      <a:prstDash val="solid"/>
-                      <a:round/>
-                      <a:headEnd type="none" w="med" len="med"/>
-                      <a:tailEnd type="none" w="med" len="med"/>
-                    </a:lnB>
-                    <a:lnTlToBr w="12700" cmpd="sng">
-                      <a:noFill/>
-                      <a:prstDash val="solid"/>
-                    </a:lnTlToBr>
-                    <a:lnBlToTr w="12700" cmpd="sng">
-                      <a:noFill/>
-                      <a:prstDash val="solid"/>
-                    </a:lnBlToTr>
-                  </a:tcPr>
-                </a:tc>
-                <a:extLst>
-                  <a:ext uri="{0D108BD9-81ED-4DB2-BD59-A6C34878D82A}">
-                    <a16:rowId xmlns:a16="http://schemas.microsoft.com/office/drawing/2014/main" val="1723981666"/>
-                  </a:ext>
-                </a:extLst>
-              </a:tr>
-              <a:tr h="396000">
-                <a:tc>
-                  <a:txBody>
-                    <a:bodyPr/>
-                    <a:lstStyle/>
-                    <a:p>
-                      <a:r>
-                        <a:rPr lang="en-US" b="1" dirty="0"/>
-                        <a:t>Assumptions</a:t>
-                      </a:r>
-                      <a:endParaRPr lang="en-US" b="1" dirty="0">
-                        <a:solidFill>
-                          <a:schemeClr val="tx1"/>
-                        </a:solidFill>
-                      </a:endParaRPr>
-                    </a:p>
-                  </a:txBody>
-                  <a:tcPr>
-                    <a:lnT w="12700" cap="flat" cmpd="sng" algn="ctr">
-                      <a:solidFill>
-                        <a:schemeClr val="tx1"/>
-                      </a:solidFill>
-                      <a:prstDash val="solid"/>
-                      <a:round/>
-                      <a:headEnd type="none" w="med" len="med"/>
-                      <a:tailEnd type="none" w="med" len="med"/>
-                    </a:lnT>
-                  </a:tcPr>
-                </a:tc>
-                <a:tc>
-                  <a:txBody>
-                    <a:bodyPr/>
-                    <a:lstStyle/>
-                    <a:p>
-                      <a:r>
-                        <a:rPr lang="en-US" dirty="0"/>
-                        <a:t>Correlation, signal</a:t>
-                      </a:r>
-                      <a:endParaRPr lang="en-AU" b="0" dirty="0">
-                        <a:solidFill>
-                          <a:schemeClr val="tx1"/>
-                        </a:solidFill>
-                      </a:endParaRPr>
-                    </a:p>
-                  </a:txBody>
-                  <a:tcPr>
-                    <a:lnR w="12700" cap="flat" cmpd="sng" algn="ctr">
-                      <a:solidFill>
-                        <a:schemeClr val="tx1"/>
-                      </a:solidFill>
-                      <a:prstDash val="solid"/>
-                      <a:round/>
-                      <a:headEnd type="none" w="med" len="med"/>
-                      <a:tailEnd type="none" w="med" len="med"/>
-                    </a:lnR>
-                    <a:lnT w="12700" cap="flat" cmpd="sng" algn="ctr">
-                      <a:solidFill>
-                        <a:schemeClr val="tx1"/>
-                      </a:solidFill>
-                      <a:prstDash val="solid"/>
-                      <a:round/>
-                      <a:headEnd type="none" w="med" len="med"/>
-                      <a:tailEnd type="none" w="med" len="med"/>
-                    </a:lnT>
-                  </a:tcPr>
-                </a:tc>
-                <a:tc>
-                  <a:txBody>
-                    <a:bodyPr/>
-                    <a:lstStyle/>
-                    <a:p>
-                      <a:pPr marL="0" marR="0" lvl="0" indent="0" algn="l" defTabSz="914400" rtl="0" eaLnBrk="1" fontAlgn="auto" latinLnBrk="0" hangingPunct="1">
-                        <a:lnSpc>
-                          <a:spcPct val="100000"/>
-                        </a:lnSpc>
-                        <a:spcBef>
-                          <a:spcPts val="0"/>
-                        </a:spcBef>
-                        <a:spcAft>
-                          <a:spcPts val="0"/>
-                        </a:spcAft>
-                        <a:buClrTx/>
-                        <a:buSzTx/>
-                        <a:buFontTx/>
-                        <a:buNone/>
-                        <a:tabLst/>
-                        <a:defRPr/>
-                      </a:pPr>
-                      <a:r>
-                        <a:rPr lang="en-US" dirty="0"/>
-                        <a:t>.9</a:t>
-                      </a:r>
-                      <a:endParaRPr lang="en-AU" b="0" dirty="0">
-                        <a:solidFill>
-                          <a:schemeClr val="tx1"/>
-                        </a:solidFill>
-                      </a:endParaRPr>
-                    </a:p>
-                  </a:txBody>
-                  <a:tcPr>
-                    <a:lnL w="12700" cap="flat" cmpd="sng" algn="ctr">
-                      <a:solidFill>
-                        <a:schemeClr val="tx1"/>
-                      </a:solidFill>
-                      <a:prstDash val="solid"/>
-                      <a:round/>
-                      <a:headEnd type="none" w="med" len="med"/>
-                      <a:tailEnd type="none" w="med" len="med"/>
-                    </a:lnL>
-                    <a:lnT w="12700" cap="flat" cmpd="sng" algn="ctr">
-                      <a:solidFill>
-                        <a:schemeClr val="tx1"/>
-                      </a:solidFill>
-                      <a:prstDash val="solid"/>
-                      <a:round/>
-                      <a:headEnd type="none" w="med" len="med"/>
-                      <a:tailEnd type="none" w="med" len="med"/>
-                    </a:lnT>
                   </a:tcPr>
                 </a:tc>
                 <a:tc>
@@ -6157,18 +5698,120 @@
                     </a:p>
                   </a:txBody>
                   <a:tcPr>
+                    <a:lnL w="12700" cmpd="sng">
+                      <a:noFill/>
+                    </a:lnL>
                     <a:lnR w="12700" cmpd="sng">
                       <a:noFill/>
                     </a:lnR>
-                    <a:lnT w="12700" cap="flat" cmpd="sng" algn="ctr">
-                      <a:solidFill>
-                        <a:schemeClr val="tx1"/>
-                      </a:solidFill>
-                      <a:prstDash val="solid"/>
-                      <a:round/>
-                      <a:headEnd type="none" w="med" len="med"/>
-                      <a:tailEnd type="none" w="med" len="med"/>
+                    <a:lnT w="12700" cmpd="sng">
+                      <a:noFill/>
                     </a:lnT>
+                    <a:lnB w="12700" cmpd="sng">
+                      <a:noFill/>
+                    </a:lnB>
+                    <a:lnTlToBr w="12700" cmpd="sng">
+                      <a:noFill/>
+                      <a:prstDash val="solid"/>
+                    </a:lnTlToBr>
+                    <a:lnBlToTr w="12700" cmpd="sng">
+                      <a:noFill/>
+                      <a:prstDash val="solid"/>
+                    </a:lnBlToTr>
+                  </a:tcPr>
+                </a:tc>
+                <a:extLst>
+                  <a:ext uri="{0D108BD9-81ED-4DB2-BD59-A6C34878D82A}">
+                    <a16:rowId xmlns:a16="http://schemas.microsoft.com/office/drawing/2014/main" val="3553002749"/>
+                  </a:ext>
+                </a:extLst>
+              </a:tr>
+              <a:tr h="396000">
+                <a:tc>
+                  <a:txBody>
+                    <a:bodyPr/>
+                    <a:lstStyle/>
+                    <a:p>
+                      <a:endParaRPr lang="en-AU" b="1" dirty="0">
+                        <a:solidFill>
+                          <a:schemeClr val="tx1"/>
+                        </a:solidFill>
+                      </a:endParaRPr>
+                    </a:p>
+                  </a:txBody>
+                  <a:tcPr/>
+                </a:tc>
+                <a:tc>
+                  <a:txBody>
+                    <a:bodyPr/>
+                    <a:lstStyle/>
+                    <a:p>
+                      <a:r>
+                        <a:rPr lang="en-US" dirty="0"/>
+                        <a:t>Preprocessing </a:t>
+                      </a:r>
+                      <a:endParaRPr lang="en-AU" b="0" dirty="0">
+                        <a:solidFill>
+                          <a:schemeClr val="tx1"/>
+                        </a:solidFill>
+                      </a:endParaRPr>
+                    </a:p>
+                  </a:txBody>
+                  <a:tcPr>
+                    <a:lnR w="12700" cap="flat" cmpd="sng" algn="ctr">
+                      <a:solidFill>
+                        <a:schemeClr val="tx1"/>
+                      </a:solidFill>
+                      <a:prstDash val="solid"/>
+                      <a:round/>
+                      <a:headEnd type="none" w="med" len="med"/>
+                      <a:tailEnd type="none" w="med" len="med"/>
+                    </a:lnR>
+                  </a:tcPr>
+                </a:tc>
+                <a:tc>
+                  <a:txBody>
+                    <a:bodyPr/>
+                    <a:lstStyle/>
+                    <a:p>
+                      <a:pPr marL="0" marR="0" lvl="0" indent="0" algn="l" defTabSz="914400" rtl="0" eaLnBrk="1" fontAlgn="auto" latinLnBrk="0" hangingPunct="1">
+                        <a:lnSpc>
+                          <a:spcPct val="100000"/>
+                        </a:lnSpc>
+                        <a:spcBef>
+                          <a:spcPts val="0"/>
+                        </a:spcBef>
+                        <a:spcAft>
+                          <a:spcPts val="0"/>
+                        </a:spcAft>
+                        <a:buClrTx/>
+                        <a:buSzTx/>
+                        <a:buFontTx/>
+                        <a:buNone/>
+                        <a:tabLst/>
+                        <a:defRPr/>
+                      </a:pPr>
+                      <a:r>
+                        <a:rPr lang="en-US" dirty="0"/>
+                        <a:t>All variables normalized by standard deviation</a:t>
+                      </a:r>
+                      <a:endParaRPr lang="en-AU" b="0" dirty="0">
+                        <a:solidFill>
+                          <a:schemeClr val="tx1"/>
+                        </a:solidFill>
+                      </a:endParaRPr>
+                    </a:p>
+                  </a:txBody>
+                  <a:tcPr>
+                    <a:lnL w="12700" cap="flat" cmpd="sng" algn="ctr">
+                      <a:solidFill>
+                        <a:schemeClr val="tx1"/>
+                      </a:solidFill>
+                      <a:prstDash val="solid"/>
+                      <a:round/>
+                      <a:headEnd type="none" w="med" len="med"/>
+                      <a:tailEnd type="none" w="med" len="med"/>
+                    </a:lnL>
                   </a:tcPr>
                 </a:tc>
                 <a:tc>
@@ -6201,31 +5844,9 @@
                     </a:p>
                   </a:txBody>
                   <a:tcPr>
-                    <a:lnL w="12700" cmpd="sng">
-                      <a:noFill/>
-                    </a:lnL>
                     <a:lnR w="12700" cmpd="sng">
                       <a:noFill/>
                     </a:lnR>
-                    <a:lnT w="12700" cap="flat" cmpd="sng" algn="ctr">
-                      <a:noFill/>
-                      <a:prstDash val="solid"/>
-                      <a:round/>
-                      <a:headEnd type="none" w="med" len="med"/>
-                      <a:tailEnd type="none" w="med" len="med"/>
-                    </a:lnT>
-                    <a:lnB w="12700" cmpd="sng">
-                      <a:noFill/>
-                    </a:lnB>
-                    <a:lnTlToBr w="12700" cmpd="sng">
-                      <a:noFill/>
-                      <a:prstDash val="solid"/>
-                    </a:lnTlToBr>
-                    <a:lnBlToTr w="12700" cmpd="sng">
-                      <a:noFill/>
-                      <a:prstDash val="solid"/>
-                    </a:lnBlToTr>
-                    <a:noFill/>
                   </a:tcPr>
                 </a:tc>
                 <a:tc>
@@ -6264,12 +5885,8 @@
                     <a:lnR w="12700" cmpd="sng">
                       <a:noFill/>
                     </a:lnR>
-                    <a:lnT w="12700" cap="flat" cmpd="sng" algn="ctr">
+                    <a:lnT w="12700" cmpd="sng">
                       <a:noFill/>
-                      <a:prstDash val="solid"/>
-                      <a:round/>
-                      <a:headEnd type="none" w="med" len="med"/>
-                      <a:tailEnd type="none" w="med" len="med"/>
                     </a:lnT>
                     <a:lnB w="12700" cmpd="sng">
                       <a:noFill/>
@@ -6282,104 +5899,7 @@
                       <a:noFill/>
                       <a:prstDash val="solid"/>
                     </a:lnBlToTr>
-                  </a:tcPr>
-                </a:tc>
-                <a:extLst>
-                  <a:ext uri="{0D108BD9-81ED-4DB2-BD59-A6C34878D82A}">
-                    <a16:rowId xmlns:a16="http://schemas.microsoft.com/office/drawing/2014/main" val="2732004267"/>
-                  </a:ext>
-                </a:extLst>
-              </a:tr>
-              <a:tr h="396000">
-                <a:tc>
-                  <a:txBody>
-                    <a:bodyPr/>
-                    <a:lstStyle/>
-                    <a:p>
-                      <a:r>
-                        <a:rPr lang="en-US" dirty="0"/>
-                        <a:t>(fixed blocks?)</a:t>
-                      </a:r>
-                      <a:endParaRPr lang="en-AU" b="0" i="1" dirty="0">
-                        <a:solidFill>
-                          <a:schemeClr val="tx1"/>
-                        </a:solidFill>
-                      </a:endParaRPr>
-                    </a:p>
-                  </a:txBody>
-                  <a:tcPr/>
-                </a:tc>
-                <a:tc>
-                  <a:txBody>
-                    <a:bodyPr/>
-                    <a:lstStyle/>
-                    <a:p>
-                      <a:r>
-                        <a:rPr lang="en-US" dirty="0"/>
-                        <a:t>Correlation, noise</a:t>
-                      </a:r>
-                      <a:endParaRPr lang="en-AU" b="0" dirty="0">
-                        <a:solidFill>
-                          <a:schemeClr val="tx1"/>
-                        </a:solidFill>
-                      </a:endParaRPr>
-                    </a:p>
-                  </a:txBody>
-                  <a:tcPr>
-                    <a:lnR w="12700" cap="flat" cmpd="sng" algn="ctr">
-                      <a:solidFill>
-                        <a:schemeClr val="tx1"/>
-                      </a:solidFill>
-                      <a:prstDash val="solid"/>
-                      <a:round/>
-                      <a:headEnd type="none" w="med" len="med"/>
-                      <a:tailEnd type="none" w="med" len="med"/>
-                    </a:lnR>
-                  </a:tcPr>
-                </a:tc>
-                <a:tc>
-                  <a:txBody>
-                    <a:bodyPr/>
-                    <a:lstStyle/>
-                    <a:p>
-                      <a:pPr marL="0" marR="0" lvl="0" indent="0" algn="l" defTabSz="914400" rtl="0" eaLnBrk="1" fontAlgn="auto" latinLnBrk="0" hangingPunct="1">
-                        <a:lnSpc>
-                          <a:spcPct val="100000"/>
-                        </a:lnSpc>
-                        <a:spcBef>
-                          <a:spcPts val="0"/>
-                        </a:spcBef>
-                        <a:spcAft>
-                          <a:spcPts val="0"/>
-                        </a:spcAft>
-                        <a:buClrTx/>
-                        <a:buSzTx/>
-                        <a:buFontTx/>
-                        <a:buNone/>
-                        <a:tabLst/>
-                        <a:defRPr/>
-                      </a:pPr>
-                      <a:r>
-                        <a:rPr lang="en-US" dirty="0"/>
-                        <a:t>0</a:t>
-                      </a:r>
-                      <a:endParaRPr lang="en-AU" b="0" dirty="0">
-                        <a:solidFill>
-                          <a:schemeClr val="tx1"/>
-                        </a:solidFill>
-                      </a:endParaRPr>
-                    </a:p>
-                  </a:txBody>
-                  <a:tcPr>
-                    <a:lnL w="12700" cap="flat" cmpd="sng" algn="ctr">
-                      <a:solidFill>
-                        <a:schemeClr val="tx1"/>
-                      </a:solidFill>
-                      <a:prstDash val="solid"/>
-                      <a:round/>
-                      <a:headEnd type="none" w="med" len="med"/>
-                      <a:tailEnd type="none" w="med" len="med"/>
-                    </a:lnL>
+                    <a:noFill/>
                   </a:tcPr>
                 </a:tc>
                 <a:tc>
@@ -6412,9 +5932,145 @@
                     </a:p>
                   </a:txBody>
                   <a:tcPr>
-                    <a:lnR w="12700" cmpd="sng">
+                    <a:lnL w="12700" cmpd="sng">
                       <a:noFill/>
+                    </a:lnL>
+                    <a:lnT w="12700" cmpd="sng">
+                      <a:noFill/>
+                    </a:lnT>
+                    <a:lnB w="12700" cmpd="sng">
+                      <a:noFill/>
+                    </a:lnB>
+                  </a:tcPr>
+                </a:tc>
+                <a:extLst>
+                  <a:ext uri="{0D108BD9-81ED-4DB2-BD59-A6C34878D82A}">
+                    <a16:rowId xmlns:a16="http://schemas.microsoft.com/office/drawing/2014/main" val="488286715"/>
+                  </a:ext>
+                </a:extLst>
+              </a:tr>
+              <a:tr h="396000">
+                <a:tc>
+                  <a:txBody>
+                    <a:bodyPr/>
+                    <a:lstStyle/>
+                    <a:p>
+                      <a:endParaRPr lang="en-AU" b="1" dirty="0">
+                        <a:solidFill>
+                          <a:schemeClr val="tx1"/>
+                        </a:solidFill>
+                      </a:endParaRPr>
+                    </a:p>
+                  </a:txBody>
+                  <a:tcPr>
+                    <a:lnB w="12700" cap="flat" cmpd="sng" algn="ctr">
+                      <a:solidFill>
+                        <a:schemeClr val="tx1"/>
+                      </a:solidFill>
+                      <a:prstDash val="solid"/>
+                      <a:round/>
+                      <a:headEnd type="none" w="med" len="med"/>
+                      <a:tailEnd type="none" w="med" len="med"/>
+                    </a:lnB>
+                  </a:tcPr>
+                </a:tc>
+                <a:tc>
+                  <a:txBody>
+                    <a:bodyPr/>
+                    <a:lstStyle/>
+                    <a:p>
+                      <a:r>
+                        <a:rPr lang="en-US" b="0" dirty="0">
+                          <a:solidFill>
+                            <a:schemeClr val="tx1"/>
+                          </a:solidFill>
+                        </a:rPr>
+                        <a:t>Observations within cluster</a:t>
+                      </a:r>
+                      <a:endParaRPr lang="en-AU" b="0" dirty="0">
+                        <a:solidFill>
+                          <a:schemeClr val="tx1"/>
+                        </a:solidFill>
+                      </a:endParaRPr>
+                    </a:p>
+                  </a:txBody>
+                  <a:tcPr>
+                    <a:lnR w="12700" cap="flat" cmpd="sng" algn="ctr">
+                      <a:solidFill>
+                        <a:schemeClr val="tx1"/>
+                      </a:solidFill>
+                      <a:prstDash val="solid"/>
+                      <a:round/>
+                      <a:headEnd type="none" w="med" len="med"/>
+                      <a:tailEnd type="none" w="med" len="med"/>
                     </a:lnR>
+                    <a:lnB w="12700" cap="flat" cmpd="sng" algn="ctr">
+                      <a:solidFill>
+                        <a:schemeClr val="tx1"/>
+                      </a:solidFill>
+                      <a:prstDash val="solid"/>
+                      <a:round/>
+                      <a:headEnd type="none" w="med" len="med"/>
+                      <a:tailEnd type="none" w="med" len="med"/>
+                    </a:lnB>
+                  </a:tcPr>
+                </a:tc>
+                <a:tc>
+                  <a:txBody>
+                    <a:bodyPr/>
+                    <a:lstStyle/>
+                    <a:p>
+                      <a:pPr marL="0" marR="0" lvl="0" indent="0" algn="l" defTabSz="914400" rtl="0" eaLnBrk="1" fontAlgn="auto" latinLnBrk="0" hangingPunct="1">
+                        <a:lnSpc>
+                          <a:spcPct val="100000"/>
+                        </a:lnSpc>
+                        <a:spcBef>
+                          <a:spcPts val="0"/>
+                        </a:spcBef>
+                        <a:spcAft>
+                          <a:spcPts val="0"/>
+                        </a:spcAft>
+                        <a:buClrTx/>
+                        <a:buSzTx/>
+                        <a:buFontTx/>
+                        <a:buNone/>
+                        <a:tabLst/>
+                        <a:defRPr/>
+                      </a:pPr>
+                      <a:r>
+                        <a:rPr lang="en-US" b="0" dirty="0">
+                          <a:solidFill>
+                            <a:schemeClr val="tx1"/>
+                          </a:solidFill>
+                        </a:rPr>
+                        <a:t>140 each</a:t>
+                      </a:r>
+                      <a:endParaRPr lang="en-AU" b="0" dirty="0">
+                        <a:solidFill>
+                          <a:schemeClr val="tx1"/>
+                        </a:solidFill>
+                      </a:endParaRPr>
+                    </a:p>
+                  </a:txBody>
+                  <a:tcPr>
+                    <a:lnL w="12700" cap="flat" cmpd="sng" algn="ctr">
+                      <a:solidFill>
+                        <a:schemeClr val="tx1"/>
+                      </a:solidFill>
+                      <a:prstDash val="solid"/>
+                      <a:round/>
+                      <a:headEnd type="none" w="med" len="med"/>
+                      <a:tailEnd type="none" w="med" len="med"/>
+                    </a:lnL>
+                    <a:lnB w="12700" cap="flat" cmpd="sng" algn="ctr">
+                      <a:solidFill>
+                        <a:schemeClr val="tx1"/>
+                      </a:solidFill>
+                      <a:prstDash val="solid"/>
+                      <a:round/>
+                      <a:headEnd type="none" w="med" len="med"/>
+                      <a:tailEnd type="none" w="med" len="med"/>
+                    </a:lnB>
                   </a:tcPr>
                 </a:tc>
                 <a:tc>
@@ -6447,27 +6103,18 @@
                     </a:p>
                   </a:txBody>
                   <a:tcPr>
-                    <a:lnL w="12700" cmpd="sng">
-                      <a:noFill/>
-                    </a:lnL>
                     <a:lnR w="12700" cmpd="sng">
                       <a:noFill/>
                     </a:lnR>
-                    <a:lnT w="12700" cmpd="sng">
-                      <a:noFill/>
-                    </a:lnT>
-                    <a:lnB w="12700" cmpd="sng">
-                      <a:noFill/>
+                    <a:lnB w="12700" cap="flat" cmpd="sng" algn="ctr">
+                      <a:solidFill>
+                        <a:schemeClr val="tx1"/>
+                      </a:solidFill>
+                      <a:prstDash val="solid"/>
+                      <a:round/>
+                      <a:headEnd type="none" w="med" len="med"/>
+                      <a:tailEnd type="none" w="med" len="med"/>
                     </a:lnB>
-                    <a:lnTlToBr w="12700" cmpd="sng">
-                      <a:noFill/>
-                      <a:prstDash val="solid"/>
-                    </a:lnTlToBr>
-                    <a:lnBlToTr w="12700" cmpd="sng">
-                      <a:noFill/>
-                      <a:prstDash val="solid"/>
-                    </a:lnBlToTr>
-                    <a:noFill/>
                   </a:tcPr>
                 </a:tc>
                 <a:tc>
@@ -6509,8 +6156,14 @@
                     <a:lnT w="12700" cmpd="sng">
                       <a:noFill/>
                     </a:lnT>
-                    <a:lnB w="12700" cmpd="sng">
-                      <a:noFill/>
+                    <a:lnB w="12700" cap="flat" cmpd="sng" algn="ctr">
+                      <a:solidFill>
+                        <a:schemeClr val="tx1"/>
+                      </a:solidFill>
+                      <a:prstDash val="solid"/>
+                      <a:round/>
+                      <a:headEnd type="none" w="med" len="med"/>
+                      <a:tailEnd type="none" w="med" len="med"/>
                     </a:lnB>
                     <a:lnTlToBr w="12700" cmpd="sng">
                       <a:noFill/>
@@ -6520,100 +6173,7 @@
                       <a:noFill/>
                       <a:prstDash val="solid"/>
                     </a:lnBlToTr>
-                  </a:tcPr>
-                </a:tc>
-                <a:extLst>
-                  <a:ext uri="{0D108BD9-81ED-4DB2-BD59-A6C34878D82A}">
-                    <a16:rowId xmlns:a16="http://schemas.microsoft.com/office/drawing/2014/main" val="3822648520"/>
-                  </a:ext>
-                </a:extLst>
-              </a:tr>
-              <a:tr h="396000">
-                <a:tc>
-                  <a:txBody>
-                    <a:bodyPr/>
-                    <a:lstStyle/>
-                    <a:p>
-                      <a:endParaRPr lang="en-AU" b="1" dirty="0">
-                        <a:solidFill>
-                          <a:schemeClr val="tx1"/>
-                        </a:solidFill>
-                      </a:endParaRPr>
-                    </a:p>
-                  </a:txBody>
-                  <a:tcPr/>
-                </a:tc>
-                <a:tc>
-                  <a:txBody>
-                    <a:bodyPr/>
-                    <a:lstStyle/>
-                    <a:p>
-                      <a:r>
-                        <a:rPr lang="en-US" dirty="0"/>
-                        <a:t>Separation size</a:t>
-                      </a:r>
-                      <a:endParaRPr lang="en-AU" b="0" dirty="0">
-                        <a:solidFill>
-                          <a:schemeClr val="tx1"/>
-                        </a:solidFill>
-                      </a:endParaRPr>
-                    </a:p>
-                  </a:txBody>
-                  <a:tcPr>
-                    <a:lnR w="12700" cap="flat" cmpd="sng" algn="ctr">
-                      <a:solidFill>
-                        <a:schemeClr val="tx1"/>
-                      </a:solidFill>
-                      <a:prstDash val="solid"/>
-                      <a:round/>
-                      <a:headEnd type="none" w="med" len="med"/>
-                      <a:tailEnd type="none" w="med" len="med"/>
-                    </a:lnR>
-                  </a:tcPr>
-                </a:tc>
-                <a:tc>
-                  <a:txBody>
-                    <a:bodyPr/>
-                    <a:lstStyle/>
-                    <a:p>
-                      <a:pPr marL="0" marR="0" lvl="0" indent="0" algn="l" defTabSz="914400" rtl="0" eaLnBrk="1" fontAlgn="auto" latinLnBrk="0" hangingPunct="1">
-                        <a:lnSpc>
-                          <a:spcPct val="100000"/>
-                        </a:lnSpc>
-                        <a:spcBef>
-                          <a:spcPts val="0"/>
-                        </a:spcBef>
-                        <a:spcAft>
-                          <a:spcPts val="0"/>
-                        </a:spcAft>
-                        <a:buClrTx/>
-                        <a:buSzTx/>
-                        <a:buFontTx/>
-                        <a:buNone/>
-                        <a:tabLst/>
-                        <a:defRPr/>
-                      </a:pPr>
-                      <a:r>
-                        <a:rPr lang="en-US" dirty="0"/>
-                        <a:t>2</a:t>
-                      </a:r>
-                      <a:endParaRPr lang="en-AU" b="0" dirty="0">
-                        <a:solidFill>
-                          <a:schemeClr val="tx1"/>
-                        </a:solidFill>
-                      </a:endParaRPr>
-                    </a:p>
-                  </a:txBody>
-                  <a:tcPr>
-                    <a:lnL w="12700" cap="flat" cmpd="sng" algn="ctr">
-                      <a:solidFill>
-                        <a:schemeClr val="tx1"/>
-                      </a:solidFill>
-                      <a:prstDash val="solid"/>
-                      <a:round/>
-                      <a:headEnd type="none" w="med" len="med"/>
-                      <a:tailEnd type="none" w="med" len="med"/>
-                    </a:lnL>
+                    <a:noFill/>
                   </a:tcPr>
                 </a:tc>
                 <a:tc>
@@ -6646,9 +6206,147 @@
                     </a:p>
                   </a:txBody>
                   <a:tcPr>
-                    <a:lnR w="12700" cmpd="sng">
+                    <a:lnL w="12700" cmpd="sng">
                       <a:noFill/>
+                    </a:lnL>
+                    <a:lnT w="12700" cmpd="sng">
+                      <a:noFill/>
+                    </a:lnT>
+                    <a:lnB w="12700" cap="flat" cmpd="sng" algn="ctr">
+                      <a:solidFill>
+                        <a:schemeClr val="tx1"/>
+                      </a:solidFill>
+                      <a:prstDash val="solid"/>
+                      <a:round/>
+                      <a:headEnd type="none" w="med" len="med"/>
+                      <a:tailEnd type="none" w="med" len="med"/>
+                    </a:lnB>
+                  </a:tcPr>
+                </a:tc>
+                <a:extLst>
+                  <a:ext uri="{0D108BD9-81ED-4DB2-BD59-A6C34878D82A}">
+                    <a16:rowId xmlns:a16="http://schemas.microsoft.com/office/drawing/2014/main" val="226284523"/>
+                  </a:ext>
+                </a:extLst>
+              </a:tr>
+              <a:tr h="396000">
+                <a:tc>
+                  <a:txBody>
+                    <a:bodyPr/>
+                    <a:lstStyle/>
+                    <a:p>
+                      <a:r>
+                        <a:rPr lang="en-US" b="1" dirty="0"/>
+                        <a:t>Randomization</a:t>
+                      </a:r>
+                      <a:endParaRPr lang="en-AU" b="1" dirty="0">
+                        <a:solidFill>
+                          <a:schemeClr val="tx1"/>
+                        </a:solidFill>
+                      </a:endParaRPr>
+                    </a:p>
+                  </a:txBody>
+                  <a:tcPr>
+                    <a:lnT w="12700" cap="flat" cmpd="sng" algn="ctr">
+                      <a:solidFill>
+                        <a:schemeClr val="tx1"/>
+                      </a:solidFill>
+                      <a:prstDash val="solid"/>
+                      <a:round/>
+                      <a:headEnd type="none" w="med" len="med"/>
+                      <a:tailEnd type="none" w="med" len="med"/>
+                    </a:lnT>
+                  </a:tcPr>
+                </a:tc>
+                <a:tc>
+                  <a:txBody>
+                    <a:bodyPr/>
+                    <a:lstStyle/>
+                    <a:p>
+                      <a:r>
+                        <a:rPr lang="en-US" dirty="0"/>
+                        <a:t>Factor</a:t>
+                      </a:r>
+                      <a:endParaRPr lang="en-AU" b="0" dirty="0">
+                        <a:solidFill>
+                          <a:schemeClr val="tx1"/>
+                        </a:solidFill>
+                      </a:endParaRPr>
+                    </a:p>
+                  </a:txBody>
+                  <a:tcPr>
+                    <a:lnR w="12700" cap="flat" cmpd="sng" algn="ctr">
+                      <a:solidFill>
+                        <a:schemeClr val="tx1"/>
+                      </a:solidFill>
+                      <a:prstDash val="solid"/>
+                      <a:round/>
+                      <a:headEnd type="none" w="med" len="med"/>
+                      <a:tailEnd type="none" w="med" len="med"/>
                     </a:lnR>
+                    <a:lnT w="12700" cap="flat" cmpd="sng" algn="ctr">
+                      <a:solidFill>
+                        <a:schemeClr val="tx1"/>
+                      </a:solidFill>
+                      <a:prstDash val="solid"/>
+                      <a:round/>
+                      <a:headEnd type="none" w="med" len="med"/>
+                      <a:tailEnd type="none" w="med" len="med"/>
+                    </a:lnT>
+                  </a:tcPr>
+                </a:tc>
+                <a:tc>
+                  <a:txBody>
+                    <a:bodyPr/>
+                    <a:lstStyle/>
+                    <a:p>
+                      <a:pPr marL="0" marR="0" lvl="0" indent="0" algn="l" defTabSz="914400" rtl="0" eaLnBrk="1" fontAlgn="auto" latinLnBrk="0" hangingPunct="1">
+                        <a:lnSpc>
+                          <a:spcPct val="100000"/>
+                        </a:lnSpc>
+                        <a:spcBef>
+                          <a:spcPts val="0"/>
+                        </a:spcBef>
+                        <a:spcAft>
+                          <a:spcPts val="0"/>
+                        </a:spcAft>
+                        <a:buClrTx/>
+                        <a:buSzTx/>
+                        <a:buFontTx/>
+                        <a:buNone/>
+                        <a:tabLst/>
+                        <a:defRPr/>
+                      </a:pPr>
+                      <a:r>
+                        <a:rPr lang="en-US" dirty="0"/>
+                        <a:t>Participants perform 2 tasks with each factor</a:t>
+                      </a:r>
+                      <a:endParaRPr lang="en-AU" b="0" dirty="0">
+                        <a:solidFill>
+                          <a:schemeClr val="tx1"/>
+                        </a:solidFill>
+                      </a:endParaRPr>
+                    </a:p>
+                  </a:txBody>
+                  <a:tcPr>
+                    <a:lnL w="12700" cap="flat" cmpd="sng" algn="ctr">
+                      <a:solidFill>
+                        <a:schemeClr val="tx1"/>
+                      </a:solidFill>
+                      <a:prstDash val="solid"/>
+                      <a:round/>
+                      <a:headEnd type="none" w="med" len="med"/>
+                      <a:tailEnd type="none" w="med" len="med"/>
+                    </a:lnL>
+                    <a:lnT w="12700" cap="flat" cmpd="sng" algn="ctr">
+                      <a:solidFill>
+                        <a:schemeClr val="tx1"/>
+                      </a:solidFill>
+                      <a:prstDash val="solid"/>
+                      <a:round/>
+                      <a:headEnd type="none" w="med" len="med"/>
+                      <a:tailEnd type="none" w="med" len="med"/>
+                    </a:lnT>
                   </a:tcPr>
                 </a:tc>
                 <a:tc>
@@ -6681,27 +6379,18 @@
                     </a:p>
                   </a:txBody>
                   <a:tcPr>
-                    <a:lnL w="12700" cmpd="sng">
-                      <a:noFill/>
-                    </a:lnL>
                     <a:lnR w="12700" cmpd="sng">
                       <a:noFill/>
                     </a:lnR>
-                    <a:lnT w="12700" cmpd="sng">
-                      <a:noFill/>
+                    <a:lnT w="12700" cap="flat" cmpd="sng" algn="ctr">
+                      <a:solidFill>
+                        <a:schemeClr val="tx1"/>
+                      </a:solidFill>
+                      <a:prstDash val="solid"/>
+                      <a:round/>
+                      <a:headEnd type="none" w="med" len="med"/>
+                      <a:tailEnd type="none" w="med" len="med"/>
                     </a:lnT>
-                    <a:lnB w="12700" cmpd="sng">
-                      <a:noFill/>
-                    </a:lnB>
-                    <a:lnTlToBr w="12700" cmpd="sng">
-                      <a:noFill/>
-                      <a:prstDash val="solid"/>
-                    </a:lnTlToBr>
-                    <a:lnBlToTr w="12700" cmpd="sng">
-                      <a:noFill/>
-                      <a:prstDash val="solid"/>
-                    </a:lnBlToTr>
-                    <a:noFill/>
                   </a:tcPr>
                 </a:tc>
                 <a:tc>
@@ -6740,8 +6429,14 @@
                     <a:lnR w="12700" cmpd="sng">
                       <a:noFill/>
                     </a:lnR>
-                    <a:lnT w="12700" cmpd="sng">
-                      <a:noFill/>
+                    <a:lnT w="12700" cap="flat" cmpd="sng" algn="ctr">
+                      <a:solidFill>
+                        <a:schemeClr val="tx1"/>
+                      </a:solidFill>
+                      <a:prstDash val="solid"/>
+                      <a:round/>
+                      <a:headEnd type="none" w="med" len="med"/>
+                      <a:tailEnd type="none" w="med" len="med"/>
                     </a:lnT>
                     <a:lnB w="12700" cmpd="sng">
                       <a:noFill/>
@@ -6754,11 +6449,41 @@
                       <a:noFill/>
                       <a:prstDash val="solid"/>
                     </a:lnBlToTr>
+                    <a:noFill/>
+                  </a:tcPr>
+                </a:tc>
+                <a:tc>
+                  <a:txBody>
+                    <a:bodyPr/>
+                    <a:lstStyle/>
+                    <a:p>
+                      <a:r>
+                        <a:rPr lang="en-AU" b="1" dirty="0"/>
+                        <a:t>Other block thoughts:</a:t>
+                      </a:r>
+                    </a:p>
+                  </a:txBody>
+                  <a:tcPr>
+                    <a:lnL w="12700" cmpd="sng">
+                      <a:noFill/>
+                    </a:lnL>
+                    <a:lnT w="12700" cap="flat" cmpd="sng" algn="ctr">
+                      <a:solidFill>
+                        <a:schemeClr val="tx1"/>
+                      </a:solidFill>
+                      <a:prstDash val="solid"/>
+                      <a:round/>
+                      <a:headEnd type="none" w="med" len="med"/>
+                      <a:tailEnd type="none" w="med" len="med"/>
+                    </a:lnT>
+                    <a:lnB w="12700" cmpd="sng">
+                      <a:noFill/>
+                    </a:lnB>
                   </a:tcPr>
                 </a:tc>
                 <a:extLst>
                   <a:ext uri="{0D108BD9-81ED-4DB2-BD59-A6C34878D82A}">
-                    <a16:rowId xmlns:a16="http://schemas.microsoft.com/office/drawing/2014/main" val="3699670257"/>
+                    <a16:rowId xmlns:a16="http://schemas.microsoft.com/office/drawing/2014/main" val="2939277536"/>
                   </a:ext>
                 </a:extLst>
               </a:tr>
@@ -6784,7 +6509,7 @@
                     <a:p>
                       <a:r>
                         <a:rPr lang="en-US" dirty="0"/>
-                        <a:t>Variation size</a:t>
+                        <a:t>Block</a:t>
                       </a:r>
                       <a:endParaRPr lang="en-AU" b="0" dirty="0">
                         <a:solidFill>
@@ -6829,7 +6554,7 @@
                       </a:pPr>
                       <a:r>
                         <a:rPr lang="en-US" dirty="0"/>
-                        <a:t>1</a:t>
+                        <a:t>Participants perform 6 different blocks of the 36 combinations</a:t>
                       </a:r>
                       <a:endParaRPr lang="en-AU" b="0" dirty="0">
                         <a:solidFill>
@@ -6960,39 +6685,31 @@
                         <a:tabLst/>
                         <a:defRPr/>
                       </a:pPr>
-                      <a:endParaRPr lang="en-AU" b="0" dirty="0">
-                        <a:solidFill>
-                          <a:schemeClr val="tx1"/>
-                        </a:solidFill>
-                      </a:endParaRPr>
+                      <a:r>
+                        <a:rPr lang="en-AU" b="0" dirty="0">
+                          <a:solidFill>
+                            <a:schemeClr val="tx1"/>
+                          </a:solidFill>
+                        </a:rPr>
+                        <a:t>Fix 2 of each VC?</a:t>
+                      </a:r>
                     </a:p>
                   </a:txBody>
                   <a:tcPr>
                     <a:lnL w="12700" cmpd="sng">
                       <a:noFill/>
                     </a:lnL>
-                    <a:lnR w="12700" cmpd="sng">
-                      <a:noFill/>
-                    </a:lnR>
                     <a:lnT w="12700" cmpd="sng">
                       <a:noFill/>
                     </a:lnT>
                     <a:lnB w="12700" cmpd="sng">
                       <a:noFill/>
                     </a:lnB>
-                    <a:lnTlToBr w="12700" cmpd="sng">
-                      <a:noFill/>
-                      <a:prstDash val="solid"/>
-                    </a:lnTlToBr>
-                    <a:lnBlToTr w="12700" cmpd="sng">
-                      <a:noFill/>
-                      <a:prstDash val="solid"/>
-                    </a:lnBlToTr>
                   </a:tcPr>
                 </a:tc>
                 <a:extLst>
                   <a:ext uri="{0D108BD9-81ED-4DB2-BD59-A6C34878D82A}">
-                    <a16:rowId xmlns:a16="http://schemas.microsoft.com/office/drawing/2014/main" val="3553002749"/>
+                    <a16:rowId xmlns:a16="http://schemas.microsoft.com/office/drawing/2014/main" val="3240862320"/>
                   </a:ext>
                 </a:extLst>
               </a:tr>
@@ -7018,7 +6735,7 @@
                     <a:p>
                       <a:r>
                         <a:rPr lang="en-US" dirty="0"/>
-                        <a:t>Preprocessing </a:t>
+                        <a:t>Location</a:t>
                       </a:r>
                       <a:endParaRPr lang="en-AU" b="0" dirty="0">
                         <a:solidFill>
@@ -7062,8 +6779,8 @@
                         <a:defRPr/>
                       </a:pPr>
                       <a:r>
-                        <a:rPr lang="en-US" dirty="0"/>
-                        <a:t>All variables normalized by standard deviation</a:t>
+                        <a:rPr lang="en-AU" dirty="0"/>
+                        <a:t>Variables are shuffled in simulation (reorder index stored)</a:t>
                       </a:r>
                       <a:endParaRPr lang="en-AU" b="0" dirty="0">
                         <a:solidFill>
@@ -7194,11 +6911,14 @@
                         <a:tabLst/>
                         <a:defRPr/>
                       </a:pPr>
-                      <a:endParaRPr lang="en-AU" b="0" dirty="0">
-                        <a:solidFill>
-                          <a:schemeClr val="tx1"/>
-                        </a:solidFill>
-                      </a:endParaRPr>
+                      <a:r>
+                        <a:rPr lang="en-AU" b="0" dirty="0">
+                          <a:solidFill>
+                            <a:schemeClr val="tx1"/>
+                          </a:solidFill>
+                        </a:rPr>
+                        <a:t>Fix one of each to each cl &amp; var </a:t>
+                      </a:r>
                     </a:p>
                   </a:txBody>
                   <a:tcPr>
@@ -7208,11 +6928,14 @@
                     <a:lnT w="12700" cmpd="sng">
                       <a:noFill/>
                     </a:lnT>
+                    <a:lnB w="12700" cmpd="sng">
+                      <a:noFill/>
+                    </a:lnB>
                   </a:tcPr>
                 </a:tc>
                 <a:extLst>
                   <a:ext uri="{0D108BD9-81ED-4DB2-BD59-A6C34878D82A}">
-                    <a16:rowId xmlns:a16="http://schemas.microsoft.com/office/drawing/2014/main" val="488286715"/>
+                    <a16:rowId xmlns:a16="http://schemas.microsoft.com/office/drawing/2014/main" val="3456151653"/>
                   </a:ext>
                 </a:extLst>
               </a:tr>
@@ -10453,9 +10176,9 @@
               <p:nvPr/>
             </p:nvCxnSpPr>
             <p:spPr>
-              <a:xfrm>
-                <a:off x="7578090" y="674824"/>
-                <a:ext cx="3981626" cy="0"/>
+              <a:xfrm flipV="1">
+                <a:off x="7476412" y="674824"/>
+                <a:ext cx="4083304" cy="18700"/>
               </a:xfrm>
               <a:prstGeom prst="line">
                 <a:avLst/>
@@ -12098,6 +11821,2618 @@
           </a:p>
         </p:txBody>
       </p:sp>
+      <p:grpSp>
+        <p:nvGrpSpPr>
+          <p:cNvPr id="69" name="Group 68">
+            <a:extLst>
+              <a:ext uri="{FF2B5EF4-FFF2-40B4-BE49-F238E27FC236}">
+                <a16:creationId xmlns:a16="http://schemas.microsoft.com/office/drawing/2014/main" id="{3890384F-62E2-437A-A93E-9EDF25C073B6}"/>
+              </a:ext>
+            </a:extLst>
+          </p:cNvPr>
+          <p:cNvGrpSpPr/>
+          <p:nvPr/>
+        </p:nvGrpSpPr>
+        <p:grpSpPr>
+          <a:xfrm>
+            <a:off x="1526122" y="6980740"/>
+            <a:ext cx="4624932" cy="1735334"/>
+            <a:chOff x="7675880" y="266594"/>
+            <a:chExt cx="4624932" cy="1735334"/>
+          </a:xfrm>
+        </p:grpSpPr>
+        <p:sp>
+          <p:nvSpPr>
+            <p:cNvPr id="70" name="Rectangle: Rounded Corners 69">
+              <a:extLst>
+                <a:ext uri="{FF2B5EF4-FFF2-40B4-BE49-F238E27FC236}">
+                  <a16:creationId xmlns:a16="http://schemas.microsoft.com/office/drawing/2014/main" id="{260EC811-85AB-4137-BBDE-0636C0188104}"/>
+                </a:ext>
+              </a:extLst>
+            </p:cNvPr>
+            <p:cNvSpPr/>
+            <p:nvPr/>
+          </p:nvSpPr>
+          <p:spPr>
+            <a:xfrm>
+              <a:off x="9599258" y="761169"/>
+              <a:ext cx="360000" cy="360000"/>
+            </a:xfrm>
+            <a:prstGeom prst="roundRect">
+              <a:avLst/>
+            </a:prstGeom>
+            <a:solidFill>
+              <a:srgbClr val="7030A0"/>
+            </a:solidFill>
+            <a:ln>
+              <a:solidFill>
+                <a:schemeClr val="tx1"/>
+              </a:solidFill>
+            </a:ln>
+          </p:spPr>
+          <p:style>
+            <a:lnRef idx="2">
+              <a:schemeClr val="accent2">
+                <a:shade val="50000"/>
+              </a:schemeClr>
+            </a:lnRef>
+            <a:fillRef idx="1">
+              <a:schemeClr val="accent2"/>
+            </a:fillRef>
+            <a:effectRef idx="0">
+              <a:schemeClr val="accent2"/>
+            </a:effectRef>
+            <a:fontRef idx="minor">
+              <a:schemeClr val="lt1"/>
+            </a:fontRef>
+          </p:style>
+          <p:txBody>
+            <a:bodyPr rtlCol="0" anchor="ctr"/>
+            <a:lstStyle/>
+            <a:p>
+              <a:pPr algn="ctr"/>
+              <a:r>
+                <a:rPr lang="en-AU" dirty="0"/>
+                <a:t>P</a:t>
+              </a:r>
+            </a:p>
+          </p:txBody>
+        </p:sp>
+        <p:sp>
+          <p:nvSpPr>
+            <p:cNvPr id="72" name="Rectangle: Rounded Corners 71">
+              <a:extLst>
+                <a:ext uri="{FF2B5EF4-FFF2-40B4-BE49-F238E27FC236}">
+                  <a16:creationId xmlns:a16="http://schemas.microsoft.com/office/drawing/2014/main" id="{2ACAA2BD-4A23-4C8E-A835-41CBCBA5393D}"/>
+                </a:ext>
+              </a:extLst>
+            </p:cNvPr>
+            <p:cNvSpPr/>
+            <p:nvPr/>
+          </p:nvSpPr>
+          <p:spPr>
+            <a:xfrm>
+              <a:off x="9595715" y="1476089"/>
+              <a:ext cx="360000" cy="360000"/>
+            </a:xfrm>
+            <a:prstGeom prst="roundRect">
+              <a:avLst/>
+            </a:prstGeom>
+            <a:solidFill>
+              <a:schemeClr val="accent6">
+                <a:lumMod val="75000"/>
+              </a:schemeClr>
+            </a:solidFill>
+            <a:ln>
+              <a:solidFill>
+                <a:schemeClr val="tx1"/>
+              </a:solidFill>
+            </a:ln>
+          </p:spPr>
+          <p:style>
+            <a:lnRef idx="2">
+              <a:schemeClr val="accent1">
+                <a:shade val="50000"/>
+              </a:schemeClr>
+            </a:lnRef>
+            <a:fillRef idx="1">
+              <a:schemeClr val="accent1"/>
+            </a:fillRef>
+            <a:effectRef idx="0">
+              <a:schemeClr val="accent1"/>
+            </a:effectRef>
+            <a:fontRef idx="minor">
+              <a:schemeClr val="lt1"/>
+            </a:fontRef>
+          </p:style>
+          <p:txBody>
+            <a:bodyPr rtlCol="0" anchor="ctr"/>
+            <a:lstStyle/>
+            <a:p>
+              <a:pPr algn="ctr"/>
+              <a:r>
+                <a:rPr lang="en-AU" dirty="0"/>
+                <a:t>G</a:t>
+              </a:r>
+            </a:p>
+          </p:txBody>
+        </p:sp>
+        <p:sp>
+          <p:nvSpPr>
+            <p:cNvPr id="74" name="Rectangle: Rounded Corners 73">
+              <a:extLst>
+                <a:ext uri="{FF2B5EF4-FFF2-40B4-BE49-F238E27FC236}">
+                  <a16:creationId xmlns:a16="http://schemas.microsoft.com/office/drawing/2014/main" id="{22EDA9D4-472B-434A-A7D6-0D20F8058E42}"/>
+                </a:ext>
+              </a:extLst>
+            </p:cNvPr>
+            <p:cNvSpPr/>
+            <p:nvPr/>
+          </p:nvSpPr>
+          <p:spPr>
+            <a:xfrm>
+              <a:off x="9597875" y="1116089"/>
+              <a:ext cx="360000" cy="360000"/>
+            </a:xfrm>
+            <a:prstGeom prst="roundRect">
+              <a:avLst/>
+            </a:prstGeom>
+            <a:solidFill>
+              <a:srgbClr val="C00000"/>
+            </a:solidFill>
+            <a:ln>
+              <a:solidFill>
+                <a:schemeClr val="tx1"/>
+              </a:solidFill>
+            </a:ln>
+          </p:spPr>
+          <p:style>
+            <a:lnRef idx="2">
+              <a:schemeClr val="accent1">
+                <a:shade val="50000"/>
+              </a:schemeClr>
+            </a:lnRef>
+            <a:fillRef idx="1">
+              <a:schemeClr val="accent1"/>
+            </a:fillRef>
+            <a:effectRef idx="0">
+              <a:schemeClr val="accent1"/>
+            </a:effectRef>
+            <a:fontRef idx="minor">
+              <a:schemeClr val="lt1"/>
+            </a:fontRef>
+          </p:style>
+          <p:txBody>
+            <a:bodyPr rtlCol="0" anchor="ctr"/>
+            <a:lstStyle/>
+            <a:p>
+              <a:pPr algn="ctr"/>
+              <a:r>
+                <a:rPr lang="en-AU" dirty="0"/>
+                <a:t>R</a:t>
+              </a:r>
+            </a:p>
+          </p:txBody>
+        </p:sp>
+        <p:sp>
+          <p:nvSpPr>
+            <p:cNvPr id="76" name="TextBox 75">
+              <a:extLst>
+                <a:ext uri="{FF2B5EF4-FFF2-40B4-BE49-F238E27FC236}">
+                  <a16:creationId xmlns:a16="http://schemas.microsoft.com/office/drawing/2014/main" id="{0D303BDD-EDD9-418C-8FD6-84E8B22E048B}"/>
+                </a:ext>
+              </a:extLst>
+            </p:cNvPr>
+            <p:cNvSpPr txBox="1"/>
+            <p:nvPr/>
+          </p:nvSpPr>
+          <p:spPr>
+            <a:xfrm>
+              <a:off x="7675880" y="733229"/>
+              <a:ext cx="1400935" cy="1107996"/>
+            </a:xfrm>
+            <a:prstGeom prst="rect">
+              <a:avLst/>
+            </a:prstGeom>
+            <a:noFill/>
+          </p:spPr>
+          <p:txBody>
+            <a:bodyPr wrap="square" rtlCol="0">
+              <a:spAutoFit/>
+            </a:bodyPr>
+            <a:lstStyle/>
+            <a:p>
+              <a:pPr algn="r"/>
+              <a:r>
+                <a:rPr lang="en-AU" sz="2200" dirty="0"/>
+                <a:t>1</a:t>
+              </a:r>
+              <a:r>
+                <a:rPr lang="en-AU" sz="2200" baseline="30000" dirty="0"/>
+                <a:t>st</a:t>
+              </a:r>
+              <a:r>
+                <a:rPr lang="en-AU" sz="2200" dirty="0"/>
+                <a:t> factor</a:t>
+              </a:r>
+            </a:p>
+            <a:p>
+              <a:pPr algn="r"/>
+              <a:r>
+                <a:rPr lang="en-AU" sz="2200" dirty="0"/>
+                <a:t>2</a:t>
+              </a:r>
+              <a:r>
+                <a:rPr lang="en-AU" sz="2200" baseline="30000" dirty="0"/>
+                <a:t>nd</a:t>
+              </a:r>
+              <a:r>
+                <a:rPr lang="en-AU" sz="2200" dirty="0"/>
+                <a:t> factor</a:t>
+              </a:r>
+            </a:p>
+            <a:p>
+              <a:pPr algn="r"/>
+              <a:r>
+                <a:rPr lang="en-AU" sz="2200" dirty="0"/>
+                <a:t>3</a:t>
+              </a:r>
+              <a:r>
+                <a:rPr lang="en-AU" sz="2200" baseline="30000" dirty="0"/>
+                <a:t>rd</a:t>
+              </a:r>
+              <a:r>
+                <a:rPr lang="en-AU" sz="2200" dirty="0"/>
+                <a:t> factor</a:t>
+              </a:r>
+            </a:p>
+          </p:txBody>
+        </p:sp>
+        <p:sp>
+          <p:nvSpPr>
+            <p:cNvPr id="80" name="TextBox 79">
+              <a:extLst>
+                <a:ext uri="{FF2B5EF4-FFF2-40B4-BE49-F238E27FC236}">
+                  <a16:creationId xmlns:a16="http://schemas.microsoft.com/office/drawing/2014/main" id="{5C345D2A-8F5E-414E-B59C-D8BBF94738F1}"/>
+                </a:ext>
+              </a:extLst>
+            </p:cNvPr>
+            <p:cNvSpPr txBox="1"/>
+            <p:nvPr/>
+          </p:nvSpPr>
+          <p:spPr>
+            <a:xfrm>
+              <a:off x="7901661" y="266594"/>
+              <a:ext cx="4399151" cy="430887"/>
+            </a:xfrm>
+            <a:prstGeom prst="rect">
+              <a:avLst/>
+            </a:prstGeom>
+            <a:noFill/>
+          </p:spPr>
+          <p:txBody>
+            <a:bodyPr wrap="square" rtlCol="0">
+              <a:spAutoFit/>
+            </a:bodyPr>
+            <a:lstStyle/>
+            <a:p>
+              <a:r>
+                <a:rPr lang="en-AU" sz="2200" dirty="0"/>
+                <a:t>VC order     1,   2,   3,   4,   5,   6</a:t>
+              </a:r>
+            </a:p>
+          </p:txBody>
+        </p:sp>
+        <p:cxnSp>
+          <p:nvCxnSpPr>
+            <p:cNvPr id="82" name="Straight Connector 81">
+              <a:extLst>
+                <a:ext uri="{FF2B5EF4-FFF2-40B4-BE49-F238E27FC236}">
+                  <a16:creationId xmlns:a16="http://schemas.microsoft.com/office/drawing/2014/main" id="{13A95C91-AB38-46AB-BD46-6DD2F90BCC65}"/>
+                </a:ext>
+              </a:extLst>
+            </p:cNvPr>
+            <p:cNvCxnSpPr>
+              <a:cxnSpLocks/>
+            </p:cNvCxnSpPr>
+            <p:nvPr/>
+          </p:nvCxnSpPr>
+          <p:spPr>
+            <a:xfrm>
+              <a:off x="7901661" y="674824"/>
+              <a:ext cx="3658055" cy="0"/>
+            </a:xfrm>
+            <a:prstGeom prst="line">
+              <a:avLst/>
+            </a:prstGeom>
+            <a:ln w="28575">
+              <a:solidFill>
+                <a:schemeClr val="tx1"/>
+              </a:solidFill>
+            </a:ln>
+          </p:spPr>
+          <p:style>
+            <a:lnRef idx="1">
+              <a:schemeClr val="accent1"/>
+            </a:lnRef>
+            <a:fillRef idx="0">
+              <a:schemeClr val="accent1"/>
+            </a:fillRef>
+            <a:effectRef idx="0">
+              <a:schemeClr val="accent1"/>
+            </a:effectRef>
+            <a:fontRef idx="minor">
+              <a:schemeClr val="tx1"/>
+            </a:fontRef>
+          </p:style>
+        </p:cxnSp>
+        <p:cxnSp>
+          <p:nvCxnSpPr>
+            <p:cNvPr id="92" name="Straight Connector 91">
+              <a:extLst>
+                <a:ext uri="{FF2B5EF4-FFF2-40B4-BE49-F238E27FC236}">
+                  <a16:creationId xmlns:a16="http://schemas.microsoft.com/office/drawing/2014/main" id="{C3BE3117-2E59-4345-8BA3-8C4D57EF04D5}"/>
+                </a:ext>
+              </a:extLst>
+            </p:cNvPr>
+            <p:cNvCxnSpPr>
+              <a:cxnSpLocks/>
+            </p:cNvCxnSpPr>
+            <p:nvPr/>
+          </p:nvCxnSpPr>
+          <p:spPr>
+            <a:xfrm flipV="1">
+              <a:off x="9095740" y="400050"/>
+              <a:ext cx="0" cy="1466576"/>
+            </a:xfrm>
+            <a:prstGeom prst="line">
+              <a:avLst/>
+            </a:prstGeom>
+            <a:ln w="28575">
+              <a:solidFill>
+                <a:schemeClr val="tx1"/>
+              </a:solidFill>
+            </a:ln>
+          </p:spPr>
+          <p:style>
+            <a:lnRef idx="1">
+              <a:schemeClr val="accent1"/>
+            </a:lnRef>
+            <a:fillRef idx="0">
+              <a:schemeClr val="accent1"/>
+            </a:fillRef>
+            <a:effectRef idx="0">
+              <a:schemeClr val="accent1"/>
+            </a:effectRef>
+            <a:fontRef idx="minor">
+              <a:schemeClr val="tx1"/>
+            </a:fontRef>
+          </p:style>
+        </p:cxnSp>
+        <p:sp>
+          <p:nvSpPr>
+            <p:cNvPr id="93" name="Rectangle: Rounded Corners 92">
+              <a:extLst>
+                <a:ext uri="{FF2B5EF4-FFF2-40B4-BE49-F238E27FC236}">
+                  <a16:creationId xmlns:a16="http://schemas.microsoft.com/office/drawing/2014/main" id="{76D178BB-DE9E-45BC-BA4B-E54A892C8DBF}"/>
+                </a:ext>
+              </a:extLst>
+            </p:cNvPr>
+            <p:cNvSpPr/>
+            <p:nvPr/>
+          </p:nvSpPr>
+          <p:spPr>
+            <a:xfrm>
+              <a:off x="9198029" y="757918"/>
+              <a:ext cx="360000" cy="360000"/>
+            </a:xfrm>
+            <a:prstGeom prst="roundRect">
+              <a:avLst/>
+            </a:prstGeom>
+            <a:solidFill>
+              <a:srgbClr val="7030A0"/>
+            </a:solidFill>
+            <a:ln>
+              <a:solidFill>
+                <a:schemeClr val="tx1"/>
+              </a:solidFill>
+            </a:ln>
+          </p:spPr>
+          <p:style>
+            <a:lnRef idx="2">
+              <a:schemeClr val="accent2">
+                <a:shade val="50000"/>
+              </a:schemeClr>
+            </a:lnRef>
+            <a:fillRef idx="1">
+              <a:schemeClr val="accent2"/>
+            </a:fillRef>
+            <a:effectRef idx="0">
+              <a:schemeClr val="accent2"/>
+            </a:effectRef>
+            <a:fontRef idx="minor">
+              <a:schemeClr val="lt1"/>
+            </a:fontRef>
+          </p:style>
+          <p:txBody>
+            <a:bodyPr rtlCol="0" anchor="ctr"/>
+            <a:lstStyle/>
+            <a:p>
+              <a:pPr algn="ctr"/>
+              <a:r>
+                <a:rPr lang="en-AU" dirty="0"/>
+                <a:t>P</a:t>
+              </a:r>
+            </a:p>
+          </p:txBody>
+        </p:sp>
+        <p:sp>
+          <p:nvSpPr>
+            <p:cNvPr id="94" name="Rectangle: Rounded Corners 93">
+              <a:extLst>
+                <a:ext uri="{FF2B5EF4-FFF2-40B4-BE49-F238E27FC236}">
+                  <a16:creationId xmlns:a16="http://schemas.microsoft.com/office/drawing/2014/main" id="{E694C0DB-70AF-406E-89EE-04D87EFD4B70}"/>
+                </a:ext>
+              </a:extLst>
+            </p:cNvPr>
+            <p:cNvSpPr/>
+            <p:nvPr/>
+          </p:nvSpPr>
+          <p:spPr>
+            <a:xfrm>
+              <a:off x="9198029" y="1122263"/>
+              <a:ext cx="360000" cy="360000"/>
+            </a:xfrm>
+            <a:prstGeom prst="roundRect">
+              <a:avLst/>
+            </a:prstGeom>
+            <a:solidFill>
+              <a:schemeClr val="accent6">
+                <a:lumMod val="75000"/>
+              </a:schemeClr>
+            </a:solidFill>
+            <a:ln>
+              <a:solidFill>
+                <a:schemeClr val="tx1"/>
+              </a:solidFill>
+            </a:ln>
+          </p:spPr>
+          <p:style>
+            <a:lnRef idx="2">
+              <a:schemeClr val="accent1">
+                <a:shade val="50000"/>
+              </a:schemeClr>
+            </a:lnRef>
+            <a:fillRef idx="1">
+              <a:schemeClr val="accent1"/>
+            </a:fillRef>
+            <a:effectRef idx="0">
+              <a:schemeClr val="accent1"/>
+            </a:effectRef>
+            <a:fontRef idx="minor">
+              <a:schemeClr val="lt1"/>
+            </a:fontRef>
+          </p:style>
+          <p:txBody>
+            <a:bodyPr rtlCol="0" anchor="ctr"/>
+            <a:lstStyle/>
+            <a:p>
+              <a:pPr algn="ctr"/>
+              <a:r>
+                <a:rPr lang="en-AU" dirty="0"/>
+                <a:t>G</a:t>
+              </a:r>
+            </a:p>
+          </p:txBody>
+        </p:sp>
+        <p:sp>
+          <p:nvSpPr>
+            <p:cNvPr id="95" name="Rectangle: Rounded Corners 94">
+              <a:extLst>
+                <a:ext uri="{FF2B5EF4-FFF2-40B4-BE49-F238E27FC236}">
+                  <a16:creationId xmlns:a16="http://schemas.microsoft.com/office/drawing/2014/main" id="{0E28F308-7123-44A0-B852-405E7F8F6ED2}"/>
+                </a:ext>
+              </a:extLst>
+            </p:cNvPr>
+            <p:cNvSpPr/>
+            <p:nvPr/>
+          </p:nvSpPr>
+          <p:spPr>
+            <a:xfrm>
+              <a:off x="9198029" y="1485594"/>
+              <a:ext cx="360000" cy="360000"/>
+            </a:xfrm>
+            <a:prstGeom prst="roundRect">
+              <a:avLst/>
+            </a:prstGeom>
+            <a:solidFill>
+              <a:srgbClr val="C00000"/>
+            </a:solidFill>
+            <a:ln>
+              <a:solidFill>
+                <a:schemeClr val="tx1"/>
+              </a:solidFill>
+            </a:ln>
+          </p:spPr>
+          <p:style>
+            <a:lnRef idx="2">
+              <a:schemeClr val="accent1">
+                <a:shade val="50000"/>
+              </a:schemeClr>
+            </a:lnRef>
+            <a:fillRef idx="1">
+              <a:schemeClr val="accent1"/>
+            </a:fillRef>
+            <a:effectRef idx="0">
+              <a:schemeClr val="accent1"/>
+            </a:effectRef>
+            <a:fontRef idx="minor">
+              <a:schemeClr val="lt1"/>
+            </a:fontRef>
+          </p:style>
+          <p:txBody>
+            <a:bodyPr rtlCol="0" anchor="ctr"/>
+            <a:lstStyle/>
+            <a:p>
+              <a:pPr algn="ctr"/>
+              <a:r>
+                <a:rPr lang="en-AU" dirty="0"/>
+                <a:t>R</a:t>
+              </a:r>
+            </a:p>
+          </p:txBody>
+        </p:sp>
+        <p:sp>
+          <p:nvSpPr>
+            <p:cNvPr id="96" name="Rectangle: Rounded Corners 95">
+              <a:extLst>
+                <a:ext uri="{FF2B5EF4-FFF2-40B4-BE49-F238E27FC236}">
+                  <a16:creationId xmlns:a16="http://schemas.microsoft.com/office/drawing/2014/main" id="{8D2920F5-1191-4202-967A-817CF98A3D4E}"/>
+                </a:ext>
+              </a:extLst>
+            </p:cNvPr>
+            <p:cNvSpPr/>
+            <p:nvPr/>
+          </p:nvSpPr>
+          <p:spPr>
+            <a:xfrm>
+              <a:off x="9989502" y="1481225"/>
+              <a:ext cx="360000" cy="360000"/>
+            </a:xfrm>
+            <a:prstGeom prst="roundRect">
+              <a:avLst/>
+            </a:prstGeom>
+            <a:solidFill>
+              <a:srgbClr val="7030A0"/>
+            </a:solidFill>
+            <a:ln>
+              <a:solidFill>
+                <a:schemeClr val="tx1"/>
+              </a:solidFill>
+            </a:ln>
+          </p:spPr>
+          <p:style>
+            <a:lnRef idx="2">
+              <a:schemeClr val="accent2">
+                <a:shade val="50000"/>
+              </a:schemeClr>
+            </a:lnRef>
+            <a:fillRef idx="1">
+              <a:schemeClr val="accent2"/>
+            </a:fillRef>
+            <a:effectRef idx="0">
+              <a:schemeClr val="accent2"/>
+            </a:effectRef>
+            <a:fontRef idx="minor">
+              <a:schemeClr val="lt1"/>
+            </a:fontRef>
+          </p:style>
+          <p:txBody>
+            <a:bodyPr rtlCol="0" anchor="ctr"/>
+            <a:lstStyle/>
+            <a:p>
+              <a:pPr algn="ctr"/>
+              <a:r>
+                <a:rPr lang="en-AU" dirty="0"/>
+                <a:t>P</a:t>
+              </a:r>
+            </a:p>
+          </p:txBody>
+        </p:sp>
+        <p:sp>
+          <p:nvSpPr>
+            <p:cNvPr id="97" name="Rectangle: Rounded Corners 96">
+              <a:extLst>
+                <a:ext uri="{FF2B5EF4-FFF2-40B4-BE49-F238E27FC236}">
+                  <a16:creationId xmlns:a16="http://schemas.microsoft.com/office/drawing/2014/main" id="{14493439-3777-4562-9F07-94F31630212C}"/>
+                </a:ext>
+              </a:extLst>
+            </p:cNvPr>
+            <p:cNvSpPr/>
+            <p:nvPr/>
+          </p:nvSpPr>
+          <p:spPr>
+            <a:xfrm>
+              <a:off x="9989502" y="1120464"/>
+              <a:ext cx="360000" cy="360000"/>
+            </a:xfrm>
+            <a:prstGeom prst="roundRect">
+              <a:avLst/>
+            </a:prstGeom>
+            <a:solidFill>
+              <a:schemeClr val="accent6">
+                <a:lumMod val="75000"/>
+              </a:schemeClr>
+            </a:solidFill>
+            <a:ln>
+              <a:solidFill>
+                <a:schemeClr val="tx1"/>
+              </a:solidFill>
+            </a:ln>
+          </p:spPr>
+          <p:style>
+            <a:lnRef idx="2">
+              <a:schemeClr val="accent1">
+                <a:shade val="50000"/>
+              </a:schemeClr>
+            </a:lnRef>
+            <a:fillRef idx="1">
+              <a:schemeClr val="accent1"/>
+            </a:fillRef>
+            <a:effectRef idx="0">
+              <a:schemeClr val="accent1"/>
+            </a:effectRef>
+            <a:fontRef idx="minor">
+              <a:schemeClr val="lt1"/>
+            </a:fontRef>
+          </p:style>
+          <p:txBody>
+            <a:bodyPr rtlCol="0" anchor="ctr"/>
+            <a:lstStyle/>
+            <a:p>
+              <a:pPr algn="ctr"/>
+              <a:r>
+                <a:rPr lang="en-AU" dirty="0"/>
+                <a:t>G</a:t>
+              </a:r>
+            </a:p>
+          </p:txBody>
+        </p:sp>
+        <p:sp>
+          <p:nvSpPr>
+            <p:cNvPr id="98" name="Rectangle: Rounded Corners 97">
+              <a:extLst>
+                <a:ext uri="{FF2B5EF4-FFF2-40B4-BE49-F238E27FC236}">
+                  <a16:creationId xmlns:a16="http://schemas.microsoft.com/office/drawing/2014/main" id="{C2D6D27F-0E21-4921-A810-CC223BE0A4EA}"/>
+                </a:ext>
+              </a:extLst>
+            </p:cNvPr>
+            <p:cNvSpPr/>
+            <p:nvPr/>
+          </p:nvSpPr>
+          <p:spPr>
+            <a:xfrm>
+              <a:off x="9989502" y="761472"/>
+              <a:ext cx="360000" cy="360000"/>
+            </a:xfrm>
+            <a:prstGeom prst="roundRect">
+              <a:avLst/>
+            </a:prstGeom>
+            <a:solidFill>
+              <a:srgbClr val="C00000"/>
+            </a:solidFill>
+            <a:ln>
+              <a:solidFill>
+                <a:schemeClr val="tx1"/>
+              </a:solidFill>
+            </a:ln>
+          </p:spPr>
+          <p:style>
+            <a:lnRef idx="2">
+              <a:schemeClr val="accent1">
+                <a:shade val="50000"/>
+              </a:schemeClr>
+            </a:lnRef>
+            <a:fillRef idx="1">
+              <a:schemeClr val="accent1"/>
+            </a:fillRef>
+            <a:effectRef idx="0">
+              <a:schemeClr val="accent1"/>
+            </a:effectRef>
+            <a:fontRef idx="minor">
+              <a:schemeClr val="lt1"/>
+            </a:fontRef>
+          </p:style>
+          <p:txBody>
+            <a:bodyPr rtlCol="0" anchor="ctr"/>
+            <a:lstStyle/>
+            <a:p>
+              <a:pPr algn="ctr"/>
+              <a:r>
+                <a:rPr lang="en-AU" dirty="0"/>
+                <a:t>R</a:t>
+              </a:r>
+            </a:p>
+          </p:txBody>
+        </p:sp>
+        <p:sp>
+          <p:nvSpPr>
+            <p:cNvPr id="99" name="Rectangle: Rounded Corners 98">
+              <a:extLst>
+                <a:ext uri="{FF2B5EF4-FFF2-40B4-BE49-F238E27FC236}">
+                  <a16:creationId xmlns:a16="http://schemas.microsoft.com/office/drawing/2014/main" id="{4DA74F09-6282-47C7-8984-BBA41F54D00A}"/>
+                </a:ext>
+              </a:extLst>
+            </p:cNvPr>
+            <p:cNvSpPr/>
+            <p:nvPr/>
+          </p:nvSpPr>
+          <p:spPr>
+            <a:xfrm>
+              <a:off x="10391282" y="1118908"/>
+              <a:ext cx="360000" cy="360000"/>
+            </a:xfrm>
+            <a:prstGeom prst="roundRect">
+              <a:avLst/>
+            </a:prstGeom>
+            <a:solidFill>
+              <a:srgbClr val="7030A0"/>
+            </a:solidFill>
+            <a:ln>
+              <a:solidFill>
+                <a:schemeClr val="tx1"/>
+              </a:solidFill>
+            </a:ln>
+          </p:spPr>
+          <p:style>
+            <a:lnRef idx="2">
+              <a:schemeClr val="accent2">
+                <a:shade val="50000"/>
+              </a:schemeClr>
+            </a:lnRef>
+            <a:fillRef idx="1">
+              <a:schemeClr val="accent2"/>
+            </a:fillRef>
+            <a:effectRef idx="0">
+              <a:schemeClr val="accent2"/>
+            </a:effectRef>
+            <a:fontRef idx="minor">
+              <a:schemeClr val="lt1"/>
+            </a:fontRef>
+          </p:style>
+          <p:txBody>
+            <a:bodyPr rtlCol="0" anchor="ctr"/>
+            <a:lstStyle/>
+            <a:p>
+              <a:pPr algn="ctr"/>
+              <a:r>
+                <a:rPr lang="en-AU" dirty="0"/>
+                <a:t>P</a:t>
+              </a:r>
+            </a:p>
+          </p:txBody>
+        </p:sp>
+        <p:sp>
+          <p:nvSpPr>
+            <p:cNvPr id="100" name="Rectangle: Rounded Corners 99">
+              <a:extLst>
+                <a:ext uri="{FF2B5EF4-FFF2-40B4-BE49-F238E27FC236}">
+                  <a16:creationId xmlns:a16="http://schemas.microsoft.com/office/drawing/2014/main" id="{9766AB6C-6D04-45B5-AFCD-9004399D74F9}"/>
+                </a:ext>
+              </a:extLst>
+            </p:cNvPr>
+            <p:cNvSpPr/>
+            <p:nvPr/>
+          </p:nvSpPr>
+          <p:spPr>
+            <a:xfrm>
+              <a:off x="10391282" y="1477894"/>
+              <a:ext cx="360000" cy="360000"/>
+            </a:xfrm>
+            <a:prstGeom prst="roundRect">
+              <a:avLst/>
+            </a:prstGeom>
+            <a:solidFill>
+              <a:schemeClr val="accent6">
+                <a:lumMod val="75000"/>
+              </a:schemeClr>
+            </a:solidFill>
+            <a:ln>
+              <a:solidFill>
+                <a:schemeClr val="tx1"/>
+              </a:solidFill>
+            </a:ln>
+          </p:spPr>
+          <p:style>
+            <a:lnRef idx="2">
+              <a:schemeClr val="accent1">
+                <a:shade val="50000"/>
+              </a:schemeClr>
+            </a:lnRef>
+            <a:fillRef idx="1">
+              <a:schemeClr val="accent1"/>
+            </a:fillRef>
+            <a:effectRef idx="0">
+              <a:schemeClr val="accent1"/>
+            </a:effectRef>
+            <a:fontRef idx="minor">
+              <a:schemeClr val="lt1"/>
+            </a:fontRef>
+          </p:style>
+          <p:txBody>
+            <a:bodyPr rtlCol="0" anchor="ctr"/>
+            <a:lstStyle/>
+            <a:p>
+              <a:pPr algn="ctr"/>
+              <a:r>
+                <a:rPr lang="en-AU" dirty="0"/>
+                <a:t>G</a:t>
+              </a:r>
+            </a:p>
+          </p:txBody>
+        </p:sp>
+        <p:sp>
+          <p:nvSpPr>
+            <p:cNvPr id="102" name="Rectangle: Rounded Corners 101">
+              <a:extLst>
+                <a:ext uri="{FF2B5EF4-FFF2-40B4-BE49-F238E27FC236}">
+                  <a16:creationId xmlns:a16="http://schemas.microsoft.com/office/drawing/2014/main" id="{BE8E1113-DCE7-4536-8C63-40A3D327D8A0}"/>
+                </a:ext>
+              </a:extLst>
+            </p:cNvPr>
+            <p:cNvSpPr/>
+            <p:nvPr/>
+          </p:nvSpPr>
+          <p:spPr>
+            <a:xfrm>
+              <a:off x="10391282" y="758902"/>
+              <a:ext cx="360000" cy="360000"/>
+            </a:xfrm>
+            <a:prstGeom prst="roundRect">
+              <a:avLst/>
+            </a:prstGeom>
+            <a:solidFill>
+              <a:srgbClr val="C00000"/>
+            </a:solidFill>
+            <a:ln>
+              <a:solidFill>
+                <a:schemeClr val="tx1"/>
+              </a:solidFill>
+            </a:ln>
+          </p:spPr>
+          <p:style>
+            <a:lnRef idx="2">
+              <a:schemeClr val="accent1">
+                <a:shade val="50000"/>
+              </a:schemeClr>
+            </a:lnRef>
+            <a:fillRef idx="1">
+              <a:schemeClr val="accent1"/>
+            </a:fillRef>
+            <a:effectRef idx="0">
+              <a:schemeClr val="accent1"/>
+            </a:effectRef>
+            <a:fontRef idx="minor">
+              <a:schemeClr val="lt1"/>
+            </a:fontRef>
+          </p:style>
+          <p:txBody>
+            <a:bodyPr rtlCol="0" anchor="ctr"/>
+            <a:lstStyle/>
+            <a:p>
+              <a:pPr algn="ctr"/>
+              <a:r>
+                <a:rPr lang="en-AU" dirty="0"/>
+                <a:t>R</a:t>
+              </a:r>
+            </a:p>
+          </p:txBody>
+        </p:sp>
+        <p:sp>
+          <p:nvSpPr>
+            <p:cNvPr id="104" name="Rectangle: Rounded Corners 103">
+              <a:extLst>
+                <a:ext uri="{FF2B5EF4-FFF2-40B4-BE49-F238E27FC236}">
+                  <a16:creationId xmlns:a16="http://schemas.microsoft.com/office/drawing/2014/main" id="{5B8C86EC-238B-4F56-BC68-555DFDD361B6}"/>
+                </a:ext>
+              </a:extLst>
+            </p:cNvPr>
+            <p:cNvSpPr/>
+            <p:nvPr/>
+          </p:nvSpPr>
+          <p:spPr>
+            <a:xfrm>
+              <a:off x="10789506" y="1480470"/>
+              <a:ext cx="360000" cy="360000"/>
+            </a:xfrm>
+            <a:prstGeom prst="roundRect">
+              <a:avLst/>
+            </a:prstGeom>
+            <a:solidFill>
+              <a:srgbClr val="7030A0"/>
+            </a:solidFill>
+            <a:ln>
+              <a:solidFill>
+                <a:schemeClr val="tx1"/>
+              </a:solidFill>
+            </a:ln>
+          </p:spPr>
+          <p:style>
+            <a:lnRef idx="2">
+              <a:schemeClr val="accent2">
+                <a:shade val="50000"/>
+              </a:schemeClr>
+            </a:lnRef>
+            <a:fillRef idx="1">
+              <a:schemeClr val="accent2"/>
+            </a:fillRef>
+            <a:effectRef idx="0">
+              <a:schemeClr val="accent2"/>
+            </a:effectRef>
+            <a:fontRef idx="minor">
+              <a:schemeClr val="lt1"/>
+            </a:fontRef>
+          </p:style>
+          <p:txBody>
+            <a:bodyPr rtlCol="0" anchor="ctr"/>
+            <a:lstStyle/>
+            <a:p>
+              <a:pPr algn="ctr"/>
+              <a:r>
+                <a:rPr lang="en-AU" dirty="0"/>
+                <a:t>P</a:t>
+              </a:r>
+            </a:p>
+          </p:txBody>
+        </p:sp>
+        <p:sp>
+          <p:nvSpPr>
+            <p:cNvPr id="106" name="Rectangle: Rounded Corners 105">
+              <a:extLst>
+                <a:ext uri="{FF2B5EF4-FFF2-40B4-BE49-F238E27FC236}">
+                  <a16:creationId xmlns:a16="http://schemas.microsoft.com/office/drawing/2014/main" id="{A6CB31F5-96F1-4AA7-83DA-0AF3C5FC3550}"/>
+                </a:ext>
+              </a:extLst>
+            </p:cNvPr>
+            <p:cNvSpPr/>
+            <p:nvPr/>
+          </p:nvSpPr>
+          <p:spPr>
+            <a:xfrm>
+              <a:off x="10791712" y="760458"/>
+              <a:ext cx="360000" cy="360000"/>
+            </a:xfrm>
+            <a:prstGeom prst="roundRect">
+              <a:avLst/>
+            </a:prstGeom>
+            <a:solidFill>
+              <a:schemeClr val="accent6">
+                <a:lumMod val="75000"/>
+              </a:schemeClr>
+            </a:solidFill>
+            <a:ln>
+              <a:solidFill>
+                <a:schemeClr val="tx1"/>
+              </a:solidFill>
+            </a:ln>
+          </p:spPr>
+          <p:style>
+            <a:lnRef idx="2">
+              <a:schemeClr val="accent1">
+                <a:shade val="50000"/>
+              </a:schemeClr>
+            </a:lnRef>
+            <a:fillRef idx="1">
+              <a:schemeClr val="accent1"/>
+            </a:fillRef>
+            <a:effectRef idx="0">
+              <a:schemeClr val="accent1"/>
+            </a:effectRef>
+            <a:fontRef idx="minor">
+              <a:schemeClr val="lt1"/>
+            </a:fontRef>
+          </p:style>
+          <p:txBody>
+            <a:bodyPr rtlCol="0" anchor="ctr"/>
+            <a:lstStyle/>
+            <a:p>
+              <a:pPr algn="ctr"/>
+              <a:r>
+                <a:rPr lang="en-AU" dirty="0"/>
+                <a:t>G</a:t>
+              </a:r>
+            </a:p>
+          </p:txBody>
+        </p:sp>
+        <p:sp>
+          <p:nvSpPr>
+            <p:cNvPr id="107" name="Rectangle: Rounded Corners 106">
+              <a:extLst>
+                <a:ext uri="{FF2B5EF4-FFF2-40B4-BE49-F238E27FC236}">
+                  <a16:creationId xmlns:a16="http://schemas.microsoft.com/office/drawing/2014/main" id="{BA593EA8-8196-4F83-B3F4-A21D95921B46}"/>
+                </a:ext>
+              </a:extLst>
+            </p:cNvPr>
+            <p:cNvSpPr/>
+            <p:nvPr/>
+          </p:nvSpPr>
+          <p:spPr>
+            <a:xfrm>
+              <a:off x="10789506" y="1120464"/>
+              <a:ext cx="360000" cy="360000"/>
+            </a:xfrm>
+            <a:prstGeom prst="roundRect">
+              <a:avLst/>
+            </a:prstGeom>
+            <a:solidFill>
+              <a:srgbClr val="C00000"/>
+            </a:solidFill>
+            <a:ln>
+              <a:solidFill>
+                <a:schemeClr val="tx1"/>
+              </a:solidFill>
+            </a:ln>
+          </p:spPr>
+          <p:style>
+            <a:lnRef idx="2">
+              <a:schemeClr val="accent1">
+                <a:shade val="50000"/>
+              </a:schemeClr>
+            </a:lnRef>
+            <a:fillRef idx="1">
+              <a:schemeClr val="accent1"/>
+            </a:fillRef>
+            <a:effectRef idx="0">
+              <a:schemeClr val="accent1"/>
+            </a:effectRef>
+            <a:fontRef idx="minor">
+              <a:schemeClr val="lt1"/>
+            </a:fontRef>
+          </p:style>
+          <p:txBody>
+            <a:bodyPr rtlCol="0" anchor="ctr"/>
+            <a:lstStyle/>
+            <a:p>
+              <a:pPr algn="ctr"/>
+              <a:r>
+                <a:rPr lang="en-AU" dirty="0"/>
+                <a:t>R</a:t>
+              </a:r>
+            </a:p>
+          </p:txBody>
+        </p:sp>
+        <p:sp>
+          <p:nvSpPr>
+            <p:cNvPr id="111" name="Rectangle: Rounded Corners 110">
+              <a:extLst>
+                <a:ext uri="{FF2B5EF4-FFF2-40B4-BE49-F238E27FC236}">
+                  <a16:creationId xmlns:a16="http://schemas.microsoft.com/office/drawing/2014/main" id="{367C943A-10D9-47CC-B688-852A4708DA0C}"/>
+                </a:ext>
+              </a:extLst>
+            </p:cNvPr>
+            <p:cNvSpPr/>
+            <p:nvPr/>
+          </p:nvSpPr>
+          <p:spPr>
+            <a:xfrm>
+              <a:off x="11199716" y="1477930"/>
+              <a:ext cx="360000" cy="360000"/>
+            </a:xfrm>
+            <a:prstGeom prst="roundRect">
+              <a:avLst/>
+            </a:prstGeom>
+            <a:solidFill>
+              <a:srgbClr val="7030A0"/>
+            </a:solidFill>
+            <a:ln>
+              <a:solidFill>
+                <a:schemeClr val="tx1"/>
+              </a:solidFill>
+            </a:ln>
+          </p:spPr>
+          <p:style>
+            <a:lnRef idx="2">
+              <a:schemeClr val="accent2">
+                <a:shade val="50000"/>
+              </a:schemeClr>
+            </a:lnRef>
+            <a:fillRef idx="1">
+              <a:schemeClr val="accent2"/>
+            </a:fillRef>
+            <a:effectRef idx="0">
+              <a:schemeClr val="accent2"/>
+            </a:effectRef>
+            <a:fontRef idx="minor">
+              <a:schemeClr val="lt1"/>
+            </a:fontRef>
+          </p:style>
+          <p:txBody>
+            <a:bodyPr rtlCol="0" anchor="ctr"/>
+            <a:lstStyle/>
+            <a:p>
+              <a:pPr algn="ctr"/>
+              <a:r>
+                <a:rPr lang="en-AU" dirty="0"/>
+                <a:t>P</a:t>
+              </a:r>
+            </a:p>
+          </p:txBody>
+        </p:sp>
+        <p:sp>
+          <p:nvSpPr>
+            <p:cNvPr id="112" name="Rectangle: Rounded Corners 111">
+              <a:extLst>
+                <a:ext uri="{FF2B5EF4-FFF2-40B4-BE49-F238E27FC236}">
+                  <a16:creationId xmlns:a16="http://schemas.microsoft.com/office/drawing/2014/main" id="{6DF2D404-5653-4B2E-836F-D0D2020BFE08}"/>
+                </a:ext>
+              </a:extLst>
+            </p:cNvPr>
+            <p:cNvSpPr/>
+            <p:nvPr/>
+          </p:nvSpPr>
+          <p:spPr>
+            <a:xfrm>
+              <a:off x="11201922" y="757918"/>
+              <a:ext cx="360000" cy="360000"/>
+            </a:xfrm>
+            <a:prstGeom prst="roundRect">
+              <a:avLst/>
+            </a:prstGeom>
+            <a:solidFill>
+              <a:schemeClr val="accent6">
+                <a:lumMod val="75000"/>
+              </a:schemeClr>
+            </a:solidFill>
+            <a:ln>
+              <a:solidFill>
+                <a:schemeClr val="tx1"/>
+              </a:solidFill>
+            </a:ln>
+          </p:spPr>
+          <p:style>
+            <a:lnRef idx="2">
+              <a:schemeClr val="accent1">
+                <a:shade val="50000"/>
+              </a:schemeClr>
+            </a:lnRef>
+            <a:fillRef idx="1">
+              <a:schemeClr val="accent1"/>
+            </a:fillRef>
+            <a:effectRef idx="0">
+              <a:schemeClr val="accent1"/>
+            </a:effectRef>
+            <a:fontRef idx="minor">
+              <a:schemeClr val="lt1"/>
+            </a:fontRef>
+          </p:style>
+          <p:txBody>
+            <a:bodyPr rtlCol="0" anchor="ctr"/>
+            <a:lstStyle/>
+            <a:p>
+              <a:pPr algn="ctr"/>
+              <a:r>
+                <a:rPr lang="en-AU" dirty="0"/>
+                <a:t>G</a:t>
+              </a:r>
+            </a:p>
+          </p:txBody>
+        </p:sp>
+        <p:sp>
+          <p:nvSpPr>
+            <p:cNvPr id="113" name="Rectangle: Rounded Corners 112">
+              <a:extLst>
+                <a:ext uri="{FF2B5EF4-FFF2-40B4-BE49-F238E27FC236}">
+                  <a16:creationId xmlns:a16="http://schemas.microsoft.com/office/drawing/2014/main" id="{73FC06D7-12D8-45FB-B9C2-8E57A17CD603}"/>
+                </a:ext>
+              </a:extLst>
+            </p:cNvPr>
+            <p:cNvSpPr/>
+            <p:nvPr/>
+          </p:nvSpPr>
+          <p:spPr>
+            <a:xfrm>
+              <a:off x="11199716" y="1117924"/>
+              <a:ext cx="360000" cy="360000"/>
+            </a:xfrm>
+            <a:prstGeom prst="roundRect">
+              <a:avLst/>
+            </a:prstGeom>
+            <a:solidFill>
+              <a:srgbClr val="C00000"/>
+            </a:solidFill>
+            <a:ln>
+              <a:solidFill>
+                <a:schemeClr val="tx1"/>
+              </a:solidFill>
+            </a:ln>
+          </p:spPr>
+          <p:style>
+            <a:lnRef idx="2">
+              <a:schemeClr val="accent1">
+                <a:shade val="50000"/>
+              </a:schemeClr>
+            </a:lnRef>
+            <a:fillRef idx="1">
+              <a:schemeClr val="accent1"/>
+            </a:fillRef>
+            <a:effectRef idx="0">
+              <a:schemeClr val="accent1"/>
+            </a:effectRef>
+            <a:fontRef idx="minor">
+              <a:schemeClr val="lt1"/>
+            </a:fontRef>
+          </p:style>
+          <p:txBody>
+            <a:bodyPr rtlCol="0" anchor="ctr"/>
+            <a:lstStyle/>
+            <a:p>
+              <a:pPr algn="ctr"/>
+              <a:r>
+                <a:rPr lang="en-AU" dirty="0"/>
+                <a:t>R</a:t>
+              </a:r>
+            </a:p>
+          </p:txBody>
+        </p:sp>
+        <p:sp>
+          <p:nvSpPr>
+            <p:cNvPr id="126" name="Rectangle: Rounded Corners 125">
+              <a:extLst>
+                <a:ext uri="{FF2B5EF4-FFF2-40B4-BE49-F238E27FC236}">
+                  <a16:creationId xmlns:a16="http://schemas.microsoft.com/office/drawing/2014/main" id="{B88928B6-E9E6-4AD0-8785-5F00BD5AC109}"/>
+                </a:ext>
+              </a:extLst>
+            </p:cNvPr>
+            <p:cNvSpPr/>
+            <p:nvPr/>
+          </p:nvSpPr>
+          <p:spPr>
+            <a:xfrm>
+              <a:off x="9540369" y="277745"/>
+              <a:ext cx="477530" cy="1724183"/>
+            </a:xfrm>
+            <a:prstGeom prst="roundRect">
+              <a:avLst/>
+            </a:prstGeom>
+            <a:noFill/>
+            <a:ln w="28575">
+              <a:solidFill>
+                <a:srgbClr val="FF0000"/>
+              </a:solidFill>
+            </a:ln>
+          </p:spPr>
+          <p:style>
+            <a:lnRef idx="2">
+              <a:schemeClr val="accent1">
+                <a:shade val="50000"/>
+              </a:schemeClr>
+            </a:lnRef>
+            <a:fillRef idx="1">
+              <a:schemeClr val="accent1"/>
+            </a:fillRef>
+            <a:effectRef idx="0">
+              <a:schemeClr val="accent1"/>
+            </a:effectRef>
+            <a:fontRef idx="minor">
+              <a:schemeClr val="lt1"/>
+            </a:fontRef>
+          </p:style>
+          <p:txBody>
+            <a:bodyPr rtlCol="0" anchor="ctr"/>
+            <a:lstStyle/>
+            <a:p>
+              <a:pPr algn="ctr"/>
+              <a:endParaRPr lang="en-AU"/>
+            </a:p>
+          </p:txBody>
+        </p:sp>
+      </p:grpSp>
+      <p:grpSp>
+        <p:nvGrpSpPr>
+          <p:cNvPr id="167" name="Group 166">
+            <a:extLst>
+              <a:ext uri="{FF2B5EF4-FFF2-40B4-BE49-F238E27FC236}">
+                <a16:creationId xmlns:a16="http://schemas.microsoft.com/office/drawing/2014/main" id="{56BECDEE-CE30-469E-B836-6CD4D9F029CF}"/>
+              </a:ext>
+            </a:extLst>
+          </p:cNvPr>
+          <p:cNvGrpSpPr/>
+          <p:nvPr/>
+        </p:nvGrpSpPr>
+        <p:grpSpPr>
+          <a:xfrm>
+            <a:off x="6322224" y="6863694"/>
+            <a:ext cx="4399151" cy="1736108"/>
+            <a:chOff x="7294322" y="265820"/>
+            <a:chExt cx="4399151" cy="1736108"/>
+          </a:xfrm>
+        </p:grpSpPr>
+        <p:sp>
+          <p:nvSpPr>
+            <p:cNvPr id="168" name="Rectangle: Rounded Corners 167">
+              <a:extLst>
+                <a:ext uri="{FF2B5EF4-FFF2-40B4-BE49-F238E27FC236}">
+                  <a16:creationId xmlns:a16="http://schemas.microsoft.com/office/drawing/2014/main" id="{BFA3F284-108B-42D7-8DF5-B36D8EA004FD}"/>
+                </a:ext>
+              </a:extLst>
+            </p:cNvPr>
+            <p:cNvSpPr/>
+            <p:nvPr/>
+          </p:nvSpPr>
+          <p:spPr>
+            <a:xfrm>
+              <a:off x="9599258" y="761169"/>
+              <a:ext cx="360000" cy="360000"/>
+            </a:xfrm>
+            <a:prstGeom prst="roundRect">
+              <a:avLst/>
+            </a:prstGeom>
+            <a:solidFill>
+              <a:srgbClr val="7030A0"/>
+            </a:solidFill>
+            <a:ln>
+              <a:solidFill>
+                <a:schemeClr val="tx1"/>
+              </a:solidFill>
+            </a:ln>
+          </p:spPr>
+          <p:style>
+            <a:lnRef idx="2">
+              <a:schemeClr val="accent2">
+                <a:shade val="50000"/>
+              </a:schemeClr>
+            </a:lnRef>
+            <a:fillRef idx="1">
+              <a:schemeClr val="accent2"/>
+            </a:fillRef>
+            <a:effectRef idx="0">
+              <a:schemeClr val="accent2"/>
+            </a:effectRef>
+            <a:fontRef idx="minor">
+              <a:schemeClr val="lt1"/>
+            </a:fontRef>
+          </p:style>
+          <p:txBody>
+            <a:bodyPr rtlCol="0" anchor="ctr"/>
+            <a:lstStyle/>
+            <a:p>
+              <a:pPr algn="ctr"/>
+              <a:r>
+                <a:rPr lang="en-AU" dirty="0"/>
+                <a:t>P</a:t>
+              </a:r>
+            </a:p>
+          </p:txBody>
+        </p:sp>
+        <p:sp>
+          <p:nvSpPr>
+            <p:cNvPr id="169" name="Rectangle: Rounded Corners 168">
+              <a:extLst>
+                <a:ext uri="{FF2B5EF4-FFF2-40B4-BE49-F238E27FC236}">
+                  <a16:creationId xmlns:a16="http://schemas.microsoft.com/office/drawing/2014/main" id="{38359E3E-2C4E-4E88-8DF2-FB294FE0FE0B}"/>
+                </a:ext>
+              </a:extLst>
+            </p:cNvPr>
+            <p:cNvSpPr/>
+            <p:nvPr/>
+          </p:nvSpPr>
+          <p:spPr>
+            <a:xfrm>
+              <a:off x="9595715" y="1476089"/>
+              <a:ext cx="360000" cy="360000"/>
+            </a:xfrm>
+            <a:prstGeom prst="roundRect">
+              <a:avLst/>
+            </a:prstGeom>
+            <a:solidFill>
+              <a:schemeClr val="accent6">
+                <a:lumMod val="75000"/>
+              </a:schemeClr>
+            </a:solidFill>
+            <a:ln>
+              <a:solidFill>
+                <a:schemeClr val="tx1"/>
+              </a:solidFill>
+            </a:ln>
+          </p:spPr>
+          <p:style>
+            <a:lnRef idx="2">
+              <a:schemeClr val="accent1">
+                <a:shade val="50000"/>
+              </a:schemeClr>
+            </a:lnRef>
+            <a:fillRef idx="1">
+              <a:schemeClr val="accent1"/>
+            </a:fillRef>
+            <a:effectRef idx="0">
+              <a:schemeClr val="accent1"/>
+            </a:effectRef>
+            <a:fontRef idx="minor">
+              <a:schemeClr val="lt1"/>
+            </a:fontRef>
+          </p:style>
+          <p:txBody>
+            <a:bodyPr rtlCol="0" anchor="ctr"/>
+            <a:lstStyle/>
+            <a:p>
+              <a:pPr algn="ctr"/>
+              <a:r>
+                <a:rPr lang="en-AU" dirty="0"/>
+                <a:t>G</a:t>
+              </a:r>
+            </a:p>
+          </p:txBody>
+        </p:sp>
+        <p:sp>
+          <p:nvSpPr>
+            <p:cNvPr id="170" name="Rectangle: Rounded Corners 169">
+              <a:extLst>
+                <a:ext uri="{FF2B5EF4-FFF2-40B4-BE49-F238E27FC236}">
+                  <a16:creationId xmlns:a16="http://schemas.microsoft.com/office/drawing/2014/main" id="{68196747-F966-4FBF-86AA-9A351AA0D72C}"/>
+                </a:ext>
+              </a:extLst>
+            </p:cNvPr>
+            <p:cNvSpPr/>
+            <p:nvPr/>
+          </p:nvSpPr>
+          <p:spPr>
+            <a:xfrm>
+              <a:off x="9597875" y="1116089"/>
+              <a:ext cx="360000" cy="360000"/>
+            </a:xfrm>
+            <a:prstGeom prst="roundRect">
+              <a:avLst/>
+            </a:prstGeom>
+            <a:solidFill>
+              <a:srgbClr val="C00000"/>
+            </a:solidFill>
+            <a:ln>
+              <a:solidFill>
+                <a:schemeClr val="tx1"/>
+              </a:solidFill>
+            </a:ln>
+          </p:spPr>
+          <p:style>
+            <a:lnRef idx="2">
+              <a:schemeClr val="accent1">
+                <a:shade val="50000"/>
+              </a:schemeClr>
+            </a:lnRef>
+            <a:fillRef idx="1">
+              <a:schemeClr val="accent1"/>
+            </a:fillRef>
+            <a:effectRef idx="0">
+              <a:schemeClr val="accent1"/>
+            </a:effectRef>
+            <a:fontRef idx="minor">
+              <a:schemeClr val="lt1"/>
+            </a:fontRef>
+          </p:style>
+          <p:txBody>
+            <a:bodyPr rtlCol="0" anchor="ctr"/>
+            <a:lstStyle/>
+            <a:p>
+              <a:pPr algn="ctr"/>
+              <a:r>
+                <a:rPr lang="en-AU" dirty="0"/>
+                <a:t>R</a:t>
+              </a:r>
+            </a:p>
+          </p:txBody>
+        </p:sp>
+        <p:sp>
+          <p:nvSpPr>
+            <p:cNvPr id="171" name="TextBox 170">
+              <a:extLst>
+                <a:ext uri="{FF2B5EF4-FFF2-40B4-BE49-F238E27FC236}">
+                  <a16:creationId xmlns:a16="http://schemas.microsoft.com/office/drawing/2014/main" id="{83155D27-47DF-4BC5-8E42-42C5F34C6F81}"/>
+                </a:ext>
+              </a:extLst>
+            </p:cNvPr>
+            <p:cNvSpPr txBox="1"/>
+            <p:nvPr/>
+          </p:nvSpPr>
+          <p:spPr>
+            <a:xfrm>
+              <a:off x="7675880" y="733229"/>
+              <a:ext cx="1400935" cy="1107996"/>
+            </a:xfrm>
+            <a:prstGeom prst="rect">
+              <a:avLst/>
+            </a:prstGeom>
+            <a:noFill/>
+          </p:spPr>
+          <p:txBody>
+            <a:bodyPr wrap="square" rtlCol="0">
+              <a:spAutoFit/>
+            </a:bodyPr>
+            <a:lstStyle/>
+            <a:p>
+              <a:pPr algn="r"/>
+              <a:r>
+                <a:rPr lang="en-AU" sz="2200" dirty="0"/>
+                <a:t>1</a:t>
+              </a:r>
+              <a:r>
+                <a:rPr lang="en-AU" sz="2200" baseline="30000" dirty="0"/>
+                <a:t>st</a:t>
+              </a:r>
+              <a:r>
+                <a:rPr lang="en-AU" sz="2200" dirty="0"/>
+                <a:t> factor</a:t>
+              </a:r>
+            </a:p>
+            <a:p>
+              <a:pPr algn="r"/>
+              <a:r>
+                <a:rPr lang="en-AU" sz="2200" dirty="0"/>
+                <a:t>2</a:t>
+              </a:r>
+              <a:r>
+                <a:rPr lang="en-AU" sz="2200" baseline="30000" dirty="0"/>
+                <a:t>nd</a:t>
+              </a:r>
+              <a:r>
+                <a:rPr lang="en-AU" sz="2200" dirty="0"/>
+                <a:t> factor</a:t>
+              </a:r>
+            </a:p>
+            <a:p>
+              <a:pPr algn="r"/>
+              <a:r>
+                <a:rPr lang="en-AU" sz="2200" dirty="0"/>
+                <a:t>3</a:t>
+              </a:r>
+              <a:r>
+                <a:rPr lang="en-AU" sz="2200" baseline="30000" dirty="0"/>
+                <a:t>rd</a:t>
+              </a:r>
+              <a:r>
+                <a:rPr lang="en-AU" sz="2200" dirty="0"/>
+                <a:t> factor</a:t>
+              </a:r>
+            </a:p>
+          </p:txBody>
+        </p:sp>
+        <p:sp>
+          <p:nvSpPr>
+            <p:cNvPr id="172" name="TextBox 171">
+              <a:extLst>
+                <a:ext uri="{FF2B5EF4-FFF2-40B4-BE49-F238E27FC236}">
+                  <a16:creationId xmlns:a16="http://schemas.microsoft.com/office/drawing/2014/main" id="{3580CECD-5258-4A82-8218-E3EBC2FC8C67}"/>
+                </a:ext>
+              </a:extLst>
+            </p:cNvPr>
+            <p:cNvSpPr txBox="1"/>
+            <p:nvPr/>
+          </p:nvSpPr>
+          <p:spPr>
+            <a:xfrm>
+              <a:off x="7294322" y="265820"/>
+              <a:ext cx="4399151" cy="430887"/>
+            </a:xfrm>
+            <a:prstGeom prst="rect">
+              <a:avLst/>
+            </a:prstGeom>
+            <a:noFill/>
+          </p:spPr>
+          <p:txBody>
+            <a:bodyPr wrap="square" rtlCol="0">
+              <a:spAutoFit/>
+            </a:bodyPr>
+            <a:lstStyle/>
+            <a:p>
+              <a:r>
+                <a:rPr lang="en-AU" sz="2200" dirty="0"/>
+                <a:t>location order     1,   2,   3,   4,   5,   6</a:t>
+              </a:r>
+            </a:p>
+          </p:txBody>
+        </p:sp>
+        <p:cxnSp>
+          <p:nvCxnSpPr>
+            <p:cNvPr id="173" name="Straight Connector 172">
+              <a:extLst>
+                <a:ext uri="{FF2B5EF4-FFF2-40B4-BE49-F238E27FC236}">
+                  <a16:creationId xmlns:a16="http://schemas.microsoft.com/office/drawing/2014/main" id="{87E3EA91-0CD6-4008-B674-6E6D3F119B41}"/>
+                </a:ext>
+              </a:extLst>
+            </p:cNvPr>
+            <p:cNvCxnSpPr>
+              <a:cxnSpLocks/>
+            </p:cNvCxnSpPr>
+            <p:nvPr/>
+          </p:nvCxnSpPr>
+          <p:spPr>
+            <a:xfrm>
+              <a:off x="7334810" y="674824"/>
+              <a:ext cx="4224906" cy="0"/>
+            </a:xfrm>
+            <a:prstGeom prst="line">
+              <a:avLst/>
+            </a:prstGeom>
+            <a:ln w="28575">
+              <a:solidFill>
+                <a:schemeClr val="tx1"/>
+              </a:solidFill>
+            </a:ln>
+          </p:spPr>
+          <p:style>
+            <a:lnRef idx="1">
+              <a:schemeClr val="accent1"/>
+            </a:lnRef>
+            <a:fillRef idx="0">
+              <a:schemeClr val="accent1"/>
+            </a:fillRef>
+            <a:effectRef idx="0">
+              <a:schemeClr val="accent1"/>
+            </a:effectRef>
+            <a:fontRef idx="minor">
+              <a:schemeClr val="tx1"/>
+            </a:fontRef>
+          </p:style>
+        </p:cxnSp>
+        <p:cxnSp>
+          <p:nvCxnSpPr>
+            <p:cNvPr id="174" name="Straight Connector 173">
+              <a:extLst>
+                <a:ext uri="{FF2B5EF4-FFF2-40B4-BE49-F238E27FC236}">
+                  <a16:creationId xmlns:a16="http://schemas.microsoft.com/office/drawing/2014/main" id="{397968F3-0138-4B48-A7AC-60504F46DFD6}"/>
+                </a:ext>
+              </a:extLst>
+            </p:cNvPr>
+            <p:cNvCxnSpPr>
+              <a:cxnSpLocks/>
+            </p:cNvCxnSpPr>
+            <p:nvPr/>
+          </p:nvCxnSpPr>
+          <p:spPr>
+            <a:xfrm flipV="1">
+              <a:off x="9095740" y="400050"/>
+              <a:ext cx="0" cy="1466576"/>
+            </a:xfrm>
+            <a:prstGeom prst="line">
+              <a:avLst/>
+            </a:prstGeom>
+            <a:ln w="28575">
+              <a:solidFill>
+                <a:schemeClr val="tx1"/>
+              </a:solidFill>
+            </a:ln>
+          </p:spPr>
+          <p:style>
+            <a:lnRef idx="1">
+              <a:schemeClr val="accent1"/>
+            </a:lnRef>
+            <a:fillRef idx="0">
+              <a:schemeClr val="accent1"/>
+            </a:fillRef>
+            <a:effectRef idx="0">
+              <a:schemeClr val="accent1"/>
+            </a:effectRef>
+            <a:fontRef idx="minor">
+              <a:schemeClr val="tx1"/>
+            </a:fontRef>
+          </p:style>
+        </p:cxnSp>
+        <p:sp>
+          <p:nvSpPr>
+            <p:cNvPr id="175" name="Rectangle: Rounded Corners 174">
+              <a:extLst>
+                <a:ext uri="{FF2B5EF4-FFF2-40B4-BE49-F238E27FC236}">
+                  <a16:creationId xmlns:a16="http://schemas.microsoft.com/office/drawing/2014/main" id="{67A8D806-CE85-4D8A-B0DF-0B4003BF3EF8}"/>
+                </a:ext>
+              </a:extLst>
+            </p:cNvPr>
+            <p:cNvSpPr/>
+            <p:nvPr/>
+          </p:nvSpPr>
+          <p:spPr>
+            <a:xfrm>
+              <a:off x="9198029" y="757918"/>
+              <a:ext cx="360000" cy="360000"/>
+            </a:xfrm>
+            <a:prstGeom prst="roundRect">
+              <a:avLst/>
+            </a:prstGeom>
+            <a:solidFill>
+              <a:srgbClr val="7030A0"/>
+            </a:solidFill>
+            <a:ln>
+              <a:solidFill>
+                <a:schemeClr val="tx1"/>
+              </a:solidFill>
+            </a:ln>
+          </p:spPr>
+          <p:style>
+            <a:lnRef idx="2">
+              <a:schemeClr val="accent2">
+                <a:shade val="50000"/>
+              </a:schemeClr>
+            </a:lnRef>
+            <a:fillRef idx="1">
+              <a:schemeClr val="accent2"/>
+            </a:fillRef>
+            <a:effectRef idx="0">
+              <a:schemeClr val="accent2"/>
+            </a:effectRef>
+            <a:fontRef idx="minor">
+              <a:schemeClr val="lt1"/>
+            </a:fontRef>
+          </p:style>
+          <p:txBody>
+            <a:bodyPr rtlCol="0" anchor="ctr"/>
+            <a:lstStyle/>
+            <a:p>
+              <a:pPr algn="ctr"/>
+              <a:r>
+                <a:rPr lang="en-AU" dirty="0"/>
+                <a:t>P</a:t>
+              </a:r>
+            </a:p>
+          </p:txBody>
+        </p:sp>
+        <p:sp>
+          <p:nvSpPr>
+            <p:cNvPr id="176" name="Rectangle: Rounded Corners 175">
+              <a:extLst>
+                <a:ext uri="{FF2B5EF4-FFF2-40B4-BE49-F238E27FC236}">
+                  <a16:creationId xmlns:a16="http://schemas.microsoft.com/office/drawing/2014/main" id="{CE451274-671B-4BD8-94D7-4EC251491211}"/>
+                </a:ext>
+              </a:extLst>
+            </p:cNvPr>
+            <p:cNvSpPr/>
+            <p:nvPr/>
+          </p:nvSpPr>
+          <p:spPr>
+            <a:xfrm>
+              <a:off x="9198029" y="1122263"/>
+              <a:ext cx="360000" cy="360000"/>
+            </a:xfrm>
+            <a:prstGeom prst="roundRect">
+              <a:avLst/>
+            </a:prstGeom>
+            <a:solidFill>
+              <a:schemeClr val="accent6">
+                <a:lumMod val="75000"/>
+              </a:schemeClr>
+            </a:solidFill>
+            <a:ln>
+              <a:solidFill>
+                <a:schemeClr val="tx1"/>
+              </a:solidFill>
+            </a:ln>
+          </p:spPr>
+          <p:style>
+            <a:lnRef idx="2">
+              <a:schemeClr val="accent1">
+                <a:shade val="50000"/>
+              </a:schemeClr>
+            </a:lnRef>
+            <a:fillRef idx="1">
+              <a:schemeClr val="accent1"/>
+            </a:fillRef>
+            <a:effectRef idx="0">
+              <a:schemeClr val="accent1"/>
+            </a:effectRef>
+            <a:fontRef idx="minor">
+              <a:schemeClr val="lt1"/>
+            </a:fontRef>
+          </p:style>
+          <p:txBody>
+            <a:bodyPr rtlCol="0" anchor="ctr"/>
+            <a:lstStyle/>
+            <a:p>
+              <a:pPr algn="ctr"/>
+              <a:r>
+                <a:rPr lang="en-AU" dirty="0"/>
+                <a:t>G</a:t>
+              </a:r>
+            </a:p>
+          </p:txBody>
+        </p:sp>
+        <p:sp>
+          <p:nvSpPr>
+            <p:cNvPr id="177" name="Rectangle: Rounded Corners 176">
+              <a:extLst>
+                <a:ext uri="{FF2B5EF4-FFF2-40B4-BE49-F238E27FC236}">
+                  <a16:creationId xmlns:a16="http://schemas.microsoft.com/office/drawing/2014/main" id="{50FBA400-740F-46EE-A9EB-F7CA4A37F304}"/>
+                </a:ext>
+              </a:extLst>
+            </p:cNvPr>
+            <p:cNvSpPr/>
+            <p:nvPr/>
+          </p:nvSpPr>
+          <p:spPr>
+            <a:xfrm>
+              <a:off x="9198029" y="1485594"/>
+              <a:ext cx="360000" cy="360000"/>
+            </a:xfrm>
+            <a:prstGeom prst="roundRect">
+              <a:avLst/>
+            </a:prstGeom>
+            <a:solidFill>
+              <a:srgbClr val="C00000"/>
+            </a:solidFill>
+            <a:ln>
+              <a:solidFill>
+                <a:schemeClr val="tx1"/>
+              </a:solidFill>
+            </a:ln>
+          </p:spPr>
+          <p:style>
+            <a:lnRef idx="2">
+              <a:schemeClr val="accent1">
+                <a:shade val="50000"/>
+              </a:schemeClr>
+            </a:lnRef>
+            <a:fillRef idx="1">
+              <a:schemeClr val="accent1"/>
+            </a:fillRef>
+            <a:effectRef idx="0">
+              <a:schemeClr val="accent1"/>
+            </a:effectRef>
+            <a:fontRef idx="minor">
+              <a:schemeClr val="lt1"/>
+            </a:fontRef>
+          </p:style>
+          <p:txBody>
+            <a:bodyPr rtlCol="0" anchor="ctr"/>
+            <a:lstStyle/>
+            <a:p>
+              <a:pPr algn="ctr"/>
+              <a:r>
+                <a:rPr lang="en-AU" dirty="0"/>
+                <a:t>R</a:t>
+              </a:r>
+            </a:p>
+          </p:txBody>
+        </p:sp>
+        <p:sp>
+          <p:nvSpPr>
+            <p:cNvPr id="178" name="Rectangle: Rounded Corners 177">
+              <a:extLst>
+                <a:ext uri="{FF2B5EF4-FFF2-40B4-BE49-F238E27FC236}">
+                  <a16:creationId xmlns:a16="http://schemas.microsoft.com/office/drawing/2014/main" id="{60A4D041-AE34-4E4F-ACE9-07A9A475C1BC}"/>
+                </a:ext>
+              </a:extLst>
+            </p:cNvPr>
+            <p:cNvSpPr/>
+            <p:nvPr/>
+          </p:nvSpPr>
+          <p:spPr>
+            <a:xfrm>
+              <a:off x="9989502" y="1481225"/>
+              <a:ext cx="360000" cy="360000"/>
+            </a:xfrm>
+            <a:prstGeom prst="roundRect">
+              <a:avLst/>
+            </a:prstGeom>
+            <a:solidFill>
+              <a:srgbClr val="7030A0"/>
+            </a:solidFill>
+            <a:ln>
+              <a:solidFill>
+                <a:schemeClr val="tx1"/>
+              </a:solidFill>
+            </a:ln>
+          </p:spPr>
+          <p:style>
+            <a:lnRef idx="2">
+              <a:schemeClr val="accent2">
+                <a:shade val="50000"/>
+              </a:schemeClr>
+            </a:lnRef>
+            <a:fillRef idx="1">
+              <a:schemeClr val="accent2"/>
+            </a:fillRef>
+            <a:effectRef idx="0">
+              <a:schemeClr val="accent2"/>
+            </a:effectRef>
+            <a:fontRef idx="minor">
+              <a:schemeClr val="lt1"/>
+            </a:fontRef>
+          </p:style>
+          <p:txBody>
+            <a:bodyPr rtlCol="0" anchor="ctr"/>
+            <a:lstStyle/>
+            <a:p>
+              <a:pPr algn="ctr"/>
+              <a:r>
+                <a:rPr lang="en-AU" dirty="0"/>
+                <a:t>P</a:t>
+              </a:r>
+            </a:p>
+          </p:txBody>
+        </p:sp>
+        <p:sp>
+          <p:nvSpPr>
+            <p:cNvPr id="179" name="Rectangle: Rounded Corners 178">
+              <a:extLst>
+                <a:ext uri="{FF2B5EF4-FFF2-40B4-BE49-F238E27FC236}">
+                  <a16:creationId xmlns:a16="http://schemas.microsoft.com/office/drawing/2014/main" id="{A086EB62-A8CB-4725-A863-CD628D0E43E8}"/>
+                </a:ext>
+              </a:extLst>
+            </p:cNvPr>
+            <p:cNvSpPr/>
+            <p:nvPr/>
+          </p:nvSpPr>
+          <p:spPr>
+            <a:xfrm>
+              <a:off x="9989502" y="1120464"/>
+              <a:ext cx="360000" cy="360000"/>
+            </a:xfrm>
+            <a:prstGeom prst="roundRect">
+              <a:avLst/>
+            </a:prstGeom>
+            <a:solidFill>
+              <a:schemeClr val="accent6">
+                <a:lumMod val="75000"/>
+              </a:schemeClr>
+            </a:solidFill>
+            <a:ln>
+              <a:solidFill>
+                <a:schemeClr val="tx1"/>
+              </a:solidFill>
+            </a:ln>
+          </p:spPr>
+          <p:style>
+            <a:lnRef idx="2">
+              <a:schemeClr val="accent1">
+                <a:shade val="50000"/>
+              </a:schemeClr>
+            </a:lnRef>
+            <a:fillRef idx="1">
+              <a:schemeClr val="accent1"/>
+            </a:fillRef>
+            <a:effectRef idx="0">
+              <a:schemeClr val="accent1"/>
+            </a:effectRef>
+            <a:fontRef idx="minor">
+              <a:schemeClr val="lt1"/>
+            </a:fontRef>
+          </p:style>
+          <p:txBody>
+            <a:bodyPr rtlCol="0" anchor="ctr"/>
+            <a:lstStyle/>
+            <a:p>
+              <a:pPr algn="ctr"/>
+              <a:r>
+                <a:rPr lang="en-AU" dirty="0"/>
+                <a:t>G</a:t>
+              </a:r>
+            </a:p>
+          </p:txBody>
+        </p:sp>
+        <p:sp>
+          <p:nvSpPr>
+            <p:cNvPr id="180" name="Rectangle: Rounded Corners 179">
+              <a:extLst>
+                <a:ext uri="{FF2B5EF4-FFF2-40B4-BE49-F238E27FC236}">
+                  <a16:creationId xmlns:a16="http://schemas.microsoft.com/office/drawing/2014/main" id="{880820DB-B113-4B84-8F6D-58C111DA93F3}"/>
+                </a:ext>
+              </a:extLst>
+            </p:cNvPr>
+            <p:cNvSpPr/>
+            <p:nvPr/>
+          </p:nvSpPr>
+          <p:spPr>
+            <a:xfrm>
+              <a:off x="9989502" y="761472"/>
+              <a:ext cx="360000" cy="360000"/>
+            </a:xfrm>
+            <a:prstGeom prst="roundRect">
+              <a:avLst/>
+            </a:prstGeom>
+            <a:solidFill>
+              <a:srgbClr val="C00000"/>
+            </a:solidFill>
+            <a:ln>
+              <a:solidFill>
+                <a:schemeClr val="tx1"/>
+              </a:solidFill>
+            </a:ln>
+          </p:spPr>
+          <p:style>
+            <a:lnRef idx="2">
+              <a:schemeClr val="accent1">
+                <a:shade val="50000"/>
+              </a:schemeClr>
+            </a:lnRef>
+            <a:fillRef idx="1">
+              <a:schemeClr val="accent1"/>
+            </a:fillRef>
+            <a:effectRef idx="0">
+              <a:schemeClr val="accent1"/>
+            </a:effectRef>
+            <a:fontRef idx="minor">
+              <a:schemeClr val="lt1"/>
+            </a:fontRef>
+          </p:style>
+          <p:txBody>
+            <a:bodyPr rtlCol="0" anchor="ctr"/>
+            <a:lstStyle/>
+            <a:p>
+              <a:pPr algn="ctr"/>
+              <a:r>
+                <a:rPr lang="en-AU" dirty="0"/>
+                <a:t>R</a:t>
+              </a:r>
+            </a:p>
+          </p:txBody>
+        </p:sp>
+        <p:sp>
+          <p:nvSpPr>
+            <p:cNvPr id="181" name="Rectangle: Rounded Corners 180">
+              <a:extLst>
+                <a:ext uri="{FF2B5EF4-FFF2-40B4-BE49-F238E27FC236}">
+                  <a16:creationId xmlns:a16="http://schemas.microsoft.com/office/drawing/2014/main" id="{512CCA27-66BA-4453-996F-4C1936DCC146}"/>
+                </a:ext>
+              </a:extLst>
+            </p:cNvPr>
+            <p:cNvSpPr/>
+            <p:nvPr/>
+          </p:nvSpPr>
+          <p:spPr>
+            <a:xfrm>
+              <a:off x="10391282" y="1118908"/>
+              <a:ext cx="360000" cy="360000"/>
+            </a:xfrm>
+            <a:prstGeom prst="roundRect">
+              <a:avLst/>
+            </a:prstGeom>
+            <a:solidFill>
+              <a:srgbClr val="7030A0"/>
+            </a:solidFill>
+            <a:ln>
+              <a:solidFill>
+                <a:schemeClr val="tx1"/>
+              </a:solidFill>
+            </a:ln>
+          </p:spPr>
+          <p:style>
+            <a:lnRef idx="2">
+              <a:schemeClr val="accent2">
+                <a:shade val="50000"/>
+              </a:schemeClr>
+            </a:lnRef>
+            <a:fillRef idx="1">
+              <a:schemeClr val="accent2"/>
+            </a:fillRef>
+            <a:effectRef idx="0">
+              <a:schemeClr val="accent2"/>
+            </a:effectRef>
+            <a:fontRef idx="minor">
+              <a:schemeClr val="lt1"/>
+            </a:fontRef>
+          </p:style>
+          <p:txBody>
+            <a:bodyPr rtlCol="0" anchor="ctr"/>
+            <a:lstStyle/>
+            <a:p>
+              <a:pPr algn="ctr"/>
+              <a:r>
+                <a:rPr lang="en-AU" dirty="0"/>
+                <a:t>P</a:t>
+              </a:r>
+            </a:p>
+          </p:txBody>
+        </p:sp>
+        <p:sp>
+          <p:nvSpPr>
+            <p:cNvPr id="182" name="Rectangle: Rounded Corners 181">
+              <a:extLst>
+                <a:ext uri="{FF2B5EF4-FFF2-40B4-BE49-F238E27FC236}">
+                  <a16:creationId xmlns:a16="http://schemas.microsoft.com/office/drawing/2014/main" id="{64A8C62B-1F98-4328-A162-6E1FF9B5CADF}"/>
+                </a:ext>
+              </a:extLst>
+            </p:cNvPr>
+            <p:cNvSpPr/>
+            <p:nvPr/>
+          </p:nvSpPr>
+          <p:spPr>
+            <a:xfrm>
+              <a:off x="10391282" y="1477894"/>
+              <a:ext cx="360000" cy="360000"/>
+            </a:xfrm>
+            <a:prstGeom prst="roundRect">
+              <a:avLst/>
+            </a:prstGeom>
+            <a:solidFill>
+              <a:schemeClr val="accent6">
+                <a:lumMod val="75000"/>
+              </a:schemeClr>
+            </a:solidFill>
+            <a:ln>
+              <a:solidFill>
+                <a:schemeClr val="tx1"/>
+              </a:solidFill>
+            </a:ln>
+          </p:spPr>
+          <p:style>
+            <a:lnRef idx="2">
+              <a:schemeClr val="accent1">
+                <a:shade val="50000"/>
+              </a:schemeClr>
+            </a:lnRef>
+            <a:fillRef idx="1">
+              <a:schemeClr val="accent1"/>
+            </a:fillRef>
+            <a:effectRef idx="0">
+              <a:schemeClr val="accent1"/>
+            </a:effectRef>
+            <a:fontRef idx="minor">
+              <a:schemeClr val="lt1"/>
+            </a:fontRef>
+          </p:style>
+          <p:txBody>
+            <a:bodyPr rtlCol="0" anchor="ctr"/>
+            <a:lstStyle/>
+            <a:p>
+              <a:pPr algn="ctr"/>
+              <a:r>
+                <a:rPr lang="en-AU" dirty="0"/>
+                <a:t>G</a:t>
+              </a:r>
+            </a:p>
+          </p:txBody>
+        </p:sp>
+        <p:sp>
+          <p:nvSpPr>
+            <p:cNvPr id="183" name="Rectangle: Rounded Corners 182">
+              <a:extLst>
+                <a:ext uri="{FF2B5EF4-FFF2-40B4-BE49-F238E27FC236}">
+                  <a16:creationId xmlns:a16="http://schemas.microsoft.com/office/drawing/2014/main" id="{78BDC951-C669-4983-AA2D-D9723F7EFD8A}"/>
+                </a:ext>
+              </a:extLst>
+            </p:cNvPr>
+            <p:cNvSpPr/>
+            <p:nvPr/>
+          </p:nvSpPr>
+          <p:spPr>
+            <a:xfrm>
+              <a:off x="10391282" y="758902"/>
+              <a:ext cx="360000" cy="360000"/>
+            </a:xfrm>
+            <a:prstGeom prst="roundRect">
+              <a:avLst/>
+            </a:prstGeom>
+            <a:solidFill>
+              <a:srgbClr val="C00000"/>
+            </a:solidFill>
+            <a:ln>
+              <a:solidFill>
+                <a:schemeClr val="tx1"/>
+              </a:solidFill>
+            </a:ln>
+          </p:spPr>
+          <p:style>
+            <a:lnRef idx="2">
+              <a:schemeClr val="accent1">
+                <a:shade val="50000"/>
+              </a:schemeClr>
+            </a:lnRef>
+            <a:fillRef idx="1">
+              <a:schemeClr val="accent1"/>
+            </a:fillRef>
+            <a:effectRef idx="0">
+              <a:schemeClr val="accent1"/>
+            </a:effectRef>
+            <a:fontRef idx="minor">
+              <a:schemeClr val="lt1"/>
+            </a:fontRef>
+          </p:style>
+          <p:txBody>
+            <a:bodyPr rtlCol="0" anchor="ctr"/>
+            <a:lstStyle/>
+            <a:p>
+              <a:pPr algn="ctr"/>
+              <a:r>
+                <a:rPr lang="en-AU" dirty="0"/>
+                <a:t>R</a:t>
+              </a:r>
+            </a:p>
+          </p:txBody>
+        </p:sp>
+        <p:sp>
+          <p:nvSpPr>
+            <p:cNvPr id="184" name="Rectangle: Rounded Corners 183">
+              <a:extLst>
+                <a:ext uri="{FF2B5EF4-FFF2-40B4-BE49-F238E27FC236}">
+                  <a16:creationId xmlns:a16="http://schemas.microsoft.com/office/drawing/2014/main" id="{5D50B88B-6C06-4218-87D0-6F481A65C7CE}"/>
+                </a:ext>
+              </a:extLst>
+            </p:cNvPr>
+            <p:cNvSpPr/>
+            <p:nvPr/>
+          </p:nvSpPr>
+          <p:spPr>
+            <a:xfrm>
+              <a:off x="10789506" y="1480470"/>
+              <a:ext cx="360000" cy="360000"/>
+            </a:xfrm>
+            <a:prstGeom prst="roundRect">
+              <a:avLst/>
+            </a:prstGeom>
+            <a:solidFill>
+              <a:srgbClr val="7030A0"/>
+            </a:solidFill>
+            <a:ln>
+              <a:solidFill>
+                <a:schemeClr val="tx1"/>
+              </a:solidFill>
+            </a:ln>
+          </p:spPr>
+          <p:style>
+            <a:lnRef idx="2">
+              <a:schemeClr val="accent2">
+                <a:shade val="50000"/>
+              </a:schemeClr>
+            </a:lnRef>
+            <a:fillRef idx="1">
+              <a:schemeClr val="accent2"/>
+            </a:fillRef>
+            <a:effectRef idx="0">
+              <a:schemeClr val="accent2"/>
+            </a:effectRef>
+            <a:fontRef idx="minor">
+              <a:schemeClr val="lt1"/>
+            </a:fontRef>
+          </p:style>
+          <p:txBody>
+            <a:bodyPr rtlCol="0" anchor="ctr"/>
+            <a:lstStyle/>
+            <a:p>
+              <a:pPr algn="ctr"/>
+              <a:r>
+                <a:rPr lang="en-AU" dirty="0"/>
+                <a:t>P</a:t>
+              </a:r>
+            </a:p>
+          </p:txBody>
+        </p:sp>
+        <p:sp>
+          <p:nvSpPr>
+            <p:cNvPr id="185" name="Rectangle: Rounded Corners 184">
+              <a:extLst>
+                <a:ext uri="{FF2B5EF4-FFF2-40B4-BE49-F238E27FC236}">
+                  <a16:creationId xmlns:a16="http://schemas.microsoft.com/office/drawing/2014/main" id="{C2B69BC8-2CB1-43FA-9592-D9BCD90914DB}"/>
+                </a:ext>
+              </a:extLst>
+            </p:cNvPr>
+            <p:cNvSpPr/>
+            <p:nvPr/>
+          </p:nvSpPr>
+          <p:spPr>
+            <a:xfrm>
+              <a:off x="10791712" y="760458"/>
+              <a:ext cx="360000" cy="360000"/>
+            </a:xfrm>
+            <a:prstGeom prst="roundRect">
+              <a:avLst/>
+            </a:prstGeom>
+            <a:solidFill>
+              <a:schemeClr val="accent6">
+                <a:lumMod val="75000"/>
+              </a:schemeClr>
+            </a:solidFill>
+            <a:ln>
+              <a:solidFill>
+                <a:schemeClr val="tx1"/>
+              </a:solidFill>
+            </a:ln>
+          </p:spPr>
+          <p:style>
+            <a:lnRef idx="2">
+              <a:schemeClr val="accent1">
+                <a:shade val="50000"/>
+              </a:schemeClr>
+            </a:lnRef>
+            <a:fillRef idx="1">
+              <a:schemeClr val="accent1"/>
+            </a:fillRef>
+            <a:effectRef idx="0">
+              <a:schemeClr val="accent1"/>
+            </a:effectRef>
+            <a:fontRef idx="minor">
+              <a:schemeClr val="lt1"/>
+            </a:fontRef>
+          </p:style>
+          <p:txBody>
+            <a:bodyPr rtlCol="0" anchor="ctr"/>
+            <a:lstStyle/>
+            <a:p>
+              <a:pPr algn="ctr"/>
+              <a:r>
+                <a:rPr lang="en-AU" dirty="0"/>
+                <a:t>G</a:t>
+              </a:r>
+            </a:p>
+          </p:txBody>
+        </p:sp>
+        <p:sp>
+          <p:nvSpPr>
+            <p:cNvPr id="186" name="Rectangle: Rounded Corners 185">
+              <a:extLst>
+                <a:ext uri="{FF2B5EF4-FFF2-40B4-BE49-F238E27FC236}">
+                  <a16:creationId xmlns:a16="http://schemas.microsoft.com/office/drawing/2014/main" id="{EFD0B767-E32B-4FB5-9142-4F5E65C2D8C2}"/>
+                </a:ext>
+              </a:extLst>
+            </p:cNvPr>
+            <p:cNvSpPr/>
+            <p:nvPr/>
+          </p:nvSpPr>
+          <p:spPr>
+            <a:xfrm>
+              <a:off x="10789506" y="1120464"/>
+              <a:ext cx="360000" cy="360000"/>
+            </a:xfrm>
+            <a:prstGeom prst="roundRect">
+              <a:avLst/>
+            </a:prstGeom>
+            <a:solidFill>
+              <a:srgbClr val="C00000"/>
+            </a:solidFill>
+            <a:ln>
+              <a:solidFill>
+                <a:schemeClr val="tx1"/>
+              </a:solidFill>
+            </a:ln>
+          </p:spPr>
+          <p:style>
+            <a:lnRef idx="2">
+              <a:schemeClr val="accent1">
+                <a:shade val="50000"/>
+              </a:schemeClr>
+            </a:lnRef>
+            <a:fillRef idx="1">
+              <a:schemeClr val="accent1"/>
+            </a:fillRef>
+            <a:effectRef idx="0">
+              <a:schemeClr val="accent1"/>
+            </a:effectRef>
+            <a:fontRef idx="minor">
+              <a:schemeClr val="lt1"/>
+            </a:fontRef>
+          </p:style>
+          <p:txBody>
+            <a:bodyPr rtlCol="0" anchor="ctr"/>
+            <a:lstStyle/>
+            <a:p>
+              <a:pPr algn="ctr"/>
+              <a:r>
+                <a:rPr lang="en-AU" dirty="0"/>
+                <a:t>R</a:t>
+              </a:r>
+            </a:p>
+          </p:txBody>
+        </p:sp>
+        <p:sp>
+          <p:nvSpPr>
+            <p:cNvPr id="187" name="Rectangle: Rounded Corners 186">
+              <a:extLst>
+                <a:ext uri="{FF2B5EF4-FFF2-40B4-BE49-F238E27FC236}">
+                  <a16:creationId xmlns:a16="http://schemas.microsoft.com/office/drawing/2014/main" id="{847734A2-58CD-467E-BC65-9AAFBC76673C}"/>
+                </a:ext>
+              </a:extLst>
+            </p:cNvPr>
+            <p:cNvSpPr/>
+            <p:nvPr/>
+          </p:nvSpPr>
+          <p:spPr>
+            <a:xfrm>
+              <a:off x="11199716" y="1477930"/>
+              <a:ext cx="360000" cy="360000"/>
+            </a:xfrm>
+            <a:prstGeom prst="roundRect">
+              <a:avLst/>
+            </a:prstGeom>
+            <a:solidFill>
+              <a:srgbClr val="7030A0"/>
+            </a:solidFill>
+            <a:ln>
+              <a:solidFill>
+                <a:schemeClr val="tx1"/>
+              </a:solidFill>
+            </a:ln>
+          </p:spPr>
+          <p:style>
+            <a:lnRef idx="2">
+              <a:schemeClr val="accent2">
+                <a:shade val="50000"/>
+              </a:schemeClr>
+            </a:lnRef>
+            <a:fillRef idx="1">
+              <a:schemeClr val="accent2"/>
+            </a:fillRef>
+            <a:effectRef idx="0">
+              <a:schemeClr val="accent2"/>
+            </a:effectRef>
+            <a:fontRef idx="minor">
+              <a:schemeClr val="lt1"/>
+            </a:fontRef>
+          </p:style>
+          <p:txBody>
+            <a:bodyPr rtlCol="0" anchor="ctr"/>
+            <a:lstStyle/>
+            <a:p>
+              <a:pPr algn="ctr"/>
+              <a:r>
+                <a:rPr lang="en-AU" dirty="0"/>
+                <a:t>P</a:t>
+              </a:r>
+            </a:p>
+          </p:txBody>
+        </p:sp>
+        <p:sp>
+          <p:nvSpPr>
+            <p:cNvPr id="188" name="Rectangle: Rounded Corners 187">
+              <a:extLst>
+                <a:ext uri="{FF2B5EF4-FFF2-40B4-BE49-F238E27FC236}">
+                  <a16:creationId xmlns:a16="http://schemas.microsoft.com/office/drawing/2014/main" id="{DAB55048-1BFB-488F-8458-2C4975B1D365}"/>
+                </a:ext>
+              </a:extLst>
+            </p:cNvPr>
+            <p:cNvSpPr/>
+            <p:nvPr/>
+          </p:nvSpPr>
+          <p:spPr>
+            <a:xfrm>
+              <a:off x="11201922" y="757918"/>
+              <a:ext cx="360000" cy="360000"/>
+            </a:xfrm>
+            <a:prstGeom prst="roundRect">
+              <a:avLst/>
+            </a:prstGeom>
+            <a:solidFill>
+              <a:schemeClr val="accent6">
+                <a:lumMod val="75000"/>
+              </a:schemeClr>
+            </a:solidFill>
+            <a:ln>
+              <a:solidFill>
+                <a:schemeClr val="tx1"/>
+              </a:solidFill>
+            </a:ln>
+          </p:spPr>
+          <p:style>
+            <a:lnRef idx="2">
+              <a:schemeClr val="accent1">
+                <a:shade val="50000"/>
+              </a:schemeClr>
+            </a:lnRef>
+            <a:fillRef idx="1">
+              <a:schemeClr val="accent1"/>
+            </a:fillRef>
+            <a:effectRef idx="0">
+              <a:schemeClr val="accent1"/>
+            </a:effectRef>
+            <a:fontRef idx="minor">
+              <a:schemeClr val="lt1"/>
+            </a:fontRef>
+          </p:style>
+          <p:txBody>
+            <a:bodyPr rtlCol="0" anchor="ctr"/>
+            <a:lstStyle/>
+            <a:p>
+              <a:pPr algn="ctr"/>
+              <a:r>
+                <a:rPr lang="en-AU" dirty="0"/>
+                <a:t>G</a:t>
+              </a:r>
+            </a:p>
+          </p:txBody>
+        </p:sp>
+        <p:sp>
+          <p:nvSpPr>
+            <p:cNvPr id="189" name="Rectangle: Rounded Corners 188">
+              <a:extLst>
+                <a:ext uri="{FF2B5EF4-FFF2-40B4-BE49-F238E27FC236}">
+                  <a16:creationId xmlns:a16="http://schemas.microsoft.com/office/drawing/2014/main" id="{B3820E1F-A3FC-4C22-8667-E123AB633040}"/>
+                </a:ext>
+              </a:extLst>
+            </p:cNvPr>
+            <p:cNvSpPr/>
+            <p:nvPr/>
+          </p:nvSpPr>
+          <p:spPr>
+            <a:xfrm>
+              <a:off x="11199716" y="1117924"/>
+              <a:ext cx="360000" cy="360000"/>
+            </a:xfrm>
+            <a:prstGeom prst="roundRect">
+              <a:avLst/>
+            </a:prstGeom>
+            <a:solidFill>
+              <a:srgbClr val="C00000"/>
+            </a:solidFill>
+            <a:ln>
+              <a:solidFill>
+                <a:schemeClr val="tx1"/>
+              </a:solidFill>
+            </a:ln>
+          </p:spPr>
+          <p:style>
+            <a:lnRef idx="2">
+              <a:schemeClr val="accent1">
+                <a:shade val="50000"/>
+              </a:schemeClr>
+            </a:lnRef>
+            <a:fillRef idx="1">
+              <a:schemeClr val="accent1"/>
+            </a:fillRef>
+            <a:effectRef idx="0">
+              <a:schemeClr val="accent1"/>
+            </a:effectRef>
+            <a:fontRef idx="minor">
+              <a:schemeClr val="lt1"/>
+            </a:fontRef>
+          </p:style>
+          <p:txBody>
+            <a:bodyPr rtlCol="0" anchor="ctr"/>
+            <a:lstStyle/>
+            <a:p>
+              <a:pPr algn="ctr"/>
+              <a:r>
+                <a:rPr lang="en-AU" dirty="0"/>
+                <a:t>R</a:t>
+              </a:r>
+            </a:p>
+          </p:txBody>
+        </p:sp>
+        <p:sp>
+          <p:nvSpPr>
+            <p:cNvPr id="190" name="Rectangle: Rounded Corners 189">
+              <a:extLst>
+                <a:ext uri="{FF2B5EF4-FFF2-40B4-BE49-F238E27FC236}">
+                  <a16:creationId xmlns:a16="http://schemas.microsoft.com/office/drawing/2014/main" id="{3ECF51B9-E3B6-48B3-92FE-4945E04AFCE7}"/>
+                </a:ext>
+              </a:extLst>
+            </p:cNvPr>
+            <p:cNvSpPr/>
+            <p:nvPr/>
+          </p:nvSpPr>
+          <p:spPr>
+            <a:xfrm>
+              <a:off x="9540369" y="277745"/>
+              <a:ext cx="477530" cy="1724183"/>
+            </a:xfrm>
+            <a:prstGeom prst="roundRect">
+              <a:avLst/>
+            </a:prstGeom>
+            <a:noFill/>
+            <a:ln w="28575">
+              <a:solidFill>
+                <a:srgbClr val="FF0000"/>
+              </a:solidFill>
+            </a:ln>
+          </p:spPr>
+          <p:style>
+            <a:lnRef idx="2">
+              <a:schemeClr val="accent1">
+                <a:shade val="50000"/>
+              </a:schemeClr>
+            </a:lnRef>
+            <a:fillRef idx="1">
+              <a:schemeClr val="accent1"/>
+            </a:fillRef>
+            <a:effectRef idx="0">
+              <a:schemeClr val="accent1"/>
+            </a:effectRef>
+            <a:fontRef idx="minor">
+              <a:schemeClr val="lt1"/>
+            </a:fontRef>
+          </p:style>
+          <p:txBody>
+            <a:bodyPr rtlCol="0" anchor="ctr"/>
+            <a:lstStyle/>
+            <a:p>
+              <a:pPr algn="ctr"/>
+              <a:endParaRPr lang="en-AU"/>
+            </a:p>
+          </p:txBody>
+        </p:sp>
+      </p:grpSp>
     </p:spTree>
     <p:extLst>
       <p:ext uri="{BB962C8B-B14F-4D97-AF65-F5344CB8AC3E}">

</xml_diff>

<commit_message>
little clean up and planing
</commit_message>
<xml_diff>
--- a/paper/figures/Experimental design graphics.pptx
+++ b/paper/figures/Experimental design graphics.pptx
@@ -3428,7 +3428,7 @@
           <p:nvPr>
             <p:extLst>
               <p:ext uri="{D42A27DB-BD31-4B8C-83A1-F6EECF244321}">
-                <p14:modId xmlns:p14="http://schemas.microsoft.com/office/powerpoint/2010/main" val="3650666140"/>
+                <p14:modId xmlns:p14="http://schemas.microsoft.com/office/powerpoint/2010/main" val="2391761152"/>
               </p:ext>
             </p:extLst>
           </p:nvPr>
@@ -3822,9 +3822,10 @@
                         <a:defRPr/>
                       </a:pPr>
                       <a:r>
-                        <a:rPr lang="en-AU" b="0" dirty="0"/>
-                        <a:t>3</a:t>
-                      </a:r>
+                        <a:rPr lang="en-US" b="0" dirty="0"/>
+                        <a:t>6</a:t>
+                      </a:r>
+                      <a:endParaRPr lang="en-AU" b="0" dirty="0"/>
                     </a:p>
                   </a:txBody>
                   <a:tcPr>
@@ -4043,7 +4044,7 @@
                     <a:p>
                       <a:r>
                         <a:rPr lang="en-US" dirty="0"/>
-                        <a:t>Location</a:t>
+                        <a:t>Location </a:t>
                       </a:r>
                     </a:p>
                     <a:p>
@@ -4136,18 +4137,9 @@
                         <a:defRPr/>
                       </a:pPr>
                       <a:r>
-                        <a:rPr lang="en-US" b="0" dirty="0">
-                          <a:solidFill>
-                            <a:schemeClr val="tx1"/>
-                          </a:solidFill>
-                        </a:rPr>
-                        <a:t>Each participant receives 2 location values, one per factor task</a:t>
-                      </a:r>
-                      <a:endParaRPr lang="en-AU" b="0" dirty="0">
-                        <a:solidFill>
-                          <a:schemeClr val="tx1"/>
-                        </a:solidFill>
-                      </a:endParaRPr>
+                        <a:rPr lang="en-US" dirty="0"/>
+                        <a:t>Fixed order; period 1 is 1&amp;2, period 2 is 2&amp;3, period 3 is 3&amp;1</a:t>
+                      </a:r>
                     </a:p>
                   </a:txBody>
                   <a:tcPr>
@@ -4201,13 +4193,18 @@
                         <a:defRPr/>
                       </a:pPr>
                       <a:r>
-                        <a:rPr lang="en-AU" b="0" dirty="0">
+                        <a:rPr lang="en-US" b="0" dirty="0">
                           <a:solidFill>
                             <a:schemeClr val="tx1"/>
                           </a:solidFill>
                         </a:rPr>
-                        <a:t>6</a:t>
-                      </a:r>
+                        <a:t>3</a:t>
+                      </a:r>
+                      <a:endParaRPr lang="en-AU" b="0" dirty="0">
+                        <a:solidFill>
+                          <a:schemeClr val="tx1"/>
+                        </a:solidFill>
+                      </a:endParaRPr>
                     </a:p>
                   </a:txBody>
                   <a:tcPr>
@@ -4510,12 +4507,8 @@
                         <a:defRPr/>
                       </a:pPr>
                       <a:r>
-                        <a:rPr lang="en-US" b="0" dirty="0">
-                          <a:solidFill>
-                            <a:schemeClr val="tx1"/>
-                          </a:solidFill>
-                        </a:rPr>
-                        <a:t>Each participant receives 1 VC model</a:t>
+                        <a:rPr lang="en-US" b="0" i="0" dirty="0"/>
+                        <a:t>Fixed order; period 1 is EEE, period 2 is EEV, period 3 is banana</a:t>
                       </a:r>
                       <a:endParaRPr lang="en-AU" b="0" i="0" dirty="0"/>
                     </a:p>
@@ -4562,9 +4555,18 @@
                         <a:defRPr/>
                       </a:pPr>
                       <a:r>
-                        <a:rPr lang="en-AU" b="0" i="0" dirty="0"/>
-                        <a:t>3</a:t>
-                      </a:r>
+                        <a:rPr lang="en-US" b="0" i="0" dirty="0">
+                          <a:solidFill>
+                            <a:schemeClr val="tx1"/>
+                          </a:solidFill>
+                        </a:rPr>
+                        <a:t>1</a:t>
+                      </a:r>
+                      <a:endParaRPr lang="en-AU" b="1" i="1" dirty="0">
+                        <a:solidFill>
+                          <a:schemeClr val="tx1"/>
+                        </a:solidFill>
+                      </a:endParaRPr>
                     </a:p>
                   </a:txBody>
                   <a:tcPr>
@@ -4827,7 +4829,7 @@
                       </a:pPr>
                       <a:r>
                         <a:rPr lang="en-AU" dirty="0"/>
-                        <a:t>Fixed order, small then large within each factor</a:t>
+                        <a:t>Fixed order; small then large within each period</a:t>
                       </a:r>
                     </a:p>
                   </a:txBody>
@@ -7404,7 +7406,7 @@
         </p:nvSpPr>
         <p:spPr>
           <a:xfrm>
-            <a:off x="9304257" y="3341800"/>
+            <a:off x="9238268" y="4859704"/>
             <a:ext cx="2539712" cy="1200329"/>
           </a:xfrm>
           <a:prstGeom prst="rect">
@@ -11517,7 +11519,7 @@
                 </a:pPr>
                 <a:r>
                   <a:rPr lang="en-AU" sz="2200" dirty="0"/>
-                  <a:t>Solve which of the 56  permutations have the lowest count</a:t>
+                  <a:t>Solve which of the 56 permutations have the lowest count</a:t>
                 </a:r>
               </a:p>
               <a:p>
@@ -12953,14 +12955,14 @@
           <p:nvPr>
             <p:extLst>
               <p:ext uri="{D42A27DB-BD31-4B8C-83A1-F6EECF244321}">
-                <p14:modId xmlns:p14="http://schemas.microsoft.com/office/powerpoint/2010/main" val="1934742013"/>
+                <p14:modId xmlns:p14="http://schemas.microsoft.com/office/powerpoint/2010/main" val="4227205055"/>
               </p:ext>
             </p:extLst>
           </p:nvPr>
         </p:nvGraphicFramePr>
         <p:xfrm>
-          <a:off x="4885744" y="3372166"/>
-          <a:ext cx="7091999" cy="1613880"/>
+          <a:off x="4829432" y="2592372"/>
+          <a:ext cx="7091999" cy="2276820"/>
         </p:xfrm>
         <a:graphic>
           <a:graphicData uri="http://schemas.openxmlformats.org/drawingml/2006/table">
@@ -13201,6 +13203,257 @@
                     <a:p>
                       <a:pPr algn="l" fontAlgn="b"/>
                       <a:r>
+                        <a:rPr lang="en-AU" sz="1400" u="none" strike="noStrike" dirty="0">
+                          <a:effectLst/>
+                        </a:rPr>
+                        <a:t>Training</a:t>
+                      </a:r>
+                      <a:endParaRPr lang="en-AU" sz="1400" b="0" i="0" u="none" strike="noStrike" dirty="0">
+                        <a:solidFill>
+                          <a:srgbClr val="000000"/>
+                        </a:solidFill>
+                        <a:effectLst/>
+                        <a:latin typeface="Calibri" panose="020F0502020204030204" pitchFamily="34" charset="0"/>
+                      </a:endParaRPr>
+                    </a:p>
+                  </a:txBody>
+                  <a:tcPr marL="7620" marR="7620" marT="7620" marB="0" anchor="b">
+                    <a:solidFill>
+                      <a:schemeClr val="accent6">
+                        <a:lumMod val="40000"/>
+                        <a:lumOff val="60000"/>
+                      </a:schemeClr>
+                    </a:solidFill>
+                  </a:tcPr>
+                </a:tc>
+                <a:tc>
+                  <a:txBody>
+                    <a:bodyPr/>
+                    <a:lstStyle/>
+                    <a:p>
+                      <a:pPr algn="l" fontAlgn="b"/>
+                      <a:r>
+                        <a:rPr lang="en-AU" sz="1400" u="none" strike="noStrike" dirty="0">
+                          <a:effectLst/>
+                        </a:rPr>
+                        <a:t>R1</a:t>
+                      </a:r>
+                      <a:endParaRPr lang="en-AU" sz="1400" b="0" i="0" u="none" strike="noStrike" dirty="0">
+                        <a:solidFill>
+                          <a:srgbClr val="000000"/>
+                        </a:solidFill>
+                        <a:effectLst/>
+                        <a:latin typeface="Calibri" panose="020F0502020204030204" pitchFamily="34" charset="0"/>
+                      </a:endParaRPr>
+                    </a:p>
+                  </a:txBody>
+                  <a:tcPr marL="7620" marR="7620" marT="7620" marB="0" anchor="b">
+                    <a:solidFill>
+                      <a:schemeClr val="accent6">
+                        <a:lumMod val="40000"/>
+                        <a:lumOff val="60000"/>
+                      </a:schemeClr>
+                    </a:solidFill>
+                  </a:tcPr>
+                </a:tc>
+                <a:tc>
+                  <a:txBody>
+                    <a:bodyPr/>
+                    <a:lstStyle/>
+                    <a:p>
+                      <a:pPr algn="l" fontAlgn="b"/>
+                      <a:r>
+                        <a:rPr lang="en-US" sz="1400" b="0" i="1" u="none" strike="noStrike" dirty="0">
+                          <a:solidFill>
+                            <a:srgbClr val="000000"/>
+                          </a:solidFill>
+                          <a:effectLst/>
+                          <a:latin typeface="Calibri" panose="020F0502020204030204" pitchFamily="34" charset="0"/>
+                        </a:rPr>
+                        <a:t>Grand</a:t>
+                      </a:r>
+                      <a:endParaRPr lang="en-AU" sz="1400" b="0" i="1" u="none" strike="noStrike" dirty="0">
+                        <a:solidFill>
+                          <a:srgbClr val="000000"/>
+                        </a:solidFill>
+                        <a:effectLst/>
+                        <a:latin typeface="Calibri" panose="020F0502020204030204" pitchFamily="34" charset="0"/>
+                      </a:endParaRPr>
+                    </a:p>
+                  </a:txBody>
+                  <a:tcPr marL="7620" marR="7620" marT="7620" marB="0" anchor="b">
+                    <a:solidFill>
+                      <a:schemeClr val="accent6">
+                        <a:lumMod val="40000"/>
+                        <a:lumOff val="60000"/>
+                      </a:schemeClr>
+                    </a:solidFill>
+                  </a:tcPr>
+                </a:tc>
+                <a:tc>
+                  <a:txBody>
+                    <a:bodyPr/>
+                    <a:lstStyle/>
+                    <a:p>
+                      <a:pPr algn="l" fontAlgn="b"/>
+                      <a:r>
+                        <a:rPr lang="en-AU" sz="1400" u="none" strike="noStrike" dirty="0">
+                          <a:effectLst/>
+                        </a:rPr>
+                        <a:t>EEE</a:t>
+                      </a:r>
+                      <a:endParaRPr lang="en-AU" sz="1400" b="0" i="1" u="none" strike="noStrike" dirty="0">
+                        <a:solidFill>
+                          <a:srgbClr val="000000"/>
+                        </a:solidFill>
+                        <a:effectLst/>
+                        <a:latin typeface="Calibri" panose="020F0502020204030204" pitchFamily="34" charset="0"/>
+                      </a:endParaRPr>
+                    </a:p>
+                  </a:txBody>
+                  <a:tcPr marL="7620" marR="7620" marT="7620" marB="0" anchor="b">
+                    <a:solidFill>
+                      <a:schemeClr val="accent6">
+                        <a:lumMod val="40000"/>
+                        <a:lumOff val="60000"/>
+                      </a:schemeClr>
+                    </a:solidFill>
+                  </a:tcPr>
+                </a:tc>
+                <a:tc>
+                  <a:txBody>
+                    <a:bodyPr/>
+                    <a:lstStyle/>
+                    <a:p>
+                      <a:pPr algn="l" fontAlgn="b"/>
+                      <a:r>
+                        <a:rPr lang="en-AU" sz="1400" u="none" strike="noStrike" dirty="0">
+                          <a:effectLst/>
+                        </a:rPr>
+                        <a:t>4v (3cl)</a:t>
+                      </a:r>
+                      <a:endParaRPr lang="en-AU" sz="1400" b="0" i="0" u="none" strike="noStrike" dirty="0">
+                        <a:solidFill>
+                          <a:srgbClr val="000000"/>
+                        </a:solidFill>
+                        <a:effectLst/>
+                        <a:latin typeface="Calibri" panose="020F0502020204030204" pitchFamily="34" charset="0"/>
+                      </a:endParaRPr>
+                    </a:p>
+                  </a:txBody>
+                  <a:tcPr marL="7620" marR="7620" marT="7620" marB="0" anchor="b">
+                    <a:solidFill>
+                      <a:schemeClr val="accent6">
+                        <a:lumMod val="40000"/>
+                        <a:lumOff val="60000"/>
+                      </a:schemeClr>
+                    </a:solidFill>
+                  </a:tcPr>
+                </a:tc>
+                <a:tc>
+                  <a:txBody>
+                    <a:bodyPr/>
+                    <a:lstStyle/>
+                    <a:p>
+                      <a:pPr algn="l" fontAlgn="b"/>
+                      <a:r>
+                        <a:rPr lang="en-AU" sz="1400" u="none" strike="noStrike" dirty="0">
+                          <a:effectLst/>
+                        </a:rPr>
+                        <a:t>1_0</a:t>
+                      </a:r>
+                      <a:endParaRPr lang="en-AU" sz="1400" b="0" i="1" u="none" strike="noStrike" dirty="0">
+                        <a:solidFill>
+                          <a:srgbClr val="000000"/>
+                        </a:solidFill>
+                        <a:effectLst/>
+                        <a:latin typeface="Calibri" panose="020F0502020204030204" pitchFamily="34" charset="0"/>
+                      </a:endParaRPr>
+                    </a:p>
+                  </a:txBody>
+                  <a:tcPr marL="7620" marR="7620" marT="7620" marB="0" anchor="b">
+                    <a:solidFill>
+                      <a:schemeClr val="accent6">
+                        <a:lumMod val="40000"/>
+                        <a:lumOff val="60000"/>
+                      </a:schemeClr>
+                    </a:solidFill>
+                  </a:tcPr>
+                </a:tc>
+                <a:tc>
+                  <a:txBody>
+                    <a:bodyPr/>
+                    <a:lstStyle/>
+                    <a:p>
+                      <a:pPr algn="l" fontAlgn="b"/>
+                      <a:r>
+                        <a:rPr lang="en-AU" sz="1400" u="none" strike="noStrike" dirty="0">
+                          <a:effectLst/>
+                        </a:rPr>
+                        <a:t>EEE_p4_0_1_t1</a:t>
+                      </a:r>
+                      <a:endParaRPr lang="en-AU" sz="1400" b="0" i="0" u="none" strike="noStrike" dirty="0">
+                        <a:solidFill>
+                          <a:srgbClr val="000000"/>
+                        </a:solidFill>
+                        <a:effectLst/>
+                        <a:latin typeface="Calibri" panose="020F0502020204030204" pitchFamily="34" charset="0"/>
+                      </a:endParaRPr>
+                    </a:p>
+                  </a:txBody>
+                  <a:tcPr marL="7620" marR="7620" marT="7620" marB="0" anchor="b">
+                    <a:solidFill>
+                      <a:schemeClr val="accent6">
+                        <a:lumMod val="40000"/>
+                        <a:lumOff val="60000"/>
+                      </a:schemeClr>
+                    </a:solidFill>
+                  </a:tcPr>
+                </a:tc>
+                <a:tc>
+                  <a:txBody>
+                    <a:bodyPr/>
+                    <a:lstStyle/>
+                    <a:p>
+                      <a:pPr algn="l" fontAlgn="b"/>
+                      <a:r>
+                        <a:rPr lang="en-AU" sz="1400" u="none" strike="noStrike" dirty="0">
+                          <a:effectLst/>
+                        </a:rPr>
+                        <a:t>p4_path_t</a:t>
+                      </a:r>
+                      <a:endParaRPr lang="en-AU" sz="1400" b="0" i="0" u="none" strike="noStrike" dirty="0">
+                        <a:solidFill>
+                          <a:srgbClr val="000000"/>
+                        </a:solidFill>
+                        <a:effectLst/>
+                        <a:latin typeface="Calibri" panose="020F0502020204030204" pitchFamily="34" charset="0"/>
+                      </a:endParaRPr>
+                    </a:p>
+                  </a:txBody>
+                  <a:tcPr marL="7620" marR="7620" marT="7620" marB="0" anchor="b">
+                    <a:solidFill>
+                      <a:schemeClr val="accent6">
+                        <a:lumMod val="40000"/>
+                        <a:lumOff val="60000"/>
+                      </a:schemeClr>
+                    </a:solidFill>
+                  </a:tcPr>
+                </a:tc>
+                <a:extLst>
+                  <a:ext uri="{0D108BD9-81ED-4DB2-BD59-A6C34878D82A}">
+                    <a16:rowId xmlns:a16="http://schemas.microsoft.com/office/drawing/2014/main" val="3399423660"/>
+                  </a:ext>
+                </a:extLst>
+              </a:tr>
+              <a:tr h="0">
+                <a:tc>
+                  <a:txBody>
+                    <a:bodyPr/>
+                    <a:lstStyle/>
+                    <a:p>
+                      <a:pPr algn="l" fontAlgn="b"/>
+                      <a:r>
                         <a:rPr lang="en-AU" sz="1400" b="0" i="0" u="none" strike="noStrike" dirty="0">
                           <a:solidFill>
                             <a:srgbClr val="000000"/>
@@ -13268,7 +13521,7 @@
                           <a:effectLst/>
                           <a:latin typeface="Calibri" panose="020F0502020204030204" pitchFamily="34" charset="0"/>
                         </a:rPr>
-                        <a:t>EEE</a:t>
+                        <a:t>1</a:t>
                       </a:r>
                     </a:p>
                   </a:txBody>
@@ -13308,7 +13561,7 @@
                           <a:effectLst/>
                           <a:latin typeface="Calibri" panose="020F0502020204030204" pitchFamily="34" charset="0"/>
                         </a:rPr>
-                        <a:t>50_50</a:t>
+                        <a:t>1</a:t>
                       </a:r>
                     </a:p>
                   </a:txBody>
@@ -13435,7 +13688,7 @@
                           <a:effectLst/>
                           <a:latin typeface="Calibri" panose="020F0502020204030204" pitchFamily="34" charset="0"/>
                         </a:rPr>
-                        <a:t>Banana</a:t>
+                        <a:t>1</a:t>
                       </a:r>
                     </a:p>
                   </a:txBody>
@@ -13475,7 +13728,7 @@
                           <a:effectLst/>
                           <a:latin typeface="Calibri" panose="020F0502020204030204" pitchFamily="34" charset="0"/>
                         </a:rPr>
-                        <a:t>50_50</a:t>
+                        <a:t>2</a:t>
                       </a:r>
                     </a:p>
                   </a:txBody>
@@ -13567,161 +13820,11 @@
                     <a:p>
                       <a:pPr algn="l" fontAlgn="b"/>
                       <a:r>
-                        <a:rPr lang="en-AU" sz="1400" b="0" i="0" u="none" strike="noStrike" dirty="0">
-                          <a:solidFill>
-                            <a:srgbClr val="000000"/>
-                          </a:solidFill>
+                        <a:rPr lang="en-AU" sz="1400" u="none" strike="noStrike" dirty="0">
                           <a:effectLst/>
-                          <a:latin typeface="Calibri" panose="020F0502020204030204" pitchFamily="34" charset="0"/>
                         </a:rPr>
-                        <a:t>P2</a:t>
-                      </a:r>
-                    </a:p>
-                  </a:txBody>
-                  <a:tcPr marL="7620" marR="7620" marT="7620" marB="0" anchor="b"/>
-                </a:tc>
-                <a:tc>
-                  <a:txBody>
-                    <a:bodyPr/>
-                    <a:lstStyle/>
-                    <a:p>
-                      <a:pPr algn="l" fontAlgn="b"/>
-                      <a:r>
-                        <a:rPr lang="en-AU" sz="1400" b="0" i="0" u="none" strike="noStrike" dirty="0">
-                          <a:solidFill>
-                            <a:srgbClr val="000000"/>
-                          </a:solidFill>
-                          <a:effectLst/>
-                          <a:latin typeface="Calibri" panose="020F0502020204030204" pitchFamily="34" charset="0"/>
-                        </a:rPr>
-                        <a:t>R1</a:t>
-                      </a:r>
-                    </a:p>
-                  </a:txBody>
-                  <a:tcPr marL="7620" marR="7620" marT="7620" marB="0" anchor="b"/>
-                </a:tc>
-                <a:tc>
-                  <a:txBody>
-                    <a:bodyPr/>
-                    <a:lstStyle/>
-                    <a:p>
-                      <a:pPr algn="l" fontAlgn="b"/>
-                      <a:r>
-                        <a:rPr lang="en-AU" sz="1400" b="0" i="1" u="none" strike="noStrike" dirty="0">
-                          <a:solidFill>
-                            <a:srgbClr val="000000"/>
-                          </a:solidFill>
-                          <a:effectLst/>
-                          <a:latin typeface="Calibri" panose="020F0502020204030204" pitchFamily="34" charset="0"/>
-                        </a:rPr>
-                        <a:t>Radial</a:t>
-                      </a:r>
-                    </a:p>
-                  </a:txBody>
-                  <a:tcPr marL="7620" marR="7620" marT="7620" marB="0" anchor="b"/>
-                </a:tc>
-                <a:tc>
-                  <a:txBody>
-                    <a:bodyPr/>
-                    <a:lstStyle/>
-                    <a:p>
-                      <a:pPr algn="l" fontAlgn="b"/>
-                      <a:r>
-                        <a:rPr lang="en-AU" sz="1400" b="0" i="1" u="none" strike="noStrike" dirty="0">
-                          <a:solidFill>
-                            <a:srgbClr val="000000"/>
-                          </a:solidFill>
-                          <a:effectLst/>
-                          <a:latin typeface="Calibri" panose="020F0502020204030204" pitchFamily="34" charset="0"/>
-                        </a:rPr>
-                        <a:t>EEE</a:t>
-                      </a:r>
-                    </a:p>
-                  </a:txBody>
-                  <a:tcPr marL="7620" marR="7620" marT="7620" marB="0" anchor="b"/>
-                </a:tc>
-                <a:tc>
-                  <a:txBody>
-                    <a:bodyPr/>
-                    <a:lstStyle/>
-                    <a:p>
-                      <a:pPr algn="l" fontAlgn="b"/>
-                      <a:r>
-                        <a:rPr lang="en-AU" sz="1400" b="0" i="0" u="none" strike="noStrike" dirty="0">
-                          <a:solidFill>
-                            <a:srgbClr val="000000"/>
-                          </a:solidFill>
-                          <a:effectLst/>
-                          <a:latin typeface="Calibri" panose="020F0502020204030204" pitchFamily="34" charset="0"/>
-                        </a:rPr>
-                        <a:t>4v (3cl)</a:t>
-                      </a:r>
-                    </a:p>
-                  </a:txBody>
-                  <a:tcPr marL="7620" marR="7620" marT="7620" marB="0" anchor="b"/>
-                </a:tc>
-                <a:tc>
-                  <a:txBody>
-                    <a:bodyPr/>
-                    <a:lstStyle/>
-                    <a:p>
-                      <a:pPr algn="l" fontAlgn="b"/>
-                      <a:r>
-                        <a:rPr lang="en-AU" sz="1400" b="0" i="1" u="none" strike="noStrike" dirty="0">
-                          <a:solidFill>
-                            <a:srgbClr val="000000"/>
-                          </a:solidFill>
-                          <a:effectLst/>
-                          <a:latin typeface="Calibri" panose="020F0502020204030204" pitchFamily="34" charset="0"/>
-                        </a:rPr>
-                        <a:t>50_50</a:t>
-                      </a:r>
-                    </a:p>
-                  </a:txBody>
-                  <a:tcPr marL="7620" marR="7620" marT="7620" marB="0" anchor="b"/>
-                </a:tc>
-                <a:tc>
-                  <a:txBody>
-                    <a:bodyPr/>
-                    <a:lstStyle/>
-                    <a:p>
-                      <a:pPr marL="0" marR="0" lvl="0" indent="0" algn="l" defTabSz="914400" rtl="0" eaLnBrk="1" fontAlgn="b" latinLnBrk="0" hangingPunct="1">
-                        <a:lnSpc>
-                          <a:spcPct val="100000"/>
-                        </a:lnSpc>
-                        <a:spcBef>
-                          <a:spcPts val="0"/>
-                        </a:spcBef>
-                        <a:spcAft>
-                          <a:spcPts val="0"/>
-                        </a:spcAft>
-                        <a:buClrTx/>
-                        <a:buSzTx/>
-                        <a:buFontTx/>
-                        <a:buNone/>
-                        <a:tabLst/>
-                        <a:defRPr/>
-                      </a:pPr>
-                      <a:r>
-                        <a:rPr lang="en-AU" sz="1400" b="0" i="0" u="none" strike="noStrike" dirty="0">
-                          <a:solidFill>
-                            <a:srgbClr val="000000"/>
-                          </a:solidFill>
-                          <a:effectLst/>
-                          <a:latin typeface="Calibri" panose="020F0502020204030204" pitchFamily="34" charset="0"/>
-                        </a:rPr>
-                        <a:t>EEE_p4_50_50_sim2</a:t>
-                      </a:r>
-                    </a:p>
-                  </a:txBody>
-                  <a:tcPr marL="7620" marR="7620" marT="7620" marB="0" anchor="b"/>
-                </a:tc>
-                <a:tc>
-                  <a:txBody>
-                    <a:bodyPr/>
-                    <a:lstStyle/>
-                    <a:p>
-                      <a:pPr algn="l" fontAlgn="b"/>
+                        <a:t>Training</a:t>
+                      </a:r>
                       <a:endParaRPr lang="en-AU" sz="1400" b="0" i="0" u="none" strike="noStrike" dirty="0">
                         <a:solidFill>
                           <a:srgbClr val="000000"/>
@@ -13731,15 +13834,15 @@
                       </a:endParaRPr>
                     </a:p>
                   </a:txBody>
-                  <a:tcPr marL="7620" marR="7620" marT="7620" marB="0" anchor="b"/>
-                </a:tc>
-                <a:extLst>
-                  <a:ext uri="{0D108BD9-81ED-4DB2-BD59-A6C34878D82A}">
-                    <a16:rowId xmlns:a16="http://schemas.microsoft.com/office/drawing/2014/main" val="3775966952"/>
-                  </a:ext>
-                </a:extLst>
-              </a:tr>
-              <a:tr h="0">
+                  <a:tcPr marL="7620" marR="7620" marT="7620" marB="0" anchor="b">
+                    <a:solidFill>
+                      <a:schemeClr val="accent6">
+                        <a:lumMod val="40000"/>
+                        <a:lumOff val="60000"/>
+                      </a:schemeClr>
+                    </a:solidFill>
+                  </a:tcPr>
+                </a:tc>
                 <a:tc>
                   <a:txBody>
                     <a:bodyPr/>
@@ -13747,38 +13850,72 @@
                     <a:p>
                       <a:pPr algn="l" fontAlgn="b"/>
                       <a:r>
-                        <a:rPr lang="en-AU" sz="1400" b="0" i="0" u="none" strike="noStrike" dirty="0">
+                        <a:rPr lang="en-AU" sz="1400" u="none" strike="noStrike" dirty="0">
+                          <a:effectLst/>
+                        </a:rPr>
+                        <a:t>R2</a:t>
+                      </a:r>
+                      <a:endParaRPr lang="en-AU" sz="1400" b="0" i="0" u="none" strike="noStrike" dirty="0">
+                        <a:solidFill>
+                          <a:srgbClr val="000000"/>
+                        </a:solidFill>
+                        <a:effectLst/>
+                        <a:latin typeface="Calibri" panose="020F0502020204030204" pitchFamily="34" charset="0"/>
+                      </a:endParaRPr>
+                    </a:p>
+                  </a:txBody>
+                  <a:tcPr marL="7620" marR="7620" marT="7620" marB="0" anchor="b">
+                    <a:solidFill>
+                      <a:schemeClr val="accent6">
+                        <a:lumMod val="40000"/>
+                        <a:lumOff val="60000"/>
+                      </a:schemeClr>
+                    </a:solidFill>
+                  </a:tcPr>
+                </a:tc>
+                <a:tc>
+                  <a:txBody>
+                    <a:bodyPr/>
+                    <a:lstStyle/>
+                    <a:p>
+                      <a:pPr algn="l" fontAlgn="b"/>
+                      <a:r>
+                        <a:rPr lang="en-US" sz="1400" b="0" i="1" u="none" strike="noStrike" dirty="0">
                           <a:solidFill>
                             <a:srgbClr val="000000"/>
                           </a:solidFill>
                           <a:effectLst/>
                           <a:latin typeface="Calibri" panose="020F0502020204030204" pitchFamily="34" charset="0"/>
                         </a:rPr>
-                        <a:t>P2</a:t>
-                      </a:r>
-                    </a:p>
-                  </a:txBody>
-                  <a:tcPr marL="7620" marR="7620" marT="7620" marB="0" anchor="b"/>
-                </a:tc>
-                <a:tc>
-                  <a:txBody>
-                    <a:bodyPr/>
-                    <a:lstStyle/>
-                    <a:p>
-                      <a:pPr algn="l" fontAlgn="b"/>
-                      <a:r>
-                        <a:rPr lang="en-AU" sz="1400" b="0" i="0" u="none" strike="noStrike" dirty="0">
+                        <a:t>R</a:t>
+                      </a:r>
+                      <a:r>
+                        <a:rPr lang="en-AU" sz="1400" b="0" i="1" u="none" strike="noStrike" dirty="0" err="1">
                           <a:solidFill>
                             <a:srgbClr val="000000"/>
                           </a:solidFill>
                           <a:effectLst/>
                           <a:latin typeface="Calibri" panose="020F0502020204030204" pitchFamily="34" charset="0"/>
                         </a:rPr>
-                        <a:t>R2</a:t>
-                      </a:r>
-                    </a:p>
-                  </a:txBody>
-                  <a:tcPr marL="7620" marR="7620" marT="7620" marB="0" anchor="b"/>
+                        <a:t>adial</a:t>
+                      </a:r>
+                      <a:endParaRPr lang="en-AU" sz="1400" b="0" i="1" u="none" strike="noStrike" dirty="0">
+                        <a:solidFill>
+                          <a:srgbClr val="000000"/>
+                        </a:solidFill>
+                        <a:effectLst/>
+                        <a:latin typeface="Calibri" panose="020F0502020204030204" pitchFamily="34" charset="0"/>
+                      </a:endParaRPr>
+                    </a:p>
+                  </a:txBody>
+                  <a:tcPr marL="7620" marR="7620" marT="7620" marB="0" anchor="b">
+                    <a:solidFill>
+                      <a:schemeClr val="accent6">
+                        <a:lumMod val="40000"/>
+                        <a:lumOff val="60000"/>
+                      </a:schemeClr>
+                    </a:solidFill>
+                  </a:tcPr>
                 </a:tc>
                 <a:tc>
                   <a:txBody>
@@ -13787,18 +13924,28 @@
                     <a:p>
                       <a:pPr algn="l" fontAlgn="b"/>
                       <a:r>
-                        <a:rPr lang="en-AU" sz="1400" b="0" i="1" u="none" strike="noStrike" dirty="0">
-                          <a:solidFill>
-                            <a:srgbClr val="000000"/>
-                          </a:solidFill>
+                        <a:rPr lang="en-AU" sz="1400" u="none" strike="noStrike" dirty="0">
                           <a:effectLst/>
-                          <a:latin typeface="Calibri" panose="020F0502020204030204" pitchFamily="34" charset="0"/>
                         </a:rPr>
-                        <a:t>Radial</a:t>
-                      </a:r>
-                    </a:p>
-                  </a:txBody>
-                  <a:tcPr marL="7620" marR="7620" marT="7620" marB="0" anchor="b"/>
+                        <a:t>EEE</a:t>
+                      </a:r>
+                      <a:endParaRPr lang="en-AU" sz="1400" b="0" i="1" u="none" strike="noStrike" dirty="0">
+                        <a:solidFill>
+                          <a:srgbClr val="000000"/>
+                        </a:solidFill>
+                        <a:effectLst/>
+                        <a:latin typeface="Calibri" panose="020F0502020204030204" pitchFamily="34" charset="0"/>
+                      </a:endParaRPr>
+                    </a:p>
+                  </a:txBody>
+                  <a:tcPr marL="7620" marR="7620" marT="7620" marB="0" anchor="b">
+                    <a:solidFill>
+                      <a:schemeClr val="accent6">
+                        <a:lumMod val="40000"/>
+                        <a:lumOff val="60000"/>
+                      </a:schemeClr>
+                    </a:solidFill>
+                  </a:tcPr>
                 </a:tc>
                 <a:tc>
                   <a:txBody>
@@ -13807,18 +13954,28 @@
                     <a:p>
                       <a:pPr algn="l" fontAlgn="b"/>
                       <a:r>
-                        <a:rPr lang="en-AU" sz="1400" b="0" i="1" u="none" strike="noStrike" dirty="0">
-                          <a:solidFill>
-                            <a:srgbClr val="000000"/>
-                          </a:solidFill>
+                        <a:rPr lang="en-AU" sz="1400" u="none" strike="noStrike" dirty="0">
                           <a:effectLst/>
-                          <a:latin typeface="Calibri" panose="020F0502020204030204" pitchFamily="34" charset="0"/>
                         </a:rPr>
-                        <a:t>Banana</a:t>
-                      </a:r>
-                    </a:p>
-                  </a:txBody>
-                  <a:tcPr marL="7620" marR="7620" marT="7620" marB="0" anchor="b"/>
+                        <a:t>4v (3cl)</a:t>
+                      </a:r>
+                      <a:endParaRPr lang="en-AU" sz="1400" b="0" i="0" u="none" strike="noStrike" dirty="0">
+                        <a:solidFill>
+                          <a:srgbClr val="000000"/>
+                        </a:solidFill>
+                        <a:effectLst/>
+                        <a:latin typeface="Calibri" panose="020F0502020204030204" pitchFamily="34" charset="0"/>
+                      </a:endParaRPr>
+                    </a:p>
+                  </a:txBody>
+                  <a:tcPr marL="7620" marR="7620" marT="7620" marB="0" anchor="b">
+                    <a:solidFill>
+                      <a:schemeClr val="accent6">
+                        <a:lumMod val="40000"/>
+                        <a:lumOff val="60000"/>
+                      </a:schemeClr>
+                    </a:solidFill>
+                  </a:tcPr>
                 </a:tc>
                 <a:tc>
                   <a:txBody>
@@ -13827,18 +13984,28 @@
                     <a:p>
                       <a:pPr algn="l" fontAlgn="b"/>
                       <a:r>
-                        <a:rPr lang="en-AU" sz="1400" b="0" i="0" u="none" strike="noStrike" dirty="0">
-                          <a:solidFill>
-                            <a:srgbClr val="000000"/>
-                          </a:solidFill>
+                        <a:rPr lang="en-AU" sz="1400" u="none" strike="noStrike" dirty="0">
                           <a:effectLst/>
-                          <a:latin typeface="Calibri" panose="020F0502020204030204" pitchFamily="34" charset="0"/>
                         </a:rPr>
-                        <a:t>6v in (4cl)</a:t>
-                      </a:r>
-                    </a:p>
-                  </a:txBody>
-                  <a:tcPr marL="7620" marR="7620" marT="7620" marB="0" anchor="b"/>
+                        <a:t>1_0</a:t>
+                      </a:r>
+                      <a:endParaRPr lang="en-AU" sz="1400" b="0" i="1" u="none" strike="noStrike" dirty="0">
+                        <a:solidFill>
+                          <a:srgbClr val="000000"/>
+                        </a:solidFill>
+                        <a:effectLst/>
+                        <a:latin typeface="Calibri" panose="020F0502020204030204" pitchFamily="34" charset="0"/>
+                      </a:endParaRPr>
+                    </a:p>
+                  </a:txBody>
+                  <a:tcPr marL="7620" marR="7620" marT="7620" marB="0" anchor="b">
+                    <a:solidFill>
+                      <a:schemeClr val="accent6">
+                        <a:lumMod val="40000"/>
+                        <a:lumOff val="60000"/>
+                      </a:schemeClr>
+                    </a:solidFill>
+                  </a:tcPr>
                 </a:tc>
                 <a:tc>
                   <a:txBody>
@@ -13847,54 +14014,28 @@
                     <a:p>
                       <a:pPr algn="l" fontAlgn="b"/>
                       <a:r>
-                        <a:rPr lang="en-AU" sz="1400" b="0" i="1" u="none" strike="noStrike" dirty="0">
-                          <a:solidFill>
-                            <a:srgbClr val="000000"/>
-                          </a:solidFill>
+                        <a:rPr lang="en-AU" sz="1400" u="none" strike="noStrike" dirty="0">
                           <a:effectLst/>
-                          <a:latin typeface="Calibri" panose="020F0502020204030204" pitchFamily="34" charset="0"/>
                         </a:rPr>
-                        <a:t>50_50</a:t>
-                      </a:r>
-                    </a:p>
-                  </a:txBody>
-                  <a:tcPr marL="7620" marR="7620" marT="7620" marB="0" anchor="b"/>
-                </a:tc>
-                <a:tc>
-                  <a:txBody>
-                    <a:bodyPr/>
-                    <a:lstStyle/>
-                    <a:p>
-                      <a:pPr marL="0" marR="0" lvl="0" indent="0" algn="l" defTabSz="914400" rtl="0" eaLnBrk="1" fontAlgn="b" latinLnBrk="0" hangingPunct="1">
-                        <a:lnSpc>
-                          <a:spcPct val="100000"/>
-                        </a:lnSpc>
-                        <a:spcBef>
-                          <a:spcPts val="0"/>
-                        </a:spcBef>
-                        <a:spcAft>
-                          <a:spcPts val="0"/>
-                        </a:spcAft>
-                        <a:buClrTx/>
-                        <a:buSzTx/>
-                        <a:buFontTx/>
-                        <a:buNone/>
-                        <a:tabLst/>
-                        <a:defRPr/>
-                      </a:pPr>
-                      <a:r>
-                        <a:rPr lang="en-AU" sz="1400" b="0" i="0" u="none" strike="noStrike" dirty="0">
-                          <a:solidFill>
-                            <a:srgbClr val="000000"/>
-                          </a:solidFill>
-                          <a:effectLst/>
-                          <a:latin typeface="Calibri" panose="020F0502020204030204" pitchFamily="34" charset="0"/>
-                        </a:rPr>
-                        <a:t>banana_p6_50_50_sim1</a:t>
-                      </a:r>
-                    </a:p>
-                  </a:txBody>
-                  <a:tcPr marL="7620" marR="7620" marT="7620" marB="0" anchor="b"/>
+                        <a:t>EEE_p4_0_1_t2</a:t>
+                      </a:r>
+                      <a:endParaRPr lang="en-AU" sz="1400" b="0" i="0" u="none" strike="noStrike" dirty="0">
+                        <a:solidFill>
+                          <a:srgbClr val="000000"/>
+                        </a:solidFill>
+                        <a:effectLst/>
+                        <a:latin typeface="Calibri" panose="020F0502020204030204" pitchFamily="34" charset="0"/>
+                      </a:endParaRPr>
+                    </a:p>
+                  </a:txBody>
+                  <a:tcPr marL="7620" marR="7620" marT="7620" marB="0" anchor="b">
+                    <a:solidFill>
+                      <a:schemeClr val="accent6">
+                        <a:lumMod val="40000"/>
+                        <a:lumOff val="60000"/>
+                      </a:schemeClr>
+                    </a:solidFill>
+                  </a:tcPr>
                 </a:tc>
                 <a:tc>
                   <a:txBody>
@@ -13927,11 +14068,18 @@
                       </a:endParaRPr>
                     </a:p>
                   </a:txBody>
-                  <a:tcPr marL="7620" marR="7620" marT="7620" marB="0" anchor="b"/>
+                  <a:tcPr marL="7620" marR="7620" marT="7620" marB="0" anchor="b">
+                    <a:solidFill>
+                      <a:schemeClr val="accent6">
+                        <a:lumMod val="40000"/>
+                        <a:lumOff val="60000"/>
+                      </a:schemeClr>
+                    </a:solidFill>
+                  </a:tcPr>
                 </a:tc>
                 <a:extLst>
                   <a:ext uri="{0D108BD9-81ED-4DB2-BD59-A6C34878D82A}">
-                    <a16:rowId xmlns:a16="http://schemas.microsoft.com/office/drawing/2014/main" val="2638294684"/>
+                    <a16:rowId xmlns:a16="http://schemas.microsoft.com/office/drawing/2014/main" val="4011408311"/>
                   </a:ext>
                 </a:extLst>
               </a:tr>
@@ -13950,7 +14098,7 @@
                           <a:effectLst/>
                           <a:latin typeface="Calibri" panose="020F0502020204030204" pitchFamily="34" charset="0"/>
                         </a:rPr>
-                        <a:t>P3</a:t>
+                        <a:t>P2</a:t>
                       </a:r>
                     </a:p>
                   </a:txBody>
@@ -13990,7 +14138,7 @@
                           <a:effectLst/>
                           <a:latin typeface="Calibri" panose="020F0502020204030204" pitchFamily="34" charset="0"/>
                         </a:rPr>
-                        <a:t>PCA</a:t>
+                        <a:t>Radial</a:t>
                       </a:r>
                     </a:p>
                   </a:txBody>
@@ -14010,7 +14158,7 @@
                           <a:effectLst/>
                           <a:latin typeface="Calibri" panose="020F0502020204030204" pitchFamily="34" charset="0"/>
                         </a:rPr>
-                        <a:t>EEE</a:t>
+                        <a:t>1</a:t>
                       </a:r>
                     </a:p>
                   </a:txBody>
@@ -14050,7 +14198,7 @@
                           <a:effectLst/>
                           <a:latin typeface="Calibri" panose="020F0502020204030204" pitchFamily="34" charset="0"/>
                         </a:rPr>
-                        <a:t>50_50</a:t>
+                        <a:t>3</a:t>
                       </a:r>
                     </a:p>
                   </a:txBody>
@@ -14086,7 +14234,7 @@
                           <a:effectLst/>
                           <a:latin typeface="Calibri" panose="020F0502020204030204" pitchFamily="34" charset="0"/>
                         </a:rPr>
-                        <a:t>EEE_p4_50_50_sim3</a:t>
+                        <a:t>EEE_p4_50_50_sim2</a:t>
                       </a:r>
                     </a:p>
                   </a:txBody>
@@ -14111,7 +14259,7 @@
                 </a:tc>
                 <a:extLst>
                   <a:ext uri="{0D108BD9-81ED-4DB2-BD59-A6C34878D82A}">
-                    <a16:rowId xmlns:a16="http://schemas.microsoft.com/office/drawing/2014/main" val="2814426595"/>
+                    <a16:rowId xmlns:a16="http://schemas.microsoft.com/office/drawing/2014/main" val="3775966952"/>
                   </a:ext>
                 </a:extLst>
               </a:tr>
@@ -14130,7 +14278,7 @@
                           <a:effectLst/>
                           <a:latin typeface="Calibri" panose="020F0502020204030204" pitchFamily="34" charset="0"/>
                         </a:rPr>
-                        <a:t>p3</a:t>
+                        <a:t>P2</a:t>
                       </a:r>
                     </a:p>
                   </a:txBody>
@@ -14170,7 +14318,7 @@
                           <a:effectLst/>
                           <a:latin typeface="Calibri" panose="020F0502020204030204" pitchFamily="34" charset="0"/>
                         </a:rPr>
-                        <a:t>PCA</a:t>
+                        <a:t>Radial</a:t>
                       </a:r>
                     </a:p>
                   </a:txBody>
@@ -14190,7 +14338,7 @@
                           <a:effectLst/>
                           <a:latin typeface="Calibri" panose="020F0502020204030204" pitchFamily="34" charset="0"/>
                         </a:rPr>
-                        <a:t>Banana</a:t>
+                        <a:t>1</a:t>
                       </a:r>
                     </a:p>
                   </a:txBody>
@@ -14230,7 +14378,7 @@
                           <a:effectLst/>
                           <a:latin typeface="Calibri" panose="020F0502020204030204" pitchFamily="34" charset="0"/>
                         </a:rPr>
-                        <a:t>50_50</a:t>
+                        <a:t>1</a:t>
                       </a:r>
                     </a:p>
                   </a:txBody>
@@ -14266,7 +14414,645 @@
                           <a:effectLst/>
                           <a:latin typeface="Calibri" panose="020F0502020204030204" pitchFamily="34" charset="0"/>
                         </a:rPr>
-                        <a:t>banana_p6_50_50_sim1</a:t>
+                        <a:t>banana_p6_50_50_sim2</a:t>
+                      </a:r>
+                    </a:p>
+                  </a:txBody>
+                  <a:tcPr marL="7620" marR="7620" marT="7620" marB="0" anchor="b"/>
+                </a:tc>
+                <a:tc>
+                  <a:txBody>
+                    <a:bodyPr/>
+                    <a:lstStyle/>
+                    <a:p>
+                      <a:pPr marL="0" marR="0" lvl="0" indent="0" algn="l" defTabSz="914400" rtl="0" eaLnBrk="1" fontAlgn="b" latinLnBrk="0" hangingPunct="1">
+                        <a:lnSpc>
+                          <a:spcPct val="100000"/>
+                        </a:lnSpc>
+                        <a:spcBef>
+                          <a:spcPts val="0"/>
+                        </a:spcBef>
+                        <a:spcAft>
+                          <a:spcPts val="0"/>
+                        </a:spcAft>
+                        <a:buClrTx/>
+                        <a:buSzTx/>
+                        <a:buFontTx/>
+                        <a:buNone/>
+                        <a:tabLst/>
+                        <a:defRPr/>
+                      </a:pPr>
+                      <a:endParaRPr lang="en-AU" sz="1400" b="0" i="0" u="none" strike="noStrike" dirty="0">
+                        <a:solidFill>
+                          <a:srgbClr val="000000"/>
+                        </a:solidFill>
+                        <a:effectLst/>
+                        <a:latin typeface="Calibri" panose="020F0502020204030204" pitchFamily="34" charset="0"/>
+                      </a:endParaRPr>
+                    </a:p>
+                  </a:txBody>
+                  <a:tcPr marL="7620" marR="7620" marT="7620" marB="0" anchor="b"/>
+                </a:tc>
+                <a:extLst>
+                  <a:ext uri="{0D108BD9-81ED-4DB2-BD59-A6C34878D82A}">
+                    <a16:rowId xmlns:a16="http://schemas.microsoft.com/office/drawing/2014/main" val="2638294684"/>
+                  </a:ext>
+                </a:extLst>
+              </a:tr>
+              <a:tr h="0">
+                <a:tc>
+                  <a:txBody>
+                    <a:bodyPr/>
+                    <a:lstStyle/>
+                    <a:p>
+                      <a:pPr algn="l" fontAlgn="b"/>
+                      <a:r>
+                        <a:rPr lang="en-US" sz="1400" b="0" i="0" u="none" strike="noStrike" dirty="0">
+                          <a:solidFill>
+                            <a:srgbClr val="000000"/>
+                          </a:solidFill>
+                          <a:effectLst/>
+                          <a:latin typeface="Calibri" panose="020F0502020204030204" pitchFamily="34" charset="0"/>
+                        </a:rPr>
+                        <a:t>Training</a:t>
+                      </a:r>
+                    </a:p>
+                  </a:txBody>
+                  <a:tcPr marL="7620" marR="7620" marT="7620" marB="0" anchor="b">
+                    <a:solidFill>
+                      <a:schemeClr val="accent6">
+                        <a:lumMod val="40000"/>
+                        <a:lumOff val="60000"/>
+                      </a:schemeClr>
+                    </a:solidFill>
+                  </a:tcPr>
+                </a:tc>
+                <a:tc>
+                  <a:txBody>
+                    <a:bodyPr/>
+                    <a:lstStyle/>
+                    <a:p>
+                      <a:pPr algn="l" fontAlgn="b"/>
+                      <a:r>
+                        <a:rPr lang="en-US" sz="1400" b="0" i="0" u="none" strike="noStrike" dirty="0">
+                          <a:solidFill>
+                            <a:srgbClr val="000000"/>
+                          </a:solidFill>
+                          <a:effectLst/>
+                          <a:latin typeface="Calibri" panose="020F0502020204030204" pitchFamily="34" charset="0"/>
+                        </a:rPr>
+                        <a:t>R3</a:t>
+                      </a:r>
+                      <a:endParaRPr lang="en-AU" sz="1400" b="0" i="0" u="none" strike="noStrike" dirty="0">
+                        <a:solidFill>
+                          <a:srgbClr val="000000"/>
+                        </a:solidFill>
+                        <a:effectLst/>
+                        <a:latin typeface="Calibri" panose="020F0502020204030204" pitchFamily="34" charset="0"/>
+                      </a:endParaRPr>
+                    </a:p>
+                  </a:txBody>
+                  <a:tcPr marL="7620" marR="7620" marT="7620" marB="0" anchor="b">
+                    <a:solidFill>
+                      <a:schemeClr val="accent6">
+                        <a:lumMod val="40000"/>
+                        <a:lumOff val="60000"/>
+                      </a:schemeClr>
+                    </a:solidFill>
+                  </a:tcPr>
+                </a:tc>
+                <a:tc>
+                  <a:txBody>
+                    <a:bodyPr/>
+                    <a:lstStyle/>
+                    <a:p>
+                      <a:pPr algn="l" fontAlgn="b"/>
+                      <a:r>
+                        <a:rPr lang="en-US" sz="1400" b="0" i="1" u="none" strike="noStrike" dirty="0">
+                          <a:solidFill>
+                            <a:srgbClr val="000000"/>
+                          </a:solidFill>
+                          <a:effectLst/>
+                          <a:latin typeface="Calibri" panose="020F0502020204030204" pitchFamily="34" charset="0"/>
+                        </a:rPr>
+                        <a:t>PCA</a:t>
+                      </a:r>
+                      <a:endParaRPr lang="en-AU" sz="1400" b="0" i="1" u="none" strike="noStrike" dirty="0">
+                        <a:solidFill>
+                          <a:srgbClr val="000000"/>
+                        </a:solidFill>
+                        <a:effectLst/>
+                        <a:latin typeface="Calibri" panose="020F0502020204030204" pitchFamily="34" charset="0"/>
+                      </a:endParaRPr>
+                    </a:p>
+                  </a:txBody>
+                  <a:tcPr marL="7620" marR="7620" marT="7620" marB="0" anchor="b">
+                    <a:solidFill>
+                      <a:schemeClr val="accent6">
+                        <a:lumMod val="40000"/>
+                        <a:lumOff val="60000"/>
+                      </a:schemeClr>
+                    </a:solidFill>
+                  </a:tcPr>
+                </a:tc>
+                <a:tc>
+                  <a:txBody>
+                    <a:bodyPr/>
+                    <a:lstStyle/>
+                    <a:p>
+                      <a:pPr algn="l" fontAlgn="b"/>
+                      <a:r>
+                        <a:rPr lang="en-AU" sz="1400" u="none" strike="noStrike" dirty="0">
+                          <a:effectLst/>
+                        </a:rPr>
+                        <a:t>EEE</a:t>
+                      </a:r>
+                      <a:endParaRPr lang="en-AU" sz="1400" b="0" i="1" u="none" strike="noStrike" dirty="0">
+                        <a:solidFill>
+                          <a:srgbClr val="000000"/>
+                        </a:solidFill>
+                        <a:effectLst/>
+                        <a:latin typeface="Calibri" panose="020F0502020204030204" pitchFamily="34" charset="0"/>
+                      </a:endParaRPr>
+                    </a:p>
+                  </a:txBody>
+                  <a:tcPr marL="7620" marR="7620" marT="7620" marB="0" anchor="b">
+                    <a:solidFill>
+                      <a:schemeClr val="accent6">
+                        <a:lumMod val="40000"/>
+                        <a:lumOff val="60000"/>
+                      </a:schemeClr>
+                    </a:solidFill>
+                  </a:tcPr>
+                </a:tc>
+                <a:tc>
+                  <a:txBody>
+                    <a:bodyPr/>
+                    <a:lstStyle/>
+                    <a:p>
+                      <a:pPr algn="l" fontAlgn="b"/>
+                      <a:r>
+                        <a:rPr lang="en-AU" sz="1400" u="none" strike="noStrike" dirty="0">
+                          <a:effectLst/>
+                        </a:rPr>
+                        <a:t>4v (3cl)</a:t>
+                      </a:r>
+                      <a:endParaRPr lang="en-AU" sz="1400" b="0" i="0" u="none" strike="noStrike" dirty="0">
+                        <a:solidFill>
+                          <a:srgbClr val="000000"/>
+                        </a:solidFill>
+                        <a:effectLst/>
+                        <a:latin typeface="Calibri" panose="020F0502020204030204" pitchFamily="34" charset="0"/>
+                      </a:endParaRPr>
+                    </a:p>
+                  </a:txBody>
+                  <a:tcPr marL="7620" marR="7620" marT="7620" marB="0" anchor="b">
+                    <a:solidFill>
+                      <a:schemeClr val="accent6">
+                        <a:lumMod val="40000"/>
+                        <a:lumOff val="60000"/>
+                      </a:schemeClr>
+                    </a:solidFill>
+                  </a:tcPr>
+                </a:tc>
+                <a:tc>
+                  <a:txBody>
+                    <a:bodyPr/>
+                    <a:lstStyle/>
+                    <a:p>
+                      <a:pPr algn="l" fontAlgn="b"/>
+                      <a:r>
+                        <a:rPr lang="en-AU" sz="1400" u="none" strike="noStrike" dirty="0">
+                          <a:effectLst/>
+                        </a:rPr>
+                        <a:t>1_0</a:t>
+                      </a:r>
+                      <a:endParaRPr lang="en-AU" sz="1400" b="0" i="1" u="none" strike="noStrike" dirty="0">
+                        <a:solidFill>
+                          <a:srgbClr val="000000"/>
+                        </a:solidFill>
+                        <a:effectLst/>
+                        <a:latin typeface="Calibri" panose="020F0502020204030204" pitchFamily="34" charset="0"/>
+                      </a:endParaRPr>
+                    </a:p>
+                  </a:txBody>
+                  <a:tcPr marL="7620" marR="7620" marT="7620" marB="0" anchor="b">
+                    <a:solidFill>
+                      <a:schemeClr val="accent6">
+                        <a:lumMod val="40000"/>
+                        <a:lumOff val="60000"/>
+                      </a:schemeClr>
+                    </a:solidFill>
+                  </a:tcPr>
+                </a:tc>
+                <a:tc>
+                  <a:txBody>
+                    <a:bodyPr/>
+                    <a:lstStyle/>
+                    <a:p>
+                      <a:pPr algn="l" fontAlgn="b"/>
+                      <a:r>
+                        <a:rPr lang="en-AU" sz="1400" u="none" strike="noStrike" dirty="0">
+                          <a:effectLst/>
+                        </a:rPr>
+                        <a:t>EEE_p4_0_1_t3</a:t>
+                      </a:r>
+                      <a:endParaRPr lang="en-AU" sz="1400" b="0" i="0" u="none" strike="noStrike" dirty="0">
+                        <a:solidFill>
+                          <a:srgbClr val="000000"/>
+                        </a:solidFill>
+                        <a:effectLst/>
+                        <a:latin typeface="Calibri" panose="020F0502020204030204" pitchFamily="34" charset="0"/>
+                      </a:endParaRPr>
+                    </a:p>
+                  </a:txBody>
+                  <a:tcPr marL="7620" marR="7620" marT="7620" marB="0" anchor="b">
+                    <a:solidFill>
+                      <a:schemeClr val="accent6">
+                        <a:lumMod val="40000"/>
+                        <a:lumOff val="60000"/>
+                      </a:schemeClr>
+                    </a:solidFill>
+                  </a:tcPr>
+                </a:tc>
+                <a:tc>
+                  <a:txBody>
+                    <a:bodyPr/>
+                    <a:lstStyle/>
+                    <a:p>
+                      <a:pPr marL="0" marR="0" lvl="0" indent="0" algn="l" defTabSz="914400" rtl="0" eaLnBrk="1" fontAlgn="b" latinLnBrk="0" hangingPunct="1">
+                        <a:lnSpc>
+                          <a:spcPct val="100000"/>
+                        </a:lnSpc>
+                        <a:spcBef>
+                          <a:spcPts val="0"/>
+                        </a:spcBef>
+                        <a:spcAft>
+                          <a:spcPts val="0"/>
+                        </a:spcAft>
+                        <a:buClrTx/>
+                        <a:buSzTx/>
+                        <a:buFontTx/>
+                        <a:buNone/>
+                        <a:tabLst/>
+                        <a:defRPr/>
+                      </a:pPr>
+                      <a:endParaRPr lang="en-AU" sz="1400" b="0" i="0" u="none" strike="noStrike" dirty="0">
+                        <a:solidFill>
+                          <a:srgbClr val="000000"/>
+                        </a:solidFill>
+                        <a:effectLst/>
+                        <a:latin typeface="Calibri" panose="020F0502020204030204" pitchFamily="34" charset="0"/>
+                      </a:endParaRPr>
+                    </a:p>
+                  </a:txBody>
+                  <a:tcPr marL="7620" marR="7620" marT="7620" marB="0" anchor="b">
+                    <a:solidFill>
+                      <a:schemeClr val="accent6">
+                        <a:lumMod val="40000"/>
+                        <a:lumOff val="60000"/>
+                      </a:schemeClr>
+                    </a:solidFill>
+                  </a:tcPr>
+                </a:tc>
+                <a:extLst>
+                  <a:ext uri="{0D108BD9-81ED-4DB2-BD59-A6C34878D82A}">
+                    <a16:rowId xmlns:a16="http://schemas.microsoft.com/office/drawing/2014/main" val="253705706"/>
+                  </a:ext>
+                </a:extLst>
+              </a:tr>
+              <a:tr h="0">
+                <a:tc>
+                  <a:txBody>
+                    <a:bodyPr/>
+                    <a:lstStyle/>
+                    <a:p>
+                      <a:pPr algn="l" fontAlgn="b"/>
+                      <a:r>
+                        <a:rPr lang="en-AU" sz="1400" b="0" i="0" u="none" strike="noStrike" dirty="0">
+                          <a:solidFill>
+                            <a:srgbClr val="000000"/>
+                          </a:solidFill>
+                          <a:effectLst/>
+                          <a:latin typeface="Calibri" panose="020F0502020204030204" pitchFamily="34" charset="0"/>
+                        </a:rPr>
+                        <a:t>P3</a:t>
+                      </a:r>
+                    </a:p>
+                  </a:txBody>
+                  <a:tcPr marL="7620" marR="7620" marT="7620" marB="0" anchor="b"/>
+                </a:tc>
+                <a:tc>
+                  <a:txBody>
+                    <a:bodyPr/>
+                    <a:lstStyle/>
+                    <a:p>
+                      <a:pPr algn="l" fontAlgn="b"/>
+                      <a:r>
+                        <a:rPr lang="en-AU" sz="1400" b="0" i="0" u="none" strike="noStrike" dirty="0">
+                          <a:solidFill>
+                            <a:srgbClr val="000000"/>
+                          </a:solidFill>
+                          <a:effectLst/>
+                          <a:latin typeface="Calibri" panose="020F0502020204030204" pitchFamily="34" charset="0"/>
+                        </a:rPr>
+                        <a:t>R1</a:t>
+                      </a:r>
+                    </a:p>
+                  </a:txBody>
+                  <a:tcPr marL="7620" marR="7620" marT="7620" marB="0" anchor="b"/>
+                </a:tc>
+                <a:tc>
+                  <a:txBody>
+                    <a:bodyPr/>
+                    <a:lstStyle/>
+                    <a:p>
+                      <a:pPr algn="l" fontAlgn="b"/>
+                      <a:r>
+                        <a:rPr lang="en-AU" sz="1400" b="0" i="1" u="none" strike="noStrike" dirty="0">
+                          <a:solidFill>
+                            <a:srgbClr val="000000"/>
+                          </a:solidFill>
+                          <a:effectLst/>
+                          <a:latin typeface="Calibri" panose="020F0502020204030204" pitchFamily="34" charset="0"/>
+                        </a:rPr>
+                        <a:t>PCA</a:t>
+                      </a:r>
+                    </a:p>
+                  </a:txBody>
+                  <a:tcPr marL="7620" marR="7620" marT="7620" marB="0" anchor="b"/>
+                </a:tc>
+                <a:tc>
+                  <a:txBody>
+                    <a:bodyPr/>
+                    <a:lstStyle/>
+                    <a:p>
+                      <a:pPr algn="l" fontAlgn="b"/>
+                      <a:r>
+                        <a:rPr lang="en-AU" sz="1400" b="0" i="1" u="none" strike="noStrike" dirty="0">
+                          <a:solidFill>
+                            <a:srgbClr val="000000"/>
+                          </a:solidFill>
+                          <a:effectLst/>
+                          <a:latin typeface="Calibri" panose="020F0502020204030204" pitchFamily="34" charset="0"/>
+                        </a:rPr>
+                        <a:t>1</a:t>
+                      </a:r>
+                    </a:p>
+                  </a:txBody>
+                  <a:tcPr marL="7620" marR="7620" marT="7620" marB="0" anchor="b"/>
+                </a:tc>
+                <a:tc>
+                  <a:txBody>
+                    <a:bodyPr/>
+                    <a:lstStyle/>
+                    <a:p>
+                      <a:pPr algn="l" fontAlgn="b"/>
+                      <a:r>
+                        <a:rPr lang="en-AU" sz="1400" b="0" i="0" u="none" strike="noStrike" dirty="0">
+                          <a:solidFill>
+                            <a:srgbClr val="000000"/>
+                          </a:solidFill>
+                          <a:effectLst/>
+                          <a:latin typeface="Calibri" panose="020F0502020204030204" pitchFamily="34" charset="0"/>
+                        </a:rPr>
+                        <a:t>4v (3cl)</a:t>
+                      </a:r>
+                    </a:p>
+                  </a:txBody>
+                  <a:tcPr marL="7620" marR="7620" marT="7620" marB="0" anchor="b"/>
+                </a:tc>
+                <a:tc>
+                  <a:txBody>
+                    <a:bodyPr/>
+                    <a:lstStyle/>
+                    <a:p>
+                      <a:pPr algn="l" fontAlgn="b"/>
+                      <a:r>
+                        <a:rPr lang="en-AU" sz="1400" b="0" i="1" u="none" strike="noStrike" dirty="0">
+                          <a:solidFill>
+                            <a:srgbClr val="000000"/>
+                          </a:solidFill>
+                          <a:effectLst/>
+                          <a:latin typeface="Calibri" panose="020F0502020204030204" pitchFamily="34" charset="0"/>
+                        </a:rPr>
+                        <a:t>2</a:t>
+                      </a:r>
+                    </a:p>
+                  </a:txBody>
+                  <a:tcPr marL="7620" marR="7620" marT="7620" marB="0" anchor="b"/>
+                </a:tc>
+                <a:tc>
+                  <a:txBody>
+                    <a:bodyPr/>
+                    <a:lstStyle/>
+                    <a:p>
+                      <a:pPr marL="0" marR="0" lvl="0" indent="0" algn="l" defTabSz="914400" rtl="0" eaLnBrk="1" fontAlgn="b" latinLnBrk="0" hangingPunct="1">
+                        <a:lnSpc>
+                          <a:spcPct val="100000"/>
+                        </a:lnSpc>
+                        <a:spcBef>
+                          <a:spcPts val="0"/>
+                        </a:spcBef>
+                        <a:spcAft>
+                          <a:spcPts val="0"/>
+                        </a:spcAft>
+                        <a:buClrTx/>
+                        <a:buSzTx/>
+                        <a:buFontTx/>
+                        <a:buNone/>
+                        <a:tabLst/>
+                        <a:defRPr/>
+                      </a:pPr>
+                      <a:r>
+                        <a:rPr lang="en-AU" sz="1400" b="0" i="0" u="none" strike="noStrike" dirty="0">
+                          <a:solidFill>
+                            <a:srgbClr val="000000"/>
+                          </a:solidFill>
+                          <a:effectLst/>
+                          <a:latin typeface="Calibri" panose="020F0502020204030204" pitchFamily="34" charset="0"/>
+                        </a:rPr>
+                        <a:t>EEE_p4_50_50_sim3</a:t>
+                      </a:r>
+                    </a:p>
+                  </a:txBody>
+                  <a:tcPr marL="7620" marR="7620" marT="7620" marB="0" anchor="b"/>
+                </a:tc>
+                <a:tc>
+                  <a:txBody>
+                    <a:bodyPr/>
+                    <a:lstStyle/>
+                    <a:p>
+                      <a:pPr algn="l" fontAlgn="b"/>
+                      <a:endParaRPr lang="en-AU" sz="1400" b="0" i="0" u="none" strike="noStrike" dirty="0">
+                        <a:solidFill>
+                          <a:srgbClr val="000000"/>
+                        </a:solidFill>
+                        <a:effectLst/>
+                        <a:latin typeface="Calibri" panose="020F0502020204030204" pitchFamily="34" charset="0"/>
+                      </a:endParaRPr>
+                    </a:p>
+                  </a:txBody>
+                  <a:tcPr marL="7620" marR="7620" marT="7620" marB="0" anchor="b"/>
+                </a:tc>
+                <a:extLst>
+                  <a:ext uri="{0D108BD9-81ED-4DB2-BD59-A6C34878D82A}">
+                    <a16:rowId xmlns:a16="http://schemas.microsoft.com/office/drawing/2014/main" val="2814426595"/>
+                  </a:ext>
+                </a:extLst>
+              </a:tr>
+              <a:tr h="0">
+                <a:tc>
+                  <a:txBody>
+                    <a:bodyPr/>
+                    <a:lstStyle/>
+                    <a:p>
+                      <a:pPr algn="l" fontAlgn="b"/>
+                      <a:r>
+                        <a:rPr lang="en-AU" sz="1400" b="0" i="0" u="none" strike="noStrike" dirty="0">
+                          <a:solidFill>
+                            <a:srgbClr val="000000"/>
+                          </a:solidFill>
+                          <a:effectLst/>
+                          <a:latin typeface="Calibri" panose="020F0502020204030204" pitchFamily="34" charset="0"/>
+                        </a:rPr>
+                        <a:t>p3</a:t>
+                      </a:r>
+                    </a:p>
+                  </a:txBody>
+                  <a:tcPr marL="7620" marR="7620" marT="7620" marB="0" anchor="b"/>
+                </a:tc>
+                <a:tc>
+                  <a:txBody>
+                    <a:bodyPr/>
+                    <a:lstStyle/>
+                    <a:p>
+                      <a:pPr algn="l" fontAlgn="b"/>
+                      <a:r>
+                        <a:rPr lang="en-AU" sz="1400" b="0" i="0" u="none" strike="noStrike" dirty="0">
+                          <a:solidFill>
+                            <a:srgbClr val="000000"/>
+                          </a:solidFill>
+                          <a:effectLst/>
+                          <a:latin typeface="Calibri" panose="020F0502020204030204" pitchFamily="34" charset="0"/>
+                        </a:rPr>
+                        <a:t>R2</a:t>
+                      </a:r>
+                    </a:p>
+                  </a:txBody>
+                  <a:tcPr marL="7620" marR="7620" marT="7620" marB="0" anchor="b"/>
+                </a:tc>
+                <a:tc>
+                  <a:txBody>
+                    <a:bodyPr/>
+                    <a:lstStyle/>
+                    <a:p>
+                      <a:pPr algn="l" fontAlgn="b"/>
+                      <a:r>
+                        <a:rPr lang="en-AU" sz="1400" b="0" i="1" u="none" strike="noStrike" dirty="0">
+                          <a:solidFill>
+                            <a:srgbClr val="000000"/>
+                          </a:solidFill>
+                          <a:effectLst/>
+                          <a:latin typeface="Calibri" panose="020F0502020204030204" pitchFamily="34" charset="0"/>
+                        </a:rPr>
+                        <a:t>PCA</a:t>
+                      </a:r>
+                    </a:p>
+                  </a:txBody>
+                  <a:tcPr marL="7620" marR="7620" marT="7620" marB="0" anchor="b"/>
+                </a:tc>
+                <a:tc>
+                  <a:txBody>
+                    <a:bodyPr/>
+                    <a:lstStyle/>
+                    <a:p>
+                      <a:pPr algn="l" fontAlgn="b"/>
+                      <a:r>
+                        <a:rPr lang="en-AU" sz="1400" b="0" i="1" u="none" strike="noStrike" dirty="0">
+                          <a:solidFill>
+                            <a:srgbClr val="000000"/>
+                          </a:solidFill>
+                          <a:effectLst/>
+                          <a:latin typeface="Calibri" panose="020F0502020204030204" pitchFamily="34" charset="0"/>
+                        </a:rPr>
+                        <a:t>1</a:t>
+                      </a:r>
+                    </a:p>
+                  </a:txBody>
+                  <a:tcPr marL="7620" marR="7620" marT="7620" marB="0" anchor="b"/>
+                </a:tc>
+                <a:tc>
+                  <a:txBody>
+                    <a:bodyPr/>
+                    <a:lstStyle/>
+                    <a:p>
+                      <a:pPr algn="l" fontAlgn="b"/>
+                      <a:r>
+                        <a:rPr lang="en-AU" sz="1400" b="0" i="0" u="none" strike="noStrike" dirty="0">
+                          <a:solidFill>
+                            <a:srgbClr val="000000"/>
+                          </a:solidFill>
+                          <a:effectLst/>
+                          <a:latin typeface="Calibri" panose="020F0502020204030204" pitchFamily="34" charset="0"/>
+                        </a:rPr>
+                        <a:t>6v in (4cl)</a:t>
+                      </a:r>
+                    </a:p>
+                  </a:txBody>
+                  <a:tcPr marL="7620" marR="7620" marT="7620" marB="0" anchor="b"/>
+                </a:tc>
+                <a:tc>
+                  <a:txBody>
+                    <a:bodyPr/>
+                    <a:lstStyle/>
+                    <a:p>
+                      <a:pPr algn="l" fontAlgn="b"/>
+                      <a:r>
+                        <a:rPr lang="en-AU" sz="1400" b="0" i="1" u="none" strike="noStrike" dirty="0">
+                          <a:solidFill>
+                            <a:srgbClr val="000000"/>
+                          </a:solidFill>
+                          <a:effectLst/>
+                          <a:latin typeface="Calibri" panose="020F0502020204030204" pitchFamily="34" charset="0"/>
+                        </a:rPr>
+                        <a:t>3</a:t>
+                      </a:r>
+                    </a:p>
+                  </a:txBody>
+                  <a:tcPr marL="7620" marR="7620" marT="7620" marB="0" anchor="b"/>
+                </a:tc>
+                <a:tc>
+                  <a:txBody>
+                    <a:bodyPr/>
+                    <a:lstStyle/>
+                    <a:p>
+                      <a:pPr marL="0" marR="0" lvl="0" indent="0" algn="l" defTabSz="914400" rtl="0" eaLnBrk="1" fontAlgn="b" latinLnBrk="0" hangingPunct="1">
+                        <a:lnSpc>
+                          <a:spcPct val="100000"/>
+                        </a:lnSpc>
+                        <a:spcBef>
+                          <a:spcPts val="0"/>
+                        </a:spcBef>
+                        <a:spcAft>
+                          <a:spcPts val="0"/>
+                        </a:spcAft>
+                        <a:buClrTx/>
+                        <a:buSzTx/>
+                        <a:buFontTx/>
+                        <a:buNone/>
+                        <a:tabLst/>
+                        <a:defRPr/>
+                      </a:pPr>
+                      <a:r>
+                        <a:rPr lang="en-AU" sz="1400" b="0" i="0" u="none" strike="noStrike" dirty="0">
+                          <a:solidFill>
+                            <a:srgbClr val="000000"/>
+                          </a:solidFill>
+                          <a:effectLst/>
+                          <a:latin typeface="Calibri" panose="020F0502020204030204" pitchFamily="34" charset="0"/>
+                        </a:rPr>
+                        <a:t>banana_p6_50_50_sim3</a:t>
                       </a:r>
                     </a:p>
                   </a:txBody>
@@ -17003,679 +17789,6 @@
           </p:txBody>
         </p:sp>
       </p:grpSp>
-      <p:graphicFrame>
-        <p:nvGraphicFramePr>
-          <p:cNvPr id="111" name="Table 110">
-            <a:extLst>
-              <a:ext uri="{FF2B5EF4-FFF2-40B4-BE49-F238E27FC236}">
-                <a16:creationId xmlns:a16="http://schemas.microsoft.com/office/drawing/2014/main" id="{FCF76CAA-FD82-4FD6-BEFD-1E0706EE4A77}"/>
-              </a:ext>
-            </a:extLst>
-          </p:cNvPr>
-          <p:cNvGraphicFramePr>
-            <a:graphicFrameLocks noGrp="1"/>
-          </p:cNvGraphicFramePr>
-          <p:nvPr>
-            <p:extLst>
-              <p:ext uri="{D42A27DB-BD31-4B8C-83A1-F6EECF244321}">
-                <p14:modId xmlns:p14="http://schemas.microsoft.com/office/powerpoint/2010/main" val="1522345543"/>
-              </p:ext>
-            </p:extLst>
-          </p:nvPr>
-        </p:nvGraphicFramePr>
-        <p:xfrm>
-          <a:off x="4885744" y="2535026"/>
-          <a:ext cx="7091999" cy="729960"/>
-        </p:xfrm>
-        <a:graphic>
-          <a:graphicData uri="http://schemas.openxmlformats.org/drawingml/2006/table">
-            <a:tbl>
-              <a:tblPr firstRow="1" bandRow="1">
-                <a:tableStyleId>{93296810-A885-4BE3-A3E7-6D5BEEA58F35}</a:tableStyleId>
-              </a:tblPr>
-              <a:tblGrid>
-                <a:gridCol w="623031">
-                  <a:extLst>
-                    <a:ext uri="{9D8B030D-6E8A-4147-A177-3AD203B41FA5}">
-                      <a16:colId xmlns:a16="http://schemas.microsoft.com/office/drawing/2014/main" val="3488268334"/>
-                    </a:ext>
-                  </a:extLst>
-                </a:gridCol>
-                <a:gridCol w="404969">
-                  <a:extLst>
-                    <a:ext uri="{9D8B030D-6E8A-4147-A177-3AD203B41FA5}">
-                      <a16:colId xmlns:a16="http://schemas.microsoft.com/office/drawing/2014/main" val="491055168"/>
-                    </a:ext>
-                  </a:extLst>
-                </a:gridCol>
-                <a:gridCol w="623031">
-                  <a:extLst>
-                    <a:ext uri="{9D8B030D-6E8A-4147-A177-3AD203B41FA5}">
-                      <a16:colId xmlns:a16="http://schemas.microsoft.com/office/drawing/2014/main" val="3695711225"/>
-                    </a:ext>
-                  </a:extLst>
-                </a:gridCol>
-                <a:gridCol w="747641">
-                  <a:extLst>
-                    <a:ext uri="{9D8B030D-6E8A-4147-A177-3AD203B41FA5}">
-                      <a16:colId xmlns:a16="http://schemas.microsoft.com/office/drawing/2014/main" val="1254602596"/>
-                    </a:ext>
-                  </a:extLst>
-                </a:gridCol>
-                <a:gridCol w="963030">
-                  <a:extLst>
-                    <a:ext uri="{9D8B030D-6E8A-4147-A177-3AD203B41FA5}">
-                      <a16:colId xmlns:a16="http://schemas.microsoft.com/office/drawing/2014/main" val="2624790650"/>
-                    </a:ext>
-                  </a:extLst>
-                </a:gridCol>
-                <a:gridCol w="685336">
-                  <a:extLst>
-                    <a:ext uri="{9D8B030D-6E8A-4147-A177-3AD203B41FA5}">
-                      <a16:colId xmlns:a16="http://schemas.microsoft.com/office/drawing/2014/main" val="1330532218"/>
-                    </a:ext>
-                  </a:extLst>
-                </a:gridCol>
-                <a:gridCol w="1984357">
-                  <a:extLst>
-                    <a:ext uri="{9D8B030D-6E8A-4147-A177-3AD203B41FA5}">
-                      <a16:colId xmlns:a16="http://schemas.microsoft.com/office/drawing/2014/main" val="907526158"/>
-                    </a:ext>
-                  </a:extLst>
-                </a:gridCol>
-                <a:gridCol w="1060604">
-                  <a:extLst>
-                    <a:ext uri="{9D8B030D-6E8A-4147-A177-3AD203B41FA5}">
-                      <a16:colId xmlns:a16="http://schemas.microsoft.com/office/drawing/2014/main" val="1884770232"/>
-                    </a:ext>
-                  </a:extLst>
-                </a:gridCol>
-              </a:tblGrid>
-              <a:tr h="288000">
-                <a:tc>
-                  <a:txBody>
-                    <a:bodyPr/>
-                    <a:lstStyle/>
-                    <a:p>
-                      <a:pPr algn="l" fontAlgn="b"/>
-                      <a:r>
-                        <a:rPr lang="en-AU" sz="1400" b="1" i="0" u="none" strike="noStrike" dirty="0">
-                          <a:solidFill>
-                            <a:schemeClr val="bg1"/>
-                          </a:solidFill>
-                          <a:effectLst/>
-                          <a:latin typeface="Calibri" panose="020F0502020204030204" pitchFamily="34" charset="0"/>
-                        </a:rPr>
-                        <a:t>Period</a:t>
-                      </a:r>
-                    </a:p>
-                  </a:txBody>
-                  <a:tcPr marL="7620" marR="7620" marT="7620" marB="0" anchor="ctr"/>
-                </a:tc>
-                <a:tc>
-                  <a:txBody>
-                    <a:bodyPr/>
-                    <a:lstStyle/>
-                    <a:p>
-                      <a:pPr algn="l" fontAlgn="b"/>
-                      <a:r>
-                        <a:rPr lang="en-AU" sz="1400" b="1" i="0" u="none" strike="noStrike" dirty="0">
-                          <a:solidFill>
-                            <a:schemeClr val="bg1"/>
-                          </a:solidFill>
-                          <a:effectLst/>
-                          <a:latin typeface="Calibri" panose="020F0502020204030204" pitchFamily="34" charset="0"/>
-                        </a:rPr>
-                        <a:t>Rep</a:t>
-                      </a:r>
-                    </a:p>
-                  </a:txBody>
-                  <a:tcPr marL="7620" marR="7620" marT="7620" marB="0" anchor="ctr"/>
-                </a:tc>
-                <a:tc>
-                  <a:txBody>
-                    <a:bodyPr/>
-                    <a:lstStyle/>
-                    <a:p>
-                      <a:pPr algn="l" fontAlgn="b"/>
-                      <a:r>
-                        <a:rPr lang="en-AU" sz="1400" b="1" i="1" u="none" strike="noStrike" dirty="0">
-                          <a:solidFill>
-                            <a:schemeClr val="bg1"/>
-                          </a:solidFill>
-                          <a:effectLst/>
-                          <a:latin typeface="Calibri" panose="020F0502020204030204" pitchFamily="34" charset="0"/>
-                        </a:rPr>
-                        <a:t>Factor</a:t>
-                      </a:r>
-                    </a:p>
-                  </a:txBody>
-                  <a:tcPr marL="7620" marR="7620" marT="7620" marB="0" anchor="ctr"/>
-                </a:tc>
-                <a:tc>
-                  <a:txBody>
-                    <a:bodyPr/>
-                    <a:lstStyle/>
-                    <a:p>
-                      <a:pPr algn="l" fontAlgn="b"/>
-                      <a:r>
-                        <a:rPr lang="en-AU" sz="1400" b="1" i="1" u="none" strike="noStrike" dirty="0">
-                          <a:solidFill>
-                            <a:schemeClr val="bg1"/>
-                          </a:solidFill>
-                          <a:effectLst/>
-                          <a:latin typeface="Calibri" panose="020F0502020204030204" pitchFamily="34" charset="0"/>
-                        </a:rPr>
-                        <a:t>VC </a:t>
-                      </a:r>
-                    </a:p>
-                  </a:txBody>
-                  <a:tcPr marL="7620" marR="7620" marT="7620" marB="0" anchor="ctr"/>
-                </a:tc>
-                <a:tc>
-                  <a:txBody>
-                    <a:bodyPr/>
-                    <a:lstStyle/>
-                    <a:p>
-                      <a:pPr algn="l" fontAlgn="b"/>
-                      <a:r>
-                        <a:rPr lang="en-AU" sz="1400" b="1" i="0" u="none" strike="noStrike" dirty="0">
-                          <a:solidFill>
-                            <a:schemeClr val="bg1"/>
-                          </a:solidFill>
-                          <a:effectLst/>
-                          <a:latin typeface="Calibri" panose="020F0502020204030204" pitchFamily="34" charset="0"/>
-                        </a:rPr>
-                        <a:t>#var (cl)</a:t>
-                      </a:r>
-                    </a:p>
-                  </a:txBody>
-                  <a:tcPr marL="7620" marR="7620" marT="7620" marB="0" anchor="ctr"/>
-                </a:tc>
-                <a:tc>
-                  <a:txBody>
-                    <a:bodyPr/>
-                    <a:lstStyle/>
-                    <a:p>
-                      <a:pPr algn="l" fontAlgn="b"/>
-                      <a:r>
-                        <a:rPr lang="en-AU" sz="1400" b="1" i="1" u="none" strike="noStrike" dirty="0">
-                          <a:solidFill>
-                            <a:schemeClr val="bg1"/>
-                          </a:solidFill>
-                          <a:effectLst/>
-                          <a:latin typeface="Calibri" panose="020F0502020204030204" pitchFamily="34" charset="0"/>
-                        </a:rPr>
-                        <a:t>Location</a:t>
-                      </a:r>
-                    </a:p>
-                  </a:txBody>
-                  <a:tcPr marL="7620" marR="7620" marT="7620" marB="0" anchor="ctr"/>
-                </a:tc>
-                <a:tc>
-                  <a:txBody>
-                    <a:bodyPr/>
-                    <a:lstStyle/>
-                    <a:p>
-                      <a:pPr algn="l" fontAlgn="b"/>
-                      <a:r>
-                        <a:rPr lang="en-AU" sz="1400" b="1" i="0" u="none" strike="noStrike" dirty="0">
-                          <a:solidFill>
-                            <a:schemeClr val="bg1"/>
-                          </a:solidFill>
-                          <a:effectLst/>
-                          <a:latin typeface="Calibri" panose="020F0502020204030204" pitchFamily="34" charset="0"/>
-                        </a:rPr>
-                        <a:t>Sim name</a:t>
-                      </a:r>
-                    </a:p>
-                  </a:txBody>
-                  <a:tcPr marL="7620" marR="7620" marT="7620" marB="0" anchor="ctr"/>
-                </a:tc>
-                <a:tc>
-                  <a:txBody>
-                    <a:bodyPr/>
-                    <a:lstStyle/>
-                    <a:p>
-                      <a:pPr algn="l" fontAlgn="b"/>
-                      <a:r>
-                        <a:rPr lang="en-AU" sz="1400" b="1" i="0" u="none" strike="noStrike" dirty="0">
-                          <a:solidFill>
-                            <a:schemeClr val="bg1"/>
-                          </a:solidFill>
-                          <a:effectLst/>
-                          <a:latin typeface="Calibri" panose="020F0502020204030204" pitchFamily="34" charset="0"/>
-                        </a:rPr>
-                        <a:t>Grand path</a:t>
-                      </a:r>
-                    </a:p>
-                  </a:txBody>
-                  <a:tcPr marL="7620" marR="7620" marT="7620" marB="0" anchor="ctr"/>
-                </a:tc>
-                <a:extLst>
-                  <a:ext uri="{0D108BD9-81ED-4DB2-BD59-A6C34878D82A}">
-                    <a16:rowId xmlns:a16="http://schemas.microsoft.com/office/drawing/2014/main" val="437667846"/>
-                  </a:ext>
-                </a:extLst>
-              </a:tr>
-              <a:tr h="0">
-                <a:tc>
-                  <a:txBody>
-                    <a:bodyPr/>
-                    <a:lstStyle/>
-                    <a:p>
-                      <a:pPr algn="l" fontAlgn="b"/>
-                      <a:r>
-                        <a:rPr lang="en-AU" sz="1400" u="none" strike="noStrike" dirty="0">
-                          <a:effectLst/>
-                        </a:rPr>
-                        <a:t>Training</a:t>
-                      </a:r>
-                      <a:endParaRPr lang="en-AU" sz="1400" b="0" i="0" u="none" strike="noStrike" dirty="0">
-                        <a:solidFill>
-                          <a:srgbClr val="000000"/>
-                        </a:solidFill>
-                        <a:effectLst/>
-                        <a:latin typeface="Calibri" panose="020F0502020204030204" pitchFamily="34" charset="0"/>
-                      </a:endParaRPr>
-                    </a:p>
-                  </a:txBody>
-                  <a:tcPr marL="7620" marR="7620" marT="7620" marB="0" anchor="b"/>
-                </a:tc>
-                <a:tc>
-                  <a:txBody>
-                    <a:bodyPr/>
-                    <a:lstStyle/>
-                    <a:p>
-                      <a:pPr algn="l" fontAlgn="b"/>
-                      <a:r>
-                        <a:rPr lang="en-AU" sz="1400" u="none" strike="noStrike" dirty="0">
-                          <a:effectLst/>
-                        </a:rPr>
-                        <a:t>R1</a:t>
-                      </a:r>
-                      <a:endParaRPr lang="en-AU" sz="1400" b="0" i="0" u="none" strike="noStrike" dirty="0">
-                        <a:solidFill>
-                          <a:srgbClr val="000000"/>
-                        </a:solidFill>
-                        <a:effectLst/>
-                        <a:latin typeface="Calibri" panose="020F0502020204030204" pitchFamily="34" charset="0"/>
-                      </a:endParaRPr>
-                    </a:p>
-                  </a:txBody>
-                  <a:tcPr marL="7620" marR="7620" marT="7620" marB="0" anchor="b"/>
-                </a:tc>
-                <a:tc>
-                  <a:txBody>
-                    <a:bodyPr/>
-                    <a:lstStyle/>
-                    <a:p>
-                      <a:pPr algn="l" fontAlgn="b"/>
-                      <a:r>
-                        <a:rPr lang="en-AU" sz="1400" u="none" strike="noStrike" dirty="0">
-                          <a:effectLst/>
-                        </a:rPr>
-                        <a:t>free?</a:t>
-                      </a:r>
-                      <a:endParaRPr lang="en-AU" sz="1400" b="0" i="1" u="none" strike="noStrike" dirty="0">
-                        <a:solidFill>
-                          <a:srgbClr val="000000"/>
-                        </a:solidFill>
-                        <a:effectLst/>
-                        <a:latin typeface="Calibri" panose="020F0502020204030204" pitchFamily="34" charset="0"/>
-                      </a:endParaRPr>
-                    </a:p>
-                  </a:txBody>
-                  <a:tcPr marL="7620" marR="7620" marT="7620" marB="0" anchor="b"/>
-                </a:tc>
-                <a:tc>
-                  <a:txBody>
-                    <a:bodyPr/>
-                    <a:lstStyle/>
-                    <a:p>
-                      <a:pPr algn="l" fontAlgn="b"/>
-                      <a:r>
-                        <a:rPr lang="en-AU" sz="1400" u="none" strike="noStrike" dirty="0">
-                          <a:effectLst/>
-                        </a:rPr>
-                        <a:t>EEE</a:t>
-                      </a:r>
-                      <a:endParaRPr lang="en-AU" sz="1400" b="0" i="1" u="none" strike="noStrike" dirty="0">
-                        <a:solidFill>
-                          <a:srgbClr val="000000"/>
-                        </a:solidFill>
-                        <a:effectLst/>
-                        <a:latin typeface="Calibri" panose="020F0502020204030204" pitchFamily="34" charset="0"/>
-                      </a:endParaRPr>
-                    </a:p>
-                  </a:txBody>
-                  <a:tcPr marL="7620" marR="7620" marT="7620" marB="0" anchor="b"/>
-                </a:tc>
-                <a:tc>
-                  <a:txBody>
-                    <a:bodyPr/>
-                    <a:lstStyle/>
-                    <a:p>
-                      <a:pPr algn="l" fontAlgn="b"/>
-                      <a:r>
-                        <a:rPr lang="en-AU" sz="1400" u="none" strike="noStrike" dirty="0">
-                          <a:effectLst/>
-                        </a:rPr>
-                        <a:t>4v (3cl)</a:t>
-                      </a:r>
-                      <a:endParaRPr lang="en-AU" sz="1400" b="0" i="0" u="none" strike="noStrike" dirty="0">
-                        <a:solidFill>
-                          <a:srgbClr val="000000"/>
-                        </a:solidFill>
-                        <a:effectLst/>
-                        <a:latin typeface="Calibri" panose="020F0502020204030204" pitchFamily="34" charset="0"/>
-                      </a:endParaRPr>
-                    </a:p>
-                  </a:txBody>
-                  <a:tcPr marL="7620" marR="7620" marT="7620" marB="0" anchor="b"/>
-                </a:tc>
-                <a:tc>
-                  <a:txBody>
-                    <a:bodyPr/>
-                    <a:lstStyle/>
-                    <a:p>
-                      <a:pPr algn="l" fontAlgn="b"/>
-                      <a:r>
-                        <a:rPr lang="en-AU" sz="1400" u="none" strike="noStrike" dirty="0">
-                          <a:effectLst/>
-                        </a:rPr>
-                        <a:t>1_0</a:t>
-                      </a:r>
-                      <a:endParaRPr lang="en-AU" sz="1400" b="0" i="1" u="none" strike="noStrike" dirty="0">
-                        <a:solidFill>
-                          <a:srgbClr val="000000"/>
-                        </a:solidFill>
-                        <a:effectLst/>
-                        <a:latin typeface="Calibri" panose="020F0502020204030204" pitchFamily="34" charset="0"/>
-                      </a:endParaRPr>
-                    </a:p>
-                  </a:txBody>
-                  <a:tcPr marL="7620" marR="7620" marT="7620" marB="0" anchor="b"/>
-                </a:tc>
-                <a:tc>
-                  <a:txBody>
-                    <a:bodyPr/>
-                    <a:lstStyle/>
-                    <a:p>
-                      <a:pPr algn="l" fontAlgn="b"/>
-                      <a:r>
-                        <a:rPr lang="en-AU" sz="1400" u="none" strike="noStrike" dirty="0">
-                          <a:effectLst/>
-                        </a:rPr>
-                        <a:t>EEE_p4_0_1_t1</a:t>
-                      </a:r>
-                      <a:endParaRPr lang="en-AU" sz="1400" b="0" i="0" u="none" strike="noStrike" dirty="0">
-                        <a:solidFill>
-                          <a:srgbClr val="000000"/>
-                        </a:solidFill>
-                        <a:effectLst/>
-                        <a:latin typeface="Calibri" panose="020F0502020204030204" pitchFamily="34" charset="0"/>
-                      </a:endParaRPr>
-                    </a:p>
-                  </a:txBody>
-                  <a:tcPr marL="7620" marR="7620" marT="7620" marB="0" anchor="b"/>
-                </a:tc>
-                <a:tc>
-                  <a:txBody>
-                    <a:bodyPr/>
-                    <a:lstStyle/>
-                    <a:p>
-                      <a:pPr algn="l" fontAlgn="b"/>
-                      <a:r>
-                        <a:rPr lang="en-AU" sz="1400" u="none" strike="noStrike" dirty="0">
-                          <a:effectLst/>
-                        </a:rPr>
-                        <a:t>p4_path_t1</a:t>
-                      </a:r>
-                      <a:endParaRPr lang="en-AU" sz="1400" b="0" i="0" u="none" strike="noStrike" dirty="0">
-                        <a:solidFill>
-                          <a:srgbClr val="000000"/>
-                        </a:solidFill>
-                        <a:effectLst/>
-                        <a:latin typeface="Calibri" panose="020F0502020204030204" pitchFamily="34" charset="0"/>
-                      </a:endParaRPr>
-                    </a:p>
-                  </a:txBody>
-                  <a:tcPr marL="7620" marR="7620" marT="7620" marB="0" anchor="b"/>
-                </a:tc>
-                <a:extLst>
-                  <a:ext uri="{0D108BD9-81ED-4DB2-BD59-A6C34878D82A}">
-                    <a16:rowId xmlns:a16="http://schemas.microsoft.com/office/drawing/2014/main" val="1150312825"/>
-                  </a:ext>
-                </a:extLst>
-              </a:tr>
-              <a:tr h="0">
-                <a:tc>
-                  <a:txBody>
-                    <a:bodyPr/>
-                    <a:lstStyle/>
-                    <a:p>
-                      <a:pPr algn="l" fontAlgn="b"/>
-                      <a:r>
-                        <a:rPr lang="en-AU" sz="1400" u="none" strike="noStrike" dirty="0">
-                          <a:effectLst/>
-                        </a:rPr>
-                        <a:t>Training</a:t>
-                      </a:r>
-                      <a:endParaRPr lang="en-AU" sz="1400" b="0" i="0" u="none" strike="noStrike" dirty="0">
-                        <a:solidFill>
-                          <a:srgbClr val="000000"/>
-                        </a:solidFill>
-                        <a:effectLst/>
-                        <a:latin typeface="Calibri" panose="020F0502020204030204" pitchFamily="34" charset="0"/>
-                      </a:endParaRPr>
-                    </a:p>
-                  </a:txBody>
-                  <a:tcPr marL="7620" marR="7620" marT="7620" marB="0" anchor="b"/>
-                </a:tc>
-                <a:tc>
-                  <a:txBody>
-                    <a:bodyPr/>
-                    <a:lstStyle/>
-                    <a:p>
-                      <a:pPr algn="l" fontAlgn="b"/>
-                      <a:r>
-                        <a:rPr lang="en-AU" sz="1400" u="none" strike="noStrike" dirty="0">
-                          <a:effectLst/>
-                        </a:rPr>
-                        <a:t>R2</a:t>
-                      </a:r>
-                      <a:endParaRPr lang="en-AU" sz="1400" b="0" i="0" u="none" strike="noStrike" dirty="0">
-                        <a:solidFill>
-                          <a:srgbClr val="000000"/>
-                        </a:solidFill>
-                        <a:effectLst/>
-                        <a:latin typeface="Calibri" panose="020F0502020204030204" pitchFamily="34" charset="0"/>
-                      </a:endParaRPr>
-                    </a:p>
-                  </a:txBody>
-                  <a:tcPr marL="7620" marR="7620" marT="7620" marB="0" anchor="b"/>
-                </a:tc>
-                <a:tc>
-                  <a:txBody>
-                    <a:bodyPr/>
-                    <a:lstStyle/>
-                    <a:p>
-                      <a:pPr algn="l" fontAlgn="b"/>
-                      <a:r>
-                        <a:rPr lang="en-AU" sz="1400" u="none" strike="noStrike" dirty="0">
-                          <a:effectLst/>
-                        </a:rPr>
-                        <a:t>free?</a:t>
-                      </a:r>
-                      <a:endParaRPr lang="en-AU" sz="1400" b="0" i="1" u="none" strike="noStrike" dirty="0">
-                        <a:solidFill>
-                          <a:srgbClr val="000000"/>
-                        </a:solidFill>
-                        <a:effectLst/>
-                        <a:latin typeface="Calibri" panose="020F0502020204030204" pitchFamily="34" charset="0"/>
-                      </a:endParaRPr>
-                    </a:p>
-                  </a:txBody>
-                  <a:tcPr marL="7620" marR="7620" marT="7620" marB="0" anchor="b"/>
-                </a:tc>
-                <a:tc>
-                  <a:txBody>
-                    <a:bodyPr/>
-                    <a:lstStyle/>
-                    <a:p>
-                      <a:pPr algn="l" fontAlgn="b"/>
-                      <a:r>
-                        <a:rPr lang="en-AU" sz="1400" u="none" strike="noStrike" dirty="0">
-                          <a:effectLst/>
-                        </a:rPr>
-                        <a:t>EEE</a:t>
-                      </a:r>
-                      <a:endParaRPr lang="en-AU" sz="1400" b="0" i="1" u="none" strike="noStrike" dirty="0">
-                        <a:solidFill>
-                          <a:srgbClr val="000000"/>
-                        </a:solidFill>
-                        <a:effectLst/>
-                        <a:latin typeface="Calibri" panose="020F0502020204030204" pitchFamily="34" charset="0"/>
-                      </a:endParaRPr>
-                    </a:p>
-                  </a:txBody>
-                  <a:tcPr marL="7620" marR="7620" marT="7620" marB="0" anchor="b"/>
-                </a:tc>
-                <a:tc>
-                  <a:txBody>
-                    <a:bodyPr/>
-                    <a:lstStyle/>
-                    <a:p>
-                      <a:pPr algn="l" fontAlgn="b"/>
-                      <a:r>
-                        <a:rPr lang="en-AU" sz="1400" u="none" strike="noStrike" dirty="0">
-                          <a:effectLst/>
-                        </a:rPr>
-                        <a:t>4v (3cl)</a:t>
-                      </a:r>
-                      <a:endParaRPr lang="en-AU" sz="1400" b="0" i="0" u="none" strike="noStrike" dirty="0">
-                        <a:solidFill>
-                          <a:srgbClr val="000000"/>
-                        </a:solidFill>
-                        <a:effectLst/>
-                        <a:latin typeface="Calibri" panose="020F0502020204030204" pitchFamily="34" charset="0"/>
-                      </a:endParaRPr>
-                    </a:p>
-                  </a:txBody>
-                  <a:tcPr marL="7620" marR="7620" marT="7620" marB="0" anchor="b"/>
-                </a:tc>
-                <a:tc>
-                  <a:txBody>
-                    <a:bodyPr/>
-                    <a:lstStyle/>
-                    <a:p>
-                      <a:pPr algn="l" fontAlgn="b"/>
-                      <a:r>
-                        <a:rPr lang="en-AU" sz="1400" u="none" strike="noStrike" dirty="0">
-                          <a:effectLst/>
-                        </a:rPr>
-                        <a:t>1_0</a:t>
-                      </a:r>
-                      <a:endParaRPr lang="en-AU" sz="1400" b="0" i="1" u="none" strike="noStrike" dirty="0">
-                        <a:solidFill>
-                          <a:srgbClr val="000000"/>
-                        </a:solidFill>
-                        <a:effectLst/>
-                        <a:latin typeface="Calibri" panose="020F0502020204030204" pitchFamily="34" charset="0"/>
-                      </a:endParaRPr>
-                    </a:p>
-                  </a:txBody>
-                  <a:tcPr marL="7620" marR="7620" marT="7620" marB="0" anchor="b"/>
-                </a:tc>
-                <a:tc>
-                  <a:txBody>
-                    <a:bodyPr/>
-                    <a:lstStyle/>
-                    <a:p>
-                      <a:pPr marL="0" marR="0" lvl="0" indent="0" algn="l" defTabSz="914400" rtl="0" eaLnBrk="1" fontAlgn="b" latinLnBrk="0" hangingPunct="1">
-                        <a:lnSpc>
-                          <a:spcPct val="100000"/>
-                        </a:lnSpc>
-                        <a:spcBef>
-                          <a:spcPts val="0"/>
-                        </a:spcBef>
-                        <a:spcAft>
-                          <a:spcPts val="0"/>
-                        </a:spcAft>
-                        <a:buClrTx/>
-                        <a:buSzTx/>
-                        <a:buFontTx/>
-                        <a:buNone/>
-                        <a:tabLst/>
-                        <a:defRPr/>
-                      </a:pPr>
-                      <a:r>
-                        <a:rPr lang="en-AU" sz="1400" u="none" strike="noStrike" dirty="0">
-                          <a:effectLst/>
-                        </a:rPr>
-                        <a:t>banana_p6_0_1_t1</a:t>
-                      </a:r>
-                      <a:endParaRPr lang="en-AU" sz="1400" b="0" i="0" u="none" strike="noStrike" dirty="0">
-                        <a:solidFill>
-                          <a:srgbClr val="000000"/>
-                        </a:solidFill>
-                        <a:effectLst/>
-                        <a:latin typeface="Calibri" panose="020F0502020204030204" pitchFamily="34" charset="0"/>
-                      </a:endParaRPr>
-                    </a:p>
-                  </a:txBody>
-                  <a:tcPr marL="7620" marR="7620" marT="7620" marB="0" anchor="b"/>
-                </a:tc>
-                <a:tc>
-                  <a:txBody>
-                    <a:bodyPr/>
-                    <a:lstStyle/>
-                    <a:p>
-                      <a:pPr marL="0" marR="0" lvl="0" indent="0" algn="l" defTabSz="914400" rtl="0" eaLnBrk="1" fontAlgn="b" latinLnBrk="0" hangingPunct="1">
-                        <a:lnSpc>
-                          <a:spcPct val="100000"/>
-                        </a:lnSpc>
-                        <a:spcBef>
-                          <a:spcPts val="0"/>
-                        </a:spcBef>
-                        <a:spcAft>
-                          <a:spcPts val="0"/>
-                        </a:spcAft>
-                        <a:buClrTx/>
-                        <a:buSzTx/>
-                        <a:buFontTx/>
-                        <a:buNone/>
-                        <a:tabLst/>
-                        <a:defRPr/>
-                      </a:pPr>
-                      <a:r>
-                        <a:rPr lang="en-AU" sz="1400" u="none" strike="noStrike" dirty="0">
-                          <a:effectLst/>
-                        </a:rPr>
-                        <a:t>p4_path_t2</a:t>
-                      </a:r>
-                      <a:endParaRPr lang="en-AU" sz="1400" b="0" i="0" u="none" strike="noStrike" dirty="0">
-                        <a:solidFill>
-                          <a:srgbClr val="000000"/>
-                        </a:solidFill>
-                        <a:effectLst/>
-                        <a:latin typeface="Calibri" panose="020F0502020204030204" pitchFamily="34" charset="0"/>
-                      </a:endParaRPr>
-                    </a:p>
-                  </a:txBody>
-                  <a:tcPr marL="7620" marR="7620" marT="7620" marB="0" anchor="b"/>
-                </a:tc>
-                <a:extLst>
-                  <a:ext uri="{0D108BD9-81ED-4DB2-BD59-A6C34878D82A}">
-                    <a16:rowId xmlns:a16="http://schemas.microsoft.com/office/drawing/2014/main" val="1236360087"/>
-                  </a:ext>
-                </a:extLst>
-              </a:tr>
-            </a:tbl>
-          </a:graphicData>
-        </a:graphic>
-      </p:graphicFrame>
     </p:spTree>
     <p:extLst>
       <p:ext uri="{BB962C8B-B14F-4D97-AF65-F5344CB8AC3E}">

</xml_diff>

<commit_message>
rep simulations and save tpaths
</commit_message>
<xml_diff>
--- a/paper/figures/Experimental design graphics.pptx
+++ b/paper/figures/Experimental design graphics.pptx
@@ -291,7 +291,7 @@
           <a:p>
             <a:fld id="{B25803F7-6624-424E-B78C-2F27C4BCE53D}" type="datetimeFigureOut">
               <a:rPr lang="en-AU" smtClean="0"/>
-              <a:t>19/10/2020</a:t>
+              <a:t>20/10/2020</a:t>
             </a:fld>
             <a:endParaRPr lang="en-AU"/>
           </a:p>
@@ -491,7 +491,7 @@
           <a:p>
             <a:fld id="{B25803F7-6624-424E-B78C-2F27C4BCE53D}" type="datetimeFigureOut">
               <a:rPr lang="en-AU" smtClean="0"/>
-              <a:t>19/10/2020</a:t>
+              <a:t>20/10/2020</a:t>
             </a:fld>
             <a:endParaRPr lang="en-AU"/>
           </a:p>
@@ -701,7 +701,7 @@
           <a:p>
             <a:fld id="{B25803F7-6624-424E-B78C-2F27C4BCE53D}" type="datetimeFigureOut">
               <a:rPr lang="en-AU" smtClean="0"/>
-              <a:t>19/10/2020</a:t>
+              <a:t>20/10/2020</a:t>
             </a:fld>
             <a:endParaRPr lang="en-AU"/>
           </a:p>
@@ -901,7 +901,7 @@
           <a:p>
             <a:fld id="{B25803F7-6624-424E-B78C-2F27C4BCE53D}" type="datetimeFigureOut">
               <a:rPr lang="en-AU" smtClean="0"/>
-              <a:t>19/10/2020</a:t>
+              <a:t>20/10/2020</a:t>
             </a:fld>
             <a:endParaRPr lang="en-AU"/>
           </a:p>
@@ -1177,7 +1177,7 @@
           <a:p>
             <a:fld id="{B25803F7-6624-424E-B78C-2F27C4BCE53D}" type="datetimeFigureOut">
               <a:rPr lang="en-AU" smtClean="0"/>
-              <a:t>19/10/2020</a:t>
+              <a:t>20/10/2020</a:t>
             </a:fld>
             <a:endParaRPr lang="en-AU"/>
           </a:p>
@@ -1445,7 +1445,7 @@
           <a:p>
             <a:fld id="{B25803F7-6624-424E-B78C-2F27C4BCE53D}" type="datetimeFigureOut">
               <a:rPr lang="en-AU" smtClean="0"/>
-              <a:t>19/10/2020</a:t>
+              <a:t>20/10/2020</a:t>
             </a:fld>
             <a:endParaRPr lang="en-AU"/>
           </a:p>
@@ -1860,7 +1860,7 @@
           <a:p>
             <a:fld id="{B25803F7-6624-424E-B78C-2F27C4BCE53D}" type="datetimeFigureOut">
               <a:rPr lang="en-AU" smtClean="0"/>
-              <a:t>19/10/2020</a:t>
+              <a:t>20/10/2020</a:t>
             </a:fld>
             <a:endParaRPr lang="en-AU"/>
           </a:p>
@@ -2002,7 +2002,7 @@
           <a:p>
             <a:fld id="{B25803F7-6624-424E-B78C-2F27C4BCE53D}" type="datetimeFigureOut">
               <a:rPr lang="en-AU" smtClean="0"/>
-              <a:t>19/10/2020</a:t>
+              <a:t>20/10/2020</a:t>
             </a:fld>
             <a:endParaRPr lang="en-AU"/>
           </a:p>
@@ -2115,7 +2115,7 @@
           <a:p>
             <a:fld id="{B25803F7-6624-424E-B78C-2F27C4BCE53D}" type="datetimeFigureOut">
               <a:rPr lang="en-AU" smtClean="0"/>
-              <a:t>19/10/2020</a:t>
+              <a:t>20/10/2020</a:t>
             </a:fld>
             <a:endParaRPr lang="en-AU"/>
           </a:p>
@@ -2428,7 +2428,7 @@
           <a:p>
             <a:fld id="{B25803F7-6624-424E-B78C-2F27C4BCE53D}" type="datetimeFigureOut">
               <a:rPr lang="en-AU" smtClean="0"/>
-              <a:t>19/10/2020</a:t>
+              <a:t>20/10/2020</a:t>
             </a:fld>
             <a:endParaRPr lang="en-AU"/>
           </a:p>
@@ -2717,7 +2717,7 @@
           <a:p>
             <a:fld id="{B25803F7-6624-424E-B78C-2F27C4BCE53D}" type="datetimeFigureOut">
               <a:rPr lang="en-AU" smtClean="0"/>
-              <a:t>19/10/2020</a:t>
+              <a:t>20/10/2020</a:t>
             </a:fld>
             <a:endParaRPr lang="en-AU"/>
           </a:p>
@@ -2960,7 +2960,7 @@
           <a:p>
             <a:fld id="{B25803F7-6624-424E-B78C-2F27C4BCE53D}" type="datetimeFigureOut">
               <a:rPr lang="en-AU" smtClean="0"/>
-              <a:t>19/10/2020</a:t>
+              <a:t>20/10/2020</a:t>
             </a:fld>
             <a:endParaRPr lang="en-AU"/>
           </a:p>
@@ -12955,7 +12955,7 @@
           <p:nvPr>
             <p:extLst>
               <p:ext uri="{D42A27DB-BD31-4B8C-83A1-F6EECF244321}">
-                <p14:modId xmlns:p14="http://schemas.microsoft.com/office/powerpoint/2010/main" val="421211506"/>
+                <p14:modId xmlns:p14="http://schemas.microsoft.com/office/powerpoint/2010/main" val="3177639207"/>
               </p:ext>
             </p:extLst>
           </p:nvPr>
@@ -13567,7 +13567,7 @@
                         <a:rPr lang="en-AU" sz="1400" u="none" strike="noStrike" dirty="0">
                           <a:effectLst/>
                         </a:rPr>
-                        <a:t>p4_path_t1</a:t>
+                        <a:t>tpath_p4_t</a:t>
                       </a:r>
                       <a:endParaRPr lang="en-AU" sz="1400" b="0" i="0" u="none" strike="noStrike" dirty="0">
                         <a:solidFill>
@@ -13757,7 +13757,7 @@
                           <a:effectLst/>
                           <a:latin typeface="Calibri" panose="020F0502020204030204" pitchFamily="34" charset="0"/>
                         </a:rPr>
-                        <a:t>p4_path1</a:t>
+                        <a:t>tpath_p4</a:t>
                       </a:r>
                     </a:p>
                   </a:txBody>
@@ -14019,15 +14019,22 @@
                         <a:defRPr/>
                       </a:pPr>
                       <a:r>
-                        <a:rPr lang="en-AU" sz="1400" b="0" i="0" u="none" strike="noStrike" dirty="0">
+                        <a:rPr lang="en-AU" sz="1400" b="0" i="0" u="none" strike="noStrike">
                           <a:solidFill>
                             <a:srgbClr val="000000"/>
                           </a:solidFill>
                           <a:effectLst/>
                           <a:latin typeface="Calibri" panose="020F0502020204030204" pitchFamily="34" charset="0"/>
                         </a:rPr>
-                        <a:t>p6_path1</a:t>
-                      </a:r>
+                        <a:t>tpath_p6</a:t>
+                      </a:r>
+                      <a:endParaRPr lang="en-AU" sz="1400" b="0" i="0" u="none" strike="noStrike" dirty="0">
+                        <a:solidFill>
+                          <a:srgbClr val="000000"/>
+                        </a:solidFill>
+                        <a:effectLst/>
+                        <a:latin typeface="Calibri" panose="020F0502020204030204" pitchFamily="34" charset="0"/>
+                      </a:endParaRPr>
                     </a:p>
                   </a:txBody>
                   <a:tcPr marL="7620" marR="7620" marT="7620" marB="0" anchor="b">

</xml_diff>

<commit_message>
preloader. Debug before futher dev.
</commit_message>
<xml_diff>
--- a/paper/figures/Experimental design graphics.pptx
+++ b/paper/figures/Experimental design graphics.pptx
@@ -291,7 +291,7 @@
           <a:p>
             <a:fld id="{B25803F7-6624-424E-B78C-2F27C4BCE53D}" type="datetimeFigureOut">
               <a:rPr lang="en-AU" smtClean="0"/>
-              <a:t>24/10/2020</a:t>
+              <a:t>28/10/2020</a:t>
             </a:fld>
             <a:endParaRPr lang="en-AU"/>
           </a:p>
@@ -491,7 +491,7 @@
           <a:p>
             <a:fld id="{B25803F7-6624-424E-B78C-2F27C4BCE53D}" type="datetimeFigureOut">
               <a:rPr lang="en-AU" smtClean="0"/>
-              <a:t>24/10/2020</a:t>
+              <a:t>28/10/2020</a:t>
             </a:fld>
             <a:endParaRPr lang="en-AU"/>
           </a:p>
@@ -701,7 +701,7 @@
           <a:p>
             <a:fld id="{B25803F7-6624-424E-B78C-2F27C4BCE53D}" type="datetimeFigureOut">
               <a:rPr lang="en-AU" smtClean="0"/>
-              <a:t>24/10/2020</a:t>
+              <a:t>28/10/2020</a:t>
             </a:fld>
             <a:endParaRPr lang="en-AU"/>
           </a:p>
@@ -901,7 +901,7 @@
           <a:p>
             <a:fld id="{B25803F7-6624-424E-B78C-2F27C4BCE53D}" type="datetimeFigureOut">
               <a:rPr lang="en-AU" smtClean="0"/>
-              <a:t>24/10/2020</a:t>
+              <a:t>28/10/2020</a:t>
             </a:fld>
             <a:endParaRPr lang="en-AU"/>
           </a:p>
@@ -1177,7 +1177,7 @@
           <a:p>
             <a:fld id="{B25803F7-6624-424E-B78C-2F27C4BCE53D}" type="datetimeFigureOut">
               <a:rPr lang="en-AU" smtClean="0"/>
-              <a:t>24/10/2020</a:t>
+              <a:t>28/10/2020</a:t>
             </a:fld>
             <a:endParaRPr lang="en-AU"/>
           </a:p>
@@ -1445,7 +1445,7 @@
           <a:p>
             <a:fld id="{B25803F7-6624-424E-B78C-2F27C4BCE53D}" type="datetimeFigureOut">
               <a:rPr lang="en-AU" smtClean="0"/>
-              <a:t>24/10/2020</a:t>
+              <a:t>28/10/2020</a:t>
             </a:fld>
             <a:endParaRPr lang="en-AU"/>
           </a:p>
@@ -1860,7 +1860,7 @@
           <a:p>
             <a:fld id="{B25803F7-6624-424E-B78C-2F27C4BCE53D}" type="datetimeFigureOut">
               <a:rPr lang="en-AU" smtClean="0"/>
-              <a:t>24/10/2020</a:t>
+              <a:t>28/10/2020</a:t>
             </a:fld>
             <a:endParaRPr lang="en-AU"/>
           </a:p>
@@ -2002,7 +2002,7 @@
           <a:p>
             <a:fld id="{B25803F7-6624-424E-B78C-2F27C4BCE53D}" type="datetimeFigureOut">
               <a:rPr lang="en-AU" smtClean="0"/>
-              <a:t>24/10/2020</a:t>
+              <a:t>28/10/2020</a:t>
             </a:fld>
             <a:endParaRPr lang="en-AU"/>
           </a:p>
@@ -2115,7 +2115,7 @@
           <a:p>
             <a:fld id="{B25803F7-6624-424E-B78C-2F27C4BCE53D}" type="datetimeFigureOut">
               <a:rPr lang="en-AU" smtClean="0"/>
-              <a:t>24/10/2020</a:t>
+              <a:t>28/10/2020</a:t>
             </a:fld>
             <a:endParaRPr lang="en-AU"/>
           </a:p>
@@ -2428,7 +2428,7 @@
           <a:p>
             <a:fld id="{B25803F7-6624-424E-B78C-2F27C4BCE53D}" type="datetimeFigureOut">
               <a:rPr lang="en-AU" smtClean="0"/>
-              <a:t>24/10/2020</a:t>
+              <a:t>28/10/2020</a:t>
             </a:fld>
             <a:endParaRPr lang="en-AU"/>
           </a:p>
@@ -2717,7 +2717,7 @@
           <a:p>
             <a:fld id="{B25803F7-6624-424E-B78C-2F27C4BCE53D}" type="datetimeFigureOut">
               <a:rPr lang="en-AU" smtClean="0"/>
-              <a:t>24/10/2020</a:t>
+              <a:t>28/10/2020</a:t>
             </a:fld>
             <a:endParaRPr lang="en-AU"/>
           </a:p>
@@ -2960,7 +2960,7 @@
           <a:p>
             <a:fld id="{B25803F7-6624-424E-B78C-2F27C4BCE53D}" type="datetimeFigureOut">
               <a:rPr lang="en-AU" smtClean="0"/>
-              <a:t>24/10/2020</a:t>
+              <a:t>28/10/2020</a:t>
             </a:fld>
             <a:endParaRPr lang="en-AU"/>
           </a:p>

</xml_diff>

<commit_message>
check-in before gutting most content
</commit_message>
<xml_diff>
--- a/paper/figures/Experimental design graphics.pptx
+++ b/paper/figures/Experimental design graphics.pptx
@@ -3428,14 +3428,14 @@
           <p:nvPr>
             <p:extLst>
               <p:ext uri="{D42A27DB-BD31-4B8C-83A1-F6EECF244321}">
-                <p14:modId xmlns:p14="http://schemas.microsoft.com/office/powerpoint/2010/main" val="2391761152"/>
+                <p14:modId xmlns:p14="http://schemas.microsoft.com/office/powerpoint/2010/main" val="1759590984"/>
               </p:ext>
             </p:extLst>
           </p:nvPr>
         </p:nvGraphicFramePr>
         <p:xfrm>
           <a:off x="414020" y="318600"/>
-          <a:ext cx="14683406" cy="6220800"/>
+          <a:ext cx="14683406" cy="6495120"/>
         </p:xfrm>
         <a:graphic>
           <a:graphicData uri="http://schemas.openxmlformats.org/drawingml/2006/table">
@@ -4139,6 +4139,37 @@
                       <a:r>
                         <a:rPr lang="en-US" dirty="0"/>
                         <a:t>Fixed order; period 1 is 1&amp;2, period 2 is 2&amp;3, period 3 is 3&amp;1</a:t>
+                      </a:r>
+                    </a:p>
+                    <a:p>
+                      <a:pPr marL="0" marR="0" lvl="0" indent="0" algn="l" defTabSz="914400" rtl="0" eaLnBrk="1" fontAlgn="auto" latinLnBrk="0" hangingPunct="1">
+                        <a:lnSpc>
+                          <a:spcPct val="100000"/>
+                        </a:lnSpc>
+                        <a:spcBef>
+                          <a:spcPts val="0"/>
+                        </a:spcBef>
+                        <a:spcAft>
+                          <a:spcPts val="0"/>
+                        </a:spcAft>
+                        <a:buClrTx/>
+                        <a:buSzTx/>
+                        <a:buFontTx/>
+                        <a:buNone/>
+                        <a:tabLst/>
+                        <a:defRPr/>
+                      </a:pPr>
+                      <a:r>
+                        <a:rPr lang="en-US" dirty="0"/>
+                        <a:t>-all </a:t>
+                      </a:r>
+                      <a:r>
+                        <a:rPr lang="en-US" dirty="0" err="1"/>
+                        <a:t>sep</a:t>
+                      </a:r>
+                      <a:r>
+                        <a:rPr lang="en-US" dirty="0"/>
+                        <a:t> from a to b is in 1 var, split that 50-50</a:t>
                       </a:r>
                     </a:p>
                   </a:txBody>
@@ -12955,7 +12986,7 @@
           <p:nvPr>
             <p:extLst>
               <p:ext uri="{D42A27DB-BD31-4B8C-83A1-F6EECF244321}">
-                <p14:modId xmlns:p14="http://schemas.microsoft.com/office/powerpoint/2010/main" val="3177639207"/>
+                <p14:modId xmlns:p14="http://schemas.microsoft.com/office/powerpoint/2010/main" val="667204706"/>
               </p:ext>
             </p:extLst>
           </p:nvPr>
@@ -13484,477 +13515,6 @@
                     <a:bodyPr/>
                     <a:lstStyle/>
                     <a:p>
-                      <a:pPr algn="l" fontAlgn="b"/>
-                      <a:r>
-                        <a:rPr lang="en-AU" sz="1400" u="none" strike="noStrike" dirty="0">
-                          <a:effectLst/>
-                        </a:rPr>
-                        <a:t>1_0</a:t>
-                      </a:r>
-                      <a:endParaRPr lang="en-AU" sz="1400" b="0" i="1" u="none" strike="noStrike" dirty="0">
-                        <a:solidFill>
-                          <a:srgbClr val="000000"/>
-                        </a:solidFill>
-                        <a:effectLst/>
-                        <a:latin typeface="Calibri" panose="020F0502020204030204" pitchFamily="34" charset="0"/>
-                      </a:endParaRPr>
-                    </a:p>
-                  </a:txBody>
-                  <a:tcPr marL="7620" marR="7620" marT="7620" marB="0" anchor="b">
-                    <a:lnT w="12700" cap="flat" cmpd="sng" algn="ctr">
-                      <a:solidFill>
-                        <a:schemeClr val="tx1"/>
-                      </a:solidFill>
-                      <a:prstDash val="solid"/>
-                      <a:round/>
-                      <a:headEnd type="none" w="med" len="med"/>
-                      <a:tailEnd type="none" w="med" len="med"/>
-                    </a:lnT>
-                    <a:solidFill>
-                      <a:schemeClr val="accent6">
-                        <a:lumMod val="40000"/>
-                        <a:lumOff val="60000"/>
-                      </a:schemeClr>
-                    </a:solidFill>
-                  </a:tcPr>
-                </a:tc>
-                <a:tc>
-                  <a:txBody>
-                    <a:bodyPr/>
-                    <a:lstStyle/>
-                    <a:p>
-                      <a:pPr algn="l" fontAlgn="b"/>
-                      <a:r>
-                        <a:rPr lang="en-AU" sz="1400" u="none" strike="noStrike" dirty="0">
-                          <a:effectLst/>
-                        </a:rPr>
-                        <a:t>EEE_p4_0_1_t1</a:t>
-                      </a:r>
-                      <a:endParaRPr lang="en-AU" sz="1400" b="0" i="0" u="none" strike="noStrike" dirty="0">
-                        <a:solidFill>
-                          <a:srgbClr val="000000"/>
-                        </a:solidFill>
-                        <a:effectLst/>
-                        <a:latin typeface="Calibri" panose="020F0502020204030204" pitchFamily="34" charset="0"/>
-                      </a:endParaRPr>
-                    </a:p>
-                  </a:txBody>
-                  <a:tcPr marL="7620" marR="7620" marT="7620" marB="0" anchor="b">
-                    <a:lnT w="12700" cap="flat" cmpd="sng" algn="ctr">
-                      <a:solidFill>
-                        <a:schemeClr val="tx1"/>
-                      </a:solidFill>
-                      <a:prstDash val="solid"/>
-                      <a:round/>
-                      <a:headEnd type="none" w="med" len="med"/>
-                      <a:tailEnd type="none" w="med" len="med"/>
-                    </a:lnT>
-                    <a:solidFill>
-                      <a:schemeClr val="accent6">
-                        <a:lumMod val="40000"/>
-                        <a:lumOff val="60000"/>
-                      </a:schemeClr>
-                    </a:solidFill>
-                  </a:tcPr>
-                </a:tc>
-                <a:tc>
-                  <a:txBody>
-                    <a:bodyPr/>
-                    <a:lstStyle/>
-                    <a:p>
-                      <a:pPr algn="l" fontAlgn="b"/>
-                      <a:r>
-                        <a:rPr lang="en-AU" sz="1400" u="none" strike="noStrike" dirty="0">
-                          <a:effectLst/>
-                        </a:rPr>
-                        <a:t>tpath_p4_t</a:t>
-                      </a:r>
-                      <a:endParaRPr lang="en-AU" sz="1400" b="0" i="0" u="none" strike="noStrike" dirty="0">
-                        <a:solidFill>
-                          <a:srgbClr val="000000"/>
-                        </a:solidFill>
-                        <a:effectLst/>
-                        <a:latin typeface="Calibri" panose="020F0502020204030204" pitchFamily="34" charset="0"/>
-                      </a:endParaRPr>
-                    </a:p>
-                  </a:txBody>
-                  <a:tcPr marL="7620" marR="7620" marT="7620" marB="0" anchor="b">
-                    <a:lnT w="12700" cap="flat" cmpd="sng" algn="ctr">
-                      <a:solidFill>
-                        <a:schemeClr val="tx1"/>
-                      </a:solidFill>
-                      <a:prstDash val="solid"/>
-                      <a:round/>
-                      <a:headEnd type="none" w="med" len="med"/>
-                      <a:tailEnd type="none" w="med" len="med"/>
-                    </a:lnT>
-                    <a:solidFill>
-                      <a:schemeClr val="accent6">
-                        <a:lumMod val="40000"/>
-                        <a:lumOff val="60000"/>
-                      </a:schemeClr>
-                    </a:solidFill>
-                  </a:tcPr>
-                </a:tc>
-                <a:extLst>
-                  <a:ext uri="{0D108BD9-81ED-4DB2-BD59-A6C34878D82A}">
-                    <a16:rowId xmlns:a16="http://schemas.microsoft.com/office/drawing/2014/main" val="3399423660"/>
-                  </a:ext>
-                </a:extLst>
-              </a:tr>
-              <a:tr h="0">
-                <a:tc>
-                  <a:txBody>
-                    <a:bodyPr/>
-                    <a:lstStyle/>
-                    <a:p>
-                      <a:pPr algn="l" fontAlgn="b"/>
-                      <a:r>
-                        <a:rPr lang="en-AU" sz="1400" b="0" i="0" u="none" strike="noStrike" dirty="0">
-                          <a:solidFill>
-                            <a:srgbClr val="000000"/>
-                          </a:solidFill>
-                          <a:effectLst/>
-                          <a:latin typeface="Calibri" panose="020F0502020204030204" pitchFamily="34" charset="0"/>
-                        </a:rPr>
-                        <a:t>1</a:t>
-                      </a:r>
-                    </a:p>
-                  </a:txBody>
-                  <a:tcPr marL="7620" marR="7620" marT="7620" marB="0" anchor="b"/>
-                </a:tc>
-                <a:tc>
-                  <a:txBody>
-                    <a:bodyPr/>
-                    <a:lstStyle/>
-                    <a:p>
-                      <a:pPr algn="l" fontAlgn="b"/>
-                      <a:r>
-                        <a:rPr lang="en-AU" sz="1400" b="0" i="0" u="none" strike="noStrike" dirty="0">
-                          <a:solidFill>
-                            <a:srgbClr val="000000"/>
-                          </a:solidFill>
-                          <a:effectLst/>
-                          <a:latin typeface="Calibri" panose="020F0502020204030204" pitchFamily="34" charset="0"/>
-                        </a:rPr>
-                        <a:t>1</a:t>
-                      </a:r>
-                    </a:p>
-                  </a:txBody>
-                  <a:tcPr marL="7620" marR="7620" marT="7620" marB="0" anchor="b"/>
-                </a:tc>
-                <a:tc>
-                  <a:txBody>
-                    <a:bodyPr/>
-                    <a:lstStyle/>
-                    <a:p>
-                      <a:pPr algn="l" fontAlgn="b"/>
-                      <a:r>
-                        <a:rPr lang="en-AU" sz="1400" b="0" i="1" u="none" strike="noStrike" dirty="0">
-                          <a:solidFill>
-                            <a:srgbClr val="000000"/>
-                          </a:solidFill>
-                          <a:effectLst/>
-                          <a:latin typeface="Calibri" panose="020F0502020204030204" pitchFamily="34" charset="0"/>
-                        </a:rPr>
-                        <a:t>Grand</a:t>
-                      </a:r>
-                    </a:p>
-                  </a:txBody>
-                  <a:tcPr marL="7620" marR="7620" marT="7620" marB="0" anchor="b"/>
-                </a:tc>
-                <a:tc>
-                  <a:txBody>
-                    <a:bodyPr/>
-                    <a:lstStyle/>
-                    <a:p>
-                      <a:pPr algn="l" fontAlgn="b"/>
-                      <a:r>
-                        <a:rPr lang="en-AU" sz="1400" b="0" i="1" u="none" strike="noStrike" dirty="0">
-                          <a:solidFill>
-                            <a:srgbClr val="000000"/>
-                          </a:solidFill>
-                          <a:effectLst/>
-                          <a:latin typeface="Calibri" panose="020F0502020204030204" pitchFamily="34" charset="0"/>
-                        </a:rPr>
-                        <a:t>1</a:t>
-                      </a:r>
-                    </a:p>
-                  </a:txBody>
-                  <a:tcPr marL="7620" marR="7620" marT="7620" marB="0" anchor="b"/>
-                </a:tc>
-                <a:tc>
-                  <a:txBody>
-                    <a:bodyPr/>
-                    <a:lstStyle/>
-                    <a:p>
-                      <a:pPr algn="l" fontAlgn="b"/>
-                      <a:r>
-                        <a:rPr lang="en-AU" sz="1400" b="0" i="0" u="none" strike="noStrike" dirty="0">
-                          <a:solidFill>
-                            <a:srgbClr val="000000"/>
-                          </a:solidFill>
-                          <a:effectLst/>
-                          <a:latin typeface="Calibri" panose="020F0502020204030204" pitchFamily="34" charset="0"/>
-                        </a:rPr>
-                        <a:t>4v (3cl)</a:t>
-                      </a:r>
-                    </a:p>
-                  </a:txBody>
-                  <a:tcPr marL="7620" marR="7620" marT="7620" marB="0" anchor="b"/>
-                </a:tc>
-                <a:tc>
-                  <a:txBody>
-                    <a:bodyPr/>
-                    <a:lstStyle/>
-                    <a:p>
-                      <a:pPr algn="l" fontAlgn="b"/>
-                      <a:r>
-                        <a:rPr lang="en-AU" sz="1400" b="0" i="1" u="none" strike="noStrike" dirty="0">
-                          <a:solidFill>
-                            <a:srgbClr val="000000"/>
-                          </a:solidFill>
-                          <a:effectLst/>
-                          <a:latin typeface="Calibri" panose="020F0502020204030204" pitchFamily="34" charset="0"/>
-                        </a:rPr>
-                        <a:t>1</a:t>
-                      </a:r>
-                    </a:p>
-                  </a:txBody>
-                  <a:tcPr marL="7620" marR="7620" marT="7620" marB="0" anchor="b"/>
-                </a:tc>
-                <a:tc>
-                  <a:txBody>
-                    <a:bodyPr/>
-                    <a:lstStyle/>
-                    <a:p>
-                      <a:pPr algn="l" fontAlgn="b"/>
-                      <a:r>
-                        <a:rPr lang="en-AU" sz="1400" b="0" i="0" u="none" strike="noStrike" dirty="0">
-                          <a:solidFill>
-                            <a:srgbClr val="000000"/>
-                          </a:solidFill>
-                          <a:effectLst/>
-                          <a:latin typeface="Calibri" panose="020F0502020204030204" pitchFamily="34" charset="0"/>
-                        </a:rPr>
-                        <a:t>EEE_p4_50_50_rep1</a:t>
-                      </a:r>
-                    </a:p>
-                  </a:txBody>
-                  <a:tcPr marL="7620" marR="7620" marT="7620" marB="0" anchor="b"/>
-                </a:tc>
-                <a:tc>
-                  <a:txBody>
-                    <a:bodyPr/>
-                    <a:lstStyle/>
-                    <a:p>
-                      <a:pPr algn="l" fontAlgn="b"/>
-                      <a:r>
-                        <a:rPr lang="en-AU" sz="1400" b="0" i="0" u="none" strike="noStrike" dirty="0">
-                          <a:solidFill>
-                            <a:srgbClr val="000000"/>
-                          </a:solidFill>
-                          <a:effectLst/>
-                          <a:latin typeface="Calibri" panose="020F0502020204030204" pitchFamily="34" charset="0"/>
-                        </a:rPr>
-                        <a:t>tpath_p4</a:t>
-                      </a:r>
-                    </a:p>
-                  </a:txBody>
-                  <a:tcPr marL="7620" marR="7620" marT="7620" marB="0" anchor="b"/>
-                </a:tc>
-                <a:extLst>
-                  <a:ext uri="{0D108BD9-81ED-4DB2-BD59-A6C34878D82A}">
-                    <a16:rowId xmlns:a16="http://schemas.microsoft.com/office/drawing/2014/main" val="1150312825"/>
-                  </a:ext>
-                </a:extLst>
-              </a:tr>
-              <a:tr h="0">
-                <a:tc>
-                  <a:txBody>
-                    <a:bodyPr/>
-                    <a:lstStyle/>
-                    <a:p>
-                      <a:pPr algn="l" fontAlgn="b"/>
-                      <a:r>
-                        <a:rPr lang="en-AU" sz="1400" b="0" i="0" u="none" strike="noStrike" dirty="0">
-                          <a:solidFill>
-                            <a:srgbClr val="000000"/>
-                          </a:solidFill>
-                          <a:effectLst/>
-                          <a:latin typeface="Calibri" panose="020F0502020204030204" pitchFamily="34" charset="0"/>
-                        </a:rPr>
-                        <a:t>1</a:t>
-                      </a:r>
-                    </a:p>
-                  </a:txBody>
-                  <a:tcPr marL="7620" marR="7620" marT="7620" marB="0" anchor="b">
-                    <a:lnB w="12700" cap="flat" cmpd="sng" algn="ctr">
-                      <a:solidFill>
-                        <a:schemeClr val="tx1"/>
-                      </a:solidFill>
-                      <a:prstDash val="solid"/>
-                      <a:round/>
-                      <a:headEnd type="none" w="med" len="med"/>
-                      <a:tailEnd type="none" w="med" len="med"/>
-                    </a:lnB>
-                  </a:tcPr>
-                </a:tc>
-                <a:tc>
-                  <a:txBody>
-                    <a:bodyPr/>
-                    <a:lstStyle/>
-                    <a:p>
-                      <a:pPr algn="l" fontAlgn="b"/>
-                      <a:r>
-                        <a:rPr lang="en-AU" sz="1400" b="0" i="0" u="none" strike="noStrike" dirty="0">
-                          <a:solidFill>
-                            <a:srgbClr val="000000"/>
-                          </a:solidFill>
-                          <a:effectLst/>
-                          <a:latin typeface="Calibri" panose="020F0502020204030204" pitchFamily="34" charset="0"/>
-                        </a:rPr>
-                        <a:t>2</a:t>
-                      </a:r>
-                    </a:p>
-                  </a:txBody>
-                  <a:tcPr marL="7620" marR="7620" marT="7620" marB="0" anchor="b">
-                    <a:lnB w="12700" cap="flat" cmpd="sng" algn="ctr">
-                      <a:solidFill>
-                        <a:schemeClr val="tx1"/>
-                      </a:solidFill>
-                      <a:prstDash val="solid"/>
-                      <a:round/>
-                      <a:headEnd type="none" w="med" len="med"/>
-                      <a:tailEnd type="none" w="med" len="med"/>
-                    </a:lnB>
-                  </a:tcPr>
-                </a:tc>
-                <a:tc>
-                  <a:txBody>
-                    <a:bodyPr/>
-                    <a:lstStyle/>
-                    <a:p>
-                      <a:pPr algn="l" fontAlgn="b"/>
-                      <a:r>
-                        <a:rPr lang="en-AU" sz="1400" b="0" i="1" u="none" strike="noStrike" dirty="0">
-                          <a:solidFill>
-                            <a:srgbClr val="000000"/>
-                          </a:solidFill>
-                          <a:effectLst/>
-                          <a:latin typeface="Calibri" panose="020F0502020204030204" pitchFamily="34" charset="0"/>
-                        </a:rPr>
-                        <a:t>Grand</a:t>
-                      </a:r>
-                    </a:p>
-                  </a:txBody>
-                  <a:tcPr marL="7620" marR="7620" marT="7620" marB="0" anchor="b">
-                    <a:lnB w="12700" cap="flat" cmpd="sng" algn="ctr">
-                      <a:solidFill>
-                        <a:schemeClr val="tx1"/>
-                      </a:solidFill>
-                      <a:prstDash val="solid"/>
-                      <a:round/>
-                      <a:headEnd type="none" w="med" len="med"/>
-                      <a:tailEnd type="none" w="med" len="med"/>
-                    </a:lnB>
-                  </a:tcPr>
-                </a:tc>
-                <a:tc>
-                  <a:txBody>
-                    <a:bodyPr/>
-                    <a:lstStyle/>
-                    <a:p>
-                      <a:pPr algn="l" fontAlgn="b"/>
-                      <a:r>
-                        <a:rPr lang="en-AU" sz="1400" b="0" i="1" u="none" strike="noStrike" dirty="0">
-                          <a:solidFill>
-                            <a:srgbClr val="000000"/>
-                          </a:solidFill>
-                          <a:effectLst/>
-                          <a:latin typeface="Calibri" panose="020F0502020204030204" pitchFamily="34" charset="0"/>
-                        </a:rPr>
-                        <a:t>1</a:t>
-                      </a:r>
-                    </a:p>
-                  </a:txBody>
-                  <a:tcPr marL="7620" marR="7620" marT="7620" marB="0" anchor="b">
-                    <a:lnB w="12700" cap="flat" cmpd="sng" algn="ctr">
-                      <a:solidFill>
-                        <a:schemeClr val="tx1"/>
-                      </a:solidFill>
-                      <a:prstDash val="solid"/>
-                      <a:round/>
-                      <a:headEnd type="none" w="med" len="med"/>
-                      <a:tailEnd type="none" w="med" len="med"/>
-                    </a:lnB>
-                  </a:tcPr>
-                </a:tc>
-                <a:tc>
-                  <a:txBody>
-                    <a:bodyPr/>
-                    <a:lstStyle/>
-                    <a:p>
-                      <a:pPr algn="l" fontAlgn="b"/>
-                      <a:r>
-                        <a:rPr lang="en-AU" sz="1400" b="0" i="0" u="none" strike="noStrike" dirty="0">
-                          <a:solidFill>
-                            <a:srgbClr val="000000"/>
-                          </a:solidFill>
-                          <a:effectLst/>
-                          <a:latin typeface="Calibri" panose="020F0502020204030204" pitchFamily="34" charset="0"/>
-                        </a:rPr>
-                        <a:t>6v in (4cl)</a:t>
-                      </a:r>
-                    </a:p>
-                  </a:txBody>
-                  <a:tcPr marL="7620" marR="7620" marT="7620" marB="0" anchor="b">
-                    <a:lnB w="12700" cap="flat" cmpd="sng" algn="ctr">
-                      <a:solidFill>
-                        <a:schemeClr val="tx1"/>
-                      </a:solidFill>
-                      <a:prstDash val="solid"/>
-                      <a:round/>
-                      <a:headEnd type="none" w="med" len="med"/>
-                      <a:tailEnd type="none" w="med" len="med"/>
-                    </a:lnB>
-                  </a:tcPr>
-                </a:tc>
-                <a:tc>
-                  <a:txBody>
-                    <a:bodyPr/>
-                    <a:lstStyle/>
-                    <a:p>
-                      <a:pPr algn="l" fontAlgn="b"/>
-                      <a:r>
-                        <a:rPr lang="en-AU" sz="1400" b="0" i="1" u="none" strike="noStrike" dirty="0">
-                          <a:solidFill>
-                            <a:srgbClr val="000000"/>
-                          </a:solidFill>
-                          <a:effectLst/>
-                          <a:latin typeface="Calibri" panose="020F0502020204030204" pitchFamily="34" charset="0"/>
-                        </a:rPr>
-                        <a:t>2</a:t>
-                      </a:r>
-                    </a:p>
-                  </a:txBody>
-                  <a:tcPr marL="7620" marR="7620" marT="7620" marB="0" anchor="b">
-                    <a:lnB w="12700" cap="flat" cmpd="sng" algn="ctr">
-                      <a:solidFill>
-                        <a:schemeClr val="tx1"/>
-                      </a:solidFill>
-                      <a:prstDash val="solid"/>
-                      <a:round/>
-                      <a:headEnd type="none" w="med" len="med"/>
-                      <a:tailEnd type="none" w="med" len="med"/>
-                    </a:lnB>
-                  </a:tcPr>
-                </a:tc>
-                <a:tc>
-                  <a:txBody>
-                    <a:bodyPr/>
-                    <a:lstStyle/>
-                    <a:p>
                       <a:pPr marL="0" marR="0" lvl="0" indent="0" algn="l" defTabSz="914400" rtl="0" eaLnBrk="1" fontAlgn="b" latinLnBrk="0" hangingPunct="1">
                         <a:lnSpc>
                           <a:spcPct val="100000"/>
@@ -13980,21 +13540,212 @@
                           <a:effectLst/>
                           <a:latin typeface="Calibri" panose="020F0502020204030204" pitchFamily="34" charset="0"/>
                         </a:rPr>
-                        <a:t>banana_p6_50_50_rep1</a:t>
+                        <a:t>33_66</a:t>
                       </a:r>
                     </a:p>
                   </a:txBody>
                   <a:tcPr marL="7620" marR="7620" marT="7620" marB="0" anchor="b">
-                    <a:lnB w="12700" cap="flat" cmpd="sng" algn="ctr">
-                      <a:solidFill>
-                        <a:schemeClr val="tx1"/>
-                      </a:solidFill>
-                      <a:prstDash val="solid"/>
-                      <a:round/>
-                      <a:headEnd type="none" w="med" len="med"/>
-                      <a:tailEnd type="none" w="med" len="med"/>
-                    </a:lnB>
-                  </a:tcPr>
+                    <a:lnT w="12700" cap="flat" cmpd="sng" algn="ctr">
+                      <a:solidFill>
+                        <a:schemeClr val="tx1"/>
+                      </a:solidFill>
+                      <a:prstDash val="solid"/>
+                      <a:round/>
+                      <a:headEnd type="none" w="med" len="med"/>
+                      <a:tailEnd type="none" w="med" len="med"/>
+                    </a:lnT>
+                    <a:solidFill>
+                      <a:schemeClr val="accent6">
+                        <a:lumMod val="40000"/>
+                        <a:lumOff val="60000"/>
+                      </a:schemeClr>
+                    </a:solidFill>
+                  </a:tcPr>
+                </a:tc>
+                <a:tc>
+                  <a:txBody>
+                    <a:bodyPr/>
+                    <a:lstStyle/>
+                    <a:p>
+                      <a:pPr algn="l" fontAlgn="b"/>
+                      <a:r>
+                        <a:rPr lang="en-AU" sz="1400" u="none" strike="noStrike" dirty="0">
+                          <a:effectLst/>
+                        </a:rPr>
+                        <a:t>EEE_p4_0_1_t1</a:t>
+                      </a:r>
+                      <a:endParaRPr lang="en-AU" sz="1400" b="0" i="0" u="none" strike="noStrike" dirty="0">
+                        <a:solidFill>
+                          <a:srgbClr val="000000"/>
+                        </a:solidFill>
+                        <a:effectLst/>
+                        <a:latin typeface="Calibri" panose="020F0502020204030204" pitchFamily="34" charset="0"/>
+                      </a:endParaRPr>
+                    </a:p>
+                  </a:txBody>
+                  <a:tcPr marL="7620" marR="7620" marT="7620" marB="0" anchor="b">
+                    <a:lnT w="12700" cap="flat" cmpd="sng" algn="ctr">
+                      <a:solidFill>
+                        <a:schemeClr val="tx1"/>
+                      </a:solidFill>
+                      <a:prstDash val="solid"/>
+                      <a:round/>
+                      <a:headEnd type="none" w="med" len="med"/>
+                      <a:tailEnd type="none" w="med" len="med"/>
+                    </a:lnT>
+                    <a:solidFill>
+                      <a:schemeClr val="accent6">
+                        <a:lumMod val="40000"/>
+                        <a:lumOff val="60000"/>
+                      </a:schemeClr>
+                    </a:solidFill>
+                  </a:tcPr>
+                </a:tc>
+                <a:tc>
+                  <a:txBody>
+                    <a:bodyPr/>
+                    <a:lstStyle/>
+                    <a:p>
+                      <a:pPr algn="l" fontAlgn="b"/>
+                      <a:r>
+                        <a:rPr lang="en-AU" sz="1400" u="none" strike="noStrike" dirty="0">
+                          <a:effectLst/>
+                        </a:rPr>
+                        <a:t>tpath_p4_t</a:t>
+                      </a:r>
+                      <a:endParaRPr lang="en-AU" sz="1400" b="0" i="0" u="none" strike="noStrike" dirty="0">
+                        <a:solidFill>
+                          <a:srgbClr val="000000"/>
+                        </a:solidFill>
+                        <a:effectLst/>
+                        <a:latin typeface="Calibri" panose="020F0502020204030204" pitchFamily="34" charset="0"/>
+                      </a:endParaRPr>
+                    </a:p>
+                  </a:txBody>
+                  <a:tcPr marL="7620" marR="7620" marT="7620" marB="0" anchor="b">
+                    <a:lnT w="12700" cap="flat" cmpd="sng" algn="ctr">
+                      <a:solidFill>
+                        <a:schemeClr val="tx1"/>
+                      </a:solidFill>
+                      <a:prstDash val="solid"/>
+                      <a:round/>
+                      <a:headEnd type="none" w="med" len="med"/>
+                      <a:tailEnd type="none" w="med" len="med"/>
+                    </a:lnT>
+                    <a:solidFill>
+                      <a:schemeClr val="accent6">
+                        <a:lumMod val="40000"/>
+                        <a:lumOff val="60000"/>
+                      </a:schemeClr>
+                    </a:solidFill>
+                  </a:tcPr>
+                </a:tc>
+                <a:extLst>
+                  <a:ext uri="{0D108BD9-81ED-4DB2-BD59-A6C34878D82A}">
+                    <a16:rowId xmlns:a16="http://schemas.microsoft.com/office/drawing/2014/main" val="3399423660"/>
+                  </a:ext>
+                </a:extLst>
+              </a:tr>
+              <a:tr h="0">
+                <a:tc>
+                  <a:txBody>
+                    <a:bodyPr/>
+                    <a:lstStyle/>
+                    <a:p>
+                      <a:pPr algn="l" fontAlgn="b"/>
+                      <a:r>
+                        <a:rPr lang="en-AU" sz="1400" b="0" i="0" u="none" strike="noStrike" dirty="0">
+                          <a:solidFill>
+                            <a:srgbClr val="000000"/>
+                          </a:solidFill>
+                          <a:effectLst/>
+                          <a:latin typeface="Calibri" panose="020F0502020204030204" pitchFamily="34" charset="0"/>
+                        </a:rPr>
+                        <a:t>1</a:t>
+                      </a:r>
+                    </a:p>
+                  </a:txBody>
+                  <a:tcPr marL="7620" marR="7620" marT="7620" marB="0" anchor="b"/>
+                </a:tc>
+                <a:tc>
+                  <a:txBody>
+                    <a:bodyPr/>
+                    <a:lstStyle/>
+                    <a:p>
+                      <a:pPr algn="l" fontAlgn="b"/>
+                      <a:r>
+                        <a:rPr lang="en-AU" sz="1400" b="0" i="0" u="none" strike="noStrike" dirty="0">
+                          <a:solidFill>
+                            <a:srgbClr val="000000"/>
+                          </a:solidFill>
+                          <a:effectLst/>
+                          <a:latin typeface="Calibri" panose="020F0502020204030204" pitchFamily="34" charset="0"/>
+                        </a:rPr>
+                        <a:t>1</a:t>
+                      </a:r>
+                    </a:p>
+                  </a:txBody>
+                  <a:tcPr marL="7620" marR="7620" marT="7620" marB="0" anchor="b"/>
+                </a:tc>
+                <a:tc>
+                  <a:txBody>
+                    <a:bodyPr/>
+                    <a:lstStyle/>
+                    <a:p>
+                      <a:pPr algn="l" fontAlgn="b"/>
+                      <a:r>
+                        <a:rPr lang="en-AU" sz="1400" b="0" i="1" u="none" strike="noStrike" dirty="0">
+                          <a:solidFill>
+                            <a:srgbClr val="000000"/>
+                          </a:solidFill>
+                          <a:effectLst/>
+                          <a:latin typeface="Calibri" panose="020F0502020204030204" pitchFamily="34" charset="0"/>
+                        </a:rPr>
+                        <a:t>Grand</a:t>
+                      </a:r>
+                    </a:p>
+                  </a:txBody>
+                  <a:tcPr marL="7620" marR="7620" marT="7620" marB="0" anchor="b"/>
+                </a:tc>
+                <a:tc>
+                  <a:txBody>
+                    <a:bodyPr/>
+                    <a:lstStyle/>
+                    <a:p>
+                      <a:pPr algn="l" fontAlgn="b"/>
+                      <a:r>
+                        <a:rPr lang="en-AU" sz="1400" b="0" i="0" u="none" strike="noStrike" dirty="0">
+                          <a:solidFill>
+                            <a:srgbClr val="000000"/>
+                          </a:solidFill>
+                          <a:effectLst/>
+                          <a:latin typeface="Calibri" panose="020F0502020204030204" pitchFamily="34" charset="0"/>
+                        </a:rPr>
+                        <a:t>EEE</a:t>
+                      </a:r>
+                    </a:p>
+                  </a:txBody>
+                  <a:tcPr marL="7620" marR="7620" marT="7620" marB="0" anchor="b"/>
+                </a:tc>
+                <a:tc>
+                  <a:txBody>
+                    <a:bodyPr/>
+                    <a:lstStyle/>
+                    <a:p>
+                      <a:pPr algn="l" fontAlgn="b"/>
+                      <a:r>
+                        <a:rPr lang="en-AU" sz="1400" b="0" i="0" u="none" strike="noStrike" dirty="0">
+                          <a:solidFill>
+                            <a:srgbClr val="000000"/>
+                          </a:solidFill>
+                          <a:effectLst/>
+                          <a:latin typeface="Calibri" panose="020F0502020204030204" pitchFamily="34" charset="0"/>
+                        </a:rPr>
+                        <a:t>4v (3cl)</a:t>
+                      </a:r>
+                    </a:p>
+                  </a:txBody>
+                  <a:tcPr marL="7620" marR="7620" marT="7620" marB="0" anchor="b"/>
                 </a:tc>
                 <a:tc>
                   <a:txBody>
@@ -14019,16 +13770,12 @@
                         <a:defRPr/>
                       </a:pPr>
                       <a:r>
-                        <a:rPr lang="en-AU" sz="1400" b="0" i="0" u="none" strike="noStrike">
-                          <a:solidFill>
-                            <a:srgbClr val="000000"/>
-                          </a:solidFill>
+                        <a:rPr lang="en-AU" sz="1400" u="none" strike="noStrike" dirty="0">
                           <a:effectLst/>
-                          <a:latin typeface="Calibri" panose="020F0502020204030204" pitchFamily="34" charset="0"/>
                         </a:rPr>
-                        <a:t>tpath_p6</a:t>
-                      </a:r>
-                      <a:endParaRPr lang="en-AU" sz="1400" b="0" i="0" u="none" strike="noStrike" dirty="0">
+                        <a:t>1_0</a:t>
+                      </a:r>
+                      <a:endParaRPr lang="en-AU" sz="1400" b="0" i="1" u="none" strike="noStrike" dirty="0">
                         <a:solidFill>
                           <a:srgbClr val="000000"/>
                         </a:solidFill>
@@ -14037,63 +13784,7 @@
                       </a:endParaRPr>
                     </a:p>
                   </a:txBody>
-                  <a:tcPr marL="7620" marR="7620" marT="7620" marB="0" anchor="b">
-                    <a:lnB w="12700" cap="flat" cmpd="sng" algn="ctr">
-                      <a:solidFill>
-                        <a:schemeClr val="tx1"/>
-                      </a:solidFill>
-                      <a:prstDash val="solid"/>
-                      <a:round/>
-                      <a:headEnd type="none" w="med" len="med"/>
-                      <a:tailEnd type="none" w="med" len="med"/>
-                    </a:lnB>
-                  </a:tcPr>
-                </a:tc>
-                <a:extLst>
-                  <a:ext uri="{0D108BD9-81ED-4DB2-BD59-A6C34878D82A}">
-                    <a16:rowId xmlns:a16="http://schemas.microsoft.com/office/drawing/2014/main" val="1236360087"/>
-                  </a:ext>
-                </a:extLst>
-              </a:tr>
-              <a:tr h="0">
-                <a:tc>
-                  <a:txBody>
-                    <a:bodyPr/>
-                    <a:lstStyle/>
-                    <a:p>
-                      <a:pPr algn="l" fontAlgn="b"/>
-                      <a:r>
-                        <a:rPr lang="en-AU" sz="1400" u="none" strike="noStrike" dirty="0">
-                          <a:effectLst/>
-                        </a:rPr>
-                        <a:t>2</a:t>
-                      </a:r>
-                      <a:endParaRPr lang="en-AU" sz="1400" b="0" i="0" u="none" strike="noStrike" dirty="0">
-                        <a:solidFill>
-                          <a:srgbClr val="000000"/>
-                        </a:solidFill>
-                        <a:effectLst/>
-                        <a:latin typeface="Calibri" panose="020F0502020204030204" pitchFamily="34" charset="0"/>
-                      </a:endParaRPr>
-                    </a:p>
-                  </a:txBody>
-                  <a:tcPr marL="7620" marR="7620" marT="7620" marB="0" anchor="b">
-                    <a:lnT w="12700" cap="flat" cmpd="sng" algn="ctr">
-                      <a:solidFill>
-                        <a:schemeClr val="tx1"/>
-                      </a:solidFill>
-                      <a:prstDash val="solid"/>
-                      <a:round/>
-                      <a:headEnd type="none" w="med" len="med"/>
-                      <a:tailEnd type="none" w="med" len="med"/>
-                    </a:lnT>
-                    <a:solidFill>
-                      <a:schemeClr val="accent6">
-                        <a:lumMod val="40000"/>
-                        <a:lumOff val="60000"/>
-                      </a:schemeClr>
-                    </a:solidFill>
-                  </a:tcPr>
+                  <a:tcPr marL="7620" marR="7620" marT="7620" marB="0" anchor="b"/>
                 </a:tc>
                 <a:tc>
                   <a:txBody>
@@ -14109,26 +13800,97 @@
                           <a:effectLst/>
                           <a:latin typeface="Calibri" panose="020F0502020204030204" pitchFamily="34" charset="0"/>
                         </a:rPr>
-                        <a:t>Training</a:t>
+                        <a:t>EEE_p4_50_50_rep1</a:t>
+                      </a:r>
+                    </a:p>
+                  </a:txBody>
+                  <a:tcPr marL="7620" marR="7620" marT="7620" marB="0" anchor="b"/>
+                </a:tc>
+                <a:tc>
+                  <a:txBody>
+                    <a:bodyPr/>
+                    <a:lstStyle/>
+                    <a:p>
+                      <a:pPr algn="l" fontAlgn="b"/>
+                      <a:r>
+                        <a:rPr lang="en-AU" sz="1400" b="0" i="0" u="none" strike="noStrike" dirty="0">
+                          <a:solidFill>
+                            <a:srgbClr val="000000"/>
+                          </a:solidFill>
+                          <a:effectLst/>
+                          <a:latin typeface="Calibri" panose="020F0502020204030204" pitchFamily="34" charset="0"/>
+                        </a:rPr>
+                        <a:t>tpath_p4</a:t>
+                      </a:r>
+                    </a:p>
+                  </a:txBody>
+                  <a:tcPr marL="7620" marR="7620" marT="7620" marB="0" anchor="b"/>
+                </a:tc>
+                <a:extLst>
+                  <a:ext uri="{0D108BD9-81ED-4DB2-BD59-A6C34878D82A}">
+                    <a16:rowId xmlns:a16="http://schemas.microsoft.com/office/drawing/2014/main" val="1150312825"/>
+                  </a:ext>
+                </a:extLst>
+              </a:tr>
+              <a:tr h="0">
+                <a:tc>
+                  <a:txBody>
+                    <a:bodyPr/>
+                    <a:lstStyle/>
+                    <a:p>
+                      <a:pPr algn="l" fontAlgn="b"/>
+                      <a:r>
+                        <a:rPr lang="en-AU" sz="1400" b="0" i="0" u="none" strike="noStrike" dirty="0">
+                          <a:solidFill>
+                            <a:srgbClr val="000000"/>
+                          </a:solidFill>
+                          <a:effectLst/>
+                          <a:latin typeface="Calibri" panose="020F0502020204030204" pitchFamily="34" charset="0"/>
+                        </a:rPr>
+                        <a:t>1</a:t>
                       </a:r>
                     </a:p>
                   </a:txBody>
                   <a:tcPr marL="7620" marR="7620" marT="7620" marB="0" anchor="b">
-                    <a:lnT w="12700" cap="flat" cmpd="sng" algn="ctr">
-                      <a:solidFill>
-                        <a:schemeClr val="tx1"/>
-                      </a:solidFill>
-                      <a:prstDash val="solid"/>
-                      <a:round/>
-                      <a:headEnd type="none" w="med" len="med"/>
-                      <a:tailEnd type="none" w="med" len="med"/>
-                    </a:lnT>
-                    <a:solidFill>
-                      <a:schemeClr val="accent6">
-                        <a:lumMod val="40000"/>
-                        <a:lumOff val="60000"/>
-                      </a:schemeClr>
-                    </a:solidFill>
+                    <a:lnB w="12700" cap="flat" cmpd="sng" algn="ctr">
+                      <a:solidFill>
+                        <a:schemeClr val="tx1"/>
+                      </a:solidFill>
+                      <a:prstDash val="solid"/>
+                      <a:round/>
+                      <a:headEnd type="none" w="med" len="med"/>
+                      <a:tailEnd type="none" w="med" len="med"/>
+                    </a:lnB>
+                  </a:tcPr>
+                </a:tc>
+                <a:tc>
+                  <a:txBody>
+                    <a:bodyPr/>
+                    <a:lstStyle/>
+                    <a:p>
+                      <a:pPr algn="l" fontAlgn="b"/>
+                      <a:r>
+                        <a:rPr lang="en-AU" sz="1400" b="0" i="0" u="none" strike="noStrike" dirty="0">
+                          <a:solidFill>
+                            <a:srgbClr val="000000"/>
+                          </a:solidFill>
+                          <a:effectLst/>
+                          <a:latin typeface="Calibri" panose="020F0502020204030204" pitchFamily="34" charset="0"/>
+                        </a:rPr>
+                        <a:t>2</a:t>
+                      </a:r>
+                    </a:p>
+                  </a:txBody>
+                  <a:tcPr marL="7620" marR="7620" marT="7620" marB="0" anchor="b">
+                    <a:lnB w="12700" cap="flat" cmpd="sng" algn="ctr">
+                      <a:solidFill>
+                        <a:schemeClr val="tx1"/>
+                      </a:solidFill>
+                      <a:prstDash val="solid"/>
+                      <a:round/>
+                      <a:headEnd type="none" w="med" len="med"/>
+                      <a:tailEnd type="none" w="med" len="med"/>
+                    </a:lnB>
                   </a:tcPr>
                 </a:tc>
                 <a:tc>
@@ -14145,26 +13907,20 @@
                           <a:effectLst/>
                           <a:latin typeface="Calibri" panose="020F0502020204030204" pitchFamily="34" charset="0"/>
                         </a:rPr>
-                        <a:t>Radial</a:t>
+                        <a:t>Grand</a:t>
                       </a:r>
                     </a:p>
                   </a:txBody>
                   <a:tcPr marL="7620" marR="7620" marT="7620" marB="0" anchor="b">
-                    <a:lnT w="12700" cap="flat" cmpd="sng" algn="ctr">
-                      <a:solidFill>
-                        <a:schemeClr val="tx1"/>
-                      </a:solidFill>
-                      <a:prstDash val="solid"/>
-                      <a:round/>
-                      <a:headEnd type="none" w="med" len="med"/>
-                      <a:tailEnd type="none" w="med" len="med"/>
-                    </a:lnT>
-                    <a:solidFill>
-                      <a:schemeClr val="accent6">
-                        <a:lumMod val="40000"/>
-                        <a:lumOff val="60000"/>
-                      </a:schemeClr>
-                    </a:solidFill>
+                    <a:lnB w="12700" cap="flat" cmpd="sng" algn="ctr">
+                      <a:solidFill>
+                        <a:schemeClr val="tx1"/>
+                      </a:solidFill>
+                      <a:prstDash val="solid"/>
+                      <a:round/>
+                      <a:headEnd type="none" w="med" len="med"/>
+                      <a:tailEnd type="none" w="med" len="med"/>
+                    </a:lnB>
                   </a:tcPr>
                 </a:tc>
                 <a:tc>
@@ -14174,36 +13930,27 @@
                     <a:p>
                       <a:pPr algn="l" fontAlgn="b"/>
                       <a:r>
-                        <a:rPr lang="en-AU" sz="1400" u="none" strike="noStrike" dirty="0">
+                        <a:rPr lang="en-AU" sz="1400" b="0" i="0" u="none" strike="noStrike" dirty="0">
+                          <a:solidFill>
+                            <a:srgbClr val="000000"/>
+                          </a:solidFill>
                           <a:effectLst/>
+                          <a:latin typeface="Calibri" panose="020F0502020204030204" pitchFamily="34" charset="0"/>
                         </a:rPr>
                         <a:t>EEE</a:t>
                       </a:r>
-                      <a:endParaRPr lang="en-AU" sz="1400" b="0" i="1" u="none" strike="noStrike" dirty="0">
-                        <a:solidFill>
-                          <a:srgbClr val="000000"/>
-                        </a:solidFill>
-                        <a:effectLst/>
-                        <a:latin typeface="Calibri" panose="020F0502020204030204" pitchFamily="34" charset="0"/>
-                      </a:endParaRPr>
                     </a:p>
                   </a:txBody>
                   <a:tcPr marL="7620" marR="7620" marT="7620" marB="0" anchor="b">
-                    <a:lnT w="12700" cap="flat" cmpd="sng" algn="ctr">
-                      <a:solidFill>
-                        <a:schemeClr val="tx1"/>
-                      </a:solidFill>
-                      <a:prstDash val="solid"/>
-                      <a:round/>
-                      <a:headEnd type="none" w="med" len="med"/>
-                      <a:tailEnd type="none" w="med" len="med"/>
-                    </a:lnT>
-                    <a:solidFill>
-                      <a:schemeClr val="accent6">
-                        <a:lumMod val="40000"/>
-                        <a:lumOff val="60000"/>
-                      </a:schemeClr>
-                    </a:solidFill>
+                    <a:lnB w="12700" cap="flat" cmpd="sng" algn="ctr">
+                      <a:solidFill>
+                        <a:schemeClr val="tx1"/>
+                      </a:solidFill>
+                      <a:prstDash val="solid"/>
+                      <a:round/>
+                      <a:headEnd type="none" w="med" len="med"/>
+                      <a:tailEnd type="none" w="med" len="med"/>
+                    </a:lnB>
                   </a:tcPr>
                 </a:tc>
                 <a:tc>
@@ -14213,36 +13960,27 @@
                     <a:p>
                       <a:pPr algn="l" fontAlgn="b"/>
                       <a:r>
-                        <a:rPr lang="en-AU" sz="1400" u="none" strike="noStrike" dirty="0">
+                        <a:rPr lang="en-AU" sz="1400" b="0" i="0" u="none" strike="noStrike" dirty="0">
+                          <a:solidFill>
+                            <a:srgbClr val="000000"/>
+                          </a:solidFill>
                           <a:effectLst/>
+                          <a:latin typeface="Calibri" panose="020F0502020204030204" pitchFamily="34" charset="0"/>
                         </a:rPr>
-                        <a:t>4v (3cl)</a:t>
-                      </a:r>
-                      <a:endParaRPr lang="en-AU" sz="1400" b="0" i="0" u="none" strike="noStrike" dirty="0">
-                        <a:solidFill>
-                          <a:srgbClr val="000000"/>
-                        </a:solidFill>
-                        <a:effectLst/>
-                        <a:latin typeface="Calibri" panose="020F0502020204030204" pitchFamily="34" charset="0"/>
-                      </a:endParaRPr>
+                        <a:t>6v in (4cl)</a:t>
+                      </a:r>
                     </a:p>
                   </a:txBody>
                   <a:tcPr marL="7620" marR="7620" marT="7620" marB="0" anchor="b">
-                    <a:lnT w="12700" cap="flat" cmpd="sng" algn="ctr">
-                      <a:solidFill>
-                        <a:schemeClr val="tx1"/>
-                      </a:solidFill>
-                      <a:prstDash val="solid"/>
-                      <a:round/>
-                      <a:headEnd type="none" w="med" len="med"/>
-                      <a:tailEnd type="none" w="med" len="med"/>
-                    </a:lnT>
-                    <a:solidFill>
-                      <a:schemeClr val="accent6">
-                        <a:lumMod val="40000"/>
-                        <a:lumOff val="60000"/>
-                      </a:schemeClr>
-                    </a:solidFill>
+                    <a:lnB w="12700" cap="flat" cmpd="sng" algn="ctr">
+                      <a:solidFill>
+                        <a:schemeClr val="tx1"/>
+                      </a:solidFill>
+                      <a:prstDash val="solid"/>
+                      <a:round/>
+                      <a:headEnd type="none" w="med" len="med"/>
+                      <a:tailEnd type="none" w="med" len="med"/>
+                    </a:lnB>
                   </a:tcPr>
                 </a:tc>
                 <a:tc>
@@ -14252,75 +13990,27 @@
                     <a:p>
                       <a:pPr algn="l" fontAlgn="b"/>
                       <a:r>
-                        <a:rPr lang="en-AU" sz="1400" u="none" strike="noStrike" dirty="0">
+                        <a:rPr lang="en-AU" sz="1400" b="0" i="0" u="none" strike="noStrike" dirty="0">
+                          <a:solidFill>
+                            <a:srgbClr val="000000"/>
+                          </a:solidFill>
                           <a:effectLst/>
+                          <a:latin typeface="Calibri" panose="020F0502020204030204" pitchFamily="34" charset="0"/>
                         </a:rPr>
-                        <a:t>1_0</a:t>
-                      </a:r>
-                      <a:endParaRPr lang="en-AU" sz="1400" b="0" i="1" u="none" strike="noStrike" dirty="0">
-                        <a:solidFill>
-                          <a:srgbClr val="000000"/>
-                        </a:solidFill>
-                        <a:effectLst/>
-                        <a:latin typeface="Calibri" panose="020F0502020204030204" pitchFamily="34" charset="0"/>
-                      </a:endParaRPr>
+                        <a:t>33_66</a:t>
+                      </a:r>
                     </a:p>
                   </a:txBody>
                   <a:tcPr marL="7620" marR="7620" marT="7620" marB="0" anchor="b">
-                    <a:lnT w="12700" cap="flat" cmpd="sng" algn="ctr">
-                      <a:solidFill>
-                        <a:schemeClr val="tx1"/>
-                      </a:solidFill>
-                      <a:prstDash val="solid"/>
-                      <a:round/>
-                      <a:headEnd type="none" w="med" len="med"/>
-                      <a:tailEnd type="none" w="med" len="med"/>
-                    </a:lnT>
-                    <a:solidFill>
-                      <a:schemeClr val="accent6">
-                        <a:lumMod val="40000"/>
-                        <a:lumOff val="60000"/>
-                      </a:schemeClr>
-                    </a:solidFill>
-                  </a:tcPr>
-                </a:tc>
-                <a:tc>
-                  <a:txBody>
-                    <a:bodyPr/>
-                    <a:lstStyle/>
-                    <a:p>
-                      <a:pPr algn="l" fontAlgn="b"/>
-                      <a:r>
-                        <a:rPr lang="en-AU" sz="1400" u="none" strike="noStrike" dirty="0">
-                          <a:effectLst/>
-                        </a:rPr>
-                        <a:t>EEE_p4_0_1_t2</a:t>
-                      </a:r>
-                      <a:endParaRPr lang="en-AU" sz="1400" b="0" i="0" u="none" strike="noStrike" dirty="0">
-                        <a:solidFill>
-                          <a:srgbClr val="000000"/>
-                        </a:solidFill>
-                        <a:effectLst/>
-                        <a:latin typeface="Calibri" panose="020F0502020204030204" pitchFamily="34" charset="0"/>
-                      </a:endParaRPr>
-                    </a:p>
-                  </a:txBody>
-                  <a:tcPr marL="7620" marR="7620" marT="7620" marB="0" anchor="b">
-                    <a:lnT w="12700" cap="flat" cmpd="sng" algn="ctr">
-                      <a:solidFill>
-                        <a:schemeClr val="tx1"/>
-                      </a:solidFill>
-                      <a:prstDash val="solid"/>
-                      <a:round/>
-                      <a:headEnd type="none" w="med" len="med"/>
-                      <a:tailEnd type="none" w="med" len="med"/>
-                    </a:lnT>
-                    <a:solidFill>
-                      <a:schemeClr val="accent6">
-                        <a:lumMod val="40000"/>
-                        <a:lumOff val="60000"/>
-                      </a:schemeClr>
-                    </a:solidFill>
+                    <a:lnB w="12700" cap="flat" cmpd="sng" algn="ctr">
+                      <a:solidFill>
+                        <a:schemeClr val="tx1"/>
+                      </a:solidFill>
+                      <a:prstDash val="solid"/>
+                      <a:round/>
+                      <a:headEnd type="none" w="med" len="med"/>
+                      <a:tailEnd type="none" w="med" len="med"/>
+                    </a:lnB>
                   </a:tcPr>
                 </a:tc>
                 <a:tc>
@@ -14353,154 +14043,21 @@
                           <a:effectLst/>
                           <a:latin typeface="Calibri" panose="020F0502020204030204" pitchFamily="34" charset="0"/>
                         </a:rPr>
-                        <a:t>NA</a:t>
+                        <a:t>EEE_p6_50_50_rep1</a:t>
                       </a:r>
                     </a:p>
                   </a:txBody>
                   <a:tcPr marL="7620" marR="7620" marT="7620" marB="0" anchor="b">
-                    <a:lnT w="12700" cap="flat" cmpd="sng" algn="ctr">
-                      <a:solidFill>
-                        <a:schemeClr val="tx1"/>
-                      </a:solidFill>
-                      <a:prstDash val="solid"/>
-                      <a:round/>
-                      <a:headEnd type="none" w="med" len="med"/>
-                      <a:tailEnd type="none" w="med" len="med"/>
-                    </a:lnT>
-                    <a:solidFill>
-                      <a:schemeClr val="accent6">
-                        <a:lumMod val="40000"/>
-                        <a:lumOff val="60000"/>
-                      </a:schemeClr>
-                    </a:solidFill>
-                  </a:tcPr>
-                </a:tc>
-                <a:extLst>
-                  <a:ext uri="{0D108BD9-81ED-4DB2-BD59-A6C34878D82A}">
-                    <a16:rowId xmlns:a16="http://schemas.microsoft.com/office/drawing/2014/main" val="4011408311"/>
-                  </a:ext>
-                </a:extLst>
-              </a:tr>
-              <a:tr h="0">
-                <a:tc>
-                  <a:txBody>
-                    <a:bodyPr/>
-                    <a:lstStyle/>
-                    <a:p>
-                      <a:pPr algn="l" fontAlgn="b"/>
-                      <a:r>
-                        <a:rPr lang="en-AU" sz="1400" b="0" i="0" u="none" strike="noStrike" dirty="0">
-                          <a:solidFill>
-                            <a:srgbClr val="000000"/>
-                          </a:solidFill>
-                          <a:effectLst/>
-                          <a:latin typeface="Calibri" panose="020F0502020204030204" pitchFamily="34" charset="0"/>
-                        </a:rPr>
-                        <a:t>2</a:t>
-                      </a:r>
-                    </a:p>
-                  </a:txBody>
-                  <a:tcPr marL="7620" marR="7620" marT="7620" marB="0" anchor="b"/>
-                </a:tc>
-                <a:tc>
-                  <a:txBody>
-                    <a:bodyPr/>
-                    <a:lstStyle/>
-                    <a:p>
-                      <a:pPr algn="l" fontAlgn="b"/>
-                      <a:r>
-                        <a:rPr lang="en-AU" sz="1400" b="0" i="0" u="none" strike="noStrike" dirty="0">
-                          <a:solidFill>
-                            <a:srgbClr val="000000"/>
-                          </a:solidFill>
-                          <a:effectLst/>
-                          <a:latin typeface="Calibri" panose="020F0502020204030204" pitchFamily="34" charset="0"/>
-                        </a:rPr>
-                        <a:t>3</a:t>
-                      </a:r>
-                    </a:p>
-                  </a:txBody>
-                  <a:tcPr marL="7620" marR="7620" marT="7620" marB="0" anchor="b"/>
-                </a:tc>
-                <a:tc>
-                  <a:txBody>
-                    <a:bodyPr/>
-                    <a:lstStyle/>
-                    <a:p>
-                      <a:pPr algn="l" fontAlgn="b"/>
-                      <a:r>
-                        <a:rPr lang="en-AU" sz="1400" b="0" i="1" u="none" strike="noStrike" dirty="0">
-                          <a:solidFill>
-                            <a:srgbClr val="000000"/>
-                          </a:solidFill>
-                          <a:effectLst/>
-                          <a:latin typeface="Calibri" panose="020F0502020204030204" pitchFamily="34" charset="0"/>
-                        </a:rPr>
-                        <a:t>Radial</a:t>
-                      </a:r>
-                    </a:p>
-                  </a:txBody>
-                  <a:tcPr marL="7620" marR="7620" marT="7620" marB="0" anchor="b"/>
-                </a:tc>
-                <a:tc>
-                  <a:txBody>
-                    <a:bodyPr/>
-                    <a:lstStyle/>
-                    <a:p>
-                      <a:pPr algn="l" fontAlgn="b"/>
-                      <a:r>
-                        <a:rPr lang="en-AU" sz="1400" b="0" i="1" u="none" strike="noStrike" dirty="0">
-                          <a:solidFill>
-                            <a:srgbClr val="000000"/>
-                          </a:solidFill>
-                          <a:effectLst/>
-                          <a:latin typeface="Calibri" panose="020F0502020204030204" pitchFamily="34" charset="0"/>
-                        </a:rPr>
-                        <a:t>2</a:t>
-                      </a:r>
-                    </a:p>
-                  </a:txBody>
-                  <a:tcPr marL="7620" marR="7620" marT="7620" marB="0" anchor="b"/>
-                </a:tc>
-                <a:tc>
-                  <a:txBody>
-                    <a:bodyPr/>
-                    <a:lstStyle/>
-                    <a:p>
-                      <a:pPr algn="l" fontAlgn="b"/>
-                      <a:r>
-                        <a:rPr lang="en-AU" sz="1400" b="0" i="0" u="none" strike="noStrike" dirty="0">
-                          <a:solidFill>
-                            <a:srgbClr val="000000"/>
-                          </a:solidFill>
-                          <a:effectLst/>
-                          <a:latin typeface="Calibri" panose="020F0502020204030204" pitchFamily="34" charset="0"/>
-                        </a:rPr>
-                        <a:t>4v (3cl)</a:t>
-                      </a:r>
-                    </a:p>
-                  </a:txBody>
-                  <a:tcPr marL="7620" marR="7620" marT="7620" marB="0" anchor="b"/>
-                </a:tc>
-                <a:tc>
-                  <a:txBody>
-                    <a:bodyPr/>
-                    <a:lstStyle/>
-                    <a:p>
-                      <a:pPr algn="l" fontAlgn="b"/>
-                      <a:r>
-                        <a:rPr lang="en-AU" sz="1400" b="0" i="1" u="none" strike="noStrike" dirty="0">
-                          <a:solidFill>
-                            <a:srgbClr val="000000"/>
-                          </a:solidFill>
-                          <a:effectLst/>
-                          <a:latin typeface="Calibri" panose="020F0502020204030204" pitchFamily="34" charset="0"/>
-                        </a:rPr>
-                        <a:t>3</a:t>
-                      </a:r>
-                    </a:p>
-                  </a:txBody>
-                  <a:tcPr marL="7620" marR="7620" marT="7620" marB="0" anchor="b"/>
+                    <a:lnB w="12700" cap="flat" cmpd="sng" algn="ctr">
+                      <a:solidFill>
+                        <a:schemeClr val="tx1"/>
+                      </a:solidFill>
+                      <a:prstDash val="solid"/>
+                      <a:round/>
+                      <a:headEnd type="none" w="med" len="med"/>
+                      <a:tailEnd type="none" w="med" len="med"/>
+                    </a:lnB>
+                  </a:tcPr>
                 </a:tc>
                 <a:tc>
                   <a:txBody>
@@ -14525,6 +14082,89 @@
                         <a:defRPr/>
                       </a:pPr>
                       <a:r>
+                        <a:rPr lang="en-AU" sz="1400" b="0" i="0" u="none" strike="noStrike">
+                          <a:solidFill>
+                            <a:srgbClr val="000000"/>
+                          </a:solidFill>
+                          <a:effectLst/>
+                          <a:latin typeface="Calibri" panose="020F0502020204030204" pitchFamily="34" charset="0"/>
+                        </a:rPr>
+                        <a:t>tpath_p6</a:t>
+                      </a:r>
+                      <a:endParaRPr lang="en-AU" sz="1400" b="0" i="0" u="none" strike="noStrike" dirty="0">
+                        <a:solidFill>
+                          <a:srgbClr val="000000"/>
+                        </a:solidFill>
+                        <a:effectLst/>
+                        <a:latin typeface="Calibri" panose="020F0502020204030204" pitchFamily="34" charset="0"/>
+                      </a:endParaRPr>
+                    </a:p>
+                  </a:txBody>
+                  <a:tcPr marL="7620" marR="7620" marT="7620" marB="0" anchor="b">
+                    <a:lnB w="12700" cap="flat" cmpd="sng" algn="ctr">
+                      <a:solidFill>
+                        <a:schemeClr val="tx1"/>
+                      </a:solidFill>
+                      <a:prstDash val="solid"/>
+                      <a:round/>
+                      <a:headEnd type="none" w="med" len="med"/>
+                      <a:tailEnd type="none" w="med" len="med"/>
+                    </a:lnB>
+                  </a:tcPr>
+                </a:tc>
+                <a:extLst>
+                  <a:ext uri="{0D108BD9-81ED-4DB2-BD59-A6C34878D82A}">
+                    <a16:rowId xmlns:a16="http://schemas.microsoft.com/office/drawing/2014/main" val="1236360087"/>
+                  </a:ext>
+                </a:extLst>
+              </a:tr>
+              <a:tr h="0">
+                <a:tc>
+                  <a:txBody>
+                    <a:bodyPr/>
+                    <a:lstStyle/>
+                    <a:p>
+                      <a:pPr algn="l" fontAlgn="b"/>
+                      <a:r>
+                        <a:rPr lang="en-AU" sz="1400" u="none" strike="noStrike" dirty="0">
+                          <a:effectLst/>
+                        </a:rPr>
+                        <a:t>2</a:t>
+                      </a:r>
+                      <a:endParaRPr lang="en-AU" sz="1400" b="0" i="0" u="none" strike="noStrike" dirty="0">
+                        <a:solidFill>
+                          <a:srgbClr val="000000"/>
+                        </a:solidFill>
+                        <a:effectLst/>
+                        <a:latin typeface="Calibri" panose="020F0502020204030204" pitchFamily="34" charset="0"/>
+                      </a:endParaRPr>
+                    </a:p>
+                  </a:txBody>
+                  <a:tcPr marL="7620" marR="7620" marT="7620" marB="0" anchor="b">
+                    <a:lnT w="12700" cap="flat" cmpd="sng" algn="ctr">
+                      <a:solidFill>
+                        <a:schemeClr val="tx1"/>
+                      </a:solidFill>
+                      <a:prstDash val="solid"/>
+                      <a:round/>
+                      <a:headEnd type="none" w="med" len="med"/>
+                      <a:tailEnd type="none" w="med" len="med"/>
+                    </a:lnT>
+                    <a:solidFill>
+                      <a:schemeClr val="accent6">
+                        <a:lumMod val="40000"/>
+                        <a:lumOff val="60000"/>
+                      </a:schemeClr>
+                    </a:solidFill>
+                  </a:tcPr>
+                </a:tc>
+                <a:tc>
+                  <a:txBody>
+                    <a:bodyPr/>
+                    <a:lstStyle/>
+                    <a:p>
+                      <a:pPr algn="l" fontAlgn="b"/>
+                      <a:r>
                         <a:rPr lang="en-AU" sz="1400" b="0" i="0" u="none" strike="noStrike" dirty="0">
                           <a:solidFill>
                             <a:srgbClr val="000000"/>
@@ -14532,11 +14172,223 @@
                           <a:effectLst/>
                           <a:latin typeface="Calibri" panose="020F0502020204030204" pitchFamily="34" charset="0"/>
                         </a:rPr>
-                        <a:t>EEE_p4_50_50_rep2</a:t>
-                      </a:r>
-                    </a:p>
-                  </a:txBody>
-                  <a:tcPr marL="7620" marR="7620" marT="7620" marB="0" anchor="b"/>
+                        <a:t>Training</a:t>
+                      </a:r>
+                    </a:p>
+                  </a:txBody>
+                  <a:tcPr marL="7620" marR="7620" marT="7620" marB="0" anchor="b">
+                    <a:lnT w="12700" cap="flat" cmpd="sng" algn="ctr">
+                      <a:solidFill>
+                        <a:schemeClr val="tx1"/>
+                      </a:solidFill>
+                      <a:prstDash val="solid"/>
+                      <a:round/>
+                      <a:headEnd type="none" w="med" len="med"/>
+                      <a:tailEnd type="none" w="med" len="med"/>
+                    </a:lnT>
+                    <a:solidFill>
+                      <a:schemeClr val="accent6">
+                        <a:lumMod val="40000"/>
+                        <a:lumOff val="60000"/>
+                      </a:schemeClr>
+                    </a:solidFill>
+                  </a:tcPr>
+                </a:tc>
+                <a:tc>
+                  <a:txBody>
+                    <a:bodyPr/>
+                    <a:lstStyle/>
+                    <a:p>
+                      <a:pPr algn="l" fontAlgn="b"/>
+                      <a:r>
+                        <a:rPr lang="en-AU" sz="1400" b="0" i="1" u="none" strike="noStrike" dirty="0">
+                          <a:solidFill>
+                            <a:srgbClr val="000000"/>
+                          </a:solidFill>
+                          <a:effectLst/>
+                          <a:latin typeface="Calibri" panose="020F0502020204030204" pitchFamily="34" charset="0"/>
+                        </a:rPr>
+                        <a:t>Radial</a:t>
+                      </a:r>
+                    </a:p>
+                  </a:txBody>
+                  <a:tcPr marL="7620" marR="7620" marT="7620" marB="0" anchor="b">
+                    <a:lnT w="12700" cap="flat" cmpd="sng" algn="ctr">
+                      <a:solidFill>
+                        <a:schemeClr val="tx1"/>
+                      </a:solidFill>
+                      <a:prstDash val="solid"/>
+                      <a:round/>
+                      <a:headEnd type="none" w="med" len="med"/>
+                      <a:tailEnd type="none" w="med" len="med"/>
+                    </a:lnT>
+                    <a:solidFill>
+                      <a:schemeClr val="accent6">
+                        <a:lumMod val="40000"/>
+                        <a:lumOff val="60000"/>
+                      </a:schemeClr>
+                    </a:solidFill>
+                  </a:tcPr>
+                </a:tc>
+                <a:tc>
+                  <a:txBody>
+                    <a:bodyPr/>
+                    <a:lstStyle/>
+                    <a:p>
+                      <a:pPr algn="l" fontAlgn="b"/>
+                      <a:r>
+                        <a:rPr lang="en-AU" sz="1400" u="none" strike="noStrike" dirty="0">
+                          <a:effectLst/>
+                        </a:rPr>
+                        <a:t>EEE</a:t>
+                      </a:r>
+                      <a:endParaRPr lang="en-AU" sz="1400" b="0" i="1" u="none" strike="noStrike" dirty="0">
+                        <a:solidFill>
+                          <a:srgbClr val="000000"/>
+                        </a:solidFill>
+                        <a:effectLst/>
+                        <a:latin typeface="Calibri" panose="020F0502020204030204" pitchFamily="34" charset="0"/>
+                      </a:endParaRPr>
+                    </a:p>
+                  </a:txBody>
+                  <a:tcPr marL="7620" marR="7620" marT="7620" marB="0" anchor="b">
+                    <a:lnT w="12700" cap="flat" cmpd="sng" algn="ctr">
+                      <a:solidFill>
+                        <a:schemeClr val="tx1"/>
+                      </a:solidFill>
+                      <a:prstDash val="solid"/>
+                      <a:round/>
+                      <a:headEnd type="none" w="med" len="med"/>
+                      <a:tailEnd type="none" w="med" len="med"/>
+                    </a:lnT>
+                    <a:solidFill>
+                      <a:schemeClr val="accent6">
+                        <a:lumMod val="40000"/>
+                        <a:lumOff val="60000"/>
+                      </a:schemeClr>
+                    </a:solidFill>
+                  </a:tcPr>
+                </a:tc>
+                <a:tc>
+                  <a:txBody>
+                    <a:bodyPr/>
+                    <a:lstStyle/>
+                    <a:p>
+                      <a:pPr algn="l" fontAlgn="b"/>
+                      <a:r>
+                        <a:rPr lang="en-AU" sz="1400" u="none" strike="noStrike" dirty="0">
+                          <a:effectLst/>
+                        </a:rPr>
+                        <a:t>4v (3cl)</a:t>
+                      </a:r>
+                      <a:endParaRPr lang="en-AU" sz="1400" b="0" i="0" u="none" strike="noStrike" dirty="0">
+                        <a:solidFill>
+                          <a:srgbClr val="000000"/>
+                        </a:solidFill>
+                        <a:effectLst/>
+                        <a:latin typeface="Calibri" panose="020F0502020204030204" pitchFamily="34" charset="0"/>
+                      </a:endParaRPr>
+                    </a:p>
+                  </a:txBody>
+                  <a:tcPr marL="7620" marR="7620" marT="7620" marB="0" anchor="b">
+                    <a:lnT w="12700" cap="flat" cmpd="sng" algn="ctr">
+                      <a:solidFill>
+                        <a:schemeClr val="tx1"/>
+                      </a:solidFill>
+                      <a:prstDash val="solid"/>
+                      <a:round/>
+                      <a:headEnd type="none" w="med" len="med"/>
+                      <a:tailEnd type="none" w="med" len="med"/>
+                    </a:lnT>
+                    <a:solidFill>
+                      <a:schemeClr val="accent6">
+                        <a:lumMod val="40000"/>
+                        <a:lumOff val="60000"/>
+                      </a:schemeClr>
+                    </a:solidFill>
+                  </a:tcPr>
+                </a:tc>
+                <a:tc>
+                  <a:txBody>
+                    <a:bodyPr/>
+                    <a:lstStyle/>
+                    <a:p>
+                      <a:pPr algn="l" fontAlgn="b"/>
+                      <a:r>
+                        <a:rPr lang="en-AU" sz="1400" b="0" i="0" u="none" strike="noStrike" dirty="0">
+                          <a:solidFill>
+                            <a:srgbClr val="000000"/>
+                          </a:solidFill>
+                          <a:effectLst/>
+                          <a:latin typeface="Calibri" panose="020F0502020204030204" pitchFamily="34" charset="0"/>
+                        </a:rPr>
+                        <a:t>33_66</a:t>
+                      </a:r>
+                      <a:endParaRPr lang="en-AU" sz="1400" b="0" i="1" u="none" strike="noStrike" dirty="0">
+                        <a:solidFill>
+                          <a:srgbClr val="000000"/>
+                        </a:solidFill>
+                        <a:effectLst/>
+                        <a:latin typeface="Calibri" panose="020F0502020204030204" pitchFamily="34" charset="0"/>
+                      </a:endParaRPr>
+                    </a:p>
+                  </a:txBody>
+                  <a:tcPr marL="7620" marR="7620" marT="7620" marB="0" anchor="b">
+                    <a:lnT w="12700" cap="flat" cmpd="sng" algn="ctr">
+                      <a:solidFill>
+                        <a:schemeClr val="tx1"/>
+                      </a:solidFill>
+                      <a:prstDash val="solid"/>
+                      <a:round/>
+                      <a:headEnd type="none" w="med" len="med"/>
+                      <a:tailEnd type="none" w="med" len="med"/>
+                    </a:lnT>
+                    <a:solidFill>
+                      <a:schemeClr val="accent6">
+                        <a:lumMod val="40000"/>
+                        <a:lumOff val="60000"/>
+                      </a:schemeClr>
+                    </a:solidFill>
+                  </a:tcPr>
+                </a:tc>
+                <a:tc>
+                  <a:txBody>
+                    <a:bodyPr/>
+                    <a:lstStyle/>
+                    <a:p>
+                      <a:pPr algn="l" fontAlgn="b"/>
+                      <a:r>
+                        <a:rPr lang="en-AU" sz="1400" u="none" strike="noStrike" dirty="0">
+                          <a:effectLst/>
+                        </a:rPr>
+                        <a:t>EEE_p4_0_1_t2</a:t>
+                      </a:r>
+                      <a:endParaRPr lang="en-AU" sz="1400" b="0" i="0" u="none" strike="noStrike" dirty="0">
+                        <a:solidFill>
+                          <a:srgbClr val="000000"/>
+                        </a:solidFill>
+                        <a:effectLst/>
+                        <a:latin typeface="Calibri" panose="020F0502020204030204" pitchFamily="34" charset="0"/>
+                      </a:endParaRPr>
+                    </a:p>
+                  </a:txBody>
+                  <a:tcPr marL="7620" marR="7620" marT="7620" marB="0" anchor="b">
+                    <a:lnT w="12700" cap="flat" cmpd="sng" algn="ctr">
+                      <a:solidFill>
+                        <a:schemeClr val="tx1"/>
+                      </a:solidFill>
+                      <a:prstDash val="solid"/>
+                      <a:round/>
+                      <a:headEnd type="none" w="med" len="med"/>
+                      <a:tailEnd type="none" w="med" len="med"/>
+                    </a:lnT>
+                    <a:solidFill>
+                      <a:schemeClr val="accent6">
+                        <a:lumMod val="40000"/>
+                        <a:lumOff val="60000"/>
+                      </a:schemeClr>
+                    </a:solidFill>
+                  </a:tcPr>
                 </a:tc>
                 <a:tc>
                   <a:txBody>
@@ -14572,11 +14424,27 @@
                       </a:r>
                     </a:p>
                   </a:txBody>
-                  <a:tcPr marL="7620" marR="7620" marT="7620" marB="0" anchor="b"/>
+                  <a:tcPr marL="7620" marR="7620" marT="7620" marB="0" anchor="b">
+                    <a:lnT w="12700" cap="flat" cmpd="sng" algn="ctr">
+                      <a:solidFill>
+                        <a:schemeClr val="tx1"/>
+                      </a:solidFill>
+                      <a:prstDash val="solid"/>
+                      <a:round/>
+                      <a:headEnd type="none" w="med" len="med"/>
+                      <a:tailEnd type="none" w="med" len="med"/>
+                    </a:lnT>
+                    <a:solidFill>
+                      <a:schemeClr val="accent6">
+                        <a:lumMod val="40000"/>
+                        <a:lumOff val="60000"/>
+                      </a:schemeClr>
+                    </a:solidFill>
+                  </a:tcPr>
                 </a:tc>
                 <a:extLst>
                   <a:ext uri="{0D108BD9-81ED-4DB2-BD59-A6C34878D82A}">
-                    <a16:rowId xmlns:a16="http://schemas.microsoft.com/office/drawing/2014/main" val="3775966952"/>
+                    <a16:rowId xmlns:a16="http://schemas.microsoft.com/office/drawing/2014/main" val="4011408311"/>
                   </a:ext>
                 </a:extLst>
               </a:tr>
@@ -14599,17 +14467,7 @@
                       </a:r>
                     </a:p>
                   </a:txBody>
-                  <a:tcPr marL="7620" marR="7620" marT="7620" marB="0" anchor="b">
-                    <a:lnB w="12700" cap="flat" cmpd="sng" algn="ctr">
-                      <a:solidFill>
-                        <a:schemeClr val="tx1"/>
-                      </a:solidFill>
-                      <a:prstDash val="solid"/>
-                      <a:round/>
-                      <a:headEnd type="none" w="med" len="med"/>
-                      <a:tailEnd type="none" w="med" len="med"/>
-                    </a:lnB>
-                  </a:tcPr>
+                  <a:tcPr marL="7620" marR="7620" marT="7620" marB="0" anchor="b"/>
                 </a:tc>
                 <a:tc>
                   <a:txBody>
@@ -14625,21 +14483,11 @@
                           <a:effectLst/>
                           <a:latin typeface="Calibri" panose="020F0502020204030204" pitchFamily="34" charset="0"/>
                         </a:rPr>
-                        <a:t>4</a:t>
-                      </a:r>
-                    </a:p>
-                  </a:txBody>
-                  <a:tcPr marL="7620" marR="7620" marT="7620" marB="0" anchor="b">
-                    <a:lnB w="12700" cap="flat" cmpd="sng" algn="ctr">
-                      <a:solidFill>
-                        <a:schemeClr val="tx1"/>
-                      </a:solidFill>
-                      <a:prstDash val="solid"/>
-                      <a:round/>
-                      <a:headEnd type="none" w="med" len="med"/>
-                      <a:tailEnd type="none" w="med" len="med"/>
-                    </a:lnB>
-                  </a:tcPr>
+                        <a:t>3</a:t>
+                      </a:r>
+                    </a:p>
+                  </a:txBody>
+                  <a:tcPr marL="7620" marR="7620" marT="7620" marB="0" anchor="b"/>
                 </a:tc>
                 <a:tc>
                   <a:txBody>
@@ -14659,47 +14507,7 @@
                       </a:r>
                     </a:p>
                   </a:txBody>
-                  <a:tcPr marL="7620" marR="7620" marT="7620" marB="0" anchor="b">
-                    <a:lnB w="12700" cap="flat" cmpd="sng" algn="ctr">
-                      <a:solidFill>
-                        <a:schemeClr val="tx1"/>
-                      </a:solidFill>
-                      <a:prstDash val="solid"/>
-                      <a:round/>
-                      <a:headEnd type="none" w="med" len="med"/>
-                      <a:tailEnd type="none" w="med" len="med"/>
-                    </a:lnB>
-                  </a:tcPr>
-                </a:tc>
-                <a:tc>
-                  <a:txBody>
-                    <a:bodyPr/>
-                    <a:lstStyle/>
-                    <a:p>
-                      <a:pPr algn="l" fontAlgn="b"/>
-                      <a:r>
-                        <a:rPr lang="en-AU" sz="1400" b="0" i="1" u="none" strike="noStrike" dirty="0">
-                          <a:solidFill>
-                            <a:srgbClr val="000000"/>
-                          </a:solidFill>
-                          <a:effectLst/>
-                          <a:latin typeface="Calibri" panose="020F0502020204030204" pitchFamily="34" charset="0"/>
-                        </a:rPr>
-                        <a:t>2</a:t>
-                      </a:r>
-                    </a:p>
-                  </a:txBody>
-                  <a:tcPr marL="7620" marR="7620" marT="7620" marB="0" anchor="b">
-                    <a:lnB w="12700" cap="flat" cmpd="sng" algn="ctr">
-                      <a:solidFill>
-                        <a:schemeClr val="tx1"/>
-                      </a:solidFill>
-                      <a:prstDash val="solid"/>
-                      <a:round/>
-                      <a:headEnd type="none" w="med" len="med"/>
-                      <a:tailEnd type="none" w="med" len="med"/>
-                    </a:lnB>
-                  </a:tcPr>
+                  <a:tcPr marL="7620" marR="7620" marT="7620" marB="0" anchor="b"/>
                 </a:tc>
                 <a:tc>
                   <a:txBody>
@@ -14715,21 +14523,11 @@
                           <a:effectLst/>
                           <a:latin typeface="Calibri" panose="020F0502020204030204" pitchFamily="34" charset="0"/>
                         </a:rPr>
-                        <a:t>6v in (4cl)</a:t>
-                      </a:r>
-                    </a:p>
-                  </a:txBody>
-                  <a:tcPr marL="7620" marR="7620" marT="7620" marB="0" anchor="b">
-                    <a:lnB w="12700" cap="flat" cmpd="sng" algn="ctr">
-                      <a:solidFill>
-                        <a:schemeClr val="tx1"/>
-                      </a:solidFill>
-                      <a:prstDash val="solid"/>
-                      <a:round/>
-                      <a:headEnd type="none" w="med" len="med"/>
-                      <a:tailEnd type="none" w="med" len="med"/>
-                    </a:lnB>
-                  </a:tcPr>
+                        <a:t>EEE</a:t>
+                      </a:r>
+                    </a:p>
+                  </a:txBody>
+                  <a:tcPr marL="7620" marR="7620" marT="7620" marB="0" anchor="b"/>
                 </a:tc>
                 <a:tc>
                   <a:txBody>
@@ -14738,28 +14536,18 @@
                     <a:p>
                       <a:pPr algn="l" fontAlgn="b"/>
                       <a:r>
-                        <a:rPr lang="en-AU" sz="1400" b="0" i="1" u="none" strike="noStrike" dirty="0">
+                        <a:rPr lang="en-AU" sz="1400" b="0" i="0" u="none" strike="noStrike" dirty="0">
                           <a:solidFill>
                             <a:srgbClr val="000000"/>
                           </a:solidFill>
                           <a:effectLst/>
                           <a:latin typeface="Calibri" panose="020F0502020204030204" pitchFamily="34" charset="0"/>
                         </a:rPr>
-                        <a:t>1</a:t>
-                      </a:r>
-                    </a:p>
-                  </a:txBody>
-                  <a:tcPr marL="7620" marR="7620" marT="7620" marB="0" anchor="b">
-                    <a:lnB w="12700" cap="flat" cmpd="sng" algn="ctr">
-                      <a:solidFill>
-                        <a:schemeClr val="tx1"/>
-                      </a:solidFill>
-                      <a:prstDash val="solid"/>
-                      <a:round/>
-                      <a:headEnd type="none" w="med" len="med"/>
-                      <a:tailEnd type="none" w="med" len="med"/>
-                    </a:lnB>
-                  </a:tcPr>
+                        <a:t>4v (3cl)</a:t>
+                      </a:r>
+                    </a:p>
+                  </a:txBody>
+                  <a:tcPr marL="7620" marR="7620" marT="7620" marB="0" anchor="b"/>
                 </a:tc>
                 <a:tc>
                   <a:txBody>
@@ -14791,21 +14579,11 @@
                           <a:effectLst/>
                           <a:latin typeface="Calibri" panose="020F0502020204030204" pitchFamily="34" charset="0"/>
                         </a:rPr>
-                        <a:t>banana_p6_50_50_rep2</a:t>
-                      </a:r>
-                    </a:p>
-                  </a:txBody>
-                  <a:tcPr marL="7620" marR="7620" marT="7620" marB="0" anchor="b">
-                    <a:lnB w="12700" cap="flat" cmpd="sng" algn="ctr">
-                      <a:solidFill>
-                        <a:schemeClr val="tx1"/>
-                      </a:solidFill>
-                      <a:prstDash val="solid"/>
-                      <a:round/>
-                      <a:headEnd type="none" w="med" len="med"/>
-                      <a:tailEnd type="none" w="med" len="med"/>
-                    </a:lnB>
-                  </a:tcPr>
+                        <a:t>33_66</a:t>
+                      </a:r>
+                    </a:p>
+                  </a:txBody>
+                  <a:tcPr marL="7620" marR="7620" marT="7620" marB="0" anchor="b"/>
                 </a:tc>
                 <a:tc>
                   <a:txBody>
@@ -14837,299 +14615,11 @@
                           <a:effectLst/>
                           <a:latin typeface="Calibri" panose="020F0502020204030204" pitchFamily="34" charset="0"/>
                         </a:rPr>
-                        <a:t>NA</a:t>
-                      </a:r>
-                    </a:p>
-                  </a:txBody>
-                  <a:tcPr marL="7620" marR="7620" marT="7620" marB="0" anchor="b">
-                    <a:lnB w="12700" cap="flat" cmpd="sng" algn="ctr">
-                      <a:solidFill>
-                        <a:schemeClr val="tx1"/>
-                      </a:solidFill>
-                      <a:prstDash val="solid"/>
-                      <a:round/>
-                      <a:headEnd type="none" w="med" len="med"/>
-                      <a:tailEnd type="none" w="med" len="med"/>
-                    </a:lnB>
-                  </a:tcPr>
-                </a:tc>
-                <a:extLst>
-                  <a:ext uri="{0D108BD9-81ED-4DB2-BD59-A6C34878D82A}">
-                    <a16:rowId xmlns:a16="http://schemas.microsoft.com/office/drawing/2014/main" val="2638294684"/>
-                  </a:ext>
-                </a:extLst>
-              </a:tr>
-              <a:tr h="0">
-                <a:tc>
-                  <a:txBody>
-                    <a:bodyPr/>
-                    <a:lstStyle/>
-                    <a:p>
-                      <a:pPr algn="l" fontAlgn="b"/>
-                      <a:r>
-                        <a:rPr lang="en-US" sz="1400" b="0" i="0" u="none" strike="noStrike" dirty="0">
-                          <a:solidFill>
-                            <a:srgbClr val="000000"/>
-                          </a:solidFill>
-                          <a:effectLst/>
-                          <a:latin typeface="Calibri" panose="020F0502020204030204" pitchFamily="34" charset="0"/>
-                        </a:rPr>
-                        <a:t>3</a:t>
-                      </a:r>
-                    </a:p>
-                  </a:txBody>
-                  <a:tcPr marL="7620" marR="7620" marT="7620" marB="0" anchor="b">
-                    <a:lnT w="12700" cap="flat" cmpd="sng" algn="ctr">
-                      <a:solidFill>
-                        <a:schemeClr val="tx1"/>
-                      </a:solidFill>
-                      <a:prstDash val="solid"/>
-                      <a:round/>
-                      <a:headEnd type="none" w="med" len="med"/>
-                      <a:tailEnd type="none" w="med" len="med"/>
-                    </a:lnT>
-                    <a:solidFill>
-                      <a:schemeClr val="accent6">
-                        <a:lumMod val="40000"/>
-                        <a:lumOff val="60000"/>
-                      </a:schemeClr>
-                    </a:solidFill>
-                  </a:tcPr>
-                </a:tc>
-                <a:tc>
-                  <a:txBody>
-                    <a:bodyPr/>
-                    <a:lstStyle/>
-                    <a:p>
-                      <a:pPr algn="l" fontAlgn="b"/>
-                      <a:r>
-                        <a:rPr lang="en-AU" sz="1400" b="0" i="0" u="none" strike="noStrike" dirty="0">
-                          <a:solidFill>
-                            <a:srgbClr val="000000"/>
-                          </a:solidFill>
-                          <a:effectLst/>
-                          <a:latin typeface="Calibri" panose="020F0502020204030204" pitchFamily="34" charset="0"/>
-                        </a:rPr>
-                        <a:t>Training</a:t>
-                      </a:r>
-                    </a:p>
-                  </a:txBody>
-                  <a:tcPr marL="7620" marR="7620" marT="7620" marB="0" anchor="b">
-                    <a:lnT w="12700" cap="flat" cmpd="sng" algn="ctr">
-                      <a:solidFill>
-                        <a:schemeClr val="tx1"/>
-                      </a:solidFill>
-                      <a:prstDash val="solid"/>
-                      <a:round/>
-                      <a:headEnd type="none" w="med" len="med"/>
-                      <a:tailEnd type="none" w="med" len="med"/>
-                    </a:lnT>
-                    <a:solidFill>
-                      <a:schemeClr val="accent6">
-                        <a:lumMod val="40000"/>
-                        <a:lumOff val="60000"/>
-                      </a:schemeClr>
-                    </a:solidFill>
-                  </a:tcPr>
-                </a:tc>
-                <a:tc>
-                  <a:txBody>
-                    <a:bodyPr/>
-                    <a:lstStyle/>
-                    <a:p>
-                      <a:pPr algn="l" fontAlgn="b"/>
-                      <a:r>
-                        <a:rPr lang="en-US" sz="1400" b="0" i="1" u="none" strike="noStrike" dirty="0">
-                          <a:solidFill>
-                            <a:srgbClr val="000000"/>
-                          </a:solidFill>
-                          <a:effectLst/>
-                          <a:latin typeface="Calibri" panose="020F0502020204030204" pitchFamily="34" charset="0"/>
-                        </a:rPr>
-                        <a:t>PCA</a:t>
-                      </a:r>
-                      <a:endParaRPr lang="en-AU" sz="1400" b="0" i="1" u="none" strike="noStrike" dirty="0">
-                        <a:solidFill>
-                          <a:srgbClr val="000000"/>
-                        </a:solidFill>
-                        <a:effectLst/>
-                        <a:latin typeface="Calibri" panose="020F0502020204030204" pitchFamily="34" charset="0"/>
-                      </a:endParaRPr>
-                    </a:p>
-                  </a:txBody>
-                  <a:tcPr marL="7620" marR="7620" marT="7620" marB="0" anchor="b">
-                    <a:lnT w="12700" cap="flat" cmpd="sng" algn="ctr">
-                      <a:solidFill>
-                        <a:schemeClr val="tx1"/>
-                      </a:solidFill>
-                      <a:prstDash val="solid"/>
-                      <a:round/>
-                      <a:headEnd type="none" w="med" len="med"/>
-                      <a:tailEnd type="none" w="med" len="med"/>
-                    </a:lnT>
-                    <a:solidFill>
-                      <a:schemeClr val="accent6">
-                        <a:lumMod val="40000"/>
-                        <a:lumOff val="60000"/>
-                      </a:schemeClr>
-                    </a:solidFill>
-                  </a:tcPr>
-                </a:tc>
-                <a:tc>
-                  <a:txBody>
-                    <a:bodyPr/>
-                    <a:lstStyle/>
-                    <a:p>
-                      <a:pPr algn="l" fontAlgn="b"/>
-                      <a:r>
-                        <a:rPr lang="en-AU" sz="1400" u="none" strike="noStrike" dirty="0">
-                          <a:effectLst/>
-                        </a:rPr>
-                        <a:t>EEE</a:t>
-                      </a:r>
-                      <a:endParaRPr lang="en-AU" sz="1400" b="0" i="1" u="none" strike="noStrike" dirty="0">
-                        <a:solidFill>
-                          <a:srgbClr val="000000"/>
-                        </a:solidFill>
-                        <a:effectLst/>
-                        <a:latin typeface="Calibri" panose="020F0502020204030204" pitchFamily="34" charset="0"/>
-                      </a:endParaRPr>
-                    </a:p>
-                  </a:txBody>
-                  <a:tcPr marL="7620" marR="7620" marT="7620" marB="0" anchor="b">
-                    <a:lnT w="12700" cap="flat" cmpd="sng" algn="ctr">
-                      <a:solidFill>
-                        <a:schemeClr val="tx1"/>
-                      </a:solidFill>
-                      <a:prstDash val="solid"/>
-                      <a:round/>
-                      <a:headEnd type="none" w="med" len="med"/>
-                      <a:tailEnd type="none" w="med" len="med"/>
-                    </a:lnT>
-                    <a:solidFill>
-                      <a:schemeClr val="accent6">
-                        <a:lumMod val="40000"/>
-                        <a:lumOff val="60000"/>
-                      </a:schemeClr>
-                    </a:solidFill>
-                  </a:tcPr>
-                </a:tc>
-                <a:tc>
-                  <a:txBody>
-                    <a:bodyPr/>
-                    <a:lstStyle/>
-                    <a:p>
-                      <a:pPr algn="l" fontAlgn="b"/>
-                      <a:r>
-                        <a:rPr lang="en-AU" sz="1400" u="none" strike="noStrike" dirty="0">
-                          <a:effectLst/>
-                        </a:rPr>
-                        <a:t>4v (3cl)</a:t>
-                      </a:r>
-                      <a:endParaRPr lang="en-AU" sz="1400" b="0" i="0" u="none" strike="noStrike" dirty="0">
-                        <a:solidFill>
-                          <a:srgbClr val="000000"/>
-                        </a:solidFill>
-                        <a:effectLst/>
-                        <a:latin typeface="Calibri" panose="020F0502020204030204" pitchFamily="34" charset="0"/>
-                      </a:endParaRPr>
-                    </a:p>
-                  </a:txBody>
-                  <a:tcPr marL="7620" marR="7620" marT="7620" marB="0" anchor="b">
-                    <a:lnT w="12700" cap="flat" cmpd="sng" algn="ctr">
-                      <a:solidFill>
-                        <a:schemeClr val="tx1"/>
-                      </a:solidFill>
-                      <a:prstDash val="solid"/>
-                      <a:round/>
-                      <a:headEnd type="none" w="med" len="med"/>
-                      <a:tailEnd type="none" w="med" len="med"/>
-                    </a:lnT>
-                    <a:solidFill>
-                      <a:schemeClr val="accent6">
-                        <a:lumMod val="40000"/>
-                        <a:lumOff val="60000"/>
-                      </a:schemeClr>
-                    </a:solidFill>
-                  </a:tcPr>
-                </a:tc>
-                <a:tc>
-                  <a:txBody>
-                    <a:bodyPr/>
-                    <a:lstStyle/>
-                    <a:p>
-                      <a:pPr algn="l" fontAlgn="b"/>
-                      <a:r>
-                        <a:rPr lang="en-AU" sz="1400" u="none" strike="noStrike" dirty="0">
-                          <a:effectLst/>
-                        </a:rPr>
-                        <a:t>1_0</a:t>
-                      </a:r>
-                      <a:endParaRPr lang="en-AU" sz="1400" b="0" i="1" u="none" strike="noStrike" dirty="0">
-                        <a:solidFill>
-                          <a:srgbClr val="000000"/>
-                        </a:solidFill>
-                        <a:effectLst/>
-                        <a:latin typeface="Calibri" panose="020F0502020204030204" pitchFamily="34" charset="0"/>
-                      </a:endParaRPr>
-                    </a:p>
-                  </a:txBody>
-                  <a:tcPr marL="7620" marR="7620" marT="7620" marB="0" anchor="b">
-                    <a:lnT w="12700" cap="flat" cmpd="sng" algn="ctr">
-                      <a:solidFill>
-                        <a:schemeClr val="tx1"/>
-                      </a:solidFill>
-                      <a:prstDash val="solid"/>
-                      <a:round/>
-                      <a:headEnd type="none" w="med" len="med"/>
-                      <a:tailEnd type="none" w="med" len="med"/>
-                    </a:lnT>
-                    <a:solidFill>
-                      <a:schemeClr val="accent6">
-                        <a:lumMod val="40000"/>
-                        <a:lumOff val="60000"/>
-                      </a:schemeClr>
-                    </a:solidFill>
-                  </a:tcPr>
-                </a:tc>
-                <a:tc>
-                  <a:txBody>
-                    <a:bodyPr/>
-                    <a:lstStyle/>
-                    <a:p>
-                      <a:pPr algn="l" fontAlgn="b"/>
-                      <a:r>
-                        <a:rPr lang="en-AU" sz="1400" u="none" strike="noStrike" dirty="0">
-                          <a:effectLst/>
-                        </a:rPr>
-                        <a:t>EEE_p4_0_1_t3</a:t>
-                      </a:r>
-                      <a:endParaRPr lang="en-AU" sz="1400" b="0" i="0" u="none" strike="noStrike" dirty="0">
-                        <a:solidFill>
-                          <a:srgbClr val="000000"/>
-                        </a:solidFill>
-                        <a:effectLst/>
-                        <a:latin typeface="Calibri" panose="020F0502020204030204" pitchFamily="34" charset="0"/>
-                      </a:endParaRPr>
-                    </a:p>
-                  </a:txBody>
-                  <a:tcPr marL="7620" marR="7620" marT="7620" marB="0" anchor="b">
-                    <a:lnT w="12700" cap="flat" cmpd="sng" algn="ctr">
-                      <a:solidFill>
-                        <a:schemeClr val="tx1"/>
-                      </a:solidFill>
-                      <a:prstDash val="solid"/>
-                      <a:round/>
-                      <a:headEnd type="none" w="med" len="med"/>
-                      <a:tailEnd type="none" w="med" len="med"/>
-                    </a:lnT>
-                    <a:solidFill>
-                      <a:schemeClr val="accent6">
-                        <a:lumMod val="40000"/>
-                        <a:lumOff val="60000"/>
-                      </a:schemeClr>
-                    </a:solidFill>
-                  </a:tcPr>
+                        <a:t>EEV_p4_50_50_rep1</a:t>
+                      </a:r>
+                    </a:p>
+                  </a:txBody>
+                  <a:tcPr marL="7620" marR="7620" marT="7620" marB="0" anchor="b"/>
                 </a:tc>
                 <a:tc>
                   <a:txBody>
@@ -15165,27 +14655,11 @@
                       </a:r>
                     </a:p>
                   </a:txBody>
-                  <a:tcPr marL="7620" marR="7620" marT="7620" marB="0" anchor="b">
-                    <a:lnT w="12700" cap="flat" cmpd="sng" algn="ctr">
-                      <a:solidFill>
-                        <a:schemeClr val="tx1"/>
-                      </a:solidFill>
-                      <a:prstDash val="solid"/>
-                      <a:round/>
-                      <a:headEnd type="none" w="med" len="med"/>
-                      <a:tailEnd type="none" w="med" len="med"/>
-                    </a:lnT>
-                    <a:solidFill>
-                      <a:schemeClr val="accent6">
-                        <a:lumMod val="40000"/>
-                        <a:lumOff val="60000"/>
-                      </a:schemeClr>
-                    </a:solidFill>
-                  </a:tcPr>
+                  <a:tcPr marL="7620" marR="7620" marT="7620" marB="0" anchor="b"/>
                 </a:tc>
                 <a:extLst>
                   <a:ext uri="{0D108BD9-81ED-4DB2-BD59-A6C34878D82A}">
-                    <a16:rowId xmlns:a16="http://schemas.microsoft.com/office/drawing/2014/main" val="253705706"/>
+                    <a16:rowId xmlns:a16="http://schemas.microsoft.com/office/drawing/2014/main" val="3775966952"/>
                   </a:ext>
                 </a:extLst>
               </a:tr>
@@ -15204,11 +14678,21 @@
                           <a:effectLst/>
                           <a:latin typeface="Calibri" panose="020F0502020204030204" pitchFamily="34" charset="0"/>
                         </a:rPr>
-                        <a:t>3</a:t>
-                      </a:r>
-                    </a:p>
-                  </a:txBody>
-                  <a:tcPr marL="7620" marR="7620" marT="7620" marB="0" anchor="b"/>
+                        <a:t>2</a:t>
+                      </a:r>
+                    </a:p>
+                  </a:txBody>
+                  <a:tcPr marL="7620" marR="7620" marT="7620" marB="0" anchor="b">
+                    <a:lnB w="12700" cap="flat" cmpd="sng" algn="ctr">
+                      <a:solidFill>
+                        <a:schemeClr val="tx1"/>
+                      </a:solidFill>
+                      <a:prstDash val="solid"/>
+                      <a:round/>
+                      <a:headEnd type="none" w="med" len="med"/>
+                      <a:tailEnd type="none" w="med" len="med"/>
+                    </a:lnB>
+                  </a:tcPr>
                 </a:tc>
                 <a:tc>
                   <a:txBody>
@@ -15224,11 +14708,21 @@
                           <a:effectLst/>
                           <a:latin typeface="Calibri" panose="020F0502020204030204" pitchFamily="34" charset="0"/>
                         </a:rPr>
-                        <a:t>5</a:t>
-                      </a:r>
-                    </a:p>
-                  </a:txBody>
-                  <a:tcPr marL="7620" marR="7620" marT="7620" marB="0" anchor="b"/>
+                        <a:t>4</a:t>
+                      </a:r>
+                    </a:p>
+                  </a:txBody>
+                  <a:tcPr marL="7620" marR="7620" marT="7620" marB="0" anchor="b">
+                    <a:lnB w="12700" cap="flat" cmpd="sng" algn="ctr">
+                      <a:solidFill>
+                        <a:schemeClr val="tx1"/>
+                      </a:solidFill>
+                      <a:prstDash val="solid"/>
+                      <a:round/>
+                      <a:headEnd type="none" w="med" len="med"/>
+                      <a:tailEnd type="none" w="med" len="med"/>
+                    </a:lnB>
+                  </a:tcPr>
                 </a:tc>
                 <a:tc>
                   <a:txBody>
@@ -15244,31 +14738,21 @@
                           <a:effectLst/>
                           <a:latin typeface="Calibri" panose="020F0502020204030204" pitchFamily="34" charset="0"/>
                         </a:rPr>
-                        <a:t>PCA</a:t>
-                      </a:r>
-                    </a:p>
-                  </a:txBody>
-                  <a:tcPr marL="7620" marR="7620" marT="7620" marB="0" anchor="b"/>
-                </a:tc>
-                <a:tc>
-                  <a:txBody>
-                    <a:bodyPr/>
-                    <a:lstStyle/>
-                    <a:p>
-                      <a:pPr algn="l" fontAlgn="b"/>
-                      <a:r>
-                        <a:rPr lang="en-AU" sz="1400" b="0" i="1" u="none" strike="noStrike" dirty="0">
-                          <a:solidFill>
-                            <a:srgbClr val="000000"/>
-                          </a:solidFill>
-                          <a:effectLst/>
-                          <a:latin typeface="Calibri" panose="020F0502020204030204" pitchFamily="34" charset="0"/>
-                        </a:rPr>
-                        <a:t>3</a:t>
-                      </a:r>
-                    </a:p>
-                  </a:txBody>
-                  <a:tcPr marL="7620" marR="7620" marT="7620" marB="0" anchor="b"/>
+                        <a:t>Radial</a:t>
+                      </a:r>
+                    </a:p>
+                  </a:txBody>
+                  <a:tcPr marL="7620" marR="7620" marT="7620" marB="0" anchor="b">
+                    <a:lnB w="12700" cap="flat" cmpd="sng" algn="ctr">
+                      <a:solidFill>
+                        <a:schemeClr val="tx1"/>
+                      </a:solidFill>
+                      <a:prstDash val="solid"/>
+                      <a:round/>
+                      <a:headEnd type="none" w="med" len="med"/>
+                      <a:tailEnd type="none" w="med" len="med"/>
+                    </a:lnB>
+                  </a:tcPr>
                 </a:tc>
                 <a:tc>
                   <a:txBody>
@@ -15284,11 +14768,21 @@
                           <a:effectLst/>
                           <a:latin typeface="Calibri" panose="020F0502020204030204" pitchFamily="34" charset="0"/>
                         </a:rPr>
-                        <a:t>4v (3cl)</a:t>
-                      </a:r>
-                    </a:p>
-                  </a:txBody>
-                  <a:tcPr marL="7620" marR="7620" marT="7620" marB="0" anchor="b"/>
+                        <a:t>EEE</a:t>
+                      </a:r>
+                    </a:p>
+                  </a:txBody>
+                  <a:tcPr marL="7620" marR="7620" marT="7620" marB="0" anchor="b">
+                    <a:lnB w="12700" cap="flat" cmpd="sng" algn="ctr">
+                      <a:solidFill>
+                        <a:schemeClr val="tx1"/>
+                      </a:solidFill>
+                      <a:prstDash val="solid"/>
+                      <a:round/>
+                      <a:headEnd type="none" w="med" len="med"/>
+                      <a:tailEnd type="none" w="med" len="med"/>
+                    </a:lnB>
+                  </a:tcPr>
                 </a:tc>
                 <a:tc>
                   <a:txBody>
@@ -15297,18 +14791,58 @@
                     <a:p>
                       <a:pPr algn="l" fontAlgn="b"/>
                       <a:r>
-                        <a:rPr lang="en-AU" sz="1400" b="0" i="1" u="none" strike="noStrike" dirty="0">
+                        <a:rPr lang="en-AU" sz="1400" b="0" i="0" u="none" strike="noStrike" dirty="0">
                           <a:solidFill>
                             <a:srgbClr val="000000"/>
                           </a:solidFill>
                           <a:effectLst/>
                           <a:latin typeface="Calibri" panose="020F0502020204030204" pitchFamily="34" charset="0"/>
                         </a:rPr>
-                        <a:t>2</a:t>
-                      </a:r>
-                    </a:p>
-                  </a:txBody>
-                  <a:tcPr marL="7620" marR="7620" marT="7620" marB="0" anchor="b"/>
+                        <a:t>6v in (4cl)</a:t>
+                      </a:r>
+                    </a:p>
+                  </a:txBody>
+                  <a:tcPr marL="7620" marR="7620" marT="7620" marB="0" anchor="b">
+                    <a:lnB w="12700" cap="flat" cmpd="sng" algn="ctr">
+                      <a:solidFill>
+                        <a:schemeClr val="tx1"/>
+                      </a:solidFill>
+                      <a:prstDash val="solid"/>
+                      <a:round/>
+                      <a:headEnd type="none" w="med" len="med"/>
+                      <a:tailEnd type="none" w="med" len="med"/>
+                    </a:lnB>
+                  </a:tcPr>
+                </a:tc>
+                <a:tc>
+                  <a:txBody>
+                    <a:bodyPr/>
+                    <a:lstStyle/>
+                    <a:p>
+                      <a:pPr algn="l" fontAlgn="b"/>
+                      <a:r>
+                        <a:rPr lang="en-AU" sz="1400" b="0" i="0" u="none" strike="noStrike" dirty="0">
+                          <a:solidFill>
+                            <a:srgbClr val="000000"/>
+                          </a:solidFill>
+                          <a:effectLst/>
+                          <a:latin typeface="Calibri" panose="020F0502020204030204" pitchFamily="34" charset="0"/>
+                        </a:rPr>
+                        <a:t>1_0</a:t>
+                      </a:r>
+                    </a:p>
+                  </a:txBody>
+                  <a:tcPr marL="7620" marR="7620" marT="7620" marB="0" anchor="b">
+                    <a:lnB w="12700" cap="flat" cmpd="sng" algn="ctr">
+                      <a:solidFill>
+                        <a:schemeClr val="tx1"/>
+                      </a:solidFill>
+                      <a:prstDash val="solid"/>
+                      <a:round/>
+                      <a:headEnd type="none" w="med" len="med"/>
+                      <a:tailEnd type="none" w="med" len="med"/>
+                    </a:lnB>
+                  </a:tcPr>
                 </a:tc>
                 <a:tc>
                   <a:txBody>
@@ -15340,11 +14874,21 @@
                           <a:effectLst/>
                           <a:latin typeface="Calibri" panose="020F0502020204030204" pitchFamily="34" charset="0"/>
                         </a:rPr>
-                        <a:t>EEE_p4_50_50_rep3</a:t>
-                      </a:r>
-                    </a:p>
-                  </a:txBody>
-                  <a:tcPr marL="7620" marR="7620" marT="7620" marB="0" anchor="b"/>
+                        <a:t>EEV_p6_50_50_rep2</a:t>
+                      </a:r>
+                    </a:p>
+                  </a:txBody>
+                  <a:tcPr marL="7620" marR="7620" marT="7620" marB="0" anchor="b">
+                    <a:lnB w="12700" cap="flat" cmpd="sng" algn="ctr">
+                      <a:solidFill>
+                        <a:schemeClr val="tx1"/>
+                      </a:solidFill>
+                      <a:prstDash val="solid"/>
+                      <a:round/>
+                      <a:headEnd type="none" w="med" len="med"/>
+                      <a:tailEnd type="none" w="med" len="med"/>
+                    </a:lnB>
+                  </a:tcPr>
                 </a:tc>
                 <a:tc>
                   <a:txBody>
@@ -15380,11 +14924,355 @@
                       </a:r>
                     </a:p>
                   </a:txBody>
-                  <a:tcPr marL="7620" marR="7620" marT="7620" marB="0" anchor="b"/>
+                  <a:tcPr marL="7620" marR="7620" marT="7620" marB="0" anchor="b">
+                    <a:lnB w="12700" cap="flat" cmpd="sng" algn="ctr">
+                      <a:solidFill>
+                        <a:schemeClr val="tx1"/>
+                      </a:solidFill>
+                      <a:prstDash val="solid"/>
+                      <a:round/>
+                      <a:headEnd type="none" w="med" len="med"/>
+                      <a:tailEnd type="none" w="med" len="med"/>
+                    </a:lnB>
+                  </a:tcPr>
                 </a:tc>
                 <a:extLst>
                   <a:ext uri="{0D108BD9-81ED-4DB2-BD59-A6C34878D82A}">
-                    <a16:rowId xmlns:a16="http://schemas.microsoft.com/office/drawing/2014/main" val="2814426595"/>
+                    <a16:rowId xmlns:a16="http://schemas.microsoft.com/office/drawing/2014/main" val="2638294684"/>
+                  </a:ext>
+                </a:extLst>
+              </a:tr>
+              <a:tr h="0">
+                <a:tc>
+                  <a:txBody>
+                    <a:bodyPr/>
+                    <a:lstStyle/>
+                    <a:p>
+                      <a:pPr algn="l" fontAlgn="b"/>
+                      <a:r>
+                        <a:rPr lang="en-US" sz="1400" b="0" i="0" u="none" strike="noStrike" dirty="0">
+                          <a:solidFill>
+                            <a:srgbClr val="000000"/>
+                          </a:solidFill>
+                          <a:effectLst/>
+                          <a:latin typeface="Calibri" panose="020F0502020204030204" pitchFamily="34" charset="0"/>
+                        </a:rPr>
+                        <a:t>3</a:t>
+                      </a:r>
+                    </a:p>
+                  </a:txBody>
+                  <a:tcPr marL="7620" marR="7620" marT="7620" marB="0" anchor="b">
+                    <a:lnT w="12700" cap="flat" cmpd="sng" algn="ctr">
+                      <a:solidFill>
+                        <a:schemeClr val="tx1"/>
+                      </a:solidFill>
+                      <a:prstDash val="solid"/>
+                      <a:round/>
+                      <a:headEnd type="none" w="med" len="med"/>
+                      <a:tailEnd type="none" w="med" len="med"/>
+                    </a:lnT>
+                    <a:solidFill>
+                      <a:schemeClr val="accent6">
+                        <a:lumMod val="40000"/>
+                        <a:lumOff val="60000"/>
+                      </a:schemeClr>
+                    </a:solidFill>
+                  </a:tcPr>
+                </a:tc>
+                <a:tc>
+                  <a:txBody>
+                    <a:bodyPr/>
+                    <a:lstStyle/>
+                    <a:p>
+                      <a:pPr algn="l" fontAlgn="b"/>
+                      <a:r>
+                        <a:rPr lang="en-AU" sz="1400" b="0" i="0" u="none" strike="noStrike" dirty="0">
+                          <a:solidFill>
+                            <a:srgbClr val="000000"/>
+                          </a:solidFill>
+                          <a:effectLst/>
+                          <a:latin typeface="Calibri" panose="020F0502020204030204" pitchFamily="34" charset="0"/>
+                        </a:rPr>
+                        <a:t>Training</a:t>
+                      </a:r>
+                    </a:p>
+                  </a:txBody>
+                  <a:tcPr marL="7620" marR="7620" marT="7620" marB="0" anchor="b">
+                    <a:lnT w="12700" cap="flat" cmpd="sng" algn="ctr">
+                      <a:solidFill>
+                        <a:schemeClr val="tx1"/>
+                      </a:solidFill>
+                      <a:prstDash val="solid"/>
+                      <a:round/>
+                      <a:headEnd type="none" w="med" len="med"/>
+                      <a:tailEnd type="none" w="med" len="med"/>
+                    </a:lnT>
+                    <a:solidFill>
+                      <a:schemeClr val="accent6">
+                        <a:lumMod val="40000"/>
+                        <a:lumOff val="60000"/>
+                      </a:schemeClr>
+                    </a:solidFill>
+                  </a:tcPr>
+                </a:tc>
+                <a:tc>
+                  <a:txBody>
+                    <a:bodyPr/>
+                    <a:lstStyle/>
+                    <a:p>
+                      <a:pPr algn="l" fontAlgn="b"/>
+                      <a:r>
+                        <a:rPr lang="en-US" sz="1400" b="0" i="1" u="none" strike="noStrike" dirty="0">
+                          <a:solidFill>
+                            <a:srgbClr val="000000"/>
+                          </a:solidFill>
+                          <a:effectLst/>
+                          <a:latin typeface="Calibri" panose="020F0502020204030204" pitchFamily="34" charset="0"/>
+                        </a:rPr>
+                        <a:t>PCA</a:t>
+                      </a:r>
+                      <a:endParaRPr lang="en-AU" sz="1400" b="0" i="1" u="none" strike="noStrike" dirty="0">
+                        <a:solidFill>
+                          <a:srgbClr val="000000"/>
+                        </a:solidFill>
+                        <a:effectLst/>
+                        <a:latin typeface="Calibri" panose="020F0502020204030204" pitchFamily="34" charset="0"/>
+                      </a:endParaRPr>
+                    </a:p>
+                  </a:txBody>
+                  <a:tcPr marL="7620" marR="7620" marT="7620" marB="0" anchor="b">
+                    <a:lnT w="12700" cap="flat" cmpd="sng" algn="ctr">
+                      <a:solidFill>
+                        <a:schemeClr val="tx1"/>
+                      </a:solidFill>
+                      <a:prstDash val="solid"/>
+                      <a:round/>
+                      <a:headEnd type="none" w="med" len="med"/>
+                      <a:tailEnd type="none" w="med" len="med"/>
+                    </a:lnT>
+                    <a:solidFill>
+                      <a:schemeClr val="accent6">
+                        <a:lumMod val="40000"/>
+                        <a:lumOff val="60000"/>
+                      </a:schemeClr>
+                    </a:solidFill>
+                  </a:tcPr>
+                </a:tc>
+                <a:tc>
+                  <a:txBody>
+                    <a:bodyPr/>
+                    <a:lstStyle/>
+                    <a:p>
+                      <a:pPr algn="l" fontAlgn="b"/>
+                      <a:r>
+                        <a:rPr lang="en-AU" sz="1400" u="none" strike="noStrike" dirty="0">
+                          <a:effectLst/>
+                        </a:rPr>
+                        <a:t>EEE</a:t>
+                      </a:r>
+                      <a:endParaRPr lang="en-AU" sz="1400" b="0" i="1" u="none" strike="noStrike" dirty="0">
+                        <a:solidFill>
+                          <a:srgbClr val="000000"/>
+                        </a:solidFill>
+                        <a:effectLst/>
+                        <a:latin typeface="Calibri" panose="020F0502020204030204" pitchFamily="34" charset="0"/>
+                      </a:endParaRPr>
+                    </a:p>
+                  </a:txBody>
+                  <a:tcPr marL="7620" marR="7620" marT="7620" marB="0" anchor="b">
+                    <a:lnT w="12700" cap="flat" cmpd="sng" algn="ctr">
+                      <a:solidFill>
+                        <a:schemeClr val="tx1"/>
+                      </a:solidFill>
+                      <a:prstDash val="solid"/>
+                      <a:round/>
+                      <a:headEnd type="none" w="med" len="med"/>
+                      <a:tailEnd type="none" w="med" len="med"/>
+                    </a:lnT>
+                    <a:solidFill>
+                      <a:schemeClr val="accent6">
+                        <a:lumMod val="40000"/>
+                        <a:lumOff val="60000"/>
+                      </a:schemeClr>
+                    </a:solidFill>
+                  </a:tcPr>
+                </a:tc>
+                <a:tc>
+                  <a:txBody>
+                    <a:bodyPr/>
+                    <a:lstStyle/>
+                    <a:p>
+                      <a:pPr algn="l" fontAlgn="b"/>
+                      <a:r>
+                        <a:rPr lang="en-AU" sz="1400" u="none" strike="noStrike" dirty="0">
+                          <a:effectLst/>
+                        </a:rPr>
+                        <a:t>4v (3cl)</a:t>
+                      </a:r>
+                      <a:endParaRPr lang="en-AU" sz="1400" b="0" i="0" u="none" strike="noStrike" dirty="0">
+                        <a:solidFill>
+                          <a:srgbClr val="000000"/>
+                        </a:solidFill>
+                        <a:effectLst/>
+                        <a:latin typeface="Calibri" panose="020F0502020204030204" pitchFamily="34" charset="0"/>
+                      </a:endParaRPr>
+                    </a:p>
+                  </a:txBody>
+                  <a:tcPr marL="7620" marR="7620" marT="7620" marB="0" anchor="b">
+                    <a:lnT w="12700" cap="flat" cmpd="sng" algn="ctr">
+                      <a:solidFill>
+                        <a:schemeClr val="tx1"/>
+                      </a:solidFill>
+                      <a:prstDash val="solid"/>
+                      <a:round/>
+                      <a:headEnd type="none" w="med" len="med"/>
+                      <a:tailEnd type="none" w="med" len="med"/>
+                    </a:lnT>
+                    <a:solidFill>
+                      <a:schemeClr val="accent6">
+                        <a:lumMod val="40000"/>
+                        <a:lumOff val="60000"/>
+                      </a:schemeClr>
+                    </a:solidFill>
+                  </a:tcPr>
+                </a:tc>
+                <a:tc>
+                  <a:txBody>
+                    <a:bodyPr/>
+                    <a:lstStyle/>
+                    <a:p>
+                      <a:pPr algn="l" fontAlgn="b"/>
+                      <a:r>
+                        <a:rPr lang="en-AU" sz="1400" b="0" i="0" u="none" strike="noStrike" dirty="0">
+                          <a:solidFill>
+                            <a:srgbClr val="000000"/>
+                          </a:solidFill>
+                          <a:effectLst/>
+                          <a:latin typeface="Calibri" panose="020F0502020204030204" pitchFamily="34" charset="0"/>
+                        </a:rPr>
+                        <a:t>33_66</a:t>
+                      </a:r>
+                      <a:endParaRPr lang="en-AU" sz="1400" b="0" i="1" u="none" strike="noStrike" dirty="0">
+                        <a:solidFill>
+                          <a:srgbClr val="000000"/>
+                        </a:solidFill>
+                        <a:effectLst/>
+                        <a:latin typeface="Calibri" panose="020F0502020204030204" pitchFamily="34" charset="0"/>
+                      </a:endParaRPr>
+                    </a:p>
+                  </a:txBody>
+                  <a:tcPr marL="7620" marR="7620" marT="7620" marB="0" anchor="b">
+                    <a:lnT w="12700" cap="flat" cmpd="sng" algn="ctr">
+                      <a:solidFill>
+                        <a:schemeClr val="tx1"/>
+                      </a:solidFill>
+                      <a:prstDash val="solid"/>
+                      <a:round/>
+                      <a:headEnd type="none" w="med" len="med"/>
+                      <a:tailEnd type="none" w="med" len="med"/>
+                    </a:lnT>
+                    <a:solidFill>
+                      <a:schemeClr val="accent6">
+                        <a:lumMod val="40000"/>
+                        <a:lumOff val="60000"/>
+                      </a:schemeClr>
+                    </a:solidFill>
+                  </a:tcPr>
+                </a:tc>
+                <a:tc>
+                  <a:txBody>
+                    <a:bodyPr/>
+                    <a:lstStyle/>
+                    <a:p>
+                      <a:pPr algn="l" fontAlgn="b"/>
+                      <a:r>
+                        <a:rPr lang="en-AU" sz="1400" u="none" strike="noStrike" dirty="0">
+                          <a:effectLst/>
+                        </a:rPr>
+                        <a:t>EEE_p4_0_1_t3</a:t>
+                      </a:r>
+                      <a:endParaRPr lang="en-AU" sz="1400" b="0" i="0" u="none" strike="noStrike" dirty="0">
+                        <a:solidFill>
+                          <a:srgbClr val="000000"/>
+                        </a:solidFill>
+                        <a:effectLst/>
+                        <a:latin typeface="Calibri" panose="020F0502020204030204" pitchFamily="34" charset="0"/>
+                      </a:endParaRPr>
+                    </a:p>
+                  </a:txBody>
+                  <a:tcPr marL="7620" marR="7620" marT="7620" marB="0" anchor="b">
+                    <a:lnT w="12700" cap="flat" cmpd="sng" algn="ctr">
+                      <a:solidFill>
+                        <a:schemeClr val="tx1"/>
+                      </a:solidFill>
+                      <a:prstDash val="solid"/>
+                      <a:round/>
+                      <a:headEnd type="none" w="med" len="med"/>
+                      <a:tailEnd type="none" w="med" len="med"/>
+                    </a:lnT>
+                    <a:solidFill>
+                      <a:schemeClr val="accent6">
+                        <a:lumMod val="40000"/>
+                        <a:lumOff val="60000"/>
+                      </a:schemeClr>
+                    </a:solidFill>
+                  </a:tcPr>
+                </a:tc>
+                <a:tc>
+                  <a:txBody>
+                    <a:bodyPr/>
+                    <a:lstStyle/>
+                    <a:p>
+                      <a:pPr marL="0" marR="0" lvl="0" indent="0" algn="l" defTabSz="914400" rtl="0" eaLnBrk="1" fontAlgn="b" latinLnBrk="0" hangingPunct="1">
+                        <a:lnSpc>
+                          <a:spcPct val="100000"/>
+                        </a:lnSpc>
+                        <a:spcBef>
+                          <a:spcPts val="0"/>
+                        </a:spcBef>
+                        <a:spcAft>
+                          <a:spcPts val="0"/>
+                        </a:spcAft>
+                        <a:buClrTx/>
+                        <a:buSzTx/>
+                        <a:buFontTx/>
+                        <a:buNone/>
+                        <a:tabLst/>
+                        <a:defRPr/>
+                      </a:pPr>
+                      <a:r>
+                        <a:rPr lang="en-AU" sz="1400" b="0" i="0" u="none" strike="noStrike" dirty="0">
+                          <a:solidFill>
+                            <a:srgbClr val="000000"/>
+                          </a:solidFill>
+                          <a:effectLst/>
+                          <a:latin typeface="Calibri" panose="020F0502020204030204" pitchFamily="34" charset="0"/>
+                        </a:rPr>
+                        <a:t>NA</a:t>
+                      </a:r>
+                    </a:p>
+                  </a:txBody>
+                  <a:tcPr marL="7620" marR="7620" marT="7620" marB="0" anchor="b">
+                    <a:lnT w="12700" cap="flat" cmpd="sng" algn="ctr">
+                      <a:solidFill>
+                        <a:schemeClr val="tx1"/>
+                      </a:solidFill>
+                      <a:prstDash val="solid"/>
+                      <a:round/>
+                      <a:headEnd type="none" w="med" len="med"/>
+                      <a:tailEnd type="none" w="med" len="med"/>
+                    </a:lnT>
+                    <a:solidFill>
+                      <a:schemeClr val="accent6">
+                        <a:lumMod val="40000"/>
+                        <a:lumOff val="60000"/>
+                      </a:schemeClr>
+                    </a:solidFill>
+                  </a:tcPr>
+                </a:tc>
+                <a:extLst>
+                  <a:ext uri="{0D108BD9-81ED-4DB2-BD59-A6C34878D82A}">
+                    <a16:rowId xmlns:a16="http://schemas.microsoft.com/office/drawing/2014/main" val="253705706"/>
                   </a:ext>
                 </a:extLst>
               </a:tr>
@@ -15423,7 +15311,7 @@
                           <a:effectLst/>
                           <a:latin typeface="Calibri" panose="020F0502020204030204" pitchFamily="34" charset="0"/>
                         </a:rPr>
-                        <a:t>6</a:t>
+                        <a:t>5</a:t>
                       </a:r>
                     </a:p>
                   </a:txBody>
@@ -15456,6 +15344,201 @@
                     <a:p>
                       <a:pPr algn="l" fontAlgn="b"/>
                       <a:r>
+                        <a:rPr lang="en-AU" sz="1400" b="0" i="0" u="none" strike="noStrike" dirty="0">
+                          <a:solidFill>
+                            <a:srgbClr val="000000"/>
+                          </a:solidFill>
+                          <a:effectLst/>
+                          <a:latin typeface="Calibri" panose="020F0502020204030204" pitchFamily="34" charset="0"/>
+                        </a:rPr>
+                        <a:t>EEE</a:t>
+                      </a:r>
+                    </a:p>
+                  </a:txBody>
+                  <a:tcPr marL="7620" marR="7620" marT="7620" marB="0" anchor="b"/>
+                </a:tc>
+                <a:tc>
+                  <a:txBody>
+                    <a:bodyPr/>
+                    <a:lstStyle/>
+                    <a:p>
+                      <a:pPr algn="l" fontAlgn="b"/>
+                      <a:r>
+                        <a:rPr lang="en-AU" sz="1400" b="0" i="0" u="none" strike="noStrike" dirty="0">
+                          <a:solidFill>
+                            <a:srgbClr val="000000"/>
+                          </a:solidFill>
+                          <a:effectLst/>
+                          <a:latin typeface="Calibri" panose="020F0502020204030204" pitchFamily="34" charset="0"/>
+                        </a:rPr>
+                        <a:t>4v (3cl)</a:t>
+                      </a:r>
+                    </a:p>
+                  </a:txBody>
+                  <a:tcPr marL="7620" marR="7620" marT="7620" marB="0" anchor="b"/>
+                </a:tc>
+                <a:tc>
+                  <a:txBody>
+                    <a:bodyPr/>
+                    <a:lstStyle/>
+                    <a:p>
+                      <a:pPr marL="0" marR="0" lvl="0" indent="0" algn="l" defTabSz="914400" rtl="0" eaLnBrk="1" fontAlgn="b" latinLnBrk="0" hangingPunct="1">
+                        <a:lnSpc>
+                          <a:spcPct val="100000"/>
+                        </a:lnSpc>
+                        <a:spcBef>
+                          <a:spcPts val="0"/>
+                        </a:spcBef>
+                        <a:spcAft>
+                          <a:spcPts val="0"/>
+                        </a:spcAft>
+                        <a:buClrTx/>
+                        <a:buSzTx/>
+                        <a:buFontTx/>
+                        <a:buNone/>
+                        <a:tabLst/>
+                        <a:defRPr/>
+                      </a:pPr>
+                      <a:r>
+                        <a:rPr lang="en-AU" sz="1400" b="0" i="0" u="none" strike="noStrike" dirty="0">
+                          <a:solidFill>
+                            <a:srgbClr val="000000"/>
+                          </a:solidFill>
+                          <a:effectLst/>
+                          <a:latin typeface="Calibri" panose="020F0502020204030204" pitchFamily="34" charset="0"/>
+                        </a:rPr>
+                        <a:t>1_0</a:t>
+                      </a:r>
+                    </a:p>
+                  </a:txBody>
+                  <a:tcPr marL="7620" marR="7620" marT="7620" marB="0" anchor="b"/>
+                </a:tc>
+                <a:tc>
+                  <a:txBody>
+                    <a:bodyPr/>
+                    <a:lstStyle/>
+                    <a:p>
+                      <a:pPr marL="0" marR="0" lvl="0" indent="0" algn="l" defTabSz="914400" rtl="0" eaLnBrk="1" fontAlgn="b" latinLnBrk="0" hangingPunct="1">
+                        <a:lnSpc>
+                          <a:spcPct val="100000"/>
+                        </a:lnSpc>
+                        <a:spcBef>
+                          <a:spcPts val="0"/>
+                        </a:spcBef>
+                        <a:spcAft>
+                          <a:spcPts val="0"/>
+                        </a:spcAft>
+                        <a:buClrTx/>
+                        <a:buSzTx/>
+                        <a:buFontTx/>
+                        <a:buNone/>
+                        <a:tabLst/>
+                        <a:defRPr/>
+                      </a:pPr>
+                      <a:r>
+                        <a:rPr lang="en-AU" sz="1400" b="0" i="0" u="none" strike="noStrike" dirty="0">
+                          <a:solidFill>
+                            <a:srgbClr val="000000"/>
+                          </a:solidFill>
+                          <a:effectLst/>
+                          <a:latin typeface="Calibri" panose="020F0502020204030204" pitchFamily="34" charset="0"/>
+                        </a:rPr>
+                        <a:t>banana_p4_50_50_rep3</a:t>
+                      </a:r>
+                    </a:p>
+                  </a:txBody>
+                  <a:tcPr marL="7620" marR="7620" marT="7620" marB="0" anchor="b"/>
+                </a:tc>
+                <a:tc>
+                  <a:txBody>
+                    <a:bodyPr/>
+                    <a:lstStyle/>
+                    <a:p>
+                      <a:pPr marL="0" marR="0" lvl="0" indent="0" algn="l" defTabSz="914400" rtl="0" eaLnBrk="1" fontAlgn="b" latinLnBrk="0" hangingPunct="1">
+                        <a:lnSpc>
+                          <a:spcPct val="100000"/>
+                        </a:lnSpc>
+                        <a:spcBef>
+                          <a:spcPts val="0"/>
+                        </a:spcBef>
+                        <a:spcAft>
+                          <a:spcPts val="0"/>
+                        </a:spcAft>
+                        <a:buClrTx/>
+                        <a:buSzTx/>
+                        <a:buFontTx/>
+                        <a:buNone/>
+                        <a:tabLst/>
+                        <a:defRPr/>
+                      </a:pPr>
+                      <a:r>
+                        <a:rPr lang="en-AU" sz="1400" b="0" i="0" u="none" strike="noStrike" dirty="0">
+                          <a:solidFill>
+                            <a:srgbClr val="000000"/>
+                          </a:solidFill>
+                          <a:effectLst/>
+                          <a:latin typeface="Calibri" panose="020F0502020204030204" pitchFamily="34" charset="0"/>
+                        </a:rPr>
+                        <a:t>NA</a:t>
+                      </a:r>
+                    </a:p>
+                  </a:txBody>
+                  <a:tcPr marL="7620" marR="7620" marT="7620" marB="0" anchor="b"/>
+                </a:tc>
+                <a:extLst>
+                  <a:ext uri="{0D108BD9-81ED-4DB2-BD59-A6C34878D82A}">
+                    <a16:rowId xmlns:a16="http://schemas.microsoft.com/office/drawing/2014/main" val="2814426595"/>
+                  </a:ext>
+                </a:extLst>
+              </a:tr>
+              <a:tr h="0">
+                <a:tc>
+                  <a:txBody>
+                    <a:bodyPr/>
+                    <a:lstStyle/>
+                    <a:p>
+                      <a:pPr algn="l" fontAlgn="b"/>
+                      <a:r>
+                        <a:rPr lang="en-AU" sz="1400" b="0" i="0" u="none" strike="noStrike" dirty="0">
+                          <a:solidFill>
+                            <a:srgbClr val="000000"/>
+                          </a:solidFill>
+                          <a:effectLst/>
+                          <a:latin typeface="Calibri" panose="020F0502020204030204" pitchFamily="34" charset="0"/>
+                        </a:rPr>
+                        <a:t>3</a:t>
+                      </a:r>
+                    </a:p>
+                  </a:txBody>
+                  <a:tcPr marL="7620" marR="7620" marT="7620" marB="0" anchor="b"/>
+                </a:tc>
+                <a:tc>
+                  <a:txBody>
+                    <a:bodyPr/>
+                    <a:lstStyle/>
+                    <a:p>
+                      <a:pPr algn="l" fontAlgn="b"/>
+                      <a:r>
+                        <a:rPr lang="en-AU" sz="1400" b="0" i="0" u="none" strike="noStrike" dirty="0">
+                          <a:solidFill>
+                            <a:srgbClr val="000000"/>
+                          </a:solidFill>
+                          <a:effectLst/>
+                          <a:latin typeface="Calibri" panose="020F0502020204030204" pitchFamily="34" charset="0"/>
+                        </a:rPr>
+                        <a:t>6</a:t>
+                      </a:r>
+                    </a:p>
+                  </a:txBody>
+                  <a:tcPr marL="7620" marR="7620" marT="7620" marB="0" anchor="b"/>
+                </a:tc>
+                <a:tc>
+                  <a:txBody>
+                    <a:bodyPr/>
+                    <a:lstStyle/>
+                    <a:p>
+                      <a:pPr algn="l" fontAlgn="b"/>
+                      <a:r>
                         <a:rPr lang="en-AU" sz="1400" b="0" i="1" u="none" strike="noStrike" dirty="0">
                           <a:solidFill>
                             <a:srgbClr val="000000"/>
@@ -15463,7 +15546,27 @@
                           <a:effectLst/>
                           <a:latin typeface="Calibri" panose="020F0502020204030204" pitchFamily="34" charset="0"/>
                         </a:rPr>
-                        <a:t>3</a:t>
+                        <a:t>PCA</a:t>
+                      </a:r>
+                    </a:p>
+                  </a:txBody>
+                  <a:tcPr marL="7620" marR="7620" marT="7620" marB="0" anchor="b"/>
+                </a:tc>
+                <a:tc>
+                  <a:txBody>
+                    <a:bodyPr/>
+                    <a:lstStyle/>
+                    <a:p>
+                      <a:pPr algn="l" fontAlgn="b"/>
+                      <a:r>
+                        <a:rPr lang="en-AU" sz="1400" b="0" i="0" u="none" strike="noStrike" dirty="0">
+                          <a:solidFill>
+                            <a:srgbClr val="000000"/>
+                          </a:solidFill>
+                          <a:effectLst/>
+                          <a:latin typeface="Calibri" panose="020F0502020204030204" pitchFamily="34" charset="0"/>
+                        </a:rPr>
+                        <a:t>EEE</a:t>
                       </a:r>
                     </a:p>
                   </a:txBody>
@@ -15496,14 +15599,14 @@
                     <a:p>
                       <a:pPr algn="l" fontAlgn="b"/>
                       <a:r>
-                        <a:rPr lang="en-AU" sz="1400" b="0" i="1" u="none" strike="noStrike" dirty="0">
+                        <a:rPr lang="en-AU" sz="1400" b="0" i="0" u="none" strike="noStrike" dirty="0">
                           <a:solidFill>
                             <a:srgbClr val="000000"/>
                           </a:solidFill>
                           <a:effectLst/>
                           <a:latin typeface="Calibri" panose="020F0502020204030204" pitchFamily="34" charset="0"/>
                         </a:rPr>
-                        <a:t>3</a:t>
+                        <a:t>33_66</a:t>
                       </a:r>
                     </a:p>
                   </a:txBody>

</xml_diff>

<commit_message>
gutting app, is stable at least.
</commit_message>
<xml_diff>
--- a/paper/figures/Experimental design graphics.pptx
+++ b/paper/figures/Experimental design graphics.pptx
@@ -291,7 +291,7 @@
           <a:p>
             <a:fld id="{B25803F7-6624-424E-B78C-2F27C4BCE53D}" type="datetimeFigureOut">
               <a:rPr lang="en-AU" smtClean="0"/>
-              <a:t>28/10/2020</a:t>
+              <a:t>29/10/2020</a:t>
             </a:fld>
             <a:endParaRPr lang="en-AU"/>
           </a:p>
@@ -491,7 +491,7 @@
           <a:p>
             <a:fld id="{B25803F7-6624-424E-B78C-2F27C4BCE53D}" type="datetimeFigureOut">
               <a:rPr lang="en-AU" smtClean="0"/>
-              <a:t>28/10/2020</a:t>
+              <a:t>29/10/2020</a:t>
             </a:fld>
             <a:endParaRPr lang="en-AU"/>
           </a:p>
@@ -701,7 +701,7 @@
           <a:p>
             <a:fld id="{B25803F7-6624-424E-B78C-2F27C4BCE53D}" type="datetimeFigureOut">
               <a:rPr lang="en-AU" smtClean="0"/>
-              <a:t>28/10/2020</a:t>
+              <a:t>29/10/2020</a:t>
             </a:fld>
             <a:endParaRPr lang="en-AU"/>
           </a:p>
@@ -901,7 +901,7 @@
           <a:p>
             <a:fld id="{B25803F7-6624-424E-B78C-2F27C4BCE53D}" type="datetimeFigureOut">
               <a:rPr lang="en-AU" smtClean="0"/>
-              <a:t>28/10/2020</a:t>
+              <a:t>29/10/2020</a:t>
             </a:fld>
             <a:endParaRPr lang="en-AU"/>
           </a:p>
@@ -1177,7 +1177,7 @@
           <a:p>
             <a:fld id="{B25803F7-6624-424E-B78C-2F27C4BCE53D}" type="datetimeFigureOut">
               <a:rPr lang="en-AU" smtClean="0"/>
-              <a:t>28/10/2020</a:t>
+              <a:t>29/10/2020</a:t>
             </a:fld>
             <a:endParaRPr lang="en-AU"/>
           </a:p>
@@ -1445,7 +1445,7 @@
           <a:p>
             <a:fld id="{B25803F7-6624-424E-B78C-2F27C4BCE53D}" type="datetimeFigureOut">
               <a:rPr lang="en-AU" smtClean="0"/>
-              <a:t>28/10/2020</a:t>
+              <a:t>29/10/2020</a:t>
             </a:fld>
             <a:endParaRPr lang="en-AU"/>
           </a:p>
@@ -1860,7 +1860,7 @@
           <a:p>
             <a:fld id="{B25803F7-6624-424E-B78C-2F27C4BCE53D}" type="datetimeFigureOut">
               <a:rPr lang="en-AU" smtClean="0"/>
-              <a:t>28/10/2020</a:t>
+              <a:t>29/10/2020</a:t>
             </a:fld>
             <a:endParaRPr lang="en-AU"/>
           </a:p>
@@ -2002,7 +2002,7 @@
           <a:p>
             <a:fld id="{B25803F7-6624-424E-B78C-2F27C4BCE53D}" type="datetimeFigureOut">
               <a:rPr lang="en-AU" smtClean="0"/>
-              <a:t>28/10/2020</a:t>
+              <a:t>29/10/2020</a:t>
             </a:fld>
             <a:endParaRPr lang="en-AU"/>
           </a:p>
@@ -2115,7 +2115,7 @@
           <a:p>
             <a:fld id="{B25803F7-6624-424E-B78C-2F27C4BCE53D}" type="datetimeFigureOut">
               <a:rPr lang="en-AU" smtClean="0"/>
-              <a:t>28/10/2020</a:t>
+              <a:t>29/10/2020</a:t>
             </a:fld>
             <a:endParaRPr lang="en-AU"/>
           </a:p>
@@ -2428,7 +2428,7 @@
           <a:p>
             <a:fld id="{B25803F7-6624-424E-B78C-2F27C4BCE53D}" type="datetimeFigureOut">
               <a:rPr lang="en-AU" smtClean="0"/>
-              <a:t>28/10/2020</a:t>
+              <a:t>29/10/2020</a:t>
             </a:fld>
             <a:endParaRPr lang="en-AU"/>
           </a:p>
@@ -2717,7 +2717,7 @@
           <a:p>
             <a:fld id="{B25803F7-6624-424E-B78C-2F27C4BCE53D}" type="datetimeFigureOut">
               <a:rPr lang="en-AU" smtClean="0"/>
-              <a:t>28/10/2020</a:t>
+              <a:t>29/10/2020</a:t>
             </a:fld>
             <a:endParaRPr lang="en-AU"/>
           </a:p>
@@ -2960,7 +2960,7 @@
           <a:p>
             <a:fld id="{B25803F7-6624-424E-B78C-2F27C4BCE53D}" type="datetimeFigureOut">
               <a:rPr lang="en-AU" smtClean="0"/>
-              <a:t>28/10/2020</a:t>
+              <a:t>29/10/2020</a:t>
             </a:fld>
             <a:endParaRPr lang="en-AU"/>
           </a:p>
@@ -16588,7 +16588,7 @@
         </p:nvSpPr>
         <p:spPr>
           <a:xfrm>
-            <a:off x="311533" y="2904160"/>
+            <a:off x="102910" y="3159092"/>
             <a:ext cx="3312000" cy="646331"/>
           </a:xfrm>
           <a:prstGeom prst="rect">
@@ -16864,10 +16864,10 @@
       </p:grpSp>
       <p:grpSp>
         <p:nvGrpSpPr>
-          <p:cNvPr id="56" name="Group 55">
+          <p:cNvPr id="57" name="Group 56">
             <a:extLst>
               <a:ext uri="{FF2B5EF4-FFF2-40B4-BE49-F238E27FC236}">
-                <a16:creationId xmlns:a16="http://schemas.microsoft.com/office/drawing/2014/main" id="{76DCF800-5DB6-47D0-936D-5EFE3D33214E}"/>
+                <a16:creationId xmlns:a16="http://schemas.microsoft.com/office/drawing/2014/main" id="{9ACE3E36-F3E1-4080-9D54-203E5EF7D87B}"/>
               </a:ext>
             </a:extLst>
           </p:cNvPr>
@@ -16876,1864 +16876,18 @@
         </p:nvGrpSpPr>
         <p:grpSpPr>
           <a:xfrm>
-            <a:off x="-5213484" y="-165947"/>
-            <a:ext cx="4500354" cy="6882859"/>
-            <a:chOff x="154222" y="694478"/>
-            <a:chExt cx="4500354" cy="6882859"/>
+            <a:off x="-3654891" y="3880785"/>
+            <a:ext cx="2582822" cy="2836127"/>
+            <a:chOff x="-258555" y="4765218"/>
+            <a:chExt cx="2582822" cy="2836127"/>
           </a:xfrm>
         </p:grpSpPr>
-        <p:grpSp>
-          <p:nvGrpSpPr>
-            <p:cNvPr id="57" name="Group 56">
+        <p:sp>
+          <p:nvSpPr>
+            <p:cNvPr id="134" name="TextBox 133">
               <a:extLst>
                 <a:ext uri="{FF2B5EF4-FFF2-40B4-BE49-F238E27FC236}">
-                  <a16:creationId xmlns:a16="http://schemas.microsoft.com/office/drawing/2014/main" id="{9ACE3E36-F3E1-4080-9D54-203E5EF7D87B}"/>
-                </a:ext>
-              </a:extLst>
-            </p:cNvPr>
-            <p:cNvGrpSpPr/>
-            <p:nvPr/>
-          </p:nvGrpSpPr>
-          <p:grpSpPr>
-            <a:xfrm>
-              <a:off x="1712815" y="4741210"/>
-              <a:ext cx="2582822" cy="2836127"/>
-              <a:chOff x="-258555" y="4765218"/>
-              <a:chExt cx="2582822" cy="2836127"/>
-            </a:xfrm>
-          </p:grpSpPr>
-          <p:sp>
-            <p:nvSpPr>
-              <p:cNvPr id="134" name="TextBox 133">
-                <a:extLst>
-                  <a:ext uri="{FF2B5EF4-FFF2-40B4-BE49-F238E27FC236}">
-                    <a16:creationId xmlns:a16="http://schemas.microsoft.com/office/drawing/2014/main" id="{7075BF10-4FE8-44F8-81CC-17FA5A9C52D7}"/>
-                  </a:ext>
-                </a:extLst>
-              </p:cNvPr>
-              <p:cNvSpPr txBox="1"/>
-              <p:nvPr/>
-            </p:nvSpPr>
-            <p:spPr>
-              <a:xfrm>
-                <a:off x="1260358" y="5477685"/>
-                <a:ext cx="319327" cy="2123658"/>
-              </a:xfrm>
-              <a:prstGeom prst="rect">
-                <a:avLst/>
-              </a:prstGeom>
-              <a:noFill/>
-            </p:spPr>
-            <p:txBody>
-              <a:bodyPr wrap="square" rtlCol="0">
-                <a:spAutoFit/>
-              </a:bodyPr>
-              <a:lstStyle/>
-              <a:p>
-                <a:pPr algn="r"/>
-                <a:r>
-                  <a:rPr lang="en-AU" sz="2200" dirty="0"/>
-                  <a:t>1</a:t>
-                </a:r>
-              </a:p>
-              <a:p>
-                <a:pPr algn="r"/>
-                <a:r>
-                  <a:rPr lang="en-US" sz="2200" dirty="0"/>
-                  <a:t>2</a:t>
-                </a:r>
-                <a:endParaRPr lang="en-AU" sz="2200" dirty="0"/>
-              </a:p>
-              <a:p>
-                <a:pPr algn="r"/>
-                <a:r>
-                  <a:rPr lang="en-US" sz="2200" dirty="0"/>
-                  <a:t>3</a:t>
-                </a:r>
-                <a:endParaRPr lang="en-AU" sz="2200" dirty="0"/>
-              </a:p>
-              <a:p>
-                <a:pPr algn="r"/>
-                <a:r>
-                  <a:rPr lang="en-US" sz="2200" dirty="0"/>
-                  <a:t>4</a:t>
-                </a:r>
-                <a:endParaRPr lang="en-AU" sz="2200" dirty="0"/>
-              </a:p>
-              <a:p>
-                <a:pPr algn="r"/>
-                <a:r>
-                  <a:rPr lang="en-US" sz="2200" dirty="0"/>
-                  <a:t>5</a:t>
-                </a:r>
-                <a:endParaRPr lang="en-AU" sz="2200" dirty="0"/>
-              </a:p>
-              <a:p>
-                <a:pPr algn="r"/>
-                <a:r>
-                  <a:rPr lang="en-US" sz="2200" dirty="0"/>
-                  <a:t>6</a:t>
-                </a:r>
-                <a:endParaRPr lang="en-AU" sz="2200" dirty="0"/>
-              </a:p>
-            </p:txBody>
-          </p:sp>
-          <p:sp>
-            <p:nvSpPr>
-              <p:cNvPr id="135" name="TextBox 134">
-                <a:extLst>
-                  <a:ext uri="{FF2B5EF4-FFF2-40B4-BE49-F238E27FC236}">
-                    <a16:creationId xmlns:a16="http://schemas.microsoft.com/office/drawing/2014/main" id="{87DCF6C8-9C55-4CA9-B269-85C703D0E0BA}"/>
-                  </a:ext>
-                </a:extLst>
-              </p:cNvPr>
-              <p:cNvSpPr txBox="1"/>
-              <p:nvPr/>
-            </p:nvSpPr>
-            <p:spPr>
-              <a:xfrm rot="16200000">
-                <a:off x="1581368" y="4802520"/>
-                <a:ext cx="707887" cy="646331"/>
-              </a:xfrm>
-              <a:prstGeom prst="rect">
-                <a:avLst/>
-              </a:prstGeom>
-              <a:noFill/>
-            </p:spPr>
-            <p:txBody>
-              <a:bodyPr wrap="square" rtlCol="0">
-                <a:spAutoFit/>
-              </a:bodyPr>
-              <a:lstStyle/>
-              <a:p>
-                <a:r>
-                  <a:rPr lang="en-AU" dirty="0"/>
-                  <a:t>Rep 1</a:t>
-                </a:r>
-              </a:p>
-              <a:p>
-                <a:r>
-                  <a:rPr lang="en-AU" dirty="0"/>
-                  <a:t>Rep 2</a:t>
-                </a:r>
-              </a:p>
-            </p:txBody>
-          </p:sp>
-          <p:sp>
-            <p:nvSpPr>
-              <p:cNvPr id="136" name="TextBox 135">
-                <a:extLst>
-                  <a:ext uri="{FF2B5EF4-FFF2-40B4-BE49-F238E27FC236}">
-                    <a16:creationId xmlns:a16="http://schemas.microsoft.com/office/drawing/2014/main" id="{EE9751F9-7190-4A50-8990-53CB8151858C}"/>
-                  </a:ext>
-                </a:extLst>
-              </p:cNvPr>
-              <p:cNvSpPr txBox="1"/>
-              <p:nvPr/>
-            </p:nvSpPr>
-            <p:spPr>
-              <a:xfrm>
-                <a:off x="-258555" y="4765218"/>
-                <a:ext cx="1805816" cy="707886"/>
-              </a:xfrm>
-              <a:prstGeom prst="rect">
-                <a:avLst/>
-              </a:prstGeom>
-              <a:noFill/>
-            </p:spPr>
-            <p:txBody>
-              <a:bodyPr wrap="square" rtlCol="0">
-                <a:spAutoFit/>
-              </a:bodyPr>
-              <a:lstStyle/>
-              <a:p>
-                <a:pPr algn="r"/>
-                <a:r>
-                  <a:rPr lang="en-AU" sz="2000" dirty="0"/>
-                  <a:t>VC order</a:t>
-                </a:r>
-              </a:p>
-              <a:p>
-                <a:pPr algn="r"/>
-                <a:r>
-                  <a:rPr lang="en-AU" sz="2000" dirty="0"/>
-                  <a:t>permutations</a:t>
-                </a:r>
-              </a:p>
-            </p:txBody>
-          </p:sp>
-          <p:cxnSp>
-            <p:nvCxnSpPr>
-              <p:cNvPr id="137" name="Straight Connector 136">
-                <a:extLst>
-                  <a:ext uri="{FF2B5EF4-FFF2-40B4-BE49-F238E27FC236}">
-                    <a16:creationId xmlns:a16="http://schemas.microsoft.com/office/drawing/2014/main" id="{293D2887-75A0-4FA0-8B95-80C0B0F6AB8B}"/>
-                  </a:ext>
-                </a:extLst>
-              </p:cNvPr>
-              <p:cNvCxnSpPr>
-                <a:cxnSpLocks/>
-              </p:cNvCxnSpPr>
-              <p:nvPr/>
-            </p:nvCxnSpPr>
-            <p:spPr>
-              <a:xfrm>
-                <a:off x="-31935" y="5477685"/>
-                <a:ext cx="2336163" cy="0"/>
-              </a:xfrm>
-              <a:prstGeom prst="line">
-                <a:avLst/>
-              </a:prstGeom>
-              <a:ln w="28575">
-                <a:solidFill>
-                  <a:schemeClr val="tx1"/>
-                </a:solidFill>
-              </a:ln>
-            </p:spPr>
-            <p:style>
-              <a:lnRef idx="1">
-                <a:schemeClr val="accent1"/>
-              </a:lnRef>
-              <a:fillRef idx="0">
-                <a:schemeClr val="accent1"/>
-              </a:fillRef>
-              <a:effectRef idx="0">
-                <a:schemeClr val="accent1"/>
-              </a:effectRef>
-              <a:fontRef idx="minor">
-                <a:schemeClr val="tx1"/>
-              </a:fontRef>
-            </p:style>
-          </p:cxnSp>
-          <p:cxnSp>
-            <p:nvCxnSpPr>
-              <p:cNvPr id="138" name="Straight Connector 137">
-                <a:extLst>
-                  <a:ext uri="{FF2B5EF4-FFF2-40B4-BE49-F238E27FC236}">
-                    <a16:creationId xmlns:a16="http://schemas.microsoft.com/office/drawing/2014/main" id="{6949D352-9DB9-43F0-98A4-C3812693BC27}"/>
-                  </a:ext>
-                </a:extLst>
-              </p:cNvPr>
-              <p:cNvCxnSpPr>
-                <a:cxnSpLocks/>
-              </p:cNvCxnSpPr>
-              <p:nvPr/>
-            </p:nvCxnSpPr>
-            <p:spPr>
-              <a:xfrm flipH="1" flipV="1">
-                <a:off x="1569094" y="4843648"/>
-                <a:ext cx="10592" cy="2757697"/>
-              </a:xfrm>
-              <a:prstGeom prst="line">
-                <a:avLst/>
-              </a:prstGeom>
-              <a:ln w="28575">
-                <a:solidFill>
-                  <a:schemeClr val="tx1"/>
-                </a:solidFill>
-              </a:ln>
-            </p:spPr>
-            <p:style>
-              <a:lnRef idx="1">
-                <a:schemeClr val="accent1"/>
-              </a:lnRef>
-              <a:fillRef idx="0">
-                <a:schemeClr val="accent1"/>
-              </a:fillRef>
-              <a:effectRef idx="0">
-                <a:schemeClr val="accent1"/>
-              </a:effectRef>
-              <a:fontRef idx="minor">
-                <a:schemeClr val="tx1"/>
-              </a:fontRef>
-            </p:style>
-          </p:cxnSp>
-          <p:sp>
-            <p:nvSpPr>
-              <p:cNvPr id="139" name="Rectangle: Rounded Corners 138">
-                <a:extLst>
-                  <a:ext uri="{FF2B5EF4-FFF2-40B4-BE49-F238E27FC236}">
-                    <a16:creationId xmlns:a16="http://schemas.microsoft.com/office/drawing/2014/main" id="{21402511-3A4A-4AAF-9B3B-D7D5B8B929D4}"/>
-                  </a:ext>
-                </a:extLst>
-              </p:cNvPr>
-              <p:cNvSpPr/>
-              <p:nvPr/>
-            </p:nvSpPr>
-            <p:spPr>
-              <a:xfrm>
-                <a:off x="1656912" y="5533108"/>
-                <a:ext cx="288000" cy="288000"/>
-              </a:xfrm>
-              <a:prstGeom prst="roundRect">
-                <a:avLst/>
-              </a:prstGeom>
-              <a:solidFill>
-                <a:srgbClr val="7030A0"/>
-              </a:solidFill>
-              <a:ln>
-                <a:solidFill>
-                  <a:schemeClr val="tx1"/>
-                </a:solidFill>
-              </a:ln>
-            </p:spPr>
-            <p:style>
-              <a:lnRef idx="2">
-                <a:schemeClr val="accent2">
-                  <a:shade val="50000"/>
-                </a:schemeClr>
-              </a:lnRef>
-              <a:fillRef idx="1">
-                <a:schemeClr val="accent2"/>
-              </a:fillRef>
-              <a:effectRef idx="0">
-                <a:schemeClr val="accent2"/>
-              </a:effectRef>
-              <a:fontRef idx="minor">
-                <a:schemeClr val="lt1"/>
-              </a:fontRef>
-            </p:style>
-            <p:txBody>
-              <a:bodyPr rtlCol="0" anchor="ctr"/>
-              <a:lstStyle/>
-              <a:p>
-                <a:pPr algn="ctr"/>
-                <a:r>
-                  <a:rPr lang="en-US" sz="2200" dirty="0"/>
-                  <a:t>1</a:t>
-                </a:r>
-                <a:endParaRPr lang="en-AU" sz="2200" dirty="0"/>
-              </a:p>
-            </p:txBody>
-          </p:sp>
-          <p:sp>
-            <p:nvSpPr>
-              <p:cNvPr id="140" name="Rectangle: Rounded Corners 139">
-                <a:extLst>
-                  <a:ext uri="{FF2B5EF4-FFF2-40B4-BE49-F238E27FC236}">
-                    <a16:creationId xmlns:a16="http://schemas.microsoft.com/office/drawing/2014/main" id="{1FB7EB48-FB69-48AA-9159-90B9192823E4}"/>
-                  </a:ext>
-                </a:extLst>
-              </p:cNvPr>
-              <p:cNvSpPr/>
-              <p:nvPr/>
-            </p:nvSpPr>
-            <p:spPr>
-              <a:xfrm>
-                <a:off x="1302138" y="5852662"/>
-                <a:ext cx="1022129" cy="349319"/>
-              </a:xfrm>
-              <a:prstGeom prst="roundRect">
-                <a:avLst/>
-              </a:prstGeom>
-              <a:noFill/>
-              <a:ln w="28575">
-                <a:solidFill>
-                  <a:srgbClr val="FF0000"/>
-                </a:solidFill>
-              </a:ln>
-            </p:spPr>
-            <p:style>
-              <a:lnRef idx="2">
-                <a:schemeClr val="accent1">
-                  <a:shade val="50000"/>
-                </a:schemeClr>
-              </a:lnRef>
-              <a:fillRef idx="1">
-                <a:schemeClr val="accent1"/>
-              </a:fillRef>
-              <a:effectRef idx="0">
-                <a:schemeClr val="accent1"/>
-              </a:effectRef>
-              <a:fontRef idx="minor">
-                <a:schemeClr val="lt1"/>
-              </a:fontRef>
-            </p:style>
-            <p:txBody>
-              <a:bodyPr rtlCol="0" anchor="ctr"/>
-              <a:lstStyle/>
-              <a:p>
-                <a:pPr algn="ctr"/>
-                <a:endParaRPr lang="en-AU"/>
-              </a:p>
-            </p:txBody>
-          </p:sp>
-          <p:sp>
-            <p:nvSpPr>
-              <p:cNvPr id="141" name="Rectangle: Rounded Corners 140">
-                <a:extLst>
-                  <a:ext uri="{FF2B5EF4-FFF2-40B4-BE49-F238E27FC236}">
-                    <a16:creationId xmlns:a16="http://schemas.microsoft.com/office/drawing/2014/main" id="{FD485652-5FA3-4F70-B752-C5497F5FAF4D}"/>
-                  </a:ext>
-                </a:extLst>
-              </p:cNvPr>
-              <p:cNvSpPr/>
-              <p:nvPr/>
-            </p:nvSpPr>
-            <p:spPr>
-              <a:xfrm>
-                <a:off x="1994428" y="5533108"/>
-                <a:ext cx="288000" cy="288000"/>
-              </a:xfrm>
-              <a:prstGeom prst="roundRect">
-                <a:avLst/>
-              </a:prstGeom>
-              <a:solidFill>
-                <a:schemeClr val="accent6">
-                  <a:lumMod val="75000"/>
-                </a:schemeClr>
-              </a:solidFill>
-              <a:ln>
-                <a:solidFill>
-                  <a:schemeClr val="tx1"/>
-                </a:solidFill>
-              </a:ln>
-            </p:spPr>
-            <p:style>
-              <a:lnRef idx="2">
-                <a:schemeClr val="accent1">
-                  <a:shade val="50000"/>
-                </a:schemeClr>
-              </a:lnRef>
-              <a:fillRef idx="1">
-                <a:schemeClr val="accent1"/>
-              </a:fillRef>
-              <a:effectRef idx="0">
-                <a:schemeClr val="accent1"/>
-              </a:effectRef>
-              <a:fontRef idx="minor">
-                <a:schemeClr val="lt1"/>
-              </a:fontRef>
-            </p:style>
-            <p:txBody>
-              <a:bodyPr rtlCol="0" anchor="ctr"/>
-              <a:lstStyle/>
-              <a:p>
-                <a:pPr algn="ctr"/>
-                <a:r>
-                  <a:rPr lang="en-US" sz="2200" dirty="0"/>
-                  <a:t>2</a:t>
-                </a:r>
-                <a:endParaRPr lang="en-AU" sz="2200" dirty="0"/>
-              </a:p>
-            </p:txBody>
-          </p:sp>
-          <p:sp>
-            <p:nvSpPr>
-              <p:cNvPr id="142" name="Rectangle: Rounded Corners 141">
-                <a:extLst>
-                  <a:ext uri="{FF2B5EF4-FFF2-40B4-BE49-F238E27FC236}">
-                    <a16:creationId xmlns:a16="http://schemas.microsoft.com/office/drawing/2014/main" id="{0F3C369B-D8FB-419C-80E4-BF5025B99D5F}"/>
-                  </a:ext>
-                </a:extLst>
-              </p:cNvPr>
-              <p:cNvSpPr/>
-              <p:nvPr/>
-            </p:nvSpPr>
-            <p:spPr>
-              <a:xfrm>
-                <a:off x="1990294" y="5887711"/>
-                <a:ext cx="288000" cy="288000"/>
-              </a:xfrm>
-              <a:prstGeom prst="roundRect">
-                <a:avLst/>
-              </a:prstGeom>
-              <a:solidFill>
-                <a:srgbClr val="C00000"/>
-              </a:solidFill>
-              <a:ln>
-                <a:solidFill>
-                  <a:schemeClr val="tx1"/>
-                </a:solidFill>
-              </a:ln>
-            </p:spPr>
-            <p:style>
-              <a:lnRef idx="2">
-                <a:schemeClr val="accent1">
-                  <a:shade val="50000"/>
-                </a:schemeClr>
-              </a:lnRef>
-              <a:fillRef idx="1">
-                <a:schemeClr val="accent1"/>
-              </a:fillRef>
-              <a:effectRef idx="0">
-                <a:schemeClr val="accent1"/>
-              </a:effectRef>
-              <a:fontRef idx="minor">
-                <a:schemeClr val="lt1"/>
-              </a:fontRef>
-            </p:style>
-            <p:txBody>
-              <a:bodyPr rtlCol="0" anchor="ctr"/>
-              <a:lstStyle/>
-              <a:p>
-                <a:pPr algn="ctr"/>
-                <a:r>
-                  <a:rPr lang="en-US" sz="2200" dirty="0"/>
-                  <a:t>3</a:t>
-                </a:r>
-                <a:endParaRPr lang="en-AU" sz="2200" dirty="0"/>
-              </a:p>
-            </p:txBody>
-          </p:sp>
-          <p:sp>
-            <p:nvSpPr>
-              <p:cNvPr id="143" name="Rectangle: Rounded Corners 142">
-                <a:extLst>
-                  <a:ext uri="{FF2B5EF4-FFF2-40B4-BE49-F238E27FC236}">
-                    <a16:creationId xmlns:a16="http://schemas.microsoft.com/office/drawing/2014/main" id="{46F5EF77-82D8-494C-B5C2-CAEE3EA0776E}"/>
-                  </a:ext>
-                </a:extLst>
-              </p:cNvPr>
-              <p:cNvSpPr/>
-              <p:nvPr/>
-            </p:nvSpPr>
-            <p:spPr>
-              <a:xfrm>
-                <a:off x="1652836" y="5887711"/>
-                <a:ext cx="288000" cy="288000"/>
-              </a:xfrm>
-              <a:prstGeom prst="roundRect">
-                <a:avLst/>
-              </a:prstGeom>
-              <a:solidFill>
-                <a:srgbClr val="7030A0"/>
-              </a:solidFill>
-              <a:ln>
-                <a:solidFill>
-                  <a:schemeClr val="tx1"/>
-                </a:solidFill>
-              </a:ln>
-            </p:spPr>
-            <p:style>
-              <a:lnRef idx="2">
-                <a:schemeClr val="accent2">
-                  <a:shade val="50000"/>
-                </a:schemeClr>
-              </a:lnRef>
-              <a:fillRef idx="1">
-                <a:schemeClr val="accent2"/>
-              </a:fillRef>
-              <a:effectRef idx="0">
-                <a:schemeClr val="accent2"/>
-              </a:effectRef>
-              <a:fontRef idx="minor">
-                <a:schemeClr val="lt1"/>
-              </a:fontRef>
-            </p:style>
-            <p:txBody>
-              <a:bodyPr rtlCol="0" anchor="ctr"/>
-              <a:lstStyle/>
-              <a:p>
-                <a:pPr algn="ctr"/>
-                <a:r>
-                  <a:rPr lang="en-US" sz="2200" dirty="0"/>
-                  <a:t>1</a:t>
-                </a:r>
-                <a:endParaRPr lang="en-AU" sz="2200" dirty="0"/>
-              </a:p>
-            </p:txBody>
-          </p:sp>
-          <p:sp>
-            <p:nvSpPr>
-              <p:cNvPr id="144" name="Rectangle: Rounded Corners 143">
-                <a:extLst>
-                  <a:ext uri="{FF2B5EF4-FFF2-40B4-BE49-F238E27FC236}">
-                    <a16:creationId xmlns:a16="http://schemas.microsoft.com/office/drawing/2014/main" id="{5937D5B3-8EB4-4E64-BCF2-C94EE90DEE44}"/>
-                  </a:ext>
-                </a:extLst>
-              </p:cNvPr>
-              <p:cNvSpPr/>
-              <p:nvPr/>
-            </p:nvSpPr>
-            <p:spPr>
-              <a:xfrm>
-                <a:off x="1657892" y="6228661"/>
-                <a:ext cx="288000" cy="288000"/>
-              </a:xfrm>
-              <a:prstGeom prst="roundRect">
-                <a:avLst/>
-              </a:prstGeom>
-              <a:solidFill>
-                <a:schemeClr val="accent6">
-                  <a:lumMod val="75000"/>
-                </a:schemeClr>
-              </a:solidFill>
-              <a:ln>
-                <a:solidFill>
-                  <a:schemeClr val="tx1"/>
-                </a:solidFill>
-              </a:ln>
-            </p:spPr>
-            <p:style>
-              <a:lnRef idx="2">
-                <a:schemeClr val="accent1">
-                  <a:shade val="50000"/>
-                </a:schemeClr>
-              </a:lnRef>
-              <a:fillRef idx="1">
-                <a:schemeClr val="accent1"/>
-              </a:fillRef>
-              <a:effectRef idx="0">
-                <a:schemeClr val="accent1"/>
-              </a:effectRef>
-              <a:fontRef idx="minor">
-                <a:schemeClr val="lt1"/>
-              </a:fontRef>
-            </p:style>
-            <p:txBody>
-              <a:bodyPr rtlCol="0" anchor="ctr"/>
-              <a:lstStyle/>
-              <a:p>
-                <a:pPr algn="ctr"/>
-                <a:r>
-                  <a:rPr lang="en-US" sz="2200" dirty="0"/>
-                  <a:t>2</a:t>
-                </a:r>
-                <a:endParaRPr lang="en-AU" sz="2200" dirty="0"/>
-              </a:p>
-            </p:txBody>
-          </p:sp>
-          <p:sp>
-            <p:nvSpPr>
-              <p:cNvPr id="145" name="Rectangle: Rounded Corners 144">
-                <a:extLst>
-                  <a:ext uri="{FF2B5EF4-FFF2-40B4-BE49-F238E27FC236}">
-                    <a16:creationId xmlns:a16="http://schemas.microsoft.com/office/drawing/2014/main" id="{F13DE852-E971-47B2-9D61-60EBB202FD70}"/>
-                  </a:ext>
-                </a:extLst>
-              </p:cNvPr>
-              <p:cNvSpPr/>
-              <p:nvPr/>
-            </p:nvSpPr>
-            <p:spPr>
-              <a:xfrm>
-                <a:off x="1657261" y="6550561"/>
-                <a:ext cx="288000" cy="288000"/>
-              </a:xfrm>
-              <a:prstGeom prst="roundRect">
-                <a:avLst/>
-              </a:prstGeom>
-              <a:solidFill>
-                <a:schemeClr val="accent6">
-                  <a:lumMod val="75000"/>
-                </a:schemeClr>
-              </a:solidFill>
-              <a:ln>
-                <a:solidFill>
-                  <a:schemeClr val="tx1"/>
-                </a:solidFill>
-              </a:ln>
-            </p:spPr>
-            <p:style>
-              <a:lnRef idx="2">
-                <a:schemeClr val="accent1">
-                  <a:shade val="50000"/>
-                </a:schemeClr>
-              </a:lnRef>
-              <a:fillRef idx="1">
-                <a:schemeClr val="accent1"/>
-              </a:fillRef>
-              <a:effectRef idx="0">
-                <a:schemeClr val="accent1"/>
-              </a:effectRef>
-              <a:fontRef idx="minor">
-                <a:schemeClr val="lt1"/>
-              </a:fontRef>
-            </p:style>
-            <p:txBody>
-              <a:bodyPr rtlCol="0" anchor="ctr"/>
-              <a:lstStyle/>
-              <a:p>
-                <a:pPr algn="ctr"/>
-                <a:r>
-                  <a:rPr lang="en-US" sz="2200" dirty="0"/>
-                  <a:t>2</a:t>
-                </a:r>
-                <a:endParaRPr lang="en-AU" sz="2200" dirty="0"/>
-              </a:p>
-            </p:txBody>
-          </p:sp>
-          <p:sp>
-            <p:nvSpPr>
-              <p:cNvPr id="146" name="Rectangle: Rounded Corners 145">
-                <a:extLst>
-                  <a:ext uri="{FF2B5EF4-FFF2-40B4-BE49-F238E27FC236}">
-                    <a16:creationId xmlns:a16="http://schemas.microsoft.com/office/drawing/2014/main" id="{D42A0E2E-0F17-484A-8E51-CB7F715011B5}"/>
-                  </a:ext>
-                </a:extLst>
-              </p:cNvPr>
-              <p:cNvSpPr/>
-              <p:nvPr/>
-            </p:nvSpPr>
-            <p:spPr>
-              <a:xfrm>
-                <a:off x="1652836" y="6885663"/>
-                <a:ext cx="288000" cy="288000"/>
-              </a:xfrm>
-              <a:prstGeom prst="roundRect">
-                <a:avLst/>
-              </a:prstGeom>
-              <a:solidFill>
-                <a:srgbClr val="C00000"/>
-              </a:solidFill>
-              <a:ln>
-                <a:solidFill>
-                  <a:schemeClr val="tx1"/>
-                </a:solidFill>
-              </a:ln>
-            </p:spPr>
-            <p:style>
-              <a:lnRef idx="2">
-                <a:schemeClr val="accent1">
-                  <a:shade val="50000"/>
-                </a:schemeClr>
-              </a:lnRef>
-              <a:fillRef idx="1">
-                <a:schemeClr val="accent1"/>
-              </a:fillRef>
-              <a:effectRef idx="0">
-                <a:schemeClr val="accent1"/>
-              </a:effectRef>
-              <a:fontRef idx="minor">
-                <a:schemeClr val="lt1"/>
-              </a:fontRef>
-            </p:style>
-            <p:txBody>
-              <a:bodyPr rtlCol="0" anchor="ctr"/>
-              <a:lstStyle/>
-              <a:p>
-                <a:pPr algn="ctr"/>
-                <a:r>
-                  <a:rPr lang="en-US" sz="2200" dirty="0"/>
-                  <a:t>3</a:t>
-                </a:r>
-                <a:endParaRPr lang="en-AU" sz="2200" dirty="0"/>
-              </a:p>
-            </p:txBody>
-          </p:sp>
-          <p:sp>
-            <p:nvSpPr>
-              <p:cNvPr id="147" name="Rectangle: Rounded Corners 146">
-                <a:extLst>
-                  <a:ext uri="{FF2B5EF4-FFF2-40B4-BE49-F238E27FC236}">
-                    <a16:creationId xmlns:a16="http://schemas.microsoft.com/office/drawing/2014/main" id="{876F010B-A773-45DF-8A9D-6A6079233AD3}"/>
-                  </a:ext>
-                </a:extLst>
-              </p:cNvPr>
-              <p:cNvSpPr/>
-              <p:nvPr/>
-            </p:nvSpPr>
-            <p:spPr>
-              <a:xfrm>
-                <a:off x="1652833" y="7229919"/>
-                <a:ext cx="288000" cy="288000"/>
-              </a:xfrm>
-              <a:prstGeom prst="roundRect">
-                <a:avLst/>
-              </a:prstGeom>
-              <a:solidFill>
-                <a:srgbClr val="C00000"/>
-              </a:solidFill>
-              <a:ln>
-                <a:solidFill>
-                  <a:schemeClr val="tx1"/>
-                </a:solidFill>
-              </a:ln>
-            </p:spPr>
-            <p:style>
-              <a:lnRef idx="2">
-                <a:schemeClr val="accent1">
-                  <a:shade val="50000"/>
-                </a:schemeClr>
-              </a:lnRef>
-              <a:fillRef idx="1">
-                <a:schemeClr val="accent1"/>
-              </a:fillRef>
-              <a:effectRef idx="0">
-                <a:schemeClr val="accent1"/>
-              </a:effectRef>
-              <a:fontRef idx="minor">
-                <a:schemeClr val="lt1"/>
-              </a:fontRef>
-            </p:style>
-            <p:txBody>
-              <a:bodyPr rtlCol="0" anchor="ctr"/>
-              <a:lstStyle/>
-              <a:p>
-                <a:pPr algn="ctr"/>
-                <a:r>
-                  <a:rPr lang="en-US" sz="2200" dirty="0"/>
-                  <a:t>3</a:t>
-                </a:r>
-                <a:endParaRPr lang="en-AU" sz="2200" dirty="0"/>
-              </a:p>
-            </p:txBody>
-          </p:sp>
-          <p:sp>
-            <p:nvSpPr>
-              <p:cNvPr id="148" name="Rectangle: Rounded Corners 147">
-                <a:extLst>
-                  <a:ext uri="{FF2B5EF4-FFF2-40B4-BE49-F238E27FC236}">
-                    <a16:creationId xmlns:a16="http://schemas.microsoft.com/office/drawing/2014/main" id="{3B18543A-A9BC-4ADF-9420-9E6EF9AC6A3B}"/>
-                  </a:ext>
-                </a:extLst>
-              </p:cNvPr>
-              <p:cNvSpPr/>
-              <p:nvPr/>
-            </p:nvSpPr>
-            <p:spPr>
-              <a:xfrm>
-                <a:off x="1998198" y="6222311"/>
-                <a:ext cx="288000" cy="288000"/>
-              </a:xfrm>
-              <a:prstGeom prst="roundRect">
-                <a:avLst/>
-              </a:prstGeom>
-              <a:solidFill>
-                <a:srgbClr val="C00000"/>
-              </a:solidFill>
-              <a:ln>
-                <a:solidFill>
-                  <a:schemeClr val="tx1"/>
-                </a:solidFill>
-              </a:ln>
-            </p:spPr>
-            <p:style>
-              <a:lnRef idx="2">
-                <a:schemeClr val="accent1">
-                  <a:shade val="50000"/>
-                </a:schemeClr>
-              </a:lnRef>
-              <a:fillRef idx="1">
-                <a:schemeClr val="accent1"/>
-              </a:fillRef>
-              <a:effectRef idx="0">
-                <a:schemeClr val="accent1"/>
-              </a:effectRef>
-              <a:fontRef idx="minor">
-                <a:schemeClr val="lt1"/>
-              </a:fontRef>
-            </p:style>
-            <p:txBody>
-              <a:bodyPr rtlCol="0" anchor="ctr"/>
-              <a:lstStyle/>
-              <a:p>
-                <a:pPr algn="ctr"/>
-                <a:r>
-                  <a:rPr lang="en-US" sz="2200" dirty="0"/>
-                  <a:t>3</a:t>
-                </a:r>
-                <a:endParaRPr lang="en-AU" sz="2200" dirty="0"/>
-              </a:p>
-            </p:txBody>
-          </p:sp>
-          <p:sp>
-            <p:nvSpPr>
-              <p:cNvPr id="149" name="Rectangle: Rounded Corners 148">
-                <a:extLst>
-                  <a:ext uri="{FF2B5EF4-FFF2-40B4-BE49-F238E27FC236}">
-                    <a16:creationId xmlns:a16="http://schemas.microsoft.com/office/drawing/2014/main" id="{F9361937-C66C-49BE-99F2-D9EE613E80D0}"/>
-                  </a:ext>
-                </a:extLst>
-              </p:cNvPr>
-              <p:cNvSpPr/>
-              <p:nvPr/>
-            </p:nvSpPr>
-            <p:spPr>
-              <a:xfrm>
-                <a:off x="2001254" y="6550561"/>
-                <a:ext cx="288000" cy="288000"/>
-              </a:xfrm>
-              <a:prstGeom prst="roundRect">
-                <a:avLst/>
-              </a:prstGeom>
-              <a:solidFill>
-                <a:srgbClr val="7030A0"/>
-              </a:solidFill>
-              <a:ln>
-                <a:solidFill>
-                  <a:schemeClr val="tx1"/>
-                </a:solidFill>
-              </a:ln>
-            </p:spPr>
-            <p:style>
-              <a:lnRef idx="2">
-                <a:schemeClr val="accent2">
-                  <a:shade val="50000"/>
-                </a:schemeClr>
-              </a:lnRef>
-              <a:fillRef idx="1">
-                <a:schemeClr val="accent2"/>
-              </a:fillRef>
-              <a:effectRef idx="0">
-                <a:schemeClr val="accent2"/>
-              </a:effectRef>
-              <a:fontRef idx="minor">
-                <a:schemeClr val="lt1"/>
-              </a:fontRef>
-            </p:style>
-            <p:txBody>
-              <a:bodyPr rtlCol="0" anchor="ctr"/>
-              <a:lstStyle/>
-              <a:p>
-                <a:pPr algn="ctr"/>
-                <a:r>
-                  <a:rPr lang="en-US" sz="2200" dirty="0"/>
-                  <a:t>1</a:t>
-                </a:r>
-                <a:endParaRPr lang="en-AU" sz="2200" dirty="0"/>
-              </a:p>
-            </p:txBody>
-          </p:sp>
-          <p:sp>
-            <p:nvSpPr>
-              <p:cNvPr id="150" name="Rectangle: Rounded Corners 149">
-                <a:extLst>
-                  <a:ext uri="{FF2B5EF4-FFF2-40B4-BE49-F238E27FC236}">
-                    <a16:creationId xmlns:a16="http://schemas.microsoft.com/office/drawing/2014/main" id="{A46DB2C7-6305-4966-BBBB-61B010BFF0CE}"/>
-                  </a:ext>
-                </a:extLst>
-              </p:cNvPr>
-              <p:cNvSpPr/>
-              <p:nvPr/>
-            </p:nvSpPr>
-            <p:spPr>
-              <a:xfrm>
-                <a:off x="2001457" y="6885663"/>
-                <a:ext cx="288000" cy="288000"/>
-              </a:xfrm>
-              <a:prstGeom prst="roundRect">
-                <a:avLst/>
-              </a:prstGeom>
-              <a:solidFill>
-                <a:srgbClr val="7030A0"/>
-              </a:solidFill>
-              <a:ln>
-                <a:solidFill>
-                  <a:schemeClr val="tx1"/>
-                </a:solidFill>
-              </a:ln>
-            </p:spPr>
-            <p:style>
-              <a:lnRef idx="2">
-                <a:schemeClr val="accent2">
-                  <a:shade val="50000"/>
-                </a:schemeClr>
-              </a:lnRef>
-              <a:fillRef idx="1">
-                <a:schemeClr val="accent2"/>
-              </a:fillRef>
-              <a:effectRef idx="0">
-                <a:schemeClr val="accent2"/>
-              </a:effectRef>
-              <a:fontRef idx="minor">
-                <a:schemeClr val="lt1"/>
-              </a:fontRef>
-            </p:style>
-            <p:txBody>
-              <a:bodyPr rtlCol="0" anchor="ctr"/>
-              <a:lstStyle/>
-              <a:p>
-                <a:pPr algn="ctr"/>
-                <a:r>
-                  <a:rPr lang="en-US" sz="2200" dirty="0"/>
-                  <a:t>1</a:t>
-                </a:r>
-                <a:endParaRPr lang="en-AU" sz="2200" dirty="0"/>
-              </a:p>
-            </p:txBody>
-          </p:sp>
-          <p:sp>
-            <p:nvSpPr>
-              <p:cNvPr id="151" name="Rectangle: Rounded Corners 150">
-                <a:extLst>
-                  <a:ext uri="{FF2B5EF4-FFF2-40B4-BE49-F238E27FC236}">
-                    <a16:creationId xmlns:a16="http://schemas.microsoft.com/office/drawing/2014/main" id="{3B5973CE-4D46-4E76-8FE1-05F81B22BF13}"/>
-                  </a:ext>
-                </a:extLst>
-              </p:cNvPr>
-              <p:cNvSpPr/>
-              <p:nvPr/>
-            </p:nvSpPr>
-            <p:spPr>
-              <a:xfrm>
-                <a:off x="1998198" y="7232963"/>
-                <a:ext cx="288000" cy="288000"/>
-              </a:xfrm>
-              <a:prstGeom prst="roundRect">
-                <a:avLst/>
-              </a:prstGeom>
-              <a:solidFill>
-                <a:schemeClr val="accent6">
-                  <a:lumMod val="75000"/>
-                </a:schemeClr>
-              </a:solidFill>
-              <a:ln>
-                <a:solidFill>
-                  <a:schemeClr val="tx1"/>
-                </a:solidFill>
-              </a:ln>
-            </p:spPr>
-            <p:style>
-              <a:lnRef idx="2">
-                <a:schemeClr val="accent1">
-                  <a:shade val="50000"/>
-                </a:schemeClr>
-              </a:lnRef>
-              <a:fillRef idx="1">
-                <a:schemeClr val="accent1"/>
-              </a:fillRef>
-              <a:effectRef idx="0">
-                <a:schemeClr val="accent1"/>
-              </a:effectRef>
-              <a:fontRef idx="minor">
-                <a:schemeClr val="lt1"/>
-              </a:fontRef>
-            </p:style>
-            <p:txBody>
-              <a:bodyPr rtlCol="0" anchor="ctr"/>
-              <a:lstStyle/>
-              <a:p>
-                <a:pPr algn="ctr"/>
-                <a:r>
-                  <a:rPr lang="en-US" sz="2200" dirty="0"/>
-                  <a:t>2</a:t>
-                </a:r>
-                <a:endParaRPr lang="en-AU" sz="2200" dirty="0"/>
-              </a:p>
-            </p:txBody>
-          </p:sp>
-        </p:grpSp>
-        <p:grpSp>
-          <p:nvGrpSpPr>
-            <p:cNvPr id="58" name="Group 57">
-              <a:extLst>
-                <a:ext uri="{FF2B5EF4-FFF2-40B4-BE49-F238E27FC236}">
-                  <a16:creationId xmlns:a16="http://schemas.microsoft.com/office/drawing/2014/main" id="{39693E24-A1FE-4415-9369-C7EA1BCD978B}"/>
-                </a:ext>
-              </a:extLst>
-            </p:cNvPr>
-            <p:cNvGrpSpPr/>
-            <p:nvPr/>
-          </p:nvGrpSpPr>
-          <p:grpSpPr>
-            <a:xfrm>
-              <a:off x="1810222" y="694478"/>
-              <a:ext cx="2844354" cy="2140710"/>
-              <a:chOff x="6988629" y="2146556"/>
-              <a:chExt cx="2844354" cy="2140710"/>
-            </a:xfrm>
-          </p:grpSpPr>
-          <p:sp>
-            <p:nvSpPr>
-              <p:cNvPr id="119" name="TextBox 118">
-                <a:extLst>
-                  <a:ext uri="{FF2B5EF4-FFF2-40B4-BE49-F238E27FC236}">
-                    <a16:creationId xmlns:a16="http://schemas.microsoft.com/office/drawing/2014/main" id="{5BE5A8F5-89DE-436C-99B8-8200BFB34859}"/>
-                  </a:ext>
-                </a:extLst>
-              </p:cNvPr>
-              <p:cNvSpPr txBox="1"/>
-              <p:nvPr/>
-            </p:nvSpPr>
-            <p:spPr>
-              <a:xfrm rot="16200000">
-                <a:off x="8694003" y="2186503"/>
-                <a:ext cx="1003223" cy="923330"/>
-              </a:xfrm>
-              <a:prstGeom prst="rect">
-                <a:avLst/>
-              </a:prstGeom>
-              <a:noFill/>
-            </p:spPr>
-            <p:txBody>
-              <a:bodyPr wrap="square" rtlCol="0">
-                <a:spAutoFit/>
-              </a:bodyPr>
-              <a:lstStyle/>
-              <a:p>
-                <a:r>
-                  <a:rPr lang="en-AU" dirty="0"/>
-                  <a:t>Period 1</a:t>
-                </a:r>
-                <a:endParaRPr lang="en-US" dirty="0"/>
-              </a:p>
-              <a:p>
-                <a:r>
-                  <a:rPr lang="en-AU" dirty="0"/>
-                  <a:t>Period 2</a:t>
-                </a:r>
-                <a:endParaRPr lang="en-US" dirty="0"/>
-              </a:p>
-              <a:p>
-                <a:r>
-                  <a:rPr lang="en-AU" dirty="0"/>
-                  <a:t>Period 3</a:t>
-                </a:r>
-                <a:endParaRPr lang="en-US" dirty="0"/>
-              </a:p>
-            </p:txBody>
-          </p:sp>
-          <p:sp>
-            <p:nvSpPr>
-              <p:cNvPr id="120" name="TextBox 119">
-                <a:extLst>
-                  <a:ext uri="{FF2B5EF4-FFF2-40B4-BE49-F238E27FC236}">
-                    <a16:creationId xmlns:a16="http://schemas.microsoft.com/office/drawing/2014/main" id="{49B3FF56-4DF2-443B-84F1-2A793F4422A6}"/>
-                  </a:ext>
-                </a:extLst>
-              </p:cNvPr>
-              <p:cNvSpPr txBox="1"/>
-              <p:nvPr/>
-            </p:nvSpPr>
-            <p:spPr>
-              <a:xfrm>
-                <a:off x="6988629" y="2452681"/>
-                <a:ext cx="1745321" cy="707886"/>
-              </a:xfrm>
-              <a:prstGeom prst="rect">
-                <a:avLst/>
-              </a:prstGeom>
-              <a:noFill/>
-            </p:spPr>
-            <p:txBody>
-              <a:bodyPr wrap="square" rtlCol="0">
-                <a:spAutoFit/>
-              </a:bodyPr>
-              <a:lstStyle/>
-              <a:p>
-                <a:pPr algn="r"/>
-                <a:r>
-                  <a:rPr lang="en-AU" sz="2000" dirty="0"/>
-                  <a:t>Factor order</a:t>
-                </a:r>
-              </a:p>
-              <a:p>
-                <a:pPr algn="r"/>
-                <a:r>
-                  <a:rPr lang="en-AU" sz="2000" dirty="0"/>
-                  <a:t>permutations</a:t>
-                </a:r>
-              </a:p>
-            </p:txBody>
-          </p:sp>
-          <p:cxnSp>
-            <p:nvCxnSpPr>
-              <p:cNvPr id="121" name="Straight Connector 120">
-                <a:extLst>
-                  <a:ext uri="{FF2B5EF4-FFF2-40B4-BE49-F238E27FC236}">
-                    <a16:creationId xmlns:a16="http://schemas.microsoft.com/office/drawing/2014/main" id="{C189B2AF-BC76-4E59-86F6-8CD7AB0978CF}"/>
-                  </a:ext>
-                </a:extLst>
-              </p:cNvPr>
-              <p:cNvCxnSpPr>
-                <a:cxnSpLocks/>
-              </p:cNvCxnSpPr>
-              <p:nvPr/>
-            </p:nvCxnSpPr>
-            <p:spPr>
-              <a:xfrm>
-                <a:off x="7097522" y="3169978"/>
-                <a:ext cx="2717068" cy="4223"/>
-              </a:xfrm>
-              <a:prstGeom prst="line">
-                <a:avLst/>
-              </a:prstGeom>
-              <a:ln w="28575">
-                <a:solidFill>
-                  <a:schemeClr val="tx1"/>
-                </a:solidFill>
-              </a:ln>
-            </p:spPr>
-            <p:style>
-              <a:lnRef idx="1">
-                <a:schemeClr val="accent1"/>
-              </a:lnRef>
-              <a:fillRef idx="0">
-                <a:schemeClr val="accent1"/>
-              </a:fillRef>
-              <a:effectRef idx="0">
-                <a:schemeClr val="accent1"/>
-              </a:effectRef>
-              <a:fontRef idx="minor">
-                <a:schemeClr val="tx1"/>
-              </a:fontRef>
-            </p:style>
-          </p:cxnSp>
-          <p:cxnSp>
-            <p:nvCxnSpPr>
-              <p:cNvPr id="122" name="Straight Connector 121">
-                <a:extLst>
-                  <a:ext uri="{FF2B5EF4-FFF2-40B4-BE49-F238E27FC236}">
-                    <a16:creationId xmlns:a16="http://schemas.microsoft.com/office/drawing/2014/main" id="{8AC17551-4ABC-4322-84BE-06A28112DA06}"/>
-                  </a:ext>
-                </a:extLst>
-              </p:cNvPr>
-              <p:cNvCxnSpPr>
-                <a:cxnSpLocks/>
-              </p:cNvCxnSpPr>
-              <p:nvPr/>
-            </p:nvCxnSpPr>
-            <p:spPr>
-              <a:xfrm flipV="1">
-                <a:off x="8716852" y="2341097"/>
-                <a:ext cx="0" cy="1946169"/>
-              </a:xfrm>
-              <a:prstGeom prst="line">
-                <a:avLst/>
-              </a:prstGeom>
-              <a:ln w="28575">
-                <a:solidFill>
-                  <a:schemeClr val="tx1"/>
-                </a:solidFill>
-              </a:ln>
-            </p:spPr>
-            <p:style>
-              <a:lnRef idx="1">
-                <a:schemeClr val="accent1"/>
-              </a:lnRef>
-              <a:fillRef idx="0">
-                <a:schemeClr val="accent1"/>
-              </a:fillRef>
-              <a:effectRef idx="0">
-                <a:schemeClr val="accent1"/>
-              </a:effectRef>
-              <a:fontRef idx="minor">
-                <a:schemeClr val="tx1"/>
-              </a:fontRef>
-            </p:style>
-          </p:cxnSp>
-          <p:sp>
-            <p:nvSpPr>
-              <p:cNvPr id="123" name="Rectangle: Rounded Corners 122">
-                <a:extLst>
-                  <a:ext uri="{FF2B5EF4-FFF2-40B4-BE49-F238E27FC236}">
-                    <a16:creationId xmlns:a16="http://schemas.microsoft.com/office/drawing/2014/main" id="{25191266-D38C-4292-AE83-72731B6F9242}"/>
-                  </a:ext>
-                </a:extLst>
-              </p:cNvPr>
-              <p:cNvSpPr/>
-              <p:nvPr/>
-            </p:nvSpPr>
-            <p:spPr>
-              <a:xfrm>
-                <a:off x="8786456" y="3250471"/>
-                <a:ext cx="288000" cy="287908"/>
-              </a:xfrm>
-              <a:prstGeom prst="roundRect">
-                <a:avLst/>
-              </a:prstGeom>
-              <a:solidFill>
-                <a:srgbClr val="7030A0"/>
-              </a:solidFill>
-              <a:ln>
-                <a:solidFill>
-                  <a:schemeClr val="tx1"/>
-                </a:solidFill>
-              </a:ln>
-            </p:spPr>
-            <p:style>
-              <a:lnRef idx="2">
-                <a:schemeClr val="accent2">
-                  <a:shade val="50000"/>
-                </a:schemeClr>
-              </a:lnRef>
-              <a:fillRef idx="1">
-                <a:schemeClr val="accent2"/>
-              </a:fillRef>
-              <a:effectRef idx="0">
-                <a:schemeClr val="accent2"/>
-              </a:effectRef>
-              <a:fontRef idx="minor">
-                <a:schemeClr val="lt1"/>
-              </a:fontRef>
-            </p:style>
-            <p:txBody>
-              <a:bodyPr rtlCol="0" anchor="ctr"/>
-              <a:lstStyle/>
-              <a:p>
-                <a:pPr algn="ctr"/>
-                <a:r>
-                  <a:rPr lang="en-AU" sz="2200" dirty="0"/>
-                  <a:t>P</a:t>
-                </a:r>
-              </a:p>
-            </p:txBody>
-          </p:sp>
-          <p:sp>
-            <p:nvSpPr>
-              <p:cNvPr id="124" name="Rectangle: Rounded Corners 123">
-                <a:extLst>
-                  <a:ext uri="{FF2B5EF4-FFF2-40B4-BE49-F238E27FC236}">
-                    <a16:creationId xmlns:a16="http://schemas.microsoft.com/office/drawing/2014/main" id="{65511608-4D1E-486D-85F8-EA1DBB4CB510}"/>
-                  </a:ext>
-                </a:extLst>
-              </p:cNvPr>
-              <p:cNvSpPr/>
-              <p:nvPr/>
-            </p:nvSpPr>
-            <p:spPr>
-              <a:xfrm>
-                <a:off x="9145685" y="3244987"/>
-                <a:ext cx="288000" cy="287908"/>
-              </a:xfrm>
-              <a:prstGeom prst="roundRect">
-                <a:avLst/>
-              </a:prstGeom>
-              <a:solidFill>
-                <a:schemeClr val="accent6">
-                  <a:lumMod val="75000"/>
-                </a:schemeClr>
-              </a:solidFill>
-              <a:ln>
-                <a:solidFill>
-                  <a:schemeClr val="tx1"/>
-                </a:solidFill>
-              </a:ln>
-            </p:spPr>
-            <p:style>
-              <a:lnRef idx="2">
-                <a:schemeClr val="accent1">
-                  <a:shade val="50000"/>
-                </a:schemeClr>
-              </a:lnRef>
-              <a:fillRef idx="1">
-                <a:schemeClr val="accent1"/>
-              </a:fillRef>
-              <a:effectRef idx="0">
-                <a:schemeClr val="accent1"/>
-              </a:effectRef>
-              <a:fontRef idx="minor">
-                <a:schemeClr val="lt1"/>
-              </a:fontRef>
-            </p:style>
-            <p:txBody>
-              <a:bodyPr rtlCol="0" anchor="ctr"/>
-              <a:lstStyle/>
-              <a:p>
-                <a:pPr algn="ctr"/>
-                <a:r>
-                  <a:rPr lang="en-AU" sz="2200" dirty="0"/>
-                  <a:t>G</a:t>
-                </a:r>
-              </a:p>
-            </p:txBody>
-          </p:sp>
-          <p:sp>
-            <p:nvSpPr>
-              <p:cNvPr id="125" name="Rectangle: Rounded Corners 124">
-                <a:extLst>
-                  <a:ext uri="{FF2B5EF4-FFF2-40B4-BE49-F238E27FC236}">
-                    <a16:creationId xmlns:a16="http://schemas.microsoft.com/office/drawing/2014/main" id="{DC539330-05C6-4C75-B854-4CA79C210B17}"/>
-                  </a:ext>
-                </a:extLst>
-              </p:cNvPr>
-              <p:cNvSpPr/>
-              <p:nvPr/>
-            </p:nvSpPr>
-            <p:spPr>
-              <a:xfrm>
-                <a:off x="9497280" y="3239653"/>
-                <a:ext cx="288000" cy="287908"/>
-              </a:xfrm>
-              <a:prstGeom prst="roundRect">
-                <a:avLst/>
-              </a:prstGeom>
-              <a:solidFill>
-                <a:srgbClr val="C00000"/>
-              </a:solidFill>
-              <a:ln>
-                <a:solidFill>
-                  <a:schemeClr val="tx1"/>
-                </a:solidFill>
-              </a:ln>
-            </p:spPr>
-            <p:style>
-              <a:lnRef idx="2">
-                <a:schemeClr val="accent1">
-                  <a:shade val="50000"/>
-                </a:schemeClr>
-              </a:lnRef>
-              <a:fillRef idx="1">
-                <a:schemeClr val="accent1"/>
-              </a:fillRef>
-              <a:effectRef idx="0">
-                <a:schemeClr val="accent1"/>
-              </a:effectRef>
-              <a:fontRef idx="minor">
-                <a:schemeClr val="lt1"/>
-              </a:fontRef>
-            </p:style>
-            <p:txBody>
-              <a:bodyPr rtlCol="0" anchor="ctr"/>
-              <a:lstStyle/>
-              <a:p>
-                <a:pPr algn="ctr"/>
-                <a:r>
-                  <a:rPr lang="en-AU" sz="2200" dirty="0"/>
-                  <a:t>R</a:t>
-                </a:r>
-              </a:p>
-            </p:txBody>
-          </p:sp>
-          <p:sp>
-            <p:nvSpPr>
-              <p:cNvPr id="126" name="Rectangle: Rounded Corners 125">
-                <a:extLst>
-                  <a:ext uri="{FF2B5EF4-FFF2-40B4-BE49-F238E27FC236}">
-                    <a16:creationId xmlns:a16="http://schemas.microsoft.com/office/drawing/2014/main" id="{EE729C0E-7D16-487C-9C0F-1449FBF8C46B}"/>
-                  </a:ext>
-                </a:extLst>
-              </p:cNvPr>
-              <p:cNvSpPr/>
-              <p:nvPr/>
-            </p:nvSpPr>
-            <p:spPr>
-              <a:xfrm>
-                <a:off x="9148644" y="3957580"/>
-                <a:ext cx="288000" cy="287908"/>
-              </a:xfrm>
-              <a:prstGeom prst="roundRect">
-                <a:avLst/>
-              </a:prstGeom>
-              <a:solidFill>
-                <a:srgbClr val="7030A0"/>
-              </a:solidFill>
-              <a:ln>
-                <a:solidFill>
-                  <a:schemeClr val="tx1"/>
-                </a:solidFill>
-              </a:ln>
-            </p:spPr>
-            <p:style>
-              <a:lnRef idx="2">
-                <a:schemeClr val="accent2">
-                  <a:shade val="50000"/>
-                </a:schemeClr>
-              </a:lnRef>
-              <a:fillRef idx="1">
-                <a:schemeClr val="accent2"/>
-              </a:fillRef>
-              <a:effectRef idx="0">
-                <a:schemeClr val="accent2"/>
-              </a:effectRef>
-              <a:fontRef idx="minor">
-                <a:schemeClr val="lt1"/>
-              </a:fontRef>
-            </p:style>
-            <p:txBody>
-              <a:bodyPr rtlCol="0" anchor="ctr"/>
-              <a:lstStyle/>
-              <a:p>
-                <a:pPr algn="ctr"/>
-                <a:r>
-                  <a:rPr lang="en-AU" sz="2200" dirty="0"/>
-                  <a:t>P</a:t>
-                </a:r>
-              </a:p>
-            </p:txBody>
-          </p:sp>
-          <p:sp>
-            <p:nvSpPr>
-              <p:cNvPr id="127" name="Rectangle: Rounded Corners 126">
-                <a:extLst>
-                  <a:ext uri="{FF2B5EF4-FFF2-40B4-BE49-F238E27FC236}">
-                    <a16:creationId xmlns:a16="http://schemas.microsoft.com/office/drawing/2014/main" id="{1E85255B-B6FD-4B37-A614-5F47FC5347A6}"/>
-                  </a:ext>
-                </a:extLst>
-              </p:cNvPr>
-              <p:cNvSpPr/>
-              <p:nvPr/>
-            </p:nvSpPr>
-            <p:spPr>
-              <a:xfrm>
-                <a:off x="9508514" y="3961701"/>
-                <a:ext cx="288000" cy="287908"/>
-              </a:xfrm>
-              <a:prstGeom prst="roundRect">
-                <a:avLst/>
-              </a:prstGeom>
-              <a:solidFill>
-                <a:schemeClr val="accent6">
-                  <a:lumMod val="75000"/>
-                </a:schemeClr>
-              </a:solidFill>
-              <a:ln>
-                <a:solidFill>
-                  <a:schemeClr val="tx1"/>
-                </a:solidFill>
-              </a:ln>
-            </p:spPr>
-            <p:style>
-              <a:lnRef idx="2">
-                <a:schemeClr val="accent1">
-                  <a:shade val="50000"/>
-                </a:schemeClr>
-              </a:lnRef>
-              <a:fillRef idx="1">
-                <a:schemeClr val="accent1"/>
-              </a:fillRef>
-              <a:effectRef idx="0">
-                <a:schemeClr val="accent1"/>
-              </a:effectRef>
-              <a:fontRef idx="minor">
-                <a:schemeClr val="lt1"/>
-              </a:fontRef>
-            </p:style>
-            <p:txBody>
-              <a:bodyPr rtlCol="0" anchor="ctr"/>
-              <a:lstStyle/>
-              <a:p>
-                <a:pPr algn="ctr"/>
-                <a:r>
-                  <a:rPr lang="en-AU" sz="2200" dirty="0"/>
-                  <a:t>G</a:t>
-                </a:r>
-              </a:p>
-            </p:txBody>
-          </p:sp>
-          <p:sp>
-            <p:nvSpPr>
-              <p:cNvPr id="128" name="Rectangle: Rounded Corners 127">
-                <a:extLst>
-                  <a:ext uri="{FF2B5EF4-FFF2-40B4-BE49-F238E27FC236}">
-                    <a16:creationId xmlns:a16="http://schemas.microsoft.com/office/drawing/2014/main" id="{E06B46F4-9F9F-4B51-8552-BEA8A974D9D4}"/>
-                  </a:ext>
-                </a:extLst>
-              </p:cNvPr>
-              <p:cNvSpPr/>
-              <p:nvPr/>
-            </p:nvSpPr>
-            <p:spPr>
-              <a:xfrm>
-                <a:off x="8789680" y="3950152"/>
-                <a:ext cx="288000" cy="287908"/>
-              </a:xfrm>
-              <a:prstGeom prst="roundRect">
-                <a:avLst/>
-              </a:prstGeom>
-              <a:solidFill>
-                <a:srgbClr val="C00000"/>
-              </a:solidFill>
-              <a:ln>
-                <a:solidFill>
-                  <a:schemeClr val="tx1"/>
-                </a:solidFill>
-              </a:ln>
-            </p:spPr>
-            <p:style>
-              <a:lnRef idx="2">
-                <a:schemeClr val="accent1">
-                  <a:shade val="50000"/>
-                </a:schemeClr>
-              </a:lnRef>
-              <a:fillRef idx="1">
-                <a:schemeClr val="accent1"/>
-              </a:fillRef>
-              <a:effectRef idx="0">
-                <a:schemeClr val="accent1"/>
-              </a:effectRef>
-              <a:fontRef idx="minor">
-                <a:schemeClr val="lt1"/>
-              </a:fontRef>
-            </p:style>
-            <p:txBody>
-              <a:bodyPr rtlCol="0" anchor="ctr"/>
-              <a:lstStyle/>
-              <a:p>
-                <a:pPr algn="ctr"/>
-                <a:r>
-                  <a:rPr lang="en-AU" sz="2200" dirty="0"/>
-                  <a:t>R</a:t>
-                </a:r>
-              </a:p>
-            </p:txBody>
-          </p:sp>
-          <p:sp>
-            <p:nvSpPr>
-              <p:cNvPr id="129" name="Rectangle: Rounded Corners 128">
-                <a:extLst>
-                  <a:ext uri="{FF2B5EF4-FFF2-40B4-BE49-F238E27FC236}">
-                    <a16:creationId xmlns:a16="http://schemas.microsoft.com/office/drawing/2014/main" id="{2242A8D1-F9E1-4B56-83C9-ACB1AFD1694C}"/>
-                  </a:ext>
-                </a:extLst>
-              </p:cNvPr>
-              <p:cNvSpPr/>
-              <p:nvPr/>
-            </p:nvSpPr>
-            <p:spPr>
-              <a:xfrm>
-                <a:off x="9505698" y="3590491"/>
-                <a:ext cx="288000" cy="287908"/>
-              </a:xfrm>
-              <a:prstGeom prst="roundRect">
-                <a:avLst/>
-              </a:prstGeom>
-              <a:solidFill>
-                <a:srgbClr val="7030A0"/>
-              </a:solidFill>
-              <a:ln>
-                <a:solidFill>
-                  <a:schemeClr val="tx1"/>
-                </a:solidFill>
-              </a:ln>
-            </p:spPr>
-            <p:style>
-              <a:lnRef idx="2">
-                <a:schemeClr val="accent2">
-                  <a:shade val="50000"/>
-                </a:schemeClr>
-              </a:lnRef>
-              <a:fillRef idx="1">
-                <a:schemeClr val="accent2"/>
-              </a:fillRef>
-              <a:effectRef idx="0">
-                <a:schemeClr val="accent2"/>
-              </a:effectRef>
-              <a:fontRef idx="minor">
-                <a:schemeClr val="lt1"/>
-              </a:fontRef>
-            </p:style>
-            <p:txBody>
-              <a:bodyPr rtlCol="0" anchor="ctr"/>
-              <a:lstStyle/>
-              <a:p>
-                <a:pPr algn="ctr"/>
-                <a:r>
-                  <a:rPr lang="en-AU" sz="2200" dirty="0"/>
-                  <a:t>P</a:t>
-                </a:r>
-              </a:p>
-            </p:txBody>
-          </p:sp>
-          <p:sp>
-            <p:nvSpPr>
-              <p:cNvPr id="130" name="Rectangle: Rounded Corners 129">
-                <a:extLst>
-                  <a:ext uri="{FF2B5EF4-FFF2-40B4-BE49-F238E27FC236}">
-                    <a16:creationId xmlns:a16="http://schemas.microsoft.com/office/drawing/2014/main" id="{B446B11D-DD55-4732-B2FA-F488098C602F}"/>
-                  </a:ext>
-                </a:extLst>
-              </p:cNvPr>
-              <p:cNvSpPr/>
-              <p:nvPr/>
-            </p:nvSpPr>
-            <p:spPr>
-              <a:xfrm>
-                <a:off x="8789680" y="3584549"/>
-                <a:ext cx="288000" cy="287908"/>
-              </a:xfrm>
-              <a:prstGeom prst="roundRect">
-                <a:avLst/>
-              </a:prstGeom>
-              <a:solidFill>
-                <a:schemeClr val="accent6">
-                  <a:lumMod val="75000"/>
-                </a:schemeClr>
-              </a:solidFill>
-              <a:ln>
-                <a:solidFill>
-                  <a:schemeClr val="tx1"/>
-                </a:solidFill>
-              </a:ln>
-            </p:spPr>
-            <p:style>
-              <a:lnRef idx="2">
-                <a:schemeClr val="accent1">
-                  <a:shade val="50000"/>
-                </a:schemeClr>
-              </a:lnRef>
-              <a:fillRef idx="1">
-                <a:schemeClr val="accent1"/>
-              </a:fillRef>
-              <a:effectRef idx="0">
-                <a:schemeClr val="accent1"/>
-              </a:effectRef>
-              <a:fontRef idx="minor">
-                <a:schemeClr val="lt1"/>
-              </a:fontRef>
-            </p:style>
-            <p:txBody>
-              <a:bodyPr rtlCol="0" anchor="ctr"/>
-              <a:lstStyle/>
-              <a:p>
-                <a:pPr algn="ctr"/>
-                <a:r>
-                  <a:rPr lang="en-AU" sz="2200" dirty="0"/>
-                  <a:t>G</a:t>
-                </a:r>
-              </a:p>
-            </p:txBody>
-          </p:sp>
-          <p:sp>
-            <p:nvSpPr>
-              <p:cNvPr id="131" name="Rectangle: Rounded Corners 130">
-                <a:extLst>
-                  <a:ext uri="{FF2B5EF4-FFF2-40B4-BE49-F238E27FC236}">
-                    <a16:creationId xmlns:a16="http://schemas.microsoft.com/office/drawing/2014/main" id="{4A6DFDE1-3B02-4EBD-A204-891EE4CF94F7}"/>
-                  </a:ext>
-                </a:extLst>
-              </p:cNvPr>
-              <p:cNvSpPr/>
-              <p:nvPr/>
-            </p:nvSpPr>
-            <p:spPr>
-              <a:xfrm>
-                <a:off x="9153785" y="3594420"/>
-                <a:ext cx="288000" cy="287908"/>
-              </a:xfrm>
-              <a:prstGeom prst="roundRect">
-                <a:avLst/>
-              </a:prstGeom>
-              <a:solidFill>
-                <a:srgbClr val="C00000"/>
-              </a:solidFill>
-              <a:ln>
-                <a:solidFill>
-                  <a:schemeClr val="tx1"/>
-                </a:solidFill>
-              </a:ln>
-            </p:spPr>
-            <p:style>
-              <a:lnRef idx="2">
-                <a:schemeClr val="accent1">
-                  <a:shade val="50000"/>
-                </a:schemeClr>
-              </a:lnRef>
-              <a:fillRef idx="1">
-                <a:schemeClr val="accent1"/>
-              </a:fillRef>
-              <a:effectRef idx="0">
-                <a:schemeClr val="accent1"/>
-              </a:effectRef>
-              <a:fontRef idx="minor">
-                <a:schemeClr val="lt1"/>
-              </a:fontRef>
-            </p:style>
-            <p:txBody>
-              <a:bodyPr rtlCol="0" anchor="ctr"/>
-              <a:lstStyle/>
-              <a:p>
-                <a:pPr algn="ctr"/>
-                <a:r>
-                  <a:rPr lang="en-AU" sz="2200" dirty="0"/>
-                  <a:t>R</a:t>
-                </a:r>
-              </a:p>
-            </p:txBody>
-          </p:sp>
-          <p:sp>
-            <p:nvSpPr>
-              <p:cNvPr id="132" name="Rectangle: Rounded Corners 131">
-                <a:extLst>
-                  <a:ext uri="{FF2B5EF4-FFF2-40B4-BE49-F238E27FC236}">
-                    <a16:creationId xmlns:a16="http://schemas.microsoft.com/office/drawing/2014/main" id="{3712C768-CC24-4B37-99B4-4ACE422CDD03}"/>
-                  </a:ext>
-                </a:extLst>
-              </p:cNvPr>
-              <p:cNvSpPr/>
-              <p:nvPr/>
-            </p:nvSpPr>
-            <p:spPr>
-              <a:xfrm>
-                <a:off x="8382733" y="3560707"/>
-                <a:ext cx="1450250" cy="348253"/>
-              </a:xfrm>
-              <a:prstGeom prst="roundRect">
-                <a:avLst/>
-              </a:prstGeom>
-              <a:noFill/>
-              <a:ln w="28575">
-                <a:solidFill>
-                  <a:srgbClr val="FF0000"/>
-                </a:solidFill>
-              </a:ln>
-            </p:spPr>
-            <p:style>
-              <a:lnRef idx="2">
-                <a:schemeClr val="accent1">
-                  <a:shade val="50000"/>
-                </a:schemeClr>
-              </a:lnRef>
-              <a:fillRef idx="1">
-                <a:schemeClr val="accent1"/>
-              </a:fillRef>
-              <a:effectRef idx="0">
-                <a:schemeClr val="accent1"/>
-              </a:effectRef>
-              <a:fontRef idx="minor">
-                <a:schemeClr val="lt1"/>
-              </a:fontRef>
-            </p:style>
-            <p:txBody>
-              <a:bodyPr rtlCol="0" anchor="ctr"/>
-              <a:lstStyle/>
-              <a:p>
-                <a:pPr algn="ctr"/>
-                <a:endParaRPr lang="en-AU"/>
-              </a:p>
-            </p:txBody>
-          </p:sp>
-          <p:sp>
-            <p:nvSpPr>
-              <p:cNvPr id="133" name="TextBox 132">
-                <a:extLst>
-                  <a:ext uri="{FF2B5EF4-FFF2-40B4-BE49-F238E27FC236}">
-                    <a16:creationId xmlns:a16="http://schemas.microsoft.com/office/drawing/2014/main" id="{0B335F76-2DA9-4667-A65C-129EE9AA4586}"/>
-                  </a:ext>
-                </a:extLst>
-              </p:cNvPr>
-              <p:cNvSpPr txBox="1"/>
-              <p:nvPr/>
-            </p:nvSpPr>
-            <p:spPr>
-              <a:xfrm>
-                <a:off x="8353330" y="3179269"/>
-                <a:ext cx="345221" cy="1107996"/>
-              </a:xfrm>
-              <a:prstGeom prst="rect">
-                <a:avLst/>
-              </a:prstGeom>
-              <a:noFill/>
-            </p:spPr>
-            <p:txBody>
-              <a:bodyPr wrap="square" rtlCol="0">
-                <a:spAutoFit/>
-              </a:bodyPr>
-              <a:lstStyle/>
-              <a:p>
-                <a:pPr algn="r"/>
-                <a:r>
-                  <a:rPr lang="en-AU" sz="2200" dirty="0"/>
-                  <a:t>1</a:t>
-                </a:r>
-              </a:p>
-              <a:p>
-                <a:pPr algn="r"/>
-                <a:r>
-                  <a:rPr lang="en-US" sz="2200" dirty="0"/>
-                  <a:t>2</a:t>
-                </a:r>
-                <a:endParaRPr lang="en-AU" sz="2200" dirty="0"/>
-              </a:p>
-              <a:p>
-                <a:pPr algn="r"/>
-                <a:r>
-                  <a:rPr lang="en-US" sz="2200" dirty="0"/>
-                  <a:t>3</a:t>
-                </a:r>
-                <a:endParaRPr lang="en-AU" sz="2200" dirty="0"/>
-              </a:p>
-            </p:txBody>
-          </p:sp>
-        </p:grpSp>
-        <p:sp>
-          <p:nvSpPr>
-            <p:cNvPr id="59" name="TextBox 58">
-              <a:extLst>
-                <a:ext uri="{FF2B5EF4-FFF2-40B4-BE49-F238E27FC236}">
-                  <a16:creationId xmlns:a16="http://schemas.microsoft.com/office/drawing/2014/main" id="{831546AB-E192-4C57-A768-4A900A5FD241}"/>
+                  <a16:creationId xmlns:a16="http://schemas.microsoft.com/office/drawing/2014/main" id="{7075BF10-4FE8-44F8-81CC-17FA5A9C52D7}"/>
                 </a:ext>
               </a:extLst>
             </p:cNvPr>
@@ -18742,8 +16896,8 @@
           </p:nvSpPr>
           <p:spPr>
             <a:xfrm>
-              <a:off x="154222" y="1717021"/>
-              <a:ext cx="3312000" cy="1200329"/>
+              <a:off x="1260358" y="5477685"/>
+              <a:ext cx="319327" cy="2123658"/>
             </a:xfrm>
             <a:prstGeom prst="rect">
               <a:avLst/>
@@ -18756,471 +16910,60 @@
             </a:bodyPr>
             <a:lstStyle/>
             <a:p>
-              <a:pPr marL="285750" indent="-285750">
-                <a:buFont typeface="Arial" panose="020B0604020202020204" pitchFamily="34" charset="0"/>
-                <a:buChar char="•"/>
-              </a:pPr>
+              <a:pPr algn="r"/>
               <a:r>
-                <a:rPr lang="en-AU" dirty="0"/>
-                <a:t>Set the factor</a:t>
+                <a:rPr lang="en-AU" sz="2200" dirty="0"/>
+                <a:t>1</a:t>
               </a:r>
             </a:p>
             <a:p>
+              <a:pPr algn="r"/>
               <a:r>
-                <a:rPr lang="en-AU" dirty="0"/>
-                <a:t>1 + (8 - 1) mod 3 = </a:t>
+                <a:rPr lang="en-US" sz="2200" dirty="0"/>
+                <a:t>2</a:t>
               </a:r>
+              <a:endParaRPr lang="en-AU" sz="2200" dirty="0"/>
             </a:p>
             <a:p>
+              <a:pPr algn="r"/>
               <a:r>
-                <a:rPr lang="en-AU" dirty="0"/>
-                <a:t>Permutation 2;</a:t>
+                <a:rPr lang="en-US" sz="2200" dirty="0"/>
+                <a:t>3</a:t>
               </a:r>
+              <a:endParaRPr lang="en-AU" sz="2200" dirty="0"/>
             </a:p>
             <a:p>
+              <a:pPr algn="r"/>
               <a:r>
-                <a:rPr lang="en-AU" dirty="0"/>
-                <a:t>Grand, Radial, PCA</a:t>
+                <a:rPr lang="en-US" sz="2200" dirty="0"/>
+                <a:t>4</a:t>
               </a:r>
+              <a:endParaRPr lang="en-AU" sz="2200" dirty="0"/>
+            </a:p>
+            <a:p>
+              <a:pPr algn="r"/>
+              <a:r>
+                <a:rPr lang="en-US" sz="2200" dirty="0"/>
+                <a:t>5</a:t>
+              </a:r>
+              <a:endParaRPr lang="en-AU" sz="2200" dirty="0"/>
+            </a:p>
+            <a:p>
+              <a:pPr algn="r"/>
+              <a:r>
+                <a:rPr lang="en-US" sz="2200" dirty="0"/>
+                <a:t>6</a:t>
+              </a:r>
+              <a:endParaRPr lang="en-AU" sz="2200" dirty="0"/>
             </a:p>
           </p:txBody>
         </p:sp>
-        <p:grpSp>
-          <p:nvGrpSpPr>
-            <p:cNvPr id="60" name="Group 59">
+        <p:sp>
+          <p:nvSpPr>
+            <p:cNvPr id="135" name="TextBox 134">
               <a:extLst>
                 <a:ext uri="{FF2B5EF4-FFF2-40B4-BE49-F238E27FC236}">
-                  <a16:creationId xmlns:a16="http://schemas.microsoft.com/office/drawing/2014/main" id="{AA79ADA1-A8C5-4667-B52D-512422972C79}"/>
-                </a:ext>
-              </a:extLst>
-            </p:cNvPr>
-            <p:cNvGrpSpPr/>
-            <p:nvPr/>
-          </p:nvGrpSpPr>
-          <p:grpSpPr>
-            <a:xfrm>
-              <a:off x="1788085" y="2908557"/>
-              <a:ext cx="2202533" cy="1829206"/>
-              <a:chOff x="9656478" y="836478"/>
-              <a:chExt cx="2202533" cy="1829206"/>
-            </a:xfrm>
-          </p:grpSpPr>
-          <p:sp>
-            <p:nvSpPr>
-              <p:cNvPr id="77" name="TextBox 76">
-                <a:extLst>
-                  <a:ext uri="{FF2B5EF4-FFF2-40B4-BE49-F238E27FC236}">
-                    <a16:creationId xmlns:a16="http://schemas.microsoft.com/office/drawing/2014/main" id="{91B86578-4FDF-4D9E-B3CC-EF8D727EBB15}"/>
-                  </a:ext>
-                </a:extLst>
-              </p:cNvPr>
-              <p:cNvSpPr txBox="1"/>
-              <p:nvPr/>
-            </p:nvSpPr>
-            <p:spPr>
-              <a:xfrm>
-                <a:off x="9656478" y="836478"/>
-                <a:ext cx="1738102" cy="707886"/>
-              </a:xfrm>
-              <a:prstGeom prst="rect">
-                <a:avLst/>
-              </a:prstGeom>
-              <a:noFill/>
-            </p:spPr>
-            <p:txBody>
-              <a:bodyPr wrap="square" rtlCol="0">
-                <a:spAutoFit/>
-              </a:bodyPr>
-              <a:lstStyle/>
-              <a:p>
-                <a:pPr algn="r"/>
-                <a:r>
-                  <a:rPr lang="en-AU" sz="2000" dirty="0"/>
-                  <a:t>Location </a:t>
-                </a:r>
-              </a:p>
-              <a:p>
-                <a:pPr algn="r"/>
-                <a:r>
-                  <a:rPr lang="en-AU" sz="2000" dirty="0"/>
-                  <a:t>permutations</a:t>
-                </a:r>
-              </a:p>
-            </p:txBody>
-          </p:sp>
-          <p:cxnSp>
-            <p:nvCxnSpPr>
-              <p:cNvPr id="111" name="Straight Connector 110">
-                <a:extLst>
-                  <a:ext uri="{FF2B5EF4-FFF2-40B4-BE49-F238E27FC236}">
-                    <a16:creationId xmlns:a16="http://schemas.microsoft.com/office/drawing/2014/main" id="{2D352D1F-F6FB-4777-B860-637C2659210A}"/>
-                  </a:ext>
-                </a:extLst>
-              </p:cNvPr>
-              <p:cNvCxnSpPr>
-                <a:cxnSpLocks/>
-              </p:cNvCxnSpPr>
-              <p:nvPr/>
-            </p:nvCxnSpPr>
-            <p:spPr>
-              <a:xfrm>
-                <a:off x="9784401" y="1557688"/>
-                <a:ext cx="2074610" cy="5517"/>
-              </a:xfrm>
-              <a:prstGeom prst="line">
-                <a:avLst/>
-              </a:prstGeom>
-              <a:ln w="28575">
-                <a:solidFill>
-                  <a:schemeClr val="tx1"/>
-                </a:solidFill>
-              </a:ln>
-            </p:spPr>
-            <p:style>
-              <a:lnRef idx="1">
-                <a:schemeClr val="accent1"/>
-              </a:lnRef>
-              <a:fillRef idx="0">
-                <a:schemeClr val="accent1"/>
-              </a:fillRef>
-              <a:effectRef idx="0">
-                <a:schemeClr val="accent1"/>
-              </a:effectRef>
-              <a:fontRef idx="minor">
-                <a:schemeClr val="tx1"/>
-              </a:fontRef>
-            </p:style>
-          </p:cxnSp>
-          <p:cxnSp>
-            <p:nvCxnSpPr>
-              <p:cNvPr id="113" name="Straight Connector 112">
-                <a:extLst>
-                  <a:ext uri="{FF2B5EF4-FFF2-40B4-BE49-F238E27FC236}">
-                    <a16:creationId xmlns:a16="http://schemas.microsoft.com/office/drawing/2014/main" id="{2B78ADE3-3F59-41D7-849E-E2CAE7B3B6C2}"/>
-                  </a:ext>
-                </a:extLst>
-              </p:cNvPr>
-              <p:cNvCxnSpPr>
-                <a:cxnSpLocks/>
-              </p:cNvCxnSpPr>
-              <p:nvPr/>
-            </p:nvCxnSpPr>
-            <p:spPr>
-              <a:xfrm flipH="1" flipV="1">
-                <a:off x="11410615" y="843232"/>
-                <a:ext cx="1" cy="1805619"/>
-              </a:xfrm>
-              <a:prstGeom prst="line">
-                <a:avLst/>
-              </a:prstGeom>
-              <a:ln w="28575">
-                <a:solidFill>
-                  <a:schemeClr val="tx1"/>
-                </a:solidFill>
-              </a:ln>
-            </p:spPr>
-            <p:style>
-              <a:lnRef idx="1">
-                <a:schemeClr val="accent1"/>
-              </a:lnRef>
-              <a:fillRef idx="0">
-                <a:schemeClr val="accent1"/>
-              </a:fillRef>
-              <a:effectRef idx="0">
-                <a:schemeClr val="accent1"/>
-              </a:effectRef>
-              <a:fontRef idx="minor">
-                <a:schemeClr val="tx1"/>
-              </a:fontRef>
-            </p:style>
-          </p:cxnSp>
-          <p:sp>
-            <p:nvSpPr>
-              <p:cNvPr id="114" name="Rectangle: Rounded Corners 113">
-                <a:extLst>
-                  <a:ext uri="{FF2B5EF4-FFF2-40B4-BE49-F238E27FC236}">
-                    <a16:creationId xmlns:a16="http://schemas.microsoft.com/office/drawing/2014/main" id="{B8ADF89F-E92D-4015-A3B6-BF540B034E61}"/>
-                  </a:ext>
-                </a:extLst>
-              </p:cNvPr>
-              <p:cNvSpPr/>
-              <p:nvPr/>
-            </p:nvSpPr>
-            <p:spPr>
-              <a:xfrm>
-                <a:off x="11509884" y="1628880"/>
-                <a:ext cx="288000" cy="288000"/>
-              </a:xfrm>
-              <a:prstGeom prst="roundRect">
-                <a:avLst/>
-              </a:prstGeom>
-              <a:solidFill>
-                <a:srgbClr val="7030A0"/>
-              </a:solidFill>
-              <a:ln>
-                <a:solidFill>
-                  <a:schemeClr val="tx1"/>
-                </a:solidFill>
-              </a:ln>
-            </p:spPr>
-            <p:style>
-              <a:lnRef idx="2">
-                <a:schemeClr val="accent2">
-                  <a:shade val="50000"/>
-                </a:schemeClr>
-              </a:lnRef>
-              <a:fillRef idx="1">
-                <a:schemeClr val="accent2"/>
-              </a:fillRef>
-              <a:effectRef idx="0">
-                <a:schemeClr val="accent2"/>
-              </a:effectRef>
-              <a:fontRef idx="minor">
-                <a:schemeClr val="lt1"/>
-              </a:fontRef>
-            </p:style>
-            <p:txBody>
-              <a:bodyPr rtlCol="0" anchor="ctr"/>
-              <a:lstStyle/>
-              <a:p>
-                <a:pPr algn="ctr"/>
-                <a:r>
-                  <a:rPr lang="en-US" sz="2200" dirty="0"/>
-                  <a:t>1</a:t>
-                </a:r>
-                <a:endParaRPr lang="en-AU" sz="2200" dirty="0"/>
-              </a:p>
-            </p:txBody>
-          </p:sp>
-          <p:sp>
-            <p:nvSpPr>
-              <p:cNvPr id="115" name="Rectangle: Rounded Corners 114">
-                <a:extLst>
-                  <a:ext uri="{FF2B5EF4-FFF2-40B4-BE49-F238E27FC236}">
-                    <a16:creationId xmlns:a16="http://schemas.microsoft.com/office/drawing/2014/main" id="{9EB6C7DD-E19E-4E3B-87BA-F9BA893758F8}"/>
-                  </a:ext>
-                </a:extLst>
-              </p:cNvPr>
-              <p:cNvSpPr/>
-              <p:nvPr/>
-            </p:nvSpPr>
-            <p:spPr>
-              <a:xfrm>
-                <a:off x="11509883" y="1962266"/>
-                <a:ext cx="288000" cy="288000"/>
-              </a:xfrm>
-              <a:prstGeom prst="roundRect">
-                <a:avLst/>
-              </a:prstGeom>
-              <a:solidFill>
-                <a:schemeClr val="accent6">
-                  <a:lumMod val="75000"/>
-                </a:schemeClr>
-              </a:solidFill>
-              <a:ln>
-                <a:solidFill>
-                  <a:schemeClr val="tx1"/>
-                </a:solidFill>
-              </a:ln>
-            </p:spPr>
-            <p:style>
-              <a:lnRef idx="2">
-                <a:schemeClr val="accent1">
-                  <a:shade val="50000"/>
-                </a:schemeClr>
-              </a:lnRef>
-              <a:fillRef idx="1">
-                <a:schemeClr val="accent1"/>
-              </a:fillRef>
-              <a:effectRef idx="0">
-                <a:schemeClr val="accent1"/>
-              </a:effectRef>
-              <a:fontRef idx="minor">
-                <a:schemeClr val="lt1"/>
-              </a:fontRef>
-            </p:style>
-            <p:txBody>
-              <a:bodyPr rtlCol="0" anchor="ctr"/>
-              <a:lstStyle/>
-              <a:p>
-                <a:pPr algn="ctr"/>
-                <a:r>
-                  <a:rPr lang="en-US" sz="2200" dirty="0"/>
-                  <a:t>2</a:t>
-                </a:r>
-                <a:endParaRPr lang="en-AU" sz="2200" dirty="0"/>
-              </a:p>
-            </p:txBody>
-          </p:sp>
-          <p:sp>
-            <p:nvSpPr>
-              <p:cNvPr id="116" name="Rectangle: Rounded Corners 115">
-                <a:extLst>
-                  <a:ext uri="{FF2B5EF4-FFF2-40B4-BE49-F238E27FC236}">
-                    <a16:creationId xmlns:a16="http://schemas.microsoft.com/office/drawing/2014/main" id="{97A36D9D-9B90-4B95-AFD0-D64EB1F581FA}"/>
-                  </a:ext>
-                </a:extLst>
-              </p:cNvPr>
-              <p:cNvSpPr/>
-              <p:nvPr/>
-            </p:nvSpPr>
-            <p:spPr>
-              <a:xfrm>
-                <a:off x="11509758" y="2294070"/>
-                <a:ext cx="288000" cy="288000"/>
-              </a:xfrm>
-              <a:prstGeom prst="roundRect">
-                <a:avLst/>
-              </a:prstGeom>
-              <a:solidFill>
-                <a:srgbClr val="C00000"/>
-              </a:solidFill>
-              <a:ln>
-                <a:solidFill>
-                  <a:schemeClr val="tx1"/>
-                </a:solidFill>
-              </a:ln>
-            </p:spPr>
-            <p:style>
-              <a:lnRef idx="2">
-                <a:schemeClr val="accent1">
-                  <a:shade val="50000"/>
-                </a:schemeClr>
-              </a:lnRef>
-              <a:fillRef idx="1">
-                <a:schemeClr val="accent1"/>
-              </a:fillRef>
-              <a:effectRef idx="0">
-                <a:schemeClr val="accent1"/>
-              </a:effectRef>
-              <a:fontRef idx="minor">
-                <a:schemeClr val="lt1"/>
-              </a:fontRef>
-            </p:style>
-            <p:txBody>
-              <a:bodyPr rtlCol="0" anchor="ctr"/>
-              <a:lstStyle/>
-              <a:p>
-                <a:pPr algn="ctr"/>
-                <a:r>
-                  <a:rPr lang="en-US" sz="2200" dirty="0"/>
-                  <a:t>3</a:t>
-                </a:r>
-                <a:endParaRPr lang="en-AU" sz="2200" dirty="0"/>
-              </a:p>
-            </p:txBody>
-          </p:sp>
-          <p:sp>
-            <p:nvSpPr>
-              <p:cNvPr id="117" name="Rectangle: Rounded Corners 116">
-                <a:extLst>
-                  <a:ext uri="{FF2B5EF4-FFF2-40B4-BE49-F238E27FC236}">
-                    <a16:creationId xmlns:a16="http://schemas.microsoft.com/office/drawing/2014/main" id="{9AADF17B-1F92-4C71-BCF2-3D00B790CBB7}"/>
-                  </a:ext>
-                </a:extLst>
-              </p:cNvPr>
-              <p:cNvSpPr/>
-              <p:nvPr/>
-            </p:nvSpPr>
-            <p:spPr>
-              <a:xfrm>
-                <a:off x="11138106" y="2269089"/>
-                <a:ext cx="720905" cy="338026"/>
-              </a:xfrm>
-              <a:prstGeom prst="roundRect">
-                <a:avLst/>
-              </a:prstGeom>
-              <a:noFill/>
-              <a:ln w="28575">
-                <a:solidFill>
-                  <a:srgbClr val="FF0000"/>
-                </a:solidFill>
-              </a:ln>
-            </p:spPr>
-            <p:style>
-              <a:lnRef idx="2">
-                <a:schemeClr val="accent1">
-                  <a:shade val="50000"/>
-                </a:schemeClr>
-              </a:lnRef>
-              <a:fillRef idx="1">
-                <a:schemeClr val="accent1"/>
-              </a:fillRef>
-              <a:effectRef idx="0">
-                <a:schemeClr val="accent1"/>
-              </a:effectRef>
-              <a:fontRef idx="minor">
-                <a:schemeClr val="lt1"/>
-              </a:fontRef>
-            </p:style>
-            <p:txBody>
-              <a:bodyPr rtlCol="0" anchor="ctr"/>
-              <a:lstStyle/>
-              <a:p>
-                <a:pPr algn="ctr"/>
-                <a:endParaRPr lang="en-AU"/>
-              </a:p>
-            </p:txBody>
-          </p:sp>
-          <p:sp>
-            <p:nvSpPr>
-              <p:cNvPr id="118" name="TextBox 117">
-                <a:extLst>
-                  <a:ext uri="{FF2B5EF4-FFF2-40B4-BE49-F238E27FC236}">
-                    <a16:creationId xmlns:a16="http://schemas.microsoft.com/office/drawing/2014/main" id="{BD8660AA-A3FF-49E3-B8D8-727A997A96EC}"/>
-                  </a:ext>
-                </a:extLst>
-              </p:cNvPr>
-              <p:cNvSpPr txBox="1"/>
-              <p:nvPr/>
-            </p:nvSpPr>
-            <p:spPr>
-              <a:xfrm>
-                <a:off x="11088199" y="1557688"/>
-                <a:ext cx="345221" cy="1107996"/>
-              </a:xfrm>
-              <a:prstGeom prst="rect">
-                <a:avLst/>
-              </a:prstGeom>
-              <a:noFill/>
-            </p:spPr>
-            <p:txBody>
-              <a:bodyPr wrap="square" rtlCol="0">
-                <a:spAutoFit/>
-              </a:bodyPr>
-              <a:lstStyle/>
-              <a:p>
-                <a:pPr algn="r"/>
-                <a:r>
-                  <a:rPr lang="en-AU" sz="2200" dirty="0"/>
-                  <a:t>1</a:t>
-                </a:r>
-              </a:p>
-              <a:p>
-                <a:pPr algn="r"/>
-                <a:r>
-                  <a:rPr lang="en-US" sz="2200" dirty="0"/>
-                  <a:t>2</a:t>
-                </a:r>
-                <a:endParaRPr lang="en-AU" sz="2200" dirty="0"/>
-              </a:p>
-              <a:p>
-                <a:pPr algn="r"/>
-                <a:r>
-                  <a:rPr lang="en-US" sz="2200" dirty="0"/>
-                  <a:t>3</a:t>
-                </a:r>
-                <a:endParaRPr lang="en-AU" sz="2200" dirty="0"/>
-              </a:p>
-            </p:txBody>
-          </p:sp>
-        </p:grpSp>
-        <p:sp>
-          <p:nvSpPr>
-            <p:cNvPr id="61" name="TextBox 60">
-              <a:extLst>
-                <a:ext uri="{FF2B5EF4-FFF2-40B4-BE49-F238E27FC236}">
-                  <a16:creationId xmlns:a16="http://schemas.microsoft.com/office/drawing/2014/main" id="{B67979E6-A98C-49CB-B123-1248487AE118}"/>
+                  <a16:creationId xmlns:a16="http://schemas.microsoft.com/office/drawing/2014/main" id="{87DCF6C8-9C55-4CA9-B269-85C703D0E0BA}"/>
                 </a:ext>
               </a:extLst>
             </p:cNvPr>
@@ -19228,9 +16971,9 @@
             <p:nvPr/>
           </p:nvSpPr>
           <p:spPr>
-            <a:xfrm>
-              <a:off x="244156" y="3623497"/>
-              <a:ext cx="3312000" cy="1200329"/>
+            <a:xfrm rot="16200000">
+              <a:off x="1581368" y="4802520"/>
+              <a:ext cx="707887" cy="646331"/>
             </a:xfrm>
             <a:prstGeom prst="rect">
               <a:avLst/>
@@ -19243,59 +16986,25 @@
             </a:bodyPr>
             <a:lstStyle/>
             <a:p>
-              <a:pPr marL="285750" indent="-285750">
-                <a:buFont typeface="Arial" panose="020B0604020202020204" pitchFamily="34" charset="0"/>
-                <a:buChar char="•"/>
-              </a:pPr>
               <a:r>
-                <a:rPr lang="en-US" dirty="0"/>
-                <a:t>Set location</a:t>
+                <a:rPr lang="en-AU" dirty="0"/>
+                <a:t>Rep 1</a:t>
               </a:r>
             </a:p>
             <a:p>
               <a:r>
-                <a:rPr lang="en-US" dirty="0"/>
-                <a:t>1 + floor((</a:t>
+                <a:rPr lang="en-AU" dirty="0"/>
+                <a:t>Rep 2</a:t>
               </a:r>
-              <a:r>
-                <a:rPr lang="en-US" b="1" dirty="0"/>
-                <a:t>8 </a:t>
-              </a:r>
-              <a:r>
-                <a:rPr lang="en-US" dirty="0"/>
-                <a:t>– 1)</a:t>
-              </a:r>
-              <a:r>
-                <a:rPr lang="en-US" b="1" dirty="0"/>
-                <a:t> </a:t>
-              </a:r>
-              <a:r>
-                <a:rPr lang="en-US" dirty="0"/>
-                <a:t>/ 3) mod 3 = </a:t>
-              </a:r>
-            </a:p>
-            <a:p>
-              <a:r>
-                <a:rPr lang="en-US" dirty="0"/>
-                <a:t>Permutation 3;</a:t>
-              </a:r>
-              <a:endParaRPr lang="en-AU" dirty="0"/>
-            </a:p>
-            <a:p>
-              <a:r>
-                <a:rPr lang="en-AU" dirty="0"/>
-                <a:t>50% / 50%</a:t>
-              </a:r>
-              <a:endParaRPr lang="en-US" dirty="0"/>
             </a:p>
           </p:txBody>
         </p:sp>
         <p:sp>
           <p:nvSpPr>
-            <p:cNvPr id="62" name="TextBox 61">
+            <p:cNvPr id="136" name="TextBox 135">
               <a:extLst>
                 <a:ext uri="{FF2B5EF4-FFF2-40B4-BE49-F238E27FC236}">
-                  <a16:creationId xmlns:a16="http://schemas.microsoft.com/office/drawing/2014/main" id="{965BD763-DC86-4B2F-9D69-74CCCFA4F499}"/>
+                  <a16:creationId xmlns:a16="http://schemas.microsoft.com/office/drawing/2014/main" id="{EE9751F9-7190-4A50-8990-53CB8151858C}"/>
                 </a:ext>
               </a:extLst>
             </p:cNvPr>
@@ -19304,8 +17013,8 @@
           </p:nvSpPr>
           <p:spPr>
             <a:xfrm>
-              <a:off x="206229" y="5458259"/>
-              <a:ext cx="3312000" cy="1200329"/>
+              <a:off x="-258555" y="4765218"/>
+              <a:ext cx="1805816" cy="707886"/>
             </a:xfrm>
             <a:prstGeom prst="rect">
               <a:avLst/>
@@ -19318,45 +17027,2315 @@
             </a:bodyPr>
             <a:lstStyle/>
             <a:p>
-              <a:pPr marL="285750" indent="-285750">
-                <a:buFont typeface="Arial" panose="020B0604020202020204" pitchFamily="34" charset="0"/>
-                <a:buChar char="•"/>
-              </a:pPr>
+              <a:pPr algn="r"/>
               <a:r>
-                <a:rPr lang="en-US" dirty="0"/>
-                <a:t>Set VC order</a:t>
+                <a:rPr lang="en-AU" sz="2000" dirty="0"/>
+                <a:t>VC order</a:t>
               </a:r>
             </a:p>
             <a:p>
+              <a:pPr algn="r"/>
               <a:r>
-                <a:rPr lang="en-US" dirty="0"/>
-                <a:t>1 + floor(</a:t>
-              </a:r>
-              <a:r>
-                <a:rPr lang="en-US" b="1" dirty="0"/>
-                <a:t>8 </a:t>
-              </a:r>
-              <a:r>
-                <a:rPr lang="en-US" dirty="0"/>
-                <a:t>/ 9) mod 6 = </a:t>
+                <a:rPr lang="en-AU" sz="2000" dirty="0"/>
+                <a:t>permutations</a:t>
               </a:r>
             </a:p>
+          </p:txBody>
+        </p:sp>
+        <p:cxnSp>
+          <p:nvCxnSpPr>
+            <p:cNvPr id="137" name="Straight Connector 136">
+              <a:extLst>
+                <a:ext uri="{FF2B5EF4-FFF2-40B4-BE49-F238E27FC236}">
+                  <a16:creationId xmlns:a16="http://schemas.microsoft.com/office/drawing/2014/main" id="{293D2887-75A0-4FA0-8B95-80C0B0F6AB8B}"/>
+                </a:ext>
+              </a:extLst>
+            </p:cNvPr>
+            <p:cNvCxnSpPr>
+              <a:cxnSpLocks/>
+            </p:cNvCxnSpPr>
+            <p:nvPr/>
+          </p:nvCxnSpPr>
+          <p:spPr>
+            <a:xfrm>
+              <a:off x="-31935" y="5477685"/>
+              <a:ext cx="2336163" cy="0"/>
+            </a:xfrm>
+            <a:prstGeom prst="line">
+              <a:avLst/>
+            </a:prstGeom>
+            <a:ln w="28575">
+              <a:solidFill>
+                <a:schemeClr val="tx1"/>
+              </a:solidFill>
+            </a:ln>
+          </p:spPr>
+          <p:style>
+            <a:lnRef idx="1">
+              <a:schemeClr val="accent1"/>
+            </a:lnRef>
+            <a:fillRef idx="0">
+              <a:schemeClr val="accent1"/>
+            </a:fillRef>
+            <a:effectRef idx="0">
+              <a:schemeClr val="accent1"/>
+            </a:effectRef>
+            <a:fontRef idx="minor">
+              <a:schemeClr val="tx1"/>
+            </a:fontRef>
+          </p:style>
+        </p:cxnSp>
+        <p:cxnSp>
+          <p:nvCxnSpPr>
+            <p:cNvPr id="138" name="Straight Connector 137">
+              <a:extLst>
+                <a:ext uri="{FF2B5EF4-FFF2-40B4-BE49-F238E27FC236}">
+                  <a16:creationId xmlns:a16="http://schemas.microsoft.com/office/drawing/2014/main" id="{6949D352-9DB9-43F0-98A4-C3812693BC27}"/>
+                </a:ext>
+              </a:extLst>
+            </p:cNvPr>
+            <p:cNvCxnSpPr>
+              <a:cxnSpLocks/>
+            </p:cNvCxnSpPr>
+            <p:nvPr/>
+          </p:nvCxnSpPr>
+          <p:spPr>
+            <a:xfrm flipH="1" flipV="1">
+              <a:off x="1569094" y="4843648"/>
+              <a:ext cx="10592" cy="2757697"/>
+            </a:xfrm>
+            <a:prstGeom prst="line">
+              <a:avLst/>
+            </a:prstGeom>
+            <a:ln w="28575">
+              <a:solidFill>
+                <a:schemeClr val="tx1"/>
+              </a:solidFill>
+            </a:ln>
+          </p:spPr>
+          <p:style>
+            <a:lnRef idx="1">
+              <a:schemeClr val="accent1"/>
+            </a:lnRef>
+            <a:fillRef idx="0">
+              <a:schemeClr val="accent1"/>
+            </a:fillRef>
+            <a:effectRef idx="0">
+              <a:schemeClr val="accent1"/>
+            </a:effectRef>
+            <a:fontRef idx="minor">
+              <a:schemeClr val="tx1"/>
+            </a:fontRef>
+          </p:style>
+        </p:cxnSp>
+        <p:sp>
+          <p:nvSpPr>
+            <p:cNvPr id="139" name="Rectangle: Rounded Corners 138">
+              <a:extLst>
+                <a:ext uri="{FF2B5EF4-FFF2-40B4-BE49-F238E27FC236}">
+                  <a16:creationId xmlns:a16="http://schemas.microsoft.com/office/drawing/2014/main" id="{21402511-3A4A-4AAF-9B3B-D7D5B8B929D4}"/>
+                </a:ext>
+              </a:extLst>
+            </p:cNvPr>
+            <p:cNvSpPr/>
+            <p:nvPr/>
+          </p:nvSpPr>
+          <p:spPr>
+            <a:xfrm>
+              <a:off x="1656912" y="5533108"/>
+              <a:ext cx="288000" cy="288000"/>
+            </a:xfrm>
+            <a:prstGeom prst="roundRect">
+              <a:avLst/>
+            </a:prstGeom>
+            <a:solidFill>
+              <a:srgbClr val="7030A0"/>
+            </a:solidFill>
+            <a:ln>
+              <a:solidFill>
+                <a:schemeClr val="tx1"/>
+              </a:solidFill>
+            </a:ln>
+          </p:spPr>
+          <p:style>
+            <a:lnRef idx="2">
+              <a:schemeClr val="accent2">
+                <a:shade val="50000"/>
+              </a:schemeClr>
+            </a:lnRef>
+            <a:fillRef idx="1">
+              <a:schemeClr val="accent2"/>
+            </a:fillRef>
+            <a:effectRef idx="0">
+              <a:schemeClr val="accent2"/>
+            </a:effectRef>
+            <a:fontRef idx="minor">
+              <a:schemeClr val="lt1"/>
+            </a:fontRef>
+          </p:style>
+          <p:txBody>
+            <a:bodyPr rtlCol="0" anchor="ctr"/>
+            <a:lstStyle/>
             <a:p>
+              <a:pPr algn="ctr"/>
               <a:r>
-                <a:rPr lang="en-US" dirty="0"/>
-                <a:t>Permutation 2;</a:t>
+                <a:rPr lang="en-US" sz="2200" dirty="0"/>
+                <a:t>1</a:t>
               </a:r>
+              <a:endParaRPr lang="en-AU" sz="2200" dirty="0"/>
             </a:p>
+          </p:txBody>
+        </p:sp>
+        <p:sp>
+          <p:nvSpPr>
+            <p:cNvPr id="140" name="Rectangle: Rounded Corners 139">
+              <a:extLst>
+                <a:ext uri="{FF2B5EF4-FFF2-40B4-BE49-F238E27FC236}">
+                  <a16:creationId xmlns:a16="http://schemas.microsoft.com/office/drawing/2014/main" id="{1FB7EB48-FB69-48AA-9159-90B9192823E4}"/>
+                </a:ext>
+              </a:extLst>
+            </p:cNvPr>
+            <p:cNvSpPr/>
+            <p:nvPr/>
+          </p:nvSpPr>
+          <p:spPr>
+            <a:xfrm>
+              <a:off x="1302138" y="5852662"/>
+              <a:ext cx="1022129" cy="349319"/>
+            </a:xfrm>
+            <a:prstGeom prst="roundRect">
+              <a:avLst/>
+            </a:prstGeom>
+            <a:noFill/>
+            <a:ln w="28575">
+              <a:solidFill>
+                <a:srgbClr val="FF0000"/>
+              </a:solidFill>
+            </a:ln>
+          </p:spPr>
+          <p:style>
+            <a:lnRef idx="2">
+              <a:schemeClr val="accent1">
+                <a:shade val="50000"/>
+              </a:schemeClr>
+            </a:lnRef>
+            <a:fillRef idx="1">
+              <a:schemeClr val="accent1"/>
+            </a:fillRef>
+            <a:effectRef idx="0">
+              <a:schemeClr val="accent1"/>
+            </a:effectRef>
+            <a:fontRef idx="minor">
+              <a:schemeClr val="lt1"/>
+            </a:fontRef>
+          </p:style>
+          <p:txBody>
+            <a:bodyPr rtlCol="0" anchor="ctr"/>
+            <a:lstStyle/>
             <a:p>
+              <a:pPr algn="ctr"/>
+              <a:endParaRPr lang="en-AU"/>
+            </a:p>
+          </p:txBody>
+        </p:sp>
+        <p:sp>
+          <p:nvSpPr>
+            <p:cNvPr id="141" name="Rectangle: Rounded Corners 140">
+              <a:extLst>
+                <a:ext uri="{FF2B5EF4-FFF2-40B4-BE49-F238E27FC236}">
+                  <a16:creationId xmlns:a16="http://schemas.microsoft.com/office/drawing/2014/main" id="{FD485652-5FA3-4F70-B752-C5497F5FAF4D}"/>
+                </a:ext>
+              </a:extLst>
+            </p:cNvPr>
+            <p:cNvSpPr/>
+            <p:nvPr/>
+          </p:nvSpPr>
+          <p:spPr>
+            <a:xfrm>
+              <a:off x="1994428" y="5533108"/>
+              <a:ext cx="288000" cy="288000"/>
+            </a:xfrm>
+            <a:prstGeom prst="roundRect">
+              <a:avLst/>
+            </a:prstGeom>
+            <a:solidFill>
+              <a:schemeClr val="accent6">
+                <a:lumMod val="75000"/>
+              </a:schemeClr>
+            </a:solidFill>
+            <a:ln>
+              <a:solidFill>
+                <a:schemeClr val="tx1"/>
+              </a:solidFill>
+            </a:ln>
+          </p:spPr>
+          <p:style>
+            <a:lnRef idx="2">
+              <a:schemeClr val="accent1">
+                <a:shade val="50000"/>
+              </a:schemeClr>
+            </a:lnRef>
+            <a:fillRef idx="1">
+              <a:schemeClr val="accent1"/>
+            </a:fillRef>
+            <a:effectRef idx="0">
+              <a:schemeClr val="accent1"/>
+            </a:effectRef>
+            <a:fontRef idx="minor">
+              <a:schemeClr val="lt1"/>
+            </a:fontRef>
+          </p:style>
+          <p:txBody>
+            <a:bodyPr rtlCol="0" anchor="ctr"/>
+            <a:lstStyle/>
+            <a:p>
+              <a:pPr algn="ctr"/>
               <a:r>
-                <a:rPr lang="en-US" dirty="0"/>
-                <a:t>EEE, banana</a:t>
+                <a:rPr lang="en-US" sz="2200" dirty="0"/>
+                <a:t>2</a:t>
               </a:r>
-              <a:endParaRPr lang="en-AU" dirty="0"/>
+              <a:endParaRPr lang="en-AU" sz="2200" dirty="0"/>
+            </a:p>
+          </p:txBody>
+        </p:sp>
+        <p:sp>
+          <p:nvSpPr>
+            <p:cNvPr id="142" name="Rectangle: Rounded Corners 141">
+              <a:extLst>
+                <a:ext uri="{FF2B5EF4-FFF2-40B4-BE49-F238E27FC236}">
+                  <a16:creationId xmlns:a16="http://schemas.microsoft.com/office/drawing/2014/main" id="{0F3C369B-D8FB-419C-80E4-BF5025B99D5F}"/>
+                </a:ext>
+              </a:extLst>
+            </p:cNvPr>
+            <p:cNvSpPr/>
+            <p:nvPr/>
+          </p:nvSpPr>
+          <p:spPr>
+            <a:xfrm>
+              <a:off x="1990294" y="5887711"/>
+              <a:ext cx="288000" cy="288000"/>
+            </a:xfrm>
+            <a:prstGeom prst="roundRect">
+              <a:avLst/>
+            </a:prstGeom>
+            <a:solidFill>
+              <a:srgbClr val="C00000"/>
+            </a:solidFill>
+            <a:ln>
+              <a:solidFill>
+                <a:schemeClr val="tx1"/>
+              </a:solidFill>
+            </a:ln>
+          </p:spPr>
+          <p:style>
+            <a:lnRef idx="2">
+              <a:schemeClr val="accent1">
+                <a:shade val="50000"/>
+              </a:schemeClr>
+            </a:lnRef>
+            <a:fillRef idx="1">
+              <a:schemeClr val="accent1"/>
+            </a:fillRef>
+            <a:effectRef idx="0">
+              <a:schemeClr val="accent1"/>
+            </a:effectRef>
+            <a:fontRef idx="minor">
+              <a:schemeClr val="lt1"/>
+            </a:fontRef>
+          </p:style>
+          <p:txBody>
+            <a:bodyPr rtlCol="0" anchor="ctr"/>
+            <a:lstStyle/>
+            <a:p>
+              <a:pPr algn="ctr"/>
+              <a:r>
+                <a:rPr lang="en-US" sz="2200" dirty="0"/>
+                <a:t>3</a:t>
+              </a:r>
+              <a:endParaRPr lang="en-AU" sz="2200" dirty="0"/>
+            </a:p>
+          </p:txBody>
+        </p:sp>
+        <p:sp>
+          <p:nvSpPr>
+            <p:cNvPr id="143" name="Rectangle: Rounded Corners 142">
+              <a:extLst>
+                <a:ext uri="{FF2B5EF4-FFF2-40B4-BE49-F238E27FC236}">
+                  <a16:creationId xmlns:a16="http://schemas.microsoft.com/office/drawing/2014/main" id="{46F5EF77-82D8-494C-B5C2-CAEE3EA0776E}"/>
+                </a:ext>
+              </a:extLst>
+            </p:cNvPr>
+            <p:cNvSpPr/>
+            <p:nvPr/>
+          </p:nvSpPr>
+          <p:spPr>
+            <a:xfrm>
+              <a:off x="1652836" y="5887711"/>
+              <a:ext cx="288000" cy="288000"/>
+            </a:xfrm>
+            <a:prstGeom prst="roundRect">
+              <a:avLst/>
+            </a:prstGeom>
+            <a:solidFill>
+              <a:srgbClr val="7030A0"/>
+            </a:solidFill>
+            <a:ln>
+              <a:solidFill>
+                <a:schemeClr val="tx1"/>
+              </a:solidFill>
+            </a:ln>
+          </p:spPr>
+          <p:style>
+            <a:lnRef idx="2">
+              <a:schemeClr val="accent2">
+                <a:shade val="50000"/>
+              </a:schemeClr>
+            </a:lnRef>
+            <a:fillRef idx="1">
+              <a:schemeClr val="accent2"/>
+            </a:fillRef>
+            <a:effectRef idx="0">
+              <a:schemeClr val="accent2"/>
+            </a:effectRef>
+            <a:fontRef idx="minor">
+              <a:schemeClr val="lt1"/>
+            </a:fontRef>
+          </p:style>
+          <p:txBody>
+            <a:bodyPr rtlCol="0" anchor="ctr"/>
+            <a:lstStyle/>
+            <a:p>
+              <a:pPr algn="ctr"/>
+              <a:r>
+                <a:rPr lang="en-US" sz="2200" dirty="0"/>
+                <a:t>1</a:t>
+              </a:r>
+              <a:endParaRPr lang="en-AU" sz="2200" dirty="0"/>
+            </a:p>
+          </p:txBody>
+        </p:sp>
+        <p:sp>
+          <p:nvSpPr>
+            <p:cNvPr id="144" name="Rectangle: Rounded Corners 143">
+              <a:extLst>
+                <a:ext uri="{FF2B5EF4-FFF2-40B4-BE49-F238E27FC236}">
+                  <a16:creationId xmlns:a16="http://schemas.microsoft.com/office/drawing/2014/main" id="{5937D5B3-8EB4-4E64-BCF2-C94EE90DEE44}"/>
+                </a:ext>
+              </a:extLst>
+            </p:cNvPr>
+            <p:cNvSpPr/>
+            <p:nvPr/>
+          </p:nvSpPr>
+          <p:spPr>
+            <a:xfrm>
+              <a:off x="1657892" y="6228661"/>
+              <a:ext cx="288000" cy="288000"/>
+            </a:xfrm>
+            <a:prstGeom prst="roundRect">
+              <a:avLst/>
+            </a:prstGeom>
+            <a:solidFill>
+              <a:schemeClr val="accent6">
+                <a:lumMod val="75000"/>
+              </a:schemeClr>
+            </a:solidFill>
+            <a:ln>
+              <a:solidFill>
+                <a:schemeClr val="tx1"/>
+              </a:solidFill>
+            </a:ln>
+          </p:spPr>
+          <p:style>
+            <a:lnRef idx="2">
+              <a:schemeClr val="accent1">
+                <a:shade val="50000"/>
+              </a:schemeClr>
+            </a:lnRef>
+            <a:fillRef idx="1">
+              <a:schemeClr val="accent1"/>
+            </a:fillRef>
+            <a:effectRef idx="0">
+              <a:schemeClr val="accent1"/>
+            </a:effectRef>
+            <a:fontRef idx="minor">
+              <a:schemeClr val="lt1"/>
+            </a:fontRef>
+          </p:style>
+          <p:txBody>
+            <a:bodyPr rtlCol="0" anchor="ctr"/>
+            <a:lstStyle/>
+            <a:p>
+              <a:pPr algn="ctr"/>
+              <a:r>
+                <a:rPr lang="en-US" sz="2200" dirty="0"/>
+                <a:t>2</a:t>
+              </a:r>
+              <a:endParaRPr lang="en-AU" sz="2200" dirty="0"/>
+            </a:p>
+          </p:txBody>
+        </p:sp>
+        <p:sp>
+          <p:nvSpPr>
+            <p:cNvPr id="145" name="Rectangle: Rounded Corners 144">
+              <a:extLst>
+                <a:ext uri="{FF2B5EF4-FFF2-40B4-BE49-F238E27FC236}">
+                  <a16:creationId xmlns:a16="http://schemas.microsoft.com/office/drawing/2014/main" id="{F13DE852-E971-47B2-9D61-60EBB202FD70}"/>
+                </a:ext>
+              </a:extLst>
+            </p:cNvPr>
+            <p:cNvSpPr/>
+            <p:nvPr/>
+          </p:nvSpPr>
+          <p:spPr>
+            <a:xfrm>
+              <a:off x="1657261" y="6550561"/>
+              <a:ext cx="288000" cy="288000"/>
+            </a:xfrm>
+            <a:prstGeom prst="roundRect">
+              <a:avLst/>
+            </a:prstGeom>
+            <a:solidFill>
+              <a:schemeClr val="accent6">
+                <a:lumMod val="75000"/>
+              </a:schemeClr>
+            </a:solidFill>
+            <a:ln>
+              <a:solidFill>
+                <a:schemeClr val="tx1"/>
+              </a:solidFill>
+            </a:ln>
+          </p:spPr>
+          <p:style>
+            <a:lnRef idx="2">
+              <a:schemeClr val="accent1">
+                <a:shade val="50000"/>
+              </a:schemeClr>
+            </a:lnRef>
+            <a:fillRef idx="1">
+              <a:schemeClr val="accent1"/>
+            </a:fillRef>
+            <a:effectRef idx="0">
+              <a:schemeClr val="accent1"/>
+            </a:effectRef>
+            <a:fontRef idx="minor">
+              <a:schemeClr val="lt1"/>
+            </a:fontRef>
+          </p:style>
+          <p:txBody>
+            <a:bodyPr rtlCol="0" anchor="ctr"/>
+            <a:lstStyle/>
+            <a:p>
+              <a:pPr algn="ctr"/>
+              <a:r>
+                <a:rPr lang="en-US" sz="2200" dirty="0"/>
+                <a:t>2</a:t>
+              </a:r>
+              <a:endParaRPr lang="en-AU" sz="2200" dirty="0"/>
+            </a:p>
+          </p:txBody>
+        </p:sp>
+        <p:sp>
+          <p:nvSpPr>
+            <p:cNvPr id="146" name="Rectangle: Rounded Corners 145">
+              <a:extLst>
+                <a:ext uri="{FF2B5EF4-FFF2-40B4-BE49-F238E27FC236}">
+                  <a16:creationId xmlns:a16="http://schemas.microsoft.com/office/drawing/2014/main" id="{D42A0E2E-0F17-484A-8E51-CB7F715011B5}"/>
+                </a:ext>
+              </a:extLst>
+            </p:cNvPr>
+            <p:cNvSpPr/>
+            <p:nvPr/>
+          </p:nvSpPr>
+          <p:spPr>
+            <a:xfrm>
+              <a:off x="1652836" y="6885663"/>
+              <a:ext cx="288000" cy="288000"/>
+            </a:xfrm>
+            <a:prstGeom prst="roundRect">
+              <a:avLst/>
+            </a:prstGeom>
+            <a:solidFill>
+              <a:srgbClr val="C00000"/>
+            </a:solidFill>
+            <a:ln>
+              <a:solidFill>
+                <a:schemeClr val="tx1"/>
+              </a:solidFill>
+            </a:ln>
+          </p:spPr>
+          <p:style>
+            <a:lnRef idx="2">
+              <a:schemeClr val="accent1">
+                <a:shade val="50000"/>
+              </a:schemeClr>
+            </a:lnRef>
+            <a:fillRef idx="1">
+              <a:schemeClr val="accent1"/>
+            </a:fillRef>
+            <a:effectRef idx="0">
+              <a:schemeClr val="accent1"/>
+            </a:effectRef>
+            <a:fontRef idx="minor">
+              <a:schemeClr val="lt1"/>
+            </a:fontRef>
+          </p:style>
+          <p:txBody>
+            <a:bodyPr rtlCol="0" anchor="ctr"/>
+            <a:lstStyle/>
+            <a:p>
+              <a:pPr algn="ctr"/>
+              <a:r>
+                <a:rPr lang="en-US" sz="2200" dirty="0"/>
+                <a:t>3</a:t>
+              </a:r>
+              <a:endParaRPr lang="en-AU" sz="2200" dirty="0"/>
+            </a:p>
+          </p:txBody>
+        </p:sp>
+        <p:sp>
+          <p:nvSpPr>
+            <p:cNvPr id="147" name="Rectangle: Rounded Corners 146">
+              <a:extLst>
+                <a:ext uri="{FF2B5EF4-FFF2-40B4-BE49-F238E27FC236}">
+                  <a16:creationId xmlns:a16="http://schemas.microsoft.com/office/drawing/2014/main" id="{876F010B-A773-45DF-8A9D-6A6079233AD3}"/>
+                </a:ext>
+              </a:extLst>
+            </p:cNvPr>
+            <p:cNvSpPr/>
+            <p:nvPr/>
+          </p:nvSpPr>
+          <p:spPr>
+            <a:xfrm>
+              <a:off x="1652833" y="7229919"/>
+              <a:ext cx="288000" cy="288000"/>
+            </a:xfrm>
+            <a:prstGeom prst="roundRect">
+              <a:avLst/>
+            </a:prstGeom>
+            <a:solidFill>
+              <a:srgbClr val="C00000"/>
+            </a:solidFill>
+            <a:ln>
+              <a:solidFill>
+                <a:schemeClr val="tx1"/>
+              </a:solidFill>
+            </a:ln>
+          </p:spPr>
+          <p:style>
+            <a:lnRef idx="2">
+              <a:schemeClr val="accent1">
+                <a:shade val="50000"/>
+              </a:schemeClr>
+            </a:lnRef>
+            <a:fillRef idx="1">
+              <a:schemeClr val="accent1"/>
+            </a:fillRef>
+            <a:effectRef idx="0">
+              <a:schemeClr val="accent1"/>
+            </a:effectRef>
+            <a:fontRef idx="minor">
+              <a:schemeClr val="lt1"/>
+            </a:fontRef>
+          </p:style>
+          <p:txBody>
+            <a:bodyPr rtlCol="0" anchor="ctr"/>
+            <a:lstStyle/>
+            <a:p>
+              <a:pPr algn="ctr"/>
+              <a:r>
+                <a:rPr lang="en-US" sz="2200" dirty="0"/>
+                <a:t>3</a:t>
+              </a:r>
+              <a:endParaRPr lang="en-AU" sz="2200" dirty="0"/>
+            </a:p>
+          </p:txBody>
+        </p:sp>
+        <p:sp>
+          <p:nvSpPr>
+            <p:cNvPr id="148" name="Rectangle: Rounded Corners 147">
+              <a:extLst>
+                <a:ext uri="{FF2B5EF4-FFF2-40B4-BE49-F238E27FC236}">
+                  <a16:creationId xmlns:a16="http://schemas.microsoft.com/office/drawing/2014/main" id="{3B18543A-A9BC-4ADF-9420-9E6EF9AC6A3B}"/>
+                </a:ext>
+              </a:extLst>
+            </p:cNvPr>
+            <p:cNvSpPr/>
+            <p:nvPr/>
+          </p:nvSpPr>
+          <p:spPr>
+            <a:xfrm>
+              <a:off x="1998198" y="6222311"/>
+              <a:ext cx="288000" cy="288000"/>
+            </a:xfrm>
+            <a:prstGeom prst="roundRect">
+              <a:avLst/>
+            </a:prstGeom>
+            <a:solidFill>
+              <a:srgbClr val="C00000"/>
+            </a:solidFill>
+            <a:ln>
+              <a:solidFill>
+                <a:schemeClr val="tx1"/>
+              </a:solidFill>
+            </a:ln>
+          </p:spPr>
+          <p:style>
+            <a:lnRef idx="2">
+              <a:schemeClr val="accent1">
+                <a:shade val="50000"/>
+              </a:schemeClr>
+            </a:lnRef>
+            <a:fillRef idx="1">
+              <a:schemeClr val="accent1"/>
+            </a:fillRef>
+            <a:effectRef idx="0">
+              <a:schemeClr val="accent1"/>
+            </a:effectRef>
+            <a:fontRef idx="minor">
+              <a:schemeClr val="lt1"/>
+            </a:fontRef>
+          </p:style>
+          <p:txBody>
+            <a:bodyPr rtlCol="0" anchor="ctr"/>
+            <a:lstStyle/>
+            <a:p>
+              <a:pPr algn="ctr"/>
+              <a:r>
+                <a:rPr lang="en-US" sz="2200" dirty="0"/>
+                <a:t>3</a:t>
+              </a:r>
+              <a:endParaRPr lang="en-AU" sz="2200" dirty="0"/>
+            </a:p>
+          </p:txBody>
+        </p:sp>
+        <p:sp>
+          <p:nvSpPr>
+            <p:cNvPr id="149" name="Rectangle: Rounded Corners 148">
+              <a:extLst>
+                <a:ext uri="{FF2B5EF4-FFF2-40B4-BE49-F238E27FC236}">
+                  <a16:creationId xmlns:a16="http://schemas.microsoft.com/office/drawing/2014/main" id="{F9361937-C66C-49BE-99F2-D9EE613E80D0}"/>
+                </a:ext>
+              </a:extLst>
+            </p:cNvPr>
+            <p:cNvSpPr/>
+            <p:nvPr/>
+          </p:nvSpPr>
+          <p:spPr>
+            <a:xfrm>
+              <a:off x="2001254" y="6550561"/>
+              <a:ext cx="288000" cy="288000"/>
+            </a:xfrm>
+            <a:prstGeom prst="roundRect">
+              <a:avLst/>
+            </a:prstGeom>
+            <a:solidFill>
+              <a:srgbClr val="7030A0"/>
+            </a:solidFill>
+            <a:ln>
+              <a:solidFill>
+                <a:schemeClr val="tx1"/>
+              </a:solidFill>
+            </a:ln>
+          </p:spPr>
+          <p:style>
+            <a:lnRef idx="2">
+              <a:schemeClr val="accent2">
+                <a:shade val="50000"/>
+              </a:schemeClr>
+            </a:lnRef>
+            <a:fillRef idx="1">
+              <a:schemeClr val="accent2"/>
+            </a:fillRef>
+            <a:effectRef idx="0">
+              <a:schemeClr val="accent2"/>
+            </a:effectRef>
+            <a:fontRef idx="minor">
+              <a:schemeClr val="lt1"/>
+            </a:fontRef>
+          </p:style>
+          <p:txBody>
+            <a:bodyPr rtlCol="0" anchor="ctr"/>
+            <a:lstStyle/>
+            <a:p>
+              <a:pPr algn="ctr"/>
+              <a:r>
+                <a:rPr lang="en-US" sz="2200" dirty="0"/>
+                <a:t>1</a:t>
+              </a:r>
+              <a:endParaRPr lang="en-AU" sz="2200" dirty="0"/>
+            </a:p>
+          </p:txBody>
+        </p:sp>
+        <p:sp>
+          <p:nvSpPr>
+            <p:cNvPr id="150" name="Rectangle: Rounded Corners 149">
+              <a:extLst>
+                <a:ext uri="{FF2B5EF4-FFF2-40B4-BE49-F238E27FC236}">
+                  <a16:creationId xmlns:a16="http://schemas.microsoft.com/office/drawing/2014/main" id="{A46DB2C7-6305-4966-BBBB-61B010BFF0CE}"/>
+                </a:ext>
+              </a:extLst>
+            </p:cNvPr>
+            <p:cNvSpPr/>
+            <p:nvPr/>
+          </p:nvSpPr>
+          <p:spPr>
+            <a:xfrm>
+              <a:off x="2001457" y="6885663"/>
+              <a:ext cx="288000" cy="288000"/>
+            </a:xfrm>
+            <a:prstGeom prst="roundRect">
+              <a:avLst/>
+            </a:prstGeom>
+            <a:solidFill>
+              <a:srgbClr val="7030A0"/>
+            </a:solidFill>
+            <a:ln>
+              <a:solidFill>
+                <a:schemeClr val="tx1"/>
+              </a:solidFill>
+            </a:ln>
+          </p:spPr>
+          <p:style>
+            <a:lnRef idx="2">
+              <a:schemeClr val="accent2">
+                <a:shade val="50000"/>
+              </a:schemeClr>
+            </a:lnRef>
+            <a:fillRef idx="1">
+              <a:schemeClr val="accent2"/>
+            </a:fillRef>
+            <a:effectRef idx="0">
+              <a:schemeClr val="accent2"/>
+            </a:effectRef>
+            <a:fontRef idx="minor">
+              <a:schemeClr val="lt1"/>
+            </a:fontRef>
+          </p:style>
+          <p:txBody>
+            <a:bodyPr rtlCol="0" anchor="ctr"/>
+            <a:lstStyle/>
+            <a:p>
+              <a:pPr algn="ctr"/>
+              <a:r>
+                <a:rPr lang="en-US" sz="2200" dirty="0"/>
+                <a:t>1</a:t>
+              </a:r>
+              <a:endParaRPr lang="en-AU" sz="2200" dirty="0"/>
+            </a:p>
+          </p:txBody>
+        </p:sp>
+        <p:sp>
+          <p:nvSpPr>
+            <p:cNvPr id="151" name="Rectangle: Rounded Corners 150">
+              <a:extLst>
+                <a:ext uri="{FF2B5EF4-FFF2-40B4-BE49-F238E27FC236}">
+                  <a16:creationId xmlns:a16="http://schemas.microsoft.com/office/drawing/2014/main" id="{3B5973CE-4D46-4E76-8FE1-05F81B22BF13}"/>
+                </a:ext>
+              </a:extLst>
+            </p:cNvPr>
+            <p:cNvSpPr/>
+            <p:nvPr/>
+          </p:nvSpPr>
+          <p:spPr>
+            <a:xfrm>
+              <a:off x="1998198" y="7232963"/>
+              <a:ext cx="288000" cy="288000"/>
+            </a:xfrm>
+            <a:prstGeom prst="roundRect">
+              <a:avLst/>
+            </a:prstGeom>
+            <a:solidFill>
+              <a:schemeClr val="accent6">
+                <a:lumMod val="75000"/>
+              </a:schemeClr>
+            </a:solidFill>
+            <a:ln>
+              <a:solidFill>
+                <a:schemeClr val="tx1"/>
+              </a:solidFill>
+            </a:ln>
+          </p:spPr>
+          <p:style>
+            <a:lnRef idx="2">
+              <a:schemeClr val="accent1">
+                <a:shade val="50000"/>
+              </a:schemeClr>
+            </a:lnRef>
+            <a:fillRef idx="1">
+              <a:schemeClr val="accent1"/>
+            </a:fillRef>
+            <a:effectRef idx="0">
+              <a:schemeClr val="accent1"/>
+            </a:effectRef>
+            <a:fontRef idx="minor">
+              <a:schemeClr val="lt1"/>
+            </a:fontRef>
+          </p:style>
+          <p:txBody>
+            <a:bodyPr rtlCol="0" anchor="ctr"/>
+            <a:lstStyle/>
+            <a:p>
+              <a:pPr algn="ctr"/>
+              <a:r>
+                <a:rPr lang="en-US" sz="2200" dirty="0"/>
+                <a:t>2</a:t>
+              </a:r>
+              <a:endParaRPr lang="en-AU" sz="2200" dirty="0"/>
             </a:p>
           </p:txBody>
         </p:sp>
       </p:grpSp>
+      <p:grpSp>
+        <p:nvGrpSpPr>
+          <p:cNvPr id="58" name="Group 57">
+            <a:extLst>
+              <a:ext uri="{FF2B5EF4-FFF2-40B4-BE49-F238E27FC236}">
+                <a16:creationId xmlns:a16="http://schemas.microsoft.com/office/drawing/2014/main" id="{39693E24-A1FE-4415-9369-C7EA1BCD978B}"/>
+              </a:ext>
+            </a:extLst>
+          </p:cNvPr>
+          <p:cNvGrpSpPr/>
+          <p:nvPr/>
+        </p:nvGrpSpPr>
+        <p:grpSpPr>
+          <a:xfrm>
+            <a:off x="-3557484" y="-165947"/>
+            <a:ext cx="2844354" cy="2140710"/>
+            <a:chOff x="6988629" y="2146556"/>
+            <a:chExt cx="2844354" cy="2140710"/>
+          </a:xfrm>
+        </p:grpSpPr>
+        <p:sp>
+          <p:nvSpPr>
+            <p:cNvPr id="119" name="TextBox 118">
+              <a:extLst>
+                <a:ext uri="{FF2B5EF4-FFF2-40B4-BE49-F238E27FC236}">
+                  <a16:creationId xmlns:a16="http://schemas.microsoft.com/office/drawing/2014/main" id="{5BE5A8F5-89DE-436C-99B8-8200BFB34859}"/>
+                </a:ext>
+              </a:extLst>
+            </p:cNvPr>
+            <p:cNvSpPr txBox="1"/>
+            <p:nvPr/>
+          </p:nvSpPr>
+          <p:spPr>
+            <a:xfrm rot="16200000">
+              <a:off x="8694003" y="2186503"/>
+              <a:ext cx="1003223" cy="923330"/>
+            </a:xfrm>
+            <a:prstGeom prst="rect">
+              <a:avLst/>
+            </a:prstGeom>
+            <a:noFill/>
+          </p:spPr>
+          <p:txBody>
+            <a:bodyPr wrap="square" rtlCol="0">
+              <a:spAutoFit/>
+            </a:bodyPr>
+            <a:lstStyle/>
+            <a:p>
+              <a:r>
+                <a:rPr lang="en-AU" dirty="0"/>
+                <a:t>Period 1</a:t>
+              </a:r>
+              <a:endParaRPr lang="en-US" dirty="0"/>
+            </a:p>
+            <a:p>
+              <a:r>
+                <a:rPr lang="en-AU" dirty="0"/>
+                <a:t>Period 2</a:t>
+              </a:r>
+              <a:endParaRPr lang="en-US" dirty="0"/>
+            </a:p>
+            <a:p>
+              <a:r>
+                <a:rPr lang="en-AU" dirty="0"/>
+                <a:t>Period 3</a:t>
+              </a:r>
+              <a:endParaRPr lang="en-US" dirty="0"/>
+            </a:p>
+          </p:txBody>
+        </p:sp>
+        <p:sp>
+          <p:nvSpPr>
+            <p:cNvPr id="120" name="TextBox 119">
+              <a:extLst>
+                <a:ext uri="{FF2B5EF4-FFF2-40B4-BE49-F238E27FC236}">
+                  <a16:creationId xmlns:a16="http://schemas.microsoft.com/office/drawing/2014/main" id="{49B3FF56-4DF2-443B-84F1-2A793F4422A6}"/>
+                </a:ext>
+              </a:extLst>
+            </p:cNvPr>
+            <p:cNvSpPr txBox="1"/>
+            <p:nvPr/>
+          </p:nvSpPr>
+          <p:spPr>
+            <a:xfrm>
+              <a:off x="6988629" y="2452681"/>
+              <a:ext cx="1745321" cy="707886"/>
+            </a:xfrm>
+            <a:prstGeom prst="rect">
+              <a:avLst/>
+            </a:prstGeom>
+            <a:noFill/>
+          </p:spPr>
+          <p:txBody>
+            <a:bodyPr wrap="square" rtlCol="0">
+              <a:spAutoFit/>
+            </a:bodyPr>
+            <a:lstStyle/>
+            <a:p>
+              <a:pPr algn="r"/>
+              <a:r>
+                <a:rPr lang="en-AU" sz="2000" dirty="0"/>
+                <a:t>Factor order</a:t>
+              </a:r>
+            </a:p>
+            <a:p>
+              <a:pPr algn="r"/>
+              <a:r>
+                <a:rPr lang="en-AU" sz="2000" dirty="0"/>
+                <a:t>permutations</a:t>
+              </a:r>
+            </a:p>
+          </p:txBody>
+        </p:sp>
+        <p:cxnSp>
+          <p:nvCxnSpPr>
+            <p:cNvPr id="121" name="Straight Connector 120">
+              <a:extLst>
+                <a:ext uri="{FF2B5EF4-FFF2-40B4-BE49-F238E27FC236}">
+                  <a16:creationId xmlns:a16="http://schemas.microsoft.com/office/drawing/2014/main" id="{C189B2AF-BC76-4E59-86F6-8CD7AB0978CF}"/>
+                </a:ext>
+              </a:extLst>
+            </p:cNvPr>
+            <p:cNvCxnSpPr>
+              <a:cxnSpLocks/>
+            </p:cNvCxnSpPr>
+            <p:nvPr/>
+          </p:nvCxnSpPr>
+          <p:spPr>
+            <a:xfrm>
+              <a:off x="7097522" y="3169978"/>
+              <a:ext cx="2717068" cy="4223"/>
+            </a:xfrm>
+            <a:prstGeom prst="line">
+              <a:avLst/>
+            </a:prstGeom>
+            <a:ln w="28575">
+              <a:solidFill>
+                <a:schemeClr val="tx1"/>
+              </a:solidFill>
+            </a:ln>
+          </p:spPr>
+          <p:style>
+            <a:lnRef idx="1">
+              <a:schemeClr val="accent1"/>
+            </a:lnRef>
+            <a:fillRef idx="0">
+              <a:schemeClr val="accent1"/>
+            </a:fillRef>
+            <a:effectRef idx="0">
+              <a:schemeClr val="accent1"/>
+            </a:effectRef>
+            <a:fontRef idx="minor">
+              <a:schemeClr val="tx1"/>
+            </a:fontRef>
+          </p:style>
+        </p:cxnSp>
+        <p:cxnSp>
+          <p:nvCxnSpPr>
+            <p:cNvPr id="122" name="Straight Connector 121">
+              <a:extLst>
+                <a:ext uri="{FF2B5EF4-FFF2-40B4-BE49-F238E27FC236}">
+                  <a16:creationId xmlns:a16="http://schemas.microsoft.com/office/drawing/2014/main" id="{8AC17551-4ABC-4322-84BE-06A28112DA06}"/>
+                </a:ext>
+              </a:extLst>
+            </p:cNvPr>
+            <p:cNvCxnSpPr>
+              <a:cxnSpLocks/>
+            </p:cNvCxnSpPr>
+            <p:nvPr/>
+          </p:nvCxnSpPr>
+          <p:spPr>
+            <a:xfrm flipV="1">
+              <a:off x="8716852" y="2341097"/>
+              <a:ext cx="0" cy="1946169"/>
+            </a:xfrm>
+            <a:prstGeom prst="line">
+              <a:avLst/>
+            </a:prstGeom>
+            <a:ln w="28575">
+              <a:solidFill>
+                <a:schemeClr val="tx1"/>
+              </a:solidFill>
+            </a:ln>
+          </p:spPr>
+          <p:style>
+            <a:lnRef idx="1">
+              <a:schemeClr val="accent1"/>
+            </a:lnRef>
+            <a:fillRef idx="0">
+              <a:schemeClr val="accent1"/>
+            </a:fillRef>
+            <a:effectRef idx="0">
+              <a:schemeClr val="accent1"/>
+            </a:effectRef>
+            <a:fontRef idx="minor">
+              <a:schemeClr val="tx1"/>
+            </a:fontRef>
+          </p:style>
+        </p:cxnSp>
+        <p:sp>
+          <p:nvSpPr>
+            <p:cNvPr id="123" name="Rectangle: Rounded Corners 122">
+              <a:extLst>
+                <a:ext uri="{FF2B5EF4-FFF2-40B4-BE49-F238E27FC236}">
+                  <a16:creationId xmlns:a16="http://schemas.microsoft.com/office/drawing/2014/main" id="{25191266-D38C-4292-AE83-72731B6F9242}"/>
+                </a:ext>
+              </a:extLst>
+            </p:cNvPr>
+            <p:cNvSpPr/>
+            <p:nvPr/>
+          </p:nvSpPr>
+          <p:spPr>
+            <a:xfrm>
+              <a:off x="8786456" y="3250471"/>
+              <a:ext cx="288000" cy="287908"/>
+            </a:xfrm>
+            <a:prstGeom prst="roundRect">
+              <a:avLst/>
+            </a:prstGeom>
+            <a:solidFill>
+              <a:srgbClr val="7030A0"/>
+            </a:solidFill>
+            <a:ln>
+              <a:solidFill>
+                <a:schemeClr val="tx1"/>
+              </a:solidFill>
+            </a:ln>
+          </p:spPr>
+          <p:style>
+            <a:lnRef idx="2">
+              <a:schemeClr val="accent2">
+                <a:shade val="50000"/>
+              </a:schemeClr>
+            </a:lnRef>
+            <a:fillRef idx="1">
+              <a:schemeClr val="accent2"/>
+            </a:fillRef>
+            <a:effectRef idx="0">
+              <a:schemeClr val="accent2"/>
+            </a:effectRef>
+            <a:fontRef idx="minor">
+              <a:schemeClr val="lt1"/>
+            </a:fontRef>
+          </p:style>
+          <p:txBody>
+            <a:bodyPr rtlCol="0" anchor="ctr"/>
+            <a:lstStyle/>
+            <a:p>
+              <a:pPr algn="ctr"/>
+              <a:r>
+                <a:rPr lang="en-AU" sz="2200" dirty="0"/>
+                <a:t>P</a:t>
+              </a:r>
+            </a:p>
+          </p:txBody>
+        </p:sp>
+        <p:sp>
+          <p:nvSpPr>
+            <p:cNvPr id="124" name="Rectangle: Rounded Corners 123">
+              <a:extLst>
+                <a:ext uri="{FF2B5EF4-FFF2-40B4-BE49-F238E27FC236}">
+                  <a16:creationId xmlns:a16="http://schemas.microsoft.com/office/drawing/2014/main" id="{65511608-4D1E-486D-85F8-EA1DBB4CB510}"/>
+                </a:ext>
+              </a:extLst>
+            </p:cNvPr>
+            <p:cNvSpPr/>
+            <p:nvPr/>
+          </p:nvSpPr>
+          <p:spPr>
+            <a:xfrm>
+              <a:off x="9145685" y="3244987"/>
+              <a:ext cx="288000" cy="287908"/>
+            </a:xfrm>
+            <a:prstGeom prst="roundRect">
+              <a:avLst/>
+            </a:prstGeom>
+            <a:solidFill>
+              <a:schemeClr val="accent6">
+                <a:lumMod val="75000"/>
+              </a:schemeClr>
+            </a:solidFill>
+            <a:ln>
+              <a:solidFill>
+                <a:schemeClr val="tx1"/>
+              </a:solidFill>
+            </a:ln>
+          </p:spPr>
+          <p:style>
+            <a:lnRef idx="2">
+              <a:schemeClr val="accent1">
+                <a:shade val="50000"/>
+              </a:schemeClr>
+            </a:lnRef>
+            <a:fillRef idx="1">
+              <a:schemeClr val="accent1"/>
+            </a:fillRef>
+            <a:effectRef idx="0">
+              <a:schemeClr val="accent1"/>
+            </a:effectRef>
+            <a:fontRef idx="minor">
+              <a:schemeClr val="lt1"/>
+            </a:fontRef>
+          </p:style>
+          <p:txBody>
+            <a:bodyPr rtlCol="0" anchor="ctr"/>
+            <a:lstStyle/>
+            <a:p>
+              <a:pPr algn="ctr"/>
+              <a:r>
+                <a:rPr lang="en-AU" sz="2200" dirty="0"/>
+                <a:t>G</a:t>
+              </a:r>
+            </a:p>
+          </p:txBody>
+        </p:sp>
+        <p:sp>
+          <p:nvSpPr>
+            <p:cNvPr id="125" name="Rectangle: Rounded Corners 124">
+              <a:extLst>
+                <a:ext uri="{FF2B5EF4-FFF2-40B4-BE49-F238E27FC236}">
+                  <a16:creationId xmlns:a16="http://schemas.microsoft.com/office/drawing/2014/main" id="{DC539330-05C6-4C75-B854-4CA79C210B17}"/>
+                </a:ext>
+              </a:extLst>
+            </p:cNvPr>
+            <p:cNvSpPr/>
+            <p:nvPr/>
+          </p:nvSpPr>
+          <p:spPr>
+            <a:xfrm>
+              <a:off x="9497280" y="3239653"/>
+              <a:ext cx="288000" cy="287908"/>
+            </a:xfrm>
+            <a:prstGeom prst="roundRect">
+              <a:avLst/>
+            </a:prstGeom>
+            <a:solidFill>
+              <a:srgbClr val="C00000"/>
+            </a:solidFill>
+            <a:ln>
+              <a:solidFill>
+                <a:schemeClr val="tx1"/>
+              </a:solidFill>
+            </a:ln>
+          </p:spPr>
+          <p:style>
+            <a:lnRef idx="2">
+              <a:schemeClr val="accent1">
+                <a:shade val="50000"/>
+              </a:schemeClr>
+            </a:lnRef>
+            <a:fillRef idx="1">
+              <a:schemeClr val="accent1"/>
+            </a:fillRef>
+            <a:effectRef idx="0">
+              <a:schemeClr val="accent1"/>
+            </a:effectRef>
+            <a:fontRef idx="minor">
+              <a:schemeClr val="lt1"/>
+            </a:fontRef>
+          </p:style>
+          <p:txBody>
+            <a:bodyPr rtlCol="0" anchor="ctr"/>
+            <a:lstStyle/>
+            <a:p>
+              <a:pPr algn="ctr"/>
+              <a:r>
+                <a:rPr lang="en-AU" sz="2200" dirty="0"/>
+                <a:t>R</a:t>
+              </a:r>
+            </a:p>
+          </p:txBody>
+        </p:sp>
+        <p:sp>
+          <p:nvSpPr>
+            <p:cNvPr id="126" name="Rectangle: Rounded Corners 125">
+              <a:extLst>
+                <a:ext uri="{FF2B5EF4-FFF2-40B4-BE49-F238E27FC236}">
+                  <a16:creationId xmlns:a16="http://schemas.microsoft.com/office/drawing/2014/main" id="{EE729C0E-7D16-487C-9C0F-1449FBF8C46B}"/>
+                </a:ext>
+              </a:extLst>
+            </p:cNvPr>
+            <p:cNvSpPr/>
+            <p:nvPr/>
+          </p:nvSpPr>
+          <p:spPr>
+            <a:xfrm>
+              <a:off x="9148644" y="3957580"/>
+              <a:ext cx="288000" cy="287908"/>
+            </a:xfrm>
+            <a:prstGeom prst="roundRect">
+              <a:avLst/>
+            </a:prstGeom>
+            <a:solidFill>
+              <a:srgbClr val="7030A0"/>
+            </a:solidFill>
+            <a:ln>
+              <a:solidFill>
+                <a:schemeClr val="tx1"/>
+              </a:solidFill>
+            </a:ln>
+          </p:spPr>
+          <p:style>
+            <a:lnRef idx="2">
+              <a:schemeClr val="accent2">
+                <a:shade val="50000"/>
+              </a:schemeClr>
+            </a:lnRef>
+            <a:fillRef idx="1">
+              <a:schemeClr val="accent2"/>
+            </a:fillRef>
+            <a:effectRef idx="0">
+              <a:schemeClr val="accent2"/>
+            </a:effectRef>
+            <a:fontRef idx="minor">
+              <a:schemeClr val="lt1"/>
+            </a:fontRef>
+          </p:style>
+          <p:txBody>
+            <a:bodyPr rtlCol="0" anchor="ctr"/>
+            <a:lstStyle/>
+            <a:p>
+              <a:pPr algn="ctr"/>
+              <a:r>
+                <a:rPr lang="en-AU" sz="2200" dirty="0"/>
+                <a:t>P</a:t>
+              </a:r>
+            </a:p>
+          </p:txBody>
+        </p:sp>
+        <p:sp>
+          <p:nvSpPr>
+            <p:cNvPr id="127" name="Rectangle: Rounded Corners 126">
+              <a:extLst>
+                <a:ext uri="{FF2B5EF4-FFF2-40B4-BE49-F238E27FC236}">
+                  <a16:creationId xmlns:a16="http://schemas.microsoft.com/office/drawing/2014/main" id="{1E85255B-B6FD-4B37-A614-5F47FC5347A6}"/>
+                </a:ext>
+              </a:extLst>
+            </p:cNvPr>
+            <p:cNvSpPr/>
+            <p:nvPr/>
+          </p:nvSpPr>
+          <p:spPr>
+            <a:xfrm>
+              <a:off x="9508514" y="3961701"/>
+              <a:ext cx="288000" cy="287908"/>
+            </a:xfrm>
+            <a:prstGeom prst="roundRect">
+              <a:avLst/>
+            </a:prstGeom>
+            <a:solidFill>
+              <a:schemeClr val="accent6">
+                <a:lumMod val="75000"/>
+              </a:schemeClr>
+            </a:solidFill>
+            <a:ln>
+              <a:solidFill>
+                <a:schemeClr val="tx1"/>
+              </a:solidFill>
+            </a:ln>
+          </p:spPr>
+          <p:style>
+            <a:lnRef idx="2">
+              <a:schemeClr val="accent1">
+                <a:shade val="50000"/>
+              </a:schemeClr>
+            </a:lnRef>
+            <a:fillRef idx="1">
+              <a:schemeClr val="accent1"/>
+            </a:fillRef>
+            <a:effectRef idx="0">
+              <a:schemeClr val="accent1"/>
+            </a:effectRef>
+            <a:fontRef idx="minor">
+              <a:schemeClr val="lt1"/>
+            </a:fontRef>
+          </p:style>
+          <p:txBody>
+            <a:bodyPr rtlCol="0" anchor="ctr"/>
+            <a:lstStyle/>
+            <a:p>
+              <a:pPr algn="ctr"/>
+              <a:r>
+                <a:rPr lang="en-AU" sz="2200" dirty="0"/>
+                <a:t>G</a:t>
+              </a:r>
+            </a:p>
+          </p:txBody>
+        </p:sp>
+        <p:sp>
+          <p:nvSpPr>
+            <p:cNvPr id="128" name="Rectangle: Rounded Corners 127">
+              <a:extLst>
+                <a:ext uri="{FF2B5EF4-FFF2-40B4-BE49-F238E27FC236}">
+                  <a16:creationId xmlns:a16="http://schemas.microsoft.com/office/drawing/2014/main" id="{E06B46F4-9F9F-4B51-8552-BEA8A974D9D4}"/>
+                </a:ext>
+              </a:extLst>
+            </p:cNvPr>
+            <p:cNvSpPr/>
+            <p:nvPr/>
+          </p:nvSpPr>
+          <p:spPr>
+            <a:xfrm>
+              <a:off x="8789680" y="3950152"/>
+              <a:ext cx="288000" cy="287908"/>
+            </a:xfrm>
+            <a:prstGeom prst="roundRect">
+              <a:avLst/>
+            </a:prstGeom>
+            <a:solidFill>
+              <a:srgbClr val="C00000"/>
+            </a:solidFill>
+            <a:ln>
+              <a:solidFill>
+                <a:schemeClr val="tx1"/>
+              </a:solidFill>
+            </a:ln>
+          </p:spPr>
+          <p:style>
+            <a:lnRef idx="2">
+              <a:schemeClr val="accent1">
+                <a:shade val="50000"/>
+              </a:schemeClr>
+            </a:lnRef>
+            <a:fillRef idx="1">
+              <a:schemeClr val="accent1"/>
+            </a:fillRef>
+            <a:effectRef idx="0">
+              <a:schemeClr val="accent1"/>
+            </a:effectRef>
+            <a:fontRef idx="minor">
+              <a:schemeClr val="lt1"/>
+            </a:fontRef>
+          </p:style>
+          <p:txBody>
+            <a:bodyPr rtlCol="0" anchor="ctr"/>
+            <a:lstStyle/>
+            <a:p>
+              <a:pPr algn="ctr"/>
+              <a:r>
+                <a:rPr lang="en-AU" sz="2200" dirty="0"/>
+                <a:t>R</a:t>
+              </a:r>
+            </a:p>
+          </p:txBody>
+        </p:sp>
+        <p:sp>
+          <p:nvSpPr>
+            <p:cNvPr id="129" name="Rectangle: Rounded Corners 128">
+              <a:extLst>
+                <a:ext uri="{FF2B5EF4-FFF2-40B4-BE49-F238E27FC236}">
+                  <a16:creationId xmlns:a16="http://schemas.microsoft.com/office/drawing/2014/main" id="{2242A8D1-F9E1-4B56-83C9-ACB1AFD1694C}"/>
+                </a:ext>
+              </a:extLst>
+            </p:cNvPr>
+            <p:cNvSpPr/>
+            <p:nvPr/>
+          </p:nvSpPr>
+          <p:spPr>
+            <a:xfrm>
+              <a:off x="9505698" y="3590491"/>
+              <a:ext cx="288000" cy="287908"/>
+            </a:xfrm>
+            <a:prstGeom prst="roundRect">
+              <a:avLst/>
+            </a:prstGeom>
+            <a:solidFill>
+              <a:srgbClr val="7030A0"/>
+            </a:solidFill>
+            <a:ln>
+              <a:solidFill>
+                <a:schemeClr val="tx1"/>
+              </a:solidFill>
+            </a:ln>
+          </p:spPr>
+          <p:style>
+            <a:lnRef idx="2">
+              <a:schemeClr val="accent2">
+                <a:shade val="50000"/>
+              </a:schemeClr>
+            </a:lnRef>
+            <a:fillRef idx="1">
+              <a:schemeClr val="accent2"/>
+            </a:fillRef>
+            <a:effectRef idx="0">
+              <a:schemeClr val="accent2"/>
+            </a:effectRef>
+            <a:fontRef idx="minor">
+              <a:schemeClr val="lt1"/>
+            </a:fontRef>
+          </p:style>
+          <p:txBody>
+            <a:bodyPr rtlCol="0" anchor="ctr"/>
+            <a:lstStyle/>
+            <a:p>
+              <a:pPr algn="ctr"/>
+              <a:r>
+                <a:rPr lang="en-AU" sz="2200" dirty="0"/>
+                <a:t>P</a:t>
+              </a:r>
+            </a:p>
+          </p:txBody>
+        </p:sp>
+        <p:sp>
+          <p:nvSpPr>
+            <p:cNvPr id="130" name="Rectangle: Rounded Corners 129">
+              <a:extLst>
+                <a:ext uri="{FF2B5EF4-FFF2-40B4-BE49-F238E27FC236}">
+                  <a16:creationId xmlns:a16="http://schemas.microsoft.com/office/drawing/2014/main" id="{B446B11D-DD55-4732-B2FA-F488098C602F}"/>
+                </a:ext>
+              </a:extLst>
+            </p:cNvPr>
+            <p:cNvSpPr/>
+            <p:nvPr/>
+          </p:nvSpPr>
+          <p:spPr>
+            <a:xfrm>
+              <a:off x="8789680" y="3584549"/>
+              <a:ext cx="288000" cy="287908"/>
+            </a:xfrm>
+            <a:prstGeom prst="roundRect">
+              <a:avLst/>
+            </a:prstGeom>
+            <a:solidFill>
+              <a:schemeClr val="accent6">
+                <a:lumMod val="75000"/>
+              </a:schemeClr>
+            </a:solidFill>
+            <a:ln>
+              <a:solidFill>
+                <a:schemeClr val="tx1"/>
+              </a:solidFill>
+            </a:ln>
+          </p:spPr>
+          <p:style>
+            <a:lnRef idx="2">
+              <a:schemeClr val="accent1">
+                <a:shade val="50000"/>
+              </a:schemeClr>
+            </a:lnRef>
+            <a:fillRef idx="1">
+              <a:schemeClr val="accent1"/>
+            </a:fillRef>
+            <a:effectRef idx="0">
+              <a:schemeClr val="accent1"/>
+            </a:effectRef>
+            <a:fontRef idx="minor">
+              <a:schemeClr val="lt1"/>
+            </a:fontRef>
+          </p:style>
+          <p:txBody>
+            <a:bodyPr rtlCol="0" anchor="ctr"/>
+            <a:lstStyle/>
+            <a:p>
+              <a:pPr algn="ctr"/>
+              <a:r>
+                <a:rPr lang="en-AU" sz="2200" dirty="0"/>
+                <a:t>G</a:t>
+              </a:r>
+            </a:p>
+          </p:txBody>
+        </p:sp>
+        <p:sp>
+          <p:nvSpPr>
+            <p:cNvPr id="131" name="Rectangle: Rounded Corners 130">
+              <a:extLst>
+                <a:ext uri="{FF2B5EF4-FFF2-40B4-BE49-F238E27FC236}">
+                  <a16:creationId xmlns:a16="http://schemas.microsoft.com/office/drawing/2014/main" id="{4A6DFDE1-3B02-4EBD-A204-891EE4CF94F7}"/>
+                </a:ext>
+              </a:extLst>
+            </p:cNvPr>
+            <p:cNvSpPr/>
+            <p:nvPr/>
+          </p:nvSpPr>
+          <p:spPr>
+            <a:xfrm>
+              <a:off x="9153785" y="3594420"/>
+              <a:ext cx="288000" cy="287908"/>
+            </a:xfrm>
+            <a:prstGeom prst="roundRect">
+              <a:avLst/>
+            </a:prstGeom>
+            <a:solidFill>
+              <a:srgbClr val="C00000"/>
+            </a:solidFill>
+            <a:ln>
+              <a:solidFill>
+                <a:schemeClr val="tx1"/>
+              </a:solidFill>
+            </a:ln>
+          </p:spPr>
+          <p:style>
+            <a:lnRef idx="2">
+              <a:schemeClr val="accent1">
+                <a:shade val="50000"/>
+              </a:schemeClr>
+            </a:lnRef>
+            <a:fillRef idx="1">
+              <a:schemeClr val="accent1"/>
+            </a:fillRef>
+            <a:effectRef idx="0">
+              <a:schemeClr val="accent1"/>
+            </a:effectRef>
+            <a:fontRef idx="minor">
+              <a:schemeClr val="lt1"/>
+            </a:fontRef>
+          </p:style>
+          <p:txBody>
+            <a:bodyPr rtlCol="0" anchor="ctr"/>
+            <a:lstStyle/>
+            <a:p>
+              <a:pPr algn="ctr"/>
+              <a:r>
+                <a:rPr lang="en-AU" sz="2200" dirty="0"/>
+                <a:t>R</a:t>
+              </a:r>
+            </a:p>
+          </p:txBody>
+        </p:sp>
+        <p:sp>
+          <p:nvSpPr>
+            <p:cNvPr id="132" name="Rectangle: Rounded Corners 131">
+              <a:extLst>
+                <a:ext uri="{FF2B5EF4-FFF2-40B4-BE49-F238E27FC236}">
+                  <a16:creationId xmlns:a16="http://schemas.microsoft.com/office/drawing/2014/main" id="{3712C768-CC24-4B37-99B4-4ACE422CDD03}"/>
+                </a:ext>
+              </a:extLst>
+            </p:cNvPr>
+            <p:cNvSpPr/>
+            <p:nvPr/>
+          </p:nvSpPr>
+          <p:spPr>
+            <a:xfrm>
+              <a:off x="8382733" y="3560707"/>
+              <a:ext cx="1450250" cy="348253"/>
+            </a:xfrm>
+            <a:prstGeom prst="roundRect">
+              <a:avLst/>
+            </a:prstGeom>
+            <a:noFill/>
+            <a:ln w="28575">
+              <a:solidFill>
+                <a:srgbClr val="FF0000"/>
+              </a:solidFill>
+            </a:ln>
+          </p:spPr>
+          <p:style>
+            <a:lnRef idx="2">
+              <a:schemeClr val="accent1">
+                <a:shade val="50000"/>
+              </a:schemeClr>
+            </a:lnRef>
+            <a:fillRef idx="1">
+              <a:schemeClr val="accent1"/>
+            </a:fillRef>
+            <a:effectRef idx="0">
+              <a:schemeClr val="accent1"/>
+            </a:effectRef>
+            <a:fontRef idx="minor">
+              <a:schemeClr val="lt1"/>
+            </a:fontRef>
+          </p:style>
+          <p:txBody>
+            <a:bodyPr rtlCol="0" anchor="ctr"/>
+            <a:lstStyle/>
+            <a:p>
+              <a:pPr algn="ctr"/>
+              <a:endParaRPr lang="en-AU"/>
+            </a:p>
+          </p:txBody>
+        </p:sp>
+        <p:sp>
+          <p:nvSpPr>
+            <p:cNvPr id="133" name="TextBox 132">
+              <a:extLst>
+                <a:ext uri="{FF2B5EF4-FFF2-40B4-BE49-F238E27FC236}">
+                  <a16:creationId xmlns:a16="http://schemas.microsoft.com/office/drawing/2014/main" id="{0B335F76-2DA9-4667-A65C-129EE9AA4586}"/>
+                </a:ext>
+              </a:extLst>
+            </p:cNvPr>
+            <p:cNvSpPr txBox="1"/>
+            <p:nvPr/>
+          </p:nvSpPr>
+          <p:spPr>
+            <a:xfrm>
+              <a:off x="8353330" y="3179269"/>
+              <a:ext cx="345221" cy="1107996"/>
+            </a:xfrm>
+            <a:prstGeom prst="rect">
+              <a:avLst/>
+            </a:prstGeom>
+            <a:noFill/>
+          </p:spPr>
+          <p:txBody>
+            <a:bodyPr wrap="square" rtlCol="0">
+              <a:spAutoFit/>
+            </a:bodyPr>
+            <a:lstStyle/>
+            <a:p>
+              <a:pPr algn="r"/>
+              <a:r>
+                <a:rPr lang="en-AU" sz="2200" dirty="0"/>
+                <a:t>1</a:t>
+              </a:r>
+            </a:p>
+            <a:p>
+              <a:pPr algn="r"/>
+              <a:r>
+                <a:rPr lang="en-US" sz="2200" dirty="0"/>
+                <a:t>2</a:t>
+              </a:r>
+              <a:endParaRPr lang="en-AU" sz="2200" dirty="0"/>
+            </a:p>
+            <a:p>
+              <a:pPr algn="r"/>
+              <a:r>
+                <a:rPr lang="en-US" sz="2200" dirty="0"/>
+                <a:t>3</a:t>
+              </a:r>
+              <a:endParaRPr lang="en-AU" sz="2200" dirty="0"/>
+            </a:p>
+          </p:txBody>
+        </p:sp>
+      </p:grpSp>
+      <p:sp>
+        <p:nvSpPr>
+          <p:cNvPr id="59" name="TextBox 58">
+            <a:extLst>
+              <a:ext uri="{FF2B5EF4-FFF2-40B4-BE49-F238E27FC236}">
+                <a16:creationId xmlns:a16="http://schemas.microsoft.com/office/drawing/2014/main" id="{831546AB-E192-4C57-A768-4A900A5FD241}"/>
+              </a:ext>
+            </a:extLst>
+          </p:cNvPr>
+          <p:cNvSpPr txBox="1"/>
+          <p:nvPr/>
+        </p:nvSpPr>
+        <p:spPr>
+          <a:xfrm>
+            <a:off x="-5213484" y="856596"/>
+            <a:ext cx="3312000" cy="1200329"/>
+          </a:xfrm>
+          <a:prstGeom prst="rect">
+            <a:avLst/>
+          </a:prstGeom>
+          <a:noFill/>
+        </p:spPr>
+        <p:txBody>
+          <a:bodyPr wrap="square" rtlCol="0">
+            <a:spAutoFit/>
+          </a:bodyPr>
+          <a:lstStyle/>
+          <a:p>
+            <a:pPr marL="285750" indent="-285750">
+              <a:buFont typeface="Arial" panose="020B0604020202020204" pitchFamily="34" charset="0"/>
+              <a:buChar char="•"/>
+            </a:pPr>
+            <a:r>
+              <a:rPr lang="en-AU" dirty="0"/>
+              <a:t>Set the factor</a:t>
+            </a:r>
+          </a:p>
+          <a:p>
+            <a:r>
+              <a:rPr lang="en-AU" dirty="0"/>
+              <a:t>1 + (8 - 1) mod 3 = </a:t>
+            </a:r>
+          </a:p>
+          <a:p>
+            <a:r>
+              <a:rPr lang="en-AU" dirty="0"/>
+              <a:t>Permutation 2;</a:t>
+            </a:r>
+          </a:p>
+          <a:p>
+            <a:r>
+              <a:rPr lang="en-AU" dirty="0"/>
+              <a:t>Grand, Radial, PCA</a:t>
+            </a:r>
+          </a:p>
+        </p:txBody>
+      </p:sp>
+      <p:grpSp>
+        <p:nvGrpSpPr>
+          <p:cNvPr id="60" name="Group 59">
+            <a:extLst>
+              <a:ext uri="{FF2B5EF4-FFF2-40B4-BE49-F238E27FC236}">
+                <a16:creationId xmlns:a16="http://schemas.microsoft.com/office/drawing/2014/main" id="{AA79ADA1-A8C5-4667-B52D-512422972C79}"/>
+              </a:ext>
+            </a:extLst>
+          </p:cNvPr>
+          <p:cNvGrpSpPr/>
+          <p:nvPr/>
+        </p:nvGrpSpPr>
+        <p:grpSpPr>
+          <a:xfrm>
+            <a:off x="-3579621" y="2048132"/>
+            <a:ext cx="2202533" cy="1829206"/>
+            <a:chOff x="9656478" y="836478"/>
+            <a:chExt cx="2202533" cy="1829206"/>
+          </a:xfrm>
+        </p:grpSpPr>
+        <p:sp>
+          <p:nvSpPr>
+            <p:cNvPr id="77" name="TextBox 76">
+              <a:extLst>
+                <a:ext uri="{FF2B5EF4-FFF2-40B4-BE49-F238E27FC236}">
+                  <a16:creationId xmlns:a16="http://schemas.microsoft.com/office/drawing/2014/main" id="{91B86578-4FDF-4D9E-B3CC-EF8D727EBB15}"/>
+                </a:ext>
+              </a:extLst>
+            </p:cNvPr>
+            <p:cNvSpPr txBox="1"/>
+            <p:nvPr/>
+          </p:nvSpPr>
+          <p:spPr>
+            <a:xfrm>
+              <a:off x="9656478" y="836478"/>
+              <a:ext cx="1738102" cy="707886"/>
+            </a:xfrm>
+            <a:prstGeom prst="rect">
+              <a:avLst/>
+            </a:prstGeom>
+            <a:noFill/>
+          </p:spPr>
+          <p:txBody>
+            <a:bodyPr wrap="square" rtlCol="0">
+              <a:spAutoFit/>
+            </a:bodyPr>
+            <a:lstStyle/>
+            <a:p>
+              <a:pPr algn="r"/>
+              <a:r>
+                <a:rPr lang="en-AU" sz="2000" dirty="0"/>
+                <a:t>Location </a:t>
+              </a:r>
+            </a:p>
+            <a:p>
+              <a:pPr algn="r"/>
+              <a:r>
+                <a:rPr lang="en-AU" sz="2000" dirty="0"/>
+                <a:t>permutations</a:t>
+              </a:r>
+            </a:p>
+          </p:txBody>
+        </p:sp>
+        <p:cxnSp>
+          <p:nvCxnSpPr>
+            <p:cNvPr id="111" name="Straight Connector 110">
+              <a:extLst>
+                <a:ext uri="{FF2B5EF4-FFF2-40B4-BE49-F238E27FC236}">
+                  <a16:creationId xmlns:a16="http://schemas.microsoft.com/office/drawing/2014/main" id="{2D352D1F-F6FB-4777-B860-637C2659210A}"/>
+                </a:ext>
+              </a:extLst>
+            </p:cNvPr>
+            <p:cNvCxnSpPr>
+              <a:cxnSpLocks/>
+            </p:cNvCxnSpPr>
+            <p:nvPr/>
+          </p:nvCxnSpPr>
+          <p:spPr>
+            <a:xfrm>
+              <a:off x="9784401" y="1557688"/>
+              <a:ext cx="2074610" cy="5517"/>
+            </a:xfrm>
+            <a:prstGeom prst="line">
+              <a:avLst/>
+            </a:prstGeom>
+            <a:ln w="28575">
+              <a:solidFill>
+                <a:schemeClr val="tx1"/>
+              </a:solidFill>
+            </a:ln>
+          </p:spPr>
+          <p:style>
+            <a:lnRef idx="1">
+              <a:schemeClr val="accent1"/>
+            </a:lnRef>
+            <a:fillRef idx="0">
+              <a:schemeClr val="accent1"/>
+            </a:fillRef>
+            <a:effectRef idx="0">
+              <a:schemeClr val="accent1"/>
+            </a:effectRef>
+            <a:fontRef idx="minor">
+              <a:schemeClr val="tx1"/>
+            </a:fontRef>
+          </p:style>
+        </p:cxnSp>
+        <p:cxnSp>
+          <p:nvCxnSpPr>
+            <p:cNvPr id="113" name="Straight Connector 112">
+              <a:extLst>
+                <a:ext uri="{FF2B5EF4-FFF2-40B4-BE49-F238E27FC236}">
+                  <a16:creationId xmlns:a16="http://schemas.microsoft.com/office/drawing/2014/main" id="{2B78ADE3-3F59-41D7-849E-E2CAE7B3B6C2}"/>
+                </a:ext>
+              </a:extLst>
+            </p:cNvPr>
+            <p:cNvCxnSpPr>
+              <a:cxnSpLocks/>
+            </p:cNvCxnSpPr>
+            <p:nvPr/>
+          </p:nvCxnSpPr>
+          <p:spPr>
+            <a:xfrm flipH="1" flipV="1">
+              <a:off x="11410615" y="843232"/>
+              <a:ext cx="1" cy="1805619"/>
+            </a:xfrm>
+            <a:prstGeom prst="line">
+              <a:avLst/>
+            </a:prstGeom>
+            <a:ln w="28575">
+              <a:solidFill>
+                <a:schemeClr val="tx1"/>
+              </a:solidFill>
+            </a:ln>
+          </p:spPr>
+          <p:style>
+            <a:lnRef idx="1">
+              <a:schemeClr val="accent1"/>
+            </a:lnRef>
+            <a:fillRef idx="0">
+              <a:schemeClr val="accent1"/>
+            </a:fillRef>
+            <a:effectRef idx="0">
+              <a:schemeClr val="accent1"/>
+            </a:effectRef>
+            <a:fontRef idx="minor">
+              <a:schemeClr val="tx1"/>
+            </a:fontRef>
+          </p:style>
+        </p:cxnSp>
+        <p:sp>
+          <p:nvSpPr>
+            <p:cNvPr id="114" name="Rectangle: Rounded Corners 113">
+              <a:extLst>
+                <a:ext uri="{FF2B5EF4-FFF2-40B4-BE49-F238E27FC236}">
+                  <a16:creationId xmlns:a16="http://schemas.microsoft.com/office/drawing/2014/main" id="{B8ADF89F-E92D-4015-A3B6-BF540B034E61}"/>
+                </a:ext>
+              </a:extLst>
+            </p:cNvPr>
+            <p:cNvSpPr/>
+            <p:nvPr/>
+          </p:nvSpPr>
+          <p:spPr>
+            <a:xfrm>
+              <a:off x="11509884" y="1628880"/>
+              <a:ext cx="288000" cy="288000"/>
+            </a:xfrm>
+            <a:prstGeom prst="roundRect">
+              <a:avLst/>
+            </a:prstGeom>
+            <a:solidFill>
+              <a:srgbClr val="7030A0"/>
+            </a:solidFill>
+            <a:ln>
+              <a:solidFill>
+                <a:schemeClr val="tx1"/>
+              </a:solidFill>
+            </a:ln>
+          </p:spPr>
+          <p:style>
+            <a:lnRef idx="2">
+              <a:schemeClr val="accent2">
+                <a:shade val="50000"/>
+              </a:schemeClr>
+            </a:lnRef>
+            <a:fillRef idx="1">
+              <a:schemeClr val="accent2"/>
+            </a:fillRef>
+            <a:effectRef idx="0">
+              <a:schemeClr val="accent2"/>
+            </a:effectRef>
+            <a:fontRef idx="minor">
+              <a:schemeClr val="lt1"/>
+            </a:fontRef>
+          </p:style>
+          <p:txBody>
+            <a:bodyPr rtlCol="0" anchor="ctr"/>
+            <a:lstStyle/>
+            <a:p>
+              <a:pPr algn="ctr"/>
+              <a:r>
+                <a:rPr lang="en-US" sz="2200" dirty="0"/>
+                <a:t>1</a:t>
+              </a:r>
+              <a:endParaRPr lang="en-AU" sz="2200" dirty="0"/>
+            </a:p>
+          </p:txBody>
+        </p:sp>
+        <p:sp>
+          <p:nvSpPr>
+            <p:cNvPr id="115" name="Rectangle: Rounded Corners 114">
+              <a:extLst>
+                <a:ext uri="{FF2B5EF4-FFF2-40B4-BE49-F238E27FC236}">
+                  <a16:creationId xmlns:a16="http://schemas.microsoft.com/office/drawing/2014/main" id="{9EB6C7DD-E19E-4E3B-87BA-F9BA893758F8}"/>
+                </a:ext>
+              </a:extLst>
+            </p:cNvPr>
+            <p:cNvSpPr/>
+            <p:nvPr/>
+          </p:nvSpPr>
+          <p:spPr>
+            <a:xfrm>
+              <a:off x="11509883" y="1962266"/>
+              <a:ext cx="288000" cy="288000"/>
+            </a:xfrm>
+            <a:prstGeom prst="roundRect">
+              <a:avLst/>
+            </a:prstGeom>
+            <a:solidFill>
+              <a:schemeClr val="accent6">
+                <a:lumMod val="75000"/>
+              </a:schemeClr>
+            </a:solidFill>
+            <a:ln>
+              <a:solidFill>
+                <a:schemeClr val="tx1"/>
+              </a:solidFill>
+            </a:ln>
+          </p:spPr>
+          <p:style>
+            <a:lnRef idx="2">
+              <a:schemeClr val="accent1">
+                <a:shade val="50000"/>
+              </a:schemeClr>
+            </a:lnRef>
+            <a:fillRef idx="1">
+              <a:schemeClr val="accent1"/>
+            </a:fillRef>
+            <a:effectRef idx="0">
+              <a:schemeClr val="accent1"/>
+            </a:effectRef>
+            <a:fontRef idx="minor">
+              <a:schemeClr val="lt1"/>
+            </a:fontRef>
+          </p:style>
+          <p:txBody>
+            <a:bodyPr rtlCol="0" anchor="ctr"/>
+            <a:lstStyle/>
+            <a:p>
+              <a:pPr algn="ctr"/>
+              <a:r>
+                <a:rPr lang="en-US" sz="2200" dirty="0"/>
+                <a:t>2</a:t>
+              </a:r>
+              <a:endParaRPr lang="en-AU" sz="2200" dirty="0"/>
+            </a:p>
+          </p:txBody>
+        </p:sp>
+        <p:sp>
+          <p:nvSpPr>
+            <p:cNvPr id="116" name="Rectangle: Rounded Corners 115">
+              <a:extLst>
+                <a:ext uri="{FF2B5EF4-FFF2-40B4-BE49-F238E27FC236}">
+                  <a16:creationId xmlns:a16="http://schemas.microsoft.com/office/drawing/2014/main" id="{97A36D9D-9B90-4B95-AFD0-D64EB1F581FA}"/>
+                </a:ext>
+              </a:extLst>
+            </p:cNvPr>
+            <p:cNvSpPr/>
+            <p:nvPr/>
+          </p:nvSpPr>
+          <p:spPr>
+            <a:xfrm>
+              <a:off x="11509758" y="2294070"/>
+              <a:ext cx="288000" cy="288000"/>
+            </a:xfrm>
+            <a:prstGeom prst="roundRect">
+              <a:avLst/>
+            </a:prstGeom>
+            <a:solidFill>
+              <a:srgbClr val="C00000"/>
+            </a:solidFill>
+            <a:ln>
+              <a:solidFill>
+                <a:schemeClr val="tx1"/>
+              </a:solidFill>
+            </a:ln>
+          </p:spPr>
+          <p:style>
+            <a:lnRef idx="2">
+              <a:schemeClr val="accent1">
+                <a:shade val="50000"/>
+              </a:schemeClr>
+            </a:lnRef>
+            <a:fillRef idx="1">
+              <a:schemeClr val="accent1"/>
+            </a:fillRef>
+            <a:effectRef idx="0">
+              <a:schemeClr val="accent1"/>
+            </a:effectRef>
+            <a:fontRef idx="minor">
+              <a:schemeClr val="lt1"/>
+            </a:fontRef>
+          </p:style>
+          <p:txBody>
+            <a:bodyPr rtlCol="0" anchor="ctr"/>
+            <a:lstStyle/>
+            <a:p>
+              <a:pPr algn="ctr"/>
+              <a:r>
+                <a:rPr lang="en-US" sz="2200" dirty="0"/>
+                <a:t>3</a:t>
+              </a:r>
+              <a:endParaRPr lang="en-AU" sz="2200" dirty="0"/>
+            </a:p>
+          </p:txBody>
+        </p:sp>
+        <p:sp>
+          <p:nvSpPr>
+            <p:cNvPr id="117" name="Rectangle: Rounded Corners 116">
+              <a:extLst>
+                <a:ext uri="{FF2B5EF4-FFF2-40B4-BE49-F238E27FC236}">
+                  <a16:creationId xmlns:a16="http://schemas.microsoft.com/office/drawing/2014/main" id="{9AADF17B-1F92-4C71-BCF2-3D00B790CBB7}"/>
+                </a:ext>
+              </a:extLst>
+            </p:cNvPr>
+            <p:cNvSpPr/>
+            <p:nvPr/>
+          </p:nvSpPr>
+          <p:spPr>
+            <a:xfrm>
+              <a:off x="11138106" y="2269089"/>
+              <a:ext cx="720905" cy="338026"/>
+            </a:xfrm>
+            <a:prstGeom prst="roundRect">
+              <a:avLst/>
+            </a:prstGeom>
+            <a:noFill/>
+            <a:ln w="28575">
+              <a:solidFill>
+                <a:srgbClr val="FF0000"/>
+              </a:solidFill>
+            </a:ln>
+          </p:spPr>
+          <p:style>
+            <a:lnRef idx="2">
+              <a:schemeClr val="accent1">
+                <a:shade val="50000"/>
+              </a:schemeClr>
+            </a:lnRef>
+            <a:fillRef idx="1">
+              <a:schemeClr val="accent1"/>
+            </a:fillRef>
+            <a:effectRef idx="0">
+              <a:schemeClr val="accent1"/>
+            </a:effectRef>
+            <a:fontRef idx="minor">
+              <a:schemeClr val="lt1"/>
+            </a:fontRef>
+          </p:style>
+          <p:txBody>
+            <a:bodyPr rtlCol="0" anchor="ctr"/>
+            <a:lstStyle/>
+            <a:p>
+              <a:pPr algn="ctr"/>
+              <a:endParaRPr lang="en-AU"/>
+            </a:p>
+          </p:txBody>
+        </p:sp>
+        <p:sp>
+          <p:nvSpPr>
+            <p:cNvPr id="118" name="TextBox 117">
+              <a:extLst>
+                <a:ext uri="{FF2B5EF4-FFF2-40B4-BE49-F238E27FC236}">
+                  <a16:creationId xmlns:a16="http://schemas.microsoft.com/office/drawing/2014/main" id="{BD8660AA-A3FF-49E3-B8D8-727A997A96EC}"/>
+                </a:ext>
+              </a:extLst>
+            </p:cNvPr>
+            <p:cNvSpPr txBox="1"/>
+            <p:nvPr/>
+          </p:nvSpPr>
+          <p:spPr>
+            <a:xfrm>
+              <a:off x="11088199" y="1557688"/>
+              <a:ext cx="345221" cy="1107996"/>
+            </a:xfrm>
+            <a:prstGeom prst="rect">
+              <a:avLst/>
+            </a:prstGeom>
+            <a:noFill/>
+          </p:spPr>
+          <p:txBody>
+            <a:bodyPr wrap="square" rtlCol="0">
+              <a:spAutoFit/>
+            </a:bodyPr>
+            <a:lstStyle/>
+            <a:p>
+              <a:pPr algn="r"/>
+              <a:r>
+                <a:rPr lang="en-AU" sz="2200" dirty="0"/>
+                <a:t>1</a:t>
+              </a:r>
+            </a:p>
+            <a:p>
+              <a:pPr algn="r"/>
+              <a:r>
+                <a:rPr lang="en-US" sz="2200" dirty="0"/>
+                <a:t>2</a:t>
+              </a:r>
+              <a:endParaRPr lang="en-AU" sz="2200" dirty="0"/>
+            </a:p>
+            <a:p>
+              <a:pPr algn="r"/>
+              <a:r>
+                <a:rPr lang="en-US" sz="2200" dirty="0"/>
+                <a:t>3</a:t>
+              </a:r>
+              <a:endParaRPr lang="en-AU" sz="2200" dirty="0"/>
+            </a:p>
+          </p:txBody>
+        </p:sp>
+      </p:grpSp>
+      <p:sp>
+        <p:nvSpPr>
+          <p:cNvPr id="61" name="TextBox 60">
+            <a:extLst>
+              <a:ext uri="{FF2B5EF4-FFF2-40B4-BE49-F238E27FC236}">
+                <a16:creationId xmlns:a16="http://schemas.microsoft.com/office/drawing/2014/main" id="{B67979E6-A98C-49CB-B123-1248487AE118}"/>
+              </a:ext>
+            </a:extLst>
+          </p:cNvPr>
+          <p:cNvSpPr txBox="1"/>
+          <p:nvPr/>
+        </p:nvSpPr>
+        <p:spPr>
+          <a:xfrm>
+            <a:off x="-5123550" y="2763072"/>
+            <a:ext cx="3312000" cy="1200329"/>
+          </a:xfrm>
+          <a:prstGeom prst="rect">
+            <a:avLst/>
+          </a:prstGeom>
+          <a:noFill/>
+        </p:spPr>
+        <p:txBody>
+          <a:bodyPr wrap="square" rtlCol="0">
+            <a:spAutoFit/>
+          </a:bodyPr>
+          <a:lstStyle/>
+          <a:p>
+            <a:pPr marL="285750" indent="-285750">
+              <a:buFont typeface="Arial" panose="020B0604020202020204" pitchFamily="34" charset="0"/>
+              <a:buChar char="•"/>
+            </a:pPr>
+            <a:r>
+              <a:rPr lang="en-US" dirty="0"/>
+              <a:t>Set location</a:t>
+            </a:r>
+          </a:p>
+          <a:p>
+            <a:r>
+              <a:rPr lang="en-US" dirty="0"/>
+              <a:t>1 + floor((</a:t>
+            </a:r>
+            <a:r>
+              <a:rPr lang="en-US" b="1" dirty="0"/>
+              <a:t>8 </a:t>
+            </a:r>
+            <a:r>
+              <a:rPr lang="en-US" dirty="0"/>
+              <a:t>– 1)</a:t>
+            </a:r>
+            <a:r>
+              <a:rPr lang="en-US" b="1" dirty="0"/>
+              <a:t> </a:t>
+            </a:r>
+            <a:r>
+              <a:rPr lang="en-US" dirty="0"/>
+              <a:t>/ 3) mod 3 = </a:t>
+            </a:r>
+          </a:p>
+          <a:p>
+            <a:r>
+              <a:rPr lang="en-US" dirty="0"/>
+              <a:t>Permutation 3;</a:t>
+            </a:r>
+            <a:endParaRPr lang="en-AU" dirty="0"/>
+          </a:p>
+          <a:p>
+            <a:r>
+              <a:rPr lang="en-AU" dirty="0"/>
+              <a:t>50% / 50%</a:t>
+            </a:r>
+            <a:endParaRPr lang="en-US" dirty="0"/>
+          </a:p>
+        </p:txBody>
+      </p:sp>
+      <p:sp>
+        <p:nvSpPr>
+          <p:cNvPr id="62" name="TextBox 61">
+            <a:extLst>
+              <a:ext uri="{FF2B5EF4-FFF2-40B4-BE49-F238E27FC236}">
+                <a16:creationId xmlns:a16="http://schemas.microsoft.com/office/drawing/2014/main" id="{965BD763-DC86-4B2F-9D69-74CCCFA4F499}"/>
+              </a:ext>
+            </a:extLst>
+          </p:cNvPr>
+          <p:cNvSpPr txBox="1"/>
+          <p:nvPr/>
+        </p:nvSpPr>
+        <p:spPr>
+          <a:xfrm>
+            <a:off x="-5161477" y="4597834"/>
+            <a:ext cx="3312000" cy="1200329"/>
+          </a:xfrm>
+          <a:prstGeom prst="rect">
+            <a:avLst/>
+          </a:prstGeom>
+          <a:noFill/>
+        </p:spPr>
+        <p:txBody>
+          <a:bodyPr wrap="square" rtlCol="0">
+            <a:spAutoFit/>
+          </a:bodyPr>
+          <a:lstStyle/>
+          <a:p>
+            <a:pPr marL="285750" indent="-285750">
+              <a:buFont typeface="Arial" panose="020B0604020202020204" pitchFamily="34" charset="0"/>
+              <a:buChar char="•"/>
+            </a:pPr>
+            <a:r>
+              <a:rPr lang="en-US" dirty="0"/>
+              <a:t>Set VC order</a:t>
+            </a:r>
+          </a:p>
+          <a:p>
+            <a:r>
+              <a:rPr lang="en-US" dirty="0"/>
+              <a:t>1 + floor(</a:t>
+            </a:r>
+            <a:r>
+              <a:rPr lang="en-US" b="1" dirty="0"/>
+              <a:t>8 </a:t>
+            </a:r>
+            <a:r>
+              <a:rPr lang="en-US" dirty="0"/>
+              <a:t>/ 9) mod 6 = </a:t>
+            </a:r>
+          </a:p>
+          <a:p>
+            <a:r>
+              <a:rPr lang="en-US" dirty="0"/>
+              <a:t>Permutation 2;</a:t>
+            </a:r>
+          </a:p>
+          <a:p>
+            <a:r>
+              <a:rPr lang="en-US" dirty="0"/>
+              <a:t>EEE, banana</a:t>
+            </a:r>
+            <a:endParaRPr lang="en-AU" dirty="0"/>
+          </a:p>
+        </p:txBody>
+      </p:sp>
       <p:sp>
         <p:nvSpPr>
           <p:cNvPr id="161" name="Rectangle: Rounded Corners 160">

</xml_diff>

<commit_message>
simplifed signif testing, reformated images, better figure dim.
</commit_message>
<xml_diff>
--- a/paper/figures/Experimental design graphics.pptx
+++ b/paper/figures/Experimental design graphics.pptx
@@ -229,7 +229,7 @@
           <a:p>
             <a:fld id="{63BE0782-7791-4644-B82B-E7A5926EFCBC}" type="datetimeFigureOut">
               <a:rPr lang="en-US" smtClean="0"/>
-              <a:t>26-Mar-21</a:t>
+              <a:t>09-Apr-21</a:t>
             </a:fld>
             <a:endParaRPr lang="en-US"/>
           </a:p>
@@ -729,7 +729,7 @@
           <a:p>
             <a:fld id="{B25803F7-6624-424E-B78C-2F27C4BCE53D}" type="datetimeFigureOut">
               <a:rPr lang="en-AU" smtClean="0"/>
-              <a:t>26/03/2021</a:t>
+              <a:t>9/04/2021</a:t>
             </a:fld>
             <a:endParaRPr lang="en-AU"/>
           </a:p>
@@ -929,7 +929,7 @@
           <a:p>
             <a:fld id="{B25803F7-6624-424E-B78C-2F27C4BCE53D}" type="datetimeFigureOut">
               <a:rPr lang="en-AU" smtClean="0"/>
-              <a:t>26/03/2021</a:t>
+              <a:t>9/04/2021</a:t>
             </a:fld>
             <a:endParaRPr lang="en-AU"/>
           </a:p>
@@ -1139,7 +1139,7 @@
           <a:p>
             <a:fld id="{B25803F7-6624-424E-B78C-2F27C4BCE53D}" type="datetimeFigureOut">
               <a:rPr lang="en-AU" smtClean="0"/>
-              <a:t>26/03/2021</a:t>
+              <a:t>9/04/2021</a:t>
             </a:fld>
             <a:endParaRPr lang="en-AU"/>
           </a:p>
@@ -1339,7 +1339,7 @@
           <a:p>
             <a:fld id="{B25803F7-6624-424E-B78C-2F27C4BCE53D}" type="datetimeFigureOut">
               <a:rPr lang="en-AU" smtClean="0"/>
-              <a:t>26/03/2021</a:t>
+              <a:t>9/04/2021</a:t>
             </a:fld>
             <a:endParaRPr lang="en-AU"/>
           </a:p>
@@ -1615,7 +1615,7 @@
           <a:p>
             <a:fld id="{B25803F7-6624-424E-B78C-2F27C4BCE53D}" type="datetimeFigureOut">
               <a:rPr lang="en-AU" smtClean="0"/>
-              <a:t>26/03/2021</a:t>
+              <a:t>9/04/2021</a:t>
             </a:fld>
             <a:endParaRPr lang="en-AU"/>
           </a:p>
@@ -1883,7 +1883,7 @@
           <a:p>
             <a:fld id="{B25803F7-6624-424E-B78C-2F27C4BCE53D}" type="datetimeFigureOut">
               <a:rPr lang="en-AU" smtClean="0"/>
-              <a:t>26/03/2021</a:t>
+              <a:t>9/04/2021</a:t>
             </a:fld>
             <a:endParaRPr lang="en-AU"/>
           </a:p>
@@ -2298,7 +2298,7 @@
           <a:p>
             <a:fld id="{B25803F7-6624-424E-B78C-2F27C4BCE53D}" type="datetimeFigureOut">
               <a:rPr lang="en-AU" smtClean="0"/>
-              <a:t>26/03/2021</a:t>
+              <a:t>9/04/2021</a:t>
             </a:fld>
             <a:endParaRPr lang="en-AU"/>
           </a:p>
@@ -2440,7 +2440,7 @@
           <a:p>
             <a:fld id="{B25803F7-6624-424E-B78C-2F27C4BCE53D}" type="datetimeFigureOut">
               <a:rPr lang="en-AU" smtClean="0"/>
-              <a:t>26/03/2021</a:t>
+              <a:t>9/04/2021</a:t>
             </a:fld>
             <a:endParaRPr lang="en-AU"/>
           </a:p>
@@ -2553,7 +2553,7 @@
           <a:p>
             <a:fld id="{B25803F7-6624-424E-B78C-2F27C4BCE53D}" type="datetimeFigureOut">
               <a:rPr lang="en-AU" smtClean="0"/>
-              <a:t>26/03/2021</a:t>
+              <a:t>9/04/2021</a:t>
             </a:fld>
             <a:endParaRPr lang="en-AU"/>
           </a:p>
@@ -2866,7 +2866,7 @@
           <a:p>
             <a:fld id="{B25803F7-6624-424E-B78C-2F27C4BCE53D}" type="datetimeFigureOut">
               <a:rPr lang="en-AU" smtClean="0"/>
-              <a:t>26/03/2021</a:t>
+              <a:t>9/04/2021</a:t>
             </a:fld>
             <a:endParaRPr lang="en-AU"/>
           </a:p>
@@ -3155,7 +3155,7 @@
           <a:p>
             <a:fld id="{B25803F7-6624-424E-B78C-2F27C4BCE53D}" type="datetimeFigureOut">
               <a:rPr lang="en-AU" smtClean="0"/>
-              <a:t>26/03/2021</a:t>
+              <a:t>9/04/2021</a:t>
             </a:fld>
             <a:endParaRPr lang="en-AU"/>
           </a:p>
@@ -3398,7 +3398,7 @@
           <a:p>
             <a:fld id="{B25803F7-6624-424E-B78C-2F27C4BCE53D}" type="datetimeFigureOut">
               <a:rPr lang="en-AU" smtClean="0"/>
-              <a:t>26/03/2021</a:t>
+              <a:t>9/04/2021</a:t>
             </a:fld>
             <a:endParaRPr lang="en-AU"/>
           </a:p>
@@ -11881,7 +11881,7 @@
         <p:spPr>
           <a:xfrm>
             <a:off x="246217" y="133820"/>
-            <a:ext cx="7915904" cy="373554"/>
+            <a:ext cx="5430374" cy="373554"/>
           </a:xfrm>
         </p:spPr>
         <p:txBody>
@@ -11900,15 +11900,14 @@
               <a:rPr lang="en-AU" sz="1800" baseline="30000" dirty="0">
                 <a:latin typeface="+mn-lt"/>
               </a:rPr>
-              <a:t>rd</a:t>
+              <a:t>rd </a:t>
             </a:r>
             <a:r>
               <a:rPr lang="en-AU" sz="1800" dirty="0">
                 <a:latin typeface="+mn-lt"/>
               </a:rPr>
-              <a:t> participant,</a:t>
+              <a:t>participant,</a:t>
             </a:r>
-            <a:endParaRPr lang="en-AU" sz="2000" dirty="0"/>
           </a:p>
         </p:txBody>
       </p:sp>
@@ -12069,7 +12068,7 @@
               </a:pPr>
               <a:r>
                 <a:rPr lang="en-AU" dirty="0"/>
-                <a:t>Set the factor order</a:t>
+                <a:t>Set the factor order:</a:t>
               </a:r>
               <a:br>
                 <a:rPr lang="en-AU" dirty="0"/>
@@ -12091,14 +12090,14 @@
               </a:br>
               <a:r>
                 <a:rPr lang="en-AU" dirty="0"/>
-                <a:t>Permutation 4;</a:t>
+                <a:t>permutation 4;</a:t>
               </a:r>
               <a:br>
                 <a:rPr lang="en-AU" dirty="0"/>
               </a:br>
               <a:r>
                 <a:rPr lang="en-AU" dirty="0"/>
-                <a:t>Grand, PCA, Radial</a:t>
+                <a:t>grand, PCA, &amp; radial</a:t>
               </a:r>
             </a:p>
           </p:txBody>
@@ -13496,10 +13495,10 @@
         </p:nvGrpSpPr>
         <p:grpSpPr>
           <a:xfrm>
-            <a:off x="2840142" y="2117143"/>
-            <a:ext cx="3406458" cy="2776720"/>
-            <a:chOff x="4209209" y="2927787"/>
-            <a:chExt cx="3406458" cy="2776720"/>
+            <a:off x="2849860" y="3181120"/>
+            <a:ext cx="2233543" cy="1712743"/>
+            <a:chOff x="4218927" y="3991764"/>
+            <a:chExt cx="2233543" cy="1712743"/>
           </a:xfrm>
         </p:grpSpPr>
         <p:cxnSp>
@@ -13517,9 +13516,9 @@
             <p:nvPr/>
           </p:nvCxnSpPr>
           <p:spPr>
-            <a:xfrm flipV="1">
-              <a:off x="4381500" y="4029091"/>
-              <a:ext cx="3204355" cy="1"/>
+            <a:xfrm>
+              <a:off x="4381500" y="4029093"/>
+              <a:ext cx="2062283" cy="6337"/>
             </a:xfrm>
             <a:prstGeom prst="line">
               <a:avLst/>
@@ -13559,8 +13558,8 @@
           </p:nvCxnSpPr>
           <p:spPr>
             <a:xfrm flipV="1">
-              <a:off x="4378126" y="4018977"/>
-              <a:ext cx="3237541" cy="1685530"/>
+              <a:off x="4378126" y="4013493"/>
+              <a:ext cx="2074344" cy="1691014"/>
             </a:xfrm>
             <a:prstGeom prst="line">
               <a:avLst/>
@@ -13598,13 +13597,15 @@
           </p:nvSpPr>
           <p:spPr>
             <a:xfrm>
-              <a:off x="4209209" y="2927787"/>
-              <a:ext cx="2080219" cy="954107"/>
+              <a:off x="4444499" y="4402986"/>
+              <a:ext cx="1987027" cy="954107"/>
             </a:xfrm>
             <a:prstGeom prst="rect">
               <a:avLst/>
             </a:prstGeom>
-            <a:noFill/>
+            <a:solidFill>
+              <a:schemeClr val="bg1"/>
+            </a:solidFill>
           </p:spPr>
           <p:txBody>
             <a:bodyPr wrap="square" rtlCol="0">
@@ -13694,8 +13695,8 @@
         </p:nvSpPr>
         <p:spPr>
           <a:xfrm>
-            <a:off x="3035935" y="615678"/>
-            <a:ext cx="3365712" cy="1200329"/>
+            <a:off x="2776652" y="633617"/>
+            <a:ext cx="3556740" cy="1200329"/>
           </a:xfrm>
           <a:prstGeom prst="rect">
             <a:avLst/>
@@ -13714,7 +13715,7 @@
             </a:pPr>
             <a:r>
               <a:rPr lang="en-US" dirty="0"/>
-              <a:t>Set location order</a:t>
+              <a:t>Set location order:</a:t>
             </a:r>
             <a:br>
               <a:rPr lang="en-US" dirty="0"/>
@@ -13736,7 +13737,7 @@
             </a:br>
             <a:r>
               <a:rPr lang="en-US" dirty="0"/>
-              <a:t>Permutation 3;  0/100 33/67, 50/50 % noise/signal mix</a:t>
+              <a:t>permutation 3; 33/67, 50/50, &amp; 0/100 percent noise/signal mix</a:t>
             </a:r>
           </a:p>
         </p:txBody>
@@ -13755,7 +13756,7 @@
         </p:nvGrpSpPr>
         <p:grpSpPr>
           <a:xfrm>
-            <a:off x="4850597" y="1842762"/>
+            <a:off x="3852216" y="1842762"/>
             <a:ext cx="2819530" cy="3264740"/>
             <a:chOff x="7791450" y="2667189"/>
             <a:chExt cx="2819530" cy="3264740"/>
@@ -15155,14 +15156,14 @@
           <p:nvPr>
             <p:extLst>
               <p:ext uri="{D42A27DB-BD31-4B8C-83A1-F6EECF244321}">
-                <p14:modId xmlns:p14="http://schemas.microsoft.com/office/powerpoint/2010/main" val="3030650409"/>
+                <p14:modId xmlns:p14="http://schemas.microsoft.com/office/powerpoint/2010/main" val="1831068742"/>
               </p:ext>
             </p:extLst>
           </p:nvPr>
         </p:nvGraphicFramePr>
         <p:xfrm>
-          <a:off x="7848139" y="1990158"/>
-          <a:ext cx="2095027" cy="3005221"/>
+          <a:off x="6790931" y="1677841"/>
+          <a:ext cx="2651759" cy="3690353"/>
         </p:xfrm>
         <a:graphic>
           <a:graphicData uri="http://schemas.openxmlformats.org/drawingml/2006/table">
@@ -15171,42 +15172,42 @@
                 <a:tableStyleId>{BDBED569-4797-4DF1-A0F4-6AAB3CD982D8}</a:tableStyleId>
               </a:tblPr>
               <a:tblGrid>
-                <a:gridCol w="218257">
+                <a:gridCol w="276257">
                   <a:extLst>
                     <a:ext uri="{9D8B030D-6E8A-4147-A177-3AD203B41FA5}">
                       <a16:colId xmlns:a16="http://schemas.microsoft.com/office/drawing/2014/main" val="1841359131"/>
                     </a:ext>
                   </a:extLst>
                 </a:gridCol>
-                <a:gridCol w="419725">
+                <a:gridCol w="531262">
                   <a:extLst>
                     <a:ext uri="{9D8B030D-6E8A-4147-A177-3AD203B41FA5}">
                       <a16:colId xmlns:a16="http://schemas.microsoft.com/office/drawing/2014/main" val="4061565006"/>
                     </a:ext>
                   </a:extLst>
                 </a:gridCol>
-                <a:gridCol w="419725">
+                <a:gridCol w="531262">
                   <a:extLst>
                     <a:ext uri="{9D8B030D-6E8A-4147-A177-3AD203B41FA5}">
                       <a16:colId xmlns:a16="http://schemas.microsoft.com/office/drawing/2014/main" val="3005057591"/>
                     </a:ext>
                   </a:extLst>
                 </a:gridCol>
-                <a:gridCol w="365760">
+                <a:gridCol w="462958">
                   <a:extLst>
                     <a:ext uri="{9D8B030D-6E8A-4147-A177-3AD203B41FA5}">
                       <a16:colId xmlns:a16="http://schemas.microsoft.com/office/drawing/2014/main" val="2065147869"/>
                     </a:ext>
                   </a:extLst>
                 </a:gridCol>
-                <a:gridCol w="251835">
+                <a:gridCol w="318758">
                   <a:extLst>
                     <a:ext uri="{9D8B030D-6E8A-4147-A177-3AD203B41FA5}">
                       <a16:colId xmlns:a16="http://schemas.microsoft.com/office/drawing/2014/main" val="921480914"/>
                     </a:ext>
                   </a:extLst>
                 </a:gridCol>
-                <a:gridCol w="419725">
+                <a:gridCol w="531262">
                   <a:extLst>
                     <a:ext uri="{9D8B030D-6E8A-4147-A177-3AD203B41FA5}">
                       <a16:colId xmlns:a16="http://schemas.microsoft.com/office/drawing/2014/main" val="614184169"/>
@@ -15214,7 +15215,7 @@
                   </a:extLst>
                 </a:gridCol>
               </a:tblGrid>
-              <a:tr h="1554480">
+              <a:tr h="1724834">
                 <a:tc>
                   <a:txBody>
                     <a:bodyPr/>
@@ -15596,7 +15597,7 @@
                   </a:ext>
                 </a:extLst>
               </a:tr>
-              <a:tr h="184344">
+              <a:tr h="204547">
                 <a:tc>
                   <a:txBody>
                     <a:bodyPr/>
@@ -15604,7 +15605,7 @@
                     <a:p>
                       <a:pPr algn="l" rtl="0" fontAlgn="b"/>
                       <a:r>
-                        <a:rPr lang="en-AU" sz="1000" b="0" u="none" strike="noStrike" dirty="0">
+                        <a:rPr lang="en-AU" sz="1400" b="0" u="none" strike="noStrike" dirty="0">
                           <a:solidFill>
                             <a:srgbClr val="000000"/>
                           </a:solidFill>
@@ -15612,7 +15613,7 @@
                         </a:rPr>
                         <a:t>1</a:t>
                       </a:r>
-                      <a:endParaRPr lang="en-AU" sz="1000" b="0" i="0" u="none" strike="noStrike" dirty="0">
+                      <a:endParaRPr lang="en-AU" sz="1400" b="0" i="0" u="none" strike="noStrike" dirty="0">
                         <a:solidFill>
                           <a:srgbClr val="000000"/>
                         </a:solidFill>
@@ -15663,12 +15664,12 @@
                     <a:p>
                       <a:pPr algn="l" rtl="0" fontAlgn="b"/>
                       <a:r>
-                        <a:rPr lang="en-AU" sz="1000" u="none" strike="noStrike" dirty="0">
+                        <a:rPr lang="en-AU" sz="1400" u="none" strike="noStrike" dirty="0">
                           <a:effectLst/>
                         </a:rPr>
                         <a:t>Train 1</a:t>
                       </a:r>
-                      <a:endParaRPr lang="en-AU" sz="1000" b="0" i="0" u="none" strike="noStrike" dirty="0">
+                      <a:endParaRPr lang="en-AU" sz="1400" b="0" i="0" u="none" strike="noStrike" dirty="0">
                         <a:solidFill>
                           <a:srgbClr val="000000"/>
                         </a:solidFill>
@@ -15735,12 +15736,12 @@
                         <a:defRPr/>
                       </a:pPr>
                       <a:r>
-                        <a:rPr lang="en-AU" sz="1000" u="none" strike="noStrike" dirty="0">
+                        <a:rPr lang="en-AU" sz="1400" u="none" strike="noStrike" dirty="0">
                           <a:effectLst/>
                         </a:rPr>
                         <a:t>Grand</a:t>
                       </a:r>
-                      <a:endParaRPr lang="en-AU" sz="1000" b="0" i="0" u="none" strike="noStrike" dirty="0">
+                      <a:endParaRPr lang="en-AU" sz="1400" b="0" i="0" u="none" strike="noStrike" dirty="0">
                         <a:solidFill>
                           <a:srgbClr val="000000"/>
                         </a:solidFill>
@@ -15791,12 +15792,12 @@
                     <a:p>
                       <a:pPr algn="l" rtl="0" fontAlgn="b"/>
                       <a:r>
-                        <a:rPr lang="en-AU" sz="1000" u="none" strike="noStrike" dirty="0">
+                        <a:rPr lang="en-AU" sz="1400" u="none" strike="noStrike" dirty="0">
                           <a:effectLst/>
                         </a:rPr>
                         <a:t>0_1</a:t>
                       </a:r>
-                      <a:endParaRPr lang="en-AU" sz="1000" b="0" i="0" u="none" strike="noStrike" dirty="0">
+                      <a:endParaRPr lang="en-AU" sz="1400" b="0" i="0" u="none" strike="noStrike" dirty="0">
                         <a:solidFill>
                           <a:srgbClr val="000000"/>
                         </a:solidFill>
@@ -15847,12 +15848,12 @@
                     <a:p>
                       <a:pPr algn="l" rtl="0" fontAlgn="b"/>
                       <a:r>
-                        <a:rPr lang="en-AU" sz="1000" u="none" strike="noStrike" dirty="0">
+                        <a:rPr lang="en-AU" sz="1400" u="none" strike="noStrike" dirty="0">
                           <a:effectLst/>
                         </a:rPr>
                         <a:t>EEE</a:t>
                       </a:r>
-                      <a:endParaRPr lang="en-AU" sz="1000" b="0" i="0" u="none" strike="noStrike" dirty="0">
+                      <a:endParaRPr lang="en-AU" sz="1400" b="0" i="0" u="none" strike="noStrike" dirty="0">
                         <a:solidFill>
                           <a:srgbClr val="000000"/>
                         </a:solidFill>
@@ -15903,12 +15904,12 @@
                     <a:p>
                       <a:pPr algn="l" rtl="0" fontAlgn="b"/>
                       <a:r>
-                        <a:rPr lang="en-AU" sz="1000" u="none" strike="noStrike" dirty="0">
+                        <a:rPr lang="en-AU" sz="1400" u="none" strike="noStrike" dirty="0">
                           <a:effectLst/>
                         </a:rPr>
                         <a:t>4 (3cl)</a:t>
                       </a:r>
-                      <a:endParaRPr lang="en-AU" sz="1000" b="0" i="0" u="none" strike="noStrike" dirty="0">
+                      <a:endParaRPr lang="en-AU" sz="1400" b="0" i="0" u="none" strike="noStrike" dirty="0">
                         <a:solidFill>
                           <a:srgbClr val="000000"/>
                         </a:solidFill>
@@ -15958,7 +15959,7 @@
                   </a:ext>
                 </a:extLst>
               </a:tr>
-              <a:tr h="164380">
+              <a:tr h="197824">
                 <a:tc>
                   <a:txBody>
                     <a:bodyPr/>
@@ -15966,7 +15967,7 @@
                     <a:p>
                       <a:pPr algn="l" rtl="0" fontAlgn="b"/>
                       <a:r>
-                        <a:rPr lang="en-AU" sz="1000" b="0" u="none" strike="noStrike" dirty="0">
+                        <a:rPr lang="en-AU" sz="1400" b="0" u="none" strike="noStrike" dirty="0">
                           <a:solidFill>
                             <a:srgbClr val="000000"/>
                           </a:solidFill>
@@ -15974,7 +15975,7 @@
                         </a:rPr>
                         <a:t>1</a:t>
                       </a:r>
-                      <a:endParaRPr lang="en-AU" sz="1000" b="0" i="0" u="none" strike="noStrike" dirty="0">
+                      <a:endParaRPr lang="en-AU" sz="1400" b="0" i="0" u="none" strike="noStrike" dirty="0">
                         <a:solidFill>
                           <a:srgbClr val="000000"/>
                         </a:solidFill>
@@ -16013,12 +16014,12 @@
                     <a:p>
                       <a:pPr algn="l" rtl="0" fontAlgn="b"/>
                       <a:r>
-                        <a:rPr lang="en-AU" sz="1000" u="none" strike="noStrike" dirty="0">
+                        <a:rPr lang="en-AU" sz="1400" u="none" strike="noStrike" dirty="0">
                           <a:effectLst/>
                         </a:rPr>
                         <a:t>1</a:t>
                       </a:r>
-                      <a:endParaRPr lang="en-AU" sz="1000" b="0" i="0" u="none" strike="noStrike" dirty="0">
+                      <a:endParaRPr lang="en-AU" sz="1400" b="0" i="0" u="none" strike="noStrike" dirty="0">
                         <a:solidFill>
                           <a:srgbClr val="000000"/>
                         </a:solidFill>
@@ -16057,12 +16058,12 @@
                     <a:p>
                       <a:pPr algn="l" rtl="0" fontAlgn="b"/>
                       <a:r>
-                        <a:rPr lang="en-AU" sz="1000" u="none" strike="noStrike" dirty="0">
+                        <a:rPr lang="en-AU" sz="1400" u="none" strike="noStrike" dirty="0">
                           <a:effectLst/>
                         </a:rPr>
                         <a:t>Grand</a:t>
                       </a:r>
-                      <a:endParaRPr lang="en-AU" sz="1000" b="0" i="0" u="none" strike="noStrike" dirty="0">
+                      <a:endParaRPr lang="en-AU" sz="1400" b="0" i="0" u="none" strike="noStrike" dirty="0">
                         <a:solidFill>
                           <a:srgbClr val="000000"/>
                         </a:solidFill>
@@ -16101,7 +16102,7 @@
                     <a:p>
                       <a:pPr algn="l" rtl="0" fontAlgn="b"/>
                       <a:r>
-                        <a:rPr lang="en-AU" sz="1000" b="0" u="none" strike="noStrike" dirty="0">
+                        <a:rPr lang="en-AU" sz="1400" b="0" u="none" strike="noStrike" dirty="0">
                           <a:solidFill>
                             <a:srgbClr val="000000"/>
                           </a:solidFill>
@@ -16109,7 +16110,7 @@
                         </a:rPr>
                         <a:t>33_67</a:t>
                       </a:r>
-                      <a:endParaRPr lang="en-AU" sz="1000" b="0" i="0" u="none" strike="noStrike" dirty="0">
+                      <a:endParaRPr lang="en-AU" sz="1400" b="0" i="0" u="none" strike="noStrike" dirty="0">
                         <a:solidFill>
                           <a:srgbClr val="000000"/>
                         </a:solidFill>
@@ -16148,12 +16149,12 @@
                     <a:p>
                       <a:pPr algn="l" rtl="0" fontAlgn="b"/>
                       <a:r>
-                        <a:rPr lang="en-AU" sz="1000" u="none" strike="noStrike" dirty="0">
+                        <a:rPr lang="en-AU" sz="1400" u="none" strike="noStrike" dirty="0">
                           <a:effectLst/>
                         </a:rPr>
                         <a:t>EEE</a:t>
                       </a:r>
-                      <a:endParaRPr lang="en-AU" sz="1000" b="0" i="0" u="none" strike="noStrike" dirty="0">
+                      <a:endParaRPr lang="en-AU" sz="1400" b="0" i="0" u="none" strike="noStrike" dirty="0">
                         <a:solidFill>
                           <a:srgbClr val="000000"/>
                         </a:solidFill>
@@ -16192,12 +16193,12 @@
                     <a:p>
                       <a:pPr algn="l" rtl="0" fontAlgn="b"/>
                       <a:r>
-                        <a:rPr lang="en-AU" sz="1000" u="none" strike="noStrike" dirty="0">
+                        <a:rPr lang="en-AU" sz="1400" u="none" strike="noStrike" dirty="0">
                           <a:effectLst/>
                         </a:rPr>
                         <a:t>4 (3cl)</a:t>
                       </a:r>
-                      <a:endParaRPr lang="en-AU" sz="1000" b="0" i="0" u="none" strike="noStrike" dirty="0">
+                      <a:endParaRPr lang="en-AU" sz="1400" b="0" i="0" u="none" strike="noStrike" dirty="0">
                         <a:solidFill>
                           <a:srgbClr val="000000"/>
                         </a:solidFill>
@@ -16235,7 +16236,7 @@
                   </a:ext>
                 </a:extLst>
               </a:tr>
-              <a:tr h="135939">
+              <a:tr h="197824">
                 <a:tc>
                   <a:txBody>
                     <a:bodyPr/>
@@ -16243,7 +16244,7 @@
                     <a:p>
                       <a:pPr algn="l" rtl="0" fontAlgn="b"/>
                       <a:r>
-                        <a:rPr lang="en-AU" sz="1000" b="0" u="none" strike="noStrike" dirty="0">
+                        <a:rPr lang="en-AU" sz="1400" b="0" u="none" strike="noStrike" dirty="0">
                           <a:solidFill>
                             <a:srgbClr val="000000"/>
                           </a:solidFill>
@@ -16251,7 +16252,7 @@
                         </a:rPr>
                         <a:t>1</a:t>
                       </a:r>
-                      <a:endParaRPr lang="en-AU" sz="1000" b="0" i="0" u="none" strike="noStrike" dirty="0">
+                      <a:endParaRPr lang="en-AU" sz="1400" b="0" i="0" u="none" strike="noStrike" dirty="0">
                         <a:solidFill>
                           <a:srgbClr val="000000"/>
                         </a:solidFill>
@@ -16290,12 +16291,12 @@
                     <a:p>
                       <a:pPr algn="l" rtl="0" fontAlgn="b"/>
                       <a:r>
-                        <a:rPr lang="en-AU" sz="1000" u="none" strike="noStrike" dirty="0">
+                        <a:rPr lang="en-AU" sz="1400" u="none" strike="noStrike" dirty="0">
                           <a:effectLst/>
                         </a:rPr>
                         <a:t>2</a:t>
                       </a:r>
-                      <a:endParaRPr lang="en-AU" sz="1000" b="0" i="0" u="none" strike="noStrike" dirty="0">
+                      <a:endParaRPr lang="en-AU" sz="1400" b="0" i="0" u="none" strike="noStrike" dirty="0">
                         <a:solidFill>
                           <a:srgbClr val="000000"/>
                         </a:solidFill>
@@ -16350,12 +16351,12 @@
                         <a:defRPr/>
                       </a:pPr>
                       <a:r>
-                        <a:rPr lang="en-AU" sz="1000" u="none" strike="noStrike" dirty="0">
+                        <a:rPr lang="en-AU" sz="1400" u="none" strike="noStrike" dirty="0">
                           <a:effectLst/>
                         </a:rPr>
                         <a:t>Grand</a:t>
                       </a:r>
-                      <a:endParaRPr lang="en-AU" sz="1000" b="0" i="0" u="none" strike="noStrike" dirty="0">
+                      <a:endParaRPr lang="en-AU" sz="1400" b="0" i="0" u="none" strike="noStrike" dirty="0">
                         <a:solidFill>
                           <a:srgbClr val="000000"/>
                         </a:solidFill>
@@ -16394,7 +16395,7 @@
                     <a:p>
                       <a:pPr algn="l" rtl="0" fontAlgn="b"/>
                       <a:r>
-                        <a:rPr lang="en-AU" sz="1000" b="0" u="none" strike="noStrike" dirty="0">
+                        <a:rPr lang="en-AU" sz="1400" b="0" u="none" strike="noStrike" dirty="0">
                           <a:solidFill>
                             <a:srgbClr val="000000"/>
                           </a:solidFill>
@@ -16402,7 +16403,7 @@
                         </a:rPr>
                         <a:t>33_67</a:t>
                       </a:r>
-                      <a:endParaRPr lang="en-AU" sz="1000" b="0" i="0" u="none" strike="noStrike" dirty="0">
+                      <a:endParaRPr lang="en-AU" sz="1400" b="0" i="0" u="none" strike="noStrike" dirty="0">
                         <a:solidFill>
                           <a:srgbClr val="000000"/>
                         </a:solidFill>
@@ -16441,12 +16442,12 @@
                     <a:p>
                       <a:pPr algn="l" rtl="0" fontAlgn="b"/>
                       <a:r>
-                        <a:rPr lang="en-AU" sz="1000" u="none" strike="noStrike" dirty="0">
+                        <a:rPr lang="en-AU" sz="1400" u="none" strike="noStrike" dirty="0">
                           <a:effectLst/>
                         </a:rPr>
                         <a:t>EEE</a:t>
                       </a:r>
-                      <a:endParaRPr lang="en-AU" sz="1000" b="0" i="0" u="none" strike="noStrike" dirty="0">
+                      <a:endParaRPr lang="en-AU" sz="1400" b="0" i="0" u="none" strike="noStrike" dirty="0">
                         <a:solidFill>
                           <a:srgbClr val="000000"/>
                         </a:solidFill>
@@ -16485,12 +16486,12 @@
                     <a:p>
                       <a:pPr algn="l" rtl="0" fontAlgn="b"/>
                       <a:r>
-                        <a:rPr lang="en-AU" sz="1000" u="none" strike="noStrike" dirty="0">
+                        <a:rPr lang="en-AU" sz="1400" u="none" strike="noStrike" dirty="0">
                           <a:effectLst/>
                         </a:rPr>
                         <a:t>6 (4cl)</a:t>
                       </a:r>
-                      <a:endParaRPr lang="en-AU" sz="1000" b="0" i="0" u="none" strike="noStrike" dirty="0">
+                      <a:endParaRPr lang="en-AU" sz="1400" b="0" i="0" u="none" strike="noStrike" dirty="0">
                         <a:solidFill>
                           <a:srgbClr val="000000"/>
                         </a:solidFill>
@@ -16528,7 +16529,7 @@
                   </a:ext>
                 </a:extLst>
               </a:tr>
-              <a:tr h="95802">
+              <a:tr h="197824">
                 <a:tc>
                   <a:txBody>
                     <a:bodyPr/>
@@ -16536,7 +16537,7 @@
                     <a:p>
                       <a:pPr marL="0" algn="l" defTabSz="914400" rtl="0" eaLnBrk="1" fontAlgn="b" latinLnBrk="0" hangingPunct="1"/>
                       <a:r>
-                        <a:rPr lang="en-AU" sz="1000" b="0" u="none" strike="noStrike" kern="1200" dirty="0">
+                        <a:rPr lang="en-AU" sz="1400" b="0" u="none" strike="noStrike" kern="1200" dirty="0">
                           <a:solidFill>
                             <a:srgbClr val="000000"/>
                           </a:solidFill>
@@ -16544,7 +16545,7 @@
                         </a:rPr>
                         <a:t>2</a:t>
                       </a:r>
-                      <a:endParaRPr lang="en-AU" sz="1000" b="0" i="0" u="none" strike="noStrike" kern="1200" dirty="0">
+                      <a:endParaRPr lang="en-AU" sz="1400" b="0" i="0" u="none" strike="noStrike" kern="1200" dirty="0">
                         <a:solidFill>
                           <a:srgbClr val="000000"/>
                         </a:solidFill>
@@ -16591,7 +16592,7 @@
                     <a:p>
                       <a:pPr marL="0" algn="l" defTabSz="914400" rtl="0" eaLnBrk="1" fontAlgn="b" latinLnBrk="0" hangingPunct="1"/>
                       <a:r>
-                        <a:rPr lang="en-AU" sz="1000" b="0" u="none" strike="noStrike" kern="1200" dirty="0">
+                        <a:rPr lang="en-AU" sz="1400" b="0" u="none" strike="noStrike" kern="1200" dirty="0">
                           <a:solidFill>
                             <a:srgbClr val="000000"/>
                           </a:solidFill>
@@ -16599,7 +16600,7 @@
                         </a:rPr>
                         <a:t>Train 2</a:t>
                       </a:r>
-                      <a:endParaRPr lang="en-AU" sz="1000" b="0" i="0" u="none" strike="noStrike" kern="1200" dirty="0">
+                      <a:endParaRPr lang="en-AU" sz="1400" b="0" i="0" u="none" strike="noStrike" kern="1200" dirty="0">
                         <a:solidFill>
                           <a:srgbClr val="000000"/>
                         </a:solidFill>
@@ -16646,7 +16647,7 @@
                     <a:p>
                       <a:pPr marL="0" algn="l" defTabSz="914400" rtl="0" eaLnBrk="1" fontAlgn="b" latinLnBrk="0" hangingPunct="1"/>
                       <a:r>
-                        <a:rPr lang="en-AU" sz="1000" b="0" u="none" strike="noStrike" kern="1200" dirty="0">
+                        <a:rPr lang="en-AU" sz="1400" b="0" u="none" strike="noStrike" kern="1200" dirty="0">
                           <a:solidFill>
                             <a:srgbClr val="000000"/>
                           </a:solidFill>
@@ -16654,7 +16655,7 @@
                         </a:rPr>
                         <a:t>PCA</a:t>
                       </a:r>
-                      <a:endParaRPr lang="en-AU" sz="1000" b="0" i="0" u="none" strike="noStrike" kern="1200" dirty="0">
+                      <a:endParaRPr lang="en-AU" sz="1400" b="0" i="0" u="none" strike="noStrike" kern="1200" dirty="0">
                         <a:solidFill>
                           <a:srgbClr val="000000"/>
                         </a:solidFill>
@@ -16701,7 +16702,7 @@
                     <a:p>
                       <a:pPr marL="0" algn="l" defTabSz="914400" rtl="0" eaLnBrk="1" fontAlgn="b" latinLnBrk="0" hangingPunct="1"/>
                       <a:r>
-                        <a:rPr lang="en-AU" sz="1000" b="0" u="none" strike="noStrike" kern="1200" dirty="0">
+                        <a:rPr lang="en-AU" sz="1400" b="0" u="none" strike="noStrike" kern="1200" dirty="0">
                           <a:solidFill>
                             <a:srgbClr val="000000"/>
                           </a:solidFill>
@@ -16709,7 +16710,7 @@
                         </a:rPr>
                         <a:t>0_1</a:t>
                       </a:r>
-                      <a:endParaRPr lang="en-AU" sz="1000" b="0" i="0" u="none" strike="noStrike" kern="1200" dirty="0">
+                      <a:endParaRPr lang="en-AU" sz="1400" b="0" i="0" u="none" strike="noStrike" kern="1200" dirty="0">
                         <a:solidFill>
                           <a:srgbClr val="000000"/>
                         </a:solidFill>
@@ -16756,7 +16757,7 @@
                     <a:p>
                       <a:pPr marL="0" algn="l" defTabSz="914400" rtl="0" eaLnBrk="1" fontAlgn="b" latinLnBrk="0" hangingPunct="1"/>
                       <a:r>
-                        <a:rPr lang="en-AU" sz="1000" b="0" u="none" strike="noStrike" kern="1200" dirty="0">
+                        <a:rPr lang="en-AU" sz="1400" b="0" u="none" strike="noStrike" kern="1200" dirty="0">
                           <a:solidFill>
                             <a:srgbClr val="000000"/>
                           </a:solidFill>
@@ -16764,7 +16765,7 @@
                         </a:rPr>
                         <a:t>EEE</a:t>
                       </a:r>
-                      <a:endParaRPr lang="en-AU" sz="1000" b="0" i="0" u="none" strike="noStrike" kern="1200" dirty="0">
+                      <a:endParaRPr lang="en-AU" sz="1400" b="0" i="0" u="none" strike="noStrike" kern="1200" dirty="0">
                         <a:solidFill>
                           <a:srgbClr val="000000"/>
                         </a:solidFill>
@@ -16811,7 +16812,7 @@
                     <a:p>
                       <a:pPr marL="0" algn="l" defTabSz="914400" rtl="0" eaLnBrk="1" fontAlgn="b" latinLnBrk="0" hangingPunct="1"/>
                       <a:r>
-                        <a:rPr lang="en-AU" sz="1000" b="0" u="none" strike="noStrike" kern="1200" dirty="0">
+                        <a:rPr lang="en-AU" sz="1400" b="0" u="none" strike="noStrike" kern="1200" dirty="0">
                           <a:solidFill>
                             <a:srgbClr val="000000"/>
                           </a:solidFill>
@@ -16819,7 +16820,7 @@
                         </a:rPr>
                         <a:t>4 (3cl)</a:t>
                       </a:r>
-                      <a:endParaRPr lang="en-AU" sz="1000" b="0" i="0" u="none" strike="noStrike" kern="1200" dirty="0">
+                      <a:endParaRPr lang="en-AU" sz="1400" b="0" i="0" u="none" strike="noStrike" kern="1200" dirty="0">
                         <a:solidFill>
                           <a:srgbClr val="000000"/>
                         </a:solidFill>
@@ -16865,7 +16866,7 @@
                   </a:ext>
                 </a:extLst>
               </a:tr>
-              <a:tr h="95802">
+              <a:tr h="197824">
                 <a:tc>
                   <a:txBody>
                     <a:bodyPr/>
@@ -16873,12 +16874,12 @@
                     <a:p>
                       <a:pPr algn="l" rtl="0" fontAlgn="b"/>
                       <a:r>
-                        <a:rPr lang="en-AU" sz="1000" u="none" strike="noStrike" dirty="0">
+                        <a:rPr lang="en-AU" sz="1400" u="none" strike="noStrike" dirty="0">
                           <a:effectLst/>
                         </a:rPr>
                         <a:t>2</a:t>
                       </a:r>
-                      <a:endParaRPr lang="en-AU" sz="1000" b="0" i="0" u="none" strike="noStrike" dirty="0">
+                      <a:endParaRPr lang="en-AU" sz="1400" b="0" i="0" u="none" strike="noStrike" dirty="0">
                         <a:solidFill>
                           <a:srgbClr val="000000"/>
                         </a:solidFill>
@@ -16917,12 +16918,12 @@
                     <a:p>
                       <a:pPr algn="l" rtl="0" fontAlgn="b"/>
                       <a:r>
-                        <a:rPr lang="en-AU" sz="1000" u="none" strike="noStrike" dirty="0">
+                        <a:rPr lang="en-AU" sz="1400" u="none" strike="noStrike" dirty="0">
                           <a:effectLst/>
                         </a:rPr>
                         <a:t>3</a:t>
                       </a:r>
-                      <a:endParaRPr lang="en-AU" sz="1000" b="0" i="0" u="none" strike="noStrike" dirty="0">
+                      <a:endParaRPr lang="en-AU" sz="1400" b="0" i="0" u="none" strike="noStrike" dirty="0">
                         <a:solidFill>
                           <a:srgbClr val="000000"/>
                         </a:solidFill>
@@ -16961,7 +16962,7 @@
                     <a:p>
                       <a:pPr algn="l" rtl="0" fontAlgn="b"/>
                       <a:r>
-                        <a:rPr lang="en-AU" sz="1000" b="0" u="none" strike="noStrike" kern="1200" dirty="0">
+                        <a:rPr lang="en-AU" sz="1400" b="0" u="none" strike="noStrike" kern="1200" dirty="0">
                           <a:solidFill>
                             <a:srgbClr val="000000"/>
                           </a:solidFill>
@@ -16969,7 +16970,7 @@
                         </a:rPr>
                         <a:t>PCA</a:t>
                       </a:r>
-                      <a:endParaRPr lang="en-AU" sz="1000" b="0" i="0" u="none" strike="noStrike" dirty="0">
+                      <a:endParaRPr lang="en-AU" sz="1400" b="0" i="0" u="none" strike="noStrike" dirty="0">
                         <a:solidFill>
                           <a:srgbClr val="000000"/>
                         </a:solidFill>
@@ -17008,12 +17009,12 @@
                     <a:p>
                       <a:pPr algn="l" rtl="0" fontAlgn="b"/>
                       <a:r>
-                        <a:rPr lang="en-AU" sz="1000" u="none" strike="noStrike" dirty="0">
+                        <a:rPr lang="en-AU" sz="1400" u="none" strike="noStrike" dirty="0">
                           <a:effectLst/>
                         </a:rPr>
                         <a:t>50_50</a:t>
                       </a:r>
-                      <a:endParaRPr lang="en-AU" sz="1000" b="0" i="0" u="none" strike="noStrike" dirty="0">
+                      <a:endParaRPr lang="en-AU" sz="1400" b="0" i="0" u="none" strike="noStrike" dirty="0">
                         <a:solidFill>
                           <a:srgbClr val="000000"/>
                         </a:solidFill>
@@ -17052,12 +17053,12 @@
                     <a:p>
                       <a:pPr algn="l" rtl="0" fontAlgn="b"/>
                       <a:r>
-                        <a:rPr lang="en-AU" sz="1000" u="none" strike="noStrike" dirty="0">
+                        <a:rPr lang="en-AU" sz="1400" u="none" strike="noStrike" dirty="0">
                           <a:effectLst/>
                         </a:rPr>
                         <a:t>EEV</a:t>
                       </a:r>
-                      <a:endParaRPr lang="en-AU" sz="1000" b="0" i="0" u="none" strike="noStrike" dirty="0">
+                      <a:endParaRPr lang="en-AU" sz="1400" b="0" i="0" u="none" strike="noStrike" dirty="0">
                         <a:solidFill>
                           <a:srgbClr val="000000"/>
                         </a:solidFill>
@@ -17096,12 +17097,12 @@
                     <a:p>
                       <a:pPr algn="l" rtl="0" fontAlgn="b"/>
                       <a:r>
-                        <a:rPr lang="en-AU" sz="1000" u="none" strike="noStrike" dirty="0">
+                        <a:rPr lang="en-AU" sz="1400" u="none" strike="noStrike" dirty="0">
                           <a:effectLst/>
                         </a:rPr>
                         <a:t>4 (3cl)</a:t>
                       </a:r>
-                      <a:endParaRPr lang="en-AU" sz="1000" b="0" i="0" u="none" strike="noStrike" dirty="0">
+                      <a:endParaRPr lang="en-AU" sz="1400" b="0" i="0" u="none" strike="noStrike" dirty="0">
                         <a:solidFill>
                           <a:srgbClr val="000000"/>
                         </a:solidFill>
@@ -17139,7 +17140,7 @@
                   </a:ext>
                 </a:extLst>
               </a:tr>
-              <a:tr h="91440">
+              <a:tr h="197824">
                 <a:tc>
                   <a:txBody>
                     <a:bodyPr/>
@@ -17147,12 +17148,12 @@
                     <a:p>
                       <a:pPr algn="l" rtl="0" fontAlgn="b"/>
                       <a:r>
-                        <a:rPr lang="en-AU" sz="1000" u="none" strike="noStrike" dirty="0">
+                        <a:rPr lang="en-AU" sz="1400" u="none" strike="noStrike" dirty="0">
                           <a:effectLst/>
                         </a:rPr>
                         <a:t>2</a:t>
                       </a:r>
-                      <a:endParaRPr lang="en-AU" sz="1000" b="0" i="0" u="none" strike="noStrike" dirty="0">
+                      <a:endParaRPr lang="en-AU" sz="1400" b="0" i="0" u="none" strike="noStrike" dirty="0">
                         <a:solidFill>
                           <a:srgbClr val="000000"/>
                         </a:solidFill>
@@ -17191,12 +17192,12 @@
                     <a:p>
                       <a:pPr algn="l" rtl="0" fontAlgn="b"/>
                       <a:r>
-                        <a:rPr lang="en-AU" sz="1000" u="none" strike="noStrike" dirty="0">
+                        <a:rPr lang="en-AU" sz="1400" u="none" strike="noStrike" dirty="0">
                           <a:effectLst/>
                         </a:rPr>
                         <a:t>4</a:t>
                       </a:r>
-                      <a:endParaRPr lang="en-AU" sz="1000" b="0" i="0" u="none" strike="noStrike" dirty="0">
+                      <a:endParaRPr lang="en-AU" sz="1400" b="0" i="0" u="none" strike="noStrike" dirty="0">
                         <a:solidFill>
                           <a:srgbClr val="000000"/>
                         </a:solidFill>
@@ -17235,7 +17236,7 @@
                     <a:p>
                       <a:pPr algn="l" rtl="0" fontAlgn="b"/>
                       <a:r>
-                        <a:rPr lang="en-AU" sz="1000" b="0" u="none" strike="noStrike" kern="1200" dirty="0">
+                        <a:rPr lang="en-AU" sz="1400" b="0" u="none" strike="noStrike" kern="1200" dirty="0">
                           <a:solidFill>
                             <a:srgbClr val="000000"/>
                           </a:solidFill>
@@ -17243,7 +17244,7 @@
                         </a:rPr>
                         <a:t>PCA</a:t>
                       </a:r>
-                      <a:endParaRPr lang="en-AU" sz="1000" b="0" i="0" u="none" strike="noStrike" dirty="0">
+                      <a:endParaRPr lang="en-AU" sz="1400" b="0" i="0" u="none" strike="noStrike" dirty="0">
                         <a:solidFill>
                           <a:srgbClr val="000000"/>
                         </a:solidFill>
@@ -17282,7 +17283,7 @@
                     <a:p>
                       <a:pPr algn="l" rtl="0" fontAlgn="b"/>
                       <a:r>
-                        <a:rPr lang="en-AU" sz="1000" b="0" u="none" strike="noStrike" dirty="0">
+                        <a:rPr lang="en-AU" sz="1400" b="0" u="none" strike="noStrike" dirty="0">
                           <a:solidFill>
                             <a:srgbClr val="000000"/>
                           </a:solidFill>
@@ -17290,7 +17291,7 @@
                         </a:rPr>
                         <a:t>50_50</a:t>
                       </a:r>
-                      <a:endParaRPr lang="en-AU" sz="1000" b="0" i="0" u="none" strike="noStrike" dirty="0">
+                      <a:endParaRPr lang="en-AU" sz="1400" b="0" i="0" u="none" strike="noStrike" dirty="0">
                         <a:solidFill>
                           <a:srgbClr val="000000"/>
                         </a:solidFill>
@@ -17329,12 +17330,12 @@
                     <a:p>
                       <a:pPr algn="l" rtl="0" fontAlgn="b"/>
                       <a:r>
-                        <a:rPr lang="en-AU" sz="1000" u="none" strike="noStrike" dirty="0">
+                        <a:rPr lang="en-AU" sz="1400" u="none" strike="noStrike" dirty="0">
                           <a:effectLst/>
                         </a:rPr>
                         <a:t>EEV</a:t>
                       </a:r>
-                      <a:endParaRPr lang="en-AU" sz="1000" b="0" i="0" u="none" strike="noStrike" dirty="0">
+                      <a:endParaRPr lang="en-AU" sz="1400" b="0" i="0" u="none" strike="noStrike" dirty="0">
                         <a:solidFill>
                           <a:srgbClr val="000000"/>
                         </a:solidFill>
@@ -17373,12 +17374,12 @@
                     <a:p>
                       <a:pPr algn="l" rtl="0" fontAlgn="b"/>
                       <a:r>
-                        <a:rPr lang="en-AU" sz="1000" u="none" strike="noStrike" dirty="0">
+                        <a:rPr lang="en-AU" sz="1400" u="none" strike="noStrike" dirty="0">
                           <a:effectLst/>
                         </a:rPr>
                         <a:t>6 (4cl)</a:t>
                       </a:r>
-                      <a:endParaRPr lang="en-AU" sz="1000" b="0" i="0" u="none" strike="noStrike" dirty="0">
+                      <a:endParaRPr lang="en-AU" sz="1400" b="0" i="0" u="none" strike="noStrike" dirty="0">
                         <a:solidFill>
                           <a:srgbClr val="000000"/>
                         </a:solidFill>
@@ -17416,7 +17417,7 @@
                   </a:ext>
                 </a:extLst>
               </a:tr>
-              <a:tr h="95802">
+              <a:tr h="197824">
                 <a:tc>
                   <a:txBody>
                     <a:bodyPr/>
@@ -17424,12 +17425,12 @@
                     <a:p>
                       <a:pPr algn="l" rtl="0" fontAlgn="b"/>
                       <a:r>
-                        <a:rPr lang="en-AU" sz="1000" u="none" strike="noStrike" dirty="0">
+                        <a:rPr lang="en-AU" sz="1400" u="none" strike="noStrike" dirty="0">
                           <a:effectLst/>
                         </a:rPr>
                         <a:t>3</a:t>
                       </a:r>
-                      <a:endParaRPr lang="en-AU" sz="1000" b="0" i="0" u="none" strike="noStrike" dirty="0">
+                      <a:endParaRPr lang="en-AU" sz="1400" b="0" i="0" u="none" strike="noStrike" dirty="0">
                         <a:solidFill>
                           <a:srgbClr val="000000"/>
                         </a:solidFill>
@@ -17474,12 +17475,12 @@
                     <a:p>
                       <a:pPr algn="l" rtl="0" fontAlgn="b"/>
                       <a:r>
-                        <a:rPr lang="en-AU" sz="1000" u="none" strike="noStrike" dirty="0">
+                        <a:rPr lang="en-AU" sz="1400" u="none" strike="noStrike" dirty="0">
                           <a:effectLst/>
                         </a:rPr>
                         <a:t>Train 3</a:t>
                       </a:r>
-                      <a:endParaRPr lang="en-AU" sz="1000" b="0" i="0" u="none" strike="noStrike" dirty="0">
+                      <a:endParaRPr lang="en-AU" sz="1400" b="0" i="0" u="none" strike="noStrike" dirty="0">
                         <a:solidFill>
                           <a:srgbClr val="000000"/>
                         </a:solidFill>
@@ -17524,7 +17525,7 @@
                     <a:p>
                       <a:pPr marL="0" algn="l" defTabSz="914400" rtl="0" eaLnBrk="1" fontAlgn="b" latinLnBrk="0" hangingPunct="1"/>
                       <a:r>
-                        <a:rPr lang="en-AU" sz="1000" b="0" u="none" strike="noStrike" kern="1200" dirty="0">
+                        <a:rPr lang="en-AU" sz="1400" b="0" u="none" strike="noStrike" kern="1200" dirty="0">
                           <a:solidFill>
                             <a:srgbClr val="000000"/>
                           </a:solidFill>
@@ -17532,7 +17533,7 @@
                         </a:rPr>
                         <a:t>Radial</a:t>
                       </a:r>
-                      <a:endParaRPr lang="en-AU" sz="1000" b="0" i="0" u="none" strike="noStrike" kern="1200" dirty="0">
+                      <a:endParaRPr lang="en-AU" sz="1400" b="0" i="0" u="none" strike="noStrike" kern="1200" dirty="0">
                         <a:solidFill>
                           <a:srgbClr val="000000"/>
                         </a:solidFill>
@@ -17579,12 +17580,12 @@
                     <a:p>
                       <a:pPr algn="l" rtl="0" fontAlgn="b"/>
                       <a:r>
-                        <a:rPr lang="en-AU" sz="1000" u="none" strike="noStrike" dirty="0">
+                        <a:rPr lang="en-AU" sz="1400" u="none" strike="noStrike" dirty="0">
                           <a:effectLst/>
                         </a:rPr>
                         <a:t>0_1</a:t>
                       </a:r>
-                      <a:endParaRPr lang="en-AU" sz="1000" b="0" i="0" u="none" strike="noStrike" dirty="0">
+                      <a:endParaRPr lang="en-AU" sz="1400" b="0" i="0" u="none" strike="noStrike" dirty="0">
                         <a:solidFill>
                           <a:srgbClr val="000000"/>
                         </a:solidFill>
@@ -17629,7 +17630,7 @@
                     <a:p>
                       <a:pPr algn="l" rtl="0" fontAlgn="b"/>
                       <a:r>
-                        <a:rPr lang="en-AU" sz="1000" b="0" u="none" strike="noStrike" dirty="0">
+                        <a:rPr lang="en-AU" sz="1400" b="0" u="none" strike="noStrike" dirty="0">
                           <a:solidFill>
                             <a:srgbClr val="000000"/>
                           </a:solidFill>
@@ -17637,7 +17638,7 @@
                         </a:rPr>
                         <a:t>EEE</a:t>
                       </a:r>
-                      <a:endParaRPr lang="en-AU" sz="1000" b="0" i="0" u="none" strike="noStrike" dirty="0">
+                      <a:endParaRPr lang="en-AU" sz="1400" b="0" i="0" u="none" strike="noStrike" dirty="0">
                         <a:solidFill>
                           <a:srgbClr val="000000"/>
                         </a:solidFill>
@@ -17682,12 +17683,12 @@
                     <a:p>
                       <a:pPr algn="l" rtl="0" fontAlgn="b"/>
                       <a:r>
-                        <a:rPr lang="en-AU" sz="1000" u="none" strike="noStrike" dirty="0">
+                        <a:rPr lang="en-AU" sz="1400" u="none" strike="noStrike" dirty="0">
                           <a:effectLst/>
                         </a:rPr>
                         <a:t>4 (3cl)</a:t>
                       </a:r>
-                      <a:endParaRPr lang="en-AU" sz="1000" b="0" i="0" u="none" strike="noStrike" dirty="0">
+                      <a:endParaRPr lang="en-AU" sz="1400" b="0" i="0" u="none" strike="noStrike" dirty="0">
                         <a:solidFill>
                           <a:srgbClr val="000000"/>
                         </a:solidFill>
@@ -17731,7 +17732,7 @@
                   </a:ext>
                 </a:extLst>
               </a:tr>
-              <a:tr h="95802">
+              <a:tr h="197824">
                 <a:tc>
                   <a:txBody>
                     <a:bodyPr/>
@@ -17739,12 +17740,12 @@
                     <a:p>
                       <a:pPr algn="l" rtl="0" fontAlgn="b"/>
                       <a:r>
-                        <a:rPr lang="en-AU" sz="1000" u="none" strike="noStrike" dirty="0">
+                        <a:rPr lang="en-AU" sz="1400" u="none" strike="noStrike" dirty="0">
                           <a:effectLst/>
                         </a:rPr>
                         <a:t>3</a:t>
                       </a:r>
-                      <a:endParaRPr lang="en-AU" sz="1000" b="0" i="0" u="none" strike="noStrike" dirty="0">
+                      <a:endParaRPr lang="en-AU" sz="1400" b="0" i="0" u="none" strike="noStrike" dirty="0">
                         <a:solidFill>
                           <a:srgbClr val="000000"/>
                         </a:solidFill>
@@ -17783,12 +17784,12 @@
                     <a:p>
                       <a:pPr algn="l" rtl="0" fontAlgn="b"/>
                       <a:r>
-                        <a:rPr lang="en-AU" sz="1000" u="none" strike="noStrike" dirty="0">
+                        <a:rPr lang="en-AU" sz="1400" u="none" strike="noStrike" dirty="0">
                           <a:effectLst/>
                         </a:rPr>
                         <a:t>5</a:t>
                       </a:r>
-                      <a:endParaRPr lang="en-AU" sz="1000" b="0" i="0" u="none" strike="noStrike" dirty="0">
+                      <a:endParaRPr lang="en-AU" sz="1400" b="0" i="0" u="none" strike="noStrike" dirty="0">
                         <a:solidFill>
                           <a:srgbClr val="000000"/>
                         </a:solidFill>
@@ -17827,12 +17828,12 @@
                     <a:p>
                       <a:pPr algn="l" rtl="0" fontAlgn="b"/>
                       <a:r>
-                        <a:rPr lang="en-AU" sz="1000" u="none" strike="noStrike" dirty="0">
+                        <a:rPr lang="en-AU" sz="1400" u="none" strike="noStrike" dirty="0">
                           <a:effectLst/>
                         </a:rPr>
                         <a:t>Radial</a:t>
                       </a:r>
-                      <a:endParaRPr lang="en-AU" sz="1000" b="0" i="0" u="none" strike="noStrike" dirty="0">
+                      <a:endParaRPr lang="en-AU" sz="1400" b="0" i="0" u="none" strike="noStrike" dirty="0">
                         <a:solidFill>
                           <a:srgbClr val="000000"/>
                         </a:solidFill>
@@ -17871,7 +17872,7 @@
                     <a:p>
                       <a:pPr algn="l" rtl="0" fontAlgn="b"/>
                       <a:r>
-                        <a:rPr lang="en-AU" sz="1000" b="0" u="none" strike="noStrike" dirty="0">
+                        <a:rPr lang="en-AU" sz="1400" b="0" u="none" strike="noStrike" dirty="0">
                           <a:solidFill>
                             <a:srgbClr val="000000"/>
                           </a:solidFill>
@@ -17879,7 +17880,7 @@
                         </a:rPr>
                         <a:t>0_1</a:t>
                       </a:r>
-                      <a:endParaRPr lang="en-AU" sz="1000" b="0" i="0" u="none" strike="noStrike" dirty="0">
+                      <a:endParaRPr lang="en-AU" sz="1400" b="0" i="0" u="none" strike="noStrike" dirty="0">
                         <a:solidFill>
                           <a:srgbClr val="000000"/>
                         </a:solidFill>
@@ -17918,7 +17919,7 @@
                     <a:p>
                       <a:pPr algn="l" rtl="0" fontAlgn="b"/>
                       <a:r>
-                        <a:rPr lang="en-AU" sz="1000" b="0" u="none" strike="noStrike" dirty="0">
+                        <a:rPr lang="en-AU" sz="1400" b="0" u="none" strike="noStrike" dirty="0">
                           <a:solidFill>
                             <a:srgbClr val="000000"/>
                           </a:solidFill>
@@ -17926,7 +17927,7 @@
                         </a:rPr>
                         <a:t>Ban</a:t>
                       </a:r>
-                      <a:endParaRPr lang="en-AU" sz="1000" b="0" i="0" u="none" strike="noStrike" dirty="0">
+                      <a:endParaRPr lang="en-AU" sz="1400" b="0" i="0" u="none" strike="noStrike" dirty="0">
                         <a:solidFill>
                           <a:srgbClr val="000000"/>
                         </a:solidFill>
@@ -17965,12 +17966,12 @@
                     <a:p>
                       <a:pPr algn="l" rtl="0" fontAlgn="b"/>
                       <a:r>
-                        <a:rPr lang="en-AU" sz="1000" u="none" strike="noStrike" dirty="0">
+                        <a:rPr lang="en-AU" sz="1400" u="none" strike="noStrike" dirty="0">
                           <a:effectLst/>
                         </a:rPr>
                         <a:t>4 (3cl)</a:t>
                       </a:r>
-                      <a:endParaRPr lang="en-AU" sz="1000" b="0" i="0" u="none" strike="noStrike" dirty="0">
+                      <a:endParaRPr lang="en-AU" sz="1400" b="0" i="0" u="none" strike="noStrike" dirty="0">
                         <a:solidFill>
                           <a:srgbClr val="000000"/>
                         </a:solidFill>
@@ -18008,7 +18009,7 @@
                   </a:ext>
                 </a:extLst>
               </a:tr>
-              <a:tr h="0">
+              <a:tr h="197824">
                 <a:tc>
                   <a:txBody>
                     <a:bodyPr/>
@@ -18016,12 +18017,12 @@
                     <a:p>
                       <a:pPr algn="l" rtl="0" fontAlgn="b"/>
                       <a:r>
-                        <a:rPr lang="en-AU" sz="1000" u="none" strike="noStrike" dirty="0">
+                        <a:rPr lang="en-AU" sz="1400" u="none" strike="noStrike" dirty="0">
                           <a:effectLst/>
                         </a:rPr>
                         <a:t>3</a:t>
                       </a:r>
-                      <a:endParaRPr lang="en-AU" sz="1000" b="0" i="0" u="none" strike="noStrike" dirty="0">
+                      <a:endParaRPr lang="en-AU" sz="1400" b="0" i="0" u="none" strike="noStrike" dirty="0">
                         <a:solidFill>
                           <a:srgbClr val="000000"/>
                         </a:solidFill>
@@ -18060,12 +18061,12 @@
                     <a:p>
                       <a:pPr algn="l" rtl="0" fontAlgn="b"/>
                       <a:r>
-                        <a:rPr lang="en-AU" sz="1000" u="none" strike="noStrike" dirty="0">
+                        <a:rPr lang="en-AU" sz="1400" u="none" strike="noStrike" dirty="0">
                           <a:effectLst/>
                         </a:rPr>
                         <a:t>6</a:t>
                       </a:r>
-                      <a:endParaRPr lang="en-AU" sz="1000" b="0" i="0" u="none" strike="noStrike" dirty="0">
+                      <a:endParaRPr lang="en-AU" sz="1400" b="0" i="0" u="none" strike="noStrike" dirty="0">
                         <a:solidFill>
                           <a:srgbClr val="000000"/>
                         </a:solidFill>
@@ -18104,12 +18105,12 @@
                     <a:p>
                       <a:pPr algn="l" rtl="0" fontAlgn="b"/>
                       <a:r>
-                        <a:rPr lang="en-AU" sz="1000" u="none" strike="noStrike" dirty="0">
+                        <a:rPr lang="en-AU" sz="1400" u="none" strike="noStrike" dirty="0">
                           <a:effectLst/>
                         </a:rPr>
                         <a:t>Radial</a:t>
                       </a:r>
-                      <a:endParaRPr lang="en-AU" sz="1000" b="0" i="0" u="none" strike="noStrike" dirty="0">
+                      <a:endParaRPr lang="en-AU" sz="1400" b="0" i="0" u="none" strike="noStrike" dirty="0">
                         <a:solidFill>
                           <a:srgbClr val="000000"/>
                         </a:solidFill>
@@ -18148,7 +18149,7 @@
                     <a:p>
                       <a:pPr algn="l" rtl="0" fontAlgn="b"/>
                       <a:r>
-                        <a:rPr lang="en-AU" sz="1000" b="0" u="none" strike="noStrike" dirty="0">
+                        <a:rPr lang="en-AU" sz="1400" b="0" u="none" strike="noStrike" dirty="0">
                           <a:solidFill>
                             <a:srgbClr val="000000"/>
                           </a:solidFill>
@@ -18156,7 +18157,7 @@
                         </a:rPr>
                         <a:t>0_1</a:t>
                       </a:r>
-                      <a:endParaRPr lang="en-AU" sz="1000" b="0" i="0" u="none" strike="noStrike" dirty="0">
+                      <a:endParaRPr lang="en-AU" sz="1400" b="0" i="0" u="none" strike="noStrike" dirty="0">
                         <a:solidFill>
                           <a:srgbClr val="000000"/>
                         </a:solidFill>
@@ -18195,7 +18196,7 @@
                     <a:p>
                       <a:pPr algn="l" rtl="0" fontAlgn="b"/>
                       <a:r>
-                        <a:rPr lang="en-AU" sz="1000" b="0" u="none" strike="noStrike" dirty="0">
+                        <a:rPr lang="en-AU" sz="1400" b="0" u="none" strike="noStrike" dirty="0">
                           <a:solidFill>
                             <a:srgbClr val="000000"/>
                           </a:solidFill>
@@ -18203,7 +18204,7 @@
                         </a:rPr>
                         <a:t>Ban</a:t>
                       </a:r>
-                      <a:endParaRPr lang="en-AU" sz="1000" b="0" i="0" u="none" strike="noStrike" dirty="0">
+                      <a:endParaRPr lang="en-AU" sz="1400" b="0" i="0" u="none" strike="noStrike" dirty="0">
                         <a:solidFill>
                           <a:srgbClr val="000000"/>
                         </a:solidFill>
@@ -18242,12 +18243,12 @@
                     <a:p>
                       <a:pPr algn="l" rtl="0" fontAlgn="b"/>
                       <a:r>
-                        <a:rPr lang="en-AU" sz="1000" u="none" strike="noStrike" dirty="0">
+                        <a:rPr lang="en-AU" sz="1400" u="none" strike="noStrike" dirty="0">
                           <a:effectLst/>
                         </a:rPr>
                         <a:t>6 (4cl)</a:t>
                       </a:r>
-                      <a:endParaRPr lang="en-AU" sz="1000" b="0" i="0" u="none" strike="noStrike" dirty="0">
+                      <a:endParaRPr lang="en-AU" sz="1400" b="0" i="0" u="none" strike="noStrike" dirty="0">
                         <a:solidFill>
                           <a:srgbClr val="000000"/>
                         </a:solidFill>
@@ -18303,8 +18304,8 @@
         </p:nvSpPr>
         <p:spPr>
           <a:xfrm>
-            <a:off x="6653011" y="126286"/>
-            <a:ext cx="3293422" cy="1754326"/>
+            <a:off x="6267889" y="161514"/>
+            <a:ext cx="3290091" cy="1754326"/>
           </a:xfrm>
           <a:prstGeom prst="rect">
             <a:avLst/>
@@ -18336,7 +18337,7 @@
             </a:br>
             <a:r>
               <a:rPr lang="en-US" dirty="0"/>
-              <a:t>EEE, EEV, (EVV-)banana</a:t>
+              <a:t>EEE, EEV, EVV-banana</a:t>
             </a:r>
           </a:p>
           <a:p>

</xml_diff>

<commit_message>
-A lot of figure clean up -code recency for spinifex. -
</commit_message>
<xml_diff>
--- a/paper/figures/Experimental design graphics.pptx
+++ b/paper/figures/Experimental design graphics.pptx
@@ -229,7 +229,7 @@
           <a:p>
             <a:fld id="{63BE0782-7791-4644-B82B-E7A5926EFCBC}" type="datetimeFigureOut">
               <a:rPr lang="en-US" smtClean="0"/>
-              <a:t>09-Apr-21</a:t>
+              <a:t>01-Dec-21</a:t>
             </a:fld>
             <a:endParaRPr lang="en-US"/>
           </a:p>
@@ -729,7 +729,7 @@
           <a:p>
             <a:fld id="{B25803F7-6624-424E-B78C-2F27C4BCE53D}" type="datetimeFigureOut">
               <a:rPr lang="en-AU" smtClean="0"/>
-              <a:t>9/04/2021</a:t>
+              <a:t>1/12/2021</a:t>
             </a:fld>
             <a:endParaRPr lang="en-AU"/>
           </a:p>
@@ -929,7 +929,7 @@
           <a:p>
             <a:fld id="{B25803F7-6624-424E-B78C-2F27C4BCE53D}" type="datetimeFigureOut">
               <a:rPr lang="en-AU" smtClean="0"/>
-              <a:t>9/04/2021</a:t>
+              <a:t>1/12/2021</a:t>
             </a:fld>
             <a:endParaRPr lang="en-AU"/>
           </a:p>
@@ -1139,7 +1139,7 @@
           <a:p>
             <a:fld id="{B25803F7-6624-424E-B78C-2F27C4BCE53D}" type="datetimeFigureOut">
               <a:rPr lang="en-AU" smtClean="0"/>
-              <a:t>9/04/2021</a:t>
+              <a:t>1/12/2021</a:t>
             </a:fld>
             <a:endParaRPr lang="en-AU"/>
           </a:p>
@@ -1339,7 +1339,7 @@
           <a:p>
             <a:fld id="{B25803F7-6624-424E-B78C-2F27C4BCE53D}" type="datetimeFigureOut">
               <a:rPr lang="en-AU" smtClean="0"/>
-              <a:t>9/04/2021</a:t>
+              <a:t>1/12/2021</a:t>
             </a:fld>
             <a:endParaRPr lang="en-AU"/>
           </a:p>
@@ -1615,7 +1615,7 @@
           <a:p>
             <a:fld id="{B25803F7-6624-424E-B78C-2F27C4BCE53D}" type="datetimeFigureOut">
               <a:rPr lang="en-AU" smtClean="0"/>
-              <a:t>9/04/2021</a:t>
+              <a:t>1/12/2021</a:t>
             </a:fld>
             <a:endParaRPr lang="en-AU"/>
           </a:p>
@@ -1883,7 +1883,7 @@
           <a:p>
             <a:fld id="{B25803F7-6624-424E-B78C-2F27C4BCE53D}" type="datetimeFigureOut">
               <a:rPr lang="en-AU" smtClean="0"/>
-              <a:t>9/04/2021</a:t>
+              <a:t>1/12/2021</a:t>
             </a:fld>
             <a:endParaRPr lang="en-AU"/>
           </a:p>
@@ -2298,7 +2298,7 @@
           <a:p>
             <a:fld id="{B25803F7-6624-424E-B78C-2F27C4BCE53D}" type="datetimeFigureOut">
               <a:rPr lang="en-AU" smtClean="0"/>
-              <a:t>9/04/2021</a:t>
+              <a:t>1/12/2021</a:t>
             </a:fld>
             <a:endParaRPr lang="en-AU"/>
           </a:p>
@@ -2440,7 +2440,7 @@
           <a:p>
             <a:fld id="{B25803F7-6624-424E-B78C-2F27C4BCE53D}" type="datetimeFigureOut">
               <a:rPr lang="en-AU" smtClean="0"/>
-              <a:t>9/04/2021</a:t>
+              <a:t>1/12/2021</a:t>
             </a:fld>
             <a:endParaRPr lang="en-AU"/>
           </a:p>
@@ -2553,7 +2553,7 @@
           <a:p>
             <a:fld id="{B25803F7-6624-424E-B78C-2F27C4BCE53D}" type="datetimeFigureOut">
               <a:rPr lang="en-AU" smtClean="0"/>
-              <a:t>9/04/2021</a:t>
+              <a:t>1/12/2021</a:t>
             </a:fld>
             <a:endParaRPr lang="en-AU"/>
           </a:p>
@@ -2866,7 +2866,7 @@
           <a:p>
             <a:fld id="{B25803F7-6624-424E-B78C-2F27C4BCE53D}" type="datetimeFigureOut">
               <a:rPr lang="en-AU" smtClean="0"/>
-              <a:t>9/04/2021</a:t>
+              <a:t>1/12/2021</a:t>
             </a:fld>
             <a:endParaRPr lang="en-AU"/>
           </a:p>
@@ -3155,7 +3155,7 @@
           <a:p>
             <a:fld id="{B25803F7-6624-424E-B78C-2F27C4BCE53D}" type="datetimeFigureOut">
               <a:rPr lang="en-AU" smtClean="0"/>
-              <a:t>9/04/2021</a:t>
+              <a:t>1/12/2021</a:t>
             </a:fld>
             <a:endParaRPr lang="en-AU"/>
           </a:p>
@@ -3398,7 +3398,7 @@
           <a:p>
             <a:fld id="{B25803F7-6624-424E-B78C-2F27C4BCE53D}" type="datetimeFigureOut">
               <a:rPr lang="en-AU" smtClean="0"/>
-              <a:t>9/04/2021</a:t>
+              <a:t>1/12/2021</a:t>
             </a:fld>
             <a:endParaRPr lang="en-AU"/>
           </a:p>
@@ -13737,7 +13737,7 @@
             </a:br>
             <a:r>
               <a:rPr lang="en-US" dirty="0"/>
-              <a:t>permutation 3; 33/67, 50/50, &amp; 0/100 percent noise/signal mix</a:t>
+              <a:t>permutation 3; 33/67, 50/50, &amp; 0/100 % noise/signal mix</a:t>
             </a:r>
           </a:p>
         </p:txBody>
@@ -15156,13 +15156,13 @@
           <p:nvPr>
             <p:extLst>
               <p:ext uri="{D42A27DB-BD31-4B8C-83A1-F6EECF244321}">
-                <p14:modId xmlns:p14="http://schemas.microsoft.com/office/powerpoint/2010/main" val="1831068742"/>
+                <p14:modId xmlns:p14="http://schemas.microsoft.com/office/powerpoint/2010/main" val="2517779103"/>
               </p:ext>
             </p:extLst>
           </p:nvPr>
         </p:nvGraphicFramePr>
         <p:xfrm>
-          <a:off x="6790931" y="1677841"/>
+          <a:off x="6782014" y="1677841"/>
           <a:ext cx="2651759" cy="3690353"/>
         </p:xfrm>
         <a:graphic>
@@ -15795,7 +15795,7 @@
                         <a:rPr lang="en-AU" sz="1400" u="none" strike="noStrike" dirty="0">
                           <a:effectLst/>
                         </a:rPr>
-                        <a:t>0_1</a:t>
+                        <a:t>0/100</a:t>
                       </a:r>
                       <a:endParaRPr lang="en-AU" sz="1400" b="0" i="0" u="none" strike="noStrike" dirty="0">
                         <a:solidFill>
@@ -16108,7 +16108,7 @@
                           </a:solidFill>
                           <a:effectLst/>
                         </a:rPr>
-                        <a:t>33_67</a:t>
+                        <a:t>33/67</a:t>
                       </a:r>
                       <a:endParaRPr lang="en-AU" sz="1400" b="0" i="0" u="none" strike="noStrike" dirty="0">
                         <a:solidFill>
@@ -16401,7 +16401,7 @@
                           </a:solidFill>
                           <a:effectLst/>
                         </a:rPr>
-                        <a:t>33_67</a:t>
+                        <a:t>33/67</a:t>
                       </a:r>
                       <a:endParaRPr lang="en-AU" sz="1400" b="0" i="0" u="none" strike="noStrike" dirty="0">
                         <a:solidFill>
@@ -16708,7 +16708,7 @@
                           </a:solidFill>
                           <a:effectLst/>
                         </a:rPr>
-                        <a:t>0_1</a:t>
+                        <a:t>0/110</a:t>
                       </a:r>
                       <a:endParaRPr lang="en-AU" sz="1400" b="0" i="0" u="none" strike="noStrike" kern="1200" dirty="0">
                         <a:solidFill>
@@ -17012,7 +17012,7 @@
                         <a:rPr lang="en-AU" sz="1400" u="none" strike="noStrike" dirty="0">
                           <a:effectLst/>
                         </a:rPr>
-                        <a:t>50_50</a:t>
+                        <a:t>50/50</a:t>
                       </a:r>
                       <a:endParaRPr lang="en-AU" sz="1400" b="0" i="0" u="none" strike="noStrike" dirty="0">
                         <a:solidFill>
@@ -17289,7 +17289,7 @@
                           </a:solidFill>
                           <a:effectLst/>
                         </a:rPr>
-                        <a:t>50_50</a:t>
+                        <a:t>50/50</a:t>
                       </a:r>
                       <a:endParaRPr lang="en-AU" sz="1400" b="0" i="0" u="none" strike="noStrike" dirty="0">
                         <a:solidFill>
@@ -17583,7 +17583,7 @@
                         <a:rPr lang="en-AU" sz="1400" u="none" strike="noStrike" dirty="0">
                           <a:effectLst/>
                         </a:rPr>
-                        <a:t>0_1</a:t>
+                        <a:t>0/100</a:t>
                       </a:r>
                       <a:endParaRPr lang="en-AU" sz="1400" b="0" i="0" u="none" strike="noStrike" dirty="0">
                         <a:solidFill>
@@ -17878,7 +17878,7 @@
                           </a:solidFill>
                           <a:effectLst/>
                         </a:rPr>
-                        <a:t>0_1</a:t>
+                        <a:t>0/100</a:t>
                       </a:r>
                       <a:endParaRPr lang="en-AU" sz="1400" b="0" i="0" u="none" strike="noStrike" dirty="0">
                         <a:solidFill>
@@ -18155,7 +18155,7 @@
                           </a:solidFill>
                           <a:effectLst/>
                         </a:rPr>
-                        <a:t>0_1</a:t>
+                        <a:t>0/100</a:t>
                       </a:r>
                       <a:endParaRPr lang="en-AU" sz="1400" b="0" i="0" u="none" strike="noStrike" dirty="0">
                         <a:solidFill>
@@ -18347,7 +18347,7 @@
             </a:pPr>
             <a:r>
               <a:rPr lang="en-US" dirty="0"/>
-              <a:t>Data dimension is fixed within each period: 4, 6</a:t>
+              <a:t>Data dimension is fixed within each period: 4 then 6</a:t>
             </a:r>
           </a:p>
         </p:txBody>

</xml_diff>